<commit_message>
2/17/18 First Mods to Strat Powerpoint
</commit_message>
<xml_diff>
--- a/CurrentWork_Delta/CX_StrategyPowerPoint.pptx
+++ b/CurrentWork_Delta/CX_StrategyPowerPoint.pptx
@@ -7,6 +7,14 @@
   <p:sldIdLst>
     <p:sldId id="256" r:id="rId2"/>
     <p:sldId id="257" r:id="rId3"/>
+    <p:sldId id="258" r:id="rId4"/>
+    <p:sldId id="259" r:id="rId5"/>
+    <p:sldId id="260" r:id="rId6"/>
+    <p:sldId id="261" r:id="rId7"/>
+    <p:sldId id="262" r:id="rId8"/>
+    <p:sldId id="263" r:id="rId9"/>
+    <p:sldId id="264" r:id="rId10"/>
+    <p:sldId id="265" r:id="rId11"/>
   </p:sldIdLst>
   <p:sldSz cx="12192000" cy="6858000"/>
   <p:notesSz cx="6858000" cy="9144000"/>
@@ -105,6 +113,11 @@
       </a:defRPr>
     </a:lvl9pPr>
   </p:defaultTextStyle>
+  <p:extLst>
+    <p:ext uri="{EFAFB233-063F-42B5-8137-9DF3F51BA10A}">
+      <p15:sldGuideLst xmlns:p15="http://schemas.microsoft.com/office/powerpoint/2012/main"/>
+    </p:ext>
+  </p:extLst>
 </p:presentation>
 </file>
 
@@ -2975,9 +2988,14 @@
             <p:ph type="ctrTitle"/>
           </p:nvPr>
         </p:nvSpPr>
-        <p:spPr/>
-        <p:txBody>
-          <a:bodyPr/>
+        <p:spPr>
+          <a:xfrm>
+            <a:off x="1524000" y="957263"/>
+            <a:ext cx="9144000" cy="1971675"/>
+          </a:xfrm>
+        </p:spPr>
+        <p:txBody>
+          <a:bodyPr anchor="t"/>
           <a:lstStyle/>
           <a:p>
             <a:r>
@@ -3018,6 +3036,78 @@
     <p:extLst>
       <p:ext uri="{BB962C8B-B14F-4D97-AF65-F5344CB8AC3E}">
         <p14:creationId xmlns:p14="http://schemas.microsoft.com/office/powerpoint/2010/main" val="4111385876"/>
+      </p:ext>
+    </p:extLst>
+  </p:cSld>
+  <p:clrMapOvr>
+    <a:masterClrMapping/>
+  </p:clrMapOvr>
+</p:sld>
+</file>
+
+<file path=ppt/slides/slide10.xml><?xml version="1.0" encoding="utf-8"?>
+<p:sld xmlns:a="http://schemas.openxmlformats.org/drawingml/2006/main" xmlns:r="http://schemas.openxmlformats.org/officeDocument/2006/relationships" xmlns:p="http://schemas.openxmlformats.org/presentationml/2006/main">
+  <p:cSld>
+    <p:spTree>
+      <p:nvGrpSpPr>
+        <p:cNvPr id="1" name=""/>
+        <p:cNvGrpSpPr/>
+        <p:nvPr/>
+      </p:nvGrpSpPr>
+      <p:grpSpPr>
+        <a:xfrm>
+          <a:off x="0" y="0"/>
+          <a:ext cx="0" cy="0"/>
+          <a:chOff x="0" y="0"/>
+          <a:chExt cx="0" cy="0"/>
+        </a:xfrm>
+      </p:grpSpPr>
+      <p:sp>
+        <p:nvSpPr>
+          <p:cNvPr id="2" name="Title 1"/>
+          <p:cNvSpPr>
+            <a:spLocks noGrp="1"/>
+          </p:cNvSpPr>
+          <p:nvPr>
+            <p:ph type="title"/>
+          </p:nvPr>
+        </p:nvSpPr>
+        <p:spPr/>
+        <p:txBody>
+          <a:bodyPr/>
+          <a:lstStyle/>
+          <a:p>
+            <a:r>
+              <a:rPr lang="en-US" dirty="0" smtClean="0"/>
+              <a:t>CLOSING</a:t>
+            </a:r>
+            <a:endParaRPr lang="en-US" dirty="0"/>
+          </a:p>
+        </p:txBody>
+      </p:sp>
+      <p:sp>
+        <p:nvSpPr>
+          <p:cNvPr id="3" name="Content Placeholder 2"/>
+          <p:cNvSpPr>
+            <a:spLocks noGrp="1"/>
+          </p:cNvSpPr>
+          <p:nvPr>
+            <p:ph idx="1"/>
+          </p:nvPr>
+        </p:nvSpPr>
+        <p:spPr/>
+        <p:txBody>
+          <a:bodyPr/>
+          <a:lstStyle/>
+          <a:p>
+            <a:endParaRPr lang="en-US" dirty="0"/>
+          </a:p>
+        </p:txBody>
+      </p:sp>
+    </p:spTree>
+    <p:extLst>
+      <p:ext uri="{BB962C8B-B14F-4D97-AF65-F5344CB8AC3E}">
+        <p14:creationId xmlns:p14="http://schemas.microsoft.com/office/powerpoint/2010/main" val="1740675661"/>
       </p:ext>
     </p:extLst>
   </p:cSld>
@@ -3056,12 +3146,12 @@
         </p:nvSpPr>
         <p:spPr>
           <a:xfrm>
-            <a:off x="132202" y="365125"/>
-            <a:ext cx="12059798" cy="1325563"/>
+            <a:off x="0" y="214312"/>
+            <a:ext cx="12059798" cy="1333501"/>
           </a:xfrm>
         </p:spPr>
         <p:txBody>
-          <a:bodyPr/>
+          <a:bodyPr anchor="t"/>
           <a:lstStyle/>
           <a:p>
             <a:r>
@@ -3100,41 +3190,122 @@
           </a:bodyPr>
           <a:lstStyle/>
           <a:p>
+            <a:pPr>
+              <a:lnSpc>
+                <a:spcPct val="150000"/>
+              </a:lnSpc>
+              <a:spcAft>
+                <a:spcPts val="1000"/>
+              </a:spcAft>
+            </a:pPr>
             <a:r>
               <a:rPr lang="en-US" dirty="0" smtClean="0">
                 <a:effectLst/>
               </a:rPr>
-              <a:t>The Test Automation frame work leverages available open source technology</a:t>
-            </a:r>
-          </a:p>
-          <a:p>
-            <a:endParaRPr lang="en-US" dirty="0"/>
-          </a:p>
-          <a:p>
+              <a:t>The Test Automation frame work leverages available open source </a:t>
+            </a:r>
             <a:r>
               <a:rPr lang="en-US" dirty="0" smtClean="0">
                 <a:effectLst/>
               </a:rPr>
-              <a:t>gives the organization ability to leverage technology to prove the correctness of CX Web Applications and supporting technologies.</a:t>
-            </a:r>
-          </a:p>
-          <a:p>
+              <a:t>technology</a:t>
+            </a:r>
+            <a:endParaRPr lang="en-US" dirty="0"/>
+          </a:p>
+          <a:p>
+            <a:pPr>
+              <a:lnSpc>
+                <a:spcPct val="150000"/>
+              </a:lnSpc>
+              <a:spcAft>
+                <a:spcPts val="1000"/>
+              </a:spcAft>
+            </a:pPr>
             <a:r>
               <a:rPr lang="en-US" dirty="0" smtClean="0">
                 <a:effectLst/>
               </a:rPr>
-              <a:t>This documentation provides detailed explanation of CXTA, our purpose, technologies, philosophies, process, and our evolutionary plans for 2018.</a:t>
-            </a:r>
-          </a:p>
-          <a:p>
+              <a:t>CXTA validates the correctness </a:t>
+            </a:r>
             <a:r>
               <a:rPr lang="en-US" dirty="0" smtClean="0">
                 <a:effectLst/>
               </a:rPr>
-              <a:t>We will give both high level and low technical level explanation of our execution environments, products used, design approach and design methods.</a:t>
-            </a:r>
-          </a:p>
-          <a:p>
+              <a:t>of </a:t>
+            </a:r>
+            <a:r>
+              <a:rPr lang="en-US" dirty="0" smtClean="0"/>
+              <a:t>all </a:t>
+            </a:r>
+            <a:r>
+              <a:rPr lang="en-US" dirty="0" smtClean="0">
+                <a:effectLst/>
+              </a:rPr>
+              <a:t>CX </a:t>
+            </a:r>
+            <a:r>
+              <a:rPr lang="en-US" dirty="0" smtClean="0">
+                <a:effectLst/>
+              </a:rPr>
+              <a:t>Web Applications </a:t>
+            </a:r>
+            <a:endParaRPr lang="en-US" dirty="0" smtClean="0">
+              <a:effectLst/>
+            </a:endParaRPr>
+          </a:p>
+          <a:p>
+            <a:pPr>
+              <a:lnSpc>
+                <a:spcPct val="150000"/>
+              </a:lnSpc>
+              <a:spcAft>
+                <a:spcPts val="1000"/>
+              </a:spcAft>
+            </a:pPr>
+            <a:r>
+              <a:rPr lang="en-US" dirty="0" smtClean="0"/>
+              <a:t>CXTA validates </a:t>
+            </a:r>
+            <a:r>
+              <a:rPr lang="en-US" dirty="0" smtClean="0">
+                <a:effectLst/>
+              </a:rPr>
+              <a:t>supporting technologies ( micro service API )</a:t>
+            </a:r>
+            <a:endParaRPr lang="en-US" dirty="0" smtClean="0">
+              <a:effectLst/>
+            </a:endParaRPr>
+          </a:p>
+          <a:p>
+            <a:pPr>
+              <a:lnSpc>
+                <a:spcPct val="150000"/>
+              </a:lnSpc>
+              <a:spcAft>
+                <a:spcPts val="1000"/>
+              </a:spcAft>
+            </a:pPr>
+            <a:r>
+              <a:rPr lang="en-US" dirty="0" smtClean="0"/>
+              <a:t>The following provides an </a:t>
+            </a:r>
+            <a:r>
+              <a:rPr lang="en-US" dirty="0" smtClean="0">
+                <a:effectLst/>
+              </a:rPr>
+              <a:t>explanation </a:t>
+            </a:r>
+            <a:r>
+              <a:rPr lang="en-US" dirty="0" smtClean="0">
+                <a:effectLst/>
+              </a:rPr>
+              <a:t>of CXTA, our purpose, technologies, philosophies, process, and our evolutionary plans for 2018.</a:t>
+            </a:r>
+          </a:p>
+          <a:p>
+            <a:pPr marL="0" indent="0">
+              <a:buNone/>
+            </a:pPr>
             <a:endParaRPr lang="en-US" dirty="0"/>
           </a:p>
         </p:txBody>
@@ -3143,6 +3314,837 @@
     <p:extLst>
       <p:ext uri="{BB962C8B-B14F-4D97-AF65-F5344CB8AC3E}">
         <p14:creationId xmlns:p14="http://schemas.microsoft.com/office/powerpoint/2010/main" val="2382997305"/>
+      </p:ext>
+    </p:extLst>
+  </p:cSld>
+  <p:clrMapOvr>
+    <a:masterClrMapping/>
+  </p:clrMapOvr>
+</p:sld>
+</file>
+
+<file path=ppt/slides/slide3.xml><?xml version="1.0" encoding="utf-8"?>
+<p:sld xmlns:a="http://schemas.openxmlformats.org/drawingml/2006/main" xmlns:r="http://schemas.openxmlformats.org/officeDocument/2006/relationships" xmlns:p="http://schemas.openxmlformats.org/presentationml/2006/main">
+  <p:cSld>
+    <p:spTree>
+      <p:nvGrpSpPr>
+        <p:cNvPr id="1" name=""/>
+        <p:cNvGrpSpPr/>
+        <p:nvPr/>
+      </p:nvGrpSpPr>
+      <p:grpSpPr>
+        <a:xfrm>
+          <a:off x="0" y="0"/>
+          <a:ext cx="0" cy="0"/>
+          <a:chOff x="0" y="0"/>
+          <a:chExt cx="0" cy="0"/>
+        </a:xfrm>
+      </p:grpSpPr>
+      <p:sp>
+        <p:nvSpPr>
+          <p:cNvPr id="2" name="Title 1"/>
+          <p:cNvSpPr>
+            <a:spLocks noGrp="1"/>
+          </p:cNvSpPr>
+          <p:nvPr>
+            <p:ph type="title"/>
+          </p:nvPr>
+        </p:nvSpPr>
+        <p:spPr>
+          <a:xfrm>
+            <a:off x="838200" y="1"/>
+            <a:ext cx="10515600" cy="571499"/>
+          </a:xfrm>
+        </p:spPr>
+        <p:txBody>
+          <a:bodyPr anchor="t">
+            <a:normAutofit fontScale="90000"/>
+          </a:bodyPr>
+          <a:lstStyle/>
+          <a:p>
+            <a:r>
+              <a:rPr lang="en-US" dirty="0" smtClean="0"/>
+              <a:t>PURPOSE  :   </a:t>
+            </a:r>
+            <a:r>
+              <a:rPr lang="en-US" sz="3600" dirty="0"/>
+              <a:t>Operational  &amp; Functional Process</a:t>
+            </a:r>
+            <a:br>
+              <a:rPr lang="en-US" sz="3600" dirty="0"/>
+            </a:br>
+            <a:endParaRPr lang="en-US" sz="3600" dirty="0"/>
+          </a:p>
+        </p:txBody>
+      </p:sp>
+      <p:sp>
+        <p:nvSpPr>
+          <p:cNvPr id="3" name="Content Placeholder 2"/>
+          <p:cNvSpPr>
+            <a:spLocks noGrp="1"/>
+          </p:cNvSpPr>
+          <p:nvPr>
+            <p:ph idx="1"/>
+          </p:nvPr>
+        </p:nvSpPr>
+        <p:spPr>
+          <a:xfrm>
+            <a:off x="144963" y="865823"/>
+            <a:ext cx="11490593" cy="4762500"/>
+          </a:xfrm>
+        </p:spPr>
+        <p:txBody>
+          <a:bodyPr>
+            <a:normAutofit/>
+          </a:bodyPr>
+          <a:lstStyle/>
+          <a:p>
+            <a:r>
+              <a:rPr lang="en-US" dirty="0" smtClean="0"/>
+              <a:t>Develop and deliver an automated </a:t>
+            </a:r>
+            <a:r>
+              <a:rPr lang="en-US" dirty="0"/>
+              <a:t>testing frame work </a:t>
+            </a:r>
+            <a:endParaRPr lang="en-US" dirty="0" smtClean="0"/>
+          </a:p>
+          <a:p>
+            <a:endParaRPr lang="en-US" dirty="0"/>
+          </a:p>
+          <a:p>
+            <a:r>
+              <a:rPr lang="en-US" dirty="0" smtClean="0"/>
+              <a:t>Design the Framework with enough power and flexibility to meet </a:t>
+            </a:r>
+            <a:r>
+              <a:rPr lang="en-US" dirty="0"/>
+              <a:t>current and future </a:t>
+            </a:r>
+            <a:r>
+              <a:rPr lang="en-US" dirty="0" smtClean="0"/>
+              <a:t>needs</a:t>
+            </a:r>
+          </a:p>
+          <a:p>
+            <a:endParaRPr lang="en-US" dirty="0"/>
+          </a:p>
+          <a:p>
+            <a:r>
+              <a:rPr lang="en-US" dirty="0" smtClean="0"/>
+              <a:t>Design with a developmental </a:t>
+            </a:r>
+            <a:r>
+              <a:rPr lang="en-US" dirty="0"/>
+              <a:t>philosophy that </a:t>
+            </a:r>
+            <a:r>
+              <a:rPr lang="en-US" dirty="0" smtClean="0"/>
+              <a:t>enables seasoned </a:t>
+            </a:r>
+            <a:r>
+              <a:rPr lang="en-US" dirty="0"/>
+              <a:t>engineers to </a:t>
+            </a:r>
+            <a:r>
+              <a:rPr lang="en-US" dirty="0" smtClean="0"/>
+              <a:t>create test scripts to validate their own work.</a:t>
+            </a:r>
+          </a:p>
+          <a:p>
+            <a:endParaRPr lang="en-US" dirty="0" smtClean="0"/>
+          </a:p>
+          <a:p>
+            <a:r>
+              <a:rPr lang="en-US" dirty="0" smtClean="0"/>
+              <a:t>Continue </a:t>
+            </a:r>
+            <a:r>
+              <a:rPr lang="en-US" dirty="0"/>
+              <a:t>developing Use Case End to End Work Flow test scripts.  </a:t>
+            </a:r>
+          </a:p>
+          <a:p>
+            <a:endParaRPr lang="en-US" dirty="0" smtClean="0"/>
+          </a:p>
+          <a:p>
+            <a:endParaRPr lang="en-US" dirty="0"/>
+          </a:p>
+          <a:p>
+            <a:endParaRPr lang="en-US" dirty="0"/>
+          </a:p>
+        </p:txBody>
+      </p:sp>
+    </p:spTree>
+    <p:extLst>
+      <p:ext uri="{BB962C8B-B14F-4D97-AF65-F5344CB8AC3E}">
+        <p14:creationId xmlns:p14="http://schemas.microsoft.com/office/powerpoint/2010/main" val="3915946766"/>
+      </p:ext>
+    </p:extLst>
+  </p:cSld>
+  <p:clrMapOvr>
+    <a:masterClrMapping/>
+  </p:clrMapOvr>
+</p:sld>
+</file>
+
+<file path=ppt/slides/slide4.xml><?xml version="1.0" encoding="utf-8"?>
+<p:sld xmlns:a="http://schemas.openxmlformats.org/drawingml/2006/main" xmlns:r="http://schemas.openxmlformats.org/officeDocument/2006/relationships" xmlns:p="http://schemas.openxmlformats.org/presentationml/2006/main">
+  <p:cSld>
+    <p:spTree>
+      <p:nvGrpSpPr>
+        <p:cNvPr id="1" name=""/>
+        <p:cNvGrpSpPr/>
+        <p:nvPr/>
+      </p:nvGrpSpPr>
+      <p:grpSpPr>
+        <a:xfrm>
+          <a:off x="0" y="0"/>
+          <a:ext cx="0" cy="0"/>
+          <a:chOff x="0" y="0"/>
+          <a:chExt cx="0" cy="0"/>
+        </a:xfrm>
+      </p:grpSpPr>
+      <p:sp>
+        <p:nvSpPr>
+          <p:cNvPr id="2" name="Title 1"/>
+          <p:cNvSpPr>
+            <a:spLocks noGrp="1"/>
+          </p:cNvSpPr>
+          <p:nvPr>
+            <p:ph type="title"/>
+          </p:nvPr>
+        </p:nvSpPr>
+        <p:spPr>
+          <a:xfrm>
+            <a:off x="838200" y="80011"/>
+            <a:ext cx="10515600" cy="880110"/>
+          </a:xfrm>
+        </p:spPr>
+        <p:txBody>
+          <a:bodyPr anchor="t">
+            <a:normAutofit/>
+          </a:bodyPr>
+          <a:lstStyle/>
+          <a:p>
+            <a:r>
+              <a:rPr lang="en-US" dirty="0" smtClean="0"/>
+              <a:t>EVOLUTION</a:t>
+            </a:r>
+            <a:endParaRPr lang="en-US" dirty="0"/>
+          </a:p>
+        </p:txBody>
+      </p:sp>
+      <p:sp>
+        <p:nvSpPr>
+          <p:cNvPr id="3" name="Content Placeholder 2"/>
+          <p:cNvSpPr>
+            <a:spLocks noGrp="1"/>
+          </p:cNvSpPr>
+          <p:nvPr>
+            <p:ph idx="1"/>
+          </p:nvPr>
+        </p:nvSpPr>
+        <p:spPr>
+          <a:xfrm>
+            <a:off x="140970" y="960121"/>
+            <a:ext cx="10515600" cy="5216843"/>
+          </a:xfrm>
+        </p:spPr>
+        <p:txBody>
+          <a:bodyPr/>
+          <a:lstStyle/>
+          <a:p>
+            <a:r>
+              <a:rPr lang="en-US" dirty="0"/>
+              <a:t>CXTA and the CX Market Place Development Team have matured. </a:t>
+            </a:r>
+            <a:endParaRPr lang="en-US" dirty="0" smtClean="0"/>
+          </a:p>
+          <a:p>
+            <a:r>
+              <a:rPr lang="en-US" dirty="0" smtClean="0"/>
+              <a:t>We </a:t>
+            </a:r>
+            <a:r>
+              <a:rPr lang="en-US" dirty="0"/>
+              <a:t>are able to do more and deliver to a greater audience.  </a:t>
+            </a:r>
+            <a:endParaRPr lang="en-US" dirty="0" smtClean="0"/>
+          </a:p>
+          <a:p>
+            <a:endParaRPr lang="en-US" dirty="0" smtClean="0"/>
+          </a:p>
+          <a:p>
+            <a:r>
+              <a:rPr lang="en-US" dirty="0" smtClean="0"/>
+              <a:t>California </a:t>
+            </a:r>
+            <a:r>
+              <a:rPr lang="en-US" dirty="0"/>
+              <a:t>is no longer the </a:t>
+            </a:r>
+            <a:r>
+              <a:rPr lang="en-US" dirty="0" smtClean="0"/>
+              <a:t>horizon !</a:t>
+            </a:r>
+          </a:p>
+          <a:p>
+            <a:pPr marL="0" indent="0">
+              <a:buNone/>
+            </a:pPr>
+            <a:r>
+              <a:rPr lang="en-US" sz="800" dirty="0" smtClean="0"/>
+              <a:t>            </a:t>
+            </a:r>
+          </a:p>
+          <a:p>
+            <a:pPr marL="0" indent="0">
+              <a:buNone/>
+            </a:pPr>
+            <a:endParaRPr lang="en-US" sz="800" dirty="0"/>
+          </a:p>
+          <a:p>
+            <a:r>
+              <a:rPr lang="en-US" dirty="0" smtClean="0"/>
+              <a:t>To scale as is projected we have to change how we develop tests</a:t>
+            </a:r>
+          </a:p>
+          <a:p>
+            <a:endParaRPr lang="en-US" dirty="0" smtClean="0"/>
+          </a:p>
+          <a:p>
+            <a:r>
+              <a:rPr lang="en-US" dirty="0" smtClean="0"/>
+              <a:t>We have to change how we select and execute tests</a:t>
+            </a:r>
+            <a:endParaRPr lang="en-US" dirty="0"/>
+          </a:p>
+        </p:txBody>
+      </p:sp>
+    </p:spTree>
+    <p:extLst>
+      <p:ext uri="{BB962C8B-B14F-4D97-AF65-F5344CB8AC3E}">
+        <p14:creationId xmlns:p14="http://schemas.microsoft.com/office/powerpoint/2010/main" val="134519480"/>
+      </p:ext>
+    </p:extLst>
+  </p:cSld>
+  <p:clrMapOvr>
+    <a:masterClrMapping/>
+  </p:clrMapOvr>
+</p:sld>
+</file>
+
+<file path=ppt/slides/slide5.xml><?xml version="1.0" encoding="utf-8"?>
+<p:sld xmlns:a="http://schemas.openxmlformats.org/drawingml/2006/main" xmlns:r="http://schemas.openxmlformats.org/officeDocument/2006/relationships" xmlns:p="http://schemas.openxmlformats.org/presentationml/2006/main">
+  <p:cSld>
+    <p:spTree>
+      <p:nvGrpSpPr>
+        <p:cNvPr id="1" name=""/>
+        <p:cNvGrpSpPr/>
+        <p:nvPr/>
+      </p:nvGrpSpPr>
+      <p:grpSpPr>
+        <a:xfrm>
+          <a:off x="0" y="0"/>
+          <a:ext cx="0" cy="0"/>
+          <a:chOff x="0" y="0"/>
+          <a:chExt cx="0" cy="0"/>
+        </a:xfrm>
+      </p:grpSpPr>
+      <p:sp>
+        <p:nvSpPr>
+          <p:cNvPr id="2" name="Title 1"/>
+          <p:cNvSpPr>
+            <a:spLocks noGrp="1"/>
+          </p:cNvSpPr>
+          <p:nvPr>
+            <p:ph type="title"/>
+          </p:nvPr>
+        </p:nvSpPr>
+        <p:spPr>
+          <a:xfrm>
+            <a:off x="758190" y="-11429"/>
+            <a:ext cx="10515600" cy="651510"/>
+          </a:xfrm>
+        </p:spPr>
+        <p:txBody>
+          <a:bodyPr anchor="t">
+            <a:normAutofit fontScale="90000"/>
+          </a:bodyPr>
+          <a:lstStyle/>
+          <a:p>
+            <a:r>
+              <a:rPr lang="en-US" dirty="0" smtClean="0"/>
+              <a:t>ROLL OUT</a:t>
+            </a:r>
+            <a:endParaRPr lang="en-US" dirty="0"/>
+          </a:p>
+        </p:txBody>
+      </p:sp>
+      <p:sp>
+        <p:nvSpPr>
+          <p:cNvPr id="3" name="Content Placeholder 2"/>
+          <p:cNvSpPr>
+            <a:spLocks noGrp="1"/>
+          </p:cNvSpPr>
+          <p:nvPr>
+            <p:ph idx="1"/>
+          </p:nvPr>
+        </p:nvSpPr>
+        <p:spPr>
+          <a:xfrm>
+            <a:off x="129540" y="785494"/>
+            <a:ext cx="11254740" cy="4940935"/>
+          </a:xfrm>
+        </p:spPr>
+        <p:txBody>
+          <a:bodyPr>
+            <a:normAutofit/>
+          </a:bodyPr>
+          <a:lstStyle/>
+          <a:p>
+            <a:pPr>
+              <a:lnSpc>
+                <a:spcPct val="125000"/>
+              </a:lnSpc>
+            </a:pPr>
+            <a:r>
+              <a:rPr lang="en-US" dirty="0"/>
+              <a:t>CXTA </a:t>
+            </a:r>
+            <a:r>
+              <a:rPr lang="en-US" dirty="0" smtClean="0"/>
+              <a:t> is rolling </a:t>
+            </a:r>
+            <a:r>
+              <a:rPr lang="en-US" dirty="0"/>
+              <a:t>out </a:t>
+            </a:r>
+            <a:r>
+              <a:rPr lang="en-US" dirty="0" smtClean="0"/>
+              <a:t>their </a:t>
+            </a:r>
+            <a:r>
+              <a:rPr lang="en-US" dirty="0"/>
+              <a:t>first version </a:t>
+            </a:r>
+            <a:r>
+              <a:rPr lang="en-US" dirty="0" smtClean="0"/>
+              <a:t>of the Test </a:t>
+            </a:r>
+            <a:r>
+              <a:rPr lang="en-US" dirty="0"/>
+              <a:t>Automation Framework </a:t>
+            </a:r>
+            <a:endParaRPr lang="en-US" dirty="0" smtClean="0"/>
+          </a:p>
+          <a:p>
+            <a:pPr>
+              <a:lnSpc>
+                <a:spcPct val="125000"/>
+              </a:lnSpc>
+            </a:pPr>
+            <a:r>
+              <a:rPr lang="en-US" dirty="0"/>
+              <a:t>Development </a:t>
+            </a:r>
+            <a:r>
+              <a:rPr lang="en-US" dirty="0" smtClean="0"/>
+              <a:t>will </a:t>
+            </a:r>
+            <a:r>
+              <a:rPr lang="en-US" dirty="0"/>
+              <a:t>write test automation scripts </a:t>
+            </a:r>
+            <a:r>
+              <a:rPr lang="en-US" dirty="0" smtClean="0"/>
+              <a:t>supporting their work</a:t>
+            </a:r>
+          </a:p>
+          <a:p>
+            <a:pPr>
+              <a:lnSpc>
+                <a:spcPct val="125000"/>
+              </a:lnSpc>
+            </a:pPr>
+            <a:r>
+              <a:rPr lang="en-US" dirty="0" smtClean="0"/>
+              <a:t>This scripting </a:t>
+            </a:r>
+            <a:r>
+              <a:rPr lang="en-US" dirty="0"/>
+              <a:t>will be page specific feature level integration </a:t>
+            </a:r>
+            <a:r>
+              <a:rPr lang="en-US" dirty="0" smtClean="0"/>
+              <a:t>tests</a:t>
+            </a:r>
+          </a:p>
+          <a:p>
+            <a:pPr>
+              <a:lnSpc>
+                <a:spcPct val="125000"/>
+              </a:lnSpc>
+            </a:pPr>
+            <a:r>
+              <a:rPr lang="en-US" dirty="0" smtClean="0"/>
+              <a:t>CXTA will manage </a:t>
+            </a:r>
+            <a:r>
+              <a:rPr lang="en-US" dirty="0"/>
+              <a:t>all </a:t>
+            </a:r>
+            <a:r>
+              <a:rPr lang="en-US" dirty="0" err="1" smtClean="0"/>
+              <a:t>UseCase</a:t>
+            </a:r>
+            <a:r>
+              <a:rPr lang="en-US" dirty="0" smtClean="0"/>
+              <a:t> End </a:t>
+            </a:r>
+            <a:r>
+              <a:rPr lang="en-US" dirty="0"/>
+              <a:t>to End test automation </a:t>
+            </a:r>
+            <a:endParaRPr lang="en-US" dirty="0" smtClean="0"/>
+          </a:p>
+          <a:p>
+            <a:pPr>
+              <a:lnSpc>
+                <a:spcPct val="125000"/>
+              </a:lnSpc>
+            </a:pPr>
+            <a:r>
+              <a:rPr lang="en-US" dirty="0" smtClean="0"/>
+              <a:t>CXTA will maintain </a:t>
+            </a:r>
+            <a:r>
+              <a:rPr lang="en-US" dirty="0"/>
+              <a:t>and enhance the </a:t>
+            </a:r>
+            <a:r>
+              <a:rPr lang="en-US" dirty="0" smtClean="0"/>
+              <a:t>Test Automation </a:t>
+            </a:r>
+            <a:r>
+              <a:rPr lang="en-US" dirty="0"/>
+              <a:t>framework.</a:t>
+            </a:r>
+          </a:p>
+          <a:p>
+            <a:pPr>
+              <a:lnSpc>
+                <a:spcPct val="125000"/>
+              </a:lnSpc>
+            </a:pPr>
+            <a:r>
+              <a:rPr lang="en-US" dirty="0" smtClean="0"/>
+              <a:t>Inclusion of development staff </a:t>
+            </a:r>
+            <a:r>
+              <a:rPr lang="en-US" dirty="0"/>
+              <a:t>in the automation development process we </a:t>
+            </a:r>
+            <a:r>
+              <a:rPr lang="en-US" dirty="0" smtClean="0"/>
+              <a:t>align </a:t>
+            </a:r>
+            <a:r>
+              <a:rPr lang="en-US" dirty="0"/>
+              <a:t>our teams much like the rest of the industry</a:t>
+            </a:r>
+            <a:r>
+              <a:rPr lang="en-US" dirty="0" smtClean="0"/>
+              <a:t>.</a:t>
+            </a:r>
+          </a:p>
+        </p:txBody>
+      </p:sp>
+    </p:spTree>
+    <p:extLst>
+      <p:ext uri="{BB962C8B-B14F-4D97-AF65-F5344CB8AC3E}">
+        <p14:creationId xmlns:p14="http://schemas.microsoft.com/office/powerpoint/2010/main" val="2538467909"/>
+      </p:ext>
+    </p:extLst>
+  </p:cSld>
+  <p:clrMapOvr>
+    <a:masterClrMapping/>
+  </p:clrMapOvr>
+</p:sld>
+</file>
+
+<file path=ppt/slides/slide6.xml><?xml version="1.0" encoding="utf-8"?>
+<p:sld xmlns:a="http://schemas.openxmlformats.org/drawingml/2006/main" xmlns:r="http://schemas.openxmlformats.org/officeDocument/2006/relationships" xmlns:p="http://schemas.openxmlformats.org/presentationml/2006/main">
+  <p:cSld>
+    <p:spTree>
+      <p:nvGrpSpPr>
+        <p:cNvPr id="1" name=""/>
+        <p:cNvGrpSpPr/>
+        <p:nvPr/>
+      </p:nvGrpSpPr>
+      <p:grpSpPr>
+        <a:xfrm>
+          <a:off x="0" y="0"/>
+          <a:ext cx="0" cy="0"/>
+          <a:chOff x="0" y="0"/>
+          <a:chExt cx="0" cy="0"/>
+        </a:xfrm>
+      </p:grpSpPr>
+      <p:sp>
+        <p:nvSpPr>
+          <p:cNvPr id="2" name="Title 1"/>
+          <p:cNvSpPr>
+            <a:spLocks noGrp="1"/>
+          </p:cNvSpPr>
+          <p:nvPr>
+            <p:ph type="title"/>
+          </p:nvPr>
+        </p:nvSpPr>
+        <p:spPr/>
+        <p:txBody>
+          <a:bodyPr/>
+          <a:lstStyle/>
+          <a:p>
+            <a:endParaRPr lang="en-US"/>
+          </a:p>
+        </p:txBody>
+      </p:sp>
+      <p:sp>
+        <p:nvSpPr>
+          <p:cNvPr id="3" name="Content Placeholder 2"/>
+          <p:cNvSpPr>
+            <a:spLocks noGrp="1"/>
+          </p:cNvSpPr>
+          <p:nvPr>
+            <p:ph idx="1"/>
+          </p:nvPr>
+        </p:nvSpPr>
+        <p:spPr/>
+        <p:txBody>
+          <a:bodyPr/>
+          <a:lstStyle/>
+          <a:p>
+            <a:endParaRPr lang="en-US"/>
+          </a:p>
+        </p:txBody>
+      </p:sp>
+    </p:spTree>
+    <p:extLst>
+      <p:ext uri="{BB962C8B-B14F-4D97-AF65-F5344CB8AC3E}">
+        <p14:creationId xmlns:p14="http://schemas.microsoft.com/office/powerpoint/2010/main" val="1195374458"/>
+      </p:ext>
+    </p:extLst>
+  </p:cSld>
+  <p:clrMapOvr>
+    <a:masterClrMapping/>
+  </p:clrMapOvr>
+</p:sld>
+</file>
+
+<file path=ppt/slides/slide7.xml><?xml version="1.0" encoding="utf-8"?>
+<p:sld xmlns:a="http://schemas.openxmlformats.org/drawingml/2006/main" xmlns:r="http://schemas.openxmlformats.org/officeDocument/2006/relationships" xmlns:p="http://schemas.openxmlformats.org/presentationml/2006/main">
+  <p:cSld>
+    <p:spTree>
+      <p:nvGrpSpPr>
+        <p:cNvPr id="1" name=""/>
+        <p:cNvGrpSpPr/>
+        <p:nvPr/>
+      </p:nvGrpSpPr>
+      <p:grpSpPr>
+        <a:xfrm>
+          <a:off x="0" y="0"/>
+          <a:ext cx="0" cy="0"/>
+          <a:chOff x="0" y="0"/>
+          <a:chExt cx="0" cy="0"/>
+        </a:xfrm>
+      </p:grpSpPr>
+      <p:sp>
+        <p:nvSpPr>
+          <p:cNvPr id="2" name="Title 1"/>
+          <p:cNvSpPr>
+            <a:spLocks noGrp="1"/>
+          </p:cNvSpPr>
+          <p:nvPr>
+            <p:ph type="title"/>
+          </p:nvPr>
+        </p:nvSpPr>
+        <p:spPr/>
+        <p:txBody>
+          <a:bodyPr/>
+          <a:lstStyle/>
+          <a:p>
+            <a:endParaRPr lang="en-US"/>
+          </a:p>
+        </p:txBody>
+      </p:sp>
+      <p:sp>
+        <p:nvSpPr>
+          <p:cNvPr id="3" name="Content Placeholder 2"/>
+          <p:cNvSpPr>
+            <a:spLocks noGrp="1"/>
+          </p:cNvSpPr>
+          <p:nvPr>
+            <p:ph idx="1"/>
+          </p:nvPr>
+        </p:nvSpPr>
+        <p:spPr/>
+        <p:txBody>
+          <a:bodyPr/>
+          <a:lstStyle/>
+          <a:p>
+            <a:endParaRPr lang="en-US"/>
+          </a:p>
+        </p:txBody>
+      </p:sp>
+    </p:spTree>
+    <p:extLst>
+      <p:ext uri="{BB962C8B-B14F-4D97-AF65-F5344CB8AC3E}">
+        <p14:creationId xmlns:p14="http://schemas.microsoft.com/office/powerpoint/2010/main" val="3707015434"/>
+      </p:ext>
+    </p:extLst>
+  </p:cSld>
+  <p:clrMapOvr>
+    <a:masterClrMapping/>
+  </p:clrMapOvr>
+</p:sld>
+</file>
+
+<file path=ppt/slides/slide8.xml><?xml version="1.0" encoding="utf-8"?>
+<p:sld xmlns:a="http://schemas.openxmlformats.org/drawingml/2006/main" xmlns:r="http://schemas.openxmlformats.org/officeDocument/2006/relationships" xmlns:p="http://schemas.openxmlformats.org/presentationml/2006/main">
+  <p:cSld>
+    <p:spTree>
+      <p:nvGrpSpPr>
+        <p:cNvPr id="1" name=""/>
+        <p:cNvGrpSpPr/>
+        <p:nvPr/>
+      </p:nvGrpSpPr>
+      <p:grpSpPr>
+        <a:xfrm>
+          <a:off x="0" y="0"/>
+          <a:ext cx="0" cy="0"/>
+          <a:chOff x="0" y="0"/>
+          <a:chExt cx="0" cy="0"/>
+        </a:xfrm>
+      </p:grpSpPr>
+      <p:sp>
+        <p:nvSpPr>
+          <p:cNvPr id="2" name="Title 1"/>
+          <p:cNvSpPr>
+            <a:spLocks noGrp="1"/>
+          </p:cNvSpPr>
+          <p:nvPr>
+            <p:ph type="title"/>
+          </p:nvPr>
+        </p:nvSpPr>
+        <p:spPr/>
+        <p:txBody>
+          <a:bodyPr/>
+          <a:lstStyle/>
+          <a:p>
+            <a:r>
+              <a:rPr lang="en-US" dirty="0" smtClean="0"/>
+              <a:t>EXECUTION</a:t>
+            </a:r>
+            <a:endParaRPr lang="en-US" dirty="0"/>
+          </a:p>
+        </p:txBody>
+      </p:sp>
+      <p:sp>
+        <p:nvSpPr>
+          <p:cNvPr id="3" name="Content Placeholder 2"/>
+          <p:cNvSpPr>
+            <a:spLocks noGrp="1"/>
+          </p:cNvSpPr>
+          <p:nvPr>
+            <p:ph idx="1"/>
+          </p:nvPr>
+        </p:nvSpPr>
+        <p:spPr/>
+        <p:txBody>
+          <a:bodyPr/>
+          <a:lstStyle/>
+          <a:p>
+            <a:endParaRPr lang="en-US"/>
+          </a:p>
+        </p:txBody>
+      </p:sp>
+    </p:spTree>
+    <p:extLst>
+      <p:ext uri="{BB962C8B-B14F-4D97-AF65-F5344CB8AC3E}">
+        <p14:creationId xmlns:p14="http://schemas.microsoft.com/office/powerpoint/2010/main" val="600975366"/>
+      </p:ext>
+    </p:extLst>
+  </p:cSld>
+  <p:clrMapOvr>
+    <a:masterClrMapping/>
+  </p:clrMapOvr>
+</p:sld>
+</file>
+
+<file path=ppt/slides/slide9.xml><?xml version="1.0" encoding="utf-8"?>
+<p:sld xmlns:a="http://schemas.openxmlformats.org/drawingml/2006/main" xmlns:r="http://schemas.openxmlformats.org/officeDocument/2006/relationships" xmlns:p="http://schemas.openxmlformats.org/presentationml/2006/main">
+  <p:cSld>
+    <p:spTree>
+      <p:nvGrpSpPr>
+        <p:cNvPr id="1" name=""/>
+        <p:cNvGrpSpPr/>
+        <p:nvPr/>
+      </p:nvGrpSpPr>
+      <p:grpSpPr>
+        <a:xfrm>
+          <a:off x="0" y="0"/>
+          <a:ext cx="0" cy="0"/>
+          <a:chOff x="0" y="0"/>
+          <a:chExt cx="0" cy="0"/>
+        </a:xfrm>
+      </p:grpSpPr>
+      <p:sp>
+        <p:nvSpPr>
+          <p:cNvPr id="2" name="Title 1"/>
+          <p:cNvSpPr>
+            <a:spLocks noGrp="1"/>
+          </p:cNvSpPr>
+          <p:nvPr>
+            <p:ph type="title"/>
+          </p:nvPr>
+        </p:nvSpPr>
+        <p:spPr/>
+        <p:txBody>
+          <a:bodyPr/>
+          <a:lstStyle/>
+          <a:p>
+            <a:r>
+              <a:rPr lang="en-US" dirty="0" smtClean="0"/>
+              <a:t>REPORTING</a:t>
+            </a:r>
+            <a:endParaRPr lang="en-US" dirty="0"/>
+          </a:p>
+        </p:txBody>
+      </p:sp>
+      <p:sp>
+        <p:nvSpPr>
+          <p:cNvPr id="3" name="Content Placeholder 2"/>
+          <p:cNvSpPr>
+            <a:spLocks noGrp="1"/>
+          </p:cNvSpPr>
+          <p:nvPr>
+            <p:ph idx="1"/>
+          </p:nvPr>
+        </p:nvSpPr>
+        <p:spPr/>
+        <p:txBody>
+          <a:bodyPr/>
+          <a:lstStyle/>
+          <a:p>
+            <a:endParaRPr lang="en-US"/>
+          </a:p>
+        </p:txBody>
+      </p:sp>
+    </p:spTree>
+    <p:extLst>
+      <p:ext uri="{BB962C8B-B14F-4D97-AF65-F5344CB8AC3E}">
+        <p14:creationId xmlns:p14="http://schemas.microsoft.com/office/powerpoint/2010/main" val="1143108204"/>
       </p:ext>
     </p:extLst>
   </p:cSld>

</xml_diff>

<commit_message>
2/17/18 First Mod last today to Strat Powerpoint
</commit_message>
<xml_diff>
--- a/CurrentWork_Delta/CX_StrategyPowerPoint.pptx
+++ b/CurrentWork_Delta/CX_StrategyPowerPoint.pptx
@@ -3028,7 +3028,11 @@
           <a:bodyPr/>
           <a:lstStyle/>
           <a:p>
-            <a:endParaRPr lang="en-US"/>
+            <a:r>
+              <a:rPr lang="en-US" dirty="0" smtClean="0"/>
+              <a:t>Need to add some worthy quote here</a:t>
+            </a:r>
+            <a:endParaRPr lang="en-US" dirty="0"/>
           </a:p>
         </p:txBody>
       </p:sp>
@@ -3147,16 +3151,28 @@
         <p:spPr>
           <a:xfrm>
             <a:off x="0" y="214312"/>
-            <a:ext cx="12059798" cy="1333501"/>
+            <a:ext cx="9920177" cy="1333501"/>
           </a:xfrm>
         </p:spPr>
         <p:txBody>
           <a:bodyPr anchor="t"/>
           <a:lstStyle/>
           <a:p>
-            <a:r>
-              <a:rPr lang="en-US" dirty="0" smtClean="0"/>
-              <a:t>INTRODUCTION  :  CXTA  - </a:t>
+            <a:pPr algn="ctr"/>
+            <a:r>
+              <a:rPr lang="en-US" dirty="0" smtClean="0"/>
+              <a:t>INTRODUCTION</a:t>
+            </a:r>
+            <a:br>
+              <a:rPr lang="en-US" dirty="0" smtClean="0"/>
+            </a:br>
+            <a:r>
+              <a:rPr lang="en-US" dirty="0" smtClean="0"/>
+              <a:t>     CXTA  </a:t>
+            </a:r>
+            <a:r>
+              <a:rPr lang="en-US" dirty="0" smtClean="0"/>
+              <a:t>- </a:t>
             </a:r>
             <a:r>
               <a:rPr lang="en-US" sz="3000" b="1" dirty="0" smtClean="0">
@@ -3180,13 +3196,13 @@
         </p:nvSpPr>
         <p:spPr>
           <a:xfrm>
-            <a:off x="264405" y="1825625"/>
-            <a:ext cx="11677879" cy="4351338"/>
+            <a:off x="285670" y="1892595"/>
+            <a:ext cx="11677879" cy="3997841"/>
           </a:xfrm>
         </p:spPr>
         <p:txBody>
           <a:bodyPr>
-            <a:normAutofit/>
+            <a:normAutofit lnSpcReduction="10000"/>
           </a:bodyPr>
           <a:lstStyle/>
           <a:p>
@@ -3202,13 +3218,7 @@
               <a:rPr lang="en-US" dirty="0" smtClean="0">
                 <a:effectLst/>
               </a:rPr>
-              <a:t>The Test Automation frame work leverages available open source </a:t>
-            </a:r>
-            <a:r>
-              <a:rPr lang="en-US" dirty="0" smtClean="0">
-                <a:effectLst/>
-              </a:rPr>
-              <a:t>technology</a:t>
+              <a:t>The Test Automation frame work leverages available open source technology</a:t>
             </a:r>
             <a:endParaRPr lang="en-US" dirty="0"/>
           </a:p>
@@ -3225,7 +3235,13 @@
               <a:rPr lang="en-US" dirty="0" smtClean="0">
                 <a:effectLst/>
               </a:rPr>
-              <a:t>CXTA validates the correctness </a:t>
+              <a:t>CXTA validates the </a:t>
+            </a:r>
+            <a:r>
+              <a:rPr lang="en-US" dirty="0" smtClean="0">
+                <a:effectLst/>
+              </a:rPr>
+              <a:t>operational correctness </a:t>
             </a:r>
             <a:r>
               <a:rPr lang="en-US" dirty="0" smtClean="0">
@@ -3234,10 +3250,6 @@
               <a:t>of </a:t>
             </a:r>
             <a:r>
-              <a:rPr lang="en-US" dirty="0" smtClean="0"/>
-              <a:t>all </a:t>
-            </a:r>
-            <a:r>
               <a:rPr lang="en-US" dirty="0" smtClean="0">
                 <a:effectLst/>
               </a:rPr>
@@ -3249,9 +3261,6 @@
               </a:rPr>
               <a:t>Web Applications </a:t>
             </a:r>
-            <a:endParaRPr lang="en-US" dirty="0" smtClean="0">
-              <a:effectLst/>
-            </a:endParaRPr>
           </a:p>
           <a:p>
             <a:pPr>
@@ -3272,9 +3281,6 @@
               </a:rPr>
               <a:t>supporting technologies ( micro service API )</a:t>
             </a:r>
-            <a:endParaRPr lang="en-US" dirty="0" smtClean="0">
-              <a:effectLst/>
-            </a:endParaRPr>
           </a:p>
           <a:p>
             <a:pPr>
@@ -3293,13 +3299,7 @@
               <a:rPr lang="en-US" dirty="0" smtClean="0">
                 <a:effectLst/>
               </a:rPr>
-              <a:t>explanation </a:t>
-            </a:r>
-            <a:r>
-              <a:rPr lang="en-US" dirty="0" smtClean="0">
-                <a:effectLst/>
-              </a:rPr>
-              <a:t>of CXTA, our purpose, technologies, philosophies, process, and our evolutionary plans for 2018.</a:t>
+              <a:t>explanation of CXTA, our purpose, technologies, philosophies, process, and our evolutionary plans for 2018.</a:t>
             </a:r>
           </a:p>
           <a:p>
@@ -3352,8 +3352,8 @@
         </p:nvSpPr>
         <p:spPr>
           <a:xfrm>
-            <a:off x="838200" y="1"/>
-            <a:ext cx="10515600" cy="571499"/>
+            <a:off x="632459" y="103302"/>
+            <a:ext cx="8596601" cy="1225768"/>
           </a:xfrm>
         </p:spPr>
         <p:txBody>
@@ -3362,13 +3362,25 @@
           </a:bodyPr>
           <a:lstStyle/>
           <a:p>
-            <a:r>
-              <a:rPr lang="en-US" dirty="0" smtClean="0"/>
-              <a:t>PURPOSE  :   </a:t>
+            <a:pPr algn="ctr"/>
+            <a:r>
+              <a:rPr lang="en-US" sz="4900" dirty="0" smtClean="0"/>
+              <a:t>PURPOSE</a:t>
+            </a:r>
+            <a:r>
+              <a:rPr lang="en-US" dirty="0" smtClean="0"/>
+              <a:t/>
+            </a:r>
+            <a:br>
+              <a:rPr lang="en-US" dirty="0" smtClean="0"/>
+            </a:br>
+            <a:r>
+              <a:rPr lang="en-US" sz="3600" dirty="0" smtClean="0"/>
+              <a:t>Operational  </a:t>
             </a:r>
             <a:r>
               <a:rPr lang="en-US" sz="3600" dirty="0"/>
-              <a:t>Operational  &amp; Functional Process</a:t>
+              <a:t>&amp; Functional Process</a:t>
             </a:r>
             <a:br>
               <a:rPr lang="en-US" sz="3600" dirty="0"/>
@@ -3389,7 +3401,7 @@
         </p:nvSpPr>
         <p:spPr>
           <a:xfrm>
-            <a:off x="144963" y="865823"/>
+            <a:off x="144962" y="1833386"/>
             <a:ext cx="11490593" cy="4762500"/>
           </a:xfrm>
         </p:spPr>
@@ -3517,8 +3529,8 @@
         </p:nvSpPr>
         <p:spPr>
           <a:xfrm>
-            <a:off x="838200" y="80011"/>
-            <a:ext cx="10515600" cy="880110"/>
+            <a:off x="859465" y="622271"/>
+            <a:ext cx="6679019" cy="880110"/>
           </a:xfrm>
         </p:spPr>
         <p:txBody>
@@ -3527,6 +3539,7 @@
           </a:bodyPr>
           <a:lstStyle/>
           <a:p>
+            <a:pPr algn="ctr"/>
             <a:r>
               <a:rPr lang="en-US" dirty="0" smtClean="0"/>
               <a:t>EVOLUTION</a:t>
@@ -3547,8 +3560,8 @@
         </p:nvSpPr>
         <p:spPr>
           <a:xfrm>
-            <a:off x="140970" y="960121"/>
-            <a:ext cx="10515600" cy="5216843"/>
+            <a:off x="98439" y="1896341"/>
+            <a:ext cx="10515600" cy="4568256"/>
           </a:xfrm>
         </p:spPr>
         <p:txBody>
@@ -3559,6 +3572,9 @@
               <a:rPr lang="en-US" dirty="0"/>
               <a:t>CXTA and the CX Market Place Development Team have matured. </a:t>
             </a:r>
+            <a:endParaRPr lang="en-US" dirty="0" smtClean="0"/>
+          </a:p>
+          <a:p>
             <a:endParaRPr lang="en-US" dirty="0" smtClean="0"/>
           </a:p>
           <a:p>
@@ -3664,16 +3680,17 @@
         </p:nvSpPr>
         <p:spPr>
           <a:xfrm>
-            <a:off x="758190" y="-11429"/>
-            <a:ext cx="10515600" cy="651510"/>
+            <a:off x="609334" y="828543"/>
+            <a:ext cx="7662796" cy="651510"/>
           </a:xfrm>
         </p:spPr>
         <p:txBody>
           <a:bodyPr anchor="t">
-            <a:normAutofit fontScale="90000"/>
+            <a:noAutofit/>
           </a:bodyPr>
           <a:lstStyle/>
           <a:p>
+            <a:pPr algn="ctr"/>
             <a:r>
               <a:rPr lang="en-US" dirty="0" smtClean="0"/>
               <a:t>ROLL OUT</a:t>
@@ -3694,13 +3711,13 @@
         </p:nvSpPr>
         <p:spPr>
           <a:xfrm>
-            <a:off x="129540" y="785494"/>
-            <a:ext cx="11254740" cy="4940935"/>
+            <a:off x="129539" y="1763690"/>
+            <a:ext cx="11254740" cy="4403194"/>
           </a:xfrm>
         </p:spPr>
         <p:txBody>
           <a:bodyPr>
-            <a:normAutofit/>
+            <a:normAutofit lnSpcReduction="10000"/>
           </a:bodyPr>
           <a:lstStyle/>
           <a:p>
@@ -3906,7 +3923,27 @@
           <a:bodyPr/>
           <a:lstStyle/>
           <a:p>
-            <a:endParaRPr lang="en-US"/>
+            <a:pPr algn="ctr"/>
+            <a:r>
+              <a:rPr lang="en-US" b="1" dirty="0"/>
+              <a:t>Independent product line testing, </a:t>
+            </a:r>
+            <a:r>
+              <a:rPr lang="en-US" b="1" dirty="0" smtClean="0"/>
+              <a:t/>
+            </a:r>
+            <a:br>
+              <a:rPr lang="en-US" b="1" dirty="0" smtClean="0"/>
+            </a:br>
+            <a:r>
+              <a:rPr lang="en-US" b="1" dirty="0" smtClean="0"/>
+              <a:t>Scaling</a:t>
+            </a:r>
+            <a:r>
+              <a:rPr lang="en-US" b="1" dirty="0"/>
+              <a:t> and Content</a:t>
+            </a:r>
+            <a:endParaRPr lang="en-US" dirty="0"/>
           </a:p>
         </p:txBody>
       </p:sp>
@@ -3925,7 +3962,31 @@
           <a:bodyPr/>
           <a:lstStyle/>
           <a:p>
-            <a:endParaRPr lang="en-US"/>
+            <a:r>
+              <a:rPr lang="en-US" dirty="0"/>
+              <a:t>The ability to test a products full abilities independently of all other products is a pressing need</a:t>
+            </a:r>
+            <a:r>
+              <a:rPr lang="en-US" dirty="0" smtClean="0"/>
+              <a:t>.</a:t>
+            </a:r>
+          </a:p>
+          <a:p>
+            <a:r>
+              <a:rPr lang="en-US" dirty="0"/>
+              <a:t>CXTA's proposed solution will reduce the overall quantity of source code that must be maintained.  We see this as an evolutionary improvement</a:t>
+            </a:r>
+            <a:r>
+              <a:rPr lang="en-US" dirty="0" smtClean="0"/>
+              <a:t>.  There is a cost…</a:t>
+            </a:r>
+          </a:p>
+          <a:p>
+            <a:r>
+              <a:rPr lang="en-US" dirty="0"/>
+              <a:t>CXTA sees a direct correlation in manner and approach between refactoring code base and new test data framework methodology giving us the ability to address content test data regionally or by product selection.</a:t>
+            </a:r>
+            <a:endParaRPr lang="en-US" dirty="0"/>
           </a:p>
         </p:txBody>
       </p:sp>
@@ -4065,7 +4126,42 @@
           <a:bodyPr/>
           <a:lstStyle/>
           <a:p>
-            <a:endParaRPr lang="en-US"/>
+            <a:r>
+              <a:rPr lang="en-US" dirty="0" smtClean="0"/>
+              <a:t>Configuration specific testing</a:t>
+            </a:r>
+          </a:p>
+          <a:p>
+            <a:pPr lvl="1"/>
+            <a:r>
+              <a:rPr lang="en-US" dirty="0" smtClean="0"/>
+              <a:t>Collection of products and states deployed for are a testing set</a:t>
+            </a:r>
+          </a:p>
+          <a:p>
+            <a:pPr lvl="1"/>
+            <a:endParaRPr lang="en-US" dirty="0"/>
+          </a:p>
+          <a:p>
+            <a:pPr lvl="1"/>
+            <a:endParaRPr lang="en-US" dirty="0"/>
+          </a:p>
+          <a:p>
+            <a:r>
+              <a:rPr lang="en-US" dirty="0" smtClean="0"/>
+              <a:t>Timing based regression testing</a:t>
+            </a:r>
+          </a:p>
+          <a:p>
+            <a:r>
+              <a:rPr lang="en-US" dirty="0" smtClean="0"/>
+              <a:t>Build initiated </a:t>
+            </a:r>
+            <a:r>
+              <a:rPr lang="en-US" smtClean="0"/>
+              <a:t>integration testing</a:t>
+            </a:r>
+            <a:endParaRPr lang="en-US" dirty="0" smtClean="0"/>
           </a:p>
         </p:txBody>
       </p:sp>

</xml_diff>

<commit_message>
3/5/18 EOD update slides and talking points: file capture
</commit_message>
<xml_diff>
--- a/CurrentWork_Delta/CX_StrategyPowerPoint.pptx
+++ b/CurrentWork_Delta/CX_StrategyPowerPoint.pptx
@@ -5,25 +5,27 @@
     <p:sldMasterId id="2147483648" r:id="rId5"/>
   </p:sldMasterIdLst>
   <p:notesMasterIdLst>
-    <p:notesMasterId r:id="rId19"/>
+    <p:notesMasterId r:id="rId21"/>
   </p:notesMasterIdLst>
   <p:sldIdLst>
     <p:sldId id="256" r:id="rId6"/>
     <p:sldId id="261" r:id="rId7"/>
     <p:sldId id="262" r:id="rId8"/>
     <p:sldId id="263" r:id="rId9"/>
-    <p:sldId id="271" r:id="rId10"/>
-    <p:sldId id="272" r:id="rId11"/>
-    <p:sldId id="273" r:id="rId12"/>
-    <p:sldId id="274" r:id="rId13"/>
-    <p:sldId id="275" r:id="rId14"/>
-    <p:sldId id="276" r:id="rId15"/>
-    <p:sldId id="277" r:id="rId16"/>
-    <p:sldId id="278" r:id="rId17"/>
+    <p:sldId id="283" r:id="rId10"/>
+    <p:sldId id="271" r:id="rId11"/>
+    <p:sldId id="272" r:id="rId12"/>
+    <p:sldId id="273" r:id="rId13"/>
+    <p:sldId id="274" r:id="rId14"/>
+    <p:sldId id="275" r:id="rId15"/>
+    <p:sldId id="281" r:id="rId16"/>
+    <p:sldId id="282" r:id="rId17"/>
     <p:sldId id="279" r:id="rId18"/>
+    <p:sldId id="280" r:id="rId19"/>
+    <p:sldId id="284" r:id="rId20"/>
   </p:sldIdLst>
   <p:sldSz cx="9144000" cy="6858000" type="screen4x3"/>
-  <p:notesSz cx="6858000" cy="9144000"/>
+  <p:notesSz cx="7010400" cy="9296400"/>
   <p:defaultTextStyle>
     <a:defPPr>
       <a:defRPr lang="en-US"/>
@@ -173,14 +175,14 @@
         <p:spPr>
           <a:xfrm>
             <a:off x="0" y="0"/>
-            <a:ext cx="2971800" cy="458788"/>
+            <a:ext cx="3037840" cy="466434"/>
           </a:xfrm>
           <a:prstGeom prst="rect">
             <a:avLst/>
           </a:prstGeom>
         </p:spPr>
         <p:txBody>
-          <a:bodyPr vert="horz" lIns="91440" tIns="45720" rIns="91440" bIns="45720" rtlCol="0"/>
+          <a:bodyPr vert="horz" lIns="93177" tIns="46589" rIns="93177" bIns="46589" rtlCol="0"/>
           <a:lstStyle>
             <a:lvl1pPr algn="l">
               <a:defRPr sz="1200"/>
@@ -203,15 +205,15 @@
         </p:nvSpPr>
         <p:spPr>
           <a:xfrm>
-            <a:off x="3884613" y="0"/>
-            <a:ext cx="2971800" cy="458788"/>
+            <a:off x="3970938" y="0"/>
+            <a:ext cx="3037840" cy="466434"/>
           </a:xfrm>
           <a:prstGeom prst="rect">
             <a:avLst/>
           </a:prstGeom>
         </p:spPr>
         <p:txBody>
-          <a:bodyPr vert="horz" lIns="91440" tIns="45720" rIns="91440" bIns="45720" rtlCol="0"/>
+          <a:bodyPr vert="horz" lIns="93177" tIns="46589" rIns="93177" bIns="46589" rtlCol="0"/>
           <a:lstStyle>
             <a:lvl1pPr algn="r">
               <a:defRPr sz="1200"/>
@@ -220,7 +222,7 @@
           <a:p>
             <a:fld id="{7195FF61-7FDF-4F4D-A3AE-3078F9B9BE1D}" type="datetimeFigureOut">
               <a:rPr lang="en-US" smtClean="0"/>
-              <a:t>3/1/2018</a:t>
+              <a:t>3/2/2018</a:t>
             </a:fld>
             <a:endParaRPr lang="en-US"/>
           </a:p>
@@ -238,8 +240,8 @@
         </p:nvSpPr>
         <p:spPr>
           <a:xfrm>
-            <a:off x="1371600" y="1143000"/>
-            <a:ext cx="4114800" cy="3086100"/>
+            <a:off x="1414463" y="1162050"/>
+            <a:ext cx="4181475" cy="3136900"/>
           </a:xfrm>
           <a:prstGeom prst="rect">
             <a:avLst/>
@@ -252,7 +254,7 @@
           </a:ln>
         </p:spPr>
         <p:txBody>
-          <a:bodyPr vert="horz" lIns="91440" tIns="45720" rIns="91440" bIns="45720" rtlCol="0" anchor="ctr"/>
+          <a:bodyPr vert="horz" lIns="93177" tIns="46589" rIns="93177" bIns="46589" rtlCol="0" anchor="ctr"/>
           <a:lstStyle/>
           <a:p>
             <a:endParaRPr lang="en-US"/>
@@ -271,15 +273,15 @@
         </p:nvSpPr>
         <p:spPr>
           <a:xfrm>
-            <a:off x="685800" y="4400550"/>
-            <a:ext cx="5486400" cy="3600450"/>
+            <a:off x="701040" y="4473892"/>
+            <a:ext cx="5608320" cy="3660458"/>
           </a:xfrm>
           <a:prstGeom prst="rect">
             <a:avLst/>
           </a:prstGeom>
         </p:spPr>
         <p:txBody>
-          <a:bodyPr vert="horz" lIns="91440" tIns="45720" rIns="91440" bIns="45720" rtlCol="0"/>
+          <a:bodyPr vert="horz" lIns="93177" tIns="46589" rIns="93177" bIns="46589" rtlCol="0"/>
           <a:lstStyle/>
           <a:p>
             <a:pPr lvl="0"/>
@@ -331,15 +333,15 @@
         </p:nvSpPr>
         <p:spPr>
           <a:xfrm>
-            <a:off x="0" y="8685213"/>
-            <a:ext cx="2971800" cy="458787"/>
+            <a:off x="0" y="8829967"/>
+            <a:ext cx="3037840" cy="466433"/>
           </a:xfrm>
           <a:prstGeom prst="rect">
             <a:avLst/>
           </a:prstGeom>
         </p:spPr>
         <p:txBody>
-          <a:bodyPr vert="horz" lIns="91440" tIns="45720" rIns="91440" bIns="45720" rtlCol="0" anchor="b"/>
+          <a:bodyPr vert="horz" lIns="93177" tIns="46589" rIns="93177" bIns="46589" rtlCol="0" anchor="b"/>
           <a:lstStyle>
             <a:lvl1pPr algn="l">
               <a:defRPr sz="1200"/>
@@ -362,15 +364,15 @@
         </p:nvSpPr>
         <p:spPr>
           <a:xfrm>
-            <a:off x="3884613" y="8685213"/>
-            <a:ext cx="2971800" cy="458787"/>
+            <a:off x="3970938" y="8829967"/>
+            <a:ext cx="3037840" cy="466433"/>
           </a:xfrm>
           <a:prstGeom prst="rect">
             <a:avLst/>
           </a:prstGeom>
         </p:spPr>
         <p:txBody>
-          <a:bodyPr vert="horz" lIns="91440" tIns="45720" rIns="91440" bIns="45720" rtlCol="0" anchor="b"/>
+          <a:bodyPr vert="horz" lIns="93177" tIns="46589" rIns="93177" bIns="46589" rtlCol="0" anchor="b"/>
           <a:lstStyle>
             <a:lvl1pPr algn="r">
               <a:defRPr sz="1200"/>
@@ -2102,15 +2104,7 @@
             <a:pPr algn="ctr"/>
             <a:r>
               <a:rPr lang="en-US" sz="2800" dirty="0" smtClean="0"/>
-              <a:t>Independent Product Test</a:t>
-            </a:r>
-            <a:r>
-              <a:rPr lang="en-US" sz="2800" dirty="0" smtClean="0"/>
-              <a:t>, </a:t>
-            </a:r>
-            <a:r>
-              <a:rPr lang="en-US" sz="2800" dirty="0" smtClean="0"/>
-              <a:t>Scaling</a:t>
+              <a:t>Independent Product Test, Scaling</a:t>
             </a:r>
           </a:p>
           <a:p>
@@ -2181,18 +2175,99 @@
           <a:chExt cx="0" cy="0"/>
         </a:xfrm>
       </p:grpSpPr>
-      <p:pic>
-        <p:nvPicPr>
-          <p:cNvPr id="2" name="Content Placeholder 3"/>
-          <p:cNvPicPr>
-            <a:picLocks noGrp="1" noChangeAspect="1"/>
-          </p:cNvPicPr>
+      <p:sp>
+        <p:nvSpPr>
+          <p:cNvPr id="2" name="Title 1"/>
+          <p:cNvSpPr>
+            <a:spLocks noGrp="1"/>
+          </p:cNvSpPr>
+          <p:nvPr>
+            <p:ph type="title"/>
+          </p:nvPr>
+        </p:nvSpPr>
+        <p:spPr>
+          <a:xfrm>
+            <a:off x="1641767" y="129597"/>
+            <a:ext cx="5101934" cy="1325563"/>
+          </a:xfrm>
+        </p:spPr>
+        <p:txBody>
+          <a:bodyPr anchor="t"/>
+          <a:lstStyle/>
+          <a:p>
+            <a:pPr algn="ctr"/>
+            <a:r>
+              <a:rPr lang="en-US" dirty="0" smtClean="0"/>
+              <a:t>REPORTING</a:t>
+            </a:r>
+            <a:endParaRPr lang="en-US" dirty="0"/>
+          </a:p>
+        </p:txBody>
+      </p:sp>
+      <p:sp>
+        <p:nvSpPr>
+          <p:cNvPr id="3" name="Content Placeholder 2"/>
+          <p:cNvSpPr>
+            <a:spLocks noGrp="1"/>
+          </p:cNvSpPr>
           <p:nvPr>
             <p:ph idx="1"/>
           </p:nvPr>
+        </p:nvSpPr>
+        <p:spPr>
+          <a:xfrm>
+            <a:off x="432843" y="1863333"/>
+            <a:ext cx="3849789" cy="4351338"/>
+          </a:xfrm>
+        </p:spPr>
+        <p:txBody>
+          <a:bodyPr/>
+          <a:lstStyle/>
+          <a:p>
+            <a:r>
+              <a:rPr lang="en-US" dirty="0" smtClean="0"/>
+              <a:t>Reporting:  Three levels of information</a:t>
+            </a:r>
+          </a:p>
+          <a:p>
+            <a:r>
+              <a:rPr lang="en-US" sz="1400" dirty="0" smtClean="0"/>
+              <a:t>    </a:t>
+            </a:r>
+            <a:endParaRPr lang="en-US" sz="1400" dirty="0"/>
+          </a:p>
+          <a:p>
+            <a:r>
+              <a:rPr lang="en-US" dirty="0" smtClean="0"/>
+              <a:t>Hyper granular:  Cover every Assert and Compare in Framework</a:t>
+            </a:r>
+          </a:p>
+          <a:p>
+            <a:pPr lvl="1">
+              <a:buFont typeface="Arial" panose="020B0604020202020204" pitchFamily="34" charset="0"/>
+              <a:buChar char="•"/>
+            </a:pPr>
+            <a:r>
+              <a:rPr lang="en-US" dirty="0" smtClean="0"/>
+              <a:t>Debugging and Framework Development </a:t>
+            </a:r>
+            <a:r>
+              <a:rPr lang="en-US" dirty="0" smtClean="0"/>
+              <a:t>tool</a:t>
+            </a:r>
+          </a:p>
+        </p:txBody>
+      </p:sp>
+      <p:pic>
+        <p:nvPicPr>
+          <p:cNvPr id="4" name="Picture 3"/>
+          <p:cNvPicPr>
+            <a:picLocks noChangeAspect="1"/>
+          </p:cNvPicPr>
+          <p:nvPr/>
         </p:nvPicPr>
         <p:blipFill>
-          <a:blip r:embed="rId2" cstate="print">
+          <a:blip r:embed="rId2">
             <a:extLst>
               <a:ext uri="{28A0092B-C50C-407E-A947-70E740481C1C}">
                 <a14:useLocalDpi xmlns:a14="http://schemas.microsoft.com/office/drawing/2010/main" val="0"/>
@@ -2205,21 +2280,31 @@
         </p:blipFill>
         <p:spPr>
           <a:xfrm>
-            <a:off x="1345721" y="78736"/>
-            <a:ext cx="4520242" cy="6615098"/>
+            <a:off x="4381878" y="942849"/>
+            <a:ext cx="4723646" cy="5744818"/>
           </a:xfrm>
+          <a:prstGeom prst="rect">
+            <a:avLst/>
+          </a:prstGeom>
         </p:spPr>
       </p:pic>
     </p:spTree>
     <p:extLst>
       <p:ext uri="{BB962C8B-B14F-4D97-AF65-F5344CB8AC3E}">
-        <p14:creationId xmlns:p14="http://schemas.microsoft.com/office/powerpoint/2010/main" val="2918513742"/>
+        <p14:creationId xmlns:p14="http://schemas.microsoft.com/office/powerpoint/2010/main" val="21198343"/>
       </p:ext>
     </p:extLst>
   </p:cSld>
   <p:clrMapOvr>
     <a:masterClrMapping/>
   </p:clrMapOvr>
+  <p:timing>
+    <p:tnLst>
+      <p:par>
+        <p:cTn id="1" dur="indefinite" restart="never" nodeType="tmRoot"/>
+      </p:par>
+    </p:tnLst>
+  </p:timing>
 </p:sld>
 </file>
 
@@ -2240,18 +2325,102 @@
           <a:chExt cx="0" cy="0"/>
         </a:xfrm>
       </p:grpSpPr>
-      <p:pic>
-        <p:nvPicPr>
-          <p:cNvPr id="2" name="Content Placeholder 3"/>
-          <p:cNvPicPr>
-            <a:picLocks noGrp="1" noChangeAspect="1"/>
-          </p:cNvPicPr>
+      <p:sp>
+        <p:nvSpPr>
+          <p:cNvPr id="2" name="Title 1"/>
+          <p:cNvSpPr>
+            <a:spLocks noGrp="1"/>
+          </p:cNvSpPr>
+          <p:nvPr>
+            <p:ph type="title"/>
+          </p:nvPr>
+        </p:nvSpPr>
+        <p:spPr>
+          <a:xfrm>
+            <a:off x="1641767" y="129597"/>
+            <a:ext cx="5101934" cy="1325563"/>
+          </a:xfrm>
+        </p:spPr>
+        <p:txBody>
+          <a:bodyPr anchor="t"/>
+          <a:lstStyle/>
+          <a:p>
+            <a:pPr algn="ctr"/>
+            <a:r>
+              <a:rPr lang="en-US" dirty="0" smtClean="0"/>
+              <a:t>REPORTING</a:t>
+            </a:r>
+            <a:endParaRPr lang="en-US" dirty="0"/>
+          </a:p>
+        </p:txBody>
+      </p:sp>
+      <p:sp>
+        <p:nvSpPr>
+          <p:cNvPr id="3" name="Content Placeholder 2"/>
+          <p:cNvSpPr>
+            <a:spLocks noGrp="1"/>
+          </p:cNvSpPr>
           <p:nvPr>
             <p:ph idx="1"/>
           </p:nvPr>
+        </p:nvSpPr>
+        <p:spPr>
+          <a:xfrm>
+            <a:off x="432843" y="1863333"/>
+            <a:ext cx="4787339" cy="4351338"/>
+          </a:xfrm>
+        </p:spPr>
+        <p:txBody>
+          <a:bodyPr/>
+          <a:lstStyle/>
+          <a:p>
+            <a:r>
+              <a:rPr lang="en-US" dirty="0" smtClean="0"/>
+              <a:t>Reporting:  Three levels of information</a:t>
+            </a:r>
+          </a:p>
+          <a:p>
+            <a:pPr marL="341313" lvl="1" indent="0">
+              <a:buNone/>
+            </a:pPr>
+            <a:r>
+              <a:rPr lang="en-US" sz="1400" dirty="0" smtClean="0"/>
+              <a:t>          </a:t>
+            </a:r>
+            <a:endParaRPr lang="en-US" sz="1400" dirty="0" smtClean="0"/>
+          </a:p>
+          <a:p>
+            <a:r>
+              <a:rPr lang="en-US" dirty="0" smtClean="0"/>
+              <a:t>Test Run Specific:  Pass / Fail assessment of all written script tests</a:t>
+            </a:r>
+          </a:p>
+          <a:p>
+            <a:pPr lvl="1">
+              <a:buFont typeface="Arial" panose="020B0604020202020204" pitchFamily="34" charset="0"/>
+              <a:buChar char="•"/>
+            </a:pPr>
+            <a:r>
+              <a:rPr lang="en-US" dirty="0" smtClean="0"/>
+              <a:t>Current Standard test run encompassing test </a:t>
+            </a:r>
+            <a:r>
+              <a:rPr lang="en-US" dirty="0" smtClean="0"/>
+              <a:t>report</a:t>
+            </a:r>
+          </a:p>
+        </p:txBody>
+      </p:sp>
+      <p:pic>
+        <p:nvPicPr>
+          <p:cNvPr id="5" name="Picture 4"/>
+          <p:cNvPicPr>
+            <a:picLocks noChangeAspect="1"/>
+          </p:cNvPicPr>
+          <p:nvPr/>
         </p:nvPicPr>
         <p:blipFill>
-          <a:blip r:embed="rId2" cstate="print">
+          <a:blip r:embed="rId2">
             <a:extLst>
               <a:ext uri="{28A0092B-C50C-407E-A947-70E740481C1C}">
                 <a14:useLocalDpi xmlns:a14="http://schemas.microsoft.com/office/drawing/2010/main" val="0"/>
@@ -2264,21 +2433,31 @@
         </p:blipFill>
         <p:spPr>
           <a:xfrm>
-            <a:off x="1393571" y="100492"/>
-            <a:ext cx="5436086" cy="6757508"/>
+            <a:off x="5428527" y="832327"/>
+            <a:ext cx="3599233" cy="6025673"/>
           </a:xfrm>
+          <a:prstGeom prst="rect">
+            <a:avLst/>
+          </a:prstGeom>
         </p:spPr>
       </p:pic>
     </p:spTree>
     <p:extLst>
       <p:ext uri="{BB962C8B-B14F-4D97-AF65-F5344CB8AC3E}">
-        <p14:creationId xmlns:p14="http://schemas.microsoft.com/office/powerpoint/2010/main" val="1594464359"/>
+        <p14:creationId xmlns:p14="http://schemas.microsoft.com/office/powerpoint/2010/main" val="3243345129"/>
       </p:ext>
     </p:extLst>
   </p:cSld>
   <p:clrMapOvr>
     <a:masterClrMapping/>
   </p:clrMapOvr>
+  <p:timing>
+    <p:tnLst>
+      <p:par>
+        <p:cTn id="1" dur="indefinite" restart="never" nodeType="tmRoot"/>
+      </p:par>
+    </p:tnLst>
+  </p:timing>
 </p:sld>
 </file>
 
@@ -2299,18 +2478,100 @@
           <a:chExt cx="0" cy="0"/>
         </a:xfrm>
       </p:grpSpPr>
-      <p:pic>
-        <p:nvPicPr>
-          <p:cNvPr id="2" name="Content Placeholder 3"/>
-          <p:cNvPicPr>
-            <a:picLocks noGrp="1" noChangeAspect="1"/>
-          </p:cNvPicPr>
+      <p:sp>
+        <p:nvSpPr>
+          <p:cNvPr id="2" name="Title 1"/>
+          <p:cNvSpPr>
+            <a:spLocks noGrp="1"/>
+          </p:cNvSpPr>
+          <p:nvPr>
+            <p:ph type="title"/>
+          </p:nvPr>
+        </p:nvSpPr>
+        <p:spPr>
+          <a:xfrm>
+            <a:off x="1641767" y="129597"/>
+            <a:ext cx="5101934" cy="1325563"/>
+          </a:xfrm>
+        </p:spPr>
+        <p:txBody>
+          <a:bodyPr anchor="t"/>
+          <a:lstStyle/>
+          <a:p>
+            <a:pPr algn="ctr"/>
+            <a:r>
+              <a:rPr lang="en-US" dirty="0" smtClean="0"/>
+              <a:t>REPORTING</a:t>
+            </a:r>
+            <a:endParaRPr lang="en-US" dirty="0"/>
+          </a:p>
+        </p:txBody>
+      </p:sp>
+      <p:sp>
+        <p:nvSpPr>
+          <p:cNvPr id="3" name="Content Placeholder 2"/>
+          <p:cNvSpPr>
+            <a:spLocks noGrp="1"/>
+          </p:cNvSpPr>
           <p:nvPr>
             <p:ph idx="1"/>
           </p:nvPr>
+        </p:nvSpPr>
+        <p:spPr>
+          <a:xfrm>
+            <a:off x="432844" y="1863333"/>
+            <a:ext cx="3953962" cy="4351338"/>
+          </a:xfrm>
+        </p:spPr>
+        <p:txBody>
+          <a:bodyPr>
+            <a:normAutofit/>
+          </a:bodyPr>
+          <a:lstStyle/>
+          <a:p>
+            <a:r>
+              <a:rPr lang="en-US" dirty="0" smtClean="0"/>
+              <a:t>Reporting:  Three levels of information</a:t>
+            </a:r>
+          </a:p>
+          <a:p>
+            <a:r>
+              <a:rPr lang="en-US" sz="1400" dirty="0" smtClean="0"/>
+              <a:t>   </a:t>
+            </a:r>
+          </a:p>
+          <a:p>
+            <a:r>
+              <a:rPr lang="en-US" dirty="0" smtClean="0"/>
+              <a:t>High </a:t>
+            </a:r>
+            <a:r>
+              <a:rPr lang="en-US" dirty="0" smtClean="0"/>
+              <a:t>Level Product Specific:  Go / No-go on a Product basis</a:t>
+            </a:r>
+          </a:p>
+          <a:p>
+            <a:pPr lvl="1">
+              <a:buFont typeface="Arial" panose="020B0604020202020204" pitchFamily="34" charset="0"/>
+              <a:buChar char="•"/>
+            </a:pPr>
+            <a:r>
+              <a:rPr lang="en-US" dirty="0" smtClean="0"/>
+              <a:t>In Design Mode.  Would provide Development and Product Managers a quick look at the current health and capability to ship the product </a:t>
+            </a:r>
+          </a:p>
+        </p:txBody>
+      </p:sp>
+      <p:pic>
+        <p:nvPicPr>
+          <p:cNvPr id="4" name="Picture 3"/>
+          <p:cNvPicPr>
+            <a:picLocks noChangeAspect="1"/>
+          </p:cNvPicPr>
+          <p:nvPr/>
         </p:nvPicPr>
         <p:blipFill>
-          <a:blip r:embed="rId2" cstate="print">
+          <a:blip r:embed="rId2">
             <a:extLst>
               <a:ext uri="{28A0092B-C50C-407E-A947-70E740481C1C}">
                 <a14:useLocalDpi xmlns:a14="http://schemas.microsoft.com/office/drawing/2010/main" val="0"/>
@@ -2323,21 +2584,31 @@
         </p:blipFill>
         <p:spPr>
           <a:xfrm>
-            <a:off x="1912657" y="83088"/>
-            <a:ext cx="4643418" cy="6810969"/>
+            <a:off x="4468519" y="864704"/>
+            <a:ext cx="4675481" cy="5993296"/>
           </a:xfrm>
+          <a:prstGeom prst="rect">
+            <a:avLst/>
+          </a:prstGeom>
         </p:spPr>
       </p:pic>
     </p:spTree>
     <p:extLst>
       <p:ext uri="{BB962C8B-B14F-4D97-AF65-F5344CB8AC3E}">
-        <p14:creationId xmlns:p14="http://schemas.microsoft.com/office/powerpoint/2010/main" val="565939006"/>
+        <p14:creationId xmlns:p14="http://schemas.microsoft.com/office/powerpoint/2010/main" val="2373342421"/>
       </p:ext>
     </p:extLst>
   </p:cSld>
   <p:clrMapOvr>
     <a:masterClrMapping/>
   </p:clrMapOvr>
+  <p:timing>
+    <p:tnLst>
+      <p:par>
+        <p:cTn id="1" dur="indefinite" restart="never" nodeType="tmRoot"/>
+      </p:par>
+    </p:tnLst>
+  </p:timing>
 </p:sld>
 </file>
 
@@ -2400,17 +2671,94 @@
         <p:spPr>
           <a:xfrm>
             <a:off x="423416" y="1825625"/>
-            <a:ext cx="7878920" cy="4351338"/>
+            <a:ext cx="8720584" cy="4351338"/>
           </a:xfrm>
         </p:spPr>
         <p:txBody>
           <a:bodyPr/>
           <a:lstStyle/>
           <a:p>
-            <a:r>
-              <a:rPr lang="en-US" dirty="0" smtClean="0"/>
-              <a:t>Mobile devices</a:t>
-            </a:r>
+            <a:pPr marL="342900" indent="-342900">
+              <a:buFont typeface="Arial" panose="020B0604020202020204" pitchFamily="34" charset="0"/>
+              <a:buChar char="•"/>
+            </a:pPr>
+            <a:r>
+              <a:rPr lang="en-US" sz="2000" dirty="0" smtClean="0"/>
+              <a:t>Mobile </a:t>
+            </a:r>
+            <a:r>
+              <a:rPr lang="en-US" sz="2000" dirty="0" smtClean="0"/>
+              <a:t>devices</a:t>
+            </a:r>
+          </a:p>
+          <a:p>
+            <a:endParaRPr lang="en-US" sz="2000" dirty="0"/>
+          </a:p>
+          <a:p>
+            <a:pPr marL="342900" indent="-342900">
+              <a:buFont typeface="Arial" panose="020B0604020202020204" pitchFamily="34" charset="0"/>
+              <a:buChar char="•"/>
+            </a:pPr>
+            <a:r>
+              <a:rPr lang="en-US" sz="2000" dirty="0" smtClean="0"/>
+              <a:t>Test Headless</a:t>
+            </a:r>
+          </a:p>
+          <a:p>
+            <a:endParaRPr lang="en-US" sz="2000" dirty="0"/>
+          </a:p>
+          <a:p>
+            <a:pPr marL="342900" indent="-342900">
+              <a:buFont typeface="Arial" panose="020B0604020202020204" pitchFamily="34" charset="0"/>
+              <a:buChar char="•"/>
+            </a:pPr>
+            <a:r>
+              <a:rPr lang="en-US" sz="2000" dirty="0" smtClean="0"/>
+              <a:t>Additional Application Coverage</a:t>
+            </a:r>
+          </a:p>
+          <a:p>
+            <a:pPr marL="862013" lvl="1" indent="-285750">
+              <a:buFont typeface="Arial" panose="020B0604020202020204" pitchFamily="34" charset="0"/>
+              <a:buChar char="•"/>
+            </a:pPr>
+            <a:r>
+              <a:rPr lang="en-US" sz="1600" dirty="0" smtClean="0"/>
+              <a:t>New Support should be capable in ~10 working Days</a:t>
+            </a:r>
+            <a:endParaRPr lang="en-US" sz="1600" dirty="0"/>
+          </a:p>
+          <a:p>
+            <a:endParaRPr lang="en-US" sz="2000" dirty="0" smtClean="0"/>
+          </a:p>
+          <a:p>
+            <a:pPr marL="342900" indent="-342900">
+              <a:buFont typeface="Arial" panose="020B0604020202020204" pitchFamily="34" charset="0"/>
+              <a:buChar char="•"/>
+            </a:pPr>
+            <a:r>
+              <a:rPr lang="en-US" sz="2000" dirty="0" smtClean="0"/>
+              <a:t>Continue deriving mid layer commonality.  Move commonality to the bottom Layer. </a:t>
+            </a:r>
+          </a:p>
+          <a:p>
+            <a:pPr marL="919163" lvl="1" indent="-342900">
+              <a:buFont typeface="Arial" panose="020B0604020202020204" pitchFamily="34" charset="0"/>
+              <a:buChar char="•"/>
+            </a:pPr>
+            <a:r>
+              <a:rPr lang="en-US" sz="1800" dirty="0" smtClean="0"/>
+              <a:t>The smaller the mid layer, the easier to add </a:t>
+            </a:r>
+            <a:r>
+              <a:rPr lang="en-US" sz="1800" dirty="0" err="1" smtClean="0"/>
+              <a:t>add</a:t>
+            </a:r>
+            <a:r>
+              <a:rPr lang="en-US" sz="1800" dirty="0" smtClean="0"/>
+              <a:t> new capability ( new applications )</a:t>
+            </a:r>
+            <a:endParaRPr lang="en-US" sz="1800" dirty="0" smtClean="0"/>
           </a:p>
           <a:p>
             <a:endParaRPr lang="en-US" dirty="0"/>
@@ -2427,6 +2775,1248 @@
   <p:clrMapOvr>
     <a:masterClrMapping/>
   </p:clrMapOvr>
+  <p:timing>
+    <p:tnLst>
+      <p:par>
+        <p:cTn id="1" dur="indefinite" restart="never" nodeType="tmRoot"/>
+      </p:par>
+    </p:tnLst>
+  </p:timing>
+</p:sld>
+</file>
+
+<file path=ppt/slides/slide14.xml><?xml version="1.0" encoding="utf-8"?>
+<p:sld xmlns:a="http://schemas.openxmlformats.org/drawingml/2006/main" xmlns:r="http://schemas.openxmlformats.org/officeDocument/2006/relationships" xmlns:p="http://schemas.openxmlformats.org/presentationml/2006/main">
+  <p:cSld>
+    <p:spTree>
+      <p:nvGrpSpPr>
+        <p:cNvPr id="1" name=""/>
+        <p:cNvGrpSpPr/>
+        <p:nvPr/>
+      </p:nvGrpSpPr>
+      <p:grpSpPr>
+        <a:xfrm>
+          <a:off x="0" y="0"/>
+          <a:ext cx="0" cy="0"/>
+          <a:chOff x="0" y="0"/>
+          <a:chExt cx="0" cy="0"/>
+        </a:xfrm>
+      </p:grpSpPr>
+      <p:sp>
+        <p:nvSpPr>
+          <p:cNvPr id="2" name="Title 1"/>
+          <p:cNvSpPr>
+            <a:spLocks noGrp="1"/>
+          </p:cNvSpPr>
+          <p:nvPr>
+            <p:ph type="title"/>
+          </p:nvPr>
+        </p:nvSpPr>
+        <p:spPr/>
+        <p:txBody>
+          <a:bodyPr anchor="t">
+            <a:normAutofit/>
+          </a:bodyPr>
+          <a:lstStyle/>
+          <a:p>
+            <a:r>
+              <a:rPr lang="en-US" sz="3600" dirty="0" smtClean="0"/>
+              <a:t>Market Place  :  </a:t>
+            </a:r>
+            <a:r>
+              <a:rPr lang="en-US" sz="2800" dirty="0" smtClean="0"/>
+              <a:t>Provider Directory :    Other Apps</a:t>
+            </a:r>
+            <a:br>
+              <a:rPr lang="en-US" sz="2800" dirty="0" smtClean="0"/>
+            </a:br>
+            <a:r>
+              <a:rPr lang="en-US" sz="2800" dirty="0" smtClean="0"/>
+              <a:t>                                    Microservice APIs</a:t>
+            </a:r>
+            <a:endParaRPr lang="en-US" sz="2800" dirty="0"/>
+          </a:p>
+        </p:txBody>
+      </p:sp>
+      <p:pic>
+        <p:nvPicPr>
+          <p:cNvPr id="7" name="Content Placeholder 6"/>
+          <p:cNvPicPr>
+            <a:picLocks noGrp="1" noChangeAspect="1"/>
+          </p:cNvPicPr>
+          <p:nvPr>
+            <p:ph idx="1"/>
+          </p:nvPr>
+        </p:nvPicPr>
+        <p:blipFill>
+          <a:blip r:embed="rId2">
+            <a:extLst>
+              <a:ext uri="{28A0092B-C50C-407E-A947-70E740481C1C}">
+                <a14:useLocalDpi xmlns:a14="http://schemas.microsoft.com/office/drawing/2010/main" val="0"/>
+              </a:ext>
+            </a:extLst>
+          </a:blip>
+          <a:stretch>
+            <a:fillRect/>
+          </a:stretch>
+        </p:blipFill>
+        <p:spPr>
+          <a:xfrm>
+            <a:off x="711200" y="1620044"/>
+            <a:ext cx="7975600" cy="4486275"/>
+          </a:xfrm>
+        </p:spPr>
+      </p:pic>
+    </p:spTree>
+    <p:extLst>
+      <p:ext uri="{BB962C8B-B14F-4D97-AF65-F5344CB8AC3E}">
+        <p14:creationId xmlns:p14="http://schemas.microsoft.com/office/powerpoint/2010/main" val="2893813657"/>
+      </p:ext>
+    </p:extLst>
+  </p:cSld>
+  <p:clrMapOvr>
+    <a:masterClrMapping/>
+  </p:clrMapOvr>
+  <p:timing>
+    <p:tnLst>
+      <p:par>
+        <p:cTn id="1" dur="indefinite" restart="never" nodeType="tmRoot"/>
+      </p:par>
+    </p:tnLst>
+  </p:timing>
+</p:sld>
+</file>
+
+<file path=ppt/slides/slide15.xml><?xml version="1.0" encoding="utf-8"?>
+<p:sld xmlns:a="http://schemas.openxmlformats.org/drawingml/2006/main" xmlns:r="http://schemas.openxmlformats.org/officeDocument/2006/relationships" xmlns:p="http://schemas.openxmlformats.org/presentationml/2006/main">
+  <p:cSld>
+    <p:spTree>
+      <p:nvGrpSpPr>
+        <p:cNvPr id="1" name=""/>
+        <p:cNvGrpSpPr/>
+        <p:nvPr/>
+      </p:nvGrpSpPr>
+      <p:grpSpPr>
+        <a:xfrm>
+          <a:off x="0" y="0"/>
+          <a:ext cx="0" cy="0"/>
+          <a:chOff x="0" y="0"/>
+          <a:chExt cx="0" cy="0"/>
+        </a:xfrm>
+      </p:grpSpPr>
+      <p:sp>
+        <p:nvSpPr>
+          <p:cNvPr id="3" name="Content Placeholder 2"/>
+          <p:cNvSpPr>
+            <a:spLocks noGrp="1"/>
+          </p:cNvSpPr>
+          <p:nvPr>
+            <p:ph idx="1"/>
+          </p:nvPr>
+        </p:nvSpPr>
+        <p:spPr>
+          <a:xfrm>
+            <a:off x="289367" y="92601"/>
+            <a:ext cx="2882096" cy="2037144"/>
+          </a:xfrm>
+        </p:spPr>
+        <p:txBody>
+          <a:bodyPr/>
+          <a:lstStyle/>
+          <a:p>
+            <a:r>
+              <a:rPr lang="en-US" dirty="0" smtClean="0"/>
+              <a:t>Small	5		%30</a:t>
+            </a:r>
+          </a:p>
+          <a:p>
+            <a:endParaRPr lang="en-US" dirty="0"/>
+          </a:p>
+          <a:p>
+            <a:r>
+              <a:rPr lang="en-US" dirty="0" smtClean="0"/>
+              <a:t>Med	15		%50</a:t>
+            </a:r>
+          </a:p>
+          <a:p>
+            <a:endParaRPr lang="en-US" dirty="0"/>
+          </a:p>
+          <a:p>
+            <a:r>
+              <a:rPr lang="en-US" dirty="0" smtClean="0"/>
+              <a:t>Large	30		%20</a:t>
+            </a:r>
+            <a:endParaRPr lang="en-US" dirty="0"/>
+          </a:p>
+        </p:txBody>
+      </p:sp>
+      <p:sp>
+        <p:nvSpPr>
+          <p:cNvPr id="4" name="Content Placeholder 2"/>
+          <p:cNvSpPr txBox="1">
+            <a:spLocks/>
+          </p:cNvSpPr>
+          <p:nvPr/>
+        </p:nvSpPr>
+        <p:spPr>
+          <a:xfrm>
+            <a:off x="3819646" y="150476"/>
+            <a:ext cx="3579470" cy="2777924"/>
+          </a:xfrm>
+          <a:prstGeom prst="rect">
+            <a:avLst/>
+          </a:prstGeom>
+        </p:spPr>
+        <p:txBody>
+          <a:bodyPr vert="horz" lIns="91440" tIns="45720" rIns="91440" bIns="45720" rtlCol="0">
+            <a:normAutofit fontScale="92500" lnSpcReduction="20000"/>
+          </a:bodyPr>
+          <a:lstStyle>
+            <a:lvl1pPr marL="0" indent="0" algn="l" defTabSz="457200" rtl="0" eaLnBrk="1" latinLnBrk="0" hangingPunct="1">
+              <a:lnSpc>
+                <a:spcPct val="80000"/>
+              </a:lnSpc>
+              <a:spcBef>
+                <a:spcPct val="20000"/>
+              </a:spcBef>
+              <a:buSzPct val="100000"/>
+              <a:buFontTx/>
+              <a:buNone/>
+              <a:defRPr sz="2400" b="0" i="0" kern="1200" baseline="0">
+                <a:solidFill>
+                  <a:schemeClr val="tx1"/>
+                </a:solidFill>
+                <a:latin typeface="Calibri Light"/>
+                <a:ea typeface="+mn-ea"/>
+                <a:cs typeface="Calibri Light"/>
+              </a:defRPr>
+            </a:lvl1pPr>
+            <a:lvl2pPr marL="576263" indent="-234950" algn="l" defTabSz="457200" rtl="0" eaLnBrk="1" latinLnBrk="0" hangingPunct="1">
+              <a:lnSpc>
+                <a:spcPct val="80000"/>
+              </a:lnSpc>
+              <a:spcBef>
+                <a:spcPct val="20000"/>
+              </a:spcBef>
+              <a:buSzPct val="100000"/>
+              <a:buFontTx/>
+              <a:buBlip>
+                <a:blip r:embed="rId2"/>
+              </a:buBlip>
+              <a:defRPr sz="2200" b="0" i="0" kern="1200">
+                <a:solidFill>
+                  <a:schemeClr val="tx1"/>
+                </a:solidFill>
+                <a:latin typeface="Calibri Light"/>
+                <a:ea typeface="+mn-ea"/>
+                <a:cs typeface="Calibri Light"/>
+              </a:defRPr>
+            </a:lvl2pPr>
+            <a:lvl3pPr marL="801688" indent="-225425" algn="l" defTabSz="457200" rtl="0" eaLnBrk="1" latinLnBrk="0" hangingPunct="1">
+              <a:lnSpc>
+                <a:spcPct val="80000"/>
+              </a:lnSpc>
+              <a:spcBef>
+                <a:spcPct val="20000"/>
+              </a:spcBef>
+              <a:buSzPct val="100000"/>
+              <a:buFontTx/>
+              <a:buBlip>
+                <a:blip r:embed="rId2"/>
+              </a:buBlip>
+              <a:defRPr sz="2000" b="0" i="0" kern="1200">
+                <a:solidFill>
+                  <a:schemeClr val="tx1"/>
+                </a:solidFill>
+                <a:latin typeface="Calibri Light"/>
+                <a:ea typeface="+mn-ea"/>
+                <a:cs typeface="Calibri Light"/>
+              </a:defRPr>
+            </a:lvl3pPr>
+            <a:lvl4pPr marL="966788" indent="-165100" algn="l" defTabSz="457200" rtl="0" eaLnBrk="1" latinLnBrk="0" hangingPunct="1">
+              <a:lnSpc>
+                <a:spcPct val="80000"/>
+              </a:lnSpc>
+              <a:spcBef>
+                <a:spcPct val="20000"/>
+              </a:spcBef>
+              <a:buSzPct val="100000"/>
+              <a:buFontTx/>
+              <a:buBlip>
+                <a:blip r:embed="rId2"/>
+              </a:buBlip>
+              <a:defRPr sz="1800" b="0" i="0" kern="1200">
+                <a:solidFill>
+                  <a:schemeClr val="tx1"/>
+                </a:solidFill>
+                <a:latin typeface="Calibri Light"/>
+                <a:ea typeface="+mn-ea"/>
+                <a:cs typeface="Calibri Light"/>
+              </a:defRPr>
+            </a:lvl4pPr>
+            <a:lvl5pPr marL="1201738" indent="-176213" algn="l" defTabSz="457200" rtl="0" eaLnBrk="1" latinLnBrk="0" hangingPunct="1">
+              <a:lnSpc>
+                <a:spcPct val="80000"/>
+              </a:lnSpc>
+              <a:spcBef>
+                <a:spcPct val="20000"/>
+              </a:spcBef>
+              <a:buSzPct val="100000"/>
+              <a:buFontTx/>
+              <a:buBlip>
+                <a:blip r:embed="rId2"/>
+              </a:buBlip>
+              <a:defRPr sz="1600" b="0" i="0" kern="1200">
+                <a:solidFill>
+                  <a:schemeClr val="tx1"/>
+                </a:solidFill>
+                <a:latin typeface="Calibri Light"/>
+                <a:ea typeface="+mn-ea"/>
+                <a:cs typeface="Calibri Light"/>
+              </a:defRPr>
+            </a:lvl5pPr>
+            <a:lvl6pPr marL="2514600" indent="-228600" algn="l" defTabSz="457200" rtl="0" eaLnBrk="1" latinLnBrk="0" hangingPunct="1">
+              <a:spcBef>
+                <a:spcPct val="20000"/>
+              </a:spcBef>
+              <a:buFont typeface="Arial"/>
+              <a:buChar char="•"/>
+              <a:defRPr sz="2000" kern="1200">
+                <a:solidFill>
+                  <a:schemeClr val="tx1"/>
+                </a:solidFill>
+                <a:latin typeface="+mn-lt"/>
+                <a:ea typeface="+mn-ea"/>
+                <a:cs typeface="+mn-cs"/>
+              </a:defRPr>
+            </a:lvl6pPr>
+            <a:lvl7pPr marL="2971800" indent="-228600" algn="l" defTabSz="457200" rtl="0" eaLnBrk="1" latinLnBrk="0" hangingPunct="1">
+              <a:spcBef>
+                <a:spcPct val="20000"/>
+              </a:spcBef>
+              <a:buFont typeface="Arial"/>
+              <a:buChar char="•"/>
+              <a:defRPr sz="2000" kern="1200">
+                <a:solidFill>
+                  <a:schemeClr val="tx1"/>
+                </a:solidFill>
+                <a:latin typeface="+mn-lt"/>
+                <a:ea typeface="+mn-ea"/>
+                <a:cs typeface="+mn-cs"/>
+              </a:defRPr>
+            </a:lvl7pPr>
+            <a:lvl8pPr marL="3429000" indent="-228600" algn="l" defTabSz="457200" rtl="0" eaLnBrk="1" latinLnBrk="0" hangingPunct="1">
+              <a:spcBef>
+                <a:spcPct val="20000"/>
+              </a:spcBef>
+              <a:buFont typeface="Arial"/>
+              <a:buChar char="•"/>
+              <a:defRPr sz="2000" kern="1200">
+                <a:solidFill>
+                  <a:schemeClr val="tx1"/>
+                </a:solidFill>
+                <a:latin typeface="+mn-lt"/>
+                <a:ea typeface="+mn-ea"/>
+                <a:cs typeface="+mn-cs"/>
+              </a:defRPr>
+            </a:lvl8pPr>
+            <a:lvl9pPr marL="3886200" indent="-228600" algn="l" defTabSz="457200" rtl="0" eaLnBrk="1" latinLnBrk="0" hangingPunct="1">
+              <a:spcBef>
+                <a:spcPct val="20000"/>
+              </a:spcBef>
+              <a:buFont typeface="Arial"/>
+              <a:buChar char="•"/>
+              <a:defRPr sz="2000" kern="1200">
+                <a:solidFill>
+                  <a:schemeClr val="tx1"/>
+                </a:solidFill>
+                <a:latin typeface="+mn-lt"/>
+                <a:ea typeface="+mn-ea"/>
+                <a:cs typeface="+mn-cs"/>
+              </a:defRPr>
+            </a:lvl9pPr>
+          </a:lstStyle>
+          <a:p>
+            <a:r>
+              <a:rPr lang="en-US" dirty="0" smtClean="0"/>
+              <a:t>	 </a:t>
+            </a:r>
+            <a:r>
+              <a:rPr lang="en-US" sz="3300" dirty="0" smtClean="0"/>
+              <a:t>PPO		   HMO</a:t>
+            </a:r>
+          </a:p>
+          <a:p>
+            <a:pPr marL="731838" lvl="3" indent="0">
+              <a:buNone/>
+            </a:pPr>
+            <a:r>
+              <a:rPr lang="en-US" sz="2200" dirty="0" smtClean="0"/>
+              <a:t>O			    </a:t>
+            </a:r>
+            <a:r>
+              <a:rPr lang="en-US" sz="3000" dirty="0" smtClean="0"/>
+              <a:t>PPO</a:t>
+            </a:r>
+          </a:p>
+          <a:p>
+            <a:pPr marL="731838" lvl="3" indent="0">
+              <a:buNone/>
+            </a:pPr>
+            <a:r>
+              <a:rPr lang="en-US" sz="2200" dirty="0" smtClean="0"/>
+              <a:t>N</a:t>
+            </a:r>
+          </a:p>
+          <a:p>
+            <a:pPr marL="731838" lvl="3" indent="0">
+              <a:buNone/>
+            </a:pPr>
+            <a:r>
+              <a:rPr lang="en-US" sz="2200" dirty="0" smtClean="0"/>
+              <a:t>E</a:t>
+            </a:r>
+          </a:p>
+          <a:p>
+            <a:pPr marL="731838" lvl="3" indent="0">
+              <a:buNone/>
+            </a:pPr>
+            <a:r>
+              <a:rPr lang="en-US" sz="2200" dirty="0" smtClean="0"/>
+              <a:t>                           One</a:t>
+            </a:r>
+          </a:p>
+          <a:p>
+            <a:pPr marL="731838" lvl="3" indent="0">
+              <a:buNone/>
+            </a:pPr>
+            <a:r>
+              <a:rPr lang="en-US" sz="2200" dirty="0" smtClean="0"/>
+              <a:t>S                        State</a:t>
+            </a:r>
+          </a:p>
+          <a:p>
+            <a:pPr marL="731838" lvl="3" indent="0">
+              <a:buNone/>
+            </a:pPr>
+            <a:r>
+              <a:rPr lang="en-US" sz="2200" dirty="0" smtClean="0"/>
+              <a:t>T</a:t>
+            </a:r>
+          </a:p>
+          <a:p>
+            <a:pPr marL="731838" lvl="3" indent="0">
+              <a:buNone/>
+            </a:pPr>
+            <a:r>
+              <a:rPr lang="en-US" sz="2200" dirty="0" smtClean="0"/>
+              <a:t>A</a:t>
+            </a:r>
+          </a:p>
+          <a:p>
+            <a:pPr marL="731838" lvl="3" indent="0">
+              <a:buNone/>
+            </a:pPr>
+            <a:r>
+              <a:rPr lang="en-US" sz="2200" dirty="0" smtClean="0"/>
+              <a:t>T</a:t>
+            </a:r>
+          </a:p>
+          <a:p>
+            <a:pPr marL="731838" lvl="3" indent="0">
+              <a:buNone/>
+            </a:pPr>
+            <a:r>
+              <a:rPr lang="en-US" sz="2200" dirty="0" smtClean="0"/>
+              <a:t>E</a:t>
+            </a:r>
+          </a:p>
+          <a:p>
+            <a:pPr marL="341313" lvl="1" indent="0">
+              <a:buNone/>
+            </a:pPr>
+            <a:endParaRPr lang="en-US" dirty="0" smtClean="0"/>
+          </a:p>
+        </p:txBody>
+      </p:sp>
+      <p:cxnSp>
+        <p:nvCxnSpPr>
+          <p:cNvPr id="6" name="Straight Connector 5"/>
+          <p:cNvCxnSpPr/>
+          <p:nvPr/>
+        </p:nvCxnSpPr>
+        <p:spPr>
+          <a:xfrm>
+            <a:off x="4190035" y="0"/>
+            <a:ext cx="23150" cy="2870522"/>
+          </a:xfrm>
+          <a:prstGeom prst="line">
+            <a:avLst/>
+          </a:prstGeom>
+          <a:ln>
+            <a:solidFill>
+              <a:schemeClr val="tx1"/>
+            </a:solidFill>
+          </a:ln>
+        </p:spPr>
+        <p:style>
+          <a:lnRef idx="2">
+            <a:schemeClr val="accent1"/>
+          </a:lnRef>
+          <a:fillRef idx="0">
+            <a:schemeClr val="accent1"/>
+          </a:fillRef>
+          <a:effectRef idx="1">
+            <a:schemeClr val="accent1"/>
+          </a:effectRef>
+          <a:fontRef idx="minor">
+            <a:schemeClr val="tx1"/>
+          </a:fontRef>
+        </p:style>
+      </p:cxnSp>
+      <p:cxnSp>
+        <p:nvCxnSpPr>
+          <p:cNvPr id="7" name="Straight Connector 6"/>
+          <p:cNvCxnSpPr/>
+          <p:nvPr/>
+        </p:nvCxnSpPr>
+        <p:spPr>
+          <a:xfrm>
+            <a:off x="5579962" y="0"/>
+            <a:ext cx="0" cy="2870522"/>
+          </a:xfrm>
+          <a:prstGeom prst="line">
+            <a:avLst/>
+          </a:prstGeom>
+          <a:ln>
+            <a:solidFill>
+              <a:schemeClr val="tx1"/>
+            </a:solidFill>
+          </a:ln>
+        </p:spPr>
+        <p:style>
+          <a:lnRef idx="2">
+            <a:schemeClr val="accent1"/>
+          </a:lnRef>
+          <a:fillRef idx="0">
+            <a:schemeClr val="accent1"/>
+          </a:fillRef>
+          <a:effectRef idx="1">
+            <a:schemeClr val="accent1"/>
+          </a:effectRef>
+          <a:fontRef idx="minor">
+            <a:schemeClr val="tx1"/>
+          </a:fontRef>
+        </p:style>
+      </p:cxnSp>
+      <p:cxnSp>
+        <p:nvCxnSpPr>
+          <p:cNvPr id="10" name="Straight Connector 9"/>
+          <p:cNvCxnSpPr/>
+          <p:nvPr/>
+        </p:nvCxnSpPr>
+        <p:spPr>
+          <a:xfrm>
+            <a:off x="7399116" y="0"/>
+            <a:ext cx="0" cy="2870522"/>
+          </a:xfrm>
+          <a:prstGeom prst="line">
+            <a:avLst/>
+          </a:prstGeom>
+          <a:ln>
+            <a:solidFill>
+              <a:schemeClr val="tx1"/>
+            </a:solidFill>
+          </a:ln>
+        </p:spPr>
+        <p:style>
+          <a:lnRef idx="2">
+            <a:schemeClr val="accent1"/>
+          </a:lnRef>
+          <a:fillRef idx="0">
+            <a:schemeClr val="accent1"/>
+          </a:fillRef>
+          <a:effectRef idx="1">
+            <a:schemeClr val="accent1"/>
+          </a:effectRef>
+          <a:fontRef idx="minor">
+            <a:schemeClr val="tx1"/>
+          </a:fontRef>
+        </p:style>
+      </p:cxnSp>
+      <p:sp>
+        <p:nvSpPr>
+          <p:cNvPr id="11" name="Content Placeholder 2"/>
+          <p:cNvSpPr txBox="1">
+            <a:spLocks/>
+          </p:cNvSpPr>
+          <p:nvPr/>
+        </p:nvSpPr>
+        <p:spPr>
+          <a:xfrm>
+            <a:off x="3704863" y="2870522"/>
+            <a:ext cx="3969152" cy="949124"/>
+          </a:xfrm>
+          <a:prstGeom prst="rect">
+            <a:avLst/>
+          </a:prstGeom>
+        </p:spPr>
+        <p:txBody>
+          <a:bodyPr vert="horz" lIns="91440" tIns="45720" rIns="91440" bIns="45720" rtlCol="0">
+            <a:normAutofit lnSpcReduction="10000"/>
+          </a:bodyPr>
+          <a:lstStyle>
+            <a:lvl1pPr marL="0" indent="0" algn="l" defTabSz="457200" rtl="0" eaLnBrk="1" latinLnBrk="0" hangingPunct="1">
+              <a:lnSpc>
+                <a:spcPct val="80000"/>
+              </a:lnSpc>
+              <a:spcBef>
+                <a:spcPct val="20000"/>
+              </a:spcBef>
+              <a:buSzPct val="100000"/>
+              <a:buFontTx/>
+              <a:buNone/>
+              <a:defRPr sz="2400" b="0" i="0" kern="1200" baseline="0">
+                <a:solidFill>
+                  <a:schemeClr val="tx1"/>
+                </a:solidFill>
+                <a:latin typeface="Calibri Light"/>
+                <a:ea typeface="+mn-ea"/>
+                <a:cs typeface="Calibri Light"/>
+              </a:defRPr>
+            </a:lvl1pPr>
+            <a:lvl2pPr marL="576263" indent="-234950" algn="l" defTabSz="457200" rtl="0" eaLnBrk="1" latinLnBrk="0" hangingPunct="1">
+              <a:lnSpc>
+                <a:spcPct val="80000"/>
+              </a:lnSpc>
+              <a:spcBef>
+                <a:spcPct val="20000"/>
+              </a:spcBef>
+              <a:buSzPct val="100000"/>
+              <a:buFontTx/>
+              <a:buBlip>
+                <a:blip r:embed="rId2"/>
+              </a:buBlip>
+              <a:defRPr sz="2200" b="0" i="0" kern="1200">
+                <a:solidFill>
+                  <a:schemeClr val="tx1"/>
+                </a:solidFill>
+                <a:latin typeface="Calibri Light"/>
+                <a:ea typeface="+mn-ea"/>
+                <a:cs typeface="Calibri Light"/>
+              </a:defRPr>
+            </a:lvl2pPr>
+            <a:lvl3pPr marL="801688" indent="-225425" algn="l" defTabSz="457200" rtl="0" eaLnBrk="1" latinLnBrk="0" hangingPunct="1">
+              <a:lnSpc>
+                <a:spcPct val="80000"/>
+              </a:lnSpc>
+              <a:spcBef>
+                <a:spcPct val="20000"/>
+              </a:spcBef>
+              <a:buSzPct val="100000"/>
+              <a:buFontTx/>
+              <a:buBlip>
+                <a:blip r:embed="rId2"/>
+              </a:buBlip>
+              <a:defRPr sz="2000" b="0" i="0" kern="1200">
+                <a:solidFill>
+                  <a:schemeClr val="tx1"/>
+                </a:solidFill>
+                <a:latin typeface="Calibri Light"/>
+                <a:ea typeface="+mn-ea"/>
+                <a:cs typeface="Calibri Light"/>
+              </a:defRPr>
+            </a:lvl3pPr>
+            <a:lvl4pPr marL="966788" indent="-165100" algn="l" defTabSz="457200" rtl="0" eaLnBrk="1" latinLnBrk="0" hangingPunct="1">
+              <a:lnSpc>
+                <a:spcPct val="80000"/>
+              </a:lnSpc>
+              <a:spcBef>
+                <a:spcPct val="20000"/>
+              </a:spcBef>
+              <a:buSzPct val="100000"/>
+              <a:buFontTx/>
+              <a:buBlip>
+                <a:blip r:embed="rId2"/>
+              </a:buBlip>
+              <a:defRPr sz="1800" b="0" i="0" kern="1200">
+                <a:solidFill>
+                  <a:schemeClr val="tx1"/>
+                </a:solidFill>
+                <a:latin typeface="Calibri Light"/>
+                <a:ea typeface="+mn-ea"/>
+                <a:cs typeface="Calibri Light"/>
+              </a:defRPr>
+            </a:lvl4pPr>
+            <a:lvl5pPr marL="1201738" indent="-176213" algn="l" defTabSz="457200" rtl="0" eaLnBrk="1" latinLnBrk="0" hangingPunct="1">
+              <a:lnSpc>
+                <a:spcPct val="80000"/>
+              </a:lnSpc>
+              <a:spcBef>
+                <a:spcPct val="20000"/>
+              </a:spcBef>
+              <a:buSzPct val="100000"/>
+              <a:buFontTx/>
+              <a:buBlip>
+                <a:blip r:embed="rId2"/>
+              </a:buBlip>
+              <a:defRPr sz="1600" b="0" i="0" kern="1200">
+                <a:solidFill>
+                  <a:schemeClr val="tx1"/>
+                </a:solidFill>
+                <a:latin typeface="Calibri Light"/>
+                <a:ea typeface="+mn-ea"/>
+                <a:cs typeface="Calibri Light"/>
+              </a:defRPr>
+            </a:lvl5pPr>
+            <a:lvl6pPr marL="2514600" indent="-228600" algn="l" defTabSz="457200" rtl="0" eaLnBrk="1" latinLnBrk="0" hangingPunct="1">
+              <a:spcBef>
+                <a:spcPct val="20000"/>
+              </a:spcBef>
+              <a:buFont typeface="Arial"/>
+              <a:buChar char="•"/>
+              <a:defRPr sz="2000" kern="1200">
+                <a:solidFill>
+                  <a:schemeClr val="tx1"/>
+                </a:solidFill>
+                <a:latin typeface="+mn-lt"/>
+                <a:ea typeface="+mn-ea"/>
+                <a:cs typeface="+mn-cs"/>
+              </a:defRPr>
+            </a:lvl6pPr>
+            <a:lvl7pPr marL="2971800" indent="-228600" algn="l" defTabSz="457200" rtl="0" eaLnBrk="1" latinLnBrk="0" hangingPunct="1">
+              <a:spcBef>
+                <a:spcPct val="20000"/>
+              </a:spcBef>
+              <a:buFont typeface="Arial"/>
+              <a:buChar char="•"/>
+              <a:defRPr sz="2000" kern="1200">
+                <a:solidFill>
+                  <a:schemeClr val="tx1"/>
+                </a:solidFill>
+                <a:latin typeface="+mn-lt"/>
+                <a:ea typeface="+mn-ea"/>
+                <a:cs typeface="+mn-cs"/>
+              </a:defRPr>
+            </a:lvl7pPr>
+            <a:lvl8pPr marL="3429000" indent="-228600" algn="l" defTabSz="457200" rtl="0" eaLnBrk="1" latinLnBrk="0" hangingPunct="1">
+              <a:spcBef>
+                <a:spcPct val="20000"/>
+              </a:spcBef>
+              <a:buFont typeface="Arial"/>
+              <a:buChar char="•"/>
+              <a:defRPr sz="2000" kern="1200">
+                <a:solidFill>
+                  <a:schemeClr val="tx1"/>
+                </a:solidFill>
+                <a:latin typeface="+mn-lt"/>
+                <a:ea typeface="+mn-ea"/>
+                <a:cs typeface="+mn-cs"/>
+              </a:defRPr>
+            </a:lvl8pPr>
+            <a:lvl9pPr marL="3886200" indent="-228600" algn="l" defTabSz="457200" rtl="0" eaLnBrk="1" latinLnBrk="0" hangingPunct="1">
+              <a:spcBef>
+                <a:spcPct val="20000"/>
+              </a:spcBef>
+              <a:buFont typeface="Arial"/>
+              <a:buChar char="•"/>
+              <a:defRPr sz="2000" kern="1200">
+                <a:solidFill>
+                  <a:schemeClr val="tx1"/>
+                </a:solidFill>
+                <a:latin typeface="+mn-lt"/>
+                <a:ea typeface="+mn-ea"/>
+                <a:cs typeface="+mn-cs"/>
+              </a:defRPr>
+            </a:lvl9pPr>
+          </a:lstStyle>
+          <a:p>
+            <a:r>
+              <a:rPr lang="en-US" sz="2200" dirty="0" smtClean="0"/>
+              <a:t>AARP 600 TC          1800 TC </a:t>
+            </a:r>
+          </a:p>
+          <a:p>
+            <a:r>
+              <a:rPr lang="en-US" sz="2200" dirty="0" smtClean="0"/>
+              <a:t>AARP + DIR             3600 TC</a:t>
+            </a:r>
+          </a:p>
+          <a:p>
+            <a:r>
+              <a:rPr lang="en-US" sz="2200" dirty="0"/>
+              <a:t>	 </a:t>
+            </a:r>
+            <a:r>
+              <a:rPr lang="en-US" sz="2200" dirty="0" smtClean="0"/>
+              <a:t> 1800 TC </a:t>
+            </a:r>
+            <a:endParaRPr lang="en-US" sz="2200" dirty="0"/>
+          </a:p>
+        </p:txBody>
+      </p:sp>
+      <p:sp>
+        <p:nvSpPr>
+          <p:cNvPr id="12" name="Content Placeholder 2"/>
+          <p:cNvSpPr txBox="1">
+            <a:spLocks/>
+          </p:cNvSpPr>
+          <p:nvPr/>
+        </p:nvSpPr>
+        <p:spPr>
+          <a:xfrm>
+            <a:off x="289367" y="3009418"/>
+            <a:ext cx="3171463" cy="474561"/>
+          </a:xfrm>
+          <a:prstGeom prst="rect">
+            <a:avLst/>
+          </a:prstGeom>
+        </p:spPr>
+        <p:txBody>
+          <a:bodyPr vert="horz" lIns="91440" tIns="45720" rIns="91440" bIns="45720" rtlCol="0">
+            <a:normAutofit/>
+          </a:bodyPr>
+          <a:lstStyle>
+            <a:lvl1pPr marL="0" indent="0" algn="l" defTabSz="457200" rtl="0" eaLnBrk="1" latinLnBrk="0" hangingPunct="1">
+              <a:lnSpc>
+                <a:spcPct val="80000"/>
+              </a:lnSpc>
+              <a:spcBef>
+                <a:spcPct val="20000"/>
+              </a:spcBef>
+              <a:buSzPct val="100000"/>
+              <a:buFontTx/>
+              <a:buNone/>
+              <a:defRPr sz="2400" b="0" i="0" kern="1200" baseline="0">
+                <a:solidFill>
+                  <a:schemeClr val="tx1"/>
+                </a:solidFill>
+                <a:latin typeface="Calibri Light"/>
+                <a:ea typeface="+mn-ea"/>
+                <a:cs typeface="Calibri Light"/>
+              </a:defRPr>
+            </a:lvl1pPr>
+            <a:lvl2pPr marL="576263" indent="-234950" algn="l" defTabSz="457200" rtl="0" eaLnBrk="1" latinLnBrk="0" hangingPunct="1">
+              <a:lnSpc>
+                <a:spcPct val="80000"/>
+              </a:lnSpc>
+              <a:spcBef>
+                <a:spcPct val="20000"/>
+              </a:spcBef>
+              <a:buSzPct val="100000"/>
+              <a:buFontTx/>
+              <a:buBlip>
+                <a:blip r:embed="rId2"/>
+              </a:buBlip>
+              <a:defRPr sz="2200" b="0" i="0" kern="1200">
+                <a:solidFill>
+                  <a:schemeClr val="tx1"/>
+                </a:solidFill>
+                <a:latin typeface="Calibri Light"/>
+                <a:ea typeface="+mn-ea"/>
+                <a:cs typeface="Calibri Light"/>
+              </a:defRPr>
+            </a:lvl2pPr>
+            <a:lvl3pPr marL="801688" indent="-225425" algn="l" defTabSz="457200" rtl="0" eaLnBrk="1" latinLnBrk="0" hangingPunct="1">
+              <a:lnSpc>
+                <a:spcPct val="80000"/>
+              </a:lnSpc>
+              <a:spcBef>
+                <a:spcPct val="20000"/>
+              </a:spcBef>
+              <a:buSzPct val="100000"/>
+              <a:buFontTx/>
+              <a:buBlip>
+                <a:blip r:embed="rId2"/>
+              </a:buBlip>
+              <a:defRPr sz="2000" b="0" i="0" kern="1200">
+                <a:solidFill>
+                  <a:schemeClr val="tx1"/>
+                </a:solidFill>
+                <a:latin typeface="Calibri Light"/>
+                <a:ea typeface="+mn-ea"/>
+                <a:cs typeface="Calibri Light"/>
+              </a:defRPr>
+            </a:lvl3pPr>
+            <a:lvl4pPr marL="966788" indent="-165100" algn="l" defTabSz="457200" rtl="0" eaLnBrk="1" latinLnBrk="0" hangingPunct="1">
+              <a:lnSpc>
+                <a:spcPct val="80000"/>
+              </a:lnSpc>
+              <a:spcBef>
+                <a:spcPct val="20000"/>
+              </a:spcBef>
+              <a:buSzPct val="100000"/>
+              <a:buFontTx/>
+              <a:buBlip>
+                <a:blip r:embed="rId2"/>
+              </a:buBlip>
+              <a:defRPr sz="1800" b="0" i="0" kern="1200">
+                <a:solidFill>
+                  <a:schemeClr val="tx1"/>
+                </a:solidFill>
+                <a:latin typeface="Calibri Light"/>
+                <a:ea typeface="+mn-ea"/>
+                <a:cs typeface="Calibri Light"/>
+              </a:defRPr>
+            </a:lvl4pPr>
+            <a:lvl5pPr marL="1201738" indent="-176213" algn="l" defTabSz="457200" rtl="0" eaLnBrk="1" latinLnBrk="0" hangingPunct="1">
+              <a:lnSpc>
+                <a:spcPct val="80000"/>
+              </a:lnSpc>
+              <a:spcBef>
+                <a:spcPct val="20000"/>
+              </a:spcBef>
+              <a:buSzPct val="100000"/>
+              <a:buFontTx/>
+              <a:buBlip>
+                <a:blip r:embed="rId2"/>
+              </a:buBlip>
+              <a:defRPr sz="1600" b="0" i="0" kern="1200">
+                <a:solidFill>
+                  <a:schemeClr val="tx1"/>
+                </a:solidFill>
+                <a:latin typeface="Calibri Light"/>
+                <a:ea typeface="+mn-ea"/>
+                <a:cs typeface="Calibri Light"/>
+              </a:defRPr>
+            </a:lvl5pPr>
+            <a:lvl6pPr marL="2514600" indent="-228600" algn="l" defTabSz="457200" rtl="0" eaLnBrk="1" latinLnBrk="0" hangingPunct="1">
+              <a:spcBef>
+                <a:spcPct val="20000"/>
+              </a:spcBef>
+              <a:buFont typeface="Arial"/>
+              <a:buChar char="•"/>
+              <a:defRPr sz="2000" kern="1200">
+                <a:solidFill>
+                  <a:schemeClr val="tx1"/>
+                </a:solidFill>
+                <a:latin typeface="+mn-lt"/>
+                <a:ea typeface="+mn-ea"/>
+                <a:cs typeface="+mn-cs"/>
+              </a:defRPr>
+            </a:lvl6pPr>
+            <a:lvl7pPr marL="2971800" indent="-228600" algn="l" defTabSz="457200" rtl="0" eaLnBrk="1" latinLnBrk="0" hangingPunct="1">
+              <a:spcBef>
+                <a:spcPct val="20000"/>
+              </a:spcBef>
+              <a:buFont typeface="Arial"/>
+              <a:buChar char="•"/>
+              <a:defRPr sz="2000" kern="1200">
+                <a:solidFill>
+                  <a:schemeClr val="tx1"/>
+                </a:solidFill>
+                <a:latin typeface="+mn-lt"/>
+                <a:ea typeface="+mn-ea"/>
+                <a:cs typeface="+mn-cs"/>
+              </a:defRPr>
+            </a:lvl7pPr>
+            <a:lvl8pPr marL="3429000" indent="-228600" algn="l" defTabSz="457200" rtl="0" eaLnBrk="1" latinLnBrk="0" hangingPunct="1">
+              <a:spcBef>
+                <a:spcPct val="20000"/>
+              </a:spcBef>
+              <a:buFont typeface="Arial"/>
+              <a:buChar char="•"/>
+              <a:defRPr sz="2000" kern="1200">
+                <a:solidFill>
+                  <a:schemeClr val="tx1"/>
+                </a:solidFill>
+                <a:latin typeface="+mn-lt"/>
+                <a:ea typeface="+mn-ea"/>
+                <a:cs typeface="+mn-cs"/>
+              </a:defRPr>
+            </a:lvl8pPr>
+            <a:lvl9pPr marL="3886200" indent="-228600" algn="l" defTabSz="457200" rtl="0" eaLnBrk="1" latinLnBrk="0" hangingPunct="1">
+              <a:spcBef>
+                <a:spcPct val="20000"/>
+              </a:spcBef>
+              <a:buFont typeface="Arial"/>
+              <a:buChar char="•"/>
+              <a:defRPr sz="2000" kern="1200">
+                <a:solidFill>
+                  <a:schemeClr val="tx1"/>
+                </a:solidFill>
+                <a:latin typeface="+mn-lt"/>
+                <a:ea typeface="+mn-ea"/>
+                <a:cs typeface="+mn-cs"/>
+              </a:defRPr>
+            </a:lvl9pPr>
+          </a:lstStyle>
+          <a:p>
+            <a:r>
+              <a:rPr lang="en-US" sz="2000" dirty="0" smtClean="0"/>
+              <a:t>One State 2Hrs 6 Browsers</a:t>
+            </a:r>
+          </a:p>
+        </p:txBody>
+      </p:sp>
+      <p:cxnSp>
+        <p:nvCxnSpPr>
+          <p:cNvPr id="14" name="Curved Connector 13"/>
+          <p:cNvCxnSpPr/>
+          <p:nvPr/>
+        </p:nvCxnSpPr>
+        <p:spPr>
+          <a:xfrm flipV="1">
+            <a:off x="3171463" y="3009418"/>
+            <a:ext cx="533400" cy="150471"/>
+          </a:xfrm>
+          <a:prstGeom prst="curvedConnector3">
+            <a:avLst>
+              <a:gd name="adj1" fmla="val 52170"/>
+            </a:avLst>
+          </a:prstGeom>
+          <a:ln>
+            <a:solidFill>
+              <a:schemeClr val="tx1"/>
+            </a:solidFill>
+            <a:tailEnd type="triangle"/>
+          </a:ln>
+        </p:spPr>
+        <p:style>
+          <a:lnRef idx="2">
+            <a:schemeClr val="accent1"/>
+          </a:lnRef>
+          <a:fillRef idx="0">
+            <a:schemeClr val="accent1"/>
+          </a:fillRef>
+          <a:effectRef idx="1">
+            <a:schemeClr val="accent1"/>
+          </a:effectRef>
+          <a:fontRef idx="minor">
+            <a:schemeClr val="tx1"/>
+          </a:fontRef>
+        </p:style>
+      </p:cxnSp>
+      <p:sp>
+        <p:nvSpPr>
+          <p:cNvPr id="18" name="Content Placeholder 2"/>
+          <p:cNvSpPr txBox="1">
+            <a:spLocks/>
+          </p:cNvSpPr>
+          <p:nvPr/>
+        </p:nvSpPr>
+        <p:spPr>
+          <a:xfrm>
+            <a:off x="424406" y="3819646"/>
+            <a:ext cx="2882096" cy="2037144"/>
+          </a:xfrm>
+          <a:prstGeom prst="rect">
+            <a:avLst/>
+          </a:prstGeom>
+        </p:spPr>
+        <p:txBody>
+          <a:bodyPr vert="horz" lIns="91440" tIns="45720" rIns="91440" bIns="45720" rtlCol="0">
+            <a:normAutofit/>
+          </a:bodyPr>
+          <a:lstStyle>
+            <a:lvl1pPr marL="0" indent="0" algn="l" defTabSz="457200" rtl="0" eaLnBrk="1" latinLnBrk="0" hangingPunct="1">
+              <a:lnSpc>
+                <a:spcPct val="80000"/>
+              </a:lnSpc>
+              <a:spcBef>
+                <a:spcPct val="20000"/>
+              </a:spcBef>
+              <a:buSzPct val="100000"/>
+              <a:buFontTx/>
+              <a:buNone/>
+              <a:defRPr sz="2400" b="0" i="0" kern="1200" baseline="0">
+                <a:solidFill>
+                  <a:schemeClr val="tx1"/>
+                </a:solidFill>
+                <a:latin typeface="Calibri Light"/>
+                <a:ea typeface="+mn-ea"/>
+                <a:cs typeface="Calibri Light"/>
+              </a:defRPr>
+            </a:lvl1pPr>
+            <a:lvl2pPr marL="576263" indent="-234950" algn="l" defTabSz="457200" rtl="0" eaLnBrk="1" latinLnBrk="0" hangingPunct="1">
+              <a:lnSpc>
+                <a:spcPct val="80000"/>
+              </a:lnSpc>
+              <a:spcBef>
+                <a:spcPct val="20000"/>
+              </a:spcBef>
+              <a:buSzPct val="100000"/>
+              <a:buFontTx/>
+              <a:buBlip>
+                <a:blip r:embed="rId2"/>
+              </a:buBlip>
+              <a:defRPr sz="2200" b="0" i="0" kern="1200">
+                <a:solidFill>
+                  <a:schemeClr val="tx1"/>
+                </a:solidFill>
+                <a:latin typeface="Calibri Light"/>
+                <a:ea typeface="+mn-ea"/>
+                <a:cs typeface="Calibri Light"/>
+              </a:defRPr>
+            </a:lvl2pPr>
+            <a:lvl3pPr marL="801688" indent="-225425" algn="l" defTabSz="457200" rtl="0" eaLnBrk="1" latinLnBrk="0" hangingPunct="1">
+              <a:lnSpc>
+                <a:spcPct val="80000"/>
+              </a:lnSpc>
+              <a:spcBef>
+                <a:spcPct val="20000"/>
+              </a:spcBef>
+              <a:buSzPct val="100000"/>
+              <a:buFontTx/>
+              <a:buBlip>
+                <a:blip r:embed="rId2"/>
+              </a:buBlip>
+              <a:defRPr sz="2000" b="0" i="0" kern="1200">
+                <a:solidFill>
+                  <a:schemeClr val="tx1"/>
+                </a:solidFill>
+                <a:latin typeface="Calibri Light"/>
+                <a:ea typeface="+mn-ea"/>
+                <a:cs typeface="Calibri Light"/>
+              </a:defRPr>
+            </a:lvl3pPr>
+            <a:lvl4pPr marL="966788" indent="-165100" algn="l" defTabSz="457200" rtl="0" eaLnBrk="1" latinLnBrk="0" hangingPunct="1">
+              <a:lnSpc>
+                <a:spcPct val="80000"/>
+              </a:lnSpc>
+              <a:spcBef>
+                <a:spcPct val="20000"/>
+              </a:spcBef>
+              <a:buSzPct val="100000"/>
+              <a:buFontTx/>
+              <a:buBlip>
+                <a:blip r:embed="rId2"/>
+              </a:buBlip>
+              <a:defRPr sz="1800" b="0" i="0" kern="1200">
+                <a:solidFill>
+                  <a:schemeClr val="tx1"/>
+                </a:solidFill>
+                <a:latin typeface="Calibri Light"/>
+                <a:ea typeface="+mn-ea"/>
+                <a:cs typeface="Calibri Light"/>
+              </a:defRPr>
+            </a:lvl4pPr>
+            <a:lvl5pPr marL="1201738" indent="-176213" algn="l" defTabSz="457200" rtl="0" eaLnBrk="1" latinLnBrk="0" hangingPunct="1">
+              <a:lnSpc>
+                <a:spcPct val="80000"/>
+              </a:lnSpc>
+              <a:spcBef>
+                <a:spcPct val="20000"/>
+              </a:spcBef>
+              <a:buSzPct val="100000"/>
+              <a:buFontTx/>
+              <a:buBlip>
+                <a:blip r:embed="rId2"/>
+              </a:buBlip>
+              <a:defRPr sz="1600" b="0" i="0" kern="1200">
+                <a:solidFill>
+                  <a:schemeClr val="tx1"/>
+                </a:solidFill>
+                <a:latin typeface="Calibri Light"/>
+                <a:ea typeface="+mn-ea"/>
+                <a:cs typeface="Calibri Light"/>
+              </a:defRPr>
+            </a:lvl5pPr>
+            <a:lvl6pPr marL="2514600" indent="-228600" algn="l" defTabSz="457200" rtl="0" eaLnBrk="1" latinLnBrk="0" hangingPunct="1">
+              <a:spcBef>
+                <a:spcPct val="20000"/>
+              </a:spcBef>
+              <a:buFont typeface="Arial"/>
+              <a:buChar char="•"/>
+              <a:defRPr sz="2000" kern="1200">
+                <a:solidFill>
+                  <a:schemeClr val="tx1"/>
+                </a:solidFill>
+                <a:latin typeface="+mn-lt"/>
+                <a:ea typeface="+mn-ea"/>
+                <a:cs typeface="+mn-cs"/>
+              </a:defRPr>
+            </a:lvl6pPr>
+            <a:lvl7pPr marL="2971800" indent="-228600" algn="l" defTabSz="457200" rtl="0" eaLnBrk="1" latinLnBrk="0" hangingPunct="1">
+              <a:spcBef>
+                <a:spcPct val="20000"/>
+              </a:spcBef>
+              <a:buFont typeface="Arial"/>
+              <a:buChar char="•"/>
+              <a:defRPr sz="2000" kern="1200">
+                <a:solidFill>
+                  <a:schemeClr val="tx1"/>
+                </a:solidFill>
+                <a:latin typeface="+mn-lt"/>
+                <a:ea typeface="+mn-ea"/>
+                <a:cs typeface="+mn-cs"/>
+              </a:defRPr>
+            </a:lvl7pPr>
+            <a:lvl8pPr marL="3429000" indent="-228600" algn="l" defTabSz="457200" rtl="0" eaLnBrk="1" latinLnBrk="0" hangingPunct="1">
+              <a:spcBef>
+                <a:spcPct val="20000"/>
+              </a:spcBef>
+              <a:buFont typeface="Arial"/>
+              <a:buChar char="•"/>
+              <a:defRPr sz="2000" kern="1200">
+                <a:solidFill>
+                  <a:schemeClr val="tx1"/>
+                </a:solidFill>
+                <a:latin typeface="+mn-lt"/>
+                <a:ea typeface="+mn-ea"/>
+                <a:cs typeface="+mn-cs"/>
+              </a:defRPr>
+            </a:lvl8pPr>
+            <a:lvl9pPr marL="3886200" indent="-228600" algn="l" defTabSz="457200" rtl="0" eaLnBrk="1" latinLnBrk="0" hangingPunct="1">
+              <a:spcBef>
+                <a:spcPct val="20000"/>
+              </a:spcBef>
+              <a:buFont typeface="Arial"/>
+              <a:buChar char="•"/>
+              <a:defRPr sz="2000" kern="1200">
+                <a:solidFill>
+                  <a:schemeClr val="tx1"/>
+                </a:solidFill>
+                <a:latin typeface="+mn-lt"/>
+                <a:ea typeface="+mn-ea"/>
+                <a:cs typeface="+mn-cs"/>
+              </a:defRPr>
+            </a:lvl9pPr>
+          </a:lstStyle>
+          <a:p>
+            <a:r>
+              <a:rPr lang="en-US" dirty="0" smtClean="0"/>
+              <a:t>Currently </a:t>
+            </a:r>
+          </a:p>
+          <a:p>
+            <a:r>
+              <a:rPr lang="en-US" dirty="0" smtClean="0"/>
+              <a:t>20 States</a:t>
+            </a:r>
+          </a:p>
+          <a:p>
+            <a:r>
+              <a:rPr lang="en-US" dirty="0" smtClean="0"/>
+              <a:t>7 HMO &amp; PPO</a:t>
+            </a:r>
+          </a:p>
+          <a:p>
+            <a:r>
+              <a:rPr lang="en-US" dirty="0" smtClean="0"/>
+              <a:t>13 PPO only</a:t>
+            </a:r>
+            <a:endParaRPr lang="en-US" dirty="0"/>
+          </a:p>
+        </p:txBody>
+      </p:sp>
+    </p:spTree>
+    <p:extLst>
+      <p:ext uri="{BB962C8B-B14F-4D97-AF65-F5344CB8AC3E}">
+        <p14:creationId xmlns:p14="http://schemas.microsoft.com/office/powerpoint/2010/main" val="3950809361"/>
+      </p:ext>
+    </p:extLst>
+  </p:cSld>
+  <p:clrMapOvr>
+    <a:masterClrMapping/>
+  </p:clrMapOvr>
+  <p:timing>
+    <p:tnLst>
+      <p:par>
+        <p:cTn id="1" dur="indefinite" restart="never" nodeType="tmRoot"/>
+      </p:par>
+    </p:tnLst>
+  </p:timing>
 </p:sld>
 </file>
 
@@ -2500,8 +4090,8 @@
         </p:nvSpPr>
         <p:spPr>
           <a:xfrm>
-            <a:off x="298174" y="1730866"/>
-            <a:ext cx="8845826" cy="3997841"/>
+            <a:off x="278295" y="1512208"/>
+            <a:ext cx="8994913" cy="3997841"/>
           </a:xfrm>
         </p:spPr>
         <p:txBody>
@@ -2510,13 +4100,15 @@
           </a:bodyPr>
           <a:lstStyle/>
           <a:p>
-            <a:pPr>
+            <a:pPr marL="342900" indent="-342900">
               <a:lnSpc>
                 <a:spcPct val="150000"/>
               </a:lnSpc>
               <a:spcAft>
                 <a:spcPts val="1000"/>
               </a:spcAft>
+              <a:buFont typeface="Arial" panose="020B0604020202020204" pitchFamily="34" charset="0"/>
+              <a:buChar char="•"/>
             </a:pPr>
             <a:r>
               <a:rPr lang="en-US" sz="2000" dirty="0" smtClean="0">
@@ -2527,13 +4119,15 @@
             <a:endParaRPr lang="en-US" sz="2000" dirty="0"/>
           </a:p>
           <a:p>
-            <a:pPr>
+            <a:pPr marL="342900" indent="-342900">
               <a:lnSpc>
                 <a:spcPct val="150000"/>
               </a:lnSpc>
               <a:spcAft>
                 <a:spcPts val="1000"/>
               </a:spcAft>
+              <a:buFont typeface="Arial" panose="020B0604020202020204" pitchFamily="34" charset="0"/>
+              <a:buChar char="•"/>
             </a:pPr>
             <a:r>
               <a:rPr lang="en-US" sz="2000" dirty="0" smtClean="0">
@@ -2549,23 +4143,19 @@
               <a:rPr lang="en-US" sz="2000" dirty="0" smtClean="0">
                 <a:effectLst/>
               </a:rPr>
-              <a:t>of </a:t>
-            </a:r>
-            <a:r>
-              <a:rPr lang="en-US" sz="2000" dirty="0" smtClean="0">
-                <a:effectLst/>
-              </a:rPr>
-              <a:t>CX Web Applications…</a:t>
-            </a:r>
-          </a:p>
-          <a:p>
-            <a:pPr>
+              <a:t>of CX Web Applications…</a:t>
+            </a:r>
+          </a:p>
+          <a:p>
+            <a:pPr marL="342900" indent="-342900">
               <a:lnSpc>
                 <a:spcPct val="150000"/>
               </a:lnSpc>
               <a:spcAft>
                 <a:spcPts val="1000"/>
               </a:spcAft>
+              <a:buFont typeface="Arial" panose="020B0604020202020204" pitchFamily="34" charset="0"/>
+              <a:buChar char="•"/>
             </a:pPr>
             <a:r>
               <a:rPr lang="en-US" sz="2000" dirty="0" smtClean="0"/>
@@ -2577,18 +4167,17 @@
               </a:rPr>
               <a:t>core functional APIs( micro service API )…</a:t>
             </a:r>
-            <a:endParaRPr lang="en-US" sz="2000" dirty="0" smtClean="0">
-              <a:effectLst/>
-            </a:endParaRPr>
-          </a:p>
-          <a:p>
-            <a:pPr>
+          </a:p>
+          <a:p>
+            <a:pPr marL="342900" indent="-342900">
               <a:lnSpc>
                 <a:spcPct val="150000"/>
               </a:lnSpc>
               <a:spcAft>
                 <a:spcPts val="1000"/>
               </a:spcAft>
+              <a:buFont typeface="Arial" panose="020B0604020202020204" pitchFamily="34" charset="0"/>
+              <a:buChar char="•"/>
             </a:pPr>
             <a:r>
               <a:rPr lang="en-US" sz="2000" dirty="0" smtClean="0"/>
@@ -2616,6 +4205,13 @@
   <p:clrMapOvr>
     <a:masterClrMapping/>
   </p:clrMapOvr>
+  <p:timing>
+    <p:tnLst>
+      <p:par>
+        <p:cTn id="1" dur="indefinite" restart="never" nodeType="tmRoot"/>
+      </p:par>
+    </p:tnLst>
+  </p:timing>
 </p:sld>
 </file>
 
@@ -2697,8 +4293,8 @@
         </p:nvSpPr>
         <p:spPr>
           <a:xfrm>
-            <a:off x="437198" y="1861096"/>
-            <a:ext cx="8460218" cy="4762500"/>
+            <a:off x="278173" y="1622560"/>
+            <a:ext cx="8657483" cy="4762500"/>
           </a:xfrm>
         </p:spPr>
         <p:txBody>
@@ -2707,52 +4303,96 @@
           </a:bodyPr>
           <a:lstStyle/>
           <a:p>
-            <a:r>
-              <a:rPr lang="en-US" sz="1800" dirty="0" smtClean="0"/>
+            <a:pPr marL="342900" indent="-342900">
+              <a:buFont typeface="Arial" panose="020B0604020202020204" pitchFamily="34" charset="0"/>
+              <a:buChar char="•"/>
+            </a:pPr>
+            <a:r>
+              <a:rPr lang="en-US" sz="2000" dirty="0" smtClean="0"/>
               <a:t>Develop and deliver an automated </a:t>
             </a:r>
             <a:r>
-              <a:rPr lang="en-US" sz="1800" dirty="0"/>
+              <a:rPr lang="en-US" sz="2000" dirty="0"/>
               <a:t>testing frame </a:t>
             </a:r>
             <a:r>
-              <a:rPr lang="en-US" sz="1800" dirty="0" smtClean="0"/>
-              <a:t>work for Delta Dental Tech teams … </a:t>
-            </a:r>
-          </a:p>
-          <a:p>
-            <a:endParaRPr lang="en-US" sz="1800" dirty="0"/>
-          </a:p>
-          <a:p>
-            <a:r>
-              <a:rPr lang="en-US" sz="1800" dirty="0"/>
+              <a:rPr lang="en-US" sz="2000" dirty="0" smtClean="0"/>
+              <a:t>work for Delta Dental </a:t>
+            </a:r>
+            <a:r>
+              <a:rPr lang="en-US" sz="2000" dirty="0" smtClean="0"/>
+              <a:t>technology </a:t>
+            </a:r>
+            <a:r>
+              <a:rPr lang="en-US" sz="2000" dirty="0" smtClean="0"/>
+              <a:t>teams … </a:t>
+            </a:r>
+          </a:p>
+          <a:p>
+            <a:pPr marL="342900" indent="-342900">
+              <a:buFont typeface="Arial" panose="020B0604020202020204" pitchFamily="34" charset="0"/>
+              <a:buChar char="•"/>
+            </a:pPr>
+            <a:endParaRPr lang="en-US" sz="2000" dirty="0"/>
+          </a:p>
+          <a:p>
+            <a:pPr marL="342900" indent="-342900">
+              <a:buFont typeface="Arial" panose="020B0604020202020204" pitchFamily="34" charset="0"/>
+              <a:buChar char="•"/>
+            </a:pPr>
+            <a:r>
+              <a:rPr lang="en-US" sz="2000" dirty="0"/>
               <a:t>Design with a developmental philosophy that enables seasoned development engineers to create test scripts to validate their own work…</a:t>
             </a:r>
           </a:p>
           <a:p>
-            <a:endParaRPr lang="en-US" sz="1800" dirty="0"/>
-          </a:p>
-          <a:p>
-            <a:r>
-              <a:rPr lang="en-US" sz="1800" dirty="0" smtClean="0"/>
+            <a:pPr marL="342900" indent="-342900">
+              <a:buFont typeface="Arial" panose="020B0604020202020204" pitchFamily="34" charset="0"/>
+              <a:buChar char="•"/>
+            </a:pPr>
+            <a:endParaRPr lang="en-US" sz="2000" dirty="0"/>
+          </a:p>
+          <a:p>
+            <a:pPr marL="342900" indent="-342900">
+              <a:buFont typeface="Arial" panose="020B0604020202020204" pitchFamily="34" charset="0"/>
+              <a:buChar char="•"/>
+            </a:pPr>
+            <a:r>
+              <a:rPr lang="en-US" sz="2000" dirty="0" smtClean="0"/>
               <a:t>Design the Framework with enough power and flexibility to meet </a:t>
             </a:r>
             <a:r>
-              <a:rPr lang="en-US" sz="1800" dirty="0"/>
+              <a:rPr lang="en-US" sz="2000" dirty="0"/>
               <a:t>current and future </a:t>
             </a:r>
             <a:r>
-              <a:rPr lang="en-US" sz="1800" dirty="0" smtClean="0"/>
+              <a:rPr lang="en-US" sz="2000" dirty="0" smtClean="0"/>
               <a:t>needs</a:t>
             </a:r>
           </a:p>
           <a:p>
-            <a:endParaRPr lang="en-US" sz="1800" dirty="0" smtClean="0"/>
-          </a:p>
-          <a:p>
-            <a:r>
-              <a:rPr lang="en-US" sz="1800" dirty="0" smtClean="0"/>
-              <a:t>Continue developing and iterating on Framework functional improvement…</a:t>
+            <a:pPr marL="342900" indent="-342900">
+              <a:buFont typeface="Arial" panose="020B0604020202020204" pitchFamily="34" charset="0"/>
+              <a:buChar char="•"/>
+            </a:pPr>
+            <a:endParaRPr lang="en-US" sz="2000" dirty="0" smtClean="0"/>
+          </a:p>
+          <a:p>
+            <a:pPr marL="342900" indent="-342900">
+              <a:buFont typeface="Arial" panose="020B0604020202020204" pitchFamily="34" charset="0"/>
+              <a:buChar char="•"/>
+            </a:pPr>
+            <a:r>
+              <a:rPr lang="en-US" sz="2000" dirty="0" smtClean="0"/>
+              <a:t>Continue </a:t>
+            </a:r>
+            <a:r>
+              <a:rPr lang="en-US" sz="2000" dirty="0" smtClean="0"/>
+              <a:t>iterating </a:t>
+            </a:r>
+            <a:r>
+              <a:rPr lang="en-US" sz="2000" dirty="0" smtClean="0"/>
+              <a:t>on Framework functional improvement…</a:t>
             </a:r>
           </a:p>
           <a:p>
@@ -2773,6 +4413,13 @@
   <p:clrMapOvr>
     <a:masterClrMapping/>
   </p:clrMapOvr>
+  <p:timing>
+    <p:tnLst>
+      <p:par>
+        <p:cTn id="1" dur="indefinite" restart="never" nodeType="tmRoot"/>
+      </p:par>
+    </p:tnLst>
+  </p:timing>
 </p:sld>
 </file>
 
@@ -2805,20 +4452,32 @@
         </p:nvSpPr>
         <p:spPr>
           <a:xfrm>
-            <a:off x="1445229" y="136495"/>
+            <a:off x="1445229" y="37104"/>
             <a:ext cx="5454335" cy="1423947"/>
           </a:xfrm>
         </p:spPr>
         <p:txBody>
           <a:bodyPr anchor="t">
-            <a:normAutofit fontScale="90000"/>
+            <a:normAutofit/>
           </a:bodyPr>
           <a:lstStyle/>
           <a:p>
-            <a:pPr algn="ctr"/>
+            <a:pPr algn="ctr">
+              <a:lnSpc>
+                <a:spcPct val="80000"/>
+              </a:lnSpc>
+            </a:pPr>
             <a:r>
               <a:rPr lang="en-US" dirty="0" smtClean="0"/>
-              <a:t>EVOLUTION / ACCOMPLISHMENTS</a:t>
+              <a:t>ACCOMPLISHMENTS </a:t>
+            </a:r>
+            <a:r>
+              <a:rPr lang="en-US" dirty="0"/>
+              <a:t>/ </a:t>
+            </a:r>
+            <a:r>
+              <a:rPr lang="en-US" dirty="0" smtClean="0"/>
+              <a:t>EVOLUTION</a:t>
             </a:r>
             <a:endParaRPr lang="en-US" dirty="0"/>
           </a:p>
@@ -2836,8 +4495,8 @@
         </p:nvSpPr>
         <p:spPr>
           <a:xfrm>
-            <a:off x="327991" y="1560442"/>
-            <a:ext cx="8727060" cy="4885301"/>
+            <a:off x="278296" y="1192693"/>
+            <a:ext cx="7360995" cy="5665307"/>
           </a:xfrm>
         </p:spPr>
         <p:txBody>
@@ -2846,102 +4505,318 @@
           </a:bodyPr>
           <a:lstStyle/>
           <a:p>
-            <a:r>
-              <a:rPr lang="en-US" sz="2000" dirty="0"/>
+            <a:pPr marL="342900" indent="-342900">
+              <a:lnSpc>
+                <a:spcPct val="135000"/>
+              </a:lnSpc>
+              <a:spcBef>
+                <a:spcPts val="0"/>
+              </a:spcBef>
+              <a:buFont typeface="Arial" panose="020B0604020202020204" pitchFamily="34" charset="0"/>
+              <a:buChar char="•"/>
+            </a:pPr>
+            <a:r>
+              <a:rPr lang="en-US" sz="2000" dirty="0" smtClean="0"/>
               <a:t>CXTA and the CX Market Place Development Team have matured. </a:t>
             </a:r>
             <a:endParaRPr lang="en-US" sz="2000" dirty="0" smtClean="0"/>
           </a:p>
           <a:p>
-            <a:endParaRPr lang="en-US" sz="2000" dirty="0" smtClean="0"/>
-          </a:p>
-          <a:p>
+            <a:pPr marL="342900" indent="-342900">
+              <a:lnSpc>
+                <a:spcPct val="135000"/>
+              </a:lnSpc>
+              <a:spcBef>
+                <a:spcPts val="0"/>
+              </a:spcBef>
+              <a:buFont typeface="Arial" panose="020B0604020202020204" pitchFamily="34" charset="0"/>
+              <a:buChar char="•"/>
+            </a:pPr>
             <a:r>
               <a:rPr lang="en-US" sz="2000" dirty="0" smtClean="0"/>
-              <a:t>We </a:t>
-            </a:r>
-            <a:r>
-              <a:rPr lang="en-US" sz="2000" dirty="0"/>
-              <a:t>are able to do more and deliver to a greater audience.  </a:t>
-            </a:r>
-            <a:endParaRPr lang="en-US" sz="2000" dirty="0" smtClean="0"/>
-          </a:p>
-          <a:p>
-            <a:endParaRPr lang="en-US" sz="2000" dirty="0" smtClean="0"/>
-          </a:p>
-          <a:p>
+              <a:t>We are able to do more and deliver to a greater audience.  </a:t>
+            </a:r>
+          </a:p>
+          <a:p>
+            <a:pPr marL="342900" indent="-342900">
+              <a:lnSpc>
+                <a:spcPct val="135000"/>
+              </a:lnSpc>
+              <a:spcBef>
+                <a:spcPts val="0"/>
+              </a:spcBef>
+              <a:buFont typeface="Arial" panose="020B0604020202020204" pitchFamily="34" charset="0"/>
+              <a:buChar char="•"/>
+            </a:pPr>
             <a:r>
               <a:rPr lang="en-US" sz="2000" dirty="0" smtClean="0"/>
-              <a:t>California </a:t>
-            </a:r>
-            <a:r>
-              <a:rPr lang="en-US" sz="2000" dirty="0"/>
-              <a:t>is no longer the </a:t>
-            </a:r>
+              <a:t>California is no longer the horizon !</a:t>
+            </a:r>
+          </a:p>
+          <a:p>
+            <a:pPr marL="342900" indent="-342900">
+              <a:lnSpc>
+                <a:spcPct val="135000"/>
+              </a:lnSpc>
+              <a:spcBef>
+                <a:spcPts val="0"/>
+              </a:spcBef>
+              <a:buFont typeface="Arial" panose="020B0604020202020204" pitchFamily="34" charset="0"/>
+              <a:buChar char="•"/>
+            </a:pPr>
             <a:r>
               <a:rPr lang="en-US" sz="2000" dirty="0" smtClean="0"/>
-              <a:t>horizon </a:t>
-            </a:r>
+              <a:t>To scale as is projected we have to change how we develop tests…</a:t>
+            </a:r>
+          </a:p>
+          <a:p>
+            <a:pPr marL="342900" indent="-342900">
+              <a:lnSpc>
+                <a:spcPct val="135000"/>
+              </a:lnSpc>
+              <a:spcBef>
+                <a:spcPts val="0"/>
+              </a:spcBef>
+              <a:buFont typeface="Arial" panose="020B0604020202020204" pitchFamily="34" charset="0"/>
+              <a:buChar char="•"/>
+            </a:pPr>
             <a:r>
               <a:rPr lang="en-US" sz="2000" dirty="0" smtClean="0"/>
-              <a:t>!</a:t>
-            </a:r>
+              <a:t>We have to change how we select and execute tests…</a:t>
+            </a:r>
+          </a:p>
+          <a:p>
+            <a:pPr marL="342900" indent="-342900">
+              <a:lnSpc>
+                <a:spcPct val="135000"/>
+              </a:lnSpc>
+              <a:spcBef>
+                <a:spcPts val="0"/>
+              </a:spcBef>
+              <a:buFont typeface="Arial" panose="020B0604020202020204" pitchFamily="34" charset="0"/>
+              <a:buChar char="•"/>
+            </a:pPr>
+            <a:r>
+              <a:rPr lang="en-US" sz="2000" dirty="0" smtClean="0"/>
+              <a:t>Reduction in the number of hours  Manual VS Automated</a:t>
+            </a:r>
+          </a:p>
+          <a:p>
+            <a:pPr>
+              <a:lnSpc>
+                <a:spcPct val="135000"/>
+              </a:lnSpc>
+              <a:spcBef>
+                <a:spcPts val="0"/>
+              </a:spcBef>
+            </a:pPr>
+            <a:endParaRPr lang="en-US" sz="1800" dirty="0"/>
+          </a:p>
+          <a:p>
+            <a:pPr marL="919163" lvl="1" indent="-342900">
+              <a:lnSpc>
+                <a:spcPct val="135000"/>
+              </a:lnSpc>
+              <a:spcBef>
+                <a:spcPts val="0"/>
+              </a:spcBef>
+              <a:buFont typeface="Arial" panose="020B0604020202020204" pitchFamily="34" charset="0"/>
+              <a:buChar char="•"/>
+            </a:pPr>
+            <a:endParaRPr lang="en-US" sz="1800" dirty="0" smtClean="0"/>
+          </a:p>
+          <a:p>
+            <a:pPr marL="919163" lvl="1" indent="-342900">
+              <a:lnSpc>
+                <a:spcPct val="135000"/>
+              </a:lnSpc>
+              <a:spcBef>
+                <a:spcPts val="0"/>
+              </a:spcBef>
+              <a:buFont typeface="Arial" panose="020B0604020202020204" pitchFamily="34" charset="0"/>
+              <a:buChar char="•"/>
+            </a:pPr>
+            <a:endParaRPr lang="en-US" sz="1800" dirty="0"/>
           </a:p>
           <a:p>
             <a:endParaRPr lang="en-US" sz="2000" dirty="0"/>
           </a:p>
-          <a:p>
-            <a:r>
-              <a:rPr lang="en-US" sz="2000" dirty="0" smtClean="0"/>
-              <a:t>To </a:t>
-            </a:r>
-            <a:r>
-              <a:rPr lang="en-US" sz="2000" dirty="0" smtClean="0"/>
-              <a:t>scale as is projected we have to change how we develop tests…</a:t>
-            </a:r>
-          </a:p>
-          <a:p>
-            <a:endParaRPr lang="en-US" sz="2000" dirty="0" smtClean="0"/>
-          </a:p>
-          <a:p>
-            <a:r>
-              <a:rPr lang="en-US" sz="2000" dirty="0" smtClean="0"/>
-              <a:t>We have to change how we select and execute tests</a:t>
-            </a:r>
-            <a:r>
-              <a:rPr lang="en-US" sz="2000" dirty="0" smtClean="0"/>
-              <a:t>…</a:t>
-            </a:r>
-          </a:p>
-          <a:p>
-            <a:endParaRPr lang="en-US" sz="2000" dirty="0"/>
-          </a:p>
-          <a:p>
-            <a:r>
-              <a:rPr lang="en-US" sz="2000" dirty="0" smtClean="0"/>
-              <a:t>Reduction in the number of hours  Pull out my # from all hands Present</a:t>
-            </a:r>
-          </a:p>
-          <a:p>
-            <a:endParaRPr lang="en-US" sz="2000" dirty="0"/>
-          </a:p>
-          <a:p>
-            <a:r>
-              <a:rPr lang="en-US" sz="2000" dirty="0" smtClean="0"/>
-              <a:t>Dev staff productivity and confidence</a:t>
-            </a:r>
-          </a:p>
-          <a:p>
-            <a:endParaRPr lang="en-US" sz="2000" dirty="0"/>
-          </a:p>
-          <a:p>
-            <a:r>
-              <a:rPr lang="en-US" sz="2000" dirty="0" smtClean="0"/>
-              <a:t>Team Agility. Bug found, code fix submitted, automation run. Its Fixed !</a:t>
-            </a:r>
-          </a:p>
-          <a:p>
-            <a:endParaRPr lang="en-US" sz="2000" dirty="0"/>
+        </p:txBody>
+      </p:sp>
+      <p:pic>
+        <p:nvPicPr>
+          <p:cNvPr id="6" name="Picture 5"/>
+          <p:cNvPicPr>
+            <a:picLocks noChangeAspect="1"/>
+          </p:cNvPicPr>
+          <p:nvPr/>
+        </p:nvPicPr>
+        <p:blipFill>
+          <a:blip r:embed="rId2">
+            <a:extLst>
+              <a:ext uri="{28A0092B-C50C-407E-A947-70E740481C1C}">
+                <a14:useLocalDpi xmlns:a14="http://schemas.microsoft.com/office/drawing/2010/main" val="0"/>
+              </a:ext>
+            </a:extLst>
+          </a:blip>
+          <a:stretch>
+            <a:fillRect/>
+          </a:stretch>
+        </p:blipFill>
+        <p:spPr>
+          <a:xfrm>
+            <a:off x="814713" y="3679465"/>
+            <a:ext cx="6006486" cy="1320798"/>
+          </a:xfrm>
+          <a:prstGeom prst="rect">
+            <a:avLst/>
+          </a:prstGeom>
+        </p:spPr>
+      </p:pic>
+      <p:pic>
+        <p:nvPicPr>
+          <p:cNvPr id="8" name="Picture 7"/>
+          <p:cNvPicPr>
+            <a:picLocks noChangeAspect="1"/>
+          </p:cNvPicPr>
+          <p:nvPr/>
+        </p:nvPicPr>
+        <p:blipFill>
+          <a:blip r:embed="rId3">
+            <a:extLst>
+              <a:ext uri="{28A0092B-C50C-407E-A947-70E740481C1C}">
+                <a14:useLocalDpi xmlns:a14="http://schemas.microsoft.com/office/drawing/2010/main" val="0"/>
+              </a:ext>
+            </a:extLst>
+          </a:blip>
+          <a:stretch>
+            <a:fillRect/>
+          </a:stretch>
+        </p:blipFill>
+        <p:spPr>
+          <a:xfrm>
+            <a:off x="814713" y="5198401"/>
+            <a:ext cx="6006486" cy="1328961"/>
+          </a:xfrm>
+          <a:prstGeom prst="rect">
+            <a:avLst/>
+          </a:prstGeom>
+        </p:spPr>
+      </p:pic>
+      <p:sp>
+        <p:nvSpPr>
+          <p:cNvPr id="9" name="Rectangle 8"/>
+          <p:cNvSpPr/>
+          <p:nvPr/>
+        </p:nvSpPr>
+        <p:spPr>
+          <a:xfrm>
+            <a:off x="6939022" y="3798235"/>
+            <a:ext cx="1400537" cy="1077218"/>
+          </a:xfrm>
+          <a:prstGeom prst="rect">
+            <a:avLst/>
+          </a:prstGeom>
+          <a:noFill/>
+        </p:spPr>
+        <p:txBody>
+          <a:bodyPr wrap="square" lIns="91440" tIns="45720" rIns="91440" bIns="45720">
+            <a:spAutoFit/>
+          </a:bodyPr>
+          <a:lstStyle/>
+          <a:p>
+            <a:pPr algn="ctr"/>
+            <a:r>
+              <a:rPr lang="en-US" sz="3200" dirty="0" smtClean="0">
+                <a:ln w="0"/>
+                <a:effectLst>
+                  <a:outerShdw blurRad="38100" dist="19050" dir="2700000" algn="tl" rotWithShape="0">
+                    <a:schemeClr val="dk1">
+                      <a:alpha val="40000"/>
+                    </a:schemeClr>
+                  </a:outerShdw>
+                </a:effectLst>
+              </a:rPr>
+              <a:t>CA DHMO</a:t>
+            </a:r>
+            <a:endParaRPr lang="en-US" sz="3200" b="0" cap="none" spc="0" dirty="0">
+              <a:ln w="0"/>
+              <a:solidFill>
+                <a:schemeClr val="tx1"/>
+              </a:solidFill>
+              <a:effectLst>
+                <a:outerShdw blurRad="38100" dist="19050" dir="2700000" algn="tl" rotWithShape="0">
+                  <a:schemeClr val="dk1">
+                    <a:alpha val="40000"/>
+                  </a:schemeClr>
+                </a:outerShdw>
+              </a:effectLst>
+            </a:endParaRPr>
+          </a:p>
+        </p:txBody>
+      </p:sp>
+      <p:sp>
+        <p:nvSpPr>
+          <p:cNvPr id="10" name="Rectangle 9"/>
+          <p:cNvSpPr/>
+          <p:nvPr/>
+        </p:nvSpPr>
+        <p:spPr>
+          <a:xfrm>
+            <a:off x="6967958" y="5453247"/>
+            <a:ext cx="1400537" cy="584775"/>
+          </a:xfrm>
+          <a:prstGeom prst="rect">
+            <a:avLst/>
+          </a:prstGeom>
+          <a:noFill/>
+        </p:spPr>
+        <p:txBody>
+          <a:bodyPr wrap="square" lIns="91440" tIns="45720" rIns="91440" bIns="45720">
+            <a:spAutoFit/>
+          </a:bodyPr>
+          <a:lstStyle/>
+          <a:p>
+            <a:pPr algn="ctr"/>
+            <a:r>
+              <a:rPr lang="en-US" sz="3200" dirty="0">
+                <a:ln w="0"/>
+                <a:effectLst>
+                  <a:outerShdw blurRad="38100" dist="19050" dir="2700000" algn="tl" rotWithShape="0">
+                    <a:schemeClr val="dk1">
+                      <a:alpha val="40000"/>
+                    </a:schemeClr>
+                  </a:outerShdw>
+                </a:effectLst>
+              </a:rPr>
+              <a:t>A</a:t>
+            </a:r>
+            <a:r>
+              <a:rPr lang="en-US" sz="3200" dirty="0" smtClean="0">
+                <a:ln w="0"/>
+                <a:effectLst>
+                  <a:outerShdw blurRad="38100" dist="19050" dir="2700000" algn="tl" rotWithShape="0">
+                    <a:schemeClr val="dk1">
+                      <a:alpha val="40000"/>
+                    </a:schemeClr>
+                  </a:outerShdw>
+                </a:effectLst>
+              </a:rPr>
+              <a:t>HMO</a:t>
+            </a:r>
+            <a:endParaRPr lang="en-US" sz="3200" b="0" cap="none" spc="0" dirty="0">
+              <a:ln w="0"/>
+              <a:solidFill>
+                <a:schemeClr val="tx1"/>
+              </a:solidFill>
+              <a:effectLst>
+                <a:outerShdw blurRad="38100" dist="19050" dir="2700000" algn="tl" rotWithShape="0">
+                  <a:schemeClr val="dk1">
+                    <a:alpha val="40000"/>
+                  </a:schemeClr>
+                </a:outerShdw>
+              </a:effectLst>
+            </a:endParaRPr>
           </a:p>
         </p:txBody>
       </p:sp>
@@ -2955,10 +4830,299 @@
   <p:clrMapOvr>
     <a:masterClrMapping/>
   </p:clrMapOvr>
+  <p:timing>
+    <p:tnLst>
+      <p:par>
+        <p:cTn id="1" dur="indefinite" restart="never" nodeType="tmRoot"/>
+      </p:par>
+    </p:tnLst>
+  </p:timing>
 </p:sld>
 </file>
 
 <file path=ppt/slides/slide5.xml><?xml version="1.0" encoding="utf-8"?>
+<p:sld xmlns:a="http://schemas.openxmlformats.org/drawingml/2006/main" xmlns:r="http://schemas.openxmlformats.org/officeDocument/2006/relationships" xmlns:p="http://schemas.openxmlformats.org/presentationml/2006/main">
+  <p:cSld>
+    <p:spTree>
+      <p:nvGrpSpPr>
+        <p:cNvPr id="1" name=""/>
+        <p:cNvGrpSpPr/>
+        <p:nvPr/>
+      </p:nvGrpSpPr>
+      <p:grpSpPr>
+        <a:xfrm>
+          <a:off x="0" y="0"/>
+          <a:ext cx="0" cy="0"/>
+          <a:chOff x="0" y="0"/>
+          <a:chExt cx="0" cy="0"/>
+        </a:xfrm>
+      </p:grpSpPr>
+      <p:sp>
+        <p:nvSpPr>
+          <p:cNvPr id="4" name="Title 1"/>
+          <p:cNvSpPr>
+            <a:spLocks noGrp="1"/>
+          </p:cNvSpPr>
+          <p:nvPr>
+            <p:ph type="title"/>
+          </p:nvPr>
+        </p:nvSpPr>
+        <p:spPr>
+          <a:xfrm>
+            <a:off x="1445229" y="37104"/>
+            <a:ext cx="5454335" cy="1423947"/>
+          </a:xfrm>
+        </p:spPr>
+        <p:txBody>
+          <a:bodyPr anchor="t">
+            <a:normAutofit/>
+          </a:bodyPr>
+          <a:lstStyle/>
+          <a:p>
+            <a:pPr algn="ctr">
+              <a:lnSpc>
+                <a:spcPct val="80000"/>
+              </a:lnSpc>
+            </a:pPr>
+            <a:r>
+              <a:rPr lang="en-US" dirty="0" smtClean="0"/>
+              <a:t>ACCOMPLISHMENTS </a:t>
+            </a:r>
+            <a:r>
+              <a:rPr lang="en-US" dirty="0"/>
+              <a:t>/ </a:t>
+            </a:r>
+            <a:r>
+              <a:rPr lang="en-US" dirty="0" smtClean="0"/>
+              <a:t>EVOLUTION</a:t>
+            </a:r>
+            <a:endParaRPr lang="en-US" dirty="0"/>
+          </a:p>
+        </p:txBody>
+      </p:sp>
+      <p:sp>
+        <p:nvSpPr>
+          <p:cNvPr id="5" name="Content Placeholder 2"/>
+          <p:cNvSpPr>
+            <a:spLocks noGrp="1"/>
+          </p:cNvSpPr>
+          <p:nvPr>
+            <p:ph idx="1"/>
+          </p:nvPr>
+        </p:nvSpPr>
+        <p:spPr>
+          <a:xfrm>
+            <a:off x="278296" y="1192693"/>
+            <a:ext cx="8865704" cy="5665307"/>
+          </a:xfrm>
+        </p:spPr>
+        <p:txBody>
+          <a:bodyPr>
+            <a:normAutofit/>
+          </a:bodyPr>
+          <a:lstStyle/>
+          <a:p>
+            <a:pPr marL="342900" indent="-342900">
+              <a:lnSpc>
+                <a:spcPct val="135000"/>
+              </a:lnSpc>
+              <a:spcBef>
+                <a:spcPts val="0"/>
+              </a:spcBef>
+              <a:buFont typeface="Arial" panose="020B0604020202020204" pitchFamily="34" charset="0"/>
+              <a:buChar char="•"/>
+            </a:pPr>
+            <a:r>
+              <a:rPr lang="en-US" sz="2000" dirty="0" smtClean="0"/>
+              <a:t>Dev </a:t>
+            </a:r>
+            <a:r>
+              <a:rPr lang="en-US" sz="2000" dirty="0" smtClean="0"/>
+              <a:t>staff productivity and </a:t>
+            </a:r>
+            <a:r>
+              <a:rPr lang="en-US" sz="2000" dirty="0" smtClean="0"/>
+              <a:t>confidence</a:t>
+            </a:r>
+          </a:p>
+          <a:p>
+            <a:pPr marL="919163" lvl="1" indent="-342900">
+              <a:lnSpc>
+                <a:spcPct val="100000"/>
+              </a:lnSpc>
+              <a:spcBef>
+                <a:spcPts val="0"/>
+              </a:spcBef>
+              <a:buFont typeface="Arial" panose="020B0604020202020204" pitchFamily="34" charset="0"/>
+              <a:buChar char="•"/>
+            </a:pPr>
+            <a:r>
+              <a:rPr lang="en-US" sz="1800" dirty="0" smtClean="0"/>
+              <a:t>A number of times Development has needed a confidence vote on the product reliability.  Each time I was able to provide within a number of hours a solid reporting on the product’s viability</a:t>
+            </a:r>
+          </a:p>
+          <a:p>
+            <a:pPr lvl="1" indent="0">
+              <a:lnSpc>
+                <a:spcPct val="100000"/>
+              </a:lnSpc>
+              <a:spcBef>
+                <a:spcPts val="0"/>
+              </a:spcBef>
+              <a:buNone/>
+            </a:pPr>
+            <a:r>
+              <a:rPr lang="en-US" sz="1600" dirty="0"/>
+              <a:t> </a:t>
+            </a:r>
+            <a:r>
+              <a:rPr lang="en-US" sz="1600" dirty="0" smtClean="0"/>
+              <a:t>         </a:t>
+            </a:r>
+            <a:endParaRPr lang="en-US" sz="1800" dirty="0"/>
+          </a:p>
+          <a:p>
+            <a:pPr marL="342900" indent="-342900">
+              <a:lnSpc>
+                <a:spcPct val="135000"/>
+              </a:lnSpc>
+              <a:spcBef>
+                <a:spcPts val="0"/>
+              </a:spcBef>
+              <a:buFont typeface="Arial" panose="020B0604020202020204" pitchFamily="34" charset="0"/>
+              <a:buChar char="•"/>
+            </a:pPr>
+            <a:r>
+              <a:rPr lang="en-US" sz="2000" dirty="0" smtClean="0"/>
+              <a:t>Team Agility. Bug found, code fix submitted, automation run. Its Fixed </a:t>
+            </a:r>
+            <a:r>
+              <a:rPr lang="en-US" sz="2000" dirty="0" smtClean="0"/>
+              <a:t>!</a:t>
+            </a:r>
+          </a:p>
+          <a:p>
+            <a:pPr marL="919163" lvl="1" indent="-342900">
+              <a:lnSpc>
+                <a:spcPct val="110000"/>
+              </a:lnSpc>
+              <a:spcBef>
+                <a:spcPts val="0"/>
+              </a:spcBef>
+              <a:buFont typeface="Arial" panose="020B0604020202020204" pitchFamily="34" charset="0"/>
+              <a:buChar char="•"/>
+            </a:pPr>
+            <a:r>
+              <a:rPr lang="en-US" sz="1800" dirty="0" smtClean="0"/>
+              <a:t>Product Architect claimed at one point, “ That’s why I liked Test Automation so much.”  My Automation ran the same script that forced the problem to the surface and ran identically proving the fix was successful</a:t>
+            </a:r>
+          </a:p>
+          <a:p>
+            <a:pPr>
+              <a:lnSpc>
+                <a:spcPct val="135000"/>
+              </a:lnSpc>
+              <a:spcBef>
+                <a:spcPts val="0"/>
+              </a:spcBef>
+            </a:pPr>
+            <a:r>
+              <a:rPr lang="en-US" sz="1600" dirty="0" smtClean="0"/>
+              <a:t>              </a:t>
+            </a:r>
+            <a:endParaRPr lang="en-US" sz="1600" dirty="0"/>
+          </a:p>
+          <a:p>
+            <a:pPr marL="342900" indent="-342900">
+              <a:lnSpc>
+                <a:spcPct val="135000"/>
+              </a:lnSpc>
+              <a:spcBef>
+                <a:spcPts val="0"/>
+              </a:spcBef>
+              <a:buFont typeface="Arial" panose="020B0604020202020204" pitchFamily="34" charset="0"/>
+              <a:buChar char="•"/>
+            </a:pPr>
+            <a:r>
+              <a:rPr lang="en-US" sz="2000" dirty="0" smtClean="0"/>
+              <a:t>Big Fixes done at MOT on a development request. </a:t>
+            </a:r>
+          </a:p>
+          <a:p>
+            <a:pPr marL="919163" lvl="1" indent="-342900">
+              <a:lnSpc>
+                <a:spcPct val="110000"/>
+              </a:lnSpc>
+              <a:spcBef>
+                <a:spcPts val="0"/>
+              </a:spcBef>
+              <a:buFont typeface="Arial" panose="020B0604020202020204" pitchFamily="34" charset="0"/>
+              <a:buChar char="•"/>
+            </a:pPr>
+            <a:r>
+              <a:rPr lang="en-US" sz="1800" dirty="0" smtClean="0"/>
+              <a:t>We run out tests.  We find a bug</a:t>
+            </a:r>
+          </a:p>
+          <a:p>
+            <a:pPr marL="919163" lvl="1" indent="-342900">
+              <a:lnSpc>
+                <a:spcPct val="110000"/>
+              </a:lnSpc>
+              <a:spcBef>
+                <a:spcPts val="0"/>
+              </a:spcBef>
+              <a:buFont typeface="Arial" panose="020B0604020202020204" pitchFamily="34" charset="0"/>
+              <a:buChar char="•"/>
+            </a:pPr>
+            <a:r>
+              <a:rPr lang="en-US" sz="1800" dirty="0" smtClean="0"/>
+              <a:t>We answer:  Yes, we can rerun the pass for you</a:t>
+            </a:r>
+          </a:p>
+          <a:p>
+            <a:pPr marL="919163" lvl="1" indent="-342900">
+              <a:lnSpc>
+                <a:spcPct val="110000"/>
+              </a:lnSpc>
+              <a:spcBef>
+                <a:spcPts val="0"/>
+              </a:spcBef>
+              <a:buFont typeface="Arial" panose="020B0604020202020204" pitchFamily="34" charset="0"/>
+              <a:buChar char="•"/>
+            </a:pPr>
+            <a:r>
+              <a:rPr lang="en-US" sz="1800" dirty="0" smtClean="0"/>
+              <a:t>And within hours we can report a Full Run, Short Run, Focused Run providing confidence to the team.</a:t>
+            </a:r>
+            <a:endParaRPr lang="en-US" sz="1800" dirty="0" smtClean="0"/>
+          </a:p>
+          <a:p>
+            <a:endParaRPr lang="en-US" sz="2000" dirty="0"/>
+          </a:p>
+        </p:txBody>
+      </p:sp>
+    </p:spTree>
+    <p:extLst>
+      <p:ext uri="{BB962C8B-B14F-4D97-AF65-F5344CB8AC3E}">
+        <p14:creationId xmlns:p14="http://schemas.microsoft.com/office/powerpoint/2010/main" val="2033148381"/>
+      </p:ext>
+    </p:extLst>
+  </p:cSld>
+  <p:clrMapOvr>
+    <a:masterClrMapping/>
+  </p:clrMapOvr>
+  <p:timing>
+    <p:tnLst>
+      <p:par>
+        <p:cTn id="1" dur="indefinite" restart="never" nodeType="tmRoot"/>
+      </p:par>
+    </p:tnLst>
+  </p:timing>
+</p:sld>
+</file>
+
+<file path=ppt/slides/slide6.xml><?xml version="1.0" encoding="utf-8"?>
 <p:sld xmlns:a="http://schemas.openxmlformats.org/drawingml/2006/main" xmlns:r="http://schemas.openxmlformats.org/officeDocument/2006/relationships" xmlns:p="http://schemas.openxmlformats.org/presentationml/2006/main">
   <p:cSld>
     <p:spTree>
@@ -3018,7 +5182,7 @@
         </p:nvSpPr>
         <p:spPr>
           <a:xfrm>
-            <a:off x="321866" y="1795828"/>
+            <a:off x="282110" y="1795828"/>
             <a:ext cx="8822133" cy="4403194"/>
           </a:xfrm>
         </p:spPr>
@@ -3028,10 +5192,12 @@
           </a:bodyPr>
           <a:lstStyle/>
           <a:p>
-            <a:pPr>
+            <a:pPr marL="342900" indent="-342900">
               <a:lnSpc>
                 <a:spcPct val="125000"/>
               </a:lnSpc>
+              <a:buFont typeface="Arial" panose="020B0604020202020204" pitchFamily="34" charset="0"/>
+              <a:buChar char="•"/>
             </a:pPr>
             <a:r>
               <a:rPr lang="en-US" sz="2000" dirty="0"/>
@@ -3064,10 +5230,12 @@
             <a:endParaRPr lang="en-US" sz="2000" dirty="0" smtClean="0"/>
           </a:p>
           <a:p>
-            <a:pPr>
+            <a:pPr marL="342900" indent="-342900">
               <a:lnSpc>
                 <a:spcPct val="125000"/>
               </a:lnSpc>
+              <a:buFont typeface="Arial" panose="020B0604020202020204" pitchFamily="34" charset="0"/>
+              <a:buChar char="•"/>
             </a:pPr>
             <a:r>
               <a:rPr lang="en-US" sz="2000" dirty="0"/>
@@ -3083,23 +5251,16 @@
             </a:r>
             <a:r>
               <a:rPr lang="en-US" sz="2000" dirty="0" smtClean="0"/>
-              <a:t>supporting their </a:t>
-            </a:r>
-            <a:r>
-              <a:rPr lang="en-US" sz="2000" dirty="0" smtClean="0"/>
-              <a:t>work… </a:t>
-            </a:r>
-            <a:r>
-              <a:rPr lang="en-US" sz="1100" dirty="0" smtClean="0"/>
-              <a:t>( list bullet voice over )</a:t>
-            </a:r>
-            <a:endParaRPr lang="en-US" sz="2000" dirty="0" smtClean="0"/>
-          </a:p>
-          <a:p>
-            <a:pPr>
+              <a:t>supporting their work… </a:t>
+            </a:r>
+          </a:p>
+          <a:p>
+            <a:pPr marL="342900" indent="-342900">
               <a:lnSpc>
                 <a:spcPct val="125000"/>
               </a:lnSpc>
+              <a:buFont typeface="Arial" panose="020B0604020202020204" pitchFamily="34" charset="0"/>
+              <a:buChar char="•"/>
             </a:pPr>
             <a:r>
               <a:rPr lang="en-US" sz="2000" dirty="0" smtClean="0"/>
@@ -3115,10 +5276,12 @@
             </a:r>
           </a:p>
           <a:p>
-            <a:pPr>
+            <a:pPr marL="342900" indent="-342900">
               <a:lnSpc>
                 <a:spcPct val="125000"/>
               </a:lnSpc>
+              <a:buFont typeface="Arial" panose="020B0604020202020204" pitchFamily="34" charset="0"/>
+              <a:buChar char="•"/>
             </a:pPr>
             <a:r>
               <a:rPr lang="en-US" sz="2000" dirty="0" smtClean="0"/>
@@ -3139,10 +5302,12 @@
             <a:endParaRPr lang="en-US" sz="2000" dirty="0" smtClean="0"/>
           </a:p>
           <a:p>
-            <a:pPr>
+            <a:pPr marL="342900" indent="-342900">
               <a:lnSpc>
                 <a:spcPct val="125000"/>
               </a:lnSpc>
+              <a:buFont typeface="Arial" panose="020B0604020202020204" pitchFamily="34" charset="0"/>
+              <a:buChar char="•"/>
             </a:pPr>
             <a:r>
               <a:rPr lang="en-US" sz="2000" dirty="0" smtClean="0"/>
@@ -3162,10 +5327,12 @@
             </a:r>
           </a:p>
           <a:p>
-            <a:pPr>
+            <a:pPr marL="342900" indent="-342900">
               <a:lnSpc>
                 <a:spcPct val="125000"/>
               </a:lnSpc>
+              <a:buFont typeface="Arial" panose="020B0604020202020204" pitchFamily="34" charset="0"/>
+              <a:buChar char="•"/>
             </a:pPr>
             <a:r>
               <a:rPr lang="en-US" sz="2000" dirty="0" smtClean="0"/>
@@ -3200,10 +5367,17 @@
   <p:clrMapOvr>
     <a:masterClrMapping/>
   </p:clrMapOvr>
+  <p:timing>
+    <p:tnLst>
+      <p:par>
+        <p:cTn id="1" dur="indefinite" restart="never" nodeType="tmRoot"/>
+      </p:par>
+    </p:tnLst>
+  </p:timing>
 </p:sld>
 </file>
 
-<file path=ppt/slides/slide6.xml><?xml version="1.0" encoding="utf-8"?>
+<file path=ppt/slides/slide7.xml><?xml version="1.0" encoding="utf-8"?>
 <p:sld xmlns:a="http://schemas.openxmlformats.org/drawingml/2006/main" xmlns:r="http://schemas.openxmlformats.org/officeDocument/2006/relationships" xmlns:p="http://schemas.openxmlformats.org/presentationml/2006/main">
   <p:cSld>
     <p:spTree>
@@ -3263,7 +5437,7 @@
         </p:nvSpPr>
         <p:spPr>
           <a:xfrm>
-            <a:off x="423640" y="1839480"/>
+            <a:off x="274555" y="1839480"/>
             <a:ext cx="8580658" cy="4589026"/>
           </a:xfrm>
         </p:spPr>
@@ -3273,10 +5447,12 @@
           </a:bodyPr>
           <a:lstStyle/>
           <a:p>
-            <a:pPr>
+            <a:pPr marL="342900" indent="-342900">
               <a:lnSpc>
                 <a:spcPct val="110000"/>
               </a:lnSpc>
+              <a:buFont typeface="Arial" panose="020B0604020202020204" pitchFamily="34" charset="0"/>
+              <a:buChar char="•"/>
             </a:pPr>
             <a:r>
               <a:rPr lang="en-US" sz="2000" dirty="0"/>
@@ -3288,21 +5464,25 @@
             </a:r>
           </a:p>
           <a:p>
-            <a:pPr>
+            <a:pPr marL="342900" indent="-342900">
               <a:lnSpc>
                 <a:spcPct val="110000"/>
               </a:lnSpc>
-            </a:pPr>
-            <a:endParaRPr lang="en-US" sz="2000" smtClean="0"/>
-          </a:p>
-          <a:p>
-            <a:pPr>
+              <a:buFont typeface="Arial" panose="020B0604020202020204" pitchFamily="34" charset="0"/>
+              <a:buChar char="•"/>
+            </a:pPr>
+            <a:endParaRPr lang="en-US" sz="2000" dirty="0" smtClean="0"/>
+          </a:p>
+          <a:p>
+            <a:pPr marL="342900" indent="-342900">
               <a:lnSpc>
                 <a:spcPct val="110000"/>
               </a:lnSpc>
-            </a:pPr>
-            <a:r>
-              <a:rPr lang="en-US" sz="2000" smtClean="0"/>
+              <a:buFont typeface="Arial" panose="020B0604020202020204" pitchFamily="34" charset="0"/>
+              <a:buChar char="•"/>
+            </a:pPr>
+            <a:r>
+              <a:rPr lang="en-US" sz="2000" dirty="0" smtClean="0"/>
               <a:t>CXTA's </a:t>
             </a:r>
             <a:r>
@@ -3323,18 +5503,22 @@
             </a:r>
           </a:p>
           <a:p>
-            <a:pPr>
+            <a:pPr marL="342900" indent="-342900">
               <a:lnSpc>
                 <a:spcPct val="110000"/>
               </a:lnSpc>
+              <a:buFont typeface="Arial" panose="020B0604020202020204" pitchFamily="34" charset="0"/>
+              <a:buChar char="•"/>
             </a:pPr>
             <a:endParaRPr lang="en-US" sz="2000" dirty="0" smtClean="0"/>
           </a:p>
           <a:p>
-            <a:pPr>
+            <a:pPr marL="342900" indent="-342900">
               <a:lnSpc>
                 <a:spcPct val="110000"/>
               </a:lnSpc>
+              <a:buFont typeface="Arial" panose="020B0604020202020204" pitchFamily="34" charset="0"/>
+              <a:buChar char="•"/>
             </a:pPr>
             <a:r>
               <a:rPr lang="en-US" sz="2000" dirty="0" smtClean="0"/>
@@ -3362,10 +5546,17 @@
   <p:clrMapOvr>
     <a:masterClrMapping/>
   </p:clrMapOvr>
+  <p:timing>
+    <p:tnLst>
+      <p:par>
+        <p:cTn id="1" dur="indefinite" restart="never" nodeType="tmRoot"/>
+      </p:par>
+    </p:tnLst>
+  </p:timing>
 </p:sld>
 </file>
 
-<file path=ppt/slides/slide7.xml><?xml version="1.0" encoding="utf-8"?>
+<file path=ppt/slides/slide8.xml><?xml version="1.0" encoding="utf-8"?>
 <p:sld xmlns:a="http://schemas.openxmlformats.org/drawingml/2006/main" xmlns:r="http://schemas.openxmlformats.org/officeDocument/2006/relationships" xmlns:p="http://schemas.openxmlformats.org/presentationml/2006/main">
   <p:cSld>
     <p:spTree>
@@ -3395,7 +5586,7 @@
         <p:spPr>
           <a:xfrm>
             <a:off x="2130137" y="115744"/>
-            <a:ext cx="4322618" cy="1325563"/>
+            <a:ext cx="4322618" cy="957682"/>
           </a:xfrm>
         </p:spPr>
         <p:txBody>
@@ -3425,14 +5616,15 @@
         </p:nvSpPr>
         <p:spPr>
           <a:xfrm>
-            <a:off x="322118" y="1872760"/>
-            <a:ext cx="8821882" cy="4351338"/>
+            <a:off x="272424" y="1912517"/>
+            <a:ext cx="4369152" cy="4351338"/>
           </a:xfrm>
         </p:spPr>
         <p:txBody>
           <a:bodyPr/>
           <a:lstStyle/>
           <a:p>
+            <a:pPr algn="ctr"/>
             <a:r>
               <a:rPr lang="en-US" dirty="0" err="1" smtClean="0"/>
               <a:t>Git</a:t>
@@ -3457,25 +5649,101 @@
             </a:r>
           </a:p>
           <a:p>
-            <a:pPr marL="341313" lvl="1" indent="0">
-              <a:buNone/>
-            </a:pPr>
-            <a:r>
-              <a:rPr lang="en-US" dirty="0" smtClean="0"/>
-              <a:t>Core base level classes defining what is common to any component on a web page</a:t>
-            </a:r>
-          </a:p>
-          <a:p>
-            <a:pPr marL="341313" lvl="1" indent="0">
-              <a:buNone/>
-            </a:pPr>
-            <a:r>
-              <a:rPr lang="en-US" dirty="0" smtClean="0"/>
-              <a:t>Specialized components and methods build up from the </a:t>
-            </a:r>
+            <a:pPr lvl="1">
+              <a:lnSpc>
+                <a:spcPct val="100000"/>
+              </a:lnSpc>
+              <a:spcBef>
+                <a:spcPts val="0"/>
+              </a:spcBef>
+              <a:buFont typeface="Arial" panose="020B0604020202020204" pitchFamily="34" charset="0"/>
+              <a:buChar char="•"/>
+            </a:pPr>
+            <a:r>
+              <a:rPr lang="en-US" sz="1800" dirty="0" smtClean="0"/>
+              <a:t>Core base level classes defining what is common to any component on a web </a:t>
+            </a:r>
+            <a:r>
+              <a:rPr lang="en-US" sz="1800" dirty="0" smtClean="0"/>
+              <a:t>page</a:t>
+            </a:r>
+          </a:p>
+          <a:p>
+            <a:pPr lvl="1">
+              <a:lnSpc>
+                <a:spcPct val="100000"/>
+              </a:lnSpc>
+              <a:spcBef>
+                <a:spcPts val="0"/>
+              </a:spcBef>
+              <a:buFont typeface="Arial" panose="020B0604020202020204" pitchFamily="34" charset="0"/>
+              <a:buChar char="•"/>
+            </a:pPr>
+            <a:r>
+              <a:rPr lang="en-US" sz="1800" dirty="0" smtClean="0"/>
+              <a:t>Initiator Classes, Handlers, Helper Classes</a:t>
+            </a:r>
+            <a:endParaRPr lang="en-US" sz="1800" dirty="0" smtClean="0"/>
+          </a:p>
+          <a:p>
+            <a:pPr lvl="1">
+              <a:lnSpc>
+                <a:spcPct val="100000"/>
+              </a:lnSpc>
+              <a:spcBef>
+                <a:spcPts val="0"/>
+              </a:spcBef>
+              <a:buFont typeface="Arial" panose="020B0604020202020204" pitchFamily="34" charset="0"/>
+              <a:buChar char="•"/>
+            </a:pPr>
+            <a:r>
+              <a:rPr lang="en-US" sz="1800" dirty="0" smtClean="0"/>
+              <a:t>Specialized components and methods build up from </a:t>
+            </a:r>
+            <a:r>
+              <a:rPr lang="en-US" sz="1800" dirty="0" smtClean="0"/>
+              <a:t>Core Classes and Methods</a:t>
+            </a:r>
+          </a:p>
+          <a:p>
+            <a:pPr lvl="1">
+              <a:buFont typeface="Arial" panose="020B0604020202020204" pitchFamily="34" charset="0"/>
+              <a:buChar char="•"/>
+            </a:pPr>
+            <a:endParaRPr lang="en-US" sz="1800" dirty="0" smtClean="0"/>
           </a:p>
         </p:txBody>
       </p:sp>
+      <p:pic>
+        <p:nvPicPr>
+          <p:cNvPr id="10" name="Picture 9"/>
+          <p:cNvPicPr>
+            <a:picLocks noChangeAspect="1"/>
+          </p:cNvPicPr>
+          <p:nvPr/>
+        </p:nvPicPr>
+        <p:blipFill>
+          <a:blip r:embed="rId2">
+            <a:extLst>
+              <a:ext uri="{28A0092B-C50C-407E-A947-70E740481C1C}">
+                <a14:useLocalDpi xmlns:a14="http://schemas.microsoft.com/office/drawing/2010/main" val="0"/>
+              </a:ext>
+            </a:extLst>
+          </a:blip>
+          <a:stretch>
+            <a:fillRect/>
+          </a:stretch>
+        </p:blipFill>
+        <p:spPr>
+          <a:xfrm>
+            <a:off x="4572000" y="1912517"/>
+            <a:ext cx="4556210" cy="3307665"/>
+          </a:xfrm>
+          <a:prstGeom prst="rect">
+            <a:avLst/>
+          </a:prstGeom>
+        </p:spPr>
+      </p:pic>
     </p:spTree>
     <p:extLst>
       <p:ext uri="{BB962C8B-B14F-4D97-AF65-F5344CB8AC3E}">
@@ -3486,10 +5754,17 @@
   <p:clrMapOvr>
     <a:masterClrMapping/>
   </p:clrMapOvr>
+  <p:timing>
+    <p:tnLst>
+      <p:par>
+        <p:cTn id="1" dur="indefinite" restart="never" nodeType="tmRoot"/>
+      </p:par>
+    </p:tnLst>
+  </p:timing>
 </p:sld>
 </file>
 
-<file path=ppt/slides/slide8.xml><?xml version="1.0" encoding="utf-8"?>
+<file path=ppt/slides/slide9.xml><?xml version="1.0" encoding="utf-8"?>
 <p:sld xmlns:a="http://schemas.openxmlformats.org/drawingml/2006/main" xmlns:r="http://schemas.openxmlformats.org/officeDocument/2006/relationships" xmlns:p="http://schemas.openxmlformats.org/presentationml/2006/main">
   <p:cSld>
     <p:spTree>
@@ -3568,41 +5843,43 @@
             </a:r>
           </a:p>
           <a:p>
-            <a:pPr marL="341313" lvl="1" indent="0">
+            <a:pPr lvl="1">
               <a:lnSpc>
                 <a:spcPct val="110000"/>
               </a:lnSpc>
+              <a:buFont typeface="Arial" panose="020B0604020202020204" pitchFamily="34" charset="0"/>
+              <a:buChar char="•"/>
+            </a:pPr>
+            <a:r>
+              <a:rPr lang="en-US" sz="2000" dirty="0"/>
+              <a:t>Schedule Based : Covers Regression Testing</a:t>
+            </a:r>
+          </a:p>
+          <a:p>
+            <a:pPr lvl="1">
+              <a:lnSpc>
+                <a:spcPct val="110000"/>
+              </a:lnSpc>
+              <a:buFont typeface="Arial" panose="020B0604020202020204" pitchFamily="34" charset="0"/>
+              <a:buChar char="•"/>
+            </a:pPr>
+            <a:r>
+              <a:rPr lang="en-US" sz="2000" dirty="0"/>
+              <a:t>On Demand : Covers all developer build initiated testing</a:t>
+            </a:r>
+          </a:p>
+          <a:p>
+            <a:pPr marL="457206" lvl="1" indent="0">
+              <a:lnSpc>
+                <a:spcPct val="110000"/>
+              </a:lnSpc>
               <a:buNone/>
             </a:pPr>
             <a:r>
-              <a:rPr lang="en-US" sz="2800" dirty="0"/>
-              <a:t>Schedule Based : Covers Regression Testing</a:t>
-            </a:r>
-          </a:p>
-          <a:p>
-            <a:pPr marL="341313" lvl="1" indent="0">
-              <a:lnSpc>
-                <a:spcPct val="110000"/>
-              </a:lnSpc>
-              <a:buNone/>
-            </a:pPr>
-            <a:r>
-              <a:rPr lang="en-US" sz="2800" dirty="0"/>
-              <a:t>On Demand : Covers all developer build initiated testing</a:t>
-            </a:r>
-          </a:p>
-          <a:p>
-            <a:pPr marL="457206" lvl="1" indent="0">
-              <a:lnSpc>
-                <a:spcPct val="110000"/>
-              </a:lnSpc>
-              <a:buNone/>
-            </a:pPr>
-            <a:r>
-              <a:rPr lang="en-US" sz="400" dirty="0"/>
-              <a:t>     </a:t>
-            </a:r>
-            <a:endParaRPr lang="en-US" sz="300" dirty="0"/>
+              <a:rPr lang="en-US" sz="1600" dirty="0" smtClean="0"/>
+              <a:t>                  </a:t>
+            </a:r>
+            <a:endParaRPr lang="en-US" sz="1400" dirty="0"/>
           </a:p>
           <a:p>
             <a:r>
@@ -3611,12 +5888,17 @@
             </a:r>
           </a:p>
           <a:p>
-            <a:pPr marL="341313" lvl="1" indent="0">
-              <a:buNone/>
-            </a:pPr>
-            <a:r>
-              <a:rPr lang="en-US" sz="2800" dirty="0"/>
-              <a:t>Gives developers ability to focus testing of code in development</a:t>
+            <a:pPr lvl="1">
+              <a:buFont typeface="Arial" panose="020B0604020202020204" pitchFamily="34" charset="0"/>
+              <a:buChar char="•"/>
+            </a:pPr>
+            <a:r>
+              <a:rPr lang="en-US" sz="2000" dirty="0"/>
+              <a:t>Gives developers ability to focus testing of code in </a:t>
+            </a:r>
+            <a:r>
+              <a:rPr lang="en-US" sz="2000" dirty="0" smtClean="0"/>
+              <a:t>development</a:t>
             </a:r>
           </a:p>
           <a:p>
@@ -3624,9 +5906,10 @@
               <a:buNone/>
             </a:pPr>
             <a:r>
-              <a:rPr lang="en-US" sz="500" dirty="0"/>
-              <a:t>     </a:t>
-            </a:r>
+              <a:rPr lang="en-US" sz="1400" dirty="0" smtClean="0"/>
+              <a:t>      </a:t>
+            </a:r>
+            <a:endParaRPr lang="en-US" sz="1400" dirty="0"/>
           </a:p>
           <a:p>
             <a:r>
@@ -3639,21 +5922,22 @@
             </a:r>
           </a:p>
           <a:p>
-            <a:pPr marL="341313" lvl="1" indent="0">
+            <a:pPr lvl="1">
               <a:lnSpc>
                 <a:spcPct val="100000"/>
               </a:lnSpc>
-              <a:buNone/>
-            </a:pPr>
-            <a:r>
-              <a:rPr lang="en-US" sz="2800" dirty="0"/>
+              <a:buFont typeface="Arial" panose="020B0604020202020204" pitchFamily="34" charset="0"/>
+              <a:buChar char="•"/>
+            </a:pPr>
+            <a:r>
+              <a:rPr lang="en-US" sz="2000" dirty="0"/>
               <a:t>Evolutionary change in configuration and approach moves to control of what product and state being tested out of the script and to Framework Configuration</a:t>
             </a:r>
             <a:r>
-              <a:rPr lang="en-US" sz="2800" dirty="0" smtClean="0"/>
+              <a:rPr lang="en-US" sz="2000" dirty="0" smtClean="0"/>
               <a:t>… ...</a:t>
             </a:r>
-            <a:endParaRPr lang="en-US" sz="2800" dirty="0"/>
+            <a:endParaRPr lang="en-US" sz="2000" dirty="0"/>
           </a:p>
         </p:txBody>
       </p:sp>
@@ -3667,140 +5951,13 @@
   <p:clrMapOvr>
     <a:masterClrMapping/>
   </p:clrMapOvr>
-</p:sld>
-</file>
-
-<file path=ppt/slides/slide9.xml><?xml version="1.0" encoding="utf-8"?>
-<p:sld xmlns:a="http://schemas.openxmlformats.org/drawingml/2006/main" xmlns:r="http://schemas.openxmlformats.org/officeDocument/2006/relationships" xmlns:p="http://schemas.openxmlformats.org/presentationml/2006/main">
-  <p:cSld>
-    <p:spTree>
-      <p:nvGrpSpPr>
-        <p:cNvPr id="1" name=""/>
-        <p:cNvGrpSpPr/>
-        <p:nvPr/>
-      </p:nvGrpSpPr>
-      <p:grpSpPr>
-        <a:xfrm>
-          <a:off x="0" y="0"/>
-          <a:ext cx="0" cy="0"/>
-          <a:chOff x="0" y="0"/>
-          <a:chExt cx="0" cy="0"/>
-        </a:xfrm>
-      </p:grpSpPr>
-      <p:sp>
-        <p:nvSpPr>
-          <p:cNvPr id="2" name="Title 1"/>
-          <p:cNvSpPr>
-            <a:spLocks noGrp="1"/>
-          </p:cNvSpPr>
-          <p:nvPr>
-            <p:ph type="title"/>
-          </p:nvPr>
-        </p:nvSpPr>
-        <p:spPr>
-          <a:xfrm>
-            <a:off x="1641767" y="129597"/>
-            <a:ext cx="5101934" cy="1325563"/>
-          </a:xfrm>
-        </p:spPr>
-        <p:txBody>
-          <a:bodyPr anchor="t"/>
-          <a:lstStyle/>
-          <a:p>
-            <a:pPr algn="ctr"/>
-            <a:r>
-              <a:rPr lang="en-US" dirty="0" smtClean="0"/>
-              <a:t>REPORTING</a:t>
-            </a:r>
-            <a:endParaRPr lang="en-US" dirty="0"/>
-          </a:p>
-        </p:txBody>
-      </p:sp>
-      <p:sp>
-        <p:nvSpPr>
-          <p:cNvPr id="3" name="Content Placeholder 2"/>
-          <p:cNvSpPr>
-            <a:spLocks noGrp="1"/>
-          </p:cNvSpPr>
-          <p:nvPr>
-            <p:ph idx="1"/>
-          </p:nvPr>
-        </p:nvSpPr>
-        <p:spPr>
-          <a:xfrm>
-            <a:off x="432844" y="1863333"/>
-            <a:ext cx="8427352" cy="4351338"/>
-          </a:xfrm>
-        </p:spPr>
-        <p:txBody>
-          <a:bodyPr/>
-          <a:lstStyle/>
-          <a:p>
-            <a:r>
-              <a:rPr lang="en-US" dirty="0" smtClean="0"/>
-              <a:t>Reporting:  Three levels of information</a:t>
-            </a:r>
-          </a:p>
-          <a:p>
-            <a:endParaRPr lang="en-US" dirty="0"/>
-          </a:p>
-          <a:p>
-            <a:r>
-              <a:rPr lang="en-US" dirty="0" smtClean="0"/>
-              <a:t>Hyper granular:  Cover every Assert and Compare in Framework</a:t>
-            </a:r>
-          </a:p>
-          <a:p>
-            <a:pPr marL="341313" lvl="1" indent="0">
-              <a:buNone/>
-            </a:pPr>
-            <a:r>
-              <a:rPr lang="en-US" dirty="0" smtClean="0"/>
-              <a:t>Debugging and Framework Development tool</a:t>
-            </a:r>
-          </a:p>
-          <a:p>
-            <a:r>
-              <a:rPr lang="en-US" dirty="0" smtClean="0"/>
-              <a:t>Test Run Specific:  Pass / Fail assessment of all written script tests</a:t>
-            </a:r>
-          </a:p>
-          <a:p>
-            <a:pPr marL="341313" lvl="1" indent="0">
-              <a:buNone/>
-            </a:pPr>
-            <a:r>
-              <a:rPr lang="en-US" dirty="0" smtClean="0"/>
-              <a:t>Current Standard test run encompassing test report</a:t>
-            </a:r>
-          </a:p>
-          <a:p>
-            <a:r>
-              <a:rPr lang="en-US" dirty="0" smtClean="0"/>
-              <a:t>High Level Product Specific:  Go / No-go on a Product basis</a:t>
-            </a:r>
-          </a:p>
-          <a:p>
-            <a:pPr marL="341313" lvl="1" indent="0">
-              <a:buNone/>
-            </a:pPr>
-            <a:r>
-              <a:rPr lang="en-US" dirty="0" smtClean="0"/>
-              <a:t>In Design Mode.  Would provide Development and Product Managers a quick look at the current health and capability to ship the product </a:t>
-            </a:r>
-          </a:p>
-        </p:txBody>
-      </p:sp>
-    </p:spTree>
-    <p:extLst>
-      <p:ext uri="{BB962C8B-B14F-4D97-AF65-F5344CB8AC3E}">
-        <p14:creationId xmlns:p14="http://schemas.microsoft.com/office/powerpoint/2010/main" val="21198343"/>
-      </p:ext>
-    </p:extLst>
-  </p:cSld>
-  <p:clrMapOvr>
-    <a:masterClrMapping/>
-  </p:clrMapOvr>
+  <p:timing>
+    <p:tnLst>
+      <p:par>
+        <p:cTn id="1" dur="indefinite" restart="never" nodeType="tmRoot"/>
+      </p:par>
+    </p:tnLst>
+  </p:timing>
 </p:sld>
 </file>
 
@@ -4391,6 +6548,52 @@
 </file>
 
 <file path=customXml/item1.xml><?xml version="1.0" encoding="utf-8"?>
+<?mso-contentType ?>
+<spe:Receivers xmlns:spe="http://schemas.microsoft.com/sharepoint/events">
+  <Receiver>
+    <Name>Document ID Generator</Name>
+    <Synchronization>Synchronous</Synchronization>
+    <Type>10001</Type>
+    <SequenceNumber>1000</SequenceNumber>
+    <Assembly>Microsoft.Office.DocumentManagement, Version=14.0.0.0, Culture=neutral, PublicKeyToken=71e9bce111e9429c</Assembly>
+    <Class>Microsoft.Office.DocumentManagement.Internal.DocIdHandler</Class>
+    <Data/>
+    <Filter/>
+  </Receiver>
+  <Receiver>
+    <Name>Document ID Generator</Name>
+    <Synchronization>Synchronous</Synchronization>
+    <Type>10002</Type>
+    <SequenceNumber>1001</SequenceNumber>
+    <Assembly>Microsoft.Office.DocumentManagement, Version=14.0.0.0, Culture=neutral, PublicKeyToken=71e9bce111e9429c</Assembly>
+    <Class>Microsoft.Office.DocumentManagement.Internal.DocIdHandler</Class>
+    <Data/>
+    <Filter/>
+  </Receiver>
+  <Receiver>
+    <Name>Document ID Generator</Name>
+    <Synchronization>Synchronous</Synchronization>
+    <Type>10004</Type>
+    <SequenceNumber>1002</SequenceNumber>
+    <Assembly>Microsoft.Office.DocumentManagement, Version=14.0.0.0, Culture=neutral, PublicKeyToken=71e9bce111e9429c</Assembly>
+    <Class>Microsoft.Office.DocumentManagement.Internal.DocIdHandler</Class>
+    <Data/>
+    <Filter/>
+  </Receiver>
+  <Receiver>
+    <Name>Document ID Generator</Name>
+    <Synchronization>Synchronous</Synchronization>
+    <Type>10006</Type>
+    <SequenceNumber>1003</SequenceNumber>
+    <Assembly>Microsoft.Office.DocumentManagement, Version=14.0.0.0, Culture=neutral, PublicKeyToken=71e9bce111e9429c</Assembly>
+    <Class>Microsoft.Office.DocumentManagement.Internal.DocIdHandler</Class>
+    <Data/>
+    <Filter/>
+  </Receiver>
+</spe:Receivers>
+</file>
+
+<file path=customXml/item2.xml><?xml version="1.0" encoding="utf-8"?>
 <ct:contentTypeSchema xmlns:ct="http://schemas.microsoft.com/office/2006/metadata/contentType" xmlns:ma="http://schemas.microsoft.com/office/2006/metadata/properties/metaAttributes" ct:_="" ma:_="" ma:contentTypeName="Document" ma:contentTypeID="0x0101000F421C3DE11F24489C3C49A9442BEF44" ma:contentTypeVersion="0" ma:contentTypeDescription="Create a new document." ma:contentTypeScope="" ma:versionID="03fa29219166c606cfec6c1a2cbf2ee4">
   <xsd:schema xmlns:xsd="http://www.w3.org/2001/XMLSchema" xmlns:xs="http://www.w3.org/2001/XMLSchema" xmlns:p="http://schemas.microsoft.com/office/2006/metadata/properties" xmlns:ns2="a9328eaf-6333-4034-a7ce-997665b5f80d" targetNamespace="http://schemas.microsoft.com/office/2006/metadata/properties" ma:root="true" ma:fieldsID="40f1611e01294dd1c52f51bc3dec7bd7" ns2:_="">
     <xsd:import namespace="a9328eaf-6333-4034-a7ce-997665b5f80d"/>
@@ -4535,62 +6738,7 @@
 </ct:contentTypeSchema>
 </file>
 
-<file path=customXml/item2.xml><?xml version="1.0" encoding="utf-8"?>
-<?mso-contentType ?>
-<spe:Receivers xmlns:spe="http://schemas.microsoft.com/sharepoint/events">
-  <Receiver>
-    <Name>Document ID Generator</Name>
-    <Synchronization>Synchronous</Synchronization>
-    <Type>10001</Type>
-    <SequenceNumber>1000</SequenceNumber>
-    <Assembly>Microsoft.Office.DocumentManagement, Version=14.0.0.0, Culture=neutral, PublicKeyToken=71e9bce111e9429c</Assembly>
-    <Class>Microsoft.Office.DocumentManagement.Internal.DocIdHandler</Class>
-    <Data/>
-    <Filter/>
-  </Receiver>
-  <Receiver>
-    <Name>Document ID Generator</Name>
-    <Synchronization>Synchronous</Synchronization>
-    <Type>10002</Type>
-    <SequenceNumber>1001</SequenceNumber>
-    <Assembly>Microsoft.Office.DocumentManagement, Version=14.0.0.0, Culture=neutral, PublicKeyToken=71e9bce111e9429c</Assembly>
-    <Class>Microsoft.Office.DocumentManagement.Internal.DocIdHandler</Class>
-    <Data/>
-    <Filter/>
-  </Receiver>
-  <Receiver>
-    <Name>Document ID Generator</Name>
-    <Synchronization>Synchronous</Synchronization>
-    <Type>10004</Type>
-    <SequenceNumber>1002</SequenceNumber>
-    <Assembly>Microsoft.Office.DocumentManagement, Version=14.0.0.0, Culture=neutral, PublicKeyToken=71e9bce111e9429c</Assembly>
-    <Class>Microsoft.Office.DocumentManagement.Internal.DocIdHandler</Class>
-    <Data/>
-    <Filter/>
-  </Receiver>
-  <Receiver>
-    <Name>Document ID Generator</Name>
-    <Synchronization>Synchronous</Synchronization>
-    <Type>10006</Type>
-    <SequenceNumber>1003</SequenceNumber>
-    <Assembly>Microsoft.Office.DocumentManagement, Version=14.0.0.0, Culture=neutral, PublicKeyToken=71e9bce111e9429c</Assembly>
-    <Class>Microsoft.Office.DocumentManagement.Internal.DocIdHandler</Class>
-    <Data/>
-    <Filter/>
-  </Receiver>
-</spe:Receivers>
-</file>
-
 <file path=customXml/item3.xml><?xml version="1.0" encoding="utf-8"?>
-<?mso-contentType ?>
-<FormTemplates xmlns="http://schemas.microsoft.com/sharepoint/v3/contenttype/forms">
-  <Display>DocumentLibraryForm</Display>
-  <Edit>DocumentLibraryForm</Edit>
-  <New>DocumentLibraryForm</New>
-</FormTemplates>
-</file>
-
-<file path=customXml/item4.xml><?xml version="1.0" encoding="utf-8"?>
 <p:properties xmlns:p="http://schemas.microsoft.com/office/2006/metadata/properties" xmlns:xsi="http://www.w3.org/2001/XMLSchema-instance" xmlns:pc="http://schemas.microsoft.com/office/infopath/2007/PartnerControls">
   <documentManagement>
     <_dlc_DocId xmlns="a9328eaf-6333-4034-a7ce-997665b5f80d">6AH7XJTKT27D-494-2</_dlc_DocId>
@@ -4602,7 +6750,24 @@
 </p:properties>
 </file>
 
+<file path=customXml/item4.xml><?xml version="1.0" encoding="utf-8"?>
+<?mso-contentType ?>
+<FormTemplates xmlns="http://schemas.microsoft.com/sharepoint/v3/contenttype/forms">
+  <Display>DocumentLibraryForm</Display>
+  <Edit>DocumentLibraryForm</Edit>
+  <New>DocumentLibraryForm</New>
+</FormTemplates>
+</file>
+
 <file path=customXml/itemProps1.xml><?xml version="1.0" encoding="utf-8"?>
+<ds:datastoreItem xmlns:ds="http://schemas.openxmlformats.org/officeDocument/2006/customXml" ds:itemID="{8CB52003-E8CD-4DF2-932F-2EC7EF4DD677}">
+  <ds:schemaRefs>
+    <ds:schemaRef ds:uri="http://schemas.microsoft.com/sharepoint/events"/>
+  </ds:schemaRefs>
+</ds:datastoreItem>
+</file>
+
+<file path=customXml/itemProps2.xml><?xml version="1.0" encoding="utf-8"?>
 <ds:datastoreItem xmlns:ds="http://schemas.openxmlformats.org/officeDocument/2006/customXml" ds:itemID="{EF7533AB-0193-4AEC-8EC4-E6A274EB1992}">
   <ds:schemaRefs>
     <ds:schemaRef ds:uri="http://schemas.microsoft.com/office/2006/metadata/contentType"/>
@@ -4620,34 +6785,26 @@
 </ds:datastoreItem>
 </file>
 
-<file path=customXml/itemProps2.xml><?xml version="1.0" encoding="utf-8"?>
-<ds:datastoreItem xmlns:ds="http://schemas.openxmlformats.org/officeDocument/2006/customXml" ds:itemID="{8CB52003-E8CD-4DF2-932F-2EC7EF4DD677}">
+<file path=customXml/itemProps3.xml><?xml version="1.0" encoding="utf-8"?>
+<ds:datastoreItem xmlns:ds="http://schemas.openxmlformats.org/officeDocument/2006/customXml" ds:itemID="{39B4CF60-C0DC-4692-912B-881AF8D8CFF5}">
   <ds:schemaRefs>
-    <ds:schemaRef ds:uri="http://schemas.microsoft.com/sharepoint/events"/>
+    <ds:schemaRef ds:uri="http://purl.org/dc/elements/1.1/"/>
+    <ds:schemaRef ds:uri="http://schemas.microsoft.com/office/2006/documentManagement/types"/>
+    <ds:schemaRef ds:uri="http://schemas.microsoft.com/office/infopath/2007/PartnerControls"/>
+    <ds:schemaRef ds:uri="http://schemas.openxmlformats.org/package/2006/metadata/core-properties"/>
+    <ds:schemaRef ds:uri="http://www.w3.org/XML/1998/namespace"/>
+    <ds:schemaRef ds:uri="http://purl.org/dc/dcmitype/"/>
+    <ds:schemaRef ds:uri="http://schemas.microsoft.com/office/2006/metadata/properties"/>
+    <ds:schemaRef ds:uri="a9328eaf-6333-4034-a7ce-997665b5f80d"/>
+    <ds:schemaRef ds:uri="http://purl.org/dc/terms/"/>
   </ds:schemaRefs>
 </ds:datastoreItem>
 </file>
 
-<file path=customXml/itemProps3.xml><?xml version="1.0" encoding="utf-8"?>
+<file path=customXml/itemProps4.xml><?xml version="1.0" encoding="utf-8"?>
 <ds:datastoreItem xmlns:ds="http://schemas.openxmlformats.org/officeDocument/2006/customXml" ds:itemID="{E9FEC3C6-DD16-422A-B8AE-8B104F632898}">
   <ds:schemaRefs>
     <ds:schemaRef ds:uri="http://schemas.microsoft.com/sharepoint/v3/contenttype/forms"/>
   </ds:schemaRefs>
 </ds:datastoreItem>
-</file>
-
-<file path=customXml/itemProps4.xml><?xml version="1.0" encoding="utf-8"?>
-<ds:datastoreItem xmlns:ds="http://schemas.openxmlformats.org/officeDocument/2006/customXml" ds:itemID="{39B4CF60-C0DC-4692-912B-881AF8D8CFF5}">
-  <ds:schemaRefs>
-    <ds:schemaRef ds:uri="http://www.w3.org/XML/1998/namespace"/>
-    <ds:schemaRef ds:uri="http://purl.org/dc/dcmitype/"/>
-    <ds:schemaRef ds:uri="http://schemas.openxmlformats.org/package/2006/metadata/core-properties"/>
-    <ds:schemaRef ds:uri="http://schemas.microsoft.com/office/2006/documentManagement/types"/>
-    <ds:schemaRef ds:uri="http://schemas.microsoft.com/office/2006/metadata/properties"/>
-    <ds:schemaRef ds:uri="http://purl.org/dc/elements/1.1/"/>
-    <ds:schemaRef ds:uri="http://schemas.microsoft.com/office/infopath/2007/PartnerControls"/>
-    <ds:schemaRef ds:uri="a9328eaf-6333-4034-a7ce-997665b5f80d"/>
-    <ds:schemaRef ds:uri="http://purl.org/dc/terms/"/>
-  </ds:schemaRefs>
-</ds:datastoreItem>
 </file>
</xml_diff>

<commit_message>
3/16/18  added new pages per Nisheet
</commit_message>
<xml_diff>
--- a/CurrentWork_Delta/CX_StrategyPowerPoint.pptx
+++ b/CurrentWork_Delta/CX_StrategyPowerPoint.pptx
@@ -5,7 +5,7 @@
     <p:sldMasterId id="2147483648" r:id="rId5"/>
   </p:sldMasterIdLst>
   <p:notesMasterIdLst>
-    <p:notesMasterId r:id="rId20"/>
+    <p:notesMasterId r:id="rId23"/>
   </p:notesMasterIdLst>
   <p:sldIdLst>
     <p:sldId id="256" r:id="rId6"/>
@@ -14,14 +14,17 @@
     <p:sldId id="263" r:id="rId9"/>
     <p:sldId id="283" r:id="rId10"/>
     <p:sldId id="271" r:id="rId11"/>
-    <p:sldId id="274" r:id="rId12"/>
-    <p:sldId id="275" r:id="rId13"/>
-    <p:sldId id="281" r:id="rId14"/>
-    <p:sldId id="282" r:id="rId15"/>
-    <p:sldId id="273" r:id="rId16"/>
-    <p:sldId id="279" r:id="rId17"/>
-    <p:sldId id="280" r:id="rId18"/>
-    <p:sldId id="284" r:id="rId19"/>
+    <p:sldId id="286" r:id="rId12"/>
+    <p:sldId id="274" r:id="rId13"/>
+    <p:sldId id="287" r:id="rId14"/>
+    <p:sldId id="285" r:id="rId15"/>
+    <p:sldId id="275" r:id="rId16"/>
+    <p:sldId id="281" r:id="rId17"/>
+    <p:sldId id="282" r:id="rId18"/>
+    <p:sldId id="273" r:id="rId19"/>
+    <p:sldId id="279" r:id="rId20"/>
+    <p:sldId id="280" r:id="rId21"/>
+    <p:sldId id="284" r:id="rId22"/>
   </p:sldIdLst>
   <p:sldSz cx="9144000" cy="6858000" type="screen4x3"/>
   <p:notesSz cx="7010400" cy="9296400"/>
@@ -221,7 +224,7 @@
           <a:p>
             <a:fld id="{7195FF61-7FDF-4F4D-A3AE-3078F9B9BE1D}" type="datetimeFigureOut">
               <a:rPr lang="en-US" smtClean="0"/>
-              <a:t>3/13/2018</a:t>
+              <a:t>3/16/2018</a:t>
             </a:fld>
             <a:endParaRPr lang="en-US"/>
           </a:p>
@@ -533,12 +536,6 @@
           <a:bodyPr/>
           <a:lstStyle/>
           <a:p>
-            <a:r>
-              <a:rPr lang="en-US" dirty="0" smtClean="0"/>
-              <a:t>Communication piece is hacked up</a:t>
-            </a:r>
-          </a:p>
-          <a:p>
             <a:endParaRPr lang="en-US" dirty="0"/>
           </a:p>
         </p:txBody>
@@ -570,6 +567,174 @@
     <p:extLst>
       <p:ext uri="{BB962C8B-B14F-4D97-AF65-F5344CB8AC3E}">
         <p14:creationId xmlns:p14="http://schemas.microsoft.com/office/powerpoint/2010/main" val="2043369958"/>
+      </p:ext>
+    </p:extLst>
+  </p:cSld>
+  <p:clrMapOvr>
+    <a:masterClrMapping/>
+  </p:clrMapOvr>
+</p:notes>
+</file>
+
+<file path=ppt/notesSlides/notesSlide2.xml><?xml version="1.0" encoding="utf-8"?>
+<p:notes xmlns:a="http://schemas.openxmlformats.org/drawingml/2006/main" xmlns:r="http://schemas.openxmlformats.org/officeDocument/2006/relationships" xmlns:p="http://schemas.openxmlformats.org/presentationml/2006/main">
+  <p:cSld>
+    <p:spTree>
+      <p:nvGrpSpPr>
+        <p:cNvPr id="1" name=""/>
+        <p:cNvGrpSpPr/>
+        <p:nvPr/>
+      </p:nvGrpSpPr>
+      <p:grpSpPr>
+        <a:xfrm>
+          <a:off x="0" y="0"/>
+          <a:ext cx="0" cy="0"/>
+          <a:chOff x="0" y="0"/>
+          <a:chExt cx="0" cy="0"/>
+        </a:xfrm>
+      </p:grpSpPr>
+      <p:sp>
+        <p:nvSpPr>
+          <p:cNvPr id="2" name="Slide Image Placeholder 1"/>
+          <p:cNvSpPr>
+            <a:spLocks noGrp="1" noRot="1" noChangeAspect="1"/>
+          </p:cNvSpPr>
+          <p:nvPr>
+            <p:ph type="sldImg"/>
+          </p:nvPr>
+        </p:nvSpPr>
+        <p:spPr/>
+      </p:sp>
+      <p:sp>
+        <p:nvSpPr>
+          <p:cNvPr id="3" name="Notes Placeholder 2"/>
+          <p:cNvSpPr>
+            <a:spLocks noGrp="1"/>
+          </p:cNvSpPr>
+          <p:nvPr>
+            <p:ph type="body" idx="1"/>
+          </p:nvPr>
+        </p:nvSpPr>
+        <p:spPr/>
+        <p:txBody>
+          <a:bodyPr/>
+          <a:lstStyle/>
+          <a:p>
+            <a:endParaRPr lang="en-US"/>
+          </a:p>
+        </p:txBody>
+      </p:sp>
+      <p:sp>
+        <p:nvSpPr>
+          <p:cNvPr id="4" name="Slide Number Placeholder 3"/>
+          <p:cNvSpPr>
+            <a:spLocks noGrp="1"/>
+          </p:cNvSpPr>
+          <p:nvPr>
+            <p:ph type="sldNum" sz="quarter" idx="10"/>
+          </p:nvPr>
+        </p:nvSpPr>
+        <p:spPr/>
+        <p:txBody>
+          <a:bodyPr/>
+          <a:lstStyle/>
+          <a:p>
+            <a:fld id="{F7BA8455-071F-4048-9007-26D1A9312D9F}" type="slidenum">
+              <a:rPr lang="en-US" smtClean="0"/>
+              <a:t>3</a:t>
+            </a:fld>
+            <a:endParaRPr lang="en-US"/>
+          </a:p>
+        </p:txBody>
+      </p:sp>
+    </p:spTree>
+    <p:extLst>
+      <p:ext uri="{BB962C8B-B14F-4D97-AF65-F5344CB8AC3E}">
+        <p14:creationId xmlns:p14="http://schemas.microsoft.com/office/powerpoint/2010/main" val="409054249"/>
+      </p:ext>
+    </p:extLst>
+  </p:cSld>
+  <p:clrMapOvr>
+    <a:masterClrMapping/>
+  </p:clrMapOvr>
+</p:notes>
+</file>
+
+<file path=ppt/notesSlides/notesSlide3.xml><?xml version="1.0" encoding="utf-8"?>
+<p:notes xmlns:a="http://schemas.openxmlformats.org/drawingml/2006/main" xmlns:r="http://schemas.openxmlformats.org/officeDocument/2006/relationships" xmlns:p="http://schemas.openxmlformats.org/presentationml/2006/main">
+  <p:cSld>
+    <p:spTree>
+      <p:nvGrpSpPr>
+        <p:cNvPr id="1" name=""/>
+        <p:cNvGrpSpPr/>
+        <p:nvPr/>
+      </p:nvGrpSpPr>
+      <p:grpSpPr>
+        <a:xfrm>
+          <a:off x="0" y="0"/>
+          <a:ext cx="0" cy="0"/>
+          <a:chOff x="0" y="0"/>
+          <a:chExt cx="0" cy="0"/>
+        </a:xfrm>
+      </p:grpSpPr>
+      <p:sp>
+        <p:nvSpPr>
+          <p:cNvPr id="2" name="Slide Image Placeholder 1"/>
+          <p:cNvSpPr>
+            <a:spLocks noGrp="1" noRot="1" noChangeAspect="1"/>
+          </p:cNvSpPr>
+          <p:nvPr>
+            <p:ph type="sldImg"/>
+          </p:nvPr>
+        </p:nvSpPr>
+        <p:spPr/>
+      </p:sp>
+      <p:sp>
+        <p:nvSpPr>
+          <p:cNvPr id="3" name="Notes Placeholder 2"/>
+          <p:cNvSpPr>
+            <a:spLocks noGrp="1"/>
+          </p:cNvSpPr>
+          <p:nvPr>
+            <p:ph type="body" idx="1"/>
+          </p:nvPr>
+        </p:nvSpPr>
+        <p:spPr/>
+        <p:txBody>
+          <a:bodyPr/>
+          <a:lstStyle/>
+          <a:p>
+            <a:endParaRPr lang="en-US"/>
+          </a:p>
+        </p:txBody>
+      </p:sp>
+      <p:sp>
+        <p:nvSpPr>
+          <p:cNvPr id="4" name="Slide Number Placeholder 3"/>
+          <p:cNvSpPr>
+            <a:spLocks noGrp="1"/>
+          </p:cNvSpPr>
+          <p:nvPr>
+            <p:ph type="sldNum" sz="quarter" idx="10"/>
+          </p:nvPr>
+        </p:nvSpPr>
+        <p:spPr/>
+        <p:txBody>
+          <a:bodyPr/>
+          <a:lstStyle/>
+          <a:p>
+            <a:fld id="{F7BA8455-071F-4048-9007-26D1A9312D9F}" type="slidenum">
+              <a:rPr lang="en-US" smtClean="0"/>
+              <a:t>4</a:t>
+            </a:fld>
+            <a:endParaRPr lang="en-US"/>
+          </a:p>
+        </p:txBody>
+      </p:sp>
+    </p:spTree>
+    <p:extLst>
+      <p:ext uri="{BB962C8B-B14F-4D97-AF65-F5344CB8AC3E}">
+        <p14:creationId xmlns:p14="http://schemas.microsoft.com/office/powerpoint/2010/main" val="2581290742"/>
       </p:ext>
     </p:extLst>
   </p:cSld>
@@ -2103,19 +2268,16 @@
             <a:pPr algn="ctr"/>
             <a:r>
               <a:rPr lang="en-US" sz="2800" dirty="0" smtClean="0"/>
-              <a:t>How </a:t>
-            </a:r>
+              <a:t>How its built</a:t>
+            </a:r>
+          </a:p>
+          <a:p>
+            <a:pPr algn="ctr"/>
             <a:r>
               <a:rPr lang="en-US" sz="2800" dirty="0" smtClean="0"/>
-              <a:t>its built</a:t>
-            </a:r>
-          </a:p>
-          <a:p>
-            <a:pPr algn="ctr"/>
-            <a:r>
-              <a:rPr lang="en-US" sz="2800" dirty="0" smtClean="0"/>
-              <a:t>Execution</a:t>
-            </a:r>
+              <a:t>Test Execution</a:t>
+            </a:r>
+            <a:endParaRPr lang="en-US" sz="2800" dirty="0" smtClean="0"/>
           </a:p>
           <a:p>
             <a:pPr algn="ctr"/>
@@ -2183,6 +2345,697 @@
         </p:nvSpPr>
         <p:spPr>
           <a:xfrm>
+            <a:off x="1526513" y="124691"/>
+            <a:ext cx="5240047" cy="1325563"/>
+          </a:xfrm>
+        </p:spPr>
+        <p:txBody>
+          <a:bodyPr anchor="t">
+            <a:normAutofit/>
+          </a:bodyPr>
+          <a:lstStyle/>
+          <a:p>
+            <a:pPr algn="ctr"/>
+            <a:r>
+              <a:rPr lang="en-US" dirty="0" smtClean="0"/>
+              <a:t>TESTING TYPES</a:t>
+            </a:r>
+            <a:r>
+              <a:rPr lang="en-US" dirty="0" smtClean="0"/>
+              <a:t>  </a:t>
+            </a:r>
+            <a:endParaRPr lang="en-US" dirty="0">
+              <a:solidFill>
+                <a:schemeClr val="bg1">
+                  <a:lumMod val="85000"/>
+                </a:schemeClr>
+              </a:solidFill>
+            </a:endParaRPr>
+          </a:p>
+        </p:txBody>
+      </p:sp>
+      <p:sp>
+        <p:nvSpPr>
+          <p:cNvPr id="3" name="Content Placeholder 2"/>
+          <p:cNvSpPr>
+            <a:spLocks noGrp="1"/>
+          </p:cNvSpPr>
+          <p:nvPr>
+            <p:ph idx="1"/>
+          </p:nvPr>
+        </p:nvSpPr>
+        <p:spPr>
+          <a:xfrm>
+            <a:off x="437704" y="1837658"/>
+            <a:ext cx="8567504" cy="5001488"/>
+          </a:xfrm>
+        </p:spPr>
+        <p:txBody>
+          <a:bodyPr>
+            <a:normAutofit/>
+          </a:bodyPr>
+          <a:lstStyle/>
+          <a:p>
+            <a:pPr>
+              <a:lnSpc>
+                <a:spcPct val="110000"/>
+              </a:lnSpc>
+            </a:pPr>
+            <a:r>
+              <a:rPr lang="en-US" sz="2000" b="1" dirty="0" smtClean="0"/>
+              <a:t>Three primary types of testing</a:t>
+            </a:r>
+            <a:endParaRPr lang="en-US" sz="2000" b="1" dirty="0" smtClean="0"/>
+          </a:p>
+          <a:p>
+            <a:pPr lvl="1">
+              <a:lnSpc>
+                <a:spcPct val="110000"/>
+              </a:lnSpc>
+              <a:buFont typeface="Arial" panose="020B0604020202020204" pitchFamily="34" charset="0"/>
+              <a:buChar char="•"/>
+            </a:pPr>
+            <a:r>
+              <a:rPr lang="en-US" sz="1800" b="1" dirty="0" smtClean="0"/>
+              <a:t>Page level Functional Integration </a:t>
+            </a:r>
+          </a:p>
+          <a:p>
+            <a:pPr lvl="2">
+              <a:lnSpc>
+                <a:spcPct val="110000"/>
+              </a:lnSpc>
+              <a:buFont typeface="Arial" panose="020B0604020202020204" pitchFamily="34" charset="0"/>
+              <a:buChar char="•"/>
+            </a:pPr>
+            <a:r>
+              <a:rPr lang="en-US" sz="1400" b="1" dirty="0" smtClean="0"/>
+              <a:t>Complete </a:t>
+            </a:r>
+            <a:r>
+              <a:rPr lang="en-US" sz="1400" b="1" dirty="0" smtClean="0"/>
+              <a:t>page element analysis</a:t>
+            </a:r>
+            <a:r>
+              <a:rPr lang="en-US" sz="1400" b="1" dirty="0"/>
+              <a:t> </a:t>
+            </a:r>
+            <a:r>
+              <a:rPr lang="en-US" sz="1400" b="1" dirty="0" smtClean="0"/>
+              <a:t>across all pages in application</a:t>
+            </a:r>
+          </a:p>
+          <a:p>
+            <a:pPr lvl="2">
+              <a:lnSpc>
+                <a:spcPct val="110000"/>
+              </a:lnSpc>
+              <a:buFont typeface="Arial" panose="020B0604020202020204" pitchFamily="34" charset="0"/>
+              <a:buChar char="•"/>
+            </a:pPr>
+            <a:r>
+              <a:rPr lang="en-US" sz="1400" b="1" dirty="0" smtClean="0"/>
+              <a:t>Every Button, Field, </a:t>
+            </a:r>
+            <a:r>
+              <a:rPr lang="en-US" sz="1400" b="1" dirty="0" err="1" smtClean="0"/>
+              <a:t>CheckBox</a:t>
+            </a:r>
+            <a:r>
+              <a:rPr lang="en-US" sz="1400" b="1" dirty="0" smtClean="0"/>
+              <a:t>, Link, etc.  </a:t>
+            </a:r>
+            <a:r>
+              <a:rPr lang="en-US" sz="1400" b="1" dirty="0" smtClean="0"/>
+              <a:t>Functionally evaluated and error checked</a:t>
+            </a:r>
+            <a:endParaRPr lang="en-US" sz="1400" b="1" dirty="0" smtClean="0"/>
+          </a:p>
+          <a:p>
+            <a:pPr lvl="1">
+              <a:lnSpc>
+                <a:spcPct val="110000"/>
+              </a:lnSpc>
+              <a:buFont typeface="Arial" panose="020B0604020202020204" pitchFamily="34" charset="0"/>
+              <a:buChar char="•"/>
+            </a:pPr>
+            <a:r>
+              <a:rPr lang="en-US" sz="1800" b="1" dirty="0" smtClean="0"/>
+              <a:t>Application level work flow : End to End</a:t>
+            </a:r>
+          </a:p>
+          <a:p>
+            <a:pPr lvl="2">
+              <a:lnSpc>
+                <a:spcPct val="110000"/>
+              </a:lnSpc>
+              <a:buFont typeface="Arial" panose="020B0604020202020204" pitchFamily="34" charset="0"/>
+              <a:buChar char="•"/>
+            </a:pPr>
+            <a:r>
+              <a:rPr lang="en-US" sz="1400" b="1" dirty="0" smtClean="0"/>
+              <a:t>Designated user work flow execution pathways</a:t>
+            </a:r>
+          </a:p>
+          <a:p>
+            <a:pPr lvl="2">
+              <a:lnSpc>
+                <a:spcPct val="110000"/>
+              </a:lnSpc>
+              <a:buFont typeface="Arial" panose="020B0604020202020204" pitchFamily="34" charset="0"/>
+              <a:buChar char="•"/>
+            </a:pPr>
+            <a:r>
+              <a:rPr lang="en-US" sz="1400" b="1" dirty="0" smtClean="0"/>
+              <a:t>Data driven</a:t>
+            </a:r>
+            <a:endParaRPr lang="en-US" sz="1400" b="1" dirty="0" smtClean="0"/>
+          </a:p>
+          <a:p>
+            <a:pPr lvl="1">
+              <a:lnSpc>
+                <a:spcPct val="110000"/>
+              </a:lnSpc>
+              <a:buFont typeface="Arial" panose="020B0604020202020204" pitchFamily="34" charset="0"/>
+              <a:buChar char="•"/>
+            </a:pPr>
+            <a:r>
+              <a:rPr lang="en-US" sz="1800" b="1" dirty="0" smtClean="0"/>
+              <a:t>Micro Service REST APIs</a:t>
+            </a:r>
+          </a:p>
+          <a:p>
+            <a:pPr lvl="2">
+              <a:lnSpc>
+                <a:spcPct val="110000"/>
+              </a:lnSpc>
+              <a:buFont typeface="Arial" panose="020B0604020202020204" pitchFamily="34" charset="0"/>
+              <a:buChar char="•"/>
+            </a:pPr>
+            <a:r>
+              <a:rPr lang="en-US" sz="1400" b="1" dirty="0" smtClean="0"/>
+              <a:t>Regression coverage for Micro service REST API Data type &amp; Data range</a:t>
+            </a:r>
+          </a:p>
+          <a:p>
+            <a:pPr lvl="2">
+              <a:lnSpc>
+                <a:spcPct val="110000"/>
+              </a:lnSpc>
+              <a:buFont typeface="Arial" panose="020B0604020202020204" pitchFamily="34" charset="0"/>
+              <a:buChar char="•"/>
+            </a:pPr>
+            <a:r>
+              <a:rPr lang="en-US" sz="1400" b="1" dirty="0" smtClean="0"/>
+              <a:t>Functional test use to supply data driven testing in CX Applications</a:t>
+            </a:r>
+            <a:endParaRPr lang="en-US" sz="1400" b="1" dirty="0"/>
+          </a:p>
+          <a:p>
+            <a:pPr marL="457206" lvl="1" indent="0">
+              <a:lnSpc>
+                <a:spcPct val="110000"/>
+              </a:lnSpc>
+              <a:buNone/>
+            </a:pPr>
+            <a:r>
+              <a:rPr lang="en-US" sz="1600" b="1" dirty="0" smtClean="0"/>
+              <a:t>                  </a:t>
+            </a:r>
+            <a:endParaRPr lang="en-US" sz="1600" b="1" dirty="0" smtClean="0"/>
+          </a:p>
+          <a:p>
+            <a:pPr marL="457206" lvl="1" indent="0">
+              <a:lnSpc>
+                <a:spcPct val="110000"/>
+              </a:lnSpc>
+              <a:buNone/>
+            </a:pPr>
+            <a:endParaRPr lang="en-US" sz="1400" b="1" dirty="0"/>
+          </a:p>
+        </p:txBody>
+      </p:sp>
+    </p:spTree>
+    <p:extLst>
+      <p:ext uri="{BB962C8B-B14F-4D97-AF65-F5344CB8AC3E}">
+        <p14:creationId xmlns:p14="http://schemas.microsoft.com/office/powerpoint/2010/main" val="1171498342"/>
+      </p:ext>
+    </p:extLst>
+  </p:cSld>
+  <p:clrMapOvr>
+    <a:masterClrMapping/>
+  </p:clrMapOvr>
+  <p:timing>
+    <p:tnLst>
+      <p:par>
+        <p:cTn id="1" dur="indefinite" restart="never" nodeType="tmRoot"/>
+      </p:par>
+    </p:tnLst>
+  </p:timing>
+</p:sld>
+</file>
+
+<file path=ppt/slides/slide11.xml><?xml version="1.0" encoding="utf-8"?>
+<p:sld xmlns:a="http://schemas.openxmlformats.org/drawingml/2006/main" xmlns:r="http://schemas.openxmlformats.org/officeDocument/2006/relationships" xmlns:p="http://schemas.openxmlformats.org/presentationml/2006/main">
+  <p:cSld>
+    <p:spTree>
+      <p:nvGrpSpPr>
+        <p:cNvPr id="1" name=""/>
+        <p:cNvGrpSpPr/>
+        <p:nvPr/>
+      </p:nvGrpSpPr>
+      <p:grpSpPr>
+        <a:xfrm>
+          <a:off x="0" y="0"/>
+          <a:ext cx="0" cy="0"/>
+          <a:chOff x="0" y="0"/>
+          <a:chExt cx="0" cy="0"/>
+        </a:xfrm>
+      </p:grpSpPr>
+      <p:sp>
+        <p:nvSpPr>
+          <p:cNvPr id="2" name="Title 1"/>
+          <p:cNvSpPr>
+            <a:spLocks noGrp="1"/>
+          </p:cNvSpPr>
+          <p:nvPr>
+            <p:ph type="title"/>
+          </p:nvPr>
+        </p:nvSpPr>
+        <p:spPr>
+          <a:xfrm>
+            <a:off x="1641767" y="129597"/>
+            <a:ext cx="5101934" cy="1325563"/>
+          </a:xfrm>
+        </p:spPr>
+        <p:txBody>
+          <a:bodyPr anchor="t"/>
+          <a:lstStyle/>
+          <a:p>
+            <a:pPr algn="ctr"/>
+            <a:r>
+              <a:rPr lang="en-US" dirty="0" smtClean="0"/>
+              <a:t>REPORTING</a:t>
+            </a:r>
+            <a:endParaRPr lang="en-US" dirty="0"/>
+          </a:p>
+        </p:txBody>
+      </p:sp>
+      <p:sp>
+        <p:nvSpPr>
+          <p:cNvPr id="3" name="Content Placeholder 2"/>
+          <p:cNvSpPr>
+            <a:spLocks noGrp="1"/>
+          </p:cNvSpPr>
+          <p:nvPr>
+            <p:ph idx="1"/>
+          </p:nvPr>
+        </p:nvSpPr>
+        <p:spPr>
+          <a:xfrm>
+            <a:off x="432843" y="914091"/>
+            <a:ext cx="3849789" cy="2804461"/>
+          </a:xfrm>
+        </p:spPr>
+        <p:txBody>
+          <a:bodyPr>
+            <a:normAutofit/>
+          </a:bodyPr>
+          <a:lstStyle/>
+          <a:p>
+            <a:r>
+              <a:rPr lang="en-US" u="sng" dirty="0" smtClean="0"/>
+              <a:t>Three levels </a:t>
+            </a:r>
+            <a:r>
+              <a:rPr lang="en-US" u="sng" dirty="0"/>
+              <a:t>of </a:t>
+            </a:r>
+            <a:r>
+              <a:rPr lang="en-US" u="sng" dirty="0" smtClean="0"/>
+              <a:t>reporting</a:t>
+            </a:r>
+          </a:p>
+          <a:p>
+            <a:pPr>
+              <a:spcBef>
+                <a:spcPts val="0"/>
+              </a:spcBef>
+            </a:pPr>
+            <a:r>
+              <a:rPr lang="en-US" sz="400" dirty="0" smtClean="0"/>
+              <a:t>    </a:t>
+            </a:r>
+            <a:endParaRPr lang="en-US" sz="400" dirty="0"/>
+          </a:p>
+          <a:p>
+            <a:r>
+              <a:rPr lang="en-US" b="1" dirty="0" smtClean="0"/>
+              <a:t>Hyper granular</a:t>
+            </a:r>
+            <a:r>
+              <a:rPr lang="en-US" dirty="0" smtClean="0"/>
+              <a:t>:  </a:t>
+            </a:r>
+          </a:p>
+          <a:p>
+            <a:pPr marL="342900" indent="-342900">
+              <a:buFont typeface="Arial" panose="020B0604020202020204" pitchFamily="34" charset="0"/>
+              <a:buChar char="•"/>
+            </a:pPr>
+            <a:r>
+              <a:rPr lang="en-US" dirty="0" smtClean="0"/>
+              <a:t>Primary for debugging.</a:t>
+            </a:r>
+          </a:p>
+          <a:p>
+            <a:pPr marL="342900" indent="-342900">
+              <a:buFont typeface="Arial" panose="020B0604020202020204" pitchFamily="34" charset="0"/>
+              <a:buChar char="•"/>
+            </a:pPr>
+            <a:r>
+              <a:rPr lang="en-US" dirty="0" smtClean="0"/>
+              <a:t>Covers every Assert or comparison in Framework</a:t>
+            </a:r>
+          </a:p>
+          <a:p>
+            <a:pPr lvl="1">
+              <a:buFont typeface="Arial" panose="020B0604020202020204" pitchFamily="34" charset="0"/>
+              <a:buChar char="•"/>
+            </a:pPr>
+            <a:r>
+              <a:rPr lang="en-US" dirty="0" smtClean="0"/>
+              <a:t>Debugging and Framework Development tool</a:t>
+            </a:r>
+          </a:p>
+        </p:txBody>
+      </p:sp>
+      <p:pic>
+        <p:nvPicPr>
+          <p:cNvPr id="4" name="Picture 3"/>
+          <p:cNvPicPr>
+            <a:picLocks noChangeAspect="1"/>
+          </p:cNvPicPr>
+          <p:nvPr/>
+        </p:nvPicPr>
+        <p:blipFill>
+          <a:blip r:embed="rId2">
+            <a:extLst>
+              <a:ext uri="{28A0092B-C50C-407E-A947-70E740481C1C}">
+                <a14:useLocalDpi xmlns:a14="http://schemas.microsoft.com/office/drawing/2010/main" val="0"/>
+              </a:ext>
+            </a:extLst>
+          </a:blip>
+          <a:stretch>
+            <a:fillRect/>
+          </a:stretch>
+        </p:blipFill>
+        <p:spPr>
+          <a:xfrm>
+            <a:off x="4484914" y="942849"/>
+            <a:ext cx="4620610" cy="5744818"/>
+          </a:xfrm>
+          <a:prstGeom prst="rect">
+            <a:avLst/>
+          </a:prstGeom>
+        </p:spPr>
+      </p:pic>
+      <p:pic>
+        <p:nvPicPr>
+          <p:cNvPr id="5" name="Picture 4"/>
+          <p:cNvPicPr>
+            <a:picLocks noChangeAspect="1"/>
+          </p:cNvPicPr>
+          <p:nvPr/>
+        </p:nvPicPr>
+        <p:blipFill>
+          <a:blip r:embed="rId3">
+            <a:extLst>
+              <a:ext uri="{28A0092B-C50C-407E-A947-70E740481C1C}">
+                <a14:useLocalDpi xmlns:a14="http://schemas.microsoft.com/office/drawing/2010/main" val="0"/>
+              </a:ext>
+            </a:extLst>
+          </a:blip>
+          <a:stretch>
+            <a:fillRect/>
+          </a:stretch>
+        </p:blipFill>
+        <p:spPr>
+          <a:xfrm>
+            <a:off x="330483" y="4023360"/>
+            <a:ext cx="4285060" cy="2807063"/>
+          </a:xfrm>
+          <a:prstGeom prst="rect">
+            <a:avLst/>
+          </a:prstGeom>
+        </p:spPr>
+      </p:pic>
+    </p:spTree>
+    <p:extLst>
+      <p:ext uri="{BB962C8B-B14F-4D97-AF65-F5344CB8AC3E}">
+        <p14:creationId xmlns:p14="http://schemas.microsoft.com/office/powerpoint/2010/main" val="21198343"/>
+      </p:ext>
+    </p:extLst>
+  </p:cSld>
+  <p:clrMapOvr>
+    <a:masterClrMapping/>
+  </p:clrMapOvr>
+  <p:timing>
+    <p:tnLst>
+      <p:par>
+        <p:cTn id="1" dur="indefinite" restart="never" nodeType="tmRoot"/>
+      </p:par>
+    </p:tnLst>
+  </p:timing>
+</p:sld>
+</file>
+
+<file path=ppt/slides/slide12.xml><?xml version="1.0" encoding="utf-8"?>
+<p:sld xmlns:a="http://schemas.openxmlformats.org/drawingml/2006/main" xmlns:r="http://schemas.openxmlformats.org/officeDocument/2006/relationships" xmlns:p="http://schemas.openxmlformats.org/presentationml/2006/main">
+  <p:cSld>
+    <p:spTree>
+      <p:nvGrpSpPr>
+        <p:cNvPr id="1" name=""/>
+        <p:cNvGrpSpPr/>
+        <p:nvPr/>
+      </p:nvGrpSpPr>
+      <p:grpSpPr>
+        <a:xfrm>
+          <a:off x="0" y="0"/>
+          <a:ext cx="0" cy="0"/>
+          <a:chOff x="0" y="0"/>
+          <a:chExt cx="0" cy="0"/>
+        </a:xfrm>
+      </p:grpSpPr>
+      <p:sp>
+        <p:nvSpPr>
+          <p:cNvPr id="2" name="Title 1"/>
+          <p:cNvSpPr>
+            <a:spLocks noGrp="1"/>
+          </p:cNvSpPr>
+          <p:nvPr>
+            <p:ph type="title"/>
+          </p:nvPr>
+        </p:nvSpPr>
+        <p:spPr>
+          <a:xfrm>
+            <a:off x="1641767" y="129597"/>
+            <a:ext cx="5101934" cy="1325563"/>
+          </a:xfrm>
+        </p:spPr>
+        <p:txBody>
+          <a:bodyPr anchor="t"/>
+          <a:lstStyle/>
+          <a:p>
+            <a:pPr algn="ctr"/>
+            <a:r>
+              <a:rPr lang="en-US" dirty="0" smtClean="0"/>
+              <a:t>REPORTING</a:t>
+            </a:r>
+            <a:endParaRPr lang="en-US" dirty="0"/>
+          </a:p>
+        </p:txBody>
+      </p:sp>
+      <p:sp>
+        <p:nvSpPr>
+          <p:cNvPr id="3" name="Content Placeholder 2"/>
+          <p:cNvSpPr>
+            <a:spLocks noGrp="1"/>
+          </p:cNvSpPr>
+          <p:nvPr>
+            <p:ph idx="1"/>
+          </p:nvPr>
+        </p:nvSpPr>
+        <p:spPr>
+          <a:xfrm>
+            <a:off x="432843" y="914087"/>
+            <a:ext cx="4860517" cy="2337113"/>
+          </a:xfrm>
+        </p:spPr>
+        <p:txBody>
+          <a:bodyPr/>
+          <a:lstStyle/>
+          <a:p>
+            <a:r>
+              <a:rPr lang="en-US" u="sng" dirty="0"/>
+              <a:t>Three levels of </a:t>
+            </a:r>
+            <a:r>
+              <a:rPr lang="en-US" u="sng" dirty="0" smtClean="0"/>
+              <a:t>reporting</a:t>
+            </a:r>
+          </a:p>
+          <a:p>
+            <a:pPr>
+              <a:spcBef>
+                <a:spcPts val="0"/>
+              </a:spcBef>
+            </a:pPr>
+            <a:r>
+              <a:rPr lang="en-US" sz="800" dirty="0"/>
+              <a:t> </a:t>
+            </a:r>
+            <a:endParaRPr lang="en-US" u="sng" dirty="0"/>
+          </a:p>
+          <a:p>
+            <a:pPr indent="-234950"/>
+            <a:r>
+              <a:rPr lang="en-US" b="1" dirty="0" smtClean="0"/>
+              <a:t>Test Run Specific</a:t>
+            </a:r>
+            <a:r>
+              <a:rPr lang="en-US" dirty="0" smtClean="0"/>
+              <a:t>:  </a:t>
+            </a:r>
+          </a:p>
+          <a:p>
+            <a:pPr indent="-234950"/>
+            <a:r>
+              <a:rPr lang="en-US" dirty="0" smtClean="0"/>
+              <a:t>Test Function Pass / Fail </a:t>
+            </a:r>
+          </a:p>
+          <a:p>
+            <a:pPr marL="684213" lvl="1" indent="-342900">
+              <a:buFont typeface="Arial" panose="020B0604020202020204" pitchFamily="34" charset="0"/>
+              <a:buChar char="•"/>
+            </a:pPr>
+            <a:r>
+              <a:rPr lang="en-US" dirty="0" smtClean="0"/>
+              <a:t>Current Standard test run encompassing test specific data and testRun specifics</a:t>
+            </a:r>
+          </a:p>
+        </p:txBody>
+      </p:sp>
+      <p:pic>
+        <p:nvPicPr>
+          <p:cNvPr id="5" name="Picture 4"/>
+          <p:cNvPicPr>
+            <a:picLocks noChangeAspect="1"/>
+          </p:cNvPicPr>
+          <p:nvPr/>
+        </p:nvPicPr>
+        <p:blipFill>
+          <a:blip r:embed="rId2">
+            <a:extLst>
+              <a:ext uri="{28A0092B-C50C-407E-A947-70E740481C1C}">
+                <a14:useLocalDpi xmlns:a14="http://schemas.microsoft.com/office/drawing/2010/main" val="0"/>
+              </a:ext>
+            </a:extLst>
+          </a:blip>
+          <a:stretch>
+            <a:fillRect/>
+          </a:stretch>
+        </p:blipFill>
+        <p:spPr>
+          <a:xfrm>
+            <a:off x="5428527" y="832327"/>
+            <a:ext cx="3599233" cy="6025673"/>
+          </a:xfrm>
+          <a:prstGeom prst="rect">
+            <a:avLst/>
+          </a:prstGeom>
+        </p:spPr>
+      </p:pic>
+      <p:pic>
+        <p:nvPicPr>
+          <p:cNvPr id="6" name="Picture 5"/>
+          <p:cNvPicPr>
+            <a:picLocks noChangeAspect="1"/>
+          </p:cNvPicPr>
+          <p:nvPr/>
+        </p:nvPicPr>
+        <p:blipFill>
+          <a:blip r:embed="rId3">
+            <a:extLst>
+              <a:ext uri="{28A0092B-C50C-407E-A947-70E740481C1C}">
+                <a14:useLocalDpi xmlns:a14="http://schemas.microsoft.com/office/drawing/2010/main" val="0"/>
+              </a:ext>
+            </a:extLst>
+          </a:blip>
+          <a:stretch>
+            <a:fillRect/>
+          </a:stretch>
+        </p:blipFill>
+        <p:spPr>
+          <a:xfrm>
+            <a:off x="321831" y="3429000"/>
+            <a:ext cx="5082540" cy="2811780"/>
+          </a:xfrm>
+          <a:prstGeom prst="rect">
+            <a:avLst/>
+          </a:prstGeom>
+        </p:spPr>
+      </p:pic>
+    </p:spTree>
+    <p:extLst>
+      <p:ext uri="{BB962C8B-B14F-4D97-AF65-F5344CB8AC3E}">
+        <p14:creationId xmlns:p14="http://schemas.microsoft.com/office/powerpoint/2010/main" val="3243345129"/>
+      </p:ext>
+    </p:extLst>
+  </p:cSld>
+  <p:clrMapOvr>
+    <a:masterClrMapping/>
+  </p:clrMapOvr>
+  <p:timing>
+    <p:tnLst>
+      <p:par>
+        <p:cTn id="1" dur="indefinite" restart="never" nodeType="tmRoot"/>
+      </p:par>
+    </p:tnLst>
+  </p:timing>
+</p:sld>
+</file>
+
+<file path=ppt/slides/slide13.xml><?xml version="1.0" encoding="utf-8"?>
+<p:sld xmlns:a="http://schemas.openxmlformats.org/drawingml/2006/main" xmlns:r="http://schemas.openxmlformats.org/officeDocument/2006/relationships" xmlns:p="http://schemas.openxmlformats.org/presentationml/2006/main">
+  <p:cSld>
+    <p:spTree>
+      <p:nvGrpSpPr>
+        <p:cNvPr id="1" name=""/>
+        <p:cNvGrpSpPr/>
+        <p:nvPr/>
+      </p:nvGrpSpPr>
+      <p:grpSpPr>
+        <a:xfrm>
+          <a:off x="0" y="0"/>
+          <a:ext cx="0" cy="0"/>
+          <a:chOff x="0" y="0"/>
+          <a:chExt cx="0" cy="0"/>
+        </a:xfrm>
+      </p:grpSpPr>
+      <p:sp>
+        <p:nvSpPr>
+          <p:cNvPr id="2" name="Title 1"/>
+          <p:cNvSpPr>
+            <a:spLocks noGrp="1"/>
+          </p:cNvSpPr>
+          <p:nvPr>
+            <p:ph type="title"/>
+          </p:nvPr>
+        </p:nvSpPr>
+        <p:spPr>
+          <a:xfrm>
             <a:off x="1641767" y="129597"/>
             <a:ext cx="5101934" cy="1325563"/>
           </a:xfrm>
@@ -2267,11 +3120,7 @@
             </a:r>
             <a:r>
               <a:rPr lang="en-US" sz="1800" b="1" dirty="0" smtClean="0"/>
-              <a:t>Go / No-go Product  </a:t>
-            </a:r>
-            <a:r>
-              <a:rPr lang="en-US" sz="1800" b="1" dirty="0" smtClean="0"/>
-              <a:t>Dashboard</a:t>
+              <a:t>Go / No-go Product  Dashboard</a:t>
             </a:r>
           </a:p>
           <a:p>
@@ -2279,7 +3128,6 @@
               <a:rPr lang="en-US" sz="1800" b="1" dirty="0" smtClean="0"/>
               <a:t>Direction I think we really need to go !</a:t>
             </a:r>
-            <a:endParaRPr lang="en-US" sz="1800" b="1" dirty="0" smtClean="0"/>
           </a:p>
           <a:p>
             <a:r>
@@ -2393,7 +3241,7 @@
 </p:sld>
 </file>
 
-<file path=ppt/slides/slide11.xml><?xml version="1.0" encoding="utf-8"?>
+<file path=ppt/slides/slide14.xml><?xml version="1.0" encoding="utf-8"?>
 <p:sld xmlns:a="http://schemas.openxmlformats.org/drawingml/2006/main" xmlns:r="http://schemas.openxmlformats.org/officeDocument/2006/relationships" xmlns:p="http://schemas.openxmlformats.org/presentationml/2006/main">
   <p:cSld>
     <p:spTree>
@@ -2991,7 +3839,7 @@
 </p:sld>
 </file>
 
-<file path=ppt/slides/slide12.xml><?xml version="1.0" encoding="utf-8"?>
+<file path=ppt/slides/slide15.xml><?xml version="1.0" encoding="utf-8"?>
 <p:sld xmlns:a="http://schemas.openxmlformats.org/drawingml/2006/main" xmlns:r="http://schemas.openxmlformats.org/officeDocument/2006/relationships" xmlns:p="http://schemas.openxmlformats.org/presentationml/2006/main">
   <p:cSld>
     <p:spTree>
@@ -3126,11 +3974,7 @@
             </a:pPr>
             <a:r>
               <a:rPr lang="en-US" sz="2000" dirty="0" smtClean="0"/>
-              <a:t>Mobile </a:t>
-            </a:r>
-            <a:r>
-              <a:rPr lang="en-US" sz="2000" dirty="0" smtClean="0"/>
-              <a:t>devices</a:t>
+              <a:t>Mobile devices</a:t>
             </a:r>
           </a:p>
           <a:p>
@@ -3167,7 +4011,7 @@
 </p:sld>
 </file>
 
-<file path=ppt/slides/slide13.xml><?xml version="1.0" encoding="utf-8"?>
+<file path=ppt/slides/slide16.xml><?xml version="1.0" encoding="utf-8"?>
 <p:sld xmlns:a="http://schemas.openxmlformats.org/drawingml/2006/main" xmlns:r="http://schemas.openxmlformats.org/officeDocument/2006/relationships" xmlns:p="http://schemas.openxmlformats.org/presentationml/2006/main">
   <p:cSld>
     <p:spTree>
@@ -3380,7 +4224,7 @@
 </p:sld>
 </file>
 
-<file path=ppt/slides/slide14.xml><?xml version="1.0" encoding="utf-8"?>
+<file path=ppt/slides/slide17.xml><?xml version="1.0" encoding="utf-8"?>
 <p:sld xmlns:a="http://schemas.openxmlformats.org/drawingml/2006/main" xmlns:r="http://schemas.openxmlformats.org/officeDocument/2006/relationships" xmlns:p="http://schemas.openxmlformats.org/presentationml/2006/main">
   <p:cSld>
     <p:spTree>
@@ -5009,7 +5853,7 @@
         </p:nvSpPr>
         <p:spPr>
           <a:xfrm>
-            <a:off x="278173" y="1622560"/>
+            <a:off x="278173" y="1190760"/>
             <a:ext cx="8657483" cy="4762500"/>
           </a:xfrm>
         </p:spPr>
@@ -5204,7 +6048,7 @@
         </p:nvSpPr>
         <p:spPr>
           <a:xfrm>
-            <a:off x="278173" y="1266682"/>
+            <a:off x="367073" y="815966"/>
             <a:ext cx="1414170" cy="369332"/>
           </a:xfrm>
           <a:prstGeom prst="rect">
@@ -5323,13 +6167,13 @@
         </p:nvSpPr>
         <p:spPr>
           <a:xfrm>
-            <a:off x="278295" y="1192693"/>
-            <a:ext cx="8865705" cy="2403353"/>
+            <a:off x="278295" y="1078394"/>
+            <a:ext cx="8865705" cy="2038879"/>
           </a:xfrm>
         </p:spPr>
         <p:txBody>
           <a:bodyPr>
-            <a:normAutofit/>
+            <a:normAutofit lnSpcReduction="10000"/>
           </a:bodyPr>
           <a:lstStyle/>
           <a:p>
@@ -5381,13 +6225,8 @@
             </a:pPr>
             <a:r>
               <a:rPr lang="en-US" sz="2000" b="1" dirty="0" smtClean="0"/>
-              <a:t>To </a:t>
-            </a:r>
-            <a:r>
-              <a:rPr lang="en-US" sz="2000" b="1" dirty="0" smtClean="0"/>
-              <a:t>scale as projected </a:t>
-            </a:r>
-            <a:endParaRPr lang="en-US" sz="2000" b="1" dirty="0" smtClean="0"/>
+              <a:t>To scale as projected </a:t>
+            </a:r>
           </a:p>
           <a:p>
             <a:pPr marL="919163" lvl="1" indent="-342900">
@@ -5402,15 +6241,7 @@
             </a:pPr>
             <a:r>
               <a:rPr lang="en-US" sz="1600" b="1" dirty="0" smtClean="0"/>
-              <a:t>we </a:t>
-            </a:r>
-            <a:r>
-              <a:rPr lang="en-US" sz="1600" b="1" dirty="0" smtClean="0"/>
-              <a:t>have to change how we develop </a:t>
-            </a:r>
-            <a:r>
-              <a:rPr lang="en-US" sz="1600" b="1" dirty="0" smtClean="0"/>
-              <a:t>tests   </a:t>
+              <a:t>we have to change how we develop tests   </a:t>
             </a:r>
             <a:r>
               <a:rPr lang="en-US" sz="1000" b="1" dirty="0" smtClean="0">
@@ -5450,15 +6281,7 @@
             </a:pPr>
             <a:r>
               <a:rPr lang="en-US" sz="1600" b="1" dirty="0" smtClean="0"/>
-              <a:t>we </a:t>
-            </a:r>
-            <a:r>
-              <a:rPr lang="en-US" sz="1600" b="1" dirty="0" smtClean="0"/>
-              <a:t>have changed how we select &amp; control </a:t>
-            </a:r>
-            <a:r>
-              <a:rPr lang="en-US" sz="1600" b="1" dirty="0" smtClean="0"/>
-              <a:t>execution   </a:t>
+              <a:t>we have changed how we select &amp; control execution   </a:t>
             </a:r>
             <a:r>
               <a:rPr lang="en-US" sz="1000" b="1" dirty="0" smtClean="0">
@@ -5526,23 +6349,20 @@
             </a:pPr>
             <a:r>
               <a:rPr lang="en-US" sz="2000" b="1" dirty="0" smtClean="0"/>
-              <a:t>Massive </a:t>
-            </a:r>
-            <a:r>
-              <a:rPr lang="en-US" sz="2000" b="1" dirty="0" smtClean="0"/>
-              <a:t>reduction in the number of hours  Manual VS Automated</a:t>
-            </a:r>
-          </a:p>
-          <a:p>
-            <a:pPr>
+              <a:t>Massive reduction in the number of hours  Manual VS Automated</a:t>
+            </a:r>
+          </a:p>
+          <a:p>
+            <a:pPr lvl="1" indent="0">
               <a:lnSpc>
                 <a:spcPct val="135000"/>
               </a:lnSpc>
               <a:spcBef>
                 <a:spcPts val="0"/>
               </a:spcBef>
-            </a:pPr>
-            <a:endParaRPr lang="en-US" sz="1800" dirty="0"/>
+              <a:buNone/>
+            </a:pPr>
+            <a:endParaRPr lang="en-US" sz="1800" dirty="0" smtClean="0"/>
           </a:p>
           <a:p>
             <a:pPr marL="919163" lvl="1" indent="-342900">
@@ -5555,19 +6375,6 @@
               <a:buFont typeface="Arial" panose="020B0604020202020204" pitchFamily="34" charset="0"/>
               <a:buChar char="•"/>
             </a:pPr>
-            <a:endParaRPr lang="en-US" sz="1800" dirty="0" smtClean="0"/>
-          </a:p>
-          <a:p>
-            <a:pPr marL="919163" lvl="1" indent="-342900">
-              <a:lnSpc>
-                <a:spcPct val="135000"/>
-              </a:lnSpc>
-              <a:spcBef>
-                <a:spcPts val="0"/>
-              </a:spcBef>
-              <a:buFont typeface="Arial" panose="020B0604020202020204" pitchFamily="34" charset="0"/>
-              <a:buChar char="•"/>
-            </a:pPr>
             <a:endParaRPr lang="en-US" sz="1800" dirty="0"/>
           </a:p>
           <a:p>
@@ -5575,36 +6382,6 @@
           </a:p>
         </p:txBody>
       </p:sp>
-      <p:pic>
-        <p:nvPicPr>
-          <p:cNvPr id="6" name="Picture 5"/>
-          <p:cNvPicPr>
-            <a:picLocks noChangeAspect="1"/>
-          </p:cNvPicPr>
-          <p:nvPr/>
-        </p:nvPicPr>
-        <p:blipFill>
-          <a:blip r:embed="rId2">
-            <a:extLst>
-              <a:ext uri="{28A0092B-C50C-407E-A947-70E740481C1C}">
-                <a14:useLocalDpi xmlns:a14="http://schemas.microsoft.com/office/drawing/2010/main" val="0"/>
-              </a:ext>
-            </a:extLst>
-          </a:blip>
-          <a:stretch>
-            <a:fillRect/>
-          </a:stretch>
-        </p:blipFill>
-        <p:spPr>
-          <a:xfrm>
-            <a:off x="814713" y="3917778"/>
-            <a:ext cx="6006486" cy="1320798"/>
-          </a:xfrm>
-          <a:prstGeom prst="rect">
-            <a:avLst/>
-          </a:prstGeom>
-        </p:spPr>
-      </p:pic>
       <p:pic>
         <p:nvPicPr>
           <p:cNvPr id="8" name="Picture 7">
@@ -5629,7 +6406,7 @@
         </p:blipFill>
         <p:spPr>
           <a:xfrm>
-            <a:off x="814713" y="5387527"/>
+            <a:off x="814713" y="5481046"/>
             <a:ext cx="6006486" cy="1328961"/>
           </a:xfrm>
           <a:prstGeom prst="rect">
@@ -5645,8 +6422,8 @@
         </p:nvSpPr>
         <p:spPr>
           <a:xfrm>
-            <a:off x="6939022" y="4049537"/>
-            <a:ext cx="1400537" cy="1077218"/>
+            <a:off x="7157026" y="3701428"/>
+            <a:ext cx="1288473" cy="1077218"/>
           </a:xfrm>
           <a:prstGeom prst="rect">
             <a:avLst/>
@@ -5716,8 +6493,8 @@
         </p:nvSpPr>
         <p:spPr>
           <a:xfrm>
-            <a:off x="6967958" y="5448487"/>
-            <a:ext cx="1597308" cy="1077218"/>
+            <a:off x="7047344" y="5664387"/>
+            <a:ext cx="1652155" cy="1077218"/>
           </a:xfrm>
           <a:prstGeom prst="rect">
             <a:avLst/>
@@ -5776,6 +6553,593 @@
                 </a:outerShdw>
               </a:effectLst>
             </a:endParaRPr>
+          </a:p>
+        </p:txBody>
+      </p:sp>
+      <p:pic>
+        <p:nvPicPr>
+          <p:cNvPr id="6" name="Picture 5"/>
+          <p:cNvPicPr>
+            <a:picLocks noChangeAspect="1"/>
+          </p:cNvPicPr>
+          <p:nvPr/>
+        </p:nvPicPr>
+        <p:blipFill>
+          <a:blip r:embed="rId5">
+            <a:extLst>
+              <a:ext uri="{28A0092B-C50C-407E-A947-70E740481C1C}">
+                <a14:useLocalDpi xmlns:a14="http://schemas.microsoft.com/office/drawing/2010/main" val="0"/>
+              </a:ext>
+            </a:extLst>
+          </a:blip>
+          <a:stretch>
+            <a:fillRect/>
+          </a:stretch>
+        </p:blipFill>
+        <p:spPr>
+          <a:xfrm>
+            <a:off x="814713" y="3565170"/>
+            <a:ext cx="6006486" cy="1320798"/>
+          </a:xfrm>
+          <a:prstGeom prst="rect">
+            <a:avLst/>
+          </a:prstGeom>
+        </p:spPr>
+      </p:pic>
+      <p:sp>
+        <p:nvSpPr>
+          <p:cNvPr id="3" name="Rectangle 2"/>
+          <p:cNvSpPr/>
+          <p:nvPr/>
+        </p:nvSpPr>
+        <p:spPr>
+          <a:xfrm>
+            <a:off x="2521204" y="3907440"/>
+            <a:ext cx="325905" cy="187036"/>
+          </a:xfrm>
+          <a:prstGeom prst="rect">
+            <a:avLst/>
+          </a:prstGeom>
+          <a:ln>
+            <a:noFill/>
+          </a:ln>
+        </p:spPr>
+        <p:style>
+          <a:lnRef idx="2">
+            <a:schemeClr val="dk1"/>
+          </a:lnRef>
+          <a:fillRef idx="1">
+            <a:schemeClr val="lt1"/>
+          </a:fillRef>
+          <a:effectRef idx="0">
+            <a:schemeClr val="dk1"/>
+          </a:effectRef>
+          <a:fontRef idx="minor">
+            <a:schemeClr val="dk1"/>
+          </a:fontRef>
+        </p:style>
+        <p:txBody>
+          <a:bodyPr rtlCol="0" anchor="ctr"/>
+          <a:lstStyle/>
+          <a:p>
+            <a:pPr algn="ctr"/>
+            <a:endParaRPr lang="en-US"/>
+          </a:p>
+        </p:txBody>
+      </p:sp>
+      <p:sp>
+        <p:nvSpPr>
+          <p:cNvPr id="2" name="TextBox 1"/>
+          <p:cNvSpPr txBox="1"/>
+          <p:nvPr/>
+        </p:nvSpPr>
+        <p:spPr>
+          <a:xfrm>
+            <a:off x="2481791" y="3550630"/>
+            <a:ext cx="1039091" cy="569515"/>
+          </a:xfrm>
+          <a:prstGeom prst="rect">
+            <a:avLst/>
+          </a:prstGeom>
+          <a:noFill/>
+        </p:spPr>
+        <p:txBody>
+          <a:bodyPr wrap="square" rtlCol="0">
+            <a:spAutoFit/>
+          </a:bodyPr>
+          <a:lstStyle/>
+          <a:p>
+            <a:pPr>
+              <a:lnSpc>
+                <a:spcPct val="114000"/>
+              </a:lnSpc>
+            </a:pPr>
+            <a:r>
+              <a:rPr lang="en-US" sz="1400" dirty="0" smtClean="0"/>
+              <a:t>Min per Test  Case</a:t>
+            </a:r>
+            <a:endParaRPr lang="en-US" sz="1400" dirty="0"/>
+          </a:p>
+        </p:txBody>
+      </p:sp>
+      <p:sp>
+        <p:nvSpPr>
+          <p:cNvPr id="11" name="Rectangle 10"/>
+          <p:cNvSpPr/>
+          <p:nvPr/>
+        </p:nvSpPr>
+        <p:spPr>
+          <a:xfrm>
+            <a:off x="3383525" y="3878510"/>
+            <a:ext cx="664165" cy="187036"/>
+          </a:xfrm>
+          <a:prstGeom prst="rect">
+            <a:avLst/>
+          </a:prstGeom>
+          <a:ln>
+            <a:noFill/>
+          </a:ln>
+        </p:spPr>
+        <p:style>
+          <a:lnRef idx="2">
+            <a:schemeClr val="dk1"/>
+          </a:lnRef>
+          <a:fillRef idx="1">
+            <a:schemeClr val="lt1"/>
+          </a:fillRef>
+          <a:effectRef idx="0">
+            <a:schemeClr val="dk1"/>
+          </a:effectRef>
+          <a:fontRef idx="minor">
+            <a:schemeClr val="dk1"/>
+          </a:fontRef>
+        </p:style>
+        <p:txBody>
+          <a:bodyPr rtlCol="0" anchor="ctr"/>
+          <a:lstStyle/>
+          <a:p>
+            <a:pPr algn="ctr"/>
+            <a:endParaRPr lang="en-US"/>
+          </a:p>
+        </p:txBody>
+      </p:sp>
+      <p:sp>
+        <p:nvSpPr>
+          <p:cNvPr id="12" name="TextBox 11"/>
+          <p:cNvSpPr txBox="1"/>
+          <p:nvPr/>
+        </p:nvSpPr>
+        <p:spPr>
+          <a:xfrm>
+            <a:off x="3317393" y="3550631"/>
+            <a:ext cx="1039091" cy="569515"/>
+          </a:xfrm>
+          <a:prstGeom prst="rect">
+            <a:avLst/>
+          </a:prstGeom>
+          <a:noFill/>
+        </p:spPr>
+        <p:txBody>
+          <a:bodyPr wrap="square" rtlCol="0">
+            <a:spAutoFit/>
+          </a:bodyPr>
+          <a:lstStyle/>
+          <a:p>
+            <a:pPr>
+              <a:lnSpc>
+                <a:spcPct val="114000"/>
+              </a:lnSpc>
+            </a:pPr>
+            <a:r>
+              <a:rPr lang="en-US" sz="1400" dirty="0" smtClean="0"/>
+              <a:t>Min per Test  Run</a:t>
+            </a:r>
+            <a:endParaRPr lang="en-US" sz="1400" dirty="0"/>
+          </a:p>
+        </p:txBody>
+      </p:sp>
+      <p:sp>
+        <p:nvSpPr>
+          <p:cNvPr id="14" name="Rectangle 13"/>
+          <p:cNvSpPr/>
+          <p:nvPr/>
+        </p:nvSpPr>
+        <p:spPr>
+          <a:xfrm>
+            <a:off x="4232771" y="3886658"/>
+            <a:ext cx="744474" cy="187036"/>
+          </a:xfrm>
+          <a:prstGeom prst="rect">
+            <a:avLst/>
+          </a:prstGeom>
+          <a:ln>
+            <a:noFill/>
+          </a:ln>
+        </p:spPr>
+        <p:style>
+          <a:lnRef idx="2">
+            <a:schemeClr val="dk1"/>
+          </a:lnRef>
+          <a:fillRef idx="1">
+            <a:schemeClr val="lt1"/>
+          </a:fillRef>
+          <a:effectRef idx="0">
+            <a:schemeClr val="dk1"/>
+          </a:effectRef>
+          <a:fontRef idx="minor">
+            <a:schemeClr val="dk1"/>
+          </a:fontRef>
+        </p:style>
+        <p:txBody>
+          <a:bodyPr rtlCol="0" anchor="ctr"/>
+          <a:lstStyle/>
+          <a:p>
+            <a:pPr algn="ctr"/>
+            <a:endParaRPr lang="en-US"/>
+          </a:p>
+        </p:txBody>
+      </p:sp>
+      <p:sp>
+        <p:nvSpPr>
+          <p:cNvPr id="13" name="TextBox 12"/>
+          <p:cNvSpPr txBox="1"/>
+          <p:nvPr/>
+        </p:nvSpPr>
+        <p:spPr>
+          <a:xfrm>
+            <a:off x="4099643" y="3579790"/>
+            <a:ext cx="1089641" cy="535468"/>
+          </a:xfrm>
+          <a:prstGeom prst="rect">
+            <a:avLst/>
+          </a:prstGeom>
+          <a:noFill/>
+        </p:spPr>
+        <p:txBody>
+          <a:bodyPr wrap="square" rtlCol="0">
+            <a:spAutoFit/>
+          </a:bodyPr>
+          <a:lstStyle/>
+          <a:p>
+            <a:pPr>
+              <a:lnSpc>
+                <a:spcPct val="114000"/>
+              </a:lnSpc>
+            </a:pPr>
+            <a:r>
+              <a:rPr lang="en-US" sz="1300" dirty="0" smtClean="0"/>
+              <a:t>Total Min for 3 Test  Run</a:t>
+            </a:r>
+            <a:endParaRPr lang="en-US" sz="1300" dirty="0"/>
+          </a:p>
+        </p:txBody>
+      </p:sp>
+      <p:sp>
+        <p:nvSpPr>
+          <p:cNvPr id="15" name="TextBox 14"/>
+          <p:cNvSpPr txBox="1"/>
+          <p:nvPr/>
+        </p:nvSpPr>
+        <p:spPr>
+          <a:xfrm>
+            <a:off x="814713" y="3274877"/>
+            <a:ext cx="5547987" cy="369332"/>
+          </a:xfrm>
+          <a:prstGeom prst="rect">
+            <a:avLst/>
+          </a:prstGeom>
+          <a:noFill/>
+        </p:spPr>
+        <p:txBody>
+          <a:bodyPr wrap="square" rtlCol="0">
+            <a:spAutoFit/>
+          </a:bodyPr>
+          <a:lstStyle/>
+          <a:p>
+            <a:r>
+              <a:rPr lang="en-US" dirty="0" smtClean="0"/>
+              <a:t>A collection of Test Cases run manually </a:t>
+            </a:r>
+            <a:endParaRPr lang="en-US" dirty="0"/>
+          </a:p>
+        </p:txBody>
+      </p:sp>
+      <p:sp>
+        <p:nvSpPr>
+          <p:cNvPr id="17" name="TextBox 16"/>
+          <p:cNvSpPr txBox="1"/>
+          <p:nvPr/>
+        </p:nvSpPr>
+        <p:spPr>
+          <a:xfrm>
+            <a:off x="852813" y="5192577"/>
+            <a:ext cx="5547987" cy="369332"/>
+          </a:xfrm>
+          <a:prstGeom prst="rect">
+            <a:avLst/>
+          </a:prstGeom>
+          <a:noFill/>
+        </p:spPr>
+        <p:txBody>
+          <a:bodyPr wrap="square" rtlCol="0">
+            <a:spAutoFit/>
+          </a:bodyPr>
+          <a:lstStyle/>
+          <a:p>
+            <a:r>
+              <a:rPr lang="en-US" dirty="0" smtClean="0"/>
+              <a:t>A similar collection of Test Cases run in Automation </a:t>
+            </a:r>
+            <a:endParaRPr lang="en-US" dirty="0"/>
+          </a:p>
+        </p:txBody>
+      </p:sp>
+      <p:sp>
+        <p:nvSpPr>
+          <p:cNvPr id="23" name="Rectangle 22"/>
+          <p:cNvSpPr/>
+          <p:nvPr/>
+        </p:nvSpPr>
+        <p:spPr>
+          <a:xfrm>
+            <a:off x="2533648" y="5818772"/>
+            <a:ext cx="783745" cy="177800"/>
+          </a:xfrm>
+          <a:prstGeom prst="rect">
+            <a:avLst/>
+          </a:prstGeom>
+          <a:ln>
+            <a:noFill/>
+          </a:ln>
+        </p:spPr>
+        <p:style>
+          <a:lnRef idx="2">
+            <a:schemeClr val="dk1"/>
+          </a:lnRef>
+          <a:fillRef idx="1">
+            <a:schemeClr val="lt1"/>
+          </a:fillRef>
+          <a:effectRef idx="0">
+            <a:schemeClr val="dk1"/>
+          </a:effectRef>
+          <a:fontRef idx="minor">
+            <a:schemeClr val="dk1"/>
+          </a:fontRef>
+        </p:style>
+        <p:txBody>
+          <a:bodyPr rtlCol="0" anchor="ctr"/>
+          <a:lstStyle/>
+          <a:p>
+            <a:pPr algn="ctr"/>
+            <a:endParaRPr lang="en-US"/>
+          </a:p>
+        </p:txBody>
+      </p:sp>
+      <p:sp>
+        <p:nvSpPr>
+          <p:cNvPr id="24" name="Rectangle 23"/>
+          <p:cNvSpPr/>
+          <p:nvPr/>
+        </p:nvSpPr>
+        <p:spPr>
+          <a:xfrm>
+            <a:off x="-2959100" y="3028373"/>
+            <a:ext cx="685800" cy="177800"/>
+          </a:xfrm>
+          <a:prstGeom prst="rect">
+            <a:avLst/>
+          </a:prstGeom>
+          <a:ln>
+            <a:noFill/>
+          </a:ln>
+        </p:spPr>
+        <p:style>
+          <a:lnRef idx="2">
+            <a:schemeClr val="dk1"/>
+          </a:lnRef>
+          <a:fillRef idx="1">
+            <a:schemeClr val="lt1"/>
+          </a:fillRef>
+          <a:effectRef idx="0">
+            <a:schemeClr val="dk1"/>
+          </a:effectRef>
+          <a:fontRef idx="minor">
+            <a:schemeClr val="dk1"/>
+          </a:fontRef>
+        </p:style>
+        <p:txBody>
+          <a:bodyPr rtlCol="0" anchor="ctr"/>
+          <a:lstStyle/>
+          <a:p>
+            <a:pPr algn="ctr"/>
+            <a:endParaRPr lang="en-US"/>
+          </a:p>
+        </p:txBody>
+      </p:sp>
+      <p:sp>
+        <p:nvSpPr>
+          <p:cNvPr id="25" name="Rectangle 24"/>
+          <p:cNvSpPr/>
+          <p:nvPr/>
+        </p:nvSpPr>
+        <p:spPr>
+          <a:xfrm>
+            <a:off x="3377817" y="5817767"/>
+            <a:ext cx="783745" cy="177800"/>
+          </a:xfrm>
+          <a:prstGeom prst="rect">
+            <a:avLst/>
+          </a:prstGeom>
+          <a:ln>
+            <a:noFill/>
+          </a:ln>
+        </p:spPr>
+        <p:style>
+          <a:lnRef idx="2">
+            <a:schemeClr val="dk1"/>
+          </a:lnRef>
+          <a:fillRef idx="1">
+            <a:schemeClr val="lt1"/>
+          </a:fillRef>
+          <a:effectRef idx="0">
+            <a:schemeClr val="dk1"/>
+          </a:effectRef>
+          <a:fontRef idx="minor">
+            <a:schemeClr val="dk1"/>
+          </a:fontRef>
+        </p:style>
+        <p:txBody>
+          <a:bodyPr rtlCol="0" anchor="ctr"/>
+          <a:lstStyle/>
+          <a:p>
+            <a:pPr algn="ctr"/>
+            <a:endParaRPr lang="en-US"/>
+          </a:p>
+        </p:txBody>
+      </p:sp>
+      <p:sp>
+        <p:nvSpPr>
+          <p:cNvPr id="26" name="Rectangle 25"/>
+          <p:cNvSpPr/>
+          <p:nvPr/>
+        </p:nvSpPr>
+        <p:spPr>
+          <a:xfrm>
+            <a:off x="4213955" y="5817767"/>
+            <a:ext cx="783745" cy="177800"/>
+          </a:xfrm>
+          <a:prstGeom prst="rect">
+            <a:avLst/>
+          </a:prstGeom>
+          <a:ln>
+            <a:noFill/>
+          </a:ln>
+        </p:spPr>
+        <p:style>
+          <a:lnRef idx="2">
+            <a:schemeClr val="dk1"/>
+          </a:lnRef>
+          <a:fillRef idx="1">
+            <a:schemeClr val="lt1"/>
+          </a:fillRef>
+          <a:effectRef idx="0">
+            <a:schemeClr val="dk1"/>
+          </a:effectRef>
+          <a:fontRef idx="minor">
+            <a:schemeClr val="dk1"/>
+          </a:fontRef>
+        </p:style>
+        <p:txBody>
+          <a:bodyPr rtlCol="0" anchor="ctr"/>
+          <a:lstStyle/>
+          <a:p>
+            <a:pPr algn="ctr"/>
+            <a:endParaRPr lang="en-US"/>
+          </a:p>
+        </p:txBody>
+      </p:sp>
+      <p:sp>
+        <p:nvSpPr>
+          <p:cNvPr id="19" name="TextBox 18"/>
+          <p:cNvSpPr txBox="1"/>
+          <p:nvPr/>
+        </p:nvSpPr>
+        <p:spPr>
+          <a:xfrm>
+            <a:off x="2493752" y="5493377"/>
+            <a:ext cx="964061" cy="583493"/>
+          </a:xfrm>
+          <a:prstGeom prst="rect">
+            <a:avLst/>
+          </a:prstGeom>
+          <a:noFill/>
+        </p:spPr>
+        <p:txBody>
+          <a:bodyPr wrap="square" rtlCol="0">
+            <a:spAutoFit/>
+          </a:bodyPr>
+          <a:lstStyle/>
+          <a:p>
+            <a:pPr>
+              <a:lnSpc>
+                <a:spcPct val="114000"/>
+              </a:lnSpc>
+            </a:pPr>
+            <a:r>
+              <a:rPr lang="en-US" sz="1400" dirty="0" smtClean="0"/>
+              <a:t>Sec per Test  Case</a:t>
+            </a:r>
+            <a:endParaRPr lang="en-US" sz="1400" dirty="0"/>
+          </a:p>
+        </p:txBody>
+      </p:sp>
+      <p:sp>
+        <p:nvSpPr>
+          <p:cNvPr id="21" name="TextBox 20"/>
+          <p:cNvSpPr txBox="1"/>
+          <p:nvPr/>
+        </p:nvSpPr>
+        <p:spPr>
+          <a:xfrm>
+            <a:off x="3356382" y="5478168"/>
+            <a:ext cx="1039091" cy="583493"/>
+          </a:xfrm>
+          <a:prstGeom prst="rect">
+            <a:avLst/>
+          </a:prstGeom>
+          <a:noFill/>
+        </p:spPr>
+        <p:txBody>
+          <a:bodyPr wrap="square" rtlCol="0">
+            <a:spAutoFit/>
+          </a:bodyPr>
+          <a:lstStyle/>
+          <a:p>
+            <a:pPr>
+              <a:lnSpc>
+                <a:spcPct val="114000"/>
+              </a:lnSpc>
+            </a:pPr>
+            <a:r>
+              <a:rPr lang="en-US" sz="1400" dirty="0" smtClean="0"/>
+              <a:t>Sec per Test  Run</a:t>
+            </a:r>
+            <a:endParaRPr lang="en-US" sz="1400" dirty="0"/>
+          </a:p>
+        </p:txBody>
+      </p:sp>
+      <p:sp>
+        <p:nvSpPr>
+          <p:cNvPr id="22" name="TextBox 21"/>
+          <p:cNvSpPr txBox="1"/>
+          <p:nvPr/>
+        </p:nvSpPr>
+        <p:spPr>
+          <a:xfrm>
+            <a:off x="4121247" y="5510881"/>
+            <a:ext cx="1089641" cy="548483"/>
+          </a:xfrm>
+          <a:prstGeom prst="rect">
+            <a:avLst/>
+          </a:prstGeom>
+          <a:noFill/>
+        </p:spPr>
+        <p:txBody>
+          <a:bodyPr wrap="square" rtlCol="0">
+            <a:spAutoFit/>
+          </a:bodyPr>
+          <a:lstStyle/>
+          <a:p>
+            <a:pPr>
+              <a:lnSpc>
+                <a:spcPct val="114000"/>
+              </a:lnSpc>
+            </a:pPr>
+            <a:r>
+              <a:rPr lang="en-US" sz="1300" dirty="0" smtClean="0"/>
+              <a:t>Total Secs for 3 Test  Run</a:t>
+            </a:r>
+            <a:endParaRPr lang="en-US" sz="1300" dirty="0"/>
           </a:p>
         </p:txBody>
       </p:sp>
@@ -5877,7 +7241,7 @@
         </p:spPr>
         <p:txBody>
           <a:bodyPr>
-            <a:normAutofit/>
+            <a:normAutofit fontScale="92500" lnSpcReduction="20000"/>
           </a:bodyPr>
           <a:lstStyle/>
           <a:p>
@@ -5892,7 +7256,7 @@
               <a:buChar char="•"/>
             </a:pPr>
             <a:r>
-              <a:rPr lang="en-US" sz="2000" b="1" dirty="0" smtClean="0"/>
+              <a:rPr lang="en-US" sz="2200" b="1" dirty="0" smtClean="0"/>
               <a:t>Dev staff productivity and confidence</a:t>
             </a:r>
           </a:p>
@@ -5960,7 +7324,7 @@
               <a:buChar char="•"/>
             </a:pPr>
             <a:r>
-              <a:rPr lang="en-US" sz="2000" b="1" dirty="0" smtClean="0"/>
+              <a:rPr lang="en-US" sz="2200" b="1" dirty="0" smtClean="0"/>
               <a:t>Agile Team operation : Bug fix resolution cycle!</a:t>
             </a:r>
           </a:p>
@@ -6011,9 +7375,10 @@
               </a:spcBef>
             </a:pPr>
             <a:r>
-              <a:rPr lang="en-US" sz="1600" dirty="0" smtClean="0"/>
-              <a:t>              </a:t>
-            </a:r>
+              <a:rPr lang="en-US" sz="1000" dirty="0" smtClean="0"/>
+              <a:t>     </a:t>
+            </a:r>
+            <a:endParaRPr lang="en-US" sz="1000" dirty="0" smtClean="0"/>
           </a:p>
           <a:p>
             <a:pPr>
@@ -6025,8 +7390,207 @@
               </a:spcBef>
             </a:pPr>
             <a:r>
+              <a:rPr lang="en-US" sz="1000" dirty="0" smtClean="0"/>
+              <a:t>         </a:t>
+            </a:r>
+          </a:p>
+          <a:p>
+            <a:pPr marL="285750" indent="-285750">
+              <a:lnSpc>
+                <a:spcPct val="114000"/>
+              </a:lnSpc>
+              <a:spcBef>
+                <a:spcPts val="0"/>
+              </a:spcBef>
+              <a:buFont typeface="Arial" panose="020B0604020202020204" pitchFamily="34" charset="0"/>
+              <a:buChar char="•"/>
+            </a:pPr>
+            <a:r>
+              <a:rPr lang="en-US" sz="2200" b="1" dirty="0" smtClean="0"/>
+              <a:t>Numbers of test cases by Product Line</a:t>
+            </a:r>
+          </a:p>
+          <a:p>
+            <a:pPr marL="862013" lvl="1" indent="-285750">
+              <a:lnSpc>
+                <a:spcPct val="114000"/>
+              </a:lnSpc>
+              <a:spcBef>
+                <a:spcPts val="0"/>
+              </a:spcBef>
+              <a:buFont typeface="Arial" panose="020B0604020202020204" pitchFamily="34" charset="0"/>
+              <a:buChar char="•"/>
+            </a:pPr>
+            <a:r>
+              <a:rPr lang="en-US" sz="1900" b="1" dirty="0" smtClean="0"/>
+              <a:t>Shopping &amp; Buying Page Integration Testing</a:t>
+            </a:r>
+          </a:p>
+          <a:p>
+            <a:pPr lvl="1" indent="0">
+              <a:lnSpc>
+                <a:spcPct val="114000"/>
+              </a:lnSpc>
+              <a:spcBef>
+                <a:spcPts val="0"/>
+              </a:spcBef>
+              <a:buNone/>
+            </a:pPr>
+            <a:r>
+              <a:rPr lang="en-US" sz="1800" b="1" dirty="0" err="1" smtClean="0"/>
+              <a:t>Pers</a:t>
+            </a:r>
+            <a:r>
+              <a:rPr lang="en-US" sz="1800" b="1" dirty="0" smtClean="0"/>
+              <a:t>, Deps, </a:t>
+            </a:r>
+            <a:r>
+              <a:rPr lang="en-US" sz="1800" b="1" dirty="0" err="1" smtClean="0"/>
+              <a:t>Facs</a:t>
+            </a:r>
+            <a:r>
+              <a:rPr lang="en-US" sz="1800" b="1" dirty="0" smtClean="0"/>
+              <a:t>, Buy, </a:t>
+            </a:r>
+            <a:r>
+              <a:rPr lang="en-US" sz="1800" b="1" dirty="0" err="1" smtClean="0"/>
+              <a:t>Reciept</a:t>
+            </a:r>
+            <a:endParaRPr lang="en-US" sz="1800" b="1" dirty="0" smtClean="0"/>
+          </a:p>
+          <a:p>
+            <a:pPr lvl="1" indent="0">
+              <a:lnSpc>
+                <a:spcPct val="114000"/>
+              </a:lnSpc>
+              <a:spcBef>
+                <a:spcPts val="0"/>
+              </a:spcBef>
+              <a:buNone/>
+            </a:pPr>
+            <a:r>
+              <a:rPr lang="en-US" sz="1800" b="1" dirty="0" smtClean="0"/>
+              <a:t>Shopping and Buying </a:t>
+            </a:r>
+            <a:r>
+              <a:rPr lang="en-US" sz="1800" b="1" smtClean="0"/>
+              <a:t>E2E Tests</a:t>
+            </a:r>
+            <a:endParaRPr lang="en-US" sz="1800" b="1" dirty="0"/>
+          </a:p>
+          <a:p>
+            <a:pPr>
+              <a:lnSpc>
+                <a:spcPct val="135000"/>
+              </a:lnSpc>
+              <a:spcBef>
+                <a:spcPts val="0"/>
+              </a:spcBef>
+            </a:pPr>
+            <a:endParaRPr lang="en-US" sz="1600" dirty="0" smtClean="0"/>
+          </a:p>
+          <a:p>
+            <a:pPr marL="862013" lvl="1" indent="-285750">
+              <a:lnSpc>
+                <a:spcPct val="114000"/>
+              </a:lnSpc>
+              <a:spcBef>
+                <a:spcPts val="0"/>
+              </a:spcBef>
+              <a:buFont typeface="Arial" panose="020B0604020202020204" pitchFamily="34" charset="0"/>
+              <a:buChar char="•"/>
+            </a:pPr>
+            <a:r>
+              <a:rPr lang="en-US" b="1" dirty="0" smtClean="0"/>
+              <a:t>Provider Directory</a:t>
+            </a:r>
+          </a:p>
+          <a:p>
+            <a:pPr lvl="1" indent="0">
+              <a:lnSpc>
+                <a:spcPct val="114000"/>
+              </a:lnSpc>
+              <a:spcBef>
+                <a:spcPts val="0"/>
+              </a:spcBef>
+              <a:buNone/>
+            </a:pPr>
+            <a:r>
+              <a:rPr lang="en-US" sz="1800" b="1" dirty="0" smtClean="0"/>
+              <a:t>Template 1,  Template 2, Template 3</a:t>
+            </a:r>
+          </a:p>
+          <a:p>
+            <a:pPr lvl="1" indent="0">
+              <a:lnSpc>
+                <a:spcPct val="114000"/>
+              </a:lnSpc>
+              <a:spcBef>
+                <a:spcPts val="0"/>
+              </a:spcBef>
+              <a:buNone/>
+            </a:pPr>
+            <a:r>
+              <a:rPr lang="en-US" sz="1800" b="1" dirty="0" smtClean="0"/>
+              <a:t>API Tests USED</a:t>
+            </a:r>
+          </a:p>
+          <a:p>
+            <a:pPr lvl="1" indent="0">
+              <a:lnSpc>
+                <a:spcPct val="114000"/>
+              </a:lnSpc>
+              <a:spcBef>
+                <a:spcPts val="0"/>
+              </a:spcBef>
+              <a:buNone/>
+            </a:pPr>
+            <a:endParaRPr lang="en-US" sz="1800" b="1" dirty="0"/>
+          </a:p>
+          <a:p>
+            <a:pPr marL="862013" lvl="1" indent="-285750">
+              <a:lnSpc>
+                <a:spcPct val="114000"/>
+              </a:lnSpc>
+              <a:spcBef>
+                <a:spcPts val="0"/>
+              </a:spcBef>
+              <a:buFont typeface="Arial" panose="020B0604020202020204" pitchFamily="34" charset="0"/>
+              <a:buChar char="•"/>
+            </a:pPr>
+            <a:r>
+              <a:rPr lang="en-US" sz="1800" b="1" dirty="0" smtClean="0"/>
+              <a:t>Micro Service REST API Test</a:t>
+            </a:r>
+            <a:endParaRPr lang="en-US" sz="1800" b="1" dirty="0"/>
+          </a:p>
+          <a:p>
+            <a:pPr>
+              <a:lnSpc>
+                <a:spcPct val="135000"/>
+              </a:lnSpc>
+              <a:spcBef>
+                <a:spcPts val="0"/>
+              </a:spcBef>
+            </a:pPr>
+            <a:endParaRPr lang="en-US" sz="1600" dirty="0"/>
+          </a:p>
+          <a:p>
+            <a:pPr>
+              <a:lnSpc>
+                <a:spcPct val="135000"/>
+              </a:lnSpc>
+              <a:spcBef>
+                <a:spcPts val="0"/>
+              </a:spcBef>
+            </a:pPr>
+            <a:r>
               <a:rPr lang="en-US" sz="1600" b="1" dirty="0" smtClean="0"/>
-              <a:t> So,   Next step is ……..   </a:t>
+              <a:t> </a:t>
+            </a:r>
+            <a:r>
+              <a:rPr lang="en-US" sz="1600" b="1" dirty="0" smtClean="0"/>
+              <a:t>So,   Next step is ……..   </a:t>
             </a:r>
             <a:endParaRPr lang="en-US" sz="1600" b="1" dirty="0"/>
           </a:p>
@@ -6183,15 +7747,7 @@
             </a:pPr>
             <a:r>
               <a:rPr lang="en-US" sz="2000" b="1" dirty="0" smtClean="0"/>
-              <a:t>Development staff </a:t>
-            </a:r>
-            <a:r>
-              <a:rPr lang="en-US" sz="2000" b="1" dirty="0" smtClean="0"/>
-              <a:t>will </a:t>
-            </a:r>
-            <a:r>
-              <a:rPr lang="en-US" sz="2000" b="1" dirty="0" smtClean="0"/>
-              <a:t>write </a:t>
+              <a:t>Development staff will write </a:t>
             </a:r>
             <a:r>
               <a:rPr lang="en-US" sz="2000" b="1" dirty="0"/>
@@ -6213,11 +7769,7 @@
             </a:pPr>
             <a:r>
               <a:rPr lang="en-US" sz="1400" b="1" dirty="0" smtClean="0"/>
-              <a:t>This </a:t>
-            </a:r>
-            <a:r>
-              <a:rPr lang="en-US" sz="1400" b="1" dirty="0" smtClean="0"/>
-              <a:t>scripting </a:t>
+              <a:t>This scripting </a:t>
             </a:r>
             <a:r>
               <a:rPr lang="en-US" sz="1400" b="1" dirty="0"/>
@@ -6240,7 +7792,6 @@
               <a:rPr lang="en-US" sz="1400" b="1" dirty="0" smtClean="0"/>
               <a:t>REST API test scripting  covers all basic use and edge case work</a:t>
             </a:r>
-            <a:endParaRPr lang="en-US" sz="1400" b="1" dirty="0" smtClean="0"/>
           </a:p>
           <a:p>
             <a:pPr marL="342900" indent="-342900">
@@ -6478,7 +8029,7 @@
       </p:grpSpPr>
       <p:sp>
         <p:nvSpPr>
-          <p:cNvPr id="2" name="Title 1"/>
+          <p:cNvPr id="4" name="Title 1"/>
           <p:cNvSpPr>
             <a:spLocks noGrp="1"/>
           </p:cNvSpPr>
@@ -6488,34 +8039,28 @@
         </p:nvSpPr>
         <p:spPr>
           <a:xfrm>
-            <a:off x="1526513" y="124691"/>
-            <a:ext cx="5240047" cy="1325563"/>
+            <a:off x="1009384" y="128455"/>
+            <a:ext cx="7906016" cy="651510"/>
           </a:xfrm>
         </p:spPr>
         <p:txBody>
           <a:bodyPr anchor="t">
-            <a:normAutofit/>
+            <a:noAutofit/>
           </a:bodyPr>
           <a:lstStyle/>
           <a:p>
             <a:pPr algn="ctr"/>
             <a:r>
               <a:rPr lang="en-US" dirty="0" smtClean="0"/>
-              <a:t>EXECUTION  </a:t>
-            </a:r>
-            <a:endParaRPr lang="en-US" dirty="0">
-              <a:solidFill>
-                <a:schemeClr val="bg1">
-                  <a:lumMod val="85000"/>
-                </a:schemeClr>
-              </a:solidFill>
-            </a:endParaRPr>
+              <a:t>ROLES &amp; RESPONSIBILITIES</a:t>
+            </a:r>
+            <a:endParaRPr lang="en-US" dirty="0"/>
           </a:p>
         </p:txBody>
       </p:sp>
       <p:sp>
         <p:nvSpPr>
-          <p:cNvPr id="3" name="Content Placeholder 2"/>
+          <p:cNvPr id="5" name="Content Placeholder 2"/>
           <p:cNvSpPr>
             <a:spLocks noGrp="1"/>
           </p:cNvSpPr>
@@ -6525,8 +8070,8 @@
         </p:nvSpPr>
         <p:spPr>
           <a:xfrm>
-            <a:off x="437704" y="1837658"/>
-            <a:ext cx="8567504" cy="5001488"/>
+            <a:off x="282110" y="1795828"/>
+            <a:ext cx="8822133" cy="5062172"/>
           </a:xfrm>
         </p:spPr>
         <p:txBody>
@@ -6535,195 +8080,156 @@
           </a:bodyPr>
           <a:lstStyle/>
           <a:p>
-            <a:pPr>
-              <a:lnSpc>
-                <a:spcPct val="110000"/>
-              </a:lnSpc>
-            </a:pPr>
-            <a:r>
-              <a:rPr lang="en-US" sz="2000" b="1" dirty="0" smtClean="0"/>
-              <a:t>Two primary modes</a:t>
-            </a:r>
-          </a:p>
-          <a:p>
-            <a:pPr lvl="1">
-              <a:lnSpc>
-                <a:spcPct val="110000"/>
+            <a:pPr marL="342900" indent="-342900">
+              <a:lnSpc>
+                <a:spcPct val="125000"/>
               </a:lnSpc>
               <a:buFont typeface="Arial" panose="020B0604020202020204" pitchFamily="34" charset="0"/>
               <a:buChar char="•"/>
             </a:pPr>
             <a:r>
-              <a:rPr lang="en-US" sz="1800" b="1" dirty="0"/>
-              <a:t>Schedule Based : Covers Regression </a:t>
-            </a:r>
-            <a:r>
-              <a:rPr lang="en-US" sz="1800" b="1" dirty="0" smtClean="0"/>
-              <a:t>Testing  </a:t>
-            </a:r>
-            <a:r>
-              <a:rPr lang="en-US" sz="1200" b="1" dirty="0" smtClean="0"/>
-              <a:t>MOT - </a:t>
-            </a:r>
-            <a:r>
-              <a:rPr lang="en-US" sz="1200" b="1" dirty="0" err="1" smtClean="0"/>
-              <a:t>Cron</a:t>
-            </a:r>
-            <a:endParaRPr lang="en-US" sz="1200" b="1" dirty="0"/>
-          </a:p>
-          <a:p>
-            <a:pPr lvl="1">
-              <a:lnSpc>
-                <a:spcPct val="110000"/>
+              <a:rPr lang="en-US" sz="2000" b="1" dirty="0" smtClean="0"/>
+              <a:t>Shopping &amp; Buying Engineering will be responsible</a:t>
+            </a:r>
+            <a:endParaRPr lang="en-US" sz="2000" b="1" dirty="0" smtClean="0"/>
+          </a:p>
+          <a:p>
+            <a:pPr marL="342900" indent="-342900">
+              <a:lnSpc>
+                <a:spcPct val="125000"/>
               </a:lnSpc>
               <a:buFont typeface="Arial" panose="020B0604020202020204" pitchFamily="34" charset="0"/>
               <a:buChar char="•"/>
             </a:pPr>
-            <a:r>
-              <a:rPr lang="en-US" sz="1800" b="1" dirty="0"/>
-              <a:t>On Demand : Covers all developer build initiated </a:t>
-            </a:r>
-            <a:r>
-              <a:rPr lang="en-US" sz="1800" b="1" dirty="0" smtClean="0"/>
-              <a:t>testing  </a:t>
-            </a:r>
-            <a:r>
-              <a:rPr lang="en-US" sz="1200" b="1" dirty="0" smtClean="0"/>
-              <a:t>DIT - Jenkins</a:t>
-            </a:r>
-            <a:endParaRPr lang="en-US" sz="1200" b="1" dirty="0"/>
-          </a:p>
-          <a:p>
-            <a:pPr marL="457206" lvl="1" indent="0">
-              <a:lnSpc>
-                <a:spcPct val="110000"/>
-              </a:lnSpc>
-              <a:buNone/>
-            </a:pPr>
-            <a:r>
-              <a:rPr lang="en-US" sz="1600" b="1" dirty="0" smtClean="0"/>
-              <a:t>                  </a:t>
-            </a:r>
-            <a:endParaRPr lang="en-US" sz="1400" b="1" dirty="0"/>
-          </a:p>
-          <a:p>
-            <a:r>
-              <a:rPr lang="en-US" sz="2000" b="1" dirty="0"/>
-              <a:t>Configuration controlled </a:t>
-            </a:r>
-            <a:r>
-              <a:rPr lang="en-US" sz="2000" b="1" dirty="0" smtClean="0"/>
-              <a:t>testing:  </a:t>
-            </a:r>
-            <a:r>
-              <a:rPr lang="en-US" sz="2000" b="1" u="sng" dirty="0" smtClean="0"/>
-              <a:t>Biggest Evolutionary Advance</a:t>
-            </a:r>
-            <a:endParaRPr lang="en-US" sz="2000" b="1" u="sng" dirty="0"/>
-          </a:p>
-          <a:p>
-            <a:pPr lvl="1">
-              <a:lnSpc>
-                <a:spcPct val="100000"/>
+            <a:endParaRPr lang="en-US" sz="2000" b="1" dirty="0"/>
+          </a:p>
+          <a:p>
+            <a:pPr marL="342900" indent="-342900">
+              <a:lnSpc>
+                <a:spcPct val="125000"/>
               </a:lnSpc>
               <a:buFont typeface="Arial" panose="020B0604020202020204" pitchFamily="34" charset="0"/>
               <a:buChar char="•"/>
             </a:pPr>
             <a:r>
-              <a:rPr lang="en-US" sz="1800" b="1" dirty="0"/>
-              <a:t>Evolutionary change in configuration </a:t>
-            </a:r>
-            <a:r>
-              <a:rPr lang="en-US" sz="1800" b="1" dirty="0" smtClean="0"/>
-              <a:t>approach </a:t>
-            </a:r>
-            <a:r>
-              <a:rPr lang="en-US" sz="1800" b="1" dirty="0"/>
-              <a:t>moves </a:t>
-            </a:r>
-            <a:r>
-              <a:rPr lang="en-US" sz="1800" b="1" dirty="0" smtClean="0"/>
-              <a:t>control </a:t>
-            </a:r>
-            <a:r>
-              <a:rPr lang="en-US" sz="1800" b="1" dirty="0"/>
-              <a:t>of what product and state being tested out of the </a:t>
-            </a:r>
-            <a:r>
-              <a:rPr lang="en-US" sz="1800" b="1" dirty="0" smtClean="0"/>
-              <a:t>test script </a:t>
-            </a:r>
-            <a:r>
-              <a:rPr lang="en-US" sz="1800" b="1" dirty="0"/>
-              <a:t>and </a:t>
-            </a:r>
-            <a:r>
-              <a:rPr lang="en-US" sz="1800" b="1" dirty="0" smtClean="0"/>
-              <a:t>into </a:t>
-            </a:r>
-            <a:r>
-              <a:rPr lang="en-US" sz="1800" b="1" dirty="0"/>
-              <a:t>Framework </a:t>
-            </a:r>
-            <a:r>
-              <a:rPr lang="en-US" sz="1800" b="1" dirty="0" smtClean="0"/>
-              <a:t>Configuration</a:t>
-            </a:r>
-            <a:endParaRPr lang="en-US" sz="1800" b="1" dirty="0"/>
-          </a:p>
-          <a:p>
-            <a:endParaRPr lang="en-US" b="1" dirty="0"/>
-          </a:p>
-          <a:p>
-            <a:r>
               <a:rPr lang="en-US" sz="2000" b="1" dirty="0" smtClean="0"/>
-              <a:t>All testing regardless of mode is </a:t>
-            </a:r>
-            <a:r>
-              <a:rPr lang="en-US" sz="2000" b="1" u="sng" dirty="0" smtClean="0"/>
-              <a:t>configurable</a:t>
-            </a:r>
-            <a:r>
-              <a:rPr lang="en-US" sz="2000" b="1" dirty="0" smtClean="0"/>
-              <a:t> prior to run</a:t>
-            </a:r>
-          </a:p>
-          <a:p>
-            <a:pPr lvl="1">
+              <a:t>Provider Directory Engineering will be responsible</a:t>
+            </a:r>
+            <a:endParaRPr lang="en-US" sz="2000" b="1" dirty="0"/>
+          </a:p>
+          <a:p>
+            <a:pPr>
+              <a:lnSpc>
+                <a:spcPct val="125000"/>
+              </a:lnSpc>
+            </a:pPr>
+            <a:endParaRPr lang="en-US" sz="2000" b="1" dirty="0" smtClean="0"/>
+          </a:p>
+          <a:p>
+            <a:pPr marL="342900" indent="-342900">
+              <a:lnSpc>
+                <a:spcPct val="125000"/>
+              </a:lnSpc>
               <a:buFont typeface="Arial" panose="020B0604020202020204" pitchFamily="34" charset="0"/>
               <a:buChar char="•"/>
             </a:pPr>
             <a:r>
-              <a:rPr lang="en-US" sz="1800" b="1" dirty="0" smtClean="0"/>
-              <a:t>Developers use configuration to focus testing on development code</a:t>
-            </a:r>
-          </a:p>
-          <a:p>
-            <a:pPr lvl="1">
+              <a:rPr lang="en-US" sz="2000" b="1" dirty="0" smtClean="0"/>
+              <a:t>Core Technology API Team engineers</a:t>
+            </a:r>
+            <a:endParaRPr lang="en-US" sz="2000" b="1" dirty="0"/>
+          </a:p>
+          <a:p>
+            <a:pPr marL="919163" lvl="1" indent="-342900">
+              <a:lnSpc>
+                <a:spcPct val="125000"/>
+              </a:lnSpc>
               <a:buFont typeface="Arial" panose="020B0604020202020204" pitchFamily="34" charset="0"/>
               <a:buChar char="•"/>
             </a:pPr>
             <a:r>
-              <a:rPr lang="en-US" sz="1800" b="1" dirty="0" smtClean="0"/>
-              <a:t>Gives CXTA ability to test on same deployed code w/out stepping on Dev</a:t>
-            </a:r>
-          </a:p>
-          <a:p>
-            <a:pPr marL="457206" lvl="1" indent="0">
+              <a:rPr lang="en-US" sz="1400" b="1" dirty="0" smtClean="0"/>
+              <a:t>This scripting </a:t>
+            </a:r>
+            <a:r>
+              <a:rPr lang="en-US" sz="1400" b="1" dirty="0"/>
+              <a:t>will be page specific feature level integration </a:t>
+            </a:r>
+            <a:r>
+              <a:rPr lang="en-US" sz="1400" b="1" dirty="0" smtClean="0"/>
+              <a:t>tests</a:t>
+            </a:r>
+          </a:p>
+          <a:p>
+            <a:pPr marL="919163" lvl="1" indent="-342900">
+              <a:lnSpc>
+                <a:spcPct val="125000"/>
+              </a:lnSpc>
+              <a:buFont typeface="Arial" panose="020B0604020202020204" pitchFamily="34" charset="0"/>
+              <a:buChar char="•"/>
+            </a:pPr>
+            <a:r>
+              <a:rPr lang="en-US" sz="1400" b="1" dirty="0" smtClean="0"/>
+              <a:t>REST API test scripting  covers all basic use and edge case work</a:t>
+            </a:r>
+          </a:p>
+          <a:p>
+            <a:pPr marL="342900" indent="-342900">
+              <a:lnSpc>
+                <a:spcPct val="125000"/>
+              </a:lnSpc>
+              <a:buFont typeface="Arial" panose="020B0604020202020204" pitchFamily="34" charset="0"/>
+              <a:buChar char="•"/>
+            </a:pPr>
+            <a:endParaRPr lang="en-US" sz="2000" b="1" dirty="0" smtClean="0"/>
+          </a:p>
+          <a:p>
+            <a:pPr marL="342900" indent="-342900">
+              <a:lnSpc>
+                <a:spcPct val="125000"/>
+              </a:lnSpc>
+              <a:buFont typeface="Arial" panose="020B0604020202020204" pitchFamily="34" charset="0"/>
+              <a:buChar char="•"/>
+            </a:pPr>
+            <a:endParaRPr lang="en-US" sz="2000" b="1" dirty="0"/>
+          </a:p>
+          <a:p>
+            <a:pPr marL="342900" indent="-342900">
+              <a:lnSpc>
+                <a:spcPct val="125000"/>
+              </a:lnSpc>
+              <a:buFont typeface="Arial" panose="020B0604020202020204" pitchFamily="34" charset="0"/>
+              <a:buChar char="•"/>
+            </a:pPr>
+            <a:r>
+              <a:rPr lang="en-US" sz="2000" b="1" dirty="0" smtClean="0"/>
+              <a:t>CXTA </a:t>
+            </a:r>
+            <a:r>
+              <a:rPr lang="en-US" sz="2000" b="1" dirty="0" smtClean="0"/>
+              <a:t>team continues with Use Case End </a:t>
+            </a:r>
+            <a:r>
+              <a:rPr lang="en-US" sz="2000" b="1" dirty="0"/>
+              <a:t>to End test automation </a:t>
+            </a:r>
+            <a:endParaRPr lang="en-US" sz="2000" b="1" dirty="0" smtClean="0"/>
+          </a:p>
+          <a:p>
+            <a:pPr lvl="1" indent="0">
+              <a:lnSpc>
+                <a:spcPct val="125000"/>
+              </a:lnSpc>
               <a:buNone/>
             </a:pPr>
-            <a:r>
-              <a:rPr lang="en-US" sz="1400" dirty="0" smtClean="0"/>
-              <a:t>      </a:t>
-            </a:r>
-            <a:endParaRPr lang="en-US" sz="1400" dirty="0"/>
+            <a:endParaRPr lang="en-US" sz="900" b="1" dirty="0" smtClean="0"/>
           </a:p>
         </p:txBody>
       </p:sp>
     </p:spTree>
     <p:extLst>
       <p:ext uri="{BB962C8B-B14F-4D97-AF65-F5344CB8AC3E}">
-        <p14:creationId xmlns:p14="http://schemas.microsoft.com/office/powerpoint/2010/main" val="3319091546"/>
+        <p14:creationId xmlns:p14="http://schemas.microsoft.com/office/powerpoint/2010/main" val="1248016403"/>
       </p:ext>
     </p:extLst>
   </p:cSld>
@@ -6769,20 +8275,28 @@
         </p:nvSpPr>
         <p:spPr>
           <a:xfrm>
-            <a:off x="1641767" y="129597"/>
-            <a:ext cx="5101934" cy="1325563"/>
+            <a:off x="1526513" y="124691"/>
+            <a:ext cx="6969787" cy="1325563"/>
           </a:xfrm>
         </p:spPr>
         <p:txBody>
-          <a:bodyPr anchor="t"/>
+          <a:bodyPr anchor="t">
+            <a:normAutofit/>
+          </a:bodyPr>
           <a:lstStyle/>
           <a:p>
             <a:pPr algn="ctr"/>
             <a:r>
               <a:rPr lang="en-US" dirty="0" smtClean="0"/>
-              <a:t>REPORTING</a:t>
-            </a:r>
-            <a:endParaRPr lang="en-US" dirty="0"/>
+              <a:t>PROPOSED TIME LINE</a:t>
+            </a:r>
+            <a:endParaRPr lang="en-US" dirty="0">
+              <a:solidFill>
+                <a:schemeClr val="bg1">
+                  <a:lumMod val="85000"/>
+                </a:schemeClr>
+              </a:solidFill>
+            </a:endParaRPr>
           </a:p>
         </p:txBody>
       </p:sp>
@@ -6798,8 +8312,8 @@
         </p:nvSpPr>
         <p:spPr>
           <a:xfrm>
-            <a:off x="432843" y="914091"/>
-            <a:ext cx="3849789" cy="2804461"/>
+            <a:off x="437704" y="1837658"/>
+            <a:ext cx="8567504" cy="5001488"/>
           </a:xfrm>
         </p:spPr>
         <p:txBody>
@@ -6808,59 +8322,120 @@
           </a:bodyPr>
           <a:lstStyle/>
           <a:p>
-            <a:r>
-              <a:rPr lang="en-US" u="sng" dirty="0" smtClean="0"/>
-              <a:t>Three levels </a:t>
-            </a:r>
-            <a:r>
-              <a:rPr lang="en-US" u="sng" dirty="0"/>
-              <a:t>of </a:t>
-            </a:r>
-            <a:r>
-              <a:rPr lang="en-US" u="sng" dirty="0" smtClean="0"/>
-              <a:t>reporting</a:t>
-            </a:r>
-          </a:p>
-          <a:p>
             <a:pPr>
-              <a:spcBef>
-                <a:spcPts val="0"/>
-              </a:spcBef>
-            </a:pPr>
-            <a:r>
-              <a:rPr lang="en-US" sz="400" dirty="0" smtClean="0"/>
-              <a:t>    </a:t>
-            </a:r>
-            <a:endParaRPr lang="en-US" sz="400" dirty="0"/>
-          </a:p>
-          <a:p>
-            <a:r>
-              <a:rPr lang="en-US" b="1" dirty="0" smtClean="0"/>
-              <a:t>Hyper granular</a:t>
-            </a:r>
-            <a:r>
-              <a:rPr lang="en-US" dirty="0" smtClean="0"/>
-              <a:t>:  </a:t>
-            </a:r>
-          </a:p>
-          <a:p>
-            <a:pPr marL="342900" indent="-342900">
+              <a:lnSpc>
+                <a:spcPct val="110000"/>
+              </a:lnSpc>
+            </a:pPr>
+            <a:r>
+              <a:rPr lang="en-US" sz="2000" b="1" dirty="0" smtClean="0"/>
+              <a:t>ROLL OUT &amp; ENGINEERING ADOPTION</a:t>
+            </a:r>
+            <a:endParaRPr lang="en-US" sz="2000" b="1" dirty="0" smtClean="0"/>
+          </a:p>
+          <a:p>
+            <a:pPr lvl="1">
+              <a:lnSpc>
+                <a:spcPct val="110000"/>
+              </a:lnSpc>
               <a:buFont typeface="Arial" panose="020B0604020202020204" pitchFamily="34" charset="0"/>
               <a:buChar char="•"/>
             </a:pPr>
             <a:r>
-              <a:rPr lang="en-US" dirty="0" smtClean="0"/>
-              <a:t>Primary for debugging.</a:t>
-            </a:r>
-          </a:p>
-          <a:p>
-            <a:pPr marL="342900" indent="-342900">
+              <a:rPr lang="en-US" sz="1800" b="1" dirty="0"/>
+              <a:t>Schedule </a:t>
+            </a:r>
+            <a:r>
+              <a:rPr lang="en-US" sz="1800" b="1" dirty="0" smtClean="0"/>
+              <a:t>Based : </a:t>
+            </a:r>
+            <a:r>
+              <a:rPr lang="en-US" sz="1200" b="1" dirty="0" smtClean="0"/>
+              <a:t> </a:t>
+            </a:r>
+            <a:r>
+              <a:rPr lang="en-US" sz="1200" b="1" dirty="0" err="1" smtClean="0"/>
+              <a:t>Cron</a:t>
+            </a:r>
+            <a:endParaRPr lang="en-US" sz="1200" b="1" dirty="0" smtClean="0"/>
+          </a:p>
+          <a:p>
+            <a:pPr lvl="1">
+              <a:lnSpc>
+                <a:spcPct val="110000"/>
+              </a:lnSpc>
               <a:buFont typeface="Arial" panose="020B0604020202020204" pitchFamily="34" charset="0"/>
               <a:buChar char="•"/>
             </a:pPr>
             <a:r>
-              <a:rPr lang="en-US" dirty="0" smtClean="0"/>
-              <a:t>Covers every Assert or comparison in Framework</a:t>
+              <a:rPr lang="en-US" sz="1800" b="1" dirty="0" smtClean="0"/>
+              <a:t>On Demand : </a:t>
+            </a:r>
+            <a:r>
+              <a:rPr lang="en-US" sz="1200" b="1" dirty="0" smtClean="0"/>
+              <a:t> - Jenkins</a:t>
+            </a:r>
+          </a:p>
+          <a:p>
+            <a:pPr marL="457206" lvl="1" indent="0">
+              <a:lnSpc>
+                <a:spcPct val="110000"/>
+              </a:lnSpc>
+              <a:buNone/>
+            </a:pPr>
+            <a:r>
+              <a:rPr lang="en-US" sz="1600" b="1" dirty="0" smtClean="0"/>
+              <a:t>                  </a:t>
+            </a:r>
+            <a:endParaRPr lang="en-US" sz="1400" b="1" dirty="0"/>
+          </a:p>
+          <a:p>
+            <a:r>
+              <a:rPr lang="en-US" sz="2000" b="1" dirty="0"/>
+              <a:t>Configuration controlled </a:t>
+            </a:r>
+            <a:r>
+              <a:rPr lang="en-US" sz="2000" b="1" dirty="0" smtClean="0"/>
+              <a:t>t</a:t>
+            </a:r>
+            <a:endParaRPr lang="en-US" sz="2000" b="1" u="sng" dirty="0" smtClean="0"/>
+          </a:p>
+          <a:p>
+            <a:pPr lvl="1">
+              <a:lnSpc>
+                <a:spcPct val="100000"/>
+              </a:lnSpc>
+              <a:buFont typeface="Arial" panose="020B0604020202020204" pitchFamily="34" charset="0"/>
+              <a:buChar char="•"/>
+            </a:pPr>
+            <a:r>
+              <a:rPr lang="en-US" sz="1800" b="1" dirty="0" smtClean="0"/>
+              <a:t>Evolutionary change </a:t>
+            </a:r>
+            <a:r>
+              <a:rPr lang="en-US" sz="1800" b="1" dirty="0" err="1" smtClean="0"/>
+              <a:t>cript</a:t>
+            </a:r>
+            <a:r>
+              <a:rPr lang="en-US" sz="1800" b="1" dirty="0" smtClean="0"/>
+              <a:t> and into Framework Configuration</a:t>
+            </a:r>
+          </a:p>
+          <a:p>
+            <a:endParaRPr lang="en-US" b="1" dirty="0"/>
+          </a:p>
+          <a:p>
+            <a:r>
+              <a:rPr lang="en-US" sz="2000" b="1" dirty="0" smtClean="0"/>
+              <a:t>All testing </a:t>
+            </a:r>
+            <a:r>
+              <a:rPr lang="en-US" sz="2000" b="1" dirty="0" smtClean="0"/>
+              <a:t>or </a:t>
+            </a:r>
+            <a:r>
+              <a:rPr lang="en-US" sz="2000" b="1" dirty="0" smtClean="0"/>
+              <a:t>to run</a:t>
             </a:r>
           </a:p>
           <a:p>
@@ -6869,76 +8444,56 @@
               <a:buChar char="•"/>
             </a:pPr>
             <a:r>
-              <a:rPr lang="en-US" dirty="0" smtClean="0"/>
-              <a:t>Debugging and Framework Development tool</a:t>
-            </a:r>
+              <a:rPr lang="en-US" sz="1800" b="1" dirty="0" smtClean="0"/>
+              <a:t>Developers use </a:t>
+            </a:r>
+            <a:r>
+              <a:rPr lang="en-US" sz="1800" b="1" dirty="0" err="1" smtClean="0"/>
+              <a:t>cdevelopment</a:t>
+            </a:r>
+            <a:r>
+              <a:rPr lang="en-US" sz="1800" b="1" dirty="0" smtClean="0"/>
+              <a:t> </a:t>
+            </a:r>
+            <a:r>
+              <a:rPr lang="en-US" sz="1800" b="1" dirty="0" smtClean="0"/>
+              <a:t>code</a:t>
+            </a:r>
+          </a:p>
+          <a:p>
+            <a:pPr lvl="1">
+              <a:buFont typeface="Arial" panose="020B0604020202020204" pitchFamily="34" charset="0"/>
+              <a:buChar char="•"/>
+            </a:pPr>
+            <a:r>
+              <a:rPr lang="en-US" sz="1800" b="1" dirty="0" smtClean="0"/>
+              <a:t>Gives CXTA </a:t>
+            </a:r>
+            <a:r>
+              <a:rPr lang="en-US" sz="1800" b="1" dirty="0" smtClean="0"/>
+              <a:t>w/out </a:t>
+            </a:r>
+            <a:r>
+              <a:rPr lang="en-US" sz="1800" b="1" dirty="0" smtClean="0"/>
+              <a:t>stepping on Dev</a:t>
+            </a:r>
+          </a:p>
+          <a:p>
+            <a:pPr marL="457206" lvl="1" indent="0">
+              <a:buNone/>
+            </a:pPr>
+            <a:r>
+              <a:rPr lang="en-US" sz="1400" dirty="0" smtClean="0"/>
+              <a:t>      </a:t>
+            </a:r>
+            <a:endParaRPr lang="en-US" sz="1400" dirty="0"/>
           </a:p>
         </p:txBody>
       </p:sp>
-      <p:pic>
-        <p:nvPicPr>
-          <p:cNvPr id="4" name="Picture 3"/>
-          <p:cNvPicPr>
-            <a:picLocks noChangeAspect="1"/>
-          </p:cNvPicPr>
-          <p:nvPr/>
-        </p:nvPicPr>
-        <p:blipFill>
-          <a:blip r:embed="rId2">
-            <a:extLst>
-              <a:ext uri="{28A0092B-C50C-407E-A947-70E740481C1C}">
-                <a14:useLocalDpi xmlns:a14="http://schemas.microsoft.com/office/drawing/2010/main" val="0"/>
-              </a:ext>
-            </a:extLst>
-          </a:blip>
-          <a:stretch>
-            <a:fillRect/>
-          </a:stretch>
-        </p:blipFill>
-        <p:spPr>
-          <a:xfrm>
-            <a:off x="4484914" y="942849"/>
-            <a:ext cx="4620610" cy="5744818"/>
-          </a:xfrm>
-          <a:prstGeom prst="rect">
-            <a:avLst/>
-          </a:prstGeom>
-        </p:spPr>
-      </p:pic>
-      <p:pic>
-        <p:nvPicPr>
-          <p:cNvPr id="5" name="Picture 4"/>
-          <p:cNvPicPr>
-            <a:picLocks noChangeAspect="1"/>
-          </p:cNvPicPr>
-          <p:nvPr/>
-        </p:nvPicPr>
-        <p:blipFill>
-          <a:blip r:embed="rId3">
-            <a:extLst>
-              <a:ext uri="{28A0092B-C50C-407E-A947-70E740481C1C}">
-                <a14:useLocalDpi xmlns:a14="http://schemas.microsoft.com/office/drawing/2010/main" val="0"/>
-              </a:ext>
-            </a:extLst>
-          </a:blip>
-          <a:stretch>
-            <a:fillRect/>
-          </a:stretch>
-        </p:blipFill>
-        <p:spPr>
-          <a:xfrm>
-            <a:off x="330483" y="4023360"/>
-            <a:ext cx="4285060" cy="2807063"/>
-          </a:xfrm>
-          <a:prstGeom prst="rect">
-            <a:avLst/>
-          </a:prstGeom>
-        </p:spPr>
-      </p:pic>
     </p:spTree>
     <p:extLst>
       <p:ext uri="{BB962C8B-B14F-4D97-AF65-F5344CB8AC3E}">
-        <p14:creationId xmlns:p14="http://schemas.microsoft.com/office/powerpoint/2010/main" val="21198343"/>
+        <p14:creationId xmlns:p14="http://schemas.microsoft.com/office/powerpoint/2010/main" val="3319091546"/>
       </p:ext>
     </p:extLst>
   </p:cSld>
@@ -6984,20 +8539,32 @@
         </p:nvSpPr>
         <p:spPr>
           <a:xfrm>
-            <a:off x="1641767" y="129597"/>
-            <a:ext cx="5101934" cy="1325563"/>
+            <a:off x="1526513" y="124691"/>
+            <a:ext cx="5240047" cy="1325563"/>
           </a:xfrm>
         </p:spPr>
         <p:txBody>
-          <a:bodyPr anchor="t"/>
+          <a:bodyPr anchor="t">
+            <a:normAutofit/>
+          </a:bodyPr>
           <a:lstStyle/>
           <a:p>
             <a:pPr algn="ctr"/>
             <a:r>
               <a:rPr lang="en-US" dirty="0" smtClean="0"/>
-              <a:t>REPORTING</a:t>
-            </a:r>
-            <a:endParaRPr lang="en-US" dirty="0"/>
+              <a:t>TEST </a:t>
+            </a:r>
+            <a:r>
+              <a:rPr lang="en-US" dirty="0" smtClean="0"/>
+              <a:t>EXECUTION  </a:t>
+            </a:r>
+            <a:endParaRPr lang="en-US" dirty="0">
+              <a:solidFill>
+                <a:schemeClr val="bg1">
+                  <a:lumMod val="85000"/>
+                </a:schemeClr>
+              </a:solidFill>
+            </a:endParaRPr>
           </a:p>
         </p:txBody>
       </p:sp>
@@ -7013,129 +8580,205 @@
         </p:nvSpPr>
         <p:spPr>
           <a:xfrm>
-            <a:off x="432843" y="914087"/>
-            <a:ext cx="4860517" cy="2337113"/>
+            <a:off x="437704" y="1837658"/>
+            <a:ext cx="8567504" cy="5001488"/>
           </a:xfrm>
         </p:spPr>
         <p:txBody>
-          <a:bodyPr/>
+          <a:bodyPr>
+            <a:normAutofit/>
+          </a:bodyPr>
           <a:lstStyle/>
           <a:p>
-            <a:r>
-              <a:rPr lang="en-US" u="sng" dirty="0"/>
-              <a:t>Three levels of </a:t>
-            </a:r>
-            <a:r>
-              <a:rPr lang="en-US" u="sng" dirty="0" smtClean="0"/>
-              <a:t>reporting</a:t>
-            </a:r>
-          </a:p>
-          <a:p>
             <a:pPr>
-              <a:spcBef>
-                <a:spcPts val="0"/>
-              </a:spcBef>
-            </a:pPr>
-            <a:r>
-              <a:rPr lang="en-US" sz="800" dirty="0"/>
-              <a:t> </a:t>
-            </a:r>
-            <a:endParaRPr lang="en-US" u="sng" dirty="0"/>
-          </a:p>
-          <a:p>
-            <a:pPr indent="-234950"/>
-            <a:r>
-              <a:rPr lang="en-US" b="1" dirty="0" smtClean="0"/>
-              <a:t>Test Run Specific</a:t>
-            </a:r>
-            <a:r>
-              <a:rPr lang="en-US" dirty="0" smtClean="0"/>
-              <a:t>:  </a:t>
-            </a:r>
-          </a:p>
-          <a:p>
-            <a:pPr indent="-234950"/>
-            <a:r>
-              <a:rPr lang="en-US" dirty="0" smtClean="0"/>
-              <a:t>Test Function Pass / Fail </a:t>
-            </a:r>
-          </a:p>
-          <a:p>
-            <a:pPr marL="684213" lvl="1" indent="-342900">
+              <a:lnSpc>
+                <a:spcPct val="110000"/>
+              </a:lnSpc>
+            </a:pPr>
+            <a:r>
+              <a:rPr lang="en-US" sz="2000" b="1" dirty="0" smtClean="0"/>
+              <a:t>Two primary modes</a:t>
+            </a:r>
+          </a:p>
+          <a:p>
+            <a:pPr lvl="1">
+              <a:lnSpc>
+                <a:spcPct val="110000"/>
+              </a:lnSpc>
               <a:buFont typeface="Arial" panose="020B0604020202020204" pitchFamily="34" charset="0"/>
               <a:buChar char="•"/>
             </a:pPr>
             <a:r>
-              <a:rPr lang="en-US" dirty="0" smtClean="0"/>
-              <a:t>Current Standard test run encompassing test specific data and testRun specifics</a:t>
-            </a:r>
+              <a:rPr lang="en-US" sz="1800" b="1" dirty="0"/>
+              <a:t>Schedule Based : Covers Regression </a:t>
+            </a:r>
+            <a:r>
+              <a:rPr lang="en-US" sz="1800" b="1" dirty="0" smtClean="0"/>
+              <a:t>Testing  </a:t>
+            </a:r>
+            <a:r>
+              <a:rPr lang="en-US" sz="1200" b="1" dirty="0" smtClean="0"/>
+              <a:t>MOT - </a:t>
+            </a:r>
+            <a:r>
+              <a:rPr lang="en-US" sz="1200" b="1" dirty="0" err="1" smtClean="0"/>
+              <a:t>Cron</a:t>
+            </a:r>
+            <a:endParaRPr lang="en-US" sz="1200" b="1" dirty="0"/>
+          </a:p>
+          <a:p>
+            <a:pPr lvl="1">
+              <a:lnSpc>
+                <a:spcPct val="110000"/>
+              </a:lnSpc>
+              <a:buFont typeface="Arial" panose="020B0604020202020204" pitchFamily="34" charset="0"/>
+              <a:buChar char="•"/>
+            </a:pPr>
+            <a:r>
+              <a:rPr lang="en-US" sz="1800" b="1" dirty="0"/>
+              <a:t>On Demand : Covers all developer build initiated </a:t>
+            </a:r>
+            <a:r>
+              <a:rPr lang="en-US" sz="1800" b="1" dirty="0" smtClean="0"/>
+              <a:t>testing  </a:t>
+            </a:r>
+            <a:r>
+              <a:rPr lang="en-US" sz="1200" b="1" dirty="0" smtClean="0"/>
+              <a:t>DIT - Jenkins</a:t>
+            </a:r>
+            <a:endParaRPr lang="en-US" sz="1200" b="1" dirty="0"/>
+          </a:p>
+          <a:p>
+            <a:pPr marL="457206" lvl="1" indent="0">
+              <a:lnSpc>
+                <a:spcPct val="110000"/>
+              </a:lnSpc>
+              <a:buNone/>
+            </a:pPr>
+            <a:r>
+              <a:rPr lang="en-US" sz="1600" b="1" dirty="0" smtClean="0"/>
+              <a:t>                  </a:t>
+            </a:r>
+            <a:endParaRPr lang="en-US" sz="1400" b="1" dirty="0"/>
+          </a:p>
+          <a:p>
+            <a:r>
+              <a:rPr lang="en-US" sz="2000" b="1" dirty="0"/>
+              <a:t>Configuration controlled </a:t>
+            </a:r>
+            <a:r>
+              <a:rPr lang="en-US" sz="2000" b="1" dirty="0" smtClean="0"/>
+              <a:t>testing:  </a:t>
+            </a:r>
+            <a:r>
+              <a:rPr lang="en-US" sz="2000" b="1" u="sng" dirty="0" smtClean="0"/>
+              <a:t>Biggest Evolutionary Advance</a:t>
+            </a:r>
+            <a:endParaRPr lang="en-US" sz="2000" b="1" u="sng" dirty="0"/>
+          </a:p>
+          <a:p>
+            <a:pPr lvl="1">
+              <a:lnSpc>
+                <a:spcPct val="100000"/>
+              </a:lnSpc>
+              <a:buFont typeface="Arial" panose="020B0604020202020204" pitchFamily="34" charset="0"/>
+              <a:buChar char="•"/>
+            </a:pPr>
+            <a:r>
+              <a:rPr lang="en-US" sz="1800" b="1" dirty="0"/>
+              <a:t>Evolutionary change in configuration </a:t>
+            </a:r>
+            <a:r>
+              <a:rPr lang="en-US" sz="1800" b="1" dirty="0" smtClean="0"/>
+              <a:t>approach </a:t>
+            </a:r>
+            <a:r>
+              <a:rPr lang="en-US" sz="1800" b="1" dirty="0"/>
+              <a:t>moves </a:t>
+            </a:r>
+            <a:r>
+              <a:rPr lang="en-US" sz="1800" b="1" dirty="0" smtClean="0"/>
+              <a:t>control </a:t>
+            </a:r>
+            <a:r>
+              <a:rPr lang="en-US" sz="1800" b="1" dirty="0"/>
+              <a:t>of what product and state being tested out of the </a:t>
+            </a:r>
+            <a:r>
+              <a:rPr lang="en-US" sz="1800" b="1" dirty="0" smtClean="0"/>
+              <a:t>test script </a:t>
+            </a:r>
+            <a:r>
+              <a:rPr lang="en-US" sz="1800" b="1" dirty="0"/>
+              <a:t>and </a:t>
+            </a:r>
+            <a:r>
+              <a:rPr lang="en-US" sz="1800" b="1" dirty="0" smtClean="0"/>
+              <a:t>into </a:t>
+            </a:r>
+            <a:r>
+              <a:rPr lang="en-US" sz="1800" b="1" dirty="0"/>
+              <a:t>Framework </a:t>
+            </a:r>
+            <a:r>
+              <a:rPr lang="en-US" sz="1800" b="1" dirty="0" smtClean="0"/>
+              <a:t>Configuration</a:t>
+            </a:r>
+            <a:endParaRPr lang="en-US" sz="1800" b="1" dirty="0"/>
+          </a:p>
+          <a:p>
+            <a:endParaRPr lang="en-US" b="1" dirty="0"/>
+          </a:p>
+          <a:p>
+            <a:r>
+              <a:rPr lang="en-US" sz="2000" b="1" dirty="0" smtClean="0"/>
+              <a:t>All testing regardless of mode is </a:t>
+            </a:r>
+            <a:r>
+              <a:rPr lang="en-US" sz="2000" b="1" u="sng" dirty="0" smtClean="0"/>
+              <a:t>configurable</a:t>
+            </a:r>
+            <a:r>
+              <a:rPr lang="en-US" sz="2000" b="1" dirty="0" smtClean="0"/>
+              <a:t> prior to run</a:t>
+            </a:r>
+          </a:p>
+          <a:p>
+            <a:pPr lvl="1">
+              <a:buFont typeface="Arial" panose="020B0604020202020204" pitchFamily="34" charset="0"/>
+              <a:buChar char="•"/>
+            </a:pPr>
+            <a:r>
+              <a:rPr lang="en-US" sz="1800" b="1" dirty="0" smtClean="0"/>
+              <a:t>Developers use configuration to focus testing on development code</a:t>
+            </a:r>
+          </a:p>
+          <a:p>
+            <a:pPr lvl="1">
+              <a:buFont typeface="Arial" panose="020B0604020202020204" pitchFamily="34" charset="0"/>
+              <a:buChar char="•"/>
+            </a:pPr>
+            <a:r>
+              <a:rPr lang="en-US" sz="1800" b="1" dirty="0" smtClean="0"/>
+              <a:t>Gives CXTA ability to test on same deployed code w/out stepping on Dev</a:t>
+            </a:r>
+          </a:p>
+          <a:p>
+            <a:pPr marL="457206" lvl="1" indent="0">
+              <a:buNone/>
+            </a:pPr>
+            <a:r>
+              <a:rPr lang="en-US" sz="1400" dirty="0" smtClean="0"/>
+              <a:t>      </a:t>
+            </a:r>
+            <a:endParaRPr lang="en-US" sz="1400" dirty="0"/>
           </a:p>
         </p:txBody>
       </p:sp>
-      <p:pic>
-        <p:nvPicPr>
-          <p:cNvPr id="5" name="Picture 4"/>
-          <p:cNvPicPr>
-            <a:picLocks noChangeAspect="1"/>
-          </p:cNvPicPr>
-          <p:nvPr/>
-        </p:nvPicPr>
-        <p:blipFill>
-          <a:blip r:embed="rId2">
-            <a:extLst>
-              <a:ext uri="{28A0092B-C50C-407E-A947-70E740481C1C}">
-                <a14:useLocalDpi xmlns:a14="http://schemas.microsoft.com/office/drawing/2010/main" val="0"/>
-              </a:ext>
-            </a:extLst>
-          </a:blip>
-          <a:stretch>
-            <a:fillRect/>
-          </a:stretch>
-        </p:blipFill>
-        <p:spPr>
-          <a:xfrm>
-            <a:off x="5428527" y="832327"/>
-            <a:ext cx="3599233" cy="6025673"/>
-          </a:xfrm>
-          <a:prstGeom prst="rect">
-            <a:avLst/>
-          </a:prstGeom>
-        </p:spPr>
-      </p:pic>
-      <p:pic>
-        <p:nvPicPr>
-          <p:cNvPr id="6" name="Picture 5"/>
-          <p:cNvPicPr>
-            <a:picLocks noChangeAspect="1"/>
-          </p:cNvPicPr>
-          <p:nvPr/>
-        </p:nvPicPr>
-        <p:blipFill>
-          <a:blip r:embed="rId3">
-            <a:extLst>
-              <a:ext uri="{28A0092B-C50C-407E-A947-70E740481C1C}">
-                <a14:useLocalDpi xmlns:a14="http://schemas.microsoft.com/office/drawing/2010/main" val="0"/>
-              </a:ext>
-            </a:extLst>
-          </a:blip>
-          <a:stretch>
-            <a:fillRect/>
-          </a:stretch>
-        </p:blipFill>
-        <p:spPr>
-          <a:xfrm>
-            <a:off x="321831" y="3429000"/>
-            <a:ext cx="5082540" cy="2811780"/>
-          </a:xfrm>
-          <a:prstGeom prst="rect">
-            <a:avLst/>
-          </a:prstGeom>
-        </p:spPr>
-      </p:pic>
     </p:spTree>
     <p:extLst>
       <p:ext uri="{BB962C8B-B14F-4D97-AF65-F5344CB8AC3E}">
-        <p14:creationId xmlns:p14="http://schemas.microsoft.com/office/powerpoint/2010/main" val="3243345129"/>
+        <p14:creationId xmlns:p14="http://schemas.microsoft.com/office/powerpoint/2010/main" val="21906337"/>
       </p:ext>
     </p:extLst>
   </p:cSld>
@@ -7785,6 +9428,27 @@
 </file>
 
 <file path=customXml/item2.xml><?xml version="1.0" encoding="utf-8"?>
+<?mso-contentType ?>
+<FormTemplates xmlns="http://schemas.microsoft.com/sharepoint/v3/contenttype/forms">
+  <Display>DocumentLibraryForm</Display>
+  <Edit>DocumentLibraryForm</Edit>
+  <New>DocumentLibraryForm</New>
+</FormTemplates>
+</file>
+
+<file path=customXml/item3.xml><?xml version="1.0" encoding="utf-8"?>
+<p:properties xmlns:p="http://schemas.microsoft.com/office/2006/metadata/properties" xmlns:xsi="http://www.w3.org/2001/XMLSchema-instance" xmlns:pc="http://schemas.microsoft.com/office/infopath/2007/PartnerControls">
+  <documentManagement>
+    <_dlc_DocId xmlns="a9328eaf-6333-4034-a7ce-997665b5f80d">6AH7XJTKT27D-494-2</_dlc_DocId>
+    <_dlc_DocIdUrl xmlns="a9328eaf-6333-4034-a7ce-997665b5f80d">
+      <Url>http://itportal/sites/PMD/presentations/_layouts/DocIdRedir.aspx?ID=6AH7XJTKT27D-494-2</Url>
+      <Description>6AH7XJTKT27D-494-2</Description>
+    </_dlc_DocIdUrl>
+  </documentManagement>
+</p:properties>
+</file>
+
+<file path=customXml/item4.xml><?xml version="1.0" encoding="utf-8"?>
 <ct:contentTypeSchema xmlns:ct="http://schemas.microsoft.com/office/2006/metadata/contentType" xmlns:ma="http://schemas.microsoft.com/office/2006/metadata/properties/metaAttributes" ct:_="" ma:_="" ma:contentTypeName="Document" ma:contentTypeID="0x0101000F421C3DE11F24489C3C49A9442BEF44" ma:contentTypeVersion="0" ma:contentTypeDescription="Create a new document." ma:contentTypeScope="" ma:versionID="03fa29219166c606cfec6c1a2cbf2ee4">
   <xsd:schema xmlns:xsd="http://www.w3.org/2001/XMLSchema" xmlns:xs="http://www.w3.org/2001/XMLSchema" xmlns:p="http://schemas.microsoft.com/office/2006/metadata/properties" xmlns:ns2="a9328eaf-6333-4034-a7ce-997665b5f80d" targetNamespace="http://schemas.microsoft.com/office/2006/metadata/properties" ma:root="true" ma:fieldsID="40f1611e01294dd1c52f51bc3dec7bd7" ns2:_="">
     <xsd:import namespace="a9328eaf-6333-4034-a7ce-997665b5f80d"/>
@@ -7929,27 +9593,6 @@
 </ct:contentTypeSchema>
 </file>
 
-<file path=customXml/item3.xml><?xml version="1.0" encoding="utf-8"?>
-<p:properties xmlns:p="http://schemas.microsoft.com/office/2006/metadata/properties" xmlns:xsi="http://www.w3.org/2001/XMLSchema-instance" xmlns:pc="http://schemas.microsoft.com/office/infopath/2007/PartnerControls">
-  <documentManagement>
-    <_dlc_DocId xmlns="a9328eaf-6333-4034-a7ce-997665b5f80d">6AH7XJTKT27D-494-2</_dlc_DocId>
-    <_dlc_DocIdUrl xmlns="a9328eaf-6333-4034-a7ce-997665b5f80d">
-      <Url>http://itportal/sites/PMD/presentations/_layouts/DocIdRedir.aspx?ID=6AH7XJTKT27D-494-2</Url>
-      <Description>6AH7XJTKT27D-494-2</Description>
-    </_dlc_DocIdUrl>
-  </documentManagement>
-</p:properties>
-</file>
-
-<file path=customXml/item4.xml><?xml version="1.0" encoding="utf-8"?>
-<?mso-contentType ?>
-<FormTemplates xmlns="http://schemas.microsoft.com/sharepoint/v3/contenttype/forms">
-  <Display>DocumentLibraryForm</Display>
-  <Edit>DocumentLibraryForm</Edit>
-  <New>DocumentLibraryForm</New>
-</FormTemplates>
-</file>
-
 <file path=customXml/itemProps1.xml><?xml version="1.0" encoding="utf-8"?>
 <ds:datastoreItem xmlns:ds="http://schemas.openxmlformats.org/officeDocument/2006/customXml" ds:itemID="{8CB52003-E8CD-4DF2-932F-2EC7EF4DD677}">
   <ds:schemaRefs>
@@ -7959,19 +9602,9 @@
 </file>
 
 <file path=customXml/itemProps2.xml><?xml version="1.0" encoding="utf-8"?>
-<ds:datastoreItem xmlns:ds="http://schemas.openxmlformats.org/officeDocument/2006/customXml" ds:itemID="{EF7533AB-0193-4AEC-8EC4-E6A274EB1992}">
+<ds:datastoreItem xmlns:ds="http://schemas.openxmlformats.org/officeDocument/2006/customXml" ds:itemID="{E9FEC3C6-DD16-422A-B8AE-8B104F632898}">
   <ds:schemaRefs>
-    <ds:schemaRef ds:uri="http://schemas.microsoft.com/office/2006/metadata/contentType"/>
-    <ds:schemaRef ds:uri="http://schemas.microsoft.com/office/2006/metadata/properties/metaAttributes"/>
-    <ds:schemaRef ds:uri="http://www.w3.org/2001/XMLSchema"/>
-    <ds:schemaRef ds:uri="http://schemas.microsoft.com/office/2006/metadata/properties"/>
-    <ds:schemaRef ds:uri="a9328eaf-6333-4034-a7ce-997665b5f80d"/>
-    <ds:schemaRef ds:uri="http://schemas.microsoft.com/office/2006/documentManagement/types"/>
-    <ds:schemaRef ds:uri="http://schemas.microsoft.com/office/infopath/2007/PartnerControls"/>
-    <ds:schemaRef ds:uri="http://schemas.openxmlformats.org/package/2006/metadata/core-properties"/>
-    <ds:schemaRef ds:uri="http://purl.org/dc/elements/1.1/"/>
-    <ds:schemaRef ds:uri="http://purl.org/dc/terms/"/>
-    <ds:schemaRef ds:uri="http://schemas.microsoft.com/internal/obd"/>
+    <ds:schemaRef ds:uri="http://schemas.microsoft.com/sharepoint/v3/contenttype/forms"/>
   </ds:schemaRefs>
 </ds:datastoreItem>
 </file>
@@ -7993,9 +9626,19 @@
 </file>
 
 <file path=customXml/itemProps4.xml><?xml version="1.0" encoding="utf-8"?>
-<ds:datastoreItem xmlns:ds="http://schemas.openxmlformats.org/officeDocument/2006/customXml" ds:itemID="{E9FEC3C6-DD16-422A-B8AE-8B104F632898}">
+<ds:datastoreItem xmlns:ds="http://schemas.openxmlformats.org/officeDocument/2006/customXml" ds:itemID="{EF7533AB-0193-4AEC-8EC4-E6A274EB1992}">
   <ds:schemaRefs>
-    <ds:schemaRef ds:uri="http://schemas.microsoft.com/sharepoint/v3/contenttype/forms"/>
+    <ds:schemaRef ds:uri="http://schemas.microsoft.com/office/2006/metadata/contentType"/>
+    <ds:schemaRef ds:uri="http://schemas.microsoft.com/office/2006/metadata/properties/metaAttributes"/>
+    <ds:schemaRef ds:uri="http://www.w3.org/2001/XMLSchema"/>
+    <ds:schemaRef ds:uri="http://schemas.microsoft.com/office/2006/metadata/properties"/>
+    <ds:schemaRef ds:uri="a9328eaf-6333-4034-a7ce-997665b5f80d"/>
+    <ds:schemaRef ds:uri="http://schemas.microsoft.com/office/2006/documentManagement/types"/>
+    <ds:schemaRef ds:uri="http://schemas.microsoft.com/office/infopath/2007/PartnerControls"/>
+    <ds:schemaRef ds:uri="http://schemas.openxmlformats.org/package/2006/metadata/core-properties"/>
+    <ds:schemaRef ds:uri="http://purl.org/dc/elements/1.1/"/>
+    <ds:schemaRef ds:uri="http://purl.org/dc/terms/"/>
+    <ds:schemaRef ds:uri="http://schemas.microsoft.com/internal/obd"/>
   </ds:schemaRefs>
 </ds:datastoreItem>
 </file>
</xml_diff>

<commit_message>
3/19/18 capture work and std util configs
</commit_message>
<xml_diff>
--- a/CurrentWork_Delta/CX_StrategyPowerPoint.pptx
+++ b/CurrentWork_Delta/CX_StrategyPowerPoint.pptx
@@ -138,6 +138,9 @@
         </p15:guide>
       </p15:sldGuideLst>
     </p:ext>
+    <p:ext uri="{2D200454-40CA-4A62-9FC3-DE9A4176ACB9}">
+      <p15:notesGuideLst xmlns:p15="http://schemas.microsoft.com/office/powerpoint/2012/main"/>
+    </p:ext>
   </p:extLst>
 </p:presentation>
 </file>
@@ -224,7 +227,7 @@
           <a:p>
             <a:fld id="{7195FF61-7FDF-4F4D-A3AE-3078F9B9BE1D}" type="datetimeFigureOut">
               <a:rPr lang="en-US" smtClean="0"/>
-              <a:t>3/16/2018</a:t>
+              <a:t>3/19/2018</a:t>
             </a:fld>
             <a:endParaRPr lang="en-US"/>
           </a:p>
@@ -2277,7 +2280,6 @@
               <a:rPr lang="en-US" sz="2800" dirty="0" smtClean="0"/>
               <a:t>Test Execution</a:t>
             </a:r>
-            <a:endParaRPr lang="en-US" sz="2800" dirty="0" smtClean="0"/>
           </a:p>
           <a:p>
             <a:pPr algn="ctr"/>
@@ -2358,11 +2360,7 @@
             <a:pPr algn="ctr"/>
             <a:r>
               <a:rPr lang="en-US" dirty="0" smtClean="0"/>
-              <a:t>TESTING TYPES</a:t>
-            </a:r>
-            <a:r>
-              <a:rPr lang="en-US" dirty="0" smtClean="0"/>
-              <a:t>  </a:t>
+              <a:t>TESTING TYPES  </a:t>
             </a:r>
             <a:endParaRPr lang="en-US" dirty="0">
               <a:solidFill>
@@ -2386,7 +2384,7 @@
         </p:nvSpPr>
         <p:spPr>
           <a:xfrm>
-            <a:off x="437704" y="1837658"/>
+            <a:off x="275144" y="1746218"/>
             <a:ext cx="8567504" cy="5001488"/>
           </a:xfrm>
         </p:spPr>
@@ -2396,22 +2394,29 @@
           </a:bodyPr>
           <a:lstStyle/>
           <a:p>
-            <a:pPr>
-              <a:lnSpc>
-                <a:spcPct val="110000"/>
-              </a:lnSpc>
+            <a:pPr marL="342900" indent="-342900">
+              <a:lnSpc>
+                <a:spcPct val="150000"/>
+              </a:lnSpc>
+              <a:spcBef>
+                <a:spcPts val="0"/>
+              </a:spcBef>
+              <a:buFont typeface="Arial" panose="020B0604020202020204" pitchFamily="34" charset="0"/>
+              <a:buChar char="•"/>
             </a:pPr>
             <a:r>
               <a:rPr lang="en-US" sz="2000" b="1" dirty="0" smtClean="0"/>
               <a:t>Three primary types of testing</a:t>
             </a:r>
-            <a:endParaRPr lang="en-US" sz="2000" b="1" dirty="0" smtClean="0"/>
           </a:p>
           <a:p>
             <a:pPr lvl="1">
               <a:lnSpc>
-                <a:spcPct val="110000"/>
-              </a:lnSpc>
+                <a:spcPct val="150000"/>
+              </a:lnSpc>
+              <a:spcBef>
+                <a:spcPts val="0"/>
+              </a:spcBef>
               <a:buFont typeface="Arial" panose="020B0604020202020204" pitchFamily="34" charset="0"/>
               <a:buChar char="•"/>
             </a:pPr>
@@ -2423,18 +2428,17 @@
           <a:p>
             <a:pPr lvl="2">
               <a:lnSpc>
-                <a:spcPct val="110000"/>
-              </a:lnSpc>
+                <a:spcPct val="150000"/>
+              </a:lnSpc>
+              <a:spcBef>
+                <a:spcPts val="0"/>
+              </a:spcBef>
               <a:buFont typeface="Arial" panose="020B0604020202020204" pitchFamily="34" charset="0"/>
               <a:buChar char="•"/>
             </a:pPr>
             <a:r>
               <a:rPr lang="en-US" sz="1400" b="1" dirty="0" smtClean="0"/>
-              <a:t>Complete </a:t>
-            </a:r>
-            <a:r>
-              <a:rPr lang="en-US" sz="1400" b="1" dirty="0" smtClean="0"/>
-              <a:t>page element analysis</a:t>
+              <a:t>Complete page element analysis</a:t>
             </a:r>
             <a:r>
               <a:rPr lang="en-US" sz="1400" b="1" dirty="0"/>
@@ -2448,8 +2452,11 @@
           <a:p>
             <a:pPr lvl="2">
               <a:lnSpc>
-                <a:spcPct val="110000"/>
-              </a:lnSpc>
+                <a:spcPct val="150000"/>
+              </a:lnSpc>
+              <a:spcBef>
+                <a:spcPts val="0"/>
+              </a:spcBef>
               <a:buFont typeface="Arial" panose="020B0604020202020204" pitchFamily="34" charset="0"/>
               <a:buChar char="•"/>
             </a:pPr>
@@ -2463,19 +2470,17 @@
             </a:r>
             <a:r>
               <a:rPr lang="en-US" sz="1400" b="1" dirty="0" smtClean="0"/>
-              <a:t>, Link, etc.  </a:t>
-            </a:r>
-            <a:r>
-              <a:rPr lang="en-US" sz="1400" b="1" dirty="0" smtClean="0"/>
-              <a:t>Functionally evaluated and error checked</a:t>
-            </a:r>
-            <a:endParaRPr lang="en-US" sz="1400" b="1" dirty="0" smtClean="0"/>
+              <a:t>, Link, etc.  Functionally evaluated and error checked</a:t>
+            </a:r>
           </a:p>
           <a:p>
             <a:pPr lvl="1">
               <a:lnSpc>
-                <a:spcPct val="110000"/>
-              </a:lnSpc>
+                <a:spcPct val="150000"/>
+              </a:lnSpc>
+              <a:spcBef>
+                <a:spcPts val="0"/>
+              </a:spcBef>
               <a:buFont typeface="Arial" panose="020B0604020202020204" pitchFamily="34" charset="0"/>
               <a:buChar char="•"/>
             </a:pPr>
@@ -2487,8 +2492,11 @@
           <a:p>
             <a:pPr lvl="2">
               <a:lnSpc>
-                <a:spcPct val="110000"/>
-              </a:lnSpc>
+                <a:spcPct val="150000"/>
+              </a:lnSpc>
+              <a:spcBef>
+                <a:spcPts val="0"/>
+              </a:spcBef>
               <a:buFont typeface="Arial" panose="020B0604020202020204" pitchFamily="34" charset="0"/>
               <a:buChar char="•"/>
             </a:pPr>
@@ -2500,8 +2508,11 @@
           <a:p>
             <a:pPr lvl="2">
               <a:lnSpc>
-                <a:spcPct val="110000"/>
-              </a:lnSpc>
+                <a:spcPct val="150000"/>
+              </a:lnSpc>
+              <a:spcBef>
+                <a:spcPts val="0"/>
+              </a:spcBef>
               <a:buFont typeface="Arial" panose="020B0604020202020204" pitchFamily="34" charset="0"/>
               <a:buChar char="•"/>
             </a:pPr>
@@ -2509,13 +2520,15 @@
               <a:rPr lang="en-US" sz="1400" b="1" dirty="0" smtClean="0"/>
               <a:t>Data driven</a:t>
             </a:r>
-            <a:endParaRPr lang="en-US" sz="1400" b="1" dirty="0" smtClean="0"/>
           </a:p>
           <a:p>
             <a:pPr lvl="1">
               <a:lnSpc>
-                <a:spcPct val="110000"/>
-              </a:lnSpc>
+                <a:spcPct val="150000"/>
+              </a:lnSpc>
+              <a:spcBef>
+                <a:spcPts val="0"/>
+              </a:spcBef>
               <a:buFont typeface="Arial" panose="020B0604020202020204" pitchFamily="34" charset="0"/>
               <a:buChar char="•"/>
             </a:pPr>
@@ -2527,8 +2540,11 @@
           <a:p>
             <a:pPr lvl="2">
               <a:lnSpc>
-                <a:spcPct val="110000"/>
-              </a:lnSpc>
+                <a:spcPct val="150000"/>
+              </a:lnSpc>
+              <a:spcBef>
+                <a:spcPts val="0"/>
+              </a:spcBef>
               <a:buFont typeface="Arial" panose="020B0604020202020204" pitchFamily="34" charset="0"/>
               <a:buChar char="•"/>
             </a:pPr>
@@ -2540,8 +2556,11 @@
           <a:p>
             <a:pPr lvl="2">
               <a:lnSpc>
-                <a:spcPct val="110000"/>
-              </a:lnSpc>
+                <a:spcPct val="150000"/>
+              </a:lnSpc>
+              <a:spcBef>
+                <a:spcPts val="0"/>
+              </a:spcBef>
               <a:buFont typeface="Arial" panose="020B0604020202020204" pitchFamily="34" charset="0"/>
               <a:buChar char="•"/>
             </a:pPr>
@@ -2562,7 +2581,6 @@
               <a:rPr lang="en-US" sz="1600" b="1" dirty="0" smtClean="0"/>
               <a:t>                  </a:t>
             </a:r>
-            <a:endParaRPr lang="en-US" sz="1600" b="1" dirty="0" smtClean="0"/>
           </a:p>
           <a:p>
             <a:pPr marL="457206" lvl="1" indent="0">
@@ -6048,7 +6066,7 @@
         </p:nvSpPr>
         <p:spPr>
           <a:xfrm>
-            <a:off x="367073" y="815966"/>
+            <a:off x="367073" y="958206"/>
             <a:ext cx="1414170" cy="369332"/>
           </a:xfrm>
           <a:prstGeom prst="rect">
@@ -6382,38 +6400,6 @@
           </a:p>
         </p:txBody>
       </p:sp>
-      <p:pic>
-        <p:nvPicPr>
-          <p:cNvPr id="8" name="Picture 7">
-            <a:hlinkClick r:id="rId3" action="ppaction://hlinksldjump"/>
-          </p:cNvPr>
-          <p:cNvPicPr>
-            <a:picLocks noChangeAspect="1"/>
-          </p:cNvPicPr>
-          <p:nvPr/>
-        </p:nvPicPr>
-        <p:blipFill>
-          <a:blip r:embed="rId4">
-            <a:extLst>
-              <a:ext uri="{28A0092B-C50C-407E-A947-70E740481C1C}">
-                <a14:useLocalDpi xmlns:a14="http://schemas.microsoft.com/office/drawing/2010/main" val="0"/>
-              </a:ext>
-            </a:extLst>
-          </a:blip>
-          <a:stretch>
-            <a:fillRect/>
-          </a:stretch>
-        </p:blipFill>
-        <p:spPr>
-          <a:xfrm>
-            <a:off x="814713" y="5481046"/>
-            <a:ext cx="6006486" cy="1328961"/>
-          </a:xfrm>
-          <a:prstGeom prst="rect">
-            <a:avLst/>
-          </a:prstGeom>
-        </p:spPr>
-      </p:pic>
       <p:sp>
         <p:nvSpPr>
           <p:cNvPr id="9" name="Rectangle 8"/>
@@ -6553,188 +6539,6 @@
                 </a:outerShdw>
               </a:effectLst>
             </a:endParaRPr>
-          </a:p>
-        </p:txBody>
-      </p:sp>
-      <p:pic>
-        <p:nvPicPr>
-          <p:cNvPr id="6" name="Picture 5"/>
-          <p:cNvPicPr>
-            <a:picLocks noChangeAspect="1"/>
-          </p:cNvPicPr>
-          <p:nvPr/>
-        </p:nvPicPr>
-        <p:blipFill>
-          <a:blip r:embed="rId5">
-            <a:extLst>
-              <a:ext uri="{28A0092B-C50C-407E-A947-70E740481C1C}">
-                <a14:useLocalDpi xmlns:a14="http://schemas.microsoft.com/office/drawing/2010/main" val="0"/>
-              </a:ext>
-            </a:extLst>
-          </a:blip>
-          <a:stretch>
-            <a:fillRect/>
-          </a:stretch>
-        </p:blipFill>
-        <p:spPr>
-          <a:xfrm>
-            <a:off x="814713" y="3565170"/>
-            <a:ext cx="6006486" cy="1320798"/>
-          </a:xfrm>
-          <a:prstGeom prst="rect">
-            <a:avLst/>
-          </a:prstGeom>
-        </p:spPr>
-      </p:pic>
-      <p:sp>
-        <p:nvSpPr>
-          <p:cNvPr id="3" name="Rectangle 2"/>
-          <p:cNvSpPr/>
-          <p:nvPr/>
-        </p:nvSpPr>
-        <p:spPr>
-          <a:xfrm>
-            <a:off x="2521204" y="3907440"/>
-            <a:ext cx="325905" cy="187036"/>
-          </a:xfrm>
-          <a:prstGeom prst="rect">
-            <a:avLst/>
-          </a:prstGeom>
-          <a:ln>
-            <a:noFill/>
-          </a:ln>
-        </p:spPr>
-        <p:style>
-          <a:lnRef idx="2">
-            <a:schemeClr val="dk1"/>
-          </a:lnRef>
-          <a:fillRef idx="1">
-            <a:schemeClr val="lt1"/>
-          </a:fillRef>
-          <a:effectRef idx="0">
-            <a:schemeClr val="dk1"/>
-          </a:effectRef>
-          <a:fontRef idx="minor">
-            <a:schemeClr val="dk1"/>
-          </a:fontRef>
-        </p:style>
-        <p:txBody>
-          <a:bodyPr rtlCol="0" anchor="ctr"/>
-          <a:lstStyle/>
-          <a:p>
-            <a:pPr algn="ctr"/>
-            <a:endParaRPr lang="en-US"/>
-          </a:p>
-        </p:txBody>
-      </p:sp>
-      <p:sp>
-        <p:nvSpPr>
-          <p:cNvPr id="2" name="TextBox 1"/>
-          <p:cNvSpPr txBox="1"/>
-          <p:nvPr/>
-        </p:nvSpPr>
-        <p:spPr>
-          <a:xfrm>
-            <a:off x="2481791" y="3550630"/>
-            <a:ext cx="1039091" cy="569515"/>
-          </a:xfrm>
-          <a:prstGeom prst="rect">
-            <a:avLst/>
-          </a:prstGeom>
-          <a:noFill/>
-        </p:spPr>
-        <p:txBody>
-          <a:bodyPr wrap="square" rtlCol="0">
-            <a:spAutoFit/>
-          </a:bodyPr>
-          <a:lstStyle/>
-          <a:p>
-            <a:pPr>
-              <a:lnSpc>
-                <a:spcPct val="114000"/>
-              </a:lnSpc>
-            </a:pPr>
-            <a:r>
-              <a:rPr lang="en-US" sz="1400" dirty="0" smtClean="0"/>
-              <a:t>Min per Test  Case</a:t>
-            </a:r>
-            <a:endParaRPr lang="en-US" sz="1400" dirty="0"/>
-          </a:p>
-        </p:txBody>
-      </p:sp>
-      <p:sp>
-        <p:nvSpPr>
-          <p:cNvPr id="11" name="Rectangle 10"/>
-          <p:cNvSpPr/>
-          <p:nvPr/>
-        </p:nvSpPr>
-        <p:spPr>
-          <a:xfrm>
-            <a:off x="3383525" y="3878510"/>
-            <a:ext cx="664165" cy="187036"/>
-          </a:xfrm>
-          <a:prstGeom prst="rect">
-            <a:avLst/>
-          </a:prstGeom>
-          <a:ln>
-            <a:noFill/>
-          </a:ln>
-        </p:spPr>
-        <p:style>
-          <a:lnRef idx="2">
-            <a:schemeClr val="dk1"/>
-          </a:lnRef>
-          <a:fillRef idx="1">
-            <a:schemeClr val="lt1"/>
-          </a:fillRef>
-          <a:effectRef idx="0">
-            <a:schemeClr val="dk1"/>
-          </a:effectRef>
-          <a:fontRef idx="minor">
-            <a:schemeClr val="dk1"/>
-          </a:fontRef>
-        </p:style>
-        <p:txBody>
-          <a:bodyPr rtlCol="0" anchor="ctr"/>
-          <a:lstStyle/>
-          <a:p>
-            <a:pPr algn="ctr"/>
-            <a:endParaRPr lang="en-US"/>
-          </a:p>
-        </p:txBody>
-      </p:sp>
-      <p:sp>
-        <p:nvSpPr>
-          <p:cNvPr id="12" name="TextBox 11"/>
-          <p:cNvSpPr txBox="1"/>
-          <p:nvPr/>
-        </p:nvSpPr>
-        <p:spPr>
-          <a:xfrm>
-            <a:off x="3317393" y="3550631"/>
-            <a:ext cx="1039091" cy="569515"/>
-          </a:xfrm>
-          <a:prstGeom prst="rect">
-            <a:avLst/>
-          </a:prstGeom>
-          <a:noFill/>
-        </p:spPr>
-        <p:txBody>
-          <a:bodyPr wrap="square" rtlCol="0">
-            <a:spAutoFit/>
-          </a:bodyPr>
-          <a:lstStyle/>
-          <a:p>
-            <a:pPr>
-              <a:lnSpc>
-                <a:spcPct val="114000"/>
-              </a:lnSpc>
-            </a:pPr>
-            <a:r>
-              <a:rPr lang="en-US" sz="1400" dirty="0" smtClean="0"/>
-              <a:t>Min per Test  Run</a:t>
-            </a:r>
-            <a:endParaRPr lang="en-US" sz="1400" dirty="0"/>
           </a:p>
         </p:txBody>
       </p:sp>
@@ -6781,41 +6585,6 @@
       </p:sp>
       <p:sp>
         <p:nvSpPr>
-          <p:cNvPr id="13" name="TextBox 12"/>
-          <p:cNvSpPr txBox="1"/>
-          <p:nvPr/>
-        </p:nvSpPr>
-        <p:spPr>
-          <a:xfrm>
-            <a:off x="4099643" y="3579790"/>
-            <a:ext cx="1089641" cy="535468"/>
-          </a:xfrm>
-          <a:prstGeom prst="rect">
-            <a:avLst/>
-          </a:prstGeom>
-          <a:noFill/>
-        </p:spPr>
-        <p:txBody>
-          <a:bodyPr wrap="square" rtlCol="0">
-            <a:spAutoFit/>
-          </a:bodyPr>
-          <a:lstStyle/>
-          <a:p>
-            <a:pPr>
-              <a:lnSpc>
-                <a:spcPct val="114000"/>
-              </a:lnSpc>
-            </a:pPr>
-            <a:r>
-              <a:rPr lang="en-US" sz="1300" dirty="0" smtClean="0"/>
-              <a:t>Total Min for 3 Test  Run</a:t>
-            </a:r>
-            <a:endParaRPr lang="en-US" sz="1300" dirty="0"/>
-          </a:p>
-        </p:txBody>
-      </p:sp>
-      <p:sp>
-        <p:nvSpPr>
           <p:cNvPr id="15" name="TextBox 14"/>
           <p:cNvSpPr txBox="1"/>
           <p:nvPr/>
@@ -6874,275 +6643,66 @@
           </a:p>
         </p:txBody>
       </p:sp>
-      <p:sp>
-        <p:nvSpPr>
-          <p:cNvPr id="23" name="Rectangle 22"/>
-          <p:cNvSpPr/>
+      <p:pic>
+        <p:nvPicPr>
+          <p:cNvPr id="7" name="Picture 6"/>
+          <p:cNvPicPr>
+            <a:picLocks noChangeAspect="1"/>
+          </p:cNvPicPr>
           <p:nvPr/>
-        </p:nvSpPr>
+        </p:nvPicPr>
+        <p:blipFill>
+          <a:blip r:embed="rId3">
+            <a:extLst>
+              <a:ext uri="{28A0092B-C50C-407E-A947-70E740481C1C}">
+                <a14:useLocalDpi xmlns:a14="http://schemas.microsoft.com/office/drawing/2010/main" val="0"/>
+              </a:ext>
+            </a:extLst>
+          </a:blip>
+          <a:stretch>
+            <a:fillRect/>
+          </a:stretch>
+        </p:blipFill>
         <p:spPr>
           <a:xfrm>
-            <a:off x="2533648" y="5818772"/>
-            <a:ext cx="783745" cy="177800"/>
+            <a:off x="812267" y="3554932"/>
+            <a:ext cx="6008932" cy="1324886"/>
           </a:xfrm>
           <a:prstGeom prst="rect">
             <a:avLst/>
           </a:prstGeom>
-          <a:ln>
-            <a:noFill/>
-          </a:ln>
         </p:spPr>
-        <p:style>
-          <a:lnRef idx="2">
-            <a:schemeClr val="dk1"/>
-          </a:lnRef>
-          <a:fillRef idx="1">
-            <a:schemeClr val="lt1"/>
-          </a:fillRef>
-          <a:effectRef idx="0">
-            <a:schemeClr val="dk1"/>
-          </a:effectRef>
-          <a:fontRef idx="minor">
-            <a:schemeClr val="dk1"/>
-          </a:fontRef>
-        </p:style>
-        <p:txBody>
-          <a:bodyPr rtlCol="0" anchor="ctr"/>
-          <a:lstStyle/>
-          <a:p>
-            <a:pPr algn="ctr"/>
-            <a:endParaRPr lang="en-US"/>
-          </a:p>
-        </p:txBody>
-      </p:sp>
-      <p:sp>
-        <p:nvSpPr>
-          <p:cNvPr id="24" name="Rectangle 23"/>
-          <p:cNvSpPr/>
+      </p:pic>
+      <p:pic>
+        <p:nvPicPr>
+          <p:cNvPr id="16" name="Picture 15"/>
+          <p:cNvPicPr>
+            <a:picLocks noChangeAspect="1"/>
+          </p:cNvPicPr>
           <p:nvPr/>
-        </p:nvSpPr>
+        </p:nvPicPr>
+        <p:blipFill>
+          <a:blip r:embed="rId4">
+            <a:extLst>
+              <a:ext uri="{28A0092B-C50C-407E-A947-70E740481C1C}">
+                <a14:useLocalDpi xmlns:a14="http://schemas.microsoft.com/office/drawing/2010/main" val="0"/>
+              </a:ext>
+            </a:extLst>
+          </a:blip>
+          <a:stretch>
+            <a:fillRect/>
+          </a:stretch>
+        </p:blipFill>
         <p:spPr>
           <a:xfrm>
-            <a:off x="-2959100" y="3028373"/>
-            <a:ext cx="685800" cy="177800"/>
+            <a:off x="814712" y="5472429"/>
+            <a:ext cx="6088537" cy="1314451"/>
           </a:xfrm>
           <a:prstGeom prst="rect">
             <a:avLst/>
           </a:prstGeom>
-          <a:ln>
-            <a:noFill/>
-          </a:ln>
         </p:spPr>
-        <p:style>
-          <a:lnRef idx="2">
-            <a:schemeClr val="dk1"/>
-          </a:lnRef>
-          <a:fillRef idx="1">
-            <a:schemeClr val="lt1"/>
-          </a:fillRef>
-          <a:effectRef idx="0">
-            <a:schemeClr val="dk1"/>
-          </a:effectRef>
-          <a:fontRef idx="minor">
-            <a:schemeClr val="dk1"/>
-          </a:fontRef>
-        </p:style>
-        <p:txBody>
-          <a:bodyPr rtlCol="0" anchor="ctr"/>
-          <a:lstStyle/>
-          <a:p>
-            <a:pPr algn="ctr"/>
-            <a:endParaRPr lang="en-US"/>
-          </a:p>
-        </p:txBody>
-      </p:sp>
-      <p:sp>
-        <p:nvSpPr>
-          <p:cNvPr id="25" name="Rectangle 24"/>
-          <p:cNvSpPr/>
-          <p:nvPr/>
-        </p:nvSpPr>
-        <p:spPr>
-          <a:xfrm>
-            <a:off x="3377817" y="5817767"/>
-            <a:ext cx="783745" cy="177800"/>
-          </a:xfrm>
-          <a:prstGeom prst="rect">
-            <a:avLst/>
-          </a:prstGeom>
-          <a:ln>
-            <a:noFill/>
-          </a:ln>
-        </p:spPr>
-        <p:style>
-          <a:lnRef idx="2">
-            <a:schemeClr val="dk1"/>
-          </a:lnRef>
-          <a:fillRef idx="1">
-            <a:schemeClr val="lt1"/>
-          </a:fillRef>
-          <a:effectRef idx="0">
-            <a:schemeClr val="dk1"/>
-          </a:effectRef>
-          <a:fontRef idx="minor">
-            <a:schemeClr val="dk1"/>
-          </a:fontRef>
-        </p:style>
-        <p:txBody>
-          <a:bodyPr rtlCol="0" anchor="ctr"/>
-          <a:lstStyle/>
-          <a:p>
-            <a:pPr algn="ctr"/>
-            <a:endParaRPr lang="en-US"/>
-          </a:p>
-        </p:txBody>
-      </p:sp>
-      <p:sp>
-        <p:nvSpPr>
-          <p:cNvPr id="26" name="Rectangle 25"/>
-          <p:cNvSpPr/>
-          <p:nvPr/>
-        </p:nvSpPr>
-        <p:spPr>
-          <a:xfrm>
-            <a:off x="4213955" y="5817767"/>
-            <a:ext cx="783745" cy="177800"/>
-          </a:xfrm>
-          <a:prstGeom prst="rect">
-            <a:avLst/>
-          </a:prstGeom>
-          <a:ln>
-            <a:noFill/>
-          </a:ln>
-        </p:spPr>
-        <p:style>
-          <a:lnRef idx="2">
-            <a:schemeClr val="dk1"/>
-          </a:lnRef>
-          <a:fillRef idx="1">
-            <a:schemeClr val="lt1"/>
-          </a:fillRef>
-          <a:effectRef idx="0">
-            <a:schemeClr val="dk1"/>
-          </a:effectRef>
-          <a:fontRef idx="minor">
-            <a:schemeClr val="dk1"/>
-          </a:fontRef>
-        </p:style>
-        <p:txBody>
-          <a:bodyPr rtlCol="0" anchor="ctr"/>
-          <a:lstStyle/>
-          <a:p>
-            <a:pPr algn="ctr"/>
-            <a:endParaRPr lang="en-US"/>
-          </a:p>
-        </p:txBody>
-      </p:sp>
-      <p:sp>
-        <p:nvSpPr>
-          <p:cNvPr id="19" name="TextBox 18"/>
-          <p:cNvSpPr txBox="1"/>
-          <p:nvPr/>
-        </p:nvSpPr>
-        <p:spPr>
-          <a:xfrm>
-            <a:off x="2493752" y="5493377"/>
-            <a:ext cx="964061" cy="583493"/>
-          </a:xfrm>
-          <a:prstGeom prst="rect">
-            <a:avLst/>
-          </a:prstGeom>
-          <a:noFill/>
-        </p:spPr>
-        <p:txBody>
-          <a:bodyPr wrap="square" rtlCol="0">
-            <a:spAutoFit/>
-          </a:bodyPr>
-          <a:lstStyle/>
-          <a:p>
-            <a:pPr>
-              <a:lnSpc>
-                <a:spcPct val="114000"/>
-              </a:lnSpc>
-            </a:pPr>
-            <a:r>
-              <a:rPr lang="en-US" sz="1400" dirty="0" smtClean="0"/>
-              <a:t>Sec per Test  Case</a:t>
-            </a:r>
-            <a:endParaRPr lang="en-US" sz="1400" dirty="0"/>
-          </a:p>
-        </p:txBody>
-      </p:sp>
-      <p:sp>
-        <p:nvSpPr>
-          <p:cNvPr id="21" name="TextBox 20"/>
-          <p:cNvSpPr txBox="1"/>
-          <p:nvPr/>
-        </p:nvSpPr>
-        <p:spPr>
-          <a:xfrm>
-            <a:off x="3356382" y="5478168"/>
-            <a:ext cx="1039091" cy="583493"/>
-          </a:xfrm>
-          <a:prstGeom prst="rect">
-            <a:avLst/>
-          </a:prstGeom>
-          <a:noFill/>
-        </p:spPr>
-        <p:txBody>
-          <a:bodyPr wrap="square" rtlCol="0">
-            <a:spAutoFit/>
-          </a:bodyPr>
-          <a:lstStyle/>
-          <a:p>
-            <a:pPr>
-              <a:lnSpc>
-                <a:spcPct val="114000"/>
-              </a:lnSpc>
-            </a:pPr>
-            <a:r>
-              <a:rPr lang="en-US" sz="1400" dirty="0" smtClean="0"/>
-              <a:t>Sec per Test  Run</a:t>
-            </a:r>
-            <a:endParaRPr lang="en-US" sz="1400" dirty="0"/>
-          </a:p>
-        </p:txBody>
-      </p:sp>
-      <p:sp>
-        <p:nvSpPr>
-          <p:cNvPr id="22" name="TextBox 21"/>
-          <p:cNvSpPr txBox="1"/>
-          <p:nvPr/>
-        </p:nvSpPr>
-        <p:spPr>
-          <a:xfrm>
-            <a:off x="4121247" y="5510881"/>
-            <a:ext cx="1089641" cy="548483"/>
-          </a:xfrm>
-          <a:prstGeom prst="rect">
-            <a:avLst/>
-          </a:prstGeom>
-          <a:noFill/>
-        </p:spPr>
-        <p:txBody>
-          <a:bodyPr wrap="square" rtlCol="0">
-            <a:spAutoFit/>
-          </a:bodyPr>
-          <a:lstStyle/>
-          <a:p>
-            <a:pPr>
-              <a:lnSpc>
-                <a:spcPct val="114000"/>
-              </a:lnSpc>
-            </a:pPr>
-            <a:r>
-              <a:rPr lang="en-US" sz="1300" dirty="0" smtClean="0"/>
-              <a:t>Total Secs for 3 Test  Run</a:t>
-            </a:r>
-            <a:endParaRPr lang="en-US" sz="1300" dirty="0"/>
-          </a:p>
-        </p:txBody>
-      </p:sp>
+      </p:pic>
     </p:spTree>
     <p:extLst>
       <p:ext uri="{BB962C8B-B14F-4D97-AF65-F5344CB8AC3E}">
@@ -7355,13 +6915,7 @@
               <a:buNone/>
             </a:pPr>
             <a:r>
-              <a:rPr lang="en-US" sz="1200" b="1" dirty="0" smtClean="0">
-                <a:solidFill>
-                  <a:schemeClr val="bg1">
-                    <a:lumMod val="75000"/>
-                  </a:schemeClr>
-                </a:solidFill>
-              </a:rPr>
+              <a:rPr lang="en-US" sz="1200" dirty="0" smtClean="0"/>
               <a:t>Product Architect claimed at one point, “ That’s why I liked Test Automation so much.”  Test Automation ran the same script that forced the problem to the surface and ran identically proving the fix was successful</a:t>
             </a:r>
           </a:p>
@@ -7378,7 +6932,6 @@
               <a:rPr lang="en-US" sz="1000" dirty="0" smtClean="0"/>
               <a:t>     </a:t>
             </a:r>
-            <a:endParaRPr lang="en-US" sz="1000" dirty="0" smtClean="0"/>
           </a:p>
           <a:p>
             <a:pPr>
@@ -7470,11 +7023,26 @@
             </a:pPr>
             <a:r>
               <a:rPr lang="en-US" sz="1800" b="1" dirty="0" smtClean="0"/>
-              <a:t>Shopping and Buying </a:t>
-            </a:r>
-            <a:r>
-              <a:rPr lang="en-US" sz="1800" b="1" smtClean="0"/>
-              <a:t>E2E Tests</a:t>
+              <a:t>Shopping and Buying E2E </a:t>
+            </a:r>
+            <a:r>
+              <a:rPr lang="en-US" sz="1800" b="1" dirty="0" smtClean="0"/>
+              <a:t>Tests</a:t>
+            </a:r>
+          </a:p>
+          <a:p>
+            <a:pPr lvl="1" indent="0">
+              <a:lnSpc>
+                <a:spcPct val="114000"/>
+              </a:lnSpc>
+              <a:spcBef>
+                <a:spcPts val="0"/>
+              </a:spcBef>
+              <a:buNone/>
+            </a:pPr>
+            <a:r>
+              <a:rPr lang="en-US" sz="1800" b="1" dirty="0" smtClean="0"/>
+              <a:t>Content</a:t>
             </a:r>
             <a:endParaRPr lang="en-US" sz="1800" b="1" dirty="0"/>
           </a:p>
@@ -7586,11 +7154,7 @@
             </a:pPr>
             <a:r>
               <a:rPr lang="en-US" sz="1600" b="1" dirty="0" smtClean="0"/>
-              <a:t> </a:t>
-            </a:r>
-            <a:r>
-              <a:rPr lang="en-US" sz="1600" b="1" dirty="0" smtClean="0"/>
-              <a:t>So,   Next step is ……..   </a:t>
+              <a:t> So,   Next step is ……..   </a:t>
             </a:r>
             <a:endParaRPr lang="en-US" sz="1600" b="1" dirty="0"/>
           </a:p>
@@ -8039,8 +7603,8 @@
         </p:nvSpPr>
         <p:spPr>
           <a:xfrm>
-            <a:off x="1009384" y="128455"/>
-            <a:ext cx="7906016" cy="651510"/>
+            <a:off x="1009384" y="779966"/>
+            <a:ext cx="7088136" cy="774514"/>
           </a:xfrm>
         </p:spPr>
         <p:txBody>
@@ -8089,11 +7653,130 @@
             </a:pPr>
             <a:r>
               <a:rPr lang="en-US" sz="2000" b="1" dirty="0" smtClean="0"/>
-              <a:t>Shopping &amp; Buying Engineering will be responsible</a:t>
+              <a:t>Shopping &amp; Buying </a:t>
+            </a:r>
+            <a:r>
+              <a:rPr lang="en-US" sz="2000" b="1" dirty="0" smtClean="0"/>
+              <a:t>Development Engineers</a:t>
+            </a:r>
+          </a:p>
+          <a:p>
+            <a:pPr marL="919163" lvl="1" indent="-342900">
+              <a:lnSpc>
+                <a:spcPct val="105000"/>
+              </a:lnSpc>
+              <a:spcBef>
+                <a:spcPts val="0"/>
+              </a:spcBef>
+              <a:buFont typeface="Arial" panose="020B0604020202020204" pitchFamily="34" charset="0"/>
+              <a:buChar char="•"/>
+            </a:pPr>
+            <a:r>
+              <a:rPr lang="en-US" sz="1400" dirty="0" smtClean="0"/>
+              <a:t>Responsible for all new  Page Level Functional Integration Tests</a:t>
+            </a:r>
+          </a:p>
+          <a:p>
+            <a:pPr marL="919163" lvl="1" indent="-342900">
+              <a:lnSpc>
+                <a:spcPct val="105000"/>
+              </a:lnSpc>
+              <a:spcBef>
+                <a:spcPts val="0"/>
+              </a:spcBef>
+              <a:buFont typeface="Arial" panose="020B0604020202020204" pitchFamily="34" charset="0"/>
+              <a:buChar char="•"/>
+            </a:pPr>
+            <a:r>
+              <a:rPr lang="en-US" sz="1400" dirty="0" smtClean="0"/>
+              <a:t>Responsible </a:t>
+            </a:r>
+            <a:r>
+              <a:rPr lang="en-US" sz="1400" dirty="0"/>
+              <a:t>for </a:t>
+            </a:r>
+            <a:r>
+              <a:rPr lang="en-US" sz="1400" dirty="0" smtClean="0"/>
+              <a:t>correcting all test failures in  ../</a:t>
+            </a:r>
+            <a:r>
+              <a:rPr lang="en-US" sz="1400" dirty="0" err="1" smtClean="0"/>
+              <a:t>fitmp</a:t>
+            </a:r>
+            <a:r>
+              <a:rPr lang="en-US" sz="1400" dirty="0" smtClean="0"/>
+              <a:t>  directory, keeping it completely operational</a:t>
+            </a:r>
+            <a:endParaRPr lang="en-US" sz="1400" b="1" dirty="0"/>
+          </a:p>
+          <a:p>
+            <a:pPr marL="342900" indent="-342900">
+              <a:lnSpc>
+                <a:spcPct val="125000"/>
+              </a:lnSpc>
+              <a:buFont typeface="Arial" panose="020B0604020202020204" pitchFamily="34" charset="0"/>
+              <a:buChar char="•"/>
+            </a:pPr>
+            <a:r>
+              <a:rPr lang="en-US" sz="2000" b="1" dirty="0" smtClean="0"/>
+              <a:t>Provider Directory </a:t>
+            </a:r>
+            <a:r>
+              <a:rPr lang="en-US" sz="2000" b="1" dirty="0"/>
+              <a:t>Development Engineers </a:t>
             </a:r>
             <a:endParaRPr lang="en-US" sz="2000" b="1" dirty="0" smtClean="0"/>
           </a:p>
           <a:p>
+            <a:pPr marL="919163" lvl="1" indent="-342900">
+              <a:lnSpc>
+                <a:spcPct val="105000"/>
+              </a:lnSpc>
+              <a:spcBef>
+                <a:spcPts val="0"/>
+              </a:spcBef>
+              <a:buFont typeface="Arial" panose="020B0604020202020204" pitchFamily="34" charset="0"/>
+              <a:buChar char="•"/>
+            </a:pPr>
+            <a:r>
+              <a:rPr lang="en-US" sz="1400" dirty="0" smtClean="0"/>
+              <a:t>R</a:t>
+            </a:r>
+            <a:r>
+              <a:rPr lang="en-US" sz="1400" dirty="0" smtClean="0"/>
+              <a:t>esponsible for all new Template level Functional Integration Tests</a:t>
+            </a:r>
+          </a:p>
+          <a:p>
+            <a:pPr marL="919163" lvl="1" indent="-342900">
+              <a:lnSpc>
+                <a:spcPct val="105000"/>
+              </a:lnSpc>
+              <a:spcBef>
+                <a:spcPts val="0"/>
+              </a:spcBef>
+              <a:buFont typeface="Arial" panose="020B0604020202020204" pitchFamily="34" charset="0"/>
+              <a:buChar char="•"/>
+            </a:pPr>
+            <a:r>
+              <a:rPr lang="en-US" sz="1400" dirty="0" smtClean="0"/>
+              <a:t>Responsible for correcting all test failures in the  </a:t>
+            </a:r>
+            <a:r>
+              <a:rPr lang="en-US" sz="1400" dirty="0" smtClean="0"/>
+              <a:t>../</a:t>
+            </a:r>
+            <a:r>
+              <a:rPr lang="en-US" sz="1400" dirty="0" err="1" smtClean="0"/>
+              <a:t>fitpd</a:t>
+            </a:r>
+            <a:r>
+              <a:rPr lang="en-US" sz="1400" dirty="0" smtClean="0"/>
+              <a:t>  directory, keeping all test operational</a:t>
+            </a:r>
+            <a:endParaRPr lang="en-US" sz="1400" dirty="0"/>
+          </a:p>
+          <a:p>
             <a:pPr marL="342900" indent="-342900">
               <a:lnSpc>
                 <a:spcPct val="125000"/>
@@ -8101,97 +7784,59 @@
               <a:buFont typeface="Arial" panose="020B0604020202020204" pitchFamily="34" charset="0"/>
               <a:buChar char="•"/>
             </a:pPr>
+            <a:r>
+              <a:rPr lang="en-US" sz="2000" b="1" dirty="0" smtClean="0"/>
+              <a:t> Core </a:t>
+            </a:r>
+            <a:r>
+              <a:rPr lang="en-US" sz="2000" b="1" dirty="0" smtClean="0"/>
+              <a:t>Technology API Team engineers</a:t>
+            </a:r>
             <a:endParaRPr lang="en-US" sz="2000" b="1" dirty="0"/>
           </a:p>
           <a:p>
-            <a:pPr marL="342900" indent="-342900">
+            <a:pPr marL="919163" lvl="1" indent="-342900">
+              <a:lnSpc>
+                <a:spcPct val="105000"/>
+              </a:lnSpc>
+              <a:spcBef>
+                <a:spcPts val="0"/>
+              </a:spcBef>
+              <a:buFont typeface="Arial" panose="020B0604020202020204" pitchFamily="34" charset="0"/>
+              <a:buChar char="•"/>
+            </a:pPr>
+            <a:r>
+              <a:rPr lang="en-US" sz="1400" dirty="0" smtClean="0"/>
+              <a:t>Responsible for adding new tests to the REST API regression suite </a:t>
+            </a:r>
+          </a:p>
+          <a:p>
+            <a:pPr marL="919163" lvl="1" indent="-342900">
+              <a:lnSpc>
+                <a:spcPct val="105000"/>
+              </a:lnSpc>
+              <a:spcBef>
+                <a:spcPts val="0"/>
+              </a:spcBef>
+              <a:buFont typeface="Arial" panose="020B0604020202020204" pitchFamily="34" charset="0"/>
+              <a:buChar char="•"/>
+            </a:pPr>
+            <a:r>
+              <a:rPr lang="en-US" sz="1400" dirty="0" smtClean="0"/>
+              <a:t>Responsible for correcting all REST API regression failures , keeping all scripting completely operational</a:t>
+            </a:r>
+          </a:p>
+          <a:p>
+            <a:pPr>
               <a:lnSpc>
                 <a:spcPct val="125000"/>
               </a:lnSpc>
-              <a:buFont typeface="Arial" panose="020B0604020202020204" pitchFamily="34" charset="0"/>
-              <a:buChar char="•"/>
-            </a:pPr>
-            <a:r>
-              <a:rPr lang="en-US" sz="2000" b="1" dirty="0" smtClean="0"/>
-              <a:t>Provider Directory Engineering will be responsible</a:t>
-            </a:r>
-            <a:endParaRPr lang="en-US" sz="2000" b="1" dirty="0"/>
-          </a:p>
-          <a:p>
-            <a:pPr>
-              <a:lnSpc>
-                <a:spcPct val="125000"/>
-              </a:lnSpc>
-            </a:pPr>
-            <a:endParaRPr lang="en-US" sz="2000" b="1" dirty="0" smtClean="0"/>
-          </a:p>
-          <a:p>
-            <a:pPr marL="342900" indent="-342900">
-              <a:lnSpc>
-                <a:spcPct val="125000"/>
-              </a:lnSpc>
-              <a:buFont typeface="Arial" panose="020B0604020202020204" pitchFamily="34" charset="0"/>
-              <a:buChar char="•"/>
-            </a:pPr>
-            <a:r>
-              <a:rPr lang="en-US" sz="2000" b="1" dirty="0" smtClean="0"/>
-              <a:t>Core Technology API Team engineers</a:t>
-            </a:r>
-            <a:endParaRPr lang="en-US" sz="2000" b="1" dirty="0"/>
-          </a:p>
-          <a:p>
-            <a:pPr marL="919163" lvl="1" indent="-342900">
-              <a:lnSpc>
-                <a:spcPct val="125000"/>
-              </a:lnSpc>
-              <a:buFont typeface="Arial" panose="020B0604020202020204" pitchFamily="34" charset="0"/>
-              <a:buChar char="•"/>
-            </a:pPr>
-            <a:r>
-              <a:rPr lang="en-US" sz="1400" b="1" dirty="0" smtClean="0"/>
-              <a:t>This scripting </a:t>
-            </a:r>
-            <a:r>
-              <a:rPr lang="en-US" sz="1400" b="1" dirty="0"/>
-              <a:t>will be page specific feature level integration </a:t>
-            </a:r>
-            <a:r>
-              <a:rPr lang="en-US" sz="1400" b="1" dirty="0" smtClean="0"/>
-              <a:t>tests</a:t>
-            </a:r>
-          </a:p>
-          <a:p>
-            <a:pPr marL="919163" lvl="1" indent="-342900">
-              <a:lnSpc>
-                <a:spcPct val="125000"/>
-              </a:lnSpc>
-              <a:buFont typeface="Arial" panose="020B0604020202020204" pitchFamily="34" charset="0"/>
-              <a:buChar char="•"/>
-            </a:pPr>
-            <a:r>
-              <a:rPr lang="en-US" sz="1400" b="1" dirty="0" smtClean="0"/>
-              <a:t>REST API test scripting  covers all basic use and edge case work</a:t>
-            </a:r>
-          </a:p>
-          <a:p>
-            <a:pPr marL="342900" indent="-342900">
-              <a:lnSpc>
-                <a:spcPct val="125000"/>
-              </a:lnSpc>
-              <a:buFont typeface="Arial" panose="020B0604020202020204" pitchFamily="34" charset="0"/>
-              <a:buChar char="•"/>
-            </a:pPr>
-            <a:endParaRPr lang="en-US" sz="2000" b="1" dirty="0" smtClean="0"/>
-          </a:p>
-          <a:p>
-            <a:pPr marL="342900" indent="-342900">
-              <a:lnSpc>
-                <a:spcPct val="125000"/>
-              </a:lnSpc>
-              <a:buFont typeface="Arial" panose="020B0604020202020204" pitchFamily="34" charset="0"/>
-              <a:buChar char="•"/>
-            </a:pPr>
-            <a:endParaRPr lang="en-US" sz="2000" b="1" dirty="0"/>
+            </a:pPr>
+            <a:r>
+              <a:rPr lang="en-US" sz="500" b="1" dirty="0" smtClean="0"/>
+              <a:t>             </a:t>
+            </a:r>
+            <a:endParaRPr lang="en-US" sz="500" b="1" dirty="0" smtClean="0"/>
           </a:p>
           <a:p>
             <a:pPr marL="342900" indent="-342900">
@@ -8206,23 +7851,181 @@
               <a:t>CXTA </a:t>
             </a:r>
             <a:r>
+              <a:rPr lang="en-US" sz="2000" b="1" dirty="0"/>
+              <a:t>T</a:t>
+            </a:r>
+            <a:r>
               <a:rPr lang="en-US" sz="2000" b="1" dirty="0" smtClean="0"/>
-              <a:t>team continues with Use Case End </a:t>
-            </a:r>
-            <a:r>
-              <a:rPr lang="en-US" sz="2000" b="1" dirty="0"/>
-              <a:t>to End test automation </a:t>
-            </a:r>
-            <a:endParaRPr lang="en-US" sz="2000" b="1" dirty="0" smtClean="0"/>
-          </a:p>
-          <a:p>
-            <a:pPr lvl="1" indent="0">
-              <a:lnSpc>
-                <a:spcPct val="125000"/>
-              </a:lnSpc>
+              <a:t>eam engineers</a:t>
+            </a:r>
+          </a:p>
+          <a:p>
+            <a:pPr marL="919163" lvl="1" indent="-342900">
+              <a:lnSpc>
+                <a:spcPct val="105000"/>
+              </a:lnSpc>
+              <a:spcBef>
+                <a:spcPts val="0"/>
+              </a:spcBef>
+              <a:buFont typeface="Arial" panose="020B0604020202020204" pitchFamily="34" charset="0"/>
+              <a:buChar char="•"/>
+            </a:pPr>
+            <a:r>
+              <a:rPr lang="en-US" sz="1400" dirty="0" smtClean="0"/>
+              <a:t>Oversee and manage all Framework development. </a:t>
+            </a:r>
+          </a:p>
+          <a:p>
+            <a:pPr marL="919163" lvl="1" indent="-342900">
+              <a:lnSpc>
+                <a:spcPct val="105000"/>
+              </a:lnSpc>
+              <a:spcBef>
+                <a:spcPts val="0"/>
+              </a:spcBef>
+              <a:buFont typeface="Arial" panose="020B0604020202020204" pitchFamily="34" charset="0"/>
+              <a:buChar char="•"/>
+            </a:pPr>
+            <a:r>
+              <a:rPr lang="en-US" sz="1400" dirty="0" smtClean="0"/>
+              <a:t>Continual </a:t>
+            </a:r>
+            <a:r>
+              <a:rPr lang="en-US" sz="1400" dirty="0"/>
+              <a:t>frame work </a:t>
+            </a:r>
+            <a:r>
+              <a:rPr lang="en-US" sz="1400" dirty="0" smtClean="0"/>
+              <a:t>improvement, evaluating all need </a:t>
+            </a:r>
+            <a:r>
+              <a:rPr lang="en-US" sz="1400" dirty="0"/>
+              <a:t>for new </a:t>
+            </a:r>
+            <a:r>
+              <a:rPr lang="en-US" sz="1400" dirty="0" smtClean="0"/>
+              <a:t>coverage</a:t>
+            </a:r>
+            <a:endParaRPr lang="en-US" sz="1400" dirty="0"/>
+          </a:p>
+          <a:p>
+            <a:pPr marL="919163" lvl="1" indent="-342900">
+              <a:lnSpc>
+                <a:spcPct val="105000"/>
+              </a:lnSpc>
+              <a:spcBef>
+                <a:spcPts val="0"/>
+              </a:spcBef>
+              <a:buFont typeface="Arial" panose="020B0604020202020204" pitchFamily="34" charset="0"/>
+              <a:buChar char="•"/>
+            </a:pPr>
+            <a:r>
+              <a:rPr lang="en-US" sz="1400" dirty="0" smtClean="0"/>
+              <a:t>Continually analyze mid layer code</a:t>
+            </a:r>
+          </a:p>
+          <a:p>
+            <a:pPr marL="919163" lvl="1" indent="-342900">
+              <a:lnSpc>
+                <a:spcPct val="105000"/>
+              </a:lnSpc>
+              <a:spcBef>
+                <a:spcPts val="0"/>
+              </a:spcBef>
+              <a:buFont typeface="Arial" panose="020B0604020202020204" pitchFamily="34" charset="0"/>
+              <a:buChar char="•"/>
+            </a:pPr>
+            <a:r>
+              <a:rPr lang="en-US" sz="1400" dirty="0" smtClean="0"/>
+              <a:t>Refactor </a:t>
+            </a:r>
+            <a:r>
+              <a:rPr lang="en-US" sz="1400" dirty="0"/>
+              <a:t>content from mid layer </a:t>
+            </a:r>
+            <a:r>
+              <a:rPr lang="en-US" sz="1400" dirty="0" smtClean="0"/>
+              <a:t>to the lower common </a:t>
+            </a:r>
+            <a:r>
+              <a:rPr lang="en-US" sz="1400" dirty="0"/>
+              <a:t>layer</a:t>
+            </a:r>
+          </a:p>
+          <a:p>
+            <a:pPr marL="919163" lvl="1" indent="-342900">
+              <a:lnSpc>
+                <a:spcPct val="105000"/>
+              </a:lnSpc>
+              <a:spcBef>
+                <a:spcPts val="0"/>
+              </a:spcBef>
+              <a:buFont typeface="Arial" panose="020B0604020202020204" pitchFamily="34" charset="0"/>
+              <a:buChar char="•"/>
+            </a:pPr>
+            <a:r>
+              <a:rPr lang="en-US" sz="1400" dirty="0" smtClean="0"/>
+              <a:t>Develop all </a:t>
+            </a:r>
+            <a:r>
+              <a:rPr lang="en-US" sz="1400" dirty="0" smtClean="0"/>
+              <a:t>End </a:t>
+            </a:r>
+            <a:r>
+              <a:rPr lang="en-US" sz="1400" dirty="0"/>
+              <a:t>to End test </a:t>
+            </a:r>
+            <a:r>
+              <a:rPr lang="en-US" sz="1400" dirty="0" smtClean="0"/>
+              <a:t>automation scripts based on business use cases</a:t>
+            </a:r>
+          </a:p>
+        </p:txBody>
+      </p:sp>
+      <p:sp>
+        <p:nvSpPr>
+          <p:cNvPr id="6" name="Title 1"/>
+          <p:cNvSpPr txBox="1">
+            <a:spLocks/>
+          </p:cNvSpPr>
+          <p:nvPr/>
+        </p:nvSpPr>
+        <p:spPr>
+          <a:xfrm>
+            <a:off x="1009384" y="128455"/>
+            <a:ext cx="5765489" cy="651510"/>
+          </a:xfrm>
+          <a:prstGeom prst="rect">
+            <a:avLst/>
+          </a:prstGeom>
+        </p:spPr>
+        <p:txBody>
+          <a:bodyPr vert="horz" lIns="91440" tIns="45720" rIns="91440" bIns="45720" rtlCol="0" anchor="t">
+            <a:noAutofit/>
+          </a:bodyPr>
+          <a:lstStyle>
+            <a:lvl1pPr algn="l" defTabSz="457200" rtl="0" eaLnBrk="1" latinLnBrk="0" hangingPunct="1">
+              <a:spcBef>
+                <a:spcPct val="0"/>
+              </a:spcBef>
               <a:buNone/>
-            </a:pPr>
-            <a:endParaRPr lang="en-US" sz="900" b="1" dirty="0" smtClean="0"/>
+              <a:defRPr sz="5000" b="0" i="0" kern="1200">
+                <a:solidFill>
+                  <a:srgbClr val="128BAD"/>
+                </a:solidFill>
+                <a:latin typeface="Calibri Light"/>
+                <a:ea typeface="+mj-ea"/>
+                <a:cs typeface="Calibri Light"/>
+              </a:defRPr>
+            </a:lvl1pPr>
+          </a:lstStyle>
+          <a:p>
+            <a:pPr algn="ctr"/>
+            <a:r>
+              <a:rPr lang="en-US" dirty="0" smtClean="0"/>
+              <a:t>ROLL OUT</a:t>
+            </a:r>
+            <a:endParaRPr lang="en-US" dirty="0"/>
           </a:p>
         </p:txBody>
       </p:sp>
@@ -8275,8 +8078,8 @@
         </p:nvSpPr>
         <p:spPr>
           <a:xfrm>
-            <a:off x="1526513" y="124691"/>
-            <a:ext cx="6969787" cy="1325563"/>
+            <a:off x="1009385" y="779965"/>
+            <a:ext cx="6356616" cy="865955"/>
           </a:xfrm>
         </p:spPr>
         <p:txBody>
@@ -8312,8 +8115,8 @@
         </p:nvSpPr>
         <p:spPr>
           <a:xfrm>
-            <a:off x="437704" y="1837658"/>
-            <a:ext cx="8567504" cy="5001488"/>
+            <a:off x="285304" y="1827498"/>
+            <a:ext cx="8567504" cy="4867942"/>
           </a:xfrm>
         </p:spPr>
         <p:txBody>
@@ -8322,16 +8125,17 @@
           </a:bodyPr>
           <a:lstStyle/>
           <a:p>
-            <a:pPr>
+            <a:pPr marL="342900" indent="-342900">
               <a:lnSpc>
                 <a:spcPct val="110000"/>
               </a:lnSpc>
+              <a:buFont typeface="Arial" panose="020B0604020202020204" pitchFamily="34" charset="0"/>
+              <a:buChar char="•"/>
             </a:pPr>
             <a:r>
               <a:rPr lang="en-US" sz="2000" b="1" dirty="0" smtClean="0"/>
               <a:t>ROLL OUT &amp; ENGINEERING ADOPTION</a:t>
             </a:r>
-            <a:endParaRPr lang="en-US" sz="2000" b="1" dirty="0" smtClean="0"/>
           </a:p>
           <a:p>
             <a:pPr lvl="1">
@@ -8342,39 +8146,36 @@
               <a:buChar char="•"/>
             </a:pPr>
             <a:r>
-              <a:rPr lang="en-US" sz="1800" b="1" dirty="0"/>
-              <a:t>Schedule </a:t>
+              <a:rPr lang="en-US" sz="1800" b="1" dirty="0" err="1" smtClean="0"/>
+              <a:t>Intruduction</a:t>
             </a:r>
             <a:r>
               <a:rPr lang="en-US" sz="1800" b="1" dirty="0" smtClean="0"/>
-              <a:t>Based : </a:t>
-            </a:r>
-            <a:r>
-              <a:rPr lang="en-US" sz="1200" b="1" dirty="0" smtClean="0"/>
-              <a:t> </a:t>
-            </a:r>
-            <a:r>
-              <a:rPr lang="en-US" sz="1200" b="1" dirty="0" err="1" smtClean="0"/>
-              <a:t>Cron</a:t>
+              <a:t> and training mid Q2</a:t>
+            </a:r>
+          </a:p>
+          <a:p>
+            <a:pPr lvl="1">
+              <a:lnSpc>
+                <a:spcPct val="110000"/>
+              </a:lnSpc>
+              <a:buFont typeface="Arial" panose="020B0604020202020204" pitchFamily="34" charset="0"/>
+              <a:buChar char="•"/>
+            </a:pPr>
+            <a:r>
+              <a:rPr lang="en-US" sz="1800" b="1" dirty="0" smtClean="0"/>
+              <a:t>Fully operational by end Q2</a:t>
             </a:r>
             <a:endParaRPr lang="en-US" sz="1200" b="1" dirty="0" smtClean="0"/>
           </a:p>
           <a:p>
-            <a:pPr lvl="1">
+            <a:pPr marL="341313" lvl="1" indent="0">
               <a:lnSpc>
                 <a:spcPct val="110000"/>
               </a:lnSpc>
-              <a:buFont typeface="Arial" panose="020B0604020202020204" pitchFamily="34" charset="0"/>
-              <a:buChar char="•"/>
-            </a:pPr>
-            <a:r>
-              <a:rPr lang="en-US" sz="1800" b="1" dirty="0" smtClean="0"/>
-              <a:t>On Demand : </a:t>
-            </a:r>
-            <a:r>
-              <a:rPr lang="en-US" sz="1200" b="1" dirty="0" smtClean="0"/>
-              <a:t> - Jenkins</a:t>
-            </a:r>
+              <a:buNone/>
+            </a:pPr>
+            <a:endParaRPr lang="en-US" sz="1200" b="1" dirty="0" smtClean="0"/>
           </a:p>
           <a:p>
             <a:pPr marL="457206" lvl="1" indent="0">
@@ -8390,52 +8191,161 @@
             <a:endParaRPr lang="en-US" sz="1400" b="1" dirty="0"/>
           </a:p>
           <a:p>
-            <a:r>
-              <a:rPr lang="en-US" sz="2000" b="1" dirty="0"/>
+            <a:pPr marL="342900" indent="-342900">
+              <a:buFont typeface="Arial" panose="020B0604020202020204" pitchFamily="34" charset="0"/>
+              <a:buChar char="•"/>
+            </a:pPr>
+            <a:r>
+              <a:rPr lang="en-US" sz="2000" b="1" dirty="0">
+                <a:solidFill>
+                  <a:srgbClr val="FF0000"/>
+                </a:solidFill>
+              </a:rPr>
               <a:t>Configuration controlled </a:t>
             </a:r>
             <a:r>
-              <a:rPr lang="en-US" sz="2000" b="1" dirty="0" smtClean="0"/>
+              <a:rPr lang="en-US" sz="2000" b="1" dirty="0" smtClean="0">
+                <a:solidFill>
+                  <a:srgbClr val="FF0000"/>
+                </a:solidFill>
+              </a:rPr>
               <a:t>t</a:t>
             </a:r>
-            <a:endParaRPr lang="en-US" sz="2000" b="1" u="sng" dirty="0" smtClean="0"/>
+            <a:endParaRPr lang="en-US" sz="2000" b="1" u="sng" dirty="0" smtClean="0">
+              <a:solidFill>
+                <a:srgbClr val="FF0000"/>
+              </a:solidFill>
+            </a:endParaRPr>
           </a:p>
           <a:p>
             <a:pPr lvl="1">
               <a:lnSpc>
-                <a:spcPct val="100000"/>
-              </a:lnSpc>
-              <a:buFont typeface="Arial" panose="020B0604020202020204" pitchFamily="34" charset="0"/>
-              <a:buChar char="•"/>
-            </a:pPr>
-            <a:r>
-              <a:rPr lang="en-US" sz="1800" b="1" dirty="0" smtClean="0"/>
-              <a:t>Evolutionary change </a:t>
-            </a:r>
-            <a:r>
-              <a:rPr lang="en-US" sz="1800" b="1" dirty="0" err="1" smtClean="0"/>
-              <a:t>cript</a:t>
-            </a:r>
-            <a:r>
-              <a:rPr lang="en-US" sz="1800" b="1" dirty="0" smtClean="0"/>
-              <a:t> and into Framework Configuration</a:t>
-            </a:r>
-          </a:p>
-          <a:p>
-            <a:endParaRPr lang="en-US" b="1" dirty="0"/>
-          </a:p>
-          <a:p>
-            <a:r>
-              <a:rPr lang="en-US" sz="2000" b="1" dirty="0" smtClean="0"/>
-              <a:t>All testing </a:t>
-            </a:r>
-            <a:r>
-              <a:rPr lang="en-US" sz="2000" b="1" dirty="0" smtClean="0"/>
-              <a:t>or </a:t>
-            </a:r>
-            <a:r>
-              <a:rPr lang="en-US" sz="2000" b="1" dirty="0" smtClean="0"/>
-              <a:t>to run</a:t>
+                <a:spcPct val="110000"/>
+              </a:lnSpc>
+              <a:buFont typeface="Arial" panose="020B0604020202020204" pitchFamily="34" charset="0"/>
+              <a:buChar char="•"/>
+            </a:pPr>
+            <a:r>
+              <a:rPr lang="en-US" sz="1800" b="1" dirty="0">
+                <a:solidFill>
+                  <a:srgbClr val="FF0000"/>
+                </a:solidFill>
+              </a:rPr>
+              <a:t>Ipsum </a:t>
+            </a:r>
+            <a:r>
+              <a:rPr lang="en-US" sz="1800" b="1" dirty="0" err="1" smtClean="0">
+                <a:solidFill>
+                  <a:srgbClr val="FF0000"/>
+                </a:solidFill>
+              </a:rPr>
+              <a:t>lore</a:t>
+            </a:r>
+            <a:r>
+              <a:rPr lang="en-US" sz="1800" b="1" dirty="0" err="1">
+                <a:solidFill>
+                  <a:srgbClr val="FF0000"/>
+                </a:solidFill>
+              </a:rPr>
+              <a:t>Ipsum</a:t>
+            </a:r>
+            <a:r>
+              <a:rPr lang="en-US" sz="1800" b="1" dirty="0">
+                <a:solidFill>
+                  <a:srgbClr val="FF0000"/>
+                </a:solidFill>
+              </a:rPr>
+              <a:t> </a:t>
+            </a:r>
+            <a:r>
+              <a:rPr lang="en-US" sz="1800" b="1" dirty="0" err="1" smtClean="0">
+                <a:solidFill>
+                  <a:srgbClr val="FF0000"/>
+                </a:solidFill>
+              </a:rPr>
+              <a:t>lore</a:t>
+            </a:r>
+            <a:r>
+              <a:rPr lang="en-US" sz="1800" b="1" dirty="0" err="1">
+                <a:solidFill>
+                  <a:srgbClr val="FF0000"/>
+                </a:solidFill>
+              </a:rPr>
+              <a:t>Ipsum</a:t>
+            </a:r>
+            <a:r>
+              <a:rPr lang="en-US" sz="1800" b="1" dirty="0">
+                <a:solidFill>
+                  <a:srgbClr val="FF0000"/>
+                </a:solidFill>
+              </a:rPr>
+              <a:t> </a:t>
+            </a:r>
+            <a:r>
+              <a:rPr lang="en-US" sz="1800" b="1" dirty="0" err="1" smtClean="0">
+                <a:solidFill>
+                  <a:srgbClr val="FF0000"/>
+                </a:solidFill>
+              </a:rPr>
+              <a:t>lore</a:t>
+            </a:r>
+            <a:r>
+              <a:rPr lang="en-US" sz="1800" b="1" dirty="0" err="1">
+                <a:solidFill>
+                  <a:srgbClr val="FF0000"/>
+                </a:solidFill>
+              </a:rPr>
+              <a:t>Ipsum</a:t>
+            </a:r>
+            <a:r>
+              <a:rPr lang="en-US" sz="1800" b="1" dirty="0">
+                <a:solidFill>
+                  <a:srgbClr val="FF0000"/>
+                </a:solidFill>
+              </a:rPr>
+              <a:t> </a:t>
+            </a:r>
+            <a:r>
+              <a:rPr lang="en-US" sz="1800" b="1" dirty="0" smtClean="0">
+                <a:solidFill>
+                  <a:srgbClr val="FF0000"/>
+                </a:solidFill>
+              </a:rPr>
+              <a:t>lore</a:t>
+            </a:r>
+            <a:endParaRPr lang="en-US" sz="1000" b="1" dirty="0" smtClean="0">
+              <a:solidFill>
+                <a:srgbClr val="FF0000"/>
+              </a:solidFill>
+            </a:endParaRPr>
+          </a:p>
+          <a:p>
+            <a:endParaRPr lang="en-US" b="1" dirty="0" smtClean="0">
+              <a:solidFill>
+                <a:srgbClr val="FF0000"/>
+              </a:solidFill>
+            </a:endParaRPr>
+          </a:p>
+          <a:p>
+            <a:pPr marL="342900" indent="-342900">
+              <a:buFont typeface="Arial" panose="020B0604020202020204" pitchFamily="34" charset="0"/>
+              <a:buChar char="•"/>
+            </a:pPr>
+            <a:r>
+              <a:rPr lang="en-US" sz="2000" b="1" dirty="0" smtClean="0">
+                <a:solidFill>
+                  <a:srgbClr val="FF0000"/>
+                </a:solidFill>
+              </a:rPr>
+              <a:t>All </a:t>
+            </a:r>
+            <a:r>
+              <a:rPr lang="en-US" sz="2000" b="1" dirty="0" smtClean="0">
+                <a:solidFill>
+                  <a:srgbClr val="FF0000"/>
+                </a:solidFill>
+              </a:rPr>
+              <a:t>testing or to run</a:t>
             </a:r>
           </a:p>
           <a:p>
@@ -8444,20 +8354,28 @@
               <a:buChar char="•"/>
             </a:pPr>
             <a:r>
-              <a:rPr lang="en-US" sz="1800" b="1" dirty="0" smtClean="0"/>
+              <a:rPr lang="en-US" sz="1800" b="1" dirty="0" smtClean="0">
+                <a:solidFill>
+                  <a:srgbClr val="FF0000"/>
+                </a:solidFill>
+              </a:rPr>
               <a:t>Developers use </a:t>
             </a:r>
             <a:r>
-              <a:rPr lang="en-US" sz="1800" b="1" dirty="0" err="1" smtClean="0"/>
+              <a:rPr lang="en-US" sz="1800" b="1" dirty="0" err="1" smtClean="0">
+                <a:solidFill>
+                  <a:srgbClr val="FF0000"/>
+                </a:solidFill>
+              </a:rPr>
               <a:t>cdevelopment</a:t>
             </a:r>
             <a:r>
-              <a:rPr lang="en-US" sz="1800" b="1" dirty="0" smtClean="0"/>
-              <a:t> </a:t>
-            </a:r>
-            <a:r>
-              <a:rPr lang="en-US" sz="1800" b="1" dirty="0" smtClean="0"/>
-              <a:t>code</a:t>
+              <a:rPr lang="en-US" sz="1800" b="1" dirty="0" smtClean="0">
+                <a:solidFill>
+                  <a:srgbClr val="FF0000"/>
+                </a:solidFill>
+              </a:rPr>
+              <a:t> code</a:t>
             </a:r>
           </a:p>
           <a:p>
@@ -8466,16 +8384,12 @@
               <a:buChar char="•"/>
             </a:pPr>
             <a:r>
-              <a:rPr lang="en-US" sz="1800" b="1" dirty="0" smtClean="0"/>
-              <a:t>Gives CXTA </a:t>
-            </a:r>
-            <a:r>
-              <a:rPr lang="en-US" sz="1800" b="1" dirty="0" smtClean="0"/>
-              <a:t>w/out </a:t>
-            </a:r>
-            <a:r>
-              <a:rPr lang="en-US" sz="1800" b="1" dirty="0" smtClean="0"/>
-              <a:t>stepping on Dev</a:t>
+              <a:rPr lang="en-US" sz="1800" b="1" dirty="0" smtClean="0">
+                <a:solidFill>
+                  <a:srgbClr val="FF0000"/>
+                </a:solidFill>
+              </a:rPr>
+              <a:t>Gives CXTA w/out stepping on Dev</a:t>
             </a:r>
           </a:p>
           <a:p>
@@ -8487,6 +8401,53 @@
               <a:t>      </a:t>
             </a:r>
             <a:endParaRPr lang="en-US" sz="1400" dirty="0"/>
+          </a:p>
+        </p:txBody>
+      </p:sp>
+      <p:sp>
+        <p:nvSpPr>
+          <p:cNvPr id="4" name="Title 1"/>
+          <p:cNvSpPr txBox="1">
+            <a:spLocks/>
+          </p:cNvSpPr>
+          <p:nvPr/>
+        </p:nvSpPr>
+        <p:spPr>
+          <a:xfrm>
+            <a:off x="1009384" y="128455"/>
+            <a:ext cx="5765489" cy="651510"/>
+          </a:xfrm>
+          <a:prstGeom prst="rect">
+            <a:avLst/>
+          </a:prstGeom>
+        </p:spPr>
+        <p:txBody>
+          <a:bodyPr vert="horz" lIns="91440" tIns="45720" rIns="91440" bIns="45720" rtlCol="0" anchor="t">
+            <a:noAutofit/>
+          </a:bodyPr>
+          <a:lstStyle>
+            <a:lvl1pPr algn="l" defTabSz="457200" rtl="0" eaLnBrk="1" latinLnBrk="0" hangingPunct="1">
+              <a:spcBef>
+                <a:spcPct val="0"/>
+              </a:spcBef>
+              <a:buNone/>
+              <a:defRPr sz="5000" b="0" i="0" kern="1200">
+                <a:solidFill>
+                  <a:srgbClr val="128BAD"/>
+                </a:solidFill>
+                <a:latin typeface="Calibri Light"/>
+                <a:ea typeface="+mj-ea"/>
+                <a:cs typeface="Calibri Light"/>
+              </a:defRPr>
+            </a:lvl1pPr>
+          </a:lstStyle>
+          <a:p>
+            <a:pPr algn="ctr"/>
+            <a:r>
+              <a:rPr lang="en-US" dirty="0" smtClean="0"/>
+              <a:t>ROLL OUT</a:t>
+            </a:r>
+            <a:endParaRPr lang="en-US" dirty="0"/>
           </a:p>
         </p:txBody>
       </p:sp>
@@ -8552,11 +8513,7 @@
             <a:pPr algn="ctr"/>
             <a:r>
               <a:rPr lang="en-US" dirty="0" smtClean="0"/>
-              <a:t>TEST </a:t>
-            </a:r>
-            <a:r>
-              <a:rPr lang="en-US" dirty="0" smtClean="0"/>
-              <a:t>EXECUTION  </a:t>
+              <a:t>TEST EXECUTION  </a:t>
             </a:r>
             <a:endParaRPr lang="en-US" dirty="0">
               <a:solidFill>
@@ -8580,7 +8537,7 @@
         </p:nvSpPr>
         <p:spPr>
           <a:xfrm>
-            <a:off x="437704" y="1837658"/>
+            <a:off x="275144" y="1827498"/>
             <a:ext cx="8567504" cy="5001488"/>
           </a:xfrm>
         </p:spPr>
@@ -8590,10 +8547,12 @@
           </a:bodyPr>
           <a:lstStyle/>
           <a:p>
-            <a:pPr>
+            <a:pPr marL="342900" indent="-342900">
               <a:lnSpc>
                 <a:spcPct val="110000"/>
               </a:lnSpc>
+              <a:buFont typeface="Arial" panose="020B0604020202020204" pitchFamily="34" charset="0"/>
+              <a:buChar char="•"/>
             </a:pPr>
             <a:r>
               <a:rPr lang="en-US" sz="2000" b="1" dirty="0" smtClean="0"/>
@@ -8662,6 +8621,10 @@
             <a:endParaRPr lang="en-US" sz="1400" b="1" dirty="0"/>
           </a:p>
           <a:p>
+            <a:pPr marL="342900" indent="-342900">
+              <a:buFont typeface="Arial" panose="020B0604020202020204" pitchFamily="34" charset="0"/>
+              <a:buChar char="•"/>
+            </a:pPr>
             <a:r>
               <a:rPr lang="en-US" sz="2000" b="1" dirty="0"/>
               <a:t>Configuration controlled </a:t>
@@ -8730,6 +8693,10 @@
             <a:endParaRPr lang="en-US" b="1" dirty="0"/>
           </a:p>
           <a:p>
+            <a:pPr marL="342900" indent="-342900">
+              <a:buFont typeface="Arial" panose="020B0604020202020204" pitchFamily="34" charset="0"/>
+              <a:buChar char="•"/>
+            </a:pPr>
             <a:r>
               <a:rPr lang="en-US" sz="2000" b="1" dirty="0" smtClean="0"/>
               <a:t>All testing regardless of mode is </a:t>
@@ -9383,6 +9350,15 @@
 
 <file path=customXml/item1.xml><?xml version="1.0" encoding="utf-8"?>
 <?mso-contentType ?>
+<FormTemplates xmlns="http://schemas.microsoft.com/sharepoint/v3/contenttype/forms">
+  <Display>DocumentLibraryForm</Display>
+  <Edit>DocumentLibraryForm</Edit>
+  <New>DocumentLibraryForm</New>
+</FormTemplates>
+</file>
+
+<file path=customXml/item2.xml><?xml version="1.0" encoding="utf-8"?>
+<?mso-contentType ?>
 <spe:Receivers xmlns:spe="http://schemas.microsoft.com/sharepoint/events">
   <Receiver>
     <Name>Document ID Generator</Name>
@@ -9427,28 +9403,7 @@
 </spe:Receivers>
 </file>
 
-<file path=customXml/item2.xml><?xml version="1.0" encoding="utf-8"?>
-<?mso-contentType ?>
-<FormTemplates xmlns="http://schemas.microsoft.com/sharepoint/v3/contenttype/forms">
-  <Display>DocumentLibraryForm</Display>
-  <Edit>DocumentLibraryForm</Edit>
-  <New>DocumentLibraryForm</New>
-</FormTemplates>
-</file>
-
 <file path=customXml/item3.xml><?xml version="1.0" encoding="utf-8"?>
-<p:properties xmlns:p="http://schemas.microsoft.com/office/2006/metadata/properties" xmlns:xsi="http://www.w3.org/2001/XMLSchema-instance" xmlns:pc="http://schemas.microsoft.com/office/infopath/2007/PartnerControls">
-  <documentManagement>
-    <_dlc_DocId xmlns="a9328eaf-6333-4034-a7ce-997665b5f80d">6AH7XJTKT27D-494-2</_dlc_DocId>
-    <_dlc_DocIdUrl xmlns="a9328eaf-6333-4034-a7ce-997665b5f80d">
-      <Url>http://itportal/sites/PMD/presentations/_layouts/DocIdRedir.aspx?ID=6AH7XJTKT27D-494-2</Url>
-      <Description>6AH7XJTKT27D-494-2</Description>
-    </_dlc_DocIdUrl>
-  </documentManagement>
-</p:properties>
-</file>
-
-<file path=customXml/item4.xml><?xml version="1.0" encoding="utf-8"?>
 <ct:contentTypeSchema xmlns:ct="http://schemas.microsoft.com/office/2006/metadata/contentType" xmlns:ma="http://schemas.microsoft.com/office/2006/metadata/properties/metaAttributes" ct:_="" ma:_="" ma:contentTypeName="Document" ma:contentTypeID="0x0101000F421C3DE11F24489C3C49A9442BEF44" ma:contentTypeVersion="0" ma:contentTypeDescription="Create a new document." ma:contentTypeScope="" ma:versionID="03fa29219166c606cfec6c1a2cbf2ee4">
   <xsd:schema xmlns:xsd="http://www.w3.org/2001/XMLSchema" xmlns:xs="http://www.w3.org/2001/XMLSchema" xmlns:p="http://schemas.microsoft.com/office/2006/metadata/properties" xmlns:ns2="a9328eaf-6333-4034-a7ce-997665b5f80d" targetNamespace="http://schemas.microsoft.com/office/2006/metadata/properties" ma:root="true" ma:fieldsID="40f1611e01294dd1c52f51bc3dec7bd7" ns2:_="">
     <xsd:import namespace="a9328eaf-6333-4034-a7ce-997665b5f80d"/>
@@ -9593,7 +9548,27 @@
 </ct:contentTypeSchema>
 </file>
 
+<file path=customXml/item4.xml><?xml version="1.0" encoding="utf-8"?>
+<p:properties xmlns:p="http://schemas.microsoft.com/office/2006/metadata/properties" xmlns:xsi="http://www.w3.org/2001/XMLSchema-instance" xmlns:pc="http://schemas.microsoft.com/office/infopath/2007/PartnerControls">
+  <documentManagement>
+    <_dlc_DocId xmlns="a9328eaf-6333-4034-a7ce-997665b5f80d">6AH7XJTKT27D-494-2</_dlc_DocId>
+    <_dlc_DocIdUrl xmlns="a9328eaf-6333-4034-a7ce-997665b5f80d">
+      <Url>http://itportal/sites/PMD/presentations/_layouts/DocIdRedir.aspx?ID=6AH7XJTKT27D-494-2</Url>
+      <Description>6AH7XJTKT27D-494-2</Description>
+    </_dlc_DocIdUrl>
+  </documentManagement>
+</p:properties>
+</file>
+
 <file path=customXml/itemProps1.xml><?xml version="1.0" encoding="utf-8"?>
+<ds:datastoreItem xmlns:ds="http://schemas.openxmlformats.org/officeDocument/2006/customXml" ds:itemID="{E9FEC3C6-DD16-422A-B8AE-8B104F632898}">
+  <ds:schemaRefs>
+    <ds:schemaRef ds:uri="http://schemas.microsoft.com/sharepoint/v3/contenttype/forms"/>
+  </ds:schemaRefs>
+</ds:datastoreItem>
+</file>
+
+<file path=customXml/itemProps2.xml><?xml version="1.0" encoding="utf-8"?>
 <ds:datastoreItem xmlns:ds="http://schemas.openxmlformats.org/officeDocument/2006/customXml" ds:itemID="{8CB52003-E8CD-4DF2-932F-2EC7EF4DD677}">
   <ds:schemaRefs>
     <ds:schemaRef ds:uri="http://schemas.microsoft.com/sharepoint/events"/>
@@ -9601,31 +9576,7 @@
 </ds:datastoreItem>
 </file>
 
-<file path=customXml/itemProps2.xml><?xml version="1.0" encoding="utf-8"?>
-<ds:datastoreItem xmlns:ds="http://schemas.openxmlformats.org/officeDocument/2006/customXml" ds:itemID="{E9FEC3C6-DD16-422A-B8AE-8B104F632898}">
-  <ds:schemaRefs>
-    <ds:schemaRef ds:uri="http://schemas.microsoft.com/sharepoint/v3/contenttype/forms"/>
-  </ds:schemaRefs>
-</ds:datastoreItem>
-</file>
-
 <file path=customXml/itemProps3.xml><?xml version="1.0" encoding="utf-8"?>
-<ds:datastoreItem xmlns:ds="http://schemas.openxmlformats.org/officeDocument/2006/customXml" ds:itemID="{39B4CF60-C0DC-4692-912B-881AF8D8CFF5}">
-  <ds:schemaRefs>
-    <ds:schemaRef ds:uri="http://schemas.openxmlformats.org/package/2006/metadata/core-properties"/>
-    <ds:schemaRef ds:uri="http://schemas.microsoft.com/office/infopath/2007/PartnerControls"/>
-    <ds:schemaRef ds:uri="http://schemas.microsoft.com/office/2006/documentManagement/types"/>
-    <ds:schemaRef ds:uri="http://purl.org/dc/terms/"/>
-    <ds:schemaRef ds:uri="http://purl.org/dc/elements/1.1/"/>
-    <ds:schemaRef ds:uri="a9328eaf-6333-4034-a7ce-997665b5f80d"/>
-    <ds:schemaRef ds:uri="http://schemas.microsoft.com/office/2006/metadata/properties"/>
-    <ds:schemaRef ds:uri="http://www.w3.org/XML/1998/namespace"/>
-    <ds:schemaRef ds:uri="http://purl.org/dc/dcmitype/"/>
-  </ds:schemaRefs>
-</ds:datastoreItem>
-</file>
-
-<file path=customXml/itemProps4.xml><?xml version="1.0" encoding="utf-8"?>
 <ds:datastoreItem xmlns:ds="http://schemas.openxmlformats.org/officeDocument/2006/customXml" ds:itemID="{EF7533AB-0193-4AEC-8EC4-E6A274EB1992}">
   <ds:schemaRefs>
     <ds:schemaRef ds:uri="http://schemas.microsoft.com/office/2006/metadata/contentType"/>
@@ -9641,4 +9592,20 @@
     <ds:schemaRef ds:uri="http://schemas.microsoft.com/internal/obd"/>
   </ds:schemaRefs>
 </ds:datastoreItem>
+</file>
+
+<file path=customXml/itemProps4.xml><?xml version="1.0" encoding="utf-8"?>
+<ds:datastoreItem xmlns:ds="http://schemas.openxmlformats.org/officeDocument/2006/customXml" ds:itemID="{39B4CF60-C0DC-4692-912B-881AF8D8CFF5}">
+  <ds:schemaRefs>
+    <ds:schemaRef ds:uri="http://schemas.microsoft.com/office/2006/documentManagement/types"/>
+    <ds:schemaRef ds:uri="http://schemas.openxmlformats.org/package/2006/metadata/core-properties"/>
+    <ds:schemaRef ds:uri="http://www.w3.org/XML/1998/namespace"/>
+    <ds:schemaRef ds:uri="a9328eaf-6333-4034-a7ce-997665b5f80d"/>
+    <ds:schemaRef ds:uri="http://purl.org/dc/elements/1.1/"/>
+    <ds:schemaRef ds:uri="http://purl.org/dc/terms/"/>
+    <ds:schemaRef ds:uri="http://schemas.microsoft.com/office/infopath/2007/PartnerControls"/>
+    <ds:schemaRef ds:uri="http://schemas.microsoft.com/office/2006/metadata/properties"/>
+    <ds:schemaRef ds:uri="http://purl.org/dc/dcmitype/"/>
+  </ds:schemaRefs>
+</ds:datastoreItem>
 </file>
</xml_diff>

<commit_message>
3/27/28 mods and file capture
</commit_message>
<xml_diff>
--- a/CurrentWork_Delta/CX_StrategyPowerPoint.pptx
+++ b/CurrentWork_Delta/CX_StrategyPowerPoint.pptx
@@ -5,7 +5,7 @@
     <p:sldMasterId id="2147483648" r:id="rId5"/>
   </p:sldMasterIdLst>
   <p:notesMasterIdLst>
-    <p:notesMasterId r:id="rId23"/>
+    <p:notesMasterId r:id="rId24"/>
   </p:notesMasterIdLst>
   <p:sldIdLst>
     <p:sldId id="256" r:id="rId6"/>
@@ -18,13 +18,14 @@
     <p:sldId id="274" r:id="rId13"/>
     <p:sldId id="287" r:id="rId14"/>
     <p:sldId id="285" r:id="rId15"/>
-    <p:sldId id="275" r:id="rId16"/>
-    <p:sldId id="281" r:id="rId17"/>
-    <p:sldId id="282" r:id="rId18"/>
-    <p:sldId id="273" r:id="rId19"/>
-    <p:sldId id="279" r:id="rId20"/>
-    <p:sldId id="280" r:id="rId21"/>
-    <p:sldId id="284" r:id="rId22"/>
+    <p:sldId id="280" r:id="rId16"/>
+    <p:sldId id="275" r:id="rId17"/>
+    <p:sldId id="281" r:id="rId18"/>
+    <p:sldId id="282" r:id="rId19"/>
+    <p:sldId id="273" r:id="rId20"/>
+    <p:sldId id="279" r:id="rId21"/>
+    <p:sldId id="288" r:id="rId22"/>
+    <p:sldId id="284" r:id="rId23"/>
   </p:sldIdLst>
   <p:sldSz cx="9144000" cy="6858000" type="screen4x3"/>
   <p:notesSz cx="7010400" cy="9296400"/>
@@ -227,7 +228,7 @@
           <a:p>
             <a:fld id="{7195FF61-7FDF-4F4D-A3AE-3078F9B9BE1D}" type="datetimeFigureOut">
               <a:rPr lang="en-US" smtClean="0"/>
-              <a:t>3/20/2018</a:t>
+              <a:t>3/27/2018</a:t>
             </a:fld>
             <a:endParaRPr lang="en-US"/>
           </a:p>
@@ -2042,8 +2043,8 @@
         </p:nvSpPr>
         <p:spPr>
           <a:xfrm>
-            <a:off x="2928934" y="1680288"/>
-            <a:ext cx="5757866" cy="4396195"/>
+            <a:off x="2928934" y="1111328"/>
+            <a:ext cx="5757866" cy="5360592"/>
           </a:xfrm>
           <a:prstGeom prst="rect">
             <a:avLst/>
@@ -2051,7 +2052,7 @@
         </p:spPr>
         <p:txBody>
           <a:bodyPr vert="horz" lIns="91440" tIns="45720" rIns="91440" bIns="45720" rtlCol="0" anchor="b">
-            <a:normAutofit lnSpcReduction="10000"/>
+            <a:normAutofit/>
           </a:bodyPr>
           <a:lstStyle>
             <a:lvl1pPr marL="0" marR="0" indent="0" algn="l" defTabSz="457200" rtl="0" eaLnBrk="1" fontAlgn="auto" latinLnBrk="0" hangingPunct="1">
@@ -2264,11 +2265,7 @@
             <a:pPr algn="ctr"/>
             <a:r>
               <a:rPr lang="en-US" sz="2800" dirty="0" smtClean="0"/>
-              <a:t>Roll </a:t>
-            </a:r>
-            <a:r>
-              <a:rPr lang="en-US" sz="2800" dirty="0" smtClean="0"/>
-              <a:t>Out</a:t>
+              <a:t>Roll Out</a:t>
             </a:r>
           </a:p>
           <a:p>
@@ -2284,7 +2281,6 @@
               <a:rPr lang="en-US" sz="2800" dirty="0" smtClean="0"/>
               <a:t>Proposed Timeline</a:t>
             </a:r>
-            <a:endParaRPr lang="en-US" sz="2800" dirty="0" smtClean="0"/>
           </a:p>
           <a:p>
             <a:pPr algn="ctr"/>
@@ -2297,7 +2293,18 @@
             <a:pPr algn="ctr"/>
             <a:r>
               <a:rPr lang="en-US" sz="2800" dirty="0" smtClean="0"/>
-              <a:t>Testing Types</a:t>
+              <a:t>Testing </a:t>
+            </a:r>
+            <a:r>
+              <a:rPr lang="en-US" sz="2800" dirty="0" smtClean="0"/>
+              <a:t>Types</a:t>
+            </a:r>
+          </a:p>
+          <a:p>
+            <a:pPr algn="ctr"/>
+            <a:r>
+              <a:rPr lang="en-US" sz="2800" dirty="0" smtClean="0"/>
+              <a:t>Test Case Numbers</a:t>
             </a:r>
             <a:endParaRPr lang="en-US" sz="2800" dirty="0" smtClean="0"/>
           </a:p>
@@ -2508,6 +2515,21 @@
             </a:r>
           </a:p>
           <a:p>
+            <a:pPr marL="341313" lvl="1" indent="0">
+              <a:lnSpc>
+                <a:spcPct val="150000"/>
+              </a:lnSpc>
+              <a:spcBef>
+                <a:spcPts val="0"/>
+              </a:spcBef>
+              <a:buNone/>
+            </a:pPr>
+            <a:r>
+              <a:rPr lang="en-US" sz="800" b="1" dirty="0" smtClean="0"/>
+              <a:t>     </a:t>
+            </a:r>
+          </a:p>
+          <a:p>
             <a:pPr lvl="1">
               <a:lnSpc>
                 <a:spcPct val="150000"/>
@@ -2520,7 +2542,11 @@
             </a:pPr>
             <a:r>
               <a:rPr lang="en-US" sz="1800" b="1" dirty="0" smtClean="0"/>
-              <a:t>Application level work flow : End to End</a:t>
+              <a:t>Application </a:t>
+            </a:r>
+            <a:r>
+              <a:rPr lang="en-US" sz="1800" b="1" dirty="0" smtClean="0"/>
+              <a:t>level work flow : End to End</a:t>
             </a:r>
           </a:p>
           <a:p>
@@ -2556,6 +2582,20 @@
             </a:r>
           </a:p>
           <a:p>
+            <a:pPr indent="-234950">
+              <a:lnSpc>
+                <a:spcPct val="150000"/>
+              </a:lnSpc>
+              <a:spcBef>
+                <a:spcPts val="0"/>
+              </a:spcBef>
+            </a:pPr>
+            <a:r>
+              <a:rPr lang="en-US" sz="800" b="1" dirty="0" smtClean="0"/>
+              <a:t>   </a:t>
+            </a:r>
+          </a:p>
+          <a:p>
             <a:pPr lvl="1">
               <a:lnSpc>
                 <a:spcPct val="150000"/>
@@ -2568,7 +2608,11 @@
             </a:pPr>
             <a:r>
               <a:rPr lang="en-US" sz="1800" b="1" dirty="0" smtClean="0"/>
-              <a:t>Micro Service REST APIs</a:t>
+              <a:t>Micro </a:t>
+            </a:r>
+            <a:r>
+              <a:rPr lang="en-US" sz="1800" b="1" dirty="0" smtClean="0"/>
+              <a:t>Service REST APIs</a:t>
             </a:r>
           </a:p>
           <a:p>
@@ -2648,6 +2692,199 @@
 </file>
 
 <file path=ppt/slides/slide11.xml><?xml version="1.0" encoding="utf-8"?>
+<p:sld xmlns:a="http://schemas.openxmlformats.org/drawingml/2006/main" xmlns:r="http://schemas.openxmlformats.org/officeDocument/2006/relationships" xmlns:p="http://schemas.openxmlformats.org/presentationml/2006/main">
+  <p:cSld>
+    <p:spTree>
+      <p:nvGrpSpPr>
+        <p:cNvPr id="1" name=""/>
+        <p:cNvGrpSpPr/>
+        <p:nvPr/>
+      </p:nvGrpSpPr>
+      <p:grpSpPr>
+        <a:xfrm>
+          <a:off x="0" y="0"/>
+          <a:ext cx="0" cy="0"/>
+          <a:chOff x="0" y="0"/>
+          <a:chExt cx="0" cy="0"/>
+        </a:xfrm>
+      </p:grpSpPr>
+      <p:sp>
+        <p:nvSpPr>
+          <p:cNvPr id="4" name="Title 1">
+            <a:hlinkClick r:id="rId2" action="ppaction://hlinksldjump"/>
+          </p:cNvPr>
+          <p:cNvSpPr txBox="1">
+            <a:spLocks/>
+          </p:cNvSpPr>
+          <p:nvPr/>
+        </p:nvSpPr>
+        <p:spPr>
+          <a:xfrm>
+            <a:off x="367715" y="48103"/>
+            <a:ext cx="313005" cy="287177"/>
+          </a:xfrm>
+          <a:prstGeom prst="rect">
+            <a:avLst/>
+          </a:prstGeom>
+        </p:spPr>
+        <p:txBody>
+          <a:bodyPr vert="horz" lIns="91440" tIns="45720" rIns="91440" bIns="45720" rtlCol="0" anchor="t">
+            <a:normAutofit fontScale="55000" lnSpcReduction="20000"/>
+          </a:bodyPr>
+          <a:lstStyle>
+            <a:lvl1pPr algn="l" defTabSz="457200" rtl="0" eaLnBrk="1" latinLnBrk="0" hangingPunct="1">
+              <a:spcBef>
+                <a:spcPct val="0"/>
+              </a:spcBef>
+              <a:buNone/>
+              <a:defRPr sz="5000" b="0" i="0" kern="1200">
+                <a:solidFill>
+                  <a:srgbClr val="128BAD"/>
+                </a:solidFill>
+                <a:latin typeface="Calibri Light"/>
+                <a:ea typeface="+mj-ea"/>
+                <a:cs typeface="Calibri Light"/>
+              </a:defRPr>
+            </a:lvl1pPr>
+          </a:lstStyle>
+          <a:p>
+            <a:endParaRPr lang="en-US" sz="2800" dirty="0">
+              <a:solidFill>
+                <a:schemeClr val="bg1">
+                  <a:lumMod val="95000"/>
+                </a:schemeClr>
+              </a:solidFill>
+            </a:endParaRPr>
+          </a:p>
+        </p:txBody>
+      </p:sp>
+      <p:sp>
+        <p:nvSpPr>
+          <p:cNvPr id="8" name="Title 7"/>
+          <p:cNvSpPr>
+            <a:spLocks noGrp="1"/>
+          </p:cNvSpPr>
+          <p:nvPr>
+            <p:ph type="title"/>
+          </p:nvPr>
+        </p:nvSpPr>
+        <p:spPr>
+          <a:xfrm>
+            <a:off x="713155" y="109366"/>
+            <a:ext cx="6896686" cy="983152"/>
+          </a:xfrm>
+        </p:spPr>
+        <p:txBody>
+          <a:bodyPr anchor="t">
+            <a:normAutofit/>
+          </a:bodyPr>
+          <a:lstStyle/>
+          <a:p>
+            <a:pPr algn="ctr"/>
+            <a:r>
+              <a:rPr lang="en-US" dirty="0" smtClean="0"/>
+              <a:t>TEST CASES NUMBERS</a:t>
+            </a:r>
+            <a:endParaRPr lang="en-US" dirty="0"/>
+          </a:p>
+        </p:txBody>
+      </p:sp>
+      <p:pic>
+        <p:nvPicPr>
+          <p:cNvPr id="12" name="Picture 11"/>
+          <p:cNvPicPr>
+            <a:picLocks noChangeAspect="1"/>
+          </p:cNvPicPr>
+          <p:nvPr/>
+        </p:nvPicPr>
+        <p:blipFill>
+          <a:blip r:embed="rId3">
+            <a:extLst>
+              <a:ext uri="{28A0092B-C50C-407E-A947-70E740481C1C}">
+                <a14:useLocalDpi xmlns:a14="http://schemas.microsoft.com/office/drawing/2010/main" val="0"/>
+              </a:ext>
+            </a:extLst>
+          </a:blip>
+          <a:stretch>
+            <a:fillRect/>
+          </a:stretch>
+        </p:blipFill>
+        <p:spPr>
+          <a:xfrm>
+            <a:off x="680720" y="1459114"/>
+            <a:ext cx="2040206" cy="3710656"/>
+          </a:xfrm>
+          <a:prstGeom prst="rect">
+            <a:avLst/>
+          </a:prstGeom>
+        </p:spPr>
+      </p:pic>
+      <p:sp>
+        <p:nvSpPr>
+          <p:cNvPr id="13" name="TextBox 12"/>
+          <p:cNvSpPr txBox="1"/>
+          <p:nvPr/>
+        </p:nvSpPr>
+        <p:spPr>
+          <a:xfrm>
+            <a:off x="2519680" y="1590596"/>
+            <a:ext cx="5618480" cy="2554545"/>
+          </a:xfrm>
+          <a:prstGeom prst="rect">
+            <a:avLst/>
+          </a:prstGeom>
+          <a:noFill/>
+        </p:spPr>
+        <p:txBody>
+          <a:bodyPr wrap="square" rtlCol="0">
+            <a:spAutoFit/>
+          </a:bodyPr>
+          <a:lstStyle/>
+          <a:p>
+            <a:r>
+              <a:rPr lang="en-US" sz="2000" dirty="0" smtClean="0"/>
+              <a:t>This listing of test case numbers requires an understanding of framework configuration and dataProvider test technology abilities</a:t>
+            </a:r>
+          </a:p>
+          <a:p>
+            <a:endParaRPr lang="en-US" sz="2000" dirty="0"/>
+          </a:p>
+          <a:p>
+            <a:endParaRPr lang="en-US" sz="2000" dirty="0" smtClean="0"/>
+          </a:p>
+          <a:p>
+            <a:r>
+              <a:rPr lang="en-US" sz="2000" dirty="0" smtClean="0"/>
+              <a:t>These test only represent the Shopping and Buying Application and only through phase 3  of  8 phases</a:t>
+            </a:r>
+            <a:endParaRPr lang="en-US" sz="2000" dirty="0"/>
+          </a:p>
+          <a:p>
+            <a:endParaRPr lang="en-US" sz="2000" dirty="0"/>
+          </a:p>
+        </p:txBody>
+      </p:sp>
+    </p:spTree>
+    <p:extLst>
+      <p:ext uri="{BB962C8B-B14F-4D97-AF65-F5344CB8AC3E}">
+        <p14:creationId xmlns:p14="http://schemas.microsoft.com/office/powerpoint/2010/main" val="2893813657"/>
+      </p:ext>
+    </p:extLst>
+  </p:cSld>
+  <p:clrMapOvr>
+    <a:masterClrMapping/>
+  </p:clrMapOvr>
+  <p:timing>
+    <p:tnLst>
+      <p:par>
+        <p:cTn id="1" dur="indefinite" restart="never" nodeType="tmRoot"/>
+      </p:par>
+    </p:tnLst>
+  </p:timing>
+</p:sld>
+</file>
+
+<file path=ppt/slides/slide12.xml><?xml version="1.0" encoding="utf-8"?>
 <p:sld xmlns:a="http://schemas.openxmlformats.org/drawingml/2006/main" xmlns:r="http://schemas.openxmlformats.org/officeDocument/2006/relationships" xmlns:p="http://schemas.openxmlformats.org/presentationml/2006/main">
   <p:cSld>
     <p:spTree>
@@ -2862,7 +3099,7 @@
 </p:sld>
 </file>
 
-<file path=ppt/slides/slide12.xml><?xml version="1.0" encoding="utf-8"?>
+<file path=ppt/slides/slide13.xml><?xml version="1.0" encoding="utf-8"?>
 <p:sld xmlns:a="http://schemas.openxmlformats.org/drawingml/2006/main" xmlns:r="http://schemas.openxmlformats.org/officeDocument/2006/relationships" xmlns:p="http://schemas.openxmlformats.org/presentationml/2006/main">
   <p:cSld>
     <p:spTree>
@@ -3059,7 +3296,7 @@
 </p:sld>
 </file>
 
-<file path=ppt/slides/slide13.xml><?xml version="1.0" encoding="utf-8"?>
+<file path=ppt/slides/slide14.xml><?xml version="1.0" encoding="utf-8"?>
 <p:sld xmlns:a="http://schemas.openxmlformats.org/drawingml/2006/main" xmlns:r="http://schemas.openxmlformats.org/officeDocument/2006/relationships" xmlns:p="http://schemas.openxmlformats.org/presentationml/2006/main">
   <p:cSld>
     <p:spTree>
@@ -3293,7 +3530,7 @@
 </p:sld>
 </file>
 
-<file path=ppt/slides/slide14.xml><?xml version="1.0" encoding="utf-8"?>
+<file path=ppt/slides/slide15.xml><?xml version="1.0" encoding="utf-8"?>
 <p:sld xmlns:a="http://schemas.openxmlformats.org/drawingml/2006/main" xmlns:r="http://schemas.openxmlformats.org/officeDocument/2006/relationships" xmlns:p="http://schemas.openxmlformats.org/presentationml/2006/main">
   <p:cSld>
     <p:spTree>
@@ -3891,7 +4128,7 @@
 </p:sld>
 </file>
 
-<file path=ppt/slides/slide15.xml><?xml version="1.0" encoding="utf-8"?>
+<file path=ppt/slides/slide16.xml><?xml version="1.0" encoding="utf-8"?>
 <p:sld xmlns:a="http://schemas.openxmlformats.org/drawingml/2006/main" xmlns:r="http://schemas.openxmlformats.org/officeDocument/2006/relationships" xmlns:p="http://schemas.openxmlformats.org/presentationml/2006/main">
   <p:cSld>
     <p:spTree>
@@ -3977,8 +4214,49 @@
             </a:pPr>
             <a:r>
               <a:rPr lang="en-US" sz="1800" dirty="0"/>
-              <a:t>The smaller the mid layer, the easier to add new capability ( new applications )</a:t>
-            </a:r>
+              <a:t>The smaller the mid layer, the easier to add new capability ( new applications </a:t>
+            </a:r>
+            <a:r>
+              <a:rPr lang="en-US" sz="1800" dirty="0" smtClean="0"/>
+              <a:t>)</a:t>
+            </a:r>
+          </a:p>
+          <a:p>
+            <a:pPr marL="919163" lvl="1" indent="-342900">
+              <a:buFont typeface="Arial" panose="020B0604020202020204" pitchFamily="34" charset="0"/>
+              <a:buChar char="•"/>
+            </a:pPr>
+            <a:r>
+              <a:rPr lang="en-US" sz="1800" dirty="0" smtClean="0"/>
+              <a:t>Decouple testing concepts in the upper layer from calls to Protractor that belong in the </a:t>
+            </a:r>
+            <a:r>
+              <a:rPr lang="en-US" sz="1800" dirty="0" err="1" smtClean="0"/>
+              <a:t>midLayer</a:t>
+            </a:r>
+            <a:r>
+              <a:rPr lang="en-US" sz="1800" dirty="0" smtClean="0"/>
+              <a:t> ( </a:t>
+            </a:r>
+            <a:r>
+              <a:rPr lang="en-US" sz="1800" dirty="0" err="1" smtClean="0"/>
+              <a:t>pageObjects</a:t>
+            </a:r>
+            <a:r>
+              <a:rPr lang="en-US" sz="1800" dirty="0" smtClean="0"/>
+              <a:t> )</a:t>
+            </a:r>
+          </a:p>
+          <a:p>
+            <a:pPr marL="919163" lvl="1" indent="-342900">
+              <a:buFont typeface="Arial" panose="020B0604020202020204" pitchFamily="34" charset="0"/>
+              <a:buChar char="•"/>
+            </a:pPr>
+            <a:r>
+              <a:rPr lang="en-US" sz="1800" dirty="0" smtClean="0"/>
+              <a:t>Work in localized well isolated areas.  Keep the churn away from the dev engineers</a:t>
+            </a:r>
+            <a:endParaRPr lang="en-US" sz="1800" dirty="0"/>
           </a:p>
           <a:p>
             <a:endParaRPr lang="en-US" sz="2000" dirty="0" smtClean="0"/>
@@ -3989,31 +4267,57 @@
               <a:buChar char="•"/>
             </a:pPr>
             <a:r>
+              <a:rPr lang="en-US" sz="2000" dirty="0" smtClean="0"/>
+              <a:t>Add Coverage for a new application</a:t>
+            </a:r>
+            <a:endParaRPr lang="en-US" sz="2000" dirty="0"/>
+          </a:p>
+          <a:p>
+            <a:pPr marL="862013" lvl="1" indent="-285750">
+              <a:buFont typeface="Arial" panose="020B0604020202020204" pitchFamily="34" charset="0"/>
+              <a:buChar char="•"/>
+            </a:pPr>
+            <a:r>
+              <a:rPr lang="en-US" sz="1600" dirty="0" smtClean="0"/>
+              <a:t>Adding support for new applications can be accomplished in </a:t>
+            </a:r>
+            <a:r>
+              <a:rPr lang="en-US" sz="1600" dirty="0"/>
+              <a:t>~10 working Days</a:t>
+            </a:r>
+          </a:p>
+          <a:p>
+            <a:endParaRPr lang="en-US" sz="2000" dirty="0" smtClean="0"/>
+          </a:p>
+          <a:p>
+            <a:pPr marL="342900" indent="-342900">
+              <a:buFont typeface="Arial" panose="020B0604020202020204" pitchFamily="34" charset="0"/>
+              <a:buChar char="•"/>
+            </a:pPr>
+            <a:r>
+              <a:rPr lang="en-US" sz="2000" dirty="0" smtClean="0"/>
+              <a:t>Better Reporting</a:t>
+            </a:r>
+          </a:p>
+          <a:p>
+            <a:pPr marL="342900" indent="-342900">
+              <a:buFont typeface="Arial" panose="020B0604020202020204" pitchFamily="34" charset="0"/>
+              <a:buChar char="•"/>
+            </a:pPr>
+            <a:endParaRPr lang="en-US" sz="2000" dirty="0" smtClean="0"/>
+          </a:p>
+          <a:p>
+            <a:pPr marL="342900" indent="-342900">
+              <a:buFont typeface="Arial" panose="020B0604020202020204" pitchFamily="34" charset="0"/>
+              <a:buChar char="•"/>
+            </a:pPr>
+            <a:r>
+              <a:rPr lang="en-US" sz="2000" dirty="0" smtClean="0"/>
+              <a:t>Test </a:t>
+            </a:r>
+            <a:r>
               <a:rPr lang="en-US" sz="2000" dirty="0"/>
-              <a:t>Additional Application Coverage</a:t>
-            </a:r>
-          </a:p>
-          <a:p>
-            <a:pPr marL="862013" lvl="1" indent="-285750">
-              <a:buFont typeface="Arial" panose="020B0604020202020204" pitchFamily="34" charset="0"/>
-              <a:buChar char="•"/>
-            </a:pPr>
-            <a:r>
-              <a:rPr lang="en-US" sz="1600" dirty="0"/>
-              <a:t>New Support should be capable in ~10 working Days</a:t>
-            </a:r>
-          </a:p>
-          <a:p>
-            <a:endParaRPr lang="en-US" sz="2000" dirty="0" smtClean="0"/>
-          </a:p>
-          <a:p>
-            <a:pPr marL="342900" indent="-342900">
-              <a:buFont typeface="Arial" panose="020B0604020202020204" pitchFamily="34" charset="0"/>
-              <a:buChar char="•"/>
-            </a:pPr>
-            <a:r>
-              <a:rPr lang="en-US" sz="2000" dirty="0"/>
-              <a:t>Test Headless  : Trying to overcome CPU and Memory consumption</a:t>
+              <a:t>Headless  : Trying to overcome CPU and Memory consumption</a:t>
             </a:r>
           </a:p>
           <a:p>
@@ -4063,7 +4367,7 @@
 </p:sld>
 </file>
 
-<file path=ppt/slides/slide16.xml><?xml version="1.0" encoding="utf-8"?>
+<file path=ppt/slides/slide17.xml><?xml version="1.0" encoding="utf-8"?>
 <p:sld xmlns:a="http://schemas.openxmlformats.org/drawingml/2006/main" xmlns:r="http://schemas.openxmlformats.org/officeDocument/2006/relationships" xmlns:p="http://schemas.openxmlformats.org/presentationml/2006/main">
   <p:cSld>
     <p:spTree>
@@ -4259,7 +4563,7 @@
     </p:spTree>
     <p:extLst>
       <p:ext uri="{BB962C8B-B14F-4D97-AF65-F5344CB8AC3E}">
-        <p14:creationId xmlns:p14="http://schemas.microsoft.com/office/powerpoint/2010/main" val="2893813657"/>
+        <p14:creationId xmlns:p14="http://schemas.microsoft.com/office/powerpoint/2010/main" val="1050889800"/>
       </p:ext>
     </p:extLst>
   </p:cSld>
@@ -4276,7 +4580,7 @@
 </p:sld>
 </file>
 
-<file path=ppt/slides/slide17.xml><?xml version="1.0" encoding="utf-8"?>
+<file path=ppt/slides/slide18.xml><?xml version="1.0" encoding="utf-8"?>
 <p:sld xmlns:a="http://schemas.openxmlformats.org/drawingml/2006/main" xmlns:r="http://schemas.openxmlformats.org/officeDocument/2006/relationships" xmlns:p="http://schemas.openxmlformats.org/presentationml/2006/main">
   <p:cSld>
     <p:spTree>
@@ -6835,7 +7139,7 @@
         </p:spPr>
         <p:txBody>
           <a:bodyPr>
-            <a:normAutofit fontScale="92500" lnSpcReduction="20000"/>
+            <a:normAutofit fontScale="92500" lnSpcReduction="10000"/>
           </a:bodyPr>
           <a:lstStyle/>
           <a:p>
@@ -6968,6 +7272,44 @@
             </a:r>
           </a:p>
           <a:p>
+            <a:pPr marL="285750" indent="-285750">
+              <a:lnSpc>
+                <a:spcPct val="114000"/>
+              </a:lnSpc>
+              <a:spcBef>
+                <a:spcPts val="0"/>
+              </a:spcBef>
+              <a:buFont typeface="Arial" panose="020B0604020202020204" pitchFamily="34" charset="0"/>
+              <a:buChar char="•"/>
+            </a:pPr>
+            <a:r>
+              <a:rPr lang="en-US" sz="2200" b="1" dirty="0" smtClean="0"/>
+              <a:t>Increase in number of test points without more code.   </a:t>
+            </a:r>
+            <a:r>
+              <a:rPr lang="en-US" sz="1700" b="1" dirty="0" smtClean="0"/>
+              <a:t>See Appendix: Test Case Numbers</a:t>
+            </a:r>
+            <a:endParaRPr lang="en-US" sz="1700" b="1" dirty="0" smtClean="0"/>
+          </a:p>
+          <a:p>
+            <a:pPr marL="862013" lvl="1" indent="-285750">
+              <a:lnSpc>
+                <a:spcPct val="114000"/>
+              </a:lnSpc>
+              <a:spcBef>
+                <a:spcPts val="0"/>
+              </a:spcBef>
+              <a:buFont typeface="Arial" panose="020B0604020202020204" pitchFamily="34" charset="0"/>
+              <a:buChar char="•"/>
+            </a:pPr>
+            <a:r>
+              <a:rPr lang="en-US" sz="1900" b="1" dirty="0" smtClean="0"/>
+              <a:t>Implementation of the ‘dataProvider’ technology </a:t>
+            </a:r>
+            <a:endParaRPr lang="en-US" sz="1800" b="1" dirty="0"/>
+          </a:p>
+          <a:p>
             <a:pPr>
               <a:lnSpc>
                 <a:spcPct val="135000"/>
@@ -6976,10 +7318,53 @@
                 <a:spcPts val="0"/>
               </a:spcBef>
             </a:pPr>
-            <a:r>
-              <a:rPr lang="en-US" sz="1000" dirty="0" smtClean="0"/>
-              <a:t>         </a:t>
-            </a:r>
+            <a:endParaRPr lang="en-US" sz="1600" dirty="0" smtClean="0"/>
+          </a:p>
+          <a:p>
+            <a:pPr marL="342900" indent="-342900">
+              <a:lnSpc>
+                <a:spcPct val="114000"/>
+              </a:lnSpc>
+              <a:spcBef>
+                <a:spcPts val="0"/>
+              </a:spcBef>
+              <a:buFont typeface="Arial" panose="020B0604020202020204" pitchFamily="34" charset="0"/>
+              <a:buChar char="•"/>
+            </a:pPr>
+            <a:r>
+              <a:rPr lang="en-US" sz="2200" b="1" dirty="0" smtClean="0"/>
+              <a:t>Provider Directory testing  incorporates novel use of the API scripts</a:t>
+            </a:r>
+            <a:endParaRPr lang="en-US" b="1" dirty="0" smtClean="0"/>
+          </a:p>
+          <a:p>
+            <a:pPr marL="862013" lvl="1" indent="-285750">
+              <a:lnSpc>
+                <a:spcPct val="114000"/>
+              </a:lnSpc>
+              <a:spcBef>
+                <a:spcPts val="0"/>
+              </a:spcBef>
+              <a:buFont typeface="Arial" panose="020B0604020202020204" pitchFamily="34" charset="0"/>
+              <a:buChar char="•"/>
+            </a:pPr>
+            <a:r>
+              <a:rPr lang="en-US" sz="1800" b="1" dirty="0" smtClean="0"/>
+              <a:t>First access REST API and capture data.  Then access PD UI requesting same information.  Compare results</a:t>
+            </a:r>
+            <a:endParaRPr lang="en-US" sz="1800" b="1" dirty="0" smtClean="0"/>
+          </a:p>
+          <a:p>
+            <a:pPr lvl="1" indent="0">
+              <a:lnSpc>
+                <a:spcPct val="114000"/>
+              </a:lnSpc>
+              <a:spcBef>
+                <a:spcPts val="0"/>
+              </a:spcBef>
+              <a:buNone/>
+            </a:pPr>
+            <a:endParaRPr lang="en-US" sz="1800" b="1" dirty="0" smtClean="0"/>
           </a:p>
           <a:p>
             <a:pPr marL="285750" indent="-285750">
@@ -6994,7 +7379,15 @@
             </a:pPr>
             <a:r>
               <a:rPr lang="en-US" sz="2200" b="1" dirty="0" smtClean="0"/>
-              <a:t>Numbers of test cases by Product Line</a:t>
+              <a:t>Micro </a:t>
+            </a:r>
+            <a:r>
+              <a:rPr lang="en-US" sz="2200" b="1" dirty="0" smtClean="0"/>
+              <a:t>Service REST API </a:t>
+            </a:r>
+            <a:r>
+              <a:rPr lang="en-US" sz="2200" b="1" dirty="0" smtClean="0"/>
+              <a:t>Testing accomplished in same framework</a:t>
             </a:r>
           </a:p>
           <a:p>
@@ -7010,157 +7403,9 @@
             </a:pPr>
             <a:r>
               <a:rPr lang="en-US" sz="1900" b="1" dirty="0" smtClean="0"/>
-              <a:t>Shopping &amp; Buying Page Integration Testing</a:t>
-            </a:r>
-          </a:p>
-          <a:p>
-            <a:pPr lvl="1" indent="0">
-              <a:lnSpc>
-                <a:spcPct val="114000"/>
-              </a:lnSpc>
-              <a:spcBef>
-                <a:spcPts val="0"/>
-              </a:spcBef>
-              <a:buNone/>
-            </a:pPr>
-            <a:r>
-              <a:rPr lang="en-US" sz="1800" b="1" dirty="0" err="1" smtClean="0"/>
-              <a:t>Pers</a:t>
-            </a:r>
-            <a:r>
-              <a:rPr lang="en-US" sz="1800" b="1" dirty="0" smtClean="0"/>
-              <a:t>, Deps, </a:t>
-            </a:r>
-            <a:r>
-              <a:rPr lang="en-US" sz="1800" b="1" dirty="0" err="1" smtClean="0"/>
-              <a:t>Facs</a:t>
-            </a:r>
-            <a:r>
-              <a:rPr lang="en-US" sz="1800" b="1" dirty="0" smtClean="0"/>
-              <a:t>, Buy, </a:t>
-            </a:r>
-            <a:r>
-              <a:rPr lang="en-US" sz="1800" b="1" dirty="0" err="1" smtClean="0"/>
-              <a:t>Reciept</a:t>
-            </a:r>
-            <a:endParaRPr lang="en-US" sz="1800" b="1" dirty="0" smtClean="0"/>
-          </a:p>
-          <a:p>
-            <a:pPr lvl="1" indent="0">
-              <a:lnSpc>
-                <a:spcPct val="114000"/>
-              </a:lnSpc>
-              <a:spcBef>
-                <a:spcPts val="0"/>
-              </a:spcBef>
-              <a:buNone/>
-            </a:pPr>
-            <a:r>
-              <a:rPr lang="en-US" sz="1800" b="1" dirty="0" smtClean="0"/>
-              <a:t>Shopping and Buying E2E Tests</a:t>
-            </a:r>
-          </a:p>
-          <a:p>
-            <a:pPr lvl="1" indent="0">
-              <a:lnSpc>
-                <a:spcPct val="114000"/>
-              </a:lnSpc>
-              <a:spcBef>
-                <a:spcPts val="0"/>
-              </a:spcBef>
-              <a:buNone/>
-            </a:pPr>
-            <a:r>
-              <a:rPr lang="en-US" sz="1800" b="1" dirty="0" smtClean="0"/>
-              <a:t>Content</a:t>
-            </a:r>
-            <a:endParaRPr lang="en-US" sz="1800" b="1" dirty="0"/>
-          </a:p>
-          <a:p>
-            <a:pPr>
-              <a:lnSpc>
-                <a:spcPct val="135000"/>
-              </a:lnSpc>
-              <a:spcBef>
-                <a:spcPts val="0"/>
-              </a:spcBef>
-            </a:pPr>
-            <a:endParaRPr lang="en-US" sz="1600" dirty="0" smtClean="0"/>
-          </a:p>
-          <a:p>
-            <a:pPr marL="862013" lvl="1" indent="-285750">
-              <a:lnSpc>
-                <a:spcPct val="114000"/>
-              </a:lnSpc>
-              <a:spcBef>
-                <a:spcPts val="0"/>
-              </a:spcBef>
-              <a:buFont typeface="Arial" panose="020B0604020202020204" pitchFamily="34" charset="0"/>
-              <a:buChar char="•"/>
-            </a:pPr>
-            <a:r>
-              <a:rPr lang="en-US" b="1" dirty="0" smtClean="0"/>
-              <a:t>Provider Directory</a:t>
-            </a:r>
-          </a:p>
-          <a:p>
-            <a:pPr lvl="1" indent="0">
-              <a:lnSpc>
-                <a:spcPct val="114000"/>
-              </a:lnSpc>
-              <a:spcBef>
-                <a:spcPts val="0"/>
-              </a:spcBef>
-              <a:buNone/>
-            </a:pPr>
-            <a:r>
-              <a:rPr lang="en-US" sz="1800" b="1" dirty="0" smtClean="0"/>
-              <a:t>Template 1,  Template 2, Template 3</a:t>
-            </a:r>
-          </a:p>
-          <a:p>
-            <a:pPr lvl="1" indent="0">
-              <a:lnSpc>
-                <a:spcPct val="114000"/>
-              </a:lnSpc>
-              <a:spcBef>
-                <a:spcPts val="0"/>
-              </a:spcBef>
-              <a:buNone/>
-            </a:pPr>
-            <a:r>
-              <a:rPr lang="en-US" sz="1800" b="1" dirty="0" smtClean="0"/>
-              <a:t>API Tests USED</a:t>
-            </a:r>
-          </a:p>
-          <a:p>
-            <a:pPr lvl="1" indent="0">
-              <a:lnSpc>
-                <a:spcPct val="114000"/>
-              </a:lnSpc>
-              <a:spcBef>
-                <a:spcPts val="0"/>
-              </a:spcBef>
-              <a:buNone/>
-            </a:pPr>
-            <a:endParaRPr lang="en-US" sz="1800" b="1" dirty="0"/>
-          </a:p>
-          <a:p>
-            <a:pPr marL="862013" lvl="1" indent="-285750">
-              <a:lnSpc>
-                <a:spcPct val="114000"/>
-              </a:lnSpc>
-              <a:spcBef>
-                <a:spcPts val="0"/>
-              </a:spcBef>
-              <a:buFont typeface="Arial" panose="020B0604020202020204" pitchFamily="34" charset="0"/>
-              <a:buChar char="•"/>
-            </a:pPr>
-            <a:r>
-              <a:rPr lang="en-US" sz="1800" b="1" dirty="0" smtClean="0"/>
-              <a:t>Micro Service REST API Test</a:t>
-            </a:r>
-            <a:endParaRPr lang="en-US" sz="1800" b="1" dirty="0"/>
+              <a:t>No need for another product or framework.  It can all be done in CXTA Framework.</a:t>
+            </a:r>
+            <a:endParaRPr lang="en-US" sz="1900" b="1" dirty="0"/>
           </a:p>
           <a:p>
             <a:pPr>
@@ -8155,16 +8400,12 @@
               <a:buChar char="•"/>
             </a:pPr>
             <a:r>
-              <a:rPr lang="en-US" sz="1800" b="1" dirty="0" err="1" smtClean="0"/>
-              <a:t>Intruduction</a:t>
-            </a:r>
-            <a:r>
               <a:rPr lang="en-US" sz="1800" b="1" dirty="0" smtClean="0"/>
-              <a:t> and training mid Q2</a:t>
-            </a:r>
-          </a:p>
-          <a:p>
-            <a:pPr lvl="1">
+              <a:t>Necessary to accomplish before</a:t>
+            </a:r>
+          </a:p>
+          <a:p>
+            <a:pPr lvl="2">
               <a:lnSpc>
                 <a:spcPct val="110000"/>
               </a:lnSpc>
@@ -8173,18 +8414,48 @@
             </a:pPr>
             <a:r>
               <a:rPr lang="en-US" sz="1800" b="1" dirty="0" smtClean="0"/>
-              <a:t>Fully operational by end Q2</a:t>
-            </a:r>
-            <a:endParaRPr lang="en-US" sz="1200" b="1" dirty="0" smtClean="0"/>
-          </a:p>
-          <a:p>
-            <a:pPr marL="341313" lvl="1" indent="0">
+              <a:t>Mid Layer API refactor ( we can only cover a small amount to start )</a:t>
+            </a:r>
+          </a:p>
+          <a:p>
+            <a:pPr lvl="2">
               <a:lnSpc>
                 <a:spcPct val="110000"/>
               </a:lnSpc>
-              <a:buNone/>
-            </a:pPr>
-            <a:endParaRPr lang="en-US" sz="1200" b="1" dirty="0" smtClean="0"/>
+              <a:buFont typeface="Arial" panose="020B0604020202020204" pitchFamily="34" charset="0"/>
+              <a:buChar char="•"/>
+            </a:pPr>
+            <a:r>
+              <a:rPr lang="en-US" sz="1800" b="1" dirty="0" smtClean="0"/>
+              <a:t>Training aids : examples of installation and configuration</a:t>
+            </a:r>
+          </a:p>
+          <a:p>
+            <a:pPr lvl="2">
+              <a:lnSpc>
+                <a:spcPct val="110000"/>
+              </a:lnSpc>
+              <a:buFont typeface="Arial" panose="020B0604020202020204" pitchFamily="34" charset="0"/>
+              <a:buChar char="•"/>
+            </a:pPr>
+            <a:r>
+              <a:rPr lang="en-US" sz="1800" b="1" dirty="0" smtClean="0"/>
+              <a:t>Training staff in the use and operation</a:t>
+            </a:r>
+          </a:p>
+          <a:p>
+            <a:pPr lvl="2">
+              <a:lnSpc>
+                <a:spcPct val="110000"/>
+              </a:lnSpc>
+              <a:buFont typeface="Arial" panose="020B0604020202020204" pitchFamily="34" charset="0"/>
+              <a:buChar char="•"/>
+            </a:pPr>
+            <a:r>
+              <a:rPr lang="en-US" sz="1800" b="1" dirty="0" smtClean="0"/>
+              <a:t>Test and debug their installations</a:t>
+            </a:r>
+            <a:endParaRPr lang="en-US" sz="1800" b="1" dirty="0" smtClean="0"/>
           </a:p>
           <a:p>
             <a:pPr marL="457206" lvl="1" indent="0">
@@ -8205,26 +8476,10 @@
               <a:buChar char="•"/>
             </a:pPr>
             <a:r>
-              <a:rPr lang="en-US" sz="2000" b="1" dirty="0">
-                <a:solidFill>
-                  <a:srgbClr val="FF0000"/>
-                </a:solidFill>
-              </a:rPr>
-              <a:t>Configuration controlled </a:t>
-            </a:r>
-            <a:r>
-              <a:rPr lang="en-US" sz="2000" b="1" dirty="0" smtClean="0">
-                <a:solidFill>
-                  <a:srgbClr val="FF0000"/>
-                </a:solidFill>
-              </a:rPr>
-              <a:t>t</a:t>
-            </a:r>
-            <a:endParaRPr lang="en-US" sz="2000" b="1" u="sng" dirty="0" smtClean="0">
-              <a:solidFill>
-                <a:srgbClr val="FF0000"/>
-              </a:solidFill>
-            </a:endParaRPr>
+              <a:rPr lang="en-US" sz="2000" b="1" dirty="0" smtClean="0"/>
+              <a:t>Timing on Roll out	</a:t>
+            </a:r>
+            <a:endParaRPr lang="en-US" sz="2000" b="1" u="sng" dirty="0" smtClean="0"/>
           </a:p>
           <a:p>
             <a:pPr lvl="1">
@@ -8235,163 +8490,26 @@
               <a:buChar char="•"/>
             </a:pPr>
             <a:r>
-              <a:rPr lang="en-US" sz="1800" b="1" dirty="0">
-                <a:solidFill>
-                  <a:srgbClr val="FF0000"/>
-                </a:solidFill>
-              </a:rPr>
-              <a:t>Ipsum </a:t>
-            </a:r>
-            <a:r>
-              <a:rPr lang="en-US" sz="1800" b="1" dirty="0" err="1" smtClean="0">
-                <a:solidFill>
-                  <a:srgbClr val="FF0000"/>
-                </a:solidFill>
-              </a:rPr>
-              <a:t>lore</a:t>
-            </a:r>
-            <a:r>
-              <a:rPr lang="en-US" sz="1800" b="1" dirty="0" err="1">
-                <a:solidFill>
-                  <a:srgbClr val="FF0000"/>
-                </a:solidFill>
-              </a:rPr>
-              <a:t>Ipsum</a:t>
-            </a:r>
-            <a:r>
-              <a:rPr lang="en-US" sz="1800" b="1" dirty="0">
-                <a:solidFill>
-                  <a:srgbClr val="FF0000"/>
-                </a:solidFill>
-              </a:rPr>
-              <a:t> </a:t>
-            </a:r>
-            <a:r>
-              <a:rPr lang="en-US" sz="1800" b="1" dirty="0" err="1" smtClean="0">
-                <a:solidFill>
-                  <a:srgbClr val="FF0000"/>
-                </a:solidFill>
-              </a:rPr>
-              <a:t>lore</a:t>
-            </a:r>
-            <a:r>
-              <a:rPr lang="en-US" sz="1800" b="1" dirty="0" err="1">
-                <a:solidFill>
-                  <a:srgbClr val="FF0000"/>
-                </a:solidFill>
-              </a:rPr>
-              <a:t>Ipsum</a:t>
-            </a:r>
-            <a:r>
-              <a:rPr lang="en-US" sz="1800" b="1" dirty="0">
-                <a:solidFill>
-                  <a:srgbClr val="FF0000"/>
-                </a:solidFill>
-              </a:rPr>
-              <a:t> </a:t>
-            </a:r>
-            <a:r>
-              <a:rPr lang="en-US" sz="1800" b="1" dirty="0" err="1" smtClean="0">
-                <a:solidFill>
-                  <a:srgbClr val="FF0000"/>
-                </a:solidFill>
-              </a:rPr>
-              <a:t>lore</a:t>
-            </a:r>
-            <a:r>
-              <a:rPr lang="en-US" sz="1800" b="1" dirty="0" err="1">
-                <a:solidFill>
-                  <a:srgbClr val="FF0000"/>
-                </a:solidFill>
-              </a:rPr>
-              <a:t>Ipsum</a:t>
-            </a:r>
-            <a:r>
-              <a:rPr lang="en-US" sz="1800" b="1" dirty="0">
-                <a:solidFill>
-                  <a:srgbClr val="FF0000"/>
-                </a:solidFill>
-              </a:rPr>
-              <a:t> </a:t>
-            </a:r>
-            <a:r>
-              <a:rPr lang="en-US" sz="1800" b="1" dirty="0" smtClean="0">
-                <a:solidFill>
-                  <a:srgbClr val="FF0000"/>
-                </a:solidFill>
-              </a:rPr>
-              <a:t>lore</a:t>
-            </a:r>
-            <a:endParaRPr lang="en-US" sz="1000" b="1" dirty="0" smtClean="0">
-              <a:solidFill>
-                <a:srgbClr val="FF0000"/>
-              </a:solidFill>
-            </a:endParaRPr>
-          </a:p>
-          <a:p>
-            <a:endParaRPr lang="en-US" b="1" dirty="0" smtClean="0">
-              <a:solidFill>
-                <a:srgbClr val="FF0000"/>
-              </a:solidFill>
-            </a:endParaRPr>
-          </a:p>
-          <a:p>
-            <a:pPr marL="342900" indent="-342900">
-              <a:buFont typeface="Arial" panose="020B0604020202020204" pitchFamily="34" charset="0"/>
-              <a:buChar char="•"/>
-            </a:pPr>
-            <a:r>
-              <a:rPr lang="en-US" sz="2000" b="1" dirty="0" smtClean="0">
-                <a:solidFill>
-                  <a:srgbClr val="FF0000"/>
-                </a:solidFill>
-              </a:rPr>
-              <a:t>All testing or to run</a:t>
+              <a:rPr lang="en-US" sz="1800" b="1" dirty="0" smtClean="0"/>
+              <a:t>Roll out to Market place team at the end of April</a:t>
             </a:r>
           </a:p>
           <a:p>
             <a:pPr lvl="1">
-              <a:buFont typeface="Arial" panose="020B0604020202020204" pitchFamily="34" charset="0"/>
-              <a:buChar char="•"/>
-            </a:pPr>
-            <a:r>
-              <a:rPr lang="en-US" sz="1800" b="1" dirty="0" smtClean="0">
-                <a:solidFill>
-                  <a:srgbClr val="FF0000"/>
-                </a:solidFill>
-              </a:rPr>
-              <a:t>Developers use </a:t>
-            </a:r>
-            <a:r>
-              <a:rPr lang="en-US" sz="1800" b="1" dirty="0" err="1" smtClean="0">
-                <a:solidFill>
-                  <a:srgbClr val="FF0000"/>
-                </a:solidFill>
-              </a:rPr>
-              <a:t>cdevelopment</a:t>
-            </a:r>
-            <a:r>
-              <a:rPr lang="en-US" sz="1800" b="1" dirty="0" smtClean="0">
-                <a:solidFill>
-                  <a:srgbClr val="FF0000"/>
-                </a:solidFill>
-              </a:rPr>
-              <a:t> code</a:t>
-            </a:r>
-          </a:p>
-          <a:p>
-            <a:pPr lvl="1">
-              <a:buFont typeface="Arial" panose="020B0604020202020204" pitchFamily="34" charset="0"/>
-              <a:buChar char="•"/>
-            </a:pPr>
-            <a:r>
-              <a:rPr lang="en-US" sz="1800" b="1" dirty="0" smtClean="0">
-                <a:solidFill>
-                  <a:srgbClr val="FF0000"/>
-                </a:solidFill>
-              </a:rPr>
-              <a:t>Gives CXTA w/out stepping on Dev</a:t>
-            </a:r>
+              <a:lnSpc>
+                <a:spcPct val="110000"/>
+              </a:lnSpc>
+              <a:buFont typeface="Arial" panose="020B0604020202020204" pitchFamily="34" charset="0"/>
+              <a:buChar char="•"/>
+            </a:pPr>
+            <a:r>
+              <a:rPr lang="en-US" sz="1800" b="1" dirty="0" smtClean="0"/>
+              <a:t>Roll out to other teams on first or second week of May</a:t>
+            </a:r>
+            <a:endParaRPr lang="en-US" sz="1000" b="1" dirty="0" smtClean="0"/>
+          </a:p>
+          <a:p>
+            <a:endParaRPr lang="en-US" b="1" dirty="0" smtClean="0"/>
           </a:p>
           <a:p>
             <a:pPr marL="457206" lvl="1" indent="0">
@@ -8399,7 +8517,7 @@
             </a:pPr>
             <a:r>
               <a:rPr lang="en-US" sz="1400" dirty="0" smtClean="0"/>
-              <a:t>      </a:t>
+              <a:t>     </a:t>
             </a:r>
             <a:endParaRPr lang="en-US" sz="1400" dirty="0"/>
           </a:p>
@@ -9350,6 +9468,27 @@
 </file>
 
 <file path=customXml/item1.xml><?xml version="1.0" encoding="utf-8"?>
+<p:properties xmlns:p="http://schemas.microsoft.com/office/2006/metadata/properties" xmlns:xsi="http://www.w3.org/2001/XMLSchema-instance" xmlns:pc="http://schemas.microsoft.com/office/infopath/2007/PartnerControls">
+  <documentManagement>
+    <_dlc_DocId xmlns="a9328eaf-6333-4034-a7ce-997665b5f80d">6AH7XJTKT27D-494-2</_dlc_DocId>
+    <_dlc_DocIdUrl xmlns="a9328eaf-6333-4034-a7ce-997665b5f80d">
+      <Url>http://itportal/sites/PMD/presentations/_layouts/DocIdRedir.aspx?ID=6AH7XJTKT27D-494-2</Url>
+      <Description>6AH7XJTKT27D-494-2</Description>
+    </_dlc_DocIdUrl>
+  </documentManagement>
+</p:properties>
+</file>
+
+<file path=customXml/item2.xml><?xml version="1.0" encoding="utf-8"?>
+<?mso-contentType ?>
+<FormTemplates xmlns="http://schemas.microsoft.com/sharepoint/v3/contenttype/forms">
+  <Display>DocumentLibraryForm</Display>
+  <Edit>DocumentLibraryForm</Edit>
+  <New>DocumentLibraryForm</New>
+</FormTemplates>
+</file>
+
+<file path=customXml/item3.xml><?xml version="1.0" encoding="utf-8"?>
 <?mso-contentType ?>
 <spe:Receivers xmlns:spe="http://schemas.microsoft.com/sharepoint/events">
   <Receiver>
@@ -9393,27 +9532,6 @@
     <Filter/>
   </Receiver>
 </spe:Receivers>
-</file>
-
-<file path=customXml/item2.xml><?xml version="1.0" encoding="utf-8"?>
-<?mso-contentType ?>
-<FormTemplates xmlns="http://schemas.microsoft.com/sharepoint/v3/contenttype/forms">
-  <Display>DocumentLibraryForm</Display>
-  <Edit>DocumentLibraryForm</Edit>
-  <New>DocumentLibraryForm</New>
-</FormTemplates>
-</file>
-
-<file path=customXml/item3.xml><?xml version="1.0" encoding="utf-8"?>
-<p:properties xmlns:p="http://schemas.microsoft.com/office/2006/metadata/properties" xmlns:xsi="http://www.w3.org/2001/XMLSchema-instance" xmlns:pc="http://schemas.microsoft.com/office/infopath/2007/PartnerControls">
-  <documentManagement>
-    <_dlc_DocId xmlns="a9328eaf-6333-4034-a7ce-997665b5f80d">6AH7XJTKT27D-494-2</_dlc_DocId>
-    <_dlc_DocIdUrl xmlns="a9328eaf-6333-4034-a7ce-997665b5f80d">
-      <Url>http://itportal/sites/PMD/presentations/_layouts/DocIdRedir.aspx?ID=6AH7XJTKT27D-494-2</Url>
-      <Description>6AH7XJTKT27D-494-2</Description>
-    </_dlc_DocIdUrl>
-  </documentManagement>
-</p:properties>
 </file>
 
 <file path=customXml/item4.xml><?xml version="1.0" encoding="utf-8"?>
@@ -9562,9 +9680,17 @@
 </file>
 
 <file path=customXml/itemProps1.xml><?xml version="1.0" encoding="utf-8"?>
-<ds:datastoreItem xmlns:ds="http://schemas.openxmlformats.org/officeDocument/2006/customXml" ds:itemID="{8CB52003-E8CD-4DF2-932F-2EC7EF4DD677}">
+<ds:datastoreItem xmlns:ds="http://schemas.openxmlformats.org/officeDocument/2006/customXml" ds:itemID="{39B4CF60-C0DC-4692-912B-881AF8D8CFF5}">
   <ds:schemaRefs>
-    <ds:schemaRef ds:uri="http://schemas.microsoft.com/sharepoint/events"/>
+    <ds:schemaRef ds:uri="http://schemas.microsoft.com/office/2006/documentManagement/types"/>
+    <ds:schemaRef ds:uri="http://schemas.openxmlformats.org/package/2006/metadata/core-properties"/>
+    <ds:schemaRef ds:uri="http://www.w3.org/XML/1998/namespace"/>
+    <ds:schemaRef ds:uri="a9328eaf-6333-4034-a7ce-997665b5f80d"/>
+    <ds:schemaRef ds:uri="http://purl.org/dc/elements/1.1/"/>
+    <ds:schemaRef ds:uri="http://purl.org/dc/terms/"/>
+    <ds:schemaRef ds:uri="http://schemas.microsoft.com/office/infopath/2007/PartnerControls"/>
+    <ds:schemaRef ds:uri="http://schemas.microsoft.com/office/2006/metadata/properties"/>
+    <ds:schemaRef ds:uri="http://purl.org/dc/dcmitype/"/>
   </ds:schemaRefs>
 </ds:datastoreItem>
 </file>
@@ -9578,17 +9704,9 @@
 </file>
 
 <file path=customXml/itemProps3.xml><?xml version="1.0" encoding="utf-8"?>
-<ds:datastoreItem xmlns:ds="http://schemas.openxmlformats.org/officeDocument/2006/customXml" ds:itemID="{39B4CF60-C0DC-4692-912B-881AF8D8CFF5}">
+<ds:datastoreItem xmlns:ds="http://schemas.openxmlformats.org/officeDocument/2006/customXml" ds:itemID="{8CB52003-E8CD-4DF2-932F-2EC7EF4DD677}">
   <ds:schemaRefs>
-    <ds:schemaRef ds:uri="http://schemas.microsoft.com/office/2006/documentManagement/types"/>
-    <ds:schemaRef ds:uri="http://schemas.openxmlformats.org/package/2006/metadata/core-properties"/>
-    <ds:schemaRef ds:uri="http://www.w3.org/XML/1998/namespace"/>
-    <ds:schemaRef ds:uri="a9328eaf-6333-4034-a7ce-997665b5f80d"/>
-    <ds:schemaRef ds:uri="http://purl.org/dc/elements/1.1/"/>
-    <ds:schemaRef ds:uri="http://purl.org/dc/terms/"/>
-    <ds:schemaRef ds:uri="http://schemas.microsoft.com/office/infopath/2007/PartnerControls"/>
-    <ds:schemaRef ds:uri="http://schemas.microsoft.com/office/2006/metadata/properties"/>
-    <ds:schemaRef ds:uri="http://purl.org/dc/dcmitype/"/>
+    <ds:schemaRef ds:uri="http://schemas.microsoft.com/sharepoint/events"/>
   </ds:schemaRefs>
 </ds:datastoreItem>
 </file>

</xml_diff>

<commit_message>
4/10/18 revision on excel and pics.  mods to slides
</commit_message>
<xml_diff>
--- a/CurrentWork_Delta/CX_StrategyPowerPoint.pptx
+++ b/CurrentWork_Delta/CX_StrategyPowerPoint.pptx
@@ -285,7 +285,7 @@
               <a:pPr>
                 <a:defRPr/>
               </a:pPr>
-              <a:t>4/4/2018</a:t>
+              <a:t>4/10/2018</a:t>
             </a:fld>
             <a:endParaRPr lang="en-US"/>
           </a:p>
@@ -2428,7 +2428,7 @@
         <p:spPr bwMode="auto">
           <a:xfrm>
             <a:off x="3284426" y="437228"/>
-            <a:ext cx="5296048" cy="1689100"/>
+            <a:ext cx="5296048" cy="2305972"/>
           </a:xfrm>
           <a:prstGeom prst="rect">
             <a:avLst/>
@@ -2447,7 +2447,7 @@
           <a:p>
             <a:pPr defTabSz="685800">
               <a:lnSpc>
-                <a:spcPct val="70000"/>
+                <a:spcPct val="85000"/>
               </a:lnSpc>
             </a:pPr>
             <a:r>
@@ -2463,7 +2463,7 @@
           <a:p>
             <a:pPr defTabSz="685800">
               <a:lnSpc>
-                <a:spcPct val="70000"/>
+                <a:spcPct val="85000"/>
               </a:lnSpc>
             </a:pPr>
             <a:r>
@@ -3848,13 +3848,7 @@
               <a:rPr lang="en-US" sz="2000" b="1" dirty="0" smtClean="0">
                 <a:ea typeface="+mn-ea"/>
               </a:rPr>
-              <a:t>team </a:t>
-            </a:r>
-            <a:r>
-              <a:rPr lang="en-US" sz="2000" b="1" dirty="0" smtClean="0">
-                <a:ea typeface="+mn-ea"/>
-              </a:rPr>
-              <a:t>continues with Use Case End </a:t>
+              <a:t>team continues with Use Case End </a:t>
             </a:r>
             <a:r>
               <a:rPr lang="en-US" sz="2000" b="1" dirty="0">
@@ -3958,13 +3952,7 @@
               <a:rPr lang="en-US" sz="2000" b="1" dirty="0" smtClean="0">
                 <a:latin typeface="Calibri Light" pitchFamily="34" charset="0"/>
               </a:rPr>
-              <a:t>NG</a:t>
-            </a:r>
-            <a:r>
-              <a:rPr lang="en-US" sz="2000" b="1" dirty="0" smtClean="0">
-                <a:latin typeface="Calibri Light" pitchFamily="34" charset="0"/>
-              </a:rPr>
-              <a:t>TA team </a:t>
+              <a:t>NGTA team </a:t>
             </a:r>
             <a:r>
               <a:rPr lang="en-US" sz="2000" b="1" dirty="0">
@@ -4352,14 +4340,7 @@
                 <a:latin typeface="Calibri Light" pitchFamily="34" charset="0"/>
                 <a:cs typeface="Calibri Light" pitchFamily="34" charset="0"/>
               </a:rPr>
-              <a:t>Team </a:t>
-            </a:r>
-            <a:r>
-              <a:rPr lang="en-US" sz="2000" b="1" dirty="0" smtClean="0">
-                <a:latin typeface="Calibri Light" pitchFamily="34" charset="0"/>
-                <a:cs typeface="Calibri Light" pitchFamily="34" charset="0"/>
-              </a:rPr>
-              <a:t>engineers</a:t>
+              <a:t>Team engineers</a:t>
             </a:r>
           </a:p>
           <a:p>
@@ -6097,19 +6078,7 @@
               <a:rPr lang="en-US" dirty="0" smtClean="0">
                 <a:ea typeface="+mj-ea"/>
               </a:rPr>
-              <a:t>     </a:t>
-            </a:r>
-            <a:r>
-              <a:rPr lang="en-US" dirty="0" smtClean="0">
-                <a:ea typeface="+mj-ea"/>
-              </a:rPr>
-              <a:t>NGTA  </a:t>
-            </a:r>
-            <a:r>
-              <a:rPr lang="en-US" dirty="0" smtClean="0">
-                <a:ea typeface="+mj-ea"/>
-              </a:rPr>
-              <a:t>- </a:t>
+              <a:t>     NGTA  - </a:t>
             </a:r>
             <a:r>
               <a:rPr lang="en-US" sz="3000" b="1" dirty="0" smtClean="0">
@@ -6139,7 +6108,7 @@
         <p:spPr>
           <a:xfrm>
             <a:off x="277813" y="1512888"/>
-            <a:ext cx="8994775" cy="3997325"/>
+            <a:ext cx="8866187" cy="3997325"/>
           </a:xfrm>
         </p:spPr>
         <p:txBody>
@@ -6188,31 +6157,19 @@
               <a:rPr lang="en-US" sz="1600" b="1" dirty="0" smtClean="0">
                 <a:ea typeface="+mn-ea"/>
               </a:rPr>
-              <a:t>Node,   </a:t>
+              <a:t>Node,   Protractor,   </a:t>
             </a:r>
             <a:r>
               <a:rPr lang="en-US" sz="1600" b="1" dirty="0" smtClean="0">
                 <a:ea typeface="+mn-ea"/>
               </a:rPr>
-              <a:t>Protractor</a:t>
-            </a:r>
-            <a:r>
-              <a:rPr lang="en-US" sz="1600" b="1" dirty="0" smtClean="0">
-                <a:ea typeface="+mn-ea"/>
-              </a:rPr>
-              <a:t>,   </a:t>
-            </a:r>
-            <a:r>
-              <a:rPr lang="en-US" sz="1600" b="1" dirty="0" smtClean="0">
-                <a:ea typeface="+mn-ea"/>
-              </a:rPr>
-              <a:t>JavaScript, </a:t>
-            </a:r>
-            <a:r>
-              <a:rPr lang="en-US" sz="1600" b="1" dirty="0" smtClean="0">
-                <a:ea typeface="+mn-ea"/>
-              </a:rPr>
-              <a:t>  Jenkins</a:t>
+              <a:t>JavaScript</a:t>
+            </a:r>
+            <a:r>
+              <a:rPr lang="en-US" sz="1600" b="1" dirty="0">
+                <a:ea typeface="+mn-ea"/>
+              </a:rPr>
+              <a:t> </a:t>
             </a:r>
             <a:endParaRPr lang="en-US" sz="2000" b="1" dirty="0">
               <a:ea typeface="+mn-ea"/>
@@ -6256,13 +6213,7 @@
               <a:rPr lang="en-US" sz="2000" b="1" dirty="0" smtClean="0">
                 <a:ea typeface="+mn-ea"/>
               </a:rPr>
-              <a:t>NGTA </a:t>
-            </a:r>
-            <a:r>
-              <a:rPr lang="en-US" sz="2000" b="1" dirty="0" smtClean="0">
-                <a:ea typeface="+mn-ea"/>
-              </a:rPr>
-              <a:t>validates product quality, usability and performance of CX Web Applications</a:t>
+              <a:t>NGTA validates product quality, usability and performance of CX Web Applications</a:t>
             </a:r>
           </a:p>
           <a:p>
@@ -6289,32 +6240,10 @@
               </a:rPr>
               <a:t>	</a:t>
             </a:r>
-            <a:r>
-              <a:rPr lang="en-US" sz="1000" dirty="0" smtClean="0">
-                <a:solidFill>
-                  <a:srgbClr val="FF0000"/>
-                </a:solidFill>
-                <a:ea typeface="+mn-ea"/>
-              </a:rPr>
-              <a:t>Perf Quall: short test completion time, Usability: easy test authoring, Prod Qual:  Pass rate</a:t>
-            </a:r>
-          </a:p>
-          <a:p>
-            <a:pPr lvl="1" indent="0" eaLnBrk="1" fontAlgn="auto" hangingPunct="1">
-              <a:lnSpc>
-                <a:spcPct val="90000"/>
-              </a:lnSpc>
-              <a:spcBef>
-                <a:spcPts val="0"/>
-              </a:spcBef>
-              <a:spcAft>
-                <a:spcPts val="0"/>
-              </a:spcAft>
-              <a:buFontTx/>
-              <a:buNone/>
-              <a:defRPr/>
-            </a:pPr>
-            <a:endParaRPr lang="en-US" sz="1000" dirty="0">
+            <a:endParaRPr lang="en-US" sz="1000" dirty="0" smtClean="0">
+              <a:solidFill>
+                <a:srgbClr val="FF0000"/>
+              </a:solidFill>
               <a:ea typeface="+mn-ea"/>
             </a:endParaRPr>
           </a:p>
@@ -6338,6 +6267,25 @@
             </a:endParaRPr>
           </a:p>
           <a:p>
+            <a:pPr lvl="1" indent="0" eaLnBrk="1" fontAlgn="auto" hangingPunct="1">
+              <a:lnSpc>
+                <a:spcPct val="90000"/>
+              </a:lnSpc>
+              <a:spcBef>
+                <a:spcPts val="0"/>
+              </a:spcBef>
+              <a:spcAft>
+                <a:spcPts val="0"/>
+              </a:spcAft>
+              <a:buFontTx/>
+              <a:buNone/>
+              <a:defRPr/>
+            </a:pPr>
+            <a:endParaRPr lang="en-US" sz="1000" dirty="0" smtClean="0">
+              <a:ea typeface="+mn-ea"/>
+            </a:endParaRPr>
+          </a:p>
+          <a:p>
             <a:pPr marL="342900" indent="-342900" eaLnBrk="1" fontAlgn="auto" hangingPunct="1">
               <a:lnSpc>
                 <a:spcPct val="90000"/>
@@ -6360,86 +6308,74 @@
               <a:rPr lang="en-US" sz="2000" b="1" dirty="0" smtClean="0">
                 <a:ea typeface="+mn-ea"/>
               </a:rPr>
-              <a:t>validates </a:t>
-            </a:r>
+              <a:t>validates core functional APIs( micro service API )</a:t>
+            </a:r>
+          </a:p>
+          <a:p>
+            <a:pPr marL="919163" lvl="1" indent="-342900" eaLnBrk="1" fontAlgn="auto" hangingPunct="1">
+              <a:lnSpc>
+                <a:spcPct val="90000"/>
+              </a:lnSpc>
+              <a:spcBef>
+                <a:spcPts val="0"/>
+              </a:spcBef>
+              <a:spcAft>
+                <a:spcPts val="0"/>
+              </a:spcAft>
+              <a:buFont typeface="Arial" panose="020B0604020202020204" pitchFamily="34" charset="0"/>
+              <a:buChar char="•"/>
+              <a:defRPr/>
+            </a:pPr>
+            <a:r>
+              <a:rPr lang="en-US" sz="1600" b="1" dirty="0" smtClean="0">
+                <a:ea typeface="+mn-ea"/>
+              </a:rPr>
+              <a:t>Frisby,    Solar  </a:t>
+            </a:r>
+            <a:r>
+              <a:rPr lang="en-US" sz="1400" b="1" dirty="0" smtClean="0">
+                <a:ea typeface="+mn-ea"/>
+              </a:rPr>
+              <a:t>( Node Modules )</a:t>
+            </a:r>
+          </a:p>
+          <a:p>
+            <a:pPr marL="342900" indent="-342900" eaLnBrk="1" fontAlgn="auto" hangingPunct="1">
+              <a:lnSpc>
+                <a:spcPct val="150000"/>
+              </a:lnSpc>
+              <a:spcAft>
+                <a:spcPts val="1000"/>
+              </a:spcAft>
+              <a:buFont typeface="Arial" panose="020B0604020202020204" pitchFamily="34" charset="0"/>
+              <a:buChar char="•"/>
+              <a:defRPr/>
+            </a:pPr>
             <a:r>
               <a:rPr lang="en-US" sz="2000" b="1" dirty="0" smtClean="0">
                 <a:ea typeface="+mn-ea"/>
               </a:rPr>
-              <a:t>core functional APIs( micro service API </a:t>
+              <a:t>The following provides an explanation of </a:t>
+            </a:r>
+            <a:r>
+              <a:rPr lang="en-US" sz="2000" b="1" dirty="0" smtClean="0"/>
+              <a:t>NGTA </a:t>
             </a:r>
             <a:r>
               <a:rPr lang="en-US" sz="2000" b="1" dirty="0" smtClean="0">
                 <a:ea typeface="+mn-ea"/>
               </a:rPr>
-              <a:t>)</a:t>
-            </a:r>
-          </a:p>
-          <a:p>
-            <a:pPr marL="919163" lvl="1" indent="-342900" eaLnBrk="1" fontAlgn="auto" hangingPunct="1">
-              <a:lnSpc>
-                <a:spcPct val="90000"/>
-              </a:lnSpc>
-              <a:spcBef>
-                <a:spcPts val="0"/>
-              </a:spcBef>
-              <a:spcAft>
-                <a:spcPts val="0"/>
-              </a:spcAft>
-              <a:buFont typeface="Arial" panose="020B0604020202020204" pitchFamily="34" charset="0"/>
-              <a:buChar char="•"/>
-              <a:defRPr/>
-            </a:pPr>
-            <a:r>
-              <a:rPr lang="en-US" sz="1600" b="1" dirty="0" err="1" smtClean="0">
-                <a:ea typeface="+mn-ea"/>
-              </a:rPr>
-              <a:t>Frisby</a:t>
-            </a:r>
-            <a:r>
-              <a:rPr lang="en-US" sz="1600" b="1" dirty="0" smtClean="0">
-                <a:ea typeface="+mn-ea"/>
-              </a:rPr>
-              <a:t>,    Solar  </a:t>
-            </a:r>
-            <a:r>
-              <a:rPr lang="en-US" sz="1400" b="1" dirty="0" smtClean="0">
-                <a:ea typeface="+mn-ea"/>
-              </a:rPr>
-              <a:t>( Node Modules )</a:t>
-            </a:r>
-            <a:endParaRPr lang="en-US" sz="1400" b="1" dirty="0" smtClean="0">
+              <a:t>, our purpose, technologies, philosophies, process, and our evolutionary plans for </a:t>
+            </a:r>
+            <a:r>
+              <a:rPr lang="en-US" sz="2000" b="1" dirty="0" smtClean="0">
+                <a:ea typeface="+mn-ea"/>
+              </a:rPr>
+              <a:t>2018 being developed by         2 local staff and 3 off shore staff.</a:t>
+            </a:r>
+            <a:endParaRPr lang="en-US" sz="2000" b="1" dirty="0" smtClean="0">
               <a:ea typeface="+mn-ea"/>
             </a:endParaRPr>
-          </a:p>
-          <a:p>
-            <a:pPr marL="342900" indent="-342900" eaLnBrk="1" fontAlgn="auto" hangingPunct="1">
-              <a:lnSpc>
-                <a:spcPct val="150000"/>
-              </a:lnSpc>
-              <a:spcAft>
-                <a:spcPts val="1000"/>
-              </a:spcAft>
-              <a:buFont typeface="Arial" panose="020B0604020202020204" pitchFamily="34" charset="0"/>
-              <a:buChar char="•"/>
-              <a:defRPr/>
-            </a:pPr>
-            <a:r>
-              <a:rPr lang="en-US" sz="2000" b="1" dirty="0" smtClean="0">
-                <a:ea typeface="+mn-ea"/>
-              </a:rPr>
-              <a:t>The following provides an explanation of </a:t>
-            </a:r>
-            <a:r>
-              <a:rPr lang="en-US" sz="2000" b="1" dirty="0" smtClean="0"/>
-              <a:t>NGTA </a:t>
-            </a:r>
-            <a:r>
-              <a:rPr lang="en-US" sz="2000" b="1" dirty="0" smtClean="0">
-                <a:ea typeface="+mn-ea"/>
-              </a:rPr>
-              <a:t>, our purpose, technologies, philosophies, process, and our evolutionary plans for 2018.</a:t>
-            </a:r>
           </a:p>
           <a:p>
             <a:pPr eaLnBrk="1" fontAlgn="auto" hangingPunct="1">
@@ -6600,7 +6536,25 @@
               <a:rPr lang="en-US" sz="2000" b="1" dirty="0" smtClean="0">
                 <a:ea typeface="+mn-ea"/>
               </a:rPr>
-              <a:t>work for Delta Dental technology teams ( CX, … )</a:t>
+              <a:t>work for Delta Dental technology teams ( CX, </a:t>
+            </a:r>
+            <a:r>
+              <a:rPr lang="en-US" sz="2000" b="1" dirty="0" smtClean="0">
+                <a:ea typeface="+mn-ea"/>
+              </a:rPr>
+              <a:t>. . . </a:t>
+            </a:r>
+            <a:r>
+              <a:rPr lang="en-US" sz="2000" b="1" dirty="0" smtClean="0">
+                <a:ea typeface="+mn-ea"/>
+              </a:rPr>
+              <a:t> </a:t>
+            </a:r>
+            <a:r>
+              <a:rPr lang="en-US" sz="2000" b="1" dirty="0" smtClean="0">
+                <a:ea typeface="+mn-ea"/>
+              </a:rPr>
+              <a:t>)</a:t>
             </a:r>
           </a:p>
           <a:p>
@@ -6701,13 +6655,7 @@
               <a:rPr lang="en-US" sz="2000" b="1" dirty="0" smtClean="0">
                 <a:ea typeface="+mn-ea"/>
               </a:rPr>
-              <a:t>Design </a:t>
-            </a:r>
-            <a:r>
-              <a:rPr lang="en-US" sz="2000" b="1" dirty="0" smtClean="0">
-                <a:ea typeface="+mn-ea"/>
-              </a:rPr>
-              <a:t>the Framework with enough power and flexibility to meet </a:t>
+              <a:t>Design the Framework with enough power and flexibility to meet </a:t>
             </a:r>
             <a:r>
               <a:rPr lang="en-US" sz="2000" b="1" dirty="0">
@@ -6917,26 +6865,8 @@
                 <a:latin typeface="Calibri Light" pitchFamily="34" charset="0"/>
                 <a:cs typeface="Calibri Light" pitchFamily="34" charset="0"/>
               </a:rPr>
-              <a:t>and </a:t>
-            </a:r>
-            <a:r>
-              <a:rPr lang="en-US" sz="2000" b="1" dirty="0" smtClean="0">
-                <a:latin typeface="Calibri Light" pitchFamily="34" charset="0"/>
-                <a:cs typeface="Calibri Light" pitchFamily="34" charset="0"/>
-              </a:rPr>
-              <a:t>the CX Market Place Development Team have </a:t>
-            </a:r>
-            <a:r>
-              <a:rPr lang="en-US" sz="2000" b="1" dirty="0" smtClean="0">
-                <a:latin typeface="Calibri Light" pitchFamily="34" charset="0"/>
-                <a:cs typeface="Calibri Light" pitchFamily="34" charset="0"/>
-              </a:rPr>
-              <a:t>matured since 2016. </a:t>
-            </a:r>
-            <a:endParaRPr lang="en-US" sz="2000" b="1" dirty="0" smtClean="0">
-              <a:latin typeface="Calibri Light" pitchFamily="34" charset="0"/>
-              <a:cs typeface="Calibri Light" pitchFamily="34" charset="0"/>
-            </a:endParaRPr>
+              <a:t>and the CX Market Place Development Team have matured since 2016. </a:t>
+            </a:r>
           </a:p>
           <a:p>
             <a:pPr marL="919163" lvl="1" indent="-342900" eaLnBrk="1" hangingPunct="1">
@@ -7009,74 +6939,34 @@
                 <a:latin typeface="Calibri Light" pitchFamily="34" charset="0"/>
                 <a:cs typeface="Calibri Light" pitchFamily="34" charset="0"/>
               </a:rPr>
-              <a:t>:</a:t>
-            </a:r>
+              <a:t> </a:t>
+            </a:r>
+          </a:p>
+          <a:p>
+            <a:pPr marL="919163" lvl="1" indent="-342900" eaLnBrk="1" hangingPunct="1">
+              <a:lnSpc>
+                <a:spcPct val="95000"/>
+              </a:lnSpc>
+              <a:spcBef>
+                <a:spcPct val="0"/>
+              </a:spcBef>
+              <a:buFont typeface="Arial" charset="0"/>
+              <a:buChar char="•"/>
+            </a:pPr>
             <a:r>
               <a:rPr lang="en-US" sz="1600" b="1" dirty="0" smtClean="0">
                 <a:latin typeface="Calibri Light" pitchFamily="34" charset="0"/>
                 <a:cs typeface="Calibri Light" pitchFamily="34" charset="0"/>
               </a:rPr>
-              <a:t>   </a:t>
-            </a:r>
-            <a:r>
-              <a:rPr lang="en-US" sz="1000" b="1" dirty="0" smtClean="0">
-                <a:solidFill>
-                  <a:srgbClr val="A6A6A6"/>
-                </a:solidFill>
-                <a:latin typeface="Calibri Light" pitchFamily="34" charset="0"/>
-                <a:cs typeface="Calibri Light" pitchFamily="34" charset="0"/>
-              </a:rPr>
-              <a:t>roll out   :    page Integration test    :      Industry practice </a:t>
-            </a:r>
-          </a:p>
-          <a:p>
-            <a:pPr marL="919163" lvl="1" indent="-342900" eaLnBrk="1" hangingPunct="1">
-              <a:lnSpc>
-                <a:spcPct val="95000"/>
-              </a:lnSpc>
-              <a:spcBef>
-                <a:spcPct val="0"/>
-              </a:spcBef>
-              <a:buFont typeface="Arial" charset="0"/>
-              <a:buChar char="•"/>
-            </a:pPr>
-            <a:r>
-              <a:rPr lang="en-US" sz="1600" b="1" dirty="0" smtClean="0">
-                <a:latin typeface="Calibri Light" pitchFamily="34" charset="0"/>
-                <a:cs typeface="Calibri Light" pitchFamily="34" charset="0"/>
-              </a:rPr>
-              <a:t>we have changed how we select &amp; control execution   </a:t>
-            </a:r>
-            <a:r>
-              <a:rPr lang="en-US" sz="1000" b="1" dirty="0" smtClean="0">
-                <a:solidFill>
-                  <a:srgbClr val="A6A6A6"/>
-                </a:solidFill>
-                <a:latin typeface="Calibri Light" pitchFamily="34" charset="0"/>
-                <a:cs typeface="Calibri Light" pitchFamily="34" charset="0"/>
-              </a:rPr>
-              <a:t>now in Scaling Mode :  groups of states &amp; </a:t>
-            </a:r>
-            <a:r>
-              <a:rPr lang="en-US" sz="1000" b="1" dirty="0" err="1" smtClean="0">
-                <a:solidFill>
-                  <a:srgbClr val="A6A6A6"/>
-                </a:solidFill>
-                <a:latin typeface="Calibri Light" pitchFamily="34" charset="0"/>
-                <a:cs typeface="Calibri Light" pitchFamily="34" charset="0"/>
-              </a:rPr>
-              <a:t>Fcns</a:t>
-            </a:r>
-            <a:r>
-              <a:rPr lang="en-US" sz="1000" b="1" dirty="0" smtClean="0">
-                <a:solidFill>
-                  <a:srgbClr val="A6A6A6"/>
-                </a:solidFill>
-                <a:latin typeface="Calibri Light" pitchFamily="34" charset="0"/>
-                <a:cs typeface="Calibri Light" pitchFamily="34" charset="0"/>
-              </a:rPr>
-              <a:t>  are named phases</a:t>
-            </a:r>
+              <a:t>we have changed how we select &amp; control execution  </a:t>
+            </a:r>
+            <a:endParaRPr lang="en-US" sz="1000" b="1" dirty="0" smtClean="0">
+              <a:solidFill>
+                <a:srgbClr val="A6A6A6"/>
+              </a:solidFill>
+              <a:latin typeface="Calibri Light" pitchFamily="34" charset="0"/>
+              <a:cs typeface="Calibri Light" pitchFamily="34" charset="0"/>
+            </a:endParaRPr>
           </a:p>
           <a:p>
             <a:pPr marL="919163" lvl="1" indent="-342900" eaLnBrk="1" hangingPunct="1">
@@ -7377,7 +7267,7 @@
         </p:nvSpPr>
         <p:spPr bwMode="auto">
           <a:xfrm>
-            <a:off x="814388" y="3275013"/>
+            <a:off x="814388" y="3208338"/>
             <a:ext cx="5548312" cy="369887"/>
           </a:xfrm>
           <a:prstGeom prst="rect">
@@ -7398,10 +7288,22 @@
           <a:lstStyle/>
           <a:p>
             <a:r>
-              <a:rPr lang="en-US">
+              <a:rPr lang="en-US" dirty="0">
                 <a:latin typeface="Calibri" pitchFamily="34" charset="0"/>
               </a:rPr>
-              <a:t>A collection of Test Cases run manually </a:t>
+              <a:t>A collection of </a:t>
+            </a:r>
+            <a:r>
+              <a:rPr lang="en-US" dirty="0" smtClean="0">
+                <a:latin typeface="Calibri" pitchFamily="34" charset="0"/>
+              </a:rPr>
+              <a:t>Manual Test </a:t>
+            </a:r>
+            <a:r>
+              <a:rPr lang="en-US" dirty="0">
+                <a:latin typeface="Calibri" pitchFamily="34" charset="0"/>
+              </a:rPr>
+              <a:t>Cases </a:t>
             </a:r>
           </a:p>
         </p:txBody>
@@ -7416,8 +7318,8 @@
         </p:nvSpPr>
         <p:spPr bwMode="auto">
           <a:xfrm>
-            <a:off x="852488" y="5192713"/>
-            <a:ext cx="5548312" cy="369887"/>
+            <a:off x="852488" y="5116513"/>
+            <a:ext cx="5548312" cy="369332"/>
           </a:xfrm>
           <a:prstGeom prst="rect">
             <a:avLst/>
@@ -7440,14 +7342,26 @@
               <a:rPr lang="en-US" dirty="0">
                 <a:latin typeface="Calibri" pitchFamily="34" charset="0"/>
               </a:rPr>
-              <a:t>A similar collection of Test Cases run in Automation </a:t>
+              <a:t>A similar collection </a:t>
+            </a:r>
+            <a:r>
+              <a:rPr lang="en-US" dirty="0" smtClean="0">
+                <a:latin typeface="Calibri" pitchFamily="34" charset="0"/>
+              </a:rPr>
+              <a:t>of Automated Test </a:t>
+            </a:r>
+            <a:r>
+              <a:rPr lang="en-US" dirty="0">
+                <a:latin typeface="Calibri" pitchFamily="34" charset="0"/>
+              </a:rPr>
+              <a:t>Cases </a:t>
             </a:r>
           </a:p>
         </p:txBody>
       </p:sp>
       <p:pic>
         <p:nvPicPr>
-          <p:cNvPr id="3" name="Picture 2"/>
+          <p:cNvPr id="2" name="Picture 1"/>
           <p:cNvPicPr>
             <a:picLocks noChangeAspect="1"/>
           </p:cNvPicPr>
@@ -7467,8 +7381,8 @@
         </p:blipFill>
         <p:spPr>
           <a:xfrm>
-            <a:off x="852489" y="5472044"/>
-            <a:ext cx="5969000" cy="1297609"/>
+            <a:off x="852489" y="3596790"/>
+            <a:ext cx="5948520" cy="1316136"/>
           </a:xfrm>
           <a:prstGeom prst="rect">
             <a:avLst/>
@@ -7477,7 +7391,7 @@
       </p:pic>
       <p:pic>
         <p:nvPicPr>
-          <p:cNvPr id="6" name="Picture 5"/>
+          <p:cNvPr id="7" name="Picture 6"/>
           <p:cNvPicPr>
             <a:picLocks noChangeAspect="1"/>
           </p:cNvPicPr>
@@ -7497,8 +7411,8 @@
         </p:blipFill>
         <p:spPr>
           <a:xfrm>
-            <a:off x="852489" y="3604408"/>
-            <a:ext cx="5969000" cy="1331066"/>
+            <a:off x="852489" y="5472043"/>
+            <a:ext cx="5948520" cy="1313847"/>
           </a:xfrm>
           <a:prstGeom prst="rect">
             <a:avLst/>
@@ -7664,13 +7578,7 @@
               <a:rPr lang="en-US" sz="1400" b="1" dirty="0" smtClean="0">
                 <a:ea typeface="+mn-ea"/>
               </a:rPr>
-              <a:t>for </a:t>
-            </a:r>
-            <a:r>
-              <a:rPr lang="en-US" sz="1400" b="1" dirty="0" smtClean="0">
-                <a:ea typeface="+mn-ea"/>
-              </a:rPr>
-              <a:t>confidence vote on the product.  </a:t>
+              <a:t>for confidence vote on the product.  </a:t>
             </a:r>
           </a:p>
           <a:p>
@@ -7999,13 +7907,7 @@
               <a:rPr lang="en-US" sz="1900" b="1" dirty="0" smtClean="0">
                 <a:ea typeface="+mn-ea"/>
               </a:rPr>
-              <a:t>Framework</a:t>
-            </a:r>
-            <a:r>
-              <a:rPr lang="en-US" sz="1900" b="1" dirty="0" smtClean="0">
-                <a:ea typeface="+mn-ea"/>
-              </a:rPr>
-              <a:t>.</a:t>
+              <a:t>Framework.</a:t>
             </a:r>
             <a:endParaRPr lang="en-US" sz="1900" b="1" dirty="0">
               <a:ea typeface="+mn-ea"/>
@@ -8144,10 +8046,6 @@
               </a:rPr>
               <a:t>ARCHITECTURAL TECH STACK</a:t>
             </a:r>
-            <a:endParaRPr lang="en-US" sz="4500" dirty="0" smtClean="0">
-              <a:latin typeface="Calibri Light" pitchFamily="34" charset="0"/>
-              <a:cs typeface="Calibri Light" pitchFamily="34" charset="0"/>
-            </a:endParaRPr>
           </a:p>
         </p:txBody>
       </p:sp>
@@ -8952,64 +8850,16 @@
               <a:defRPr/>
             </a:pPr>
             <a:r>
-              <a:rPr lang="en-US" sz="1800" b="1" dirty="0">
-                <a:ea typeface="+mn-ea"/>
-              </a:rPr>
-              <a:t>Evolutionary change in configuration </a:t>
-            </a:r>
-            <a:r>
-              <a:rPr lang="en-US" sz="1800" b="1" dirty="0" smtClean="0">
-                <a:ea typeface="+mn-ea"/>
-              </a:rPr>
-              <a:t>approach </a:t>
-            </a:r>
-            <a:r>
-              <a:rPr lang="en-US" sz="1800" b="1" dirty="0">
-                <a:ea typeface="+mn-ea"/>
-              </a:rPr>
-              <a:t>moves </a:t>
-            </a:r>
-            <a:r>
-              <a:rPr lang="en-US" sz="1800" b="1" dirty="0" smtClean="0">
-                <a:ea typeface="+mn-ea"/>
-              </a:rPr>
-              <a:t>control </a:t>
-            </a:r>
-            <a:r>
-              <a:rPr lang="en-US" sz="1800" b="1" dirty="0">
-                <a:ea typeface="+mn-ea"/>
-              </a:rPr>
-              <a:t>of what product and state being tested out of the </a:t>
-            </a:r>
-            <a:r>
-              <a:rPr lang="en-US" sz="1800" b="1" dirty="0" smtClean="0">
-                <a:ea typeface="+mn-ea"/>
-              </a:rPr>
-              <a:t>test script </a:t>
-            </a:r>
-            <a:r>
-              <a:rPr lang="en-US" sz="1800" b="1" dirty="0">
-                <a:ea typeface="+mn-ea"/>
-              </a:rPr>
-              <a:t>and </a:t>
-            </a:r>
-            <a:r>
-              <a:rPr lang="en-US" sz="1800" b="1" dirty="0" smtClean="0">
-                <a:ea typeface="+mn-ea"/>
-              </a:rPr>
-              <a:t>into </a:t>
-            </a:r>
-            <a:r>
-              <a:rPr lang="en-US" sz="1800" b="1" dirty="0">
-                <a:ea typeface="+mn-ea"/>
-              </a:rPr>
-              <a:t>Framework </a:t>
-            </a:r>
-            <a:r>
-              <a:rPr lang="en-US" sz="1800" b="1" dirty="0" smtClean="0">
-                <a:ea typeface="+mn-ea"/>
-              </a:rPr>
-              <a:t>Configuration</a:t>
+              <a:rPr lang="en-US" sz="1800" b="1" dirty="0" smtClean="0"/>
+              <a:t>In </a:t>
+            </a:r>
+            <a:r>
+              <a:rPr lang="en-US" sz="1800" b="1" dirty="0"/>
+              <a:t>order to scale Market Place across states our research showed us how to pull test data out of our scripts, decoupling execution from configuration</a:t>
+            </a:r>
+            <a:r>
+              <a:rPr lang="en-US" sz="1800" b="1" dirty="0" smtClean="0"/>
+              <a:t>.</a:t>
             </a:r>
             <a:endParaRPr lang="en-US" sz="1800" b="1" dirty="0">
               <a:ea typeface="+mn-ea"/>
@@ -9039,7 +8889,19 @@
               <a:rPr lang="en-US" sz="2000" b="1" dirty="0" smtClean="0">
                 <a:ea typeface="+mn-ea"/>
               </a:rPr>
-              <a:t>All testing regardless of mode is </a:t>
+              <a:t>All testing regardless of </a:t>
+            </a:r>
+            <a:r>
+              <a:rPr lang="en-US" sz="2000" b="1" dirty="0" smtClean="0">
+                <a:ea typeface="+mn-ea"/>
+              </a:rPr>
+              <a:t>primary mode </a:t>
+            </a:r>
+            <a:r>
+              <a:rPr lang="en-US" sz="2000" b="1" dirty="0" smtClean="0">
+                <a:ea typeface="+mn-ea"/>
+              </a:rPr>
+              <a:t>is </a:t>
             </a:r>
             <a:r>
               <a:rPr lang="en-US" sz="2000" b="1" u="sng" dirty="0" smtClean="0">
@@ -9067,7 +8929,19 @@
               <a:rPr lang="en-US" sz="1800" b="1" dirty="0" smtClean="0">
                 <a:ea typeface="+mn-ea"/>
               </a:rPr>
-              <a:t>Developers use configuration to focus testing on development code</a:t>
+              <a:t>Developers use </a:t>
+            </a:r>
+            <a:r>
+              <a:rPr lang="en-US" sz="1800" b="1" dirty="0" smtClean="0">
+                <a:ea typeface="+mn-ea"/>
+              </a:rPr>
+              <a:t>the configuration model to </a:t>
+            </a:r>
+            <a:r>
+              <a:rPr lang="en-US" sz="1800" b="1" dirty="0" smtClean="0">
+                <a:ea typeface="+mn-ea"/>
+              </a:rPr>
+              <a:t>focus testing on development code</a:t>
             </a:r>
           </a:p>
           <a:p>
@@ -9093,14 +8967,26 @@
               <a:rPr lang="en-US" sz="1800" b="1" dirty="0" smtClean="0">
                 <a:ea typeface="+mn-ea"/>
               </a:rPr>
-              <a:t>ability </a:t>
+              <a:t>ability to test on same deployed code w/out stepping on </a:t>
             </a:r>
             <a:r>
               <a:rPr lang="en-US" sz="1800" b="1" dirty="0" smtClean="0">
                 <a:ea typeface="+mn-ea"/>
               </a:rPr>
-              <a:t>to test on same deployed code w/out stepping on Dev</a:t>
-            </a:r>
+              <a:t>Dev</a:t>
+            </a:r>
+          </a:p>
+          <a:p>
+            <a:pPr marL="341313" lvl="1" indent="0" eaLnBrk="1" fontAlgn="auto" hangingPunct="1">
+              <a:spcAft>
+                <a:spcPts val="0"/>
+              </a:spcAft>
+              <a:buNone/>
+              <a:defRPr/>
+            </a:pPr>
+            <a:endParaRPr lang="en-US" sz="1800" b="1" dirty="0" smtClean="0">
+              <a:ea typeface="+mn-ea"/>
+            </a:endParaRPr>
           </a:p>
           <a:p>
             <a:pPr marL="457206" lvl="1" indent="0" eaLnBrk="1" fontAlgn="auto" hangingPunct="1">
@@ -9636,7 +9522,7 @@
         <p:spPr>
           <a:xfrm>
             <a:off x="712788" y="109538"/>
-            <a:ext cx="6897687" cy="982662"/>
+            <a:ext cx="6897687" cy="1528762"/>
           </a:xfrm>
         </p:spPr>
         <p:txBody>
@@ -9645,12 +9531,36 @@
           <a:p>
             <a:pPr algn="ctr" eaLnBrk="1" hangingPunct="1"/>
             <a:r>
-              <a:rPr lang="en-US" smtClean="0">
+              <a:rPr lang="en-US" dirty="0" smtClean="0">
                 <a:latin typeface="Calibri Light" pitchFamily="34" charset="0"/>
                 <a:cs typeface="Calibri Light" pitchFamily="34" charset="0"/>
               </a:rPr>
-              <a:t>TEST CASES NUMBERS</a:t>
-            </a:r>
+              <a:t>TEST CASES </a:t>
+            </a:r>
+            <a:r>
+              <a:rPr lang="en-US" dirty="0" smtClean="0">
+                <a:latin typeface="Calibri Light" pitchFamily="34" charset="0"/>
+                <a:cs typeface="Calibri Light" pitchFamily="34" charset="0"/>
+              </a:rPr>
+              <a:t>NUMBERS</a:t>
+            </a:r>
+            <a:br>
+              <a:rPr lang="en-US" dirty="0" smtClean="0">
+                <a:latin typeface="Calibri Light" pitchFamily="34" charset="0"/>
+                <a:cs typeface="Calibri Light" pitchFamily="34" charset="0"/>
+              </a:rPr>
+            </a:br>
+            <a:r>
+              <a:rPr lang="en-US" sz="4000" dirty="0" smtClean="0">
+                <a:latin typeface="Calibri Light" pitchFamily="34" charset="0"/>
+                <a:cs typeface="Calibri Light" pitchFamily="34" charset="0"/>
+              </a:rPr>
+              <a:t>Market Place</a:t>
+            </a:r>
+            <a:endParaRPr lang="en-US" dirty="0" smtClean="0">
+              <a:latin typeface="Calibri Light" pitchFamily="34" charset="0"/>
+              <a:cs typeface="Calibri Light" pitchFamily="34" charset="0"/>
+            </a:endParaRPr>
           </a:p>
         </p:txBody>
       </p:sp>
@@ -9665,7 +9575,7 @@
         <p:spPr bwMode="auto">
           <a:xfrm>
             <a:off x="274320" y="1840428"/>
-            <a:ext cx="6624320" cy="4401205"/>
+            <a:ext cx="6624320" cy="5447645"/>
           </a:xfrm>
           <a:prstGeom prst="rect">
             <a:avLst/>
@@ -9725,23 +9635,32 @@
               <a:buChar char="•"/>
             </a:pPr>
             <a:r>
+              <a:rPr lang="en-US" sz="1600" dirty="0" smtClean="0">
+                <a:latin typeface="Calibri" pitchFamily="34" charset="0"/>
+              </a:rPr>
+              <a:t>Phase 0 </a:t>
+            </a:r>
+            <a:r>
+              <a:rPr lang="en-US" sz="1600" dirty="0" smtClean="0">
+                <a:latin typeface="Calibri" pitchFamily="34" charset="0"/>
+              </a:rPr>
+              <a:t>contains 4 products with different number of tests per product.  </a:t>
+            </a:r>
+            <a:r>
               <a:rPr lang="en-US" sz="2000" dirty="0" smtClean="0">
                 <a:latin typeface="Calibri" pitchFamily="34" charset="0"/>
               </a:rPr>
-              <a:t>Phase_0   4 Prod  </a:t>
-            </a:r>
-            <a:r>
-              <a:rPr lang="en-US" sz="2000" dirty="0">
-                <a:latin typeface="Calibri" pitchFamily="34" charset="0"/>
-              </a:rPr>
-              <a:t>5 states 	</a:t>
-            </a:r>
-            <a:r>
-              <a:rPr lang="en-US" sz="2000" dirty="0" smtClean="0">
-                <a:latin typeface="Calibri" pitchFamily="34" charset="0"/>
-              </a:rPr>
-              <a:t>=== 10125 tests</a:t>
-            </a:r>
+              <a:t>4 Products tested in 5 states totals 10125 tests</a:t>
+            </a:r>
+            <a:endParaRPr lang="en-US" sz="1600" dirty="0" smtClean="0">
+              <a:latin typeface="Calibri" pitchFamily="34" charset="0"/>
+            </a:endParaRPr>
+          </a:p>
+          <a:p>
+            <a:pPr marL="342900" indent="-342900">
+              <a:buFont typeface="Arial" panose="020B0604020202020204" pitchFamily="34" charset="0"/>
+              <a:buChar char="•"/>
+            </a:pPr>
             <a:endParaRPr lang="en-US" sz="2000" dirty="0">
               <a:latin typeface="Calibri" pitchFamily="34" charset="0"/>
             </a:endParaRPr>
@@ -9751,6 +9670,30 @@
               <a:buFont typeface="Arial" panose="020B0604020202020204" pitchFamily="34" charset="0"/>
               <a:buChar char="•"/>
             </a:pPr>
+            <a:r>
+              <a:rPr lang="en-US" sz="1600" dirty="0" smtClean="0">
+                <a:latin typeface="Calibri" pitchFamily="34" charset="0"/>
+              </a:rPr>
+              <a:t>Phase 1 contains 2 products with different numbers of tests per product.      </a:t>
+            </a:r>
+            <a:r>
+              <a:rPr lang="en-US" sz="2000" dirty="0" smtClean="0">
+                <a:latin typeface="Calibri" pitchFamily="34" charset="0"/>
+              </a:rPr>
+              <a:t>2 Products tested in 8 States totals 4394 </a:t>
+            </a:r>
+            <a:r>
+              <a:rPr lang="en-US" sz="2000" dirty="0">
+                <a:latin typeface="Calibri" pitchFamily="34" charset="0"/>
+              </a:rPr>
+              <a:t>tests</a:t>
+            </a:r>
+          </a:p>
+          <a:p>
+            <a:pPr marL="342900" indent="-342900">
+              <a:buFont typeface="Arial" panose="020B0604020202020204" pitchFamily="34" charset="0"/>
+              <a:buChar char="•"/>
+            </a:pPr>
             <a:endParaRPr lang="en-US" sz="2000" dirty="0">
               <a:latin typeface="Calibri" pitchFamily="34" charset="0"/>
             </a:endParaRPr>
@@ -9761,43 +9704,25 @@
               <a:buChar char="•"/>
             </a:pPr>
             <a:r>
-              <a:rPr lang="en-US" sz="2000" dirty="0">
+              <a:rPr lang="en-US" sz="1600" dirty="0" smtClean="0">
                 <a:latin typeface="Calibri" pitchFamily="34" charset="0"/>
               </a:rPr>
-              <a:t>Phase_1 </a:t>
-            </a:r>
+              <a:t>Phase 3 contains 1 product </a:t>
+            </a:r>
+          </a:p>
+          <a:p>
+            <a:pPr marL="342900" indent="-342900">
+              <a:buFont typeface="Arial" panose="020B0604020202020204" pitchFamily="34" charset="0"/>
+              <a:buChar char="•"/>
+            </a:pPr>
             <a:r>
               <a:rPr lang="en-US" sz="2000" dirty="0" smtClean="0">
                 <a:latin typeface="Calibri" pitchFamily="34" charset="0"/>
               </a:rPr>
-              <a:t>  2 </a:t>
-            </a:r>
-            <a:r>
-              <a:rPr lang="en-US" sz="2000" dirty="0">
-                <a:latin typeface="Calibri" pitchFamily="34" charset="0"/>
-              </a:rPr>
-              <a:t>Prod   </a:t>
+              <a:t>1 Product tested in 7 States totals 3234 </a:t>
             </a:r>
             <a:r>
               <a:rPr lang="en-US" sz="2000" dirty="0" smtClean="0">
-                <a:latin typeface="Calibri" pitchFamily="34" charset="0"/>
-              </a:rPr>
-              <a:t>8 States</a:t>
-            </a:r>
-            <a:r>
-              <a:rPr lang="en-US" sz="2000" dirty="0">
-                <a:latin typeface="Calibri" pitchFamily="34" charset="0"/>
-              </a:rPr>
-              <a:t>	</a:t>
-            </a:r>
-            <a:r>
-              <a:rPr lang="en-US" sz="2000" dirty="0" smtClean="0">
-                <a:latin typeface="Calibri" pitchFamily="34" charset="0"/>
-              </a:rPr>
-              <a:t>===   4394 </a:t>
-            </a:r>
-            <a:r>
-              <a:rPr lang="en-US" sz="2000" dirty="0">
                 <a:latin typeface="Calibri" pitchFamily="34" charset="0"/>
               </a:rPr>
               <a:t>tests</a:t>
@@ -9818,95 +9743,26 @@
               <a:buChar char="•"/>
             </a:pPr>
             <a:r>
+              <a:rPr lang="en-US" sz="2000" dirty="0" smtClean="0">
+                <a:latin typeface="Calibri" pitchFamily="34" charset="0"/>
+              </a:rPr>
+              <a:t>Phase 3 contains 1 product </a:t>
+            </a:r>
+            <a:endParaRPr lang="en-US" sz="2000" dirty="0" smtClean="0">
+              <a:latin typeface="Calibri" pitchFamily="34" charset="0"/>
+            </a:endParaRPr>
+          </a:p>
+          <a:p>
+            <a:pPr marL="342900" indent="-342900">
+              <a:buFont typeface="Arial" panose="020B0604020202020204" pitchFamily="34" charset="0"/>
+              <a:buChar char="•"/>
+            </a:pPr>
+            <a:r>
               <a:rPr lang="en-US" sz="2000" dirty="0">
                 <a:latin typeface="Calibri" pitchFamily="34" charset="0"/>
               </a:rPr>
-              <a:t>Phase_2 </a:t>
-            </a:r>
-            <a:r>
-              <a:rPr lang="en-US" sz="2000" dirty="0" smtClean="0">
-                <a:latin typeface="Calibri" pitchFamily="34" charset="0"/>
-              </a:rPr>
-              <a:t>  1 </a:t>
-            </a:r>
-            <a:r>
-              <a:rPr lang="en-US" sz="2000" dirty="0">
-                <a:latin typeface="Calibri" pitchFamily="34" charset="0"/>
-              </a:rPr>
-              <a:t>Prod   </a:t>
-            </a:r>
-            <a:r>
-              <a:rPr lang="en-US" sz="2000" dirty="0" smtClean="0">
-                <a:latin typeface="Calibri" pitchFamily="34" charset="0"/>
-              </a:rPr>
-              <a:t>7 States </a:t>
-            </a:r>
-            <a:r>
-              <a:rPr lang="en-US" sz="2000" dirty="0">
-                <a:latin typeface="Calibri" pitchFamily="34" charset="0"/>
-              </a:rPr>
-              <a:t>	=== </a:t>
-            </a:r>
-            <a:r>
-              <a:rPr lang="en-US" sz="2000" dirty="0" smtClean="0">
-                <a:latin typeface="Calibri" pitchFamily="34" charset="0"/>
-              </a:rPr>
-              <a:t>  3234 tests</a:t>
-            </a:r>
-          </a:p>
-          <a:p>
-            <a:pPr marL="342900" indent="-342900">
-              <a:buFont typeface="Arial" panose="020B0604020202020204" pitchFamily="34" charset="0"/>
-              <a:buChar char="•"/>
-            </a:pPr>
-            <a:endParaRPr lang="en-US" sz="2000" dirty="0">
-              <a:latin typeface="Calibri" pitchFamily="34" charset="0"/>
-            </a:endParaRPr>
-          </a:p>
-          <a:p>
-            <a:pPr marL="342900" indent="-342900">
-              <a:buFont typeface="Arial" panose="020B0604020202020204" pitchFamily="34" charset="0"/>
-              <a:buChar char="•"/>
-            </a:pPr>
-            <a:r>
-              <a:rPr lang="en-US" sz="2000" dirty="0">
-                <a:latin typeface="Calibri" pitchFamily="34" charset="0"/>
-              </a:rPr>
-              <a:t>Phase_3 </a:t>
-            </a:r>
-            <a:r>
-              <a:rPr lang="en-US" sz="2000" dirty="0" smtClean="0">
-                <a:latin typeface="Calibri" pitchFamily="34" charset="0"/>
-              </a:rPr>
-              <a:t>  1 </a:t>
-            </a:r>
-            <a:r>
-              <a:rPr lang="en-US" sz="2000" dirty="0">
-                <a:latin typeface="Calibri" pitchFamily="34" charset="0"/>
-              </a:rPr>
-              <a:t>Prod</a:t>
-            </a:r>
-            <a:r>
-              <a:rPr lang="en-US" sz="2000" dirty="0" smtClean="0">
-                <a:latin typeface="Calibri" pitchFamily="34" charset="0"/>
-              </a:rPr>
-              <a:t>   7 </a:t>
-            </a:r>
-            <a:r>
-              <a:rPr lang="en-US" sz="2000" dirty="0">
-                <a:latin typeface="Calibri" pitchFamily="34" charset="0"/>
-              </a:rPr>
-              <a:t>States 	===   3234 </a:t>
-            </a:r>
-            <a:r>
-              <a:rPr lang="en-US" sz="2000" dirty="0" smtClean="0">
-                <a:latin typeface="Calibri" pitchFamily="34" charset="0"/>
-              </a:rPr>
-              <a:t>tests</a:t>
-            </a:r>
-            <a:endParaRPr lang="en-US" sz="2000" dirty="0">
-              <a:latin typeface="Calibri" pitchFamily="34" charset="0"/>
-            </a:endParaRPr>
+              <a:t>1 Product tested in 7 States totals 3234 tests</a:t>
+            </a:r>
           </a:p>
           <a:p>
             <a:endParaRPr lang="en-US" sz="2000" dirty="0">

</xml_diff>

<commit_message>
4/12/18 continued work on slided and calculations of test cases
</commit_message>
<xml_diff>
--- a/CurrentWork_Delta/CX_StrategyPowerPoint.pptx
+++ b/CurrentWork_Delta/CX_StrategyPowerPoint.pptx
@@ -285,7 +285,7 @@
               <a:pPr>
                 <a:defRPr/>
               </a:pPr>
-              <a:t>4/10/2018</a:t>
+              <a:t>4/11/2018</a:t>
             </a:fld>
             <a:endParaRPr lang="en-US"/>
           </a:p>
@@ -3086,7 +3086,7 @@
               </a:lnSpc>
             </a:pPr>
             <a:r>
-              <a:rPr lang="en-US" u="sng" smtClean="0">
+              <a:rPr lang="en-US" u="sng" dirty="0" smtClean="0">
                 <a:latin typeface="Calibri Light" pitchFamily="34" charset="0"/>
                 <a:cs typeface="Calibri Light" pitchFamily="34" charset="0"/>
               </a:rPr>
@@ -3103,13 +3103,13 @@
               </a:spcBef>
             </a:pPr>
             <a:r>
-              <a:rPr lang="en-US" sz="700" smtClean="0">
+              <a:rPr lang="en-US" sz="700" dirty="0" smtClean="0">
                 <a:latin typeface="Calibri Light" pitchFamily="34" charset="0"/>
                 <a:cs typeface="Calibri Light" pitchFamily="34" charset="0"/>
               </a:rPr>
               <a:t> </a:t>
             </a:r>
-            <a:endParaRPr lang="en-US" sz="700" u="sng" smtClean="0">
+            <a:endParaRPr lang="en-US" sz="700" u="sng" dirty="0" smtClean="0">
               <a:latin typeface="Calibri Light" pitchFamily="34" charset="0"/>
               <a:cs typeface="Calibri Light" pitchFamily="34" charset="0"/>
             </a:endParaRPr>
@@ -3120,7 +3120,7 @@
                 <a:spcPct val="70000"/>
               </a:lnSpc>
             </a:pPr>
-            <a:endParaRPr lang="en-US" b="1" smtClean="0">
+            <a:endParaRPr lang="en-US" b="1" dirty="0" smtClean="0">
               <a:latin typeface="Calibri Light" pitchFamily="34" charset="0"/>
               <a:cs typeface="Calibri Light" pitchFamily="34" charset="0"/>
             </a:endParaRPr>
@@ -3132,11 +3132,18 @@
               </a:lnSpc>
             </a:pPr>
             <a:r>
-              <a:rPr lang="en-US" sz="2500" b="1" u="sng" smtClean="0">
+              <a:rPr lang="en-US" sz="2500" b="1" u="sng" dirty="0" smtClean="0">
                 <a:latin typeface="Calibri Light" pitchFamily="34" charset="0"/>
                 <a:cs typeface="Calibri Light" pitchFamily="34" charset="0"/>
               </a:rPr>
-              <a:t>ASPERIAIONAL PRESENTATION</a:t>
+              <a:t>ASPIRATIONAL </a:t>
+            </a:r>
+            <a:r>
+              <a:rPr lang="en-US" sz="2500" b="1" u="sng" dirty="0" smtClean="0">
+                <a:latin typeface="Calibri Light" pitchFamily="34" charset="0"/>
+                <a:cs typeface="Calibri Light" pitchFamily="34" charset="0"/>
+              </a:rPr>
+              <a:t>PRESENTATION</a:t>
             </a:r>
           </a:p>
           <a:p>
@@ -3145,7 +3152,7 @@
                 <a:spcPct val="70000"/>
               </a:lnSpc>
             </a:pPr>
-            <a:endParaRPr lang="en-US" sz="2500" b="1" smtClean="0">
+            <a:endParaRPr lang="en-US" sz="2500" b="1" dirty="0" smtClean="0">
               <a:latin typeface="Calibri Light" pitchFamily="34" charset="0"/>
               <a:cs typeface="Calibri Light" pitchFamily="34" charset="0"/>
             </a:endParaRPr>
@@ -3157,7 +3164,7 @@
               </a:lnSpc>
             </a:pPr>
             <a:r>
-              <a:rPr lang="en-US" b="1" smtClean="0">
+              <a:rPr lang="en-US" b="1" dirty="0" smtClean="0">
                 <a:latin typeface="Calibri Light" pitchFamily="34" charset="0"/>
                 <a:cs typeface="Calibri Light" pitchFamily="34" charset="0"/>
               </a:rPr>
@@ -3171,7 +3178,7 @@
               </a:lnSpc>
             </a:pPr>
             <a:r>
-              <a:rPr lang="en-US" b="1" smtClean="0">
+              <a:rPr lang="en-US" b="1" dirty="0" smtClean="0">
                 <a:latin typeface="Calibri Light" pitchFamily="34" charset="0"/>
                 <a:cs typeface="Calibri Light" pitchFamily="34" charset="0"/>
               </a:rPr>
@@ -3185,7 +3192,7 @@
               </a:lnSpc>
             </a:pPr>
             <a:r>
-              <a:rPr lang="en-US" sz="500" smtClean="0">
+              <a:rPr lang="en-US" sz="500" dirty="0" smtClean="0">
                 <a:latin typeface="Calibri Light" pitchFamily="34" charset="0"/>
                 <a:cs typeface="Calibri Light" pitchFamily="34" charset="0"/>
               </a:rPr>
@@ -3199,14 +3206,14 @@
               </a:lnSpc>
             </a:pPr>
             <a:r>
-              <a:rPr lang="en-US" sz="1800" smtClean="0">
+              <a:rPr lang="en-US" sz="1800" dirty="0" smtClean="0">
                 <a:latin typeface="Calibri Light" pitchFamily="34" charset="0"/>
                 <a:cs typeface="Calibri Light" pitchFamily="34" charset="0"/>
               </a:rPr>
               <a:t>       </a:t>
             </a:r>
             <a:r>
-              <a:rPr lang="en-US" sz="1800" b="1" smtClean="0">
+              <a:rPr lang="en-US" sz="1800" b="1" dirty="0" smtClean="0">
                 <a:latin typeface="Calibri Light" pitchFamily="34" charset="0"/>
                 <a:cs typeface="Calibri Light" pitchFamily="34" charset="0"/>
               </a:rPr>
@@ -3219,7 +3226,7 @@
                 <a:spcPct val="70000"/>
               </a:lnSpc>
             </a:pPr>
-            <a:endParaRPr lang="en-US" sz="1800" b="1" smtClean="0">
+            <a:endParaRPr lang="en-US" sz="1800" b="1" dirty="0" smtClean="0">
               <a:latin typeface="Calibri Light" pitchFamily="34" charset="0"/>
               <a:cs typeface="Calibri Light" pitchFamily="34" charset="0"/>
             </a:endParaRPr>
@@ -3231,7 +3238,7 @@
               </a:lnSpc>
             </a:pPr>
             <a:r>
-              <a:rPr lang="en-US" sz="800" smtClean="0">
+              <a:rPr lang="en-US" sz="800" dirty="0" smtClean="0">
                 <a:latin typeface="Calibri Light" pitchFamily="34" charset="0"/>
                 <a:cs typeface="Calibri Light" pitchFamily="34" charset="0"/>
               </a:rPr>
@@ -3245,7 +3252,7 @@
               </a:lnSpc>
             </a:pPr>
             <a:r>
-              <a:rPr lang="en-US" b="1" smtClean="0">
+              <a:rPr lang="en-US" b="1" dirty="0" smtClean="0">
                 <a:latin typeface="Calibri Light" pitchFamily="34" charset="0"/>
                 <a:cs typeface="Calibri Light" pitchFamily="34" charset="0"/>
               </a:rPr>
@@ -3261,7 +3268,7 @@
               <a:buChar char="•"/>
             </a:pPr>
             <a:r>
-              <a:rPr lang="en-US" b="1" smtClean="0">
+              <a:rPr lang="en-US" b="1" dirty="0" smtClean="0">
                 <a:latin typeface="Calibri Light" pitchFamily="34" charset="0"/>
                 <a:cs typeface="Calibri Light" pitchFamily="34" charset="0"/>
               </a:rPr>
@@ -3277,7 +3284,7 @@
               <a:buChar char="•"/>
             </a:pPr>
             <a:r>
-              <a:rPr lang="en-US" b="1" smtClean="0">
+              <a:rPr lang="en-US" b="1" dirty="0" smtClean="0">
                 <a:latin typeface="Calibri Light" pitchFamily="34" charset="0"/>
                 <a:cs typeface="Calibri Light" pitchFamily="34" charset="0"/>
               </a:rPr>
@@ -3686,7 +3693,7 @@
         <p:spPr>
           <a:xfrm>
             <a:off x="282575" y="1795463"/>
-            <a:ext cx="8821738" cy="2238375"/>
+            <a:ext cx="8821738" cy="2014537"/>
           </a:xfrm>
         </p:spPr>
         <p:txBody>
@@ -3859,41 +3866,6 @@
             <a:endParaRPr lang="en-US" sz="2000" b="1" dirty="0" smtClean="0">
               <a:ea typeface="+mn-ea"/>
             </a:endParaRPr>
-          </a:p>
-          <a:p>
-            <a:pPr lvl="1" indent="0" eaLnBrk="1" fontAlgn="auto" hangingPunct="1">
-              <a:lnSpc>
-                <a:spcPct val="125000"/>
-              </a:lnSpc>
-              <a:spcAft>
-                <a:spcPts val="0"/>
-              </a:spcAft>
-              <a:buFontTx/>
-              <a:buNone/>
-              <a:defRPr/>
-            </a:pPr>
-            <a:r>
-              <a:rPr lang="en-US" sz="1000" b="1" dirty="0">
-                <a:solidFill>
-                  <a:schemeClr val="bg1">
-                    <a:lumMod val="95000"/>
-                  </a:schemeClr>
-                </a:solidFill>
-                <a:ea typeface="+mn-ea"/>
-              </a:rPr>
-              <a:t>Inclusion of development staff in the automation development process we align our teams much like the rest of the </a:t>
-            </a:r>
-            <a:r>
-              <a:rPr lang="en-US" sz="1000" b="1" dirty="0" smtClean="0">
-                <a:solidFill>
-                  <a:schemeClr val="bg1">
-                    <a:lumMod val="95000"/>
-                  </a:schemeClr>
-                </a:solidFill>
-                <a:ea typeface="+mn-ea"/>
-              </a:rPr>
-              <a:t>industry</a:t>
-            </a:r>
           </a:p>
           <a:p>
             <a:pPr lvl="1" indent="0" eaLnBrk="1" fontAlgn="auto" hangingPunct="1">
@@ -3923,8 +3895,8 @@
         </p:nvSpPr>
         <p:spPr bwMode="auto">
           <a:xfrm>
-            <a:off x="282575" y="4135438"/>
-            <a:ext cx="4127500" cy="1776412"/>
+            <a:off x="282575" y="4135437"/>
+            <a:ext cx="3316968" cy="2294391"/>
           </a:xfrm>
           <a:prstGeom prst="rect">
             <a:avLst/>
@@ -3995,7 +3967,7 @@
         </p:blipFill>
         <p:spPr bwMode="auto">
           <a:xfrm>
-            <a:off x="4949825" y="4135438"/>
+            <a:off x="4949825" y="3932242"/>
             <a:ext cx="3613150" cy="2622550"/>
           </a:xfrm>
           <a:prstGeom prst="rect">
@@ -4012,50 +3984,137 @@
       </p:pic>
       <p:sp>
         <p:nvSpPr>
-          <p:cNvPr id="3" name="Right Arrow 2"/>
+          <p:cNvPr id="2" name="Left Brace 1"/>
           <p:cNvSpPr/>
           <p:nvPr/>
         </p:nvSpPr>
         <p:spPr>
           <a:xfrm>
-            <a:off x="1009650" y="5454650"/>
-            <a:ext cx="3940175" cy="457200"/>
+            <a:off x="4587240" y="4541520"/>
+            <a:ext cx="190500" cy="541020"/>
           </a:xfrm>
-          <a:prstGeom prst="rightArrow">
-            <a:avLst>
-              <a:gd name="adj1" fmla="val 45556"/>
-              <a:gd name="adj2" fmla="val 138889"/>
-            </a:avLst>
+          <a:prstGeom prst="leftBrace">
+            <a:avLst/>
           </a:prstGeom>
         </p:spPr>
         <p:style>
-          <a:lnRef idx="1">
+          <a:lnRef idx="2">
             <a:schemeClr val="accent1"/>
           </a:lnRef>
-          <a:fillRef idx="3">
+          <a:fillRef idx="0">
             <a:schemeClr val="accent1"/>
           </a:fillRef>
-          <a:effectRef idx="2">
+          <a:effectRef idx="1">
             <a:schemeClr val="accent1"/>
           </a:effectRef>
           <a:fontRef idx="minor">
-            <a:schemeClr val="lt1"/>
+            <a:schemeClr val="tx1"/>
           </a:fontRef>
         </p:style>
         <p:txBody>
-          <a:bodyPr anchor="ctr"/>
+          <a:bodyPr rtlCol="0" anchor="ctr"/>
           <a:lstStyle/>
           <a:p>
-            <a:pPr algn="ctr" fontAlgn="auto">
-              <a:spcBef>
-                <a:spcPts val="0"/>
-              </a:spcBef>
-              <a:spcAft>
-                <a:spcPts val="0"/>
-              </a:spcAft>
-              <a:defRPr/>
-            </a:pPr>
+            <a:pPr algn="ctr"/>
             <a:endParaRPr lang="en-US"/>
+          </a:p>
+        </p:txBody>
+      </p:sp>
+      <p:sp>
+        <p:nvSpPr>
+          <p:cNvPr id="8" name="Left Brace 7"/>
+          <p:cNvSpPr/>
+          <p:nvPr/>
+        </p:nvSpPr>
+        <p:spPr>
+          <a:xfrm>
+            <a:off x="4594860" y="5364480"/>
+            <a:ext cx="190500" cy="1127760"/>
+          </a:xfrm>
+          <a:prstGeom prst="leftBrace">
+            <a:avLst/>
+          </a:prstGeom>
+        </p:spPr>
+        <p:style>
+          <a:lnRef idx="2">
+            <a:schemeClr val="accent1"/>
+          </a:lnRef>
+          <a:fillRef idx="0">
+            <a:schemeClr val="accent1"/>
+          </a:fillRef>
+          <a:effectRef idx="1">
+            <a:schemeClr val="accent1"/>
+          </a:effectRef>
+          <a:fontRef idx="minor">
+            <a:schemeClr val="tx1"/>
+          </a:fontRef>
+        </p:style>
+        <p:txBody>
+          <a:bodyPr rtlCol="0" anchor="ctr"/>
+          <a:lstStyle/>
+          <a:p>
+            <a:pPr algn="ctr"/>
+            <a:endParaRPr lang="en-US"/>
+          </a:p>
+        </p:txBody>
+      </p:sp>
+      <p:sp>
+        <p:nvSpPr>
+          <p:cNvPr id="4" name="TextBox 3"/>
+          <p:cNvSpPr txBox="1"/>
+          <p:nvPr/>
+        </p:nvSpPr>
+        <p:spPr>
+          <a:xfrm>
+            <a:off x="3848100" y="4610100"/>
+            <a:ext cx="595035" cy="369332"/>
+          </a:xfrm>
+          <a:prstGeom prst="rect">
+            <a:avLst/>
+          </a:prstGeom>
+          <a:noFill/>
+        </p:spPr>
+        <p:txBody>
+          <a:bodyPr wrap="none" rtlCol="0">
+            <a:spAutoFit/>
+          </a:bodyPr>
+          <a:lstStyle/>
+          <a:p>
+            <a:r>
+              <a:rPr lang="en-US" dirty="0" smtClean="0"/>
+              <a:t>Dev</a:t>
+            </a:r>
+            <a:endParaRPr lang="en-US" dirty="0"/>
+          </a:p>
+        </p:txBody>
+      </p:sp>
+      <p:sp>
+        <p:nvSpPr>
+          <p:cNvPr id="11" name="TextBox 10"/>
+          <p:cNvSpPr txBox="1"/>
+          <p:nvPr/>
+        </p:nvSpPr>
+        <p:spPr>
+          <a:xfrm>
+            <a:off x="3549635" y="5720834"/>
+            <a:ext cx="1095172" cy="369332"/>
+          </a:xfrm>
+          <a:prstGeom prst="rect">
+            <a:avLst/>
+          </a:prstGeom>
+          <a:noFill/>
+        </p:spPr>
+        <p:txBody>
+          <a:bodyPr wrap="none" rtlCol="0">
+            <a:spAutoFit/>
+          </a:bodyPr>
+          <a:lstStyle/>
+          <a:p>
+            <a:r>
+              <a:rPr lang="en-US" dirty="0" err="1" smtClean="0"/>
+              <a:t>NextGen</a:t>
+            </a:r>
+            <a:endParaRPr lang="en-US" dirty="0"/>
           </a:p>
         </p:txBody>
       </p:sp>
@@ -6157,13 +6216,7 @@
               <a:rPr lang="en-US" sz="1600" b="1" dirty="0" smtClean="0">
                 <a:ea typeface="+mn-ea"/>
               </a:rPr>
-              <a:t>Node,   Protractor,   </a:t>
-            </a:r>
-            <a:r>
-              <a:rPr lang="en-US" sz="1600" b="1" dirty="0" smtClean="0">
-                <a:ea typeface="+mn-ea"/>
-              </a:rPr>
-              <a:t>JavaScript</a:t>
+              <a:t>Node,   Protractor,   JavaScript</a:t>
             </a:r>
             <a:r>
               <a:rPr lang="en-US" sz="1600" b="1" dirty="0">
@@ -6365,17 +6418,8 @@
               <a:rPr lang="en-US" sz="2000" b="1" dirty="0" smtClean="0">
                 <a:ea typeface="+mn-ea"/>
               </a:rPr>
-              <a:t>, our purpose, technologies, philosophies, process, and our evolutionary plans for </a:t>
-            </a:r>
-            <a:r>
-              <a:rPr lang="en-US" sz="2000" b="1" dirty="0" smtClean="0">
-                <a:ea typeface="+mn-ea"/>
-              </a:rPr>
-              <a:t>2018 being developed by         2 local staff and 3 off shore staff.</a:t>
-            </a:r>
-            <a:endParaRPr lang="en-US" sz="2000" b="1" dirty="0" smtClean="0">
-              <a:ea typeface="+mn-ea"/>
-            </a:endParaRPr>
+              <a:t>, our purpose, technologies, philosophies, process, and our evolutionary plans for 2018 being developed by         2 local staff and 3 off shore staff.</a:t>
+            </a:r>
           </a:p>
           <a:p>
             <a:pPr eaLnBrk="1" fontAlgn="auto" hangingPunct="1">
@@ -6536,25 +6580,7 @@
               <a:rPr lang="en-US" sz="2000" b="1" dirty="0" smtClean="0">
                 <a:ea typeface="+mn-ea"/>
               </a:rPr>
-              <a:t>work for Delta Dental technology teams ( CX, </a:t>
-            </a:r>
-            <a:r>
-              <a:rPr lang="en-US" sz="2000" b="1" dirty="0" smtClean="0">
-                <a:ea typeface="+mn-ea"/>
-              </a:rPr>
-              <a:t>. . . </a:t>
-            </a:r>
-            <a:r>
-              <a:rPr lang="en-US" sz="2000" b="1" dirty="0" smtClean="0">
-                <a:ea typeface="+mn-ea"/>
-              </a:rPr>
-              <a:t> </a:t>
-            </a:r>
-            <a:r>
-              <a:rPr lang="en-US" sz="2000" b="1" dirty="0" smtClean="0">
-                <a:ea typeface="+mn-ea"/>
-              </a:rPr>
-              <a:t>)</a:t>
+              <a:t>work for Delta Dental technology teams ( CX, . . .  )</a:t>
             </a:r>
           </a:p>
           <a:p>
@@ -8855,11 +8881,35 @@
             </a:r>
             <a:r>
               <a:rPr lang="en-US" sz="1800" b="1" dirty="0"/>
-              <a:t>order to scale Market Place across states our research showed us how to pull test data out of our scripts, decoupling execution from configuration</a:t>
+              <a:t>order to scale Market Place across states our research </a:t>
             </a:r>
             <a:r>
               <a:rPr lang="en-US" sz="1800" b="1" dirty="0" smtClean="0"/>
-              <a:t>.</a:t>
+              <a:t>required we </a:t>
+            </a:r>
+            <a:r>
+              <a:rPr lang="en-US" sz="1800" b="1" dirty="0"/>
+              <a:t>pull test </a:t>
+            </a:r>
+            <a:r>
+              <a:rPr lang="en-US" sz="1800" b="1" dirty="0" smtClean="0"/>
+              <a:t>data points </a:t>
+            </a:r>
+            <a:r>
+              <a:rPr lang="en-US" sz="1800" b="1" dirty="0"/>
+              <a:t>out of </a:t>
+            </a:r>
+            <a:r>
+              <a:rPr lang="en-US" sz="1800" b="1" dirty="0" smtClean="0"/>
+              <a:t>test scripts</a:t>
+            </a:r>
+            <a:r>
+              <a:rPr lang="en-US" sz="1800" b="1" dirty="0"/>
+              <a:t>, decoupling execution from configuration</a:t>
+            </a:r>
+            <a:r>
+              <a:rPr lang="en-US" sz="1800" b="1" dirty="0" smtClean="0"/>
+              <a:t>.  Test data is now separate and usable elsewhere</a:t>
             </a:r>
             <a:endParaRPr lang="en-US" sz="1800" b="1" dirty="0">
               <a:ea typeface="+mn-ea"/>
@@ -8889,30 +8939,18 @@
               <a:rPr lang="en-US" sz="2000" b="1" dirty="0" smtClean="0">
                 <a:ea typeface="+mn-ea"/>
               </a:rPr>
-              <a:t>All testing regardless of </a:t>
+              <a:t>All testing regardless of primary mode is </a:t>
+            </a:r>
+            <a:r>
+              <a:rPr lang="en-US" sz="2000" b="1" u="sng" dirty="0" smtClean="0">
+                <a:ea typeface="+mn-ea"/>
+              </a:rPr>
+              <a:t>configurable</a:t>
             </a:r>
             <a:r>
               <a:rPr lang="en-US" sz="2000" b="1" dirty="0" smtClean="0">
                 <a:ea typeface="+mn-ea"/>
               </a:rPr>
-              <a:t>primary mode </a:t>
-            </a:r>
-            <a:r>
-              <a:rPr lang="en-US" sz="2000" b="1" dirty="0" smtClean="0">
-                <a:ea typeface="+mn-ea"/>
-              </a:rPr>
-              <a:t>is </a:t>
-            </a:r>
-            <a:r>
-              <a:rPr lang="en-US" sz="2000" b="1" u="sng" dirty="0" smtClean="0">
-                <a:ea typeface="+mn-ea"/>
-              </a:rPr>
-              <a:t>configurable</a:t>
-            </a:r>
-            <a:r>
-              <a:rPr lang="en-US" sz="2000" b="1" dirty="0" smtClean="0">
-                <a:ea typeface="+mn-ea"/>
-              </a:rPr>
               <a:t> prior to run</a:t>
             </a:r>
           </a:p>
@@ -8929,19 +8967,7 @@
               <a:rPr lang="en-US" sz="1800" b="1" dirty="0" smtClean="0">
                 <a:ea typeface="+mn-ea"/>
               </a:rPr>
-              <a:t>Developers use </a:t>
-            </a:r>
-            <a:r>
-              <a:rPr lang="en-US" sz="1800" b="1" dirty="0" smtClean="0">
-                <a:ea typeface="+mn-ea"/>
-              </a:rPr>
-              <a:t>the configuration model to </a:t>
-            </a:r>
-            <a:r>
-              <a:rPr lang="en-US" sz="1800" b="1" dirty="0" smtClean="0">
-                <a:ea typeface="+mn-ea"/>
-              </a:rPr>
-              <a:t>focus testing on development code</a:t>
+              <a:t>Developers use the configuration model to focus testing on development code</a:t>
             </a:r>
           </a:p>
           <a:p>
@@ -8967,13 +8993,7 @@
               <a:rPr lang="en-US" sz="1800" b="1" dirty="0" smtClean="0">
                 <a:ea typeface="+mn-ea"/>
               </a:rPr>
-              <a:t>ability to test on same deployed code w/out stepping on </a:t>
-            </a:r>
-            <a:r>
-              <a:rPr lang="en-US" sz="1800" b="1" dirty="0" smtClean="0">
-                <a:ea typeface="+mn-ea"/>
-              </a:rPr>
-              <a:t>Dev</a:t>
+              <a:t>ability to test on same deployed code w/out stepping on Dev</a:t>
             </a:r>
           </a:p>
           <a:p>
@@ -9535,14 +9555,7 @@
                 <a:latin typeface="Calibri Light" pitchFamily="34" charset="0"/>
                 <a:cs typeface="Calibri Light" pitchFamily="34" charset="0"/>
               </a:rPr>
-              <a:t>TEST CASES </a:t>
-            </a:r>
-            <a:r>
-              <a:rPr lang="en-US" dirty="0" smtClean="0">
-                <a:latin typeface="Calibri Light" pitchFamily="34" charset="0"/>
-                <a:cs typeface="Calibri Light" pitchFamily="34" charset="0"/>
-              </a:rPr>
-              <a:t>NUMBERS</a:t>
+              <a:t>TEST CASES NUMBERS</a:t>
             </a:r>
             <a:br>
               <a:rPr lang="en-US" dirty="0" smtClean="0">
@@ -9574,8 +9587,8 @@
         </p:nvSpPr>
         <p:spPr bwMode="auto">
           <a:xfrm>
-            <a:off x="274320" y="1840428"/>
-            <a:ext cx="6624320" cy="5447645"/>
+            <a:off x="274320" y="1735202"/>
+            <a:ext cx="8869680" cy="5139869"/>
           </a:xfrm>
           <a:prstGeom prst="rect">
             <a:avLst/>
@@ -9602,20 +9615,76 @@
               <a:rPr lang="en-US" sz="2000" dirty="0">
                 <a:latin typeface="Calibri" pitchFamily="34" charset="0"/>
               </a:rPr>
-              <a:t>Test case numbers are a </a:t>
+              <a:t>Test case </a:t>
             </a:r>
             <a:r>
               <a:rPr lang="en-US" sz="2000" dirty="0" smtClean="0">
                 <a:latin typeface="Calibri" pitchFamily="34" charset="0"/>
               </a:rPr>
-              <a:t>product of functional test written X   data points tested against   X   States Tested in</a:t>
-            </a:r>
-          </a:p>
-          <a:p>
-            <a:pPr marL="342900" indent="-342900">
-              <a:buFont typeface="Arial" panose="020B0604020202020204" pitchFamily="34" charset="0"/>
-              <a:buChar char="•"/>
-            </a:pPr>
+              <a:t>results </a:t>
+            </a:r>
+            <a:r>
+              <a:rPr lang="en-US" sz="2000" dirty="0">
+                <a:latin typeface="Calibri" pitchFamily="34" charset="0"/>
+              </a:rPr>
+              <a:t>are </a:t>
+            </a:r>
+            <a:r>
+              <a:rPr lang="en-US" sz="2000" dirty="0" smtClean="0">
+                <a:latin typeface="Calibri" pitchFamily="34" charset="0"/>
+              </a:rPr>
+              <a:t>the result </a:t>
+            </a:r>
+            <a:r>
+              <a:rPr lang="en-US" sz="2000" dirty="0" smtClean="0">
+                <a:latin typeface="Calibri" pitchFamily="34" charset="0"/>
+              </a:rPr>
+              <a:t>of </a:t>
+            </a:r>
+            <a:r>
+              <a:rPr lang="en-US" sz="2000" dirty="0" smtClean="0">
+                <a:latin typeface="Calibri" pitchFamily="34" charset="0"/>
+              </a:rPr>
+              <a:t>functional test </a:t>
+            </a:r>
+            <a:r>
+              <a:rPr lang="en-US" sz="2000" dirty="0" smtClean="0">
+                <a:latin typeface="Calibri" pitchFamily="34" charset="0"/>
+              </a:rPr>
+              <a:t>written                                                  for a product   </a:t>
+            </a:r>
+            <a:r>
+              <a:rPr lang="en-US" sz="2000" dirty="0" smtClean="0">
+                <a:latin typeface="Calibri" pitchFamily="34" charset="0"/>
+              </a:rPr>
+              <a:t>X </a:t>
+            </a:r>
+            <a:r>
+              <a:rPr lang="en-US" sz="2000" dirty="0" smtClean="0">
+                <a:latin typeface="Calibri" pitchFamily="34" charset="0"/>
+              </a:rPr>
+              <a:t>  </a:t>
+            </a:r>
+            <a:r>
+              <a:rPr lang="en-US" sz="2000" dirty="0" smtClean="0">
+                <a:latin typeface="Calibri" pitchFamily="34" charset="0"/>
+              </a:rPr>
+              <a:t>data points tested </a:t>
+            </a:r>
+            <a:r>
+              <a:rPr lang="en-US" sz="2000" dirty="0" smtClean="0">
+                <a:latin typeface="Calibri" pitchFamily="34" charset="0"/>
+              </a:rPr>
+              <a:t>against   X    </a:t>
+            </a:r>
+            <a:r>
+              <a:rPr lang="en-US" sz="2000" dirty="0" smtClean="0">
+                <a:latin typeface="Calibri" pitchFamily="34" charset="0"/>
+              </a:rPr>
+              <a:t>States Tested in</a:t>
+            </a:r>
+          </a:p>
+          <a:p>
             <a:endParaRPr lang="en-US" sz="2000" dirty="0">
               <a:latin typeface="Calibri" pitchFamily="34" charset="0"/>
             </a:endParaRPr>
@@ -9625,6 +9694,57 @@
               <a:buFont typeface="Arial" panose="020B0604020202020204" pitchFamily="34" charset="0"/>
               <a:buChar char="•"/>
             </a:pPr>
+            <a:r>
+              <a:rPr lang="en-US" sz="1400" b="1" dirty="0" smtClean="0">
+                <a:latin typeface="Calibri" pitchFamily="34" charset="0"/>
+              </a:rPr>
+              <a:t>Phase 0</a:t>
+            </a:r>
+            <a:r>
+              <a:rPr lang="en-US" sz="1400" dirty="0" smtClean="0">
+                <a:latin typeface="Calibri" pitchFamily="34" charset="0"/>
+              </a:rPr>
+              <a:t> contains 4 products with </a:t>
+            </a:r>
+            <a:r>
+              <a:rPr lang="en-US" sz="1400" dirty="0" smtClean="0">
+                <a:latin typeface="Calibri" pitchFamily="34" charset="0"/>
+              </a:rPr>
+              <a:t>total  of 1873 </a:t>
+            </a:r>
+            <a:r>
+              <a:rPr lang="en-US" sz="1400" dirty="0" smtClean="0">
+                <a:latin typeface="Calibri" pitchFamily="34" charset="0"/>
+              </a:rPr>
+              <a:t>functional tests written.                                                                              Factoring test data point into the calculation,                                                                                                                                </a:t>
+            </a:r>
+            <a:r>
+              <a:rPr lang="en-US" sz="1400" dirty="0" smtClean="0">
+                <a:latin typeface="Calibri" pitchFamily="34" charset="0"/>
+              </a:rPr>
+              <a:t> </a:t>
+            </a:r>
+            <a:r>
+              <a:rPr lang="en-US" sz="2000" dirty="0" smtClean="0">
+                <a:latin typeface="Calibri" pitchFamily="34" charset="0"/>
+              </a:rPr>
+              <a:t>4 Products tested in 5 states totals </a:t>
+            </a:r>
+            <a:r>
+              <a:rPr lang="en-US" sz="2400" dirty="0" smtClean="0">
+                <a:latin typeface="Calibri" pitchFamily="34" charset="0"/>
+              </a:rPr>
+              <a:t>10125 tests</a:t>
+            </a:r>
+            <a:endParaRPr lang="en-US" dirty="0" smtClean="0">
+              <a:latin typeface="Calibri" pitchFamily="34" charset="0"/>
+            </a:endParaRPr>
+          </a:p>
+          <a:p>
+            <a:pPr marL="342900" indent="-342900">
+              <a:buFont typeface="Arial" panose="020B0604020202020204" pitchFamily="34" charset="0"/>
+              <a:buChar char="•"/>
+            </a:pPr>
             <a:endParaRPr lang="en-US" sz="2000" dirty="0">
               <a:latin typeface="Calibri" pitchFamily="34" charset="0"/>
             </a:endParaRPr>
@@ -9635,26 +9755,71 @@
               <a:buChar char="•"/>
             </a:pPr>
             <a:r>
-              <a:rPr lang="en-US" sz="1600" dirty="0" smtClean="0">
+              <a:rPr lang="en-US" sz="1400" b="1" dirty="0" smtClean="0">
                 <a:latin typeface="Calibri" pitchFamily="34" charset="0"/>
               </a:rPr>
-              <a:t>Phase 0 </a:t>
-            </a:r>
-            <a:r>
-              <a:rPr lang="en-US" sz="1600" dirty="0" smtClean="0">
+              <a:t>Phase 1 </a:t>
+            </a:r>
+            <a:r>
+              <a:rPr lang="en-US" sz="1400" dirty="0" smtClean="0">
                 <a:latin typeface="Calibri" pitchFamily="34" charset="0"/>
               </a:rPr>
-              <a:t>contains 4 products with different number of tests per product.  </a:t>
+              <a:t>contains 2 </a:t>
+            </a:r>
+            <a:r>
+              <a:rPr lang="en-US" sz="1400" dirty="0">
+                <a:latin typeface="Calibri" pitchFamily="34" charset="0"/>
+              </a:rPr>
+              <a:t>products with total  of </a:t>
+            </a:r>
+            <a:r>
+              <a:rPr lang="en-US" sz="1400" dirty="0" smtClean="0">
+                <a:latin typeface="Calibri" pitchFamily="34" charset="0"/>
+              </a:rPr>
+              <a:t>819 functional </a:t>
+            </a:r>
+            <a:r>
+              <a:rPr lang="en-US" sz="1400" dirty="0">
+                <a:latin typeface="Calibri" pitchFamily="34" charset="0"/>
+              </a:rPr>
+              <a:t>tests written.                                </a:t>
+            </a:r>
+            <a:r>
+              <a:rPr lang="en-US" sz="1400" dirty="0" smtClean="0">
+                <a:latin typeface="Calibri" pitchFamily="34" charset="0"/>
+              </a:rPr>
+              <a:t>                                                  </a:t>
+            </a:r>
+            <a:r>
+              <a:rPr lang="en-US" sz="1400" dirty="0">
+                <a:latin typeface="Calibri" pitchFamily="34" charset="0"/>
+              </a:rPr>
+              <a:t>Factoring test data point into the calculation, </a:t>
+            </a:r>
+            <a:r>
+              <a:rPr lang="en-US" sz="1400" dirty="0" smtClean="0">
+                <a:latin typeface="Calibri" pitchFamily="34" charset="0"/>
+              </a:rPr>
+              <a:t>                                                                                                                                      </a:t>
             </a:r>
             <a:r>
               <a:rPr lang="en-US" sz="2000" dirty="0" smtClean="0">
                 <a:latin typeface="Calibri" pitchFamily="34" charset="0"/>
               </a:rPr>
-              <a:t>4 Products tested in 5 states totals 10125 tests</a:t>
-            </a:r>
-            <a:endParaRPr lang="en-US" sz="1600" dirty="0" smtClean="0">
-              <a:latin typeface="Calibri" pitchFamily="34" charset="0"/>
-            </a:endParaRPr>
+              <a:t>2 Products tested in 8 States totals </a:t>
+            </a:r>
+            <a:r>
+              <a:rPr lang="en-US" sz="2400" dirty="0" smtClean="0">
+                <a:latin typeface="Calibri" pitchFamily="34" charset="0"/>
+              </a:rPr>
+              <a:t>4394 </a:t>
+            </a:r>
+            <a:r>
+              <a:rPr lang="en-US" sz="2400" dirty="0">
+                <a:latin typeface="Calibri" pitchFamily="34" charset="0"/>
+              </a:rPr>
+              <a:t>tests</a:t>
+            </a:r>
           </a:p>
           <a:p>
             <a:pPr marL="342900" indent="-342900">
@@ -9671,23 +9836,74 @@
               <a:buChar char="•"/>
             </a:pPr>
             <a:r>
-              <a:rPr lang="en-US" sz="1600" dirty="0" smtClean="0">
+              <a:rPr lang="en-US" sz="1400" b="1" dirty="0" smtClean="0">
                 <a:latin typeface="Calibri" pitchFamily="34" charset="0"/>
               </a:rPr>
-              <a:t>Phase 1 contains 2 products with different numbers of tests per product.      </a:t>
+              <a:t>Phase </a:t>
+            </a:r>
+            <a:r>
+              <a:rPr lang="en-US" sz="1400" b="1" dirty="0" smtClean="0">
+                <a:latin typeface="Calibri" pitchFamily="34" charset="0"/>
+              </a:rPr>
+              <a:t>2 </a:t>
+            </a:r>
+            <a:r>
+              <a:rPr lang="en-US" sz="1400" dirty="0" smtClean="0">
+                <a:latin typeface="Calibri" pitchFamily="34" charset="0"/>
+              </a:rPr>
+              <a:t>contains 1 </a:t>
+            </a:r>
+            <a:r>
+              <a:rPr lang="en-US" sz="1400" dirty="0">
+                <a:latin typeface="Calibri" pitchFamily="34" charset="0"/>
+              </a:rPr>
+              <a:t>products with total  of </a:t>
+            </a:r>
+            <a:r>
+              <a:rPr lang="en-US" sz="1400" dirty="0" smtClean="0">
+                <a:latin typeface="Calibri" pitchFamily="34" charset="0"/>
+              </a:rPr>
+              <a:t>471 functional </a:t>
+            </a:r>
+            <a:r>
+              <a:rPr lang="en-US" sz="1400" dirty="0">
+                <a:latin typeface="Calibri" pitchFamily="34" charset="0"/>
+              </a:rPr>
+              <a:t>tests written.                                                                                  Factoring test data point into the calculation, </a:t>
+            </a:r>
+            <a:r>
+              <a:rPr lang="en-US" sz="1400" dirty="0" smtClean="0">
+                <a:latin typeface="Calibri" pitchFamily="34" charset="0"/>
+              </a:rPr>
+              <a:t> </a:t>
+            </a:r>
+            <a:r>
+              <a:rPr lang="en-US" sz="1400" dirty="0" smtClean="0">
+                <a:latin typeface="Calibri" pitchFamily="34" charset="0"/>
+              </a:rPr>
+              <a:t>                                                                                                                                              </a:t>
             </a:r>
             <a:r>
               <a:rPr lang="en-US" sz="2000" dirty="0" smtClean="0">
                 <a:latin typeface="Calibri" pitchFamily="34" charset="0"/>
               </a:rPr>
-              <a:t>2 Products tested in 8 States totals 4394 </a:t>
-            </a:r>
-            <a:r>
-              <a:rPr lang="en-US" sz="2000" dirty="0">
+              <a:t>1 </a:t>
+            </a:r>
+            <a:r>
+              <a:rPr lang="en-US" sz="2000" dirty="0" smtClean="0">
                 <a:latin typeface="Calibri" pitchFamily="34" charset="0"/>
               </a:rPr>
-              <a:t>tests</a:t>
-            </a:r>
+              <a:t>Product tested in 7 States totals </a:t>
+            </a:r>
+            <a:r>
+              <a:rPr lang="en-US" sz="2400" dirty="0" smtClean="0">
+                <a:latin typeface="Calibri" pitchFamily="34" charset="0"/>
+              </a:rPr>
+              <a:t>3234 tests</a:t>
+            </a:r>
+            <a:endParaRPr lang="en-US" sz="2000" dirty="0" smtClean="0">
+              <a:latin typeface="Calibri" pitchFamily="34" charset="0"/>
+            </a:endParaRPr>
           </a:p>
           <a:p>
             <a:pPr marL="342900" indent="-342900">
@@ -9704,78 +9920,72 @@
               <a:buChar char="•"/>
             </a:pPr>
             <a:r>
-              <a:rPr lang="en-US" sz="1600" dirty="0" smtClean="0">
+              <a:rPr lang="en-US" sz="1400" b="1" dirty="0" smtClean="0">
                 <a:latin typeface="Calibri" pitchFamily="34" charset="0"/>
               </a:rPr>
-              <a:t>Phase 3 contains 1 product </a:t>
-            </a:r>
-          </a:p>
-          <a:p>
-            <a:pPr marL="342900" indent="-342900">
-              <a:buFont typeface="Arial" panose="020B0604020202020204" pitchFamily="34" charset="0"/>
-              <a:buChar char="•"/>
-            </a:pPr>
+              <a:t>Phase 3 </a:t>
+            </a:r>
+            <a:r>
+              <a:rPr lang="en-US" sz="1400" dirty="0" smtClean="0">
+                <a:latin typeface="Calibri" pitchFamily="34" charset="0"/>
+              </a:rPr>
+              <a:t>contains 1 </a:t>
+            </a:r>
+            <a:r>
+              <a:rPr lang="en-US" sz="1400" dirty="0">
+                <a:latin typeface="Calibri" pitchFamily="34" charset="0"/>
+              </a:rPr>
+              <a:t>products with total  of </a:t>
+            </a:r>
+            <a:r>
+              <a:rPr lang="en-US" sz="1400" dirty="0" smtClean="0">
+                <a:latin typeface="Calibri" pitchFamily="34" charset="0"/>
+              </a:rPr>
+              <a:t>471 functional </a:t>
+            </a:r>
+            <a:r>
+              <a:rPr lang="en-US" sz="1400" dirty="0">
+                <a:latin typeface="Calibri" pitchFamily="34" charset="0"/>
+              </a:rPr>
+              <a:t>tests written.                                                                                  Factoring test data point into the calculation, </a:t>
+            </a:r>
+            <a:r>
+              <a:rPr lang="en-US" sz="1400" dirty="0">
+                <a:latin typeface="Calibri" pitchFamily="34" charset="0"/>
+              </a:rPr>
+              <a:t> </a:t>
+            </a:r>
+            <a:r>
+              <a:rPr lang="en-US" sz="1400" dirty="0" smtClean="0">
+                <a:latin typeface="Calibri" pitchFamily="34" charset="0"/>
+              </a:rPr>
+              <a:t>                                                                                                                             </a:t>
+            </a:r>
             <a:r>
               <a:rPr lang="en-US" sz="2000" dirty="0" smtClean="0">
                 <a:latin typeface="Calibri" pitchFamily="34" charset="0"/>
               </a:rPr>
-              <a:t>1 Product tested in 7 States totals 3234 </a:t>
-            </a:r>
-            <a:r>
-              <a:rPr lang="en-US" sz="2000" dirty="0" smtClean="0">
-                <a:latin typeface="Calibri" pitchFamily="34" charset="0"/>
-              </a:rPr>
-              <a:t>tests</a:t>
-            </a:r>
-          </a:p>
-          <a:p>
-            <a:pPr marL="342900" indent="-342900">
-              <a:buFont typeface="Arial" panose="020B0604020202020204" pitchFamily="34" charset="0"/>
-              <a:buChar char="•"/>
-            </a:pPr>
-            <a:endParaRPr lang="en-US" sz="2000" dirty="0">
-              <a:latin typeface="Calibri" pitchFamily="34" charset="0"/>
-            </a:endParaRPr>
-          </a:p>
-          <a:p>
-            <a:pPr marL="342900" indent="-342900">
-              <a:buFont typeface="Arial" panose="020B0604020202020204" pitchFamily="34" charset="0"/>
-              <a:buChar char="•"/>
-            </a:pPr>
-            <a:r>
-              <a:rPr lang="en-US" sz="2000" dirty="0" smtClean="0">
-                <a:latin typeface="Calibri" pitchFamily="34" charset="0"/>
-              </a:rPr>
-              <a:t>Phase 3 contains 1 product </a:t>
-            </a:r>
-            <a:endParaRPr lang="en-US" sz="2000" dirty="0" smtClean="0">
-              <a:latin typeface="Calibri" pitchFamily="34" charset="0"/>
-            </a:endParaRPr>
-          </a:p>
-          <a:p>
-            <a:pPr marL="342900" indent="-342900">
-              <a:buFont typeface="Arial" panose="020B0604020202020204" pitchFamily="34" charset="0"/>
-              <a:buChar char="•"/>
-            </a:pPr>
+              <a:t>1 </a:t>
+            </a:r>
             <a:r>
               <a:rPr lang="en-US" sz="2000" dirty="0">
                 <a:latin typeface="Calibri" pitchFamily="34" charset="0"/>
               </a:rPr>
-              <a:t>1 Product tested in 7 States totals 3234 tests</a:t>
-            </a:r>
-          </a:p>
-          <a:p>
-            <a:endParaRPr lang="en-US" sz="2000" dirty="0">
-              <a:latin typeface="Calibri" pitchFamily="34" charset="0"/>
-            </a:endParaRPr>
-          </a:p>
-          <a:p>
-            <a:endParaRPr lang="en-US" sz="2000" dirty="0">
-              <a:latin typeface="Calibri" pitchFamily="34" charset="0"/>
-            </a:endParaRPr>
-          </a:p>
-          <a:p>
-            <a:endParaRPr lang="en-US" sz="2000" dirty="0">
+              <a:t>Product tested in 7 States totals </a:t>
+            </a:r>
+            <a:r>
+              <a:rPr lang="en-US" sz="2400" dirty="0">
+                <a:latin typeface="Calibri" pitchFamily="34" charset="0"/>
+              </a:rPr>
+              <a:t>3234 </a:t>
+            </a:r>
+            <a:r>
+              <a:rPr lang="en-US" sz="2400" dirty="0" smtClean="0">
+                <a:latin typeface="Calibri" pitchFamily="34" charset="0"/>
+              </a:rPr>
+              <a:t>tests</a:t>
+            </a:r>
+            <a:endParaRPr lang="en-US" sz="2400" dirty="0">
               <a:latin typeface="Calibri" pitchFamily="34" charset="0"/>
             </a:endParaRPr>
           </a:p>

</xml_diff>

<commit_message>
4/19/18 Capture of work
</commit_message>
<xml_diff>
--- a/CurrentWork_Delta/CX_StrategyPowerPoint.pptx
+++ b/CurrentWork_Delta/CX_StrategyPowerPoint.pptx
@@ -154,6 +154,25 @@
       </a:defRPr>
     </a:lvl9pPr>
   </p:defaultTextStyle>
+  <p:extLst>
+    <p:ext uri="{EFAFB233-063F-42B5-8137-9DF3F51BA10A}">
+      <p15:sldGuideLst xmlns:p15="http://schemas.microsoft.com/office/powerpoint/2012/main">
+        <p15:guide id="1" orient="horz" pos="2625">
+          <p15:clr>
+            <a:srgbClr val="A4A3A4"/>
+          </p15:clr>
+        </p15:guide>
+        <p15:guide id="2" pos="2880">
+          <p15:clr>
+            <a:srgbClr val="A4A3A4"/>
+          </p15:clr>
+        </p15:guide>
+      </p15:sldGuideLst>
+    </p:ext>
+    <p:ext uri="{2D200454-40CA-4A62-9FC3-DE9A4176ACB9}">
+      <p15:notesGuideLst xmlns:p15="http://schemas.microsoft.com/office/powerpoint/2012/main"/>
+    </p:ext>
+  </p:extLst>
 </p:presentation>
 </file>
 
@@ -266,7 +285,7 @@
               <a:pPr>
                 <a:defRPr/>
               </a:pPr>
-              <a:t>4/17/2018</a:t>
+              <a:t>4/19/2018</a:t>
             </a:fld>
             <a:endParaRPr lang="en-US"/>
           </a:p>
@@ -460,6 +479,11 @@
         </p:txBody>
       </p:sp>
     </p:spTree>
+    <p:extLst>
+      <p:ext uri="{BB962C8B-B14F-4D97-AF65-F5344CB8AC3E}">
+        <p14:creationId xmlns:p14="http://schemas.microsoft.com/office/powerpoint/2010/main" val="3086307207"/>
+      </p:ext>
+    </p:extLst>
   </p:cSld>
   <p:clrMap bg1="lt1" tx1="dk1" bg2="lt2" tx2="dk2" accent1="accent1" accent2="accent2" accent3="accent3" accent4="accent4" accent5="accent5" accent6="accent6" hlink="hlink" folHlink="folHlink"/>
   <p:notesStyle>
@@ -712,6 +736,11 @@
         </p:txBody>
       </p:sp>
     </p:spTree>
+    <p:extLst>
+      <p:ext uri="{BB962C8B-B14F-4D97-AF65-F5344CB8AC3E}">
+        <p14:creationId xmlns:p14="http://schemas.microsoft.com/office/powerpoint/2010/main" val="208588175"/>
+      </p:ext>
+    </p:extLst>
   </p:cSld>
   <p:clrMapOvr>
     <a:masterClrMapping/>
@@ -844,6 +873,11 @@
         </p:txBody>
       </p:sp>
     </p:spTree>
+    <p:extLst>
+      <p:ext uri="{BB962C8B-B14F-4D97-AF65-F5344CB8AC3E}">
+        <p14:creationId xmlns:p14="http://schemas.microsoft.com/office/powerpoint/2010/main" val="1832979780"/>
+      </p:ext>
+    </p:extLst>
   </p:cSld>
   <p:clrMapOvr>
     <a:masterClrMapping/>
@@ -976,6 +1010,11 @@
         </p:txBody>
       </p:sp>
     </p:spTree>
+    <p:extLst>
+      <p:ext uri="{BB962C8B-B14F-4D97-AF65-F5344CB8AC3E}">
+        <p14:creationId xmlns:p14="http://schemas.microsoft.com/office/powerpoint/2010/main" val="1246303198"/>
+      </p:ext>
+    </p:extLst>
   </p:cSld>
   <p:clrMapOvr>
     <a:masterClrMapping/>
@@ -2412,7 +2451,7 @@
               </a:lnSpc>
             </a:pPr>
             <a:r>
-              <a:rPr lang="en-US" sz="5000">
+              <a:rPr lang="en-US" sz="5000" dirty="0">
                 <a:solidFill>
                   <a:srgbClr val="128BAD"/>
                 </a:solidFill>
@@ -2428,7 +2467,7 @@
               </a:lnSpc>
             </a:pPr>
             <a:r>
-              <a:rPr lang="en-US" sz="5000">
+              <a:rPr lang="en-US" sz="5000" dirty="0">
                 <a:solidFill>
                   <a:srgbClr val="128BAD"/>
                 </a:solidFill>
@@ -3914,212 +3953,89 @@
           </a:p>
         </p:txBody>
       </p:sp>
-      <p:grpSp>
-        <p:nvGrpSpPr>
-          <p:cNvPr id="23578" name="Group 26"/>
-          <p:cNvGrpSpPr>
-            <a:grpSpLocks/>
-          </p:cNvGrpSpPr>
-          <p:nvPr/>
-        </p:nvGrpSpPr>
-        <p:grpSpPr bwMode="auto">
-          <a:xfrm>
-            <a:off x="3322638" y="3698875"/>
-            <a:ext cx="5240337" cy="2622550"/>
-            <a:chOff x="2093" y="2477"/>
-            <a:chExt cx="3301" cy="1652"/>
-          </a:xfrm>
-        </p:grpSpPr>
-        <p:pic>
-          <p:nvPicPr>
-            <p:cNvPr id="23556" name="Picture 1"/>
-            <p:cNvPicPr>
-              <a:picLocks noChangeAspect="1"/>
-            </p:cNvPicPr>
-            <p:nvPr/>
-          </p:nvPicPr>
-          <p:blipFill>
-            <a:blip r:embed="rId2"/>
-            <a:srcRect/>
-            <a:stretch>
-              <a:fillRect/>
-            </a:stretch>
-          </p:blipFill>
-          <p:spPr bwMode="auto">
-            <a:xfrm>
-              <a:off x="3118" y="2477"/>
-              <a:ext cx="2276" cy="1652"/>
-            </a:xfrm>
-            <a:prstGeom prst="rect">
-              <a:avLst/>
-            </a:prstGeom>
-            <a:noFill/>
-            <a:ln w="9525">
-              <a:noFill/>
-              <a:miter lim="800000"/>
-              <a:headEnd/>
-              <a:tailEnd/>
-            </a:ln>
-          </p:spPr>
-        </p:pic>
-        <p:sp>
-          <p:nvSpPr>
-            <p:cNvPr id="2" name="Left Brace 1"/>
-            <p:cNvSpPr/>
-            <p:nvPr/>
-          </p:nvSpPr>
-          <p:spPr>
-            <a:xfrm>
-              <a:off x="2890" y="2861"/>
-              <a:ext cx="120" cy="341"/>
-            </a:xfrm>
-            <a:prstGeom prst="leftBrace">
-              <a:avLst/>
-            </a:prstGeom>
-          </p:spPr>
-          <p:style>
-            <a:lnRef idx="2">
-              <a:schemeClr val="accent1"/>
-            </a:lnRef>
-            <a:fillRef idx="0">
-              <a:schemeClr val="accent1"/>
-            </a:fillRef>
-            <a:effectRef idx="1">
-              <a:schemeClr val="accent1"/>
-            </a:effectRef>
-            <a:fontRef idx="minor">
-              <a:schemeClr val="tx1"/>
-            </a:fontRef>
-          </p:style>
-          <p:txBody>
-            <a:bodyPr anchor="ctr"/>
-            <a:lstStyle/>
-            <a:p>
-              <a:pPr algn="ctr">
-                <a:defRPr/>
-              </a:pPr>
-              <a:endParaRPr lang="en-US"/>
-            </a:p>
-          </p:txBody>
-        </p:sp>
-        <p:sp>
-          <p:nvSpPr>
-            <p:cNvPr id="8" name="Left Brace 7"/>
-            <p:cNvSpPr/>
-            <p:nvPr/>
-          </p:nvSpPr>
-          <p:spPr>
-            <a:xfrm>
-              <a:off x="2894" y="3379"/>
-              <a:ext cx="120" cy="711"/>
-            </a:xfrm>
-            <a:prstGeom prst="leftBrace">
-              <a:avLst/>
-            </a:prstGeom>
-          </p:spPr>
-          <p:style>
-            <a:lnRef idx="2">
-              <a:schemeClr val="accent1"/>
-            </a:lnRef>
-            <a:fillRef idx="0">
-              <a:schemeClr val="accent1"/>
-            </a:fillRef>
-            <a:effectRef idx="1">
-              <a:schemeClr val="accent1"/>
-            </a:effectRef>
-            <a:fontRef idx="minor">
-              <a:schemeClr val="tx1"/>
-            </a:fontRef>
-          </p:style>
-          <p:txBody>
-            <a:bodyPr anchor="ctr"/>
-            <a:lstStyle/>
-            <a:p>
-              <a:pPr algn="ctr">
-                <a:defRPr/>
-              </a:pPr>
-              <a:endParaRPr lang="en-US"/>
-            </a:p>
-          </p:txBody>
-        </p:sp>
-        <p:sp>
-          <p:nvSpPr>
-            <p:cNvPr id="23559" name="TextBox 3"/>
-            <p:cNvSpPr txBox="1">
-              <a:spLocks noChangeArrowheads="1"/>
-            </p:cNvSpPr>
-            <p:nvPr/>
-          </p:nvSpPr>
-          <p:spPr bwMode="auto">
-            <a:xfrm>
-              <a:off x="2093" y="2802"/>
-              <a:ext cx="833" cy="482"/>
-            </a:xfrm>
-            <a:prstGeom prst="rect">
-              <a:avLst/>
-            </a:prstGeom>
-            <a:noFill/>
-            <a:ln w="9525">
-              <a:noFill/>
-              <a:miter lim="800000"/>
-              <a:headEnd/>
-              <a:tailEnd/>
-            </a:ln>
-          </p:spPr>
-          <p:txBody>
-            <a:bodyPr>
-              <a:spAutoFit/>
-            </a:bodyPr>
-            <a:lstStyle/>
-            <a:p>
-              <a:r>
-                <a:rPr lang="en-US" sz="1100"/>
-                <a:t>Development Engineers Focus Attention on this layer for testing</a:t>
-              </a:r>
-            </a:p>
-          </p:txBody>
-        </p:sp>
-        <p:sp>
-          <p:nvSpPr>
-            <p:cNvPr id="23560" name="TextBox 10"/>
-            <p:cNvSpPr txBox="1">
-              <a:spLocks noChangeArrowheads="1"/>
-            </p:cNvSpPr>
-            <p:nvPr/>
-          </p:nvSpPr>
-          <p:spPr bwMode="auto">
-            <a:xfrm>
-              <a:off x="2163" y="3447"/>
-              <a:ext cx="731" cy="588"/>
-            </a:xfrm>
-            <a:prstGeom prst="rect">
-              <a:avLst/>
-            </a:prstGeom>
-            <a:noFill/>
-            <a:ln w="9525">
-              <a:noFill/>
-              <a:miter lim="800000"/>
-              <a:headEnd/>
-              <a:tailEnd/>
-            </a:ln>
-          </p:spPr>
-          <p:txBody>
-            <a:bodyPr>
-              <a:spAutoFit/>
-            </a:bodyPr>
-            <a:lstStyle/>
-            <a:p>
-              <a:r>
-                <a:rPr lang="en-US" sz="1100"/>
-                <a:t>NextGen Test Automation  staff enhance and improve these layers</a:t>
-              </a:r>
-            </a:p>
-          </p:txBody>
-        </p:sp>
-      </p:grpSp>
       <p:sp>
         <p:nvSpPr>
-          <p:cNvPr id="23579" name="Text Box 27"/>
+          <p:cNvPr id="2" name="Left Brace 1"/>
+          <p:cNvSpPr/>
+          <p:nvPr/>
+        </p:nvSpPr>
+        <p:spPr bwMode="auto">
+          <a:xfrm>
+            <a:off x="4699000" y="4316412"/>
+            <a:ext cx="184923" cy="671513"/>
+          </a:xfrm>
+          <a:prstGeom prst="leftBrace">
+            <a:avLst/>
+          </a:prstGeom>
+        </p:spPr>
+        <p:style>
+          <a:lnRef idx="2">
+            <a:schemeClr val="accent1"/>
+          </a:lnRef>
+          <a:fillRef idx="0">
+            <a:schemeClr val="accent1"/>
+          </a:fillRef>
+          <a:effectRef idx="1">
+            <a:schemeClr val="accent1"/>
+          </a:effectRef>
+          <a:fontRef idx="minor">
+            <a:schemeClr val="tx1"/>
+          </a:fontRef>
+        </p:style>
+        <p:txBody>
+          <a:bodyPr anchor="ctr"/>
+          <a:lstStyle/>
+          <a:p>
+            <a:pPr algn="ctr">
+              <a:defRPr/>
+            </a:pPr>
+            <a:endParaRPr lang="en-US"/>
+          </a:p>
+        </p:txBody>
+      </p:sp>
+      <p:sp>
+        <p:nvSpPr>
+          <p:cNvPr id="8" name="Left Brace 7"/>
+          <p:cNvSpPr/>
+          <p:nvPr/>
+        </p:nvSpPr>
+        <p:spPr bwMode="auto">
+          <a:xfrm>
+            <a:off x="4705350" y="5138739"/>
+            <a:ext cx="190500" cy="805952"/>
+          </a:xfrm>
+          <a:prstGeom prst="leftBrace">
+            <a:avLst/>
+          </a:prstGeom>
+        </p:spPr>
+        <p:style>
+          <a:lnRef idx="2">
+            <a:schemeClr val="accent1"/>
+          </a:lnRef>
+          <a:fillRef idx="0">
+            <a:schemeClr val="accent1"/>
+          </a:fillRef>
+          <a:effectRef idx="1">
+            <a:schemeClr val="accent1"/>
+          </a:effectRef>
+          <a:fontRef idx="minor">
+            <a:schemeClr val="tx1"/>
+          </a:fontRef>
+        </p:style>
+        <p:txBody>
+          <a:bodyPr anchor="ctr"/>
+          <a:lstStyle/>
+          <a:p>
+            <a:pPr algn="ctr">
+              <a:defRPr/>
+            </a:pPr>
+            <a:endParaRPr lang="en-US"/>
+          </a:p>
+        </p:txBody>
+      </p:sp>
+      <p:sp>
+        <p:nvSpPr>
+          <p:cNvPr id="23559" name="TextBox 3"/>
           <p:cNvSpPr txBox="1">
             <a:spLocks noChangeArrowheads="1"/>
           </p:cNvSpPr>
@@ -4127,38 +4043,194 @@
         </p:nvSpPr>
         <p:spPr bwMode="auto">
           <a:xfrm>
-            <a:off x="4784725" y="6329363"/>
-            <a:ext cx="3778250" cy="366712"/>
+            <a:off x="3268663" y="4222751"/>
+            <a:ext cx="1487487" cy="765175"/>
           </a:xfrm>
           <a:prstGeom prst="rect">
             <a:avLst/>
           </a:prstGeom>
-          <a:solidFill>
-            <a:srgbClr val="C0C0C0"/>
-          </a:solidFill>
+          <a:noFill/>
           <a:ln w="9525">
             <a:noFill/>
             <a:miter lim="800000"/>
             <a:headEnd/>
             <a:tailEnd/>
           </a:ln>
-          <a:effectLst/>
         </p:spPr>
         <p:txBody>
-          <a:bodyPr>
+          <a:bodyPr wrap="square">
             <a:spAutoFit/>
           </a:bodyPr>
           <a:lstStyle/>
           <a:p>
-            <a:pPr algn="ctr" defTabSz="914400">
-              <a:spcBef>
-                <a:spcPct val="50000"/>
-              </a:spcBef>
-            </a:pPr>
-            <a:r>
-              <a:rPr lang="en-US"/>
-              <a:t>Micro Service APIs</a:t>
-            </a:r>
+            <a:r>
+              <a:rPr lang="en-US" sz="1100" dirty="0"/>
+              <a:t>Development Engineers Focus Attention on this layer for testing</a:t>
+            </a:r>
+          </a:p>
+        </p:txBody>
+      </p:sp>
+      <p:sp>
+        <p:nvSpPr>
+          <p:cNvPr id="23560" name="TextBox 10"/>
+          <p:cNvSpPr txBox="1">
+            <a:spLocks noChangeArrowheads="1"/>
+          </p:cNvSpPr>
+          <p:nvPr/>
+        </p:nvSpPr>
+        <p:spPr bwMode="auto">
+          <a:xfrm>
+            <a:off x="3268663" y="5081588"/>
+            <a:ext cx="1487487" cy="769441"/>
+          </a:xfrm>
+          <a:prstGeom prst="rect">
+            <a:avLst/>
+          </a:prstGeom>
+          <a:noFill/>
+          <a:ln w="9525">
+            <a:noFill/>
+            <a:miter lim="800000"/>
+            <a:headEnd/>
+            <a:tailEnd/>
+          </a:ln>
+        </p:spPr>
+        <p:txBody>
+          <a:bodyPr wrap="square">
+            <a:spAutoFit/>
+          </a:bodyPr>
+          <a:lstStyle/>
+          <a:p>
+            <a:r>
+              <a:rPr lang="en-US" sz="1100" dirty="0"/>
+              <a:t>NextGen </a:t>
+            </a:r>
+            <a:endParaRPr lang="en-US" sz="1100" dirty="0" smtClean="0"/>
+          </a:p>
+          <a:p>
+            <a:r>
+              <a:rPr lang="en-US" sz="1100" dirty="0" smtClean="0"/>
+              <a:t>Test </a:t>
+            </a:r>
+            <a:r>
+              <a:rPr lang="en-US" sz="1100" dirty="0"/>
+              <a:t>Automation  staff enhance and improve these layers</a:t>
+            </a:r>
+          </a:p>
+        </p:txBody>
+      </p:sp>
+      <p:pic>
+        <p:nvPicPr>
+          <p:cNvPr id="4" name="Picture 3"/>
+          <p:cNvPicPr>
+            <a:picLocks noChangeAspect="1"/>
+          </p:cNvPicPr>
+          <p:nvPr/>
+        </p:nvPicPr>
+        <p:blipFill>
+          <a:blip r:embed="rId2">
+            <a:extLst>
+              <a:ext uri="{28A0092B-C50C-407E-A947-70E740481C1C}">
+                <a14:useLocalDpi xmlns:a14="http://schemas.microsoft.com/office/drawing/2010/main" val="0"/>
+              </a:ext>
+            </a:extLst>
+          </a:blip>
+          <a:stretch>
+            <a:fillRect/>
+          </a:stretch>
+        </p:blipFill>
+        <p:spPr>
+          <a:xfrm>
+            <a:off x="5023623" y="3703229"/>
+            <a:ext cx="3784114" cy="2992539"/>
+          </a:xfrm>
+          <a:prstGeom prst="rect">
+            <a:avLst/>
+          </a:prstGeom>
+        </p:spPr>
+      </p:pic>
+      <p:sp>
+        <p:nvSpPr>
+          <p:cNvPr id="14" name="Left Brace 13"/>
+          <p:cNvSpPr/>
+          <p:nvPr/>
+        </p:nvSpPr>
+        <p:spPr bwMode="auto">
+          <a:xfrm>
+            <a:off x="4705350" y="6143248"/>
+            <a:ext cx="190500" cy="552520"/>
+          </a:xfrm>
+          <a:prstGeom prst="leftBrace">
+            <a:avLst/>
+          </a:prstGeom>
+        </p:spPr>
+        <p:style>
+          <a:lnRef idx="2">
+            <a:schemeClr val="accent1"/>
+          </a:lnRef>
+          <a:fillRef idx="0">
+            <a:schemeClr val="accent1"/>
+          </a:fillRef>
+          <a:effectRef idx="1">
+            <a:schemeClr val="accent1"/>
+          </a:effectRef>
+          <a:fontRef idx="minor">
+            <a:schemeClr val="tx1"/>
+          </a:fontRef>
+        </p:style>
+        <p:txBody>
+          <a:bodyPr anchor="ctr"/>
+          <a:lstStyle/>
+          <a:p>
+            <a:pPr algn="ctr">
+              <a:defRPr/>
+            </a:pPr>
+            <a:endParaRPr lang="en-US"/>
+          </a:p>
+        </p:txBody>
+      </p:sp>
+      <p:sp>
+        <p:nvSpPr>
+          <p:cNvPr id="15" name="TextBox 10"/>
+          <p:cNvSpPr txBox="1">
+            <a:spLocks noChangeArrowheads="1"/>
+          </p:cNvSpPr>
+          <p:nvPr/>
+        </p:nvSpPr>
+        <p:spPr bwMode="auto">
+          <a:xfrm>
+            <a:off x="2630519" y="6095504"/>
+            <a:ext cx="2096528" cy="600164"/>
+          </a:xfrm>
+          <a:prstGeom prst="rect">
+            <a:avLst/>
+          </a:prstGeom>
+          <a:noFill/>
+          <a:ln w="9525">
+            <a:noFill/>
+            <a:miter lim="800000"/>
+            <a:headEnd/>
+            <a:tailEnd/>
+          </a:ln>
+        </p:spPr>
+        <p:txBody>
+          <a:bodyPr wrap="square">
+            <a:spAutoFit/>
+          </a:bodyPr>
+          <a:lstStyle/>
+          <a:p>
+            <a:r>
+              <a:rPr lang="en-US" sz="1100" dirty="0"/>
+              <a:t>NextGen </a:t>
+            </a:r>
+            <a:r>
+              <a:rPr lang="en-US" sz="1100" dirty="0"/>
+              <a:t> </a:t>
+            </a:r>
+            <a:r>
+              <a:rPr lang="en-US" sz="1100" dirty="0" smtClean="0"/>
+              <a:t>Test Auto to develop and fill out all http layer REST API Automation Testing</a:t>
+            </a:r>
+            <a:endParaRPr lang="en-US" sz="1100" dirty="0"/>
           </a:p>
         </p:txBody>
       </p:sp>
@@ -5026,97 +5098,8 @@
       </p:grpSpPr>
       <p:sp>
         <p:nvSpPr>
-          <p:cNvPr id="26625" name="Title 1"/>
-          <p:cNvSpPr>
-            <a:spLocks noGrp="1"/>
-          </p:cNvSpPr>
-          <p:nvPr>
-            <p:ph type="title"/>
-          </p:nvPr>
-        </p:nvSpPr>
-        <p:spPr>
-          <a:xfrm>
-            <a:off x="512763" y="635000"/>
-            <a:ext cx="7974012" cy="1143000"/>
-          </a:xfrm>
-        </p:spPr>
-        <p:txBody>
-          <a:bodyPr anchor="t"/>
-          <a:lstStyle/>
-          <a:p>
-            <a:pPr eaLnBrk="1" hangingPunct="1"/>
-            <a:r>
-              <a:rPr lang="en-US" sz="3600" smtClean="0">
-                <a:latin typeface="Calibri Light" pitchFamily="34" charset="0"/>
-                <a:cs typeface="Calibri Light" pitchFamily="34" charset="0"/>
-              </a:rPr>
-              <a:t>Market Place  :  </a:t>
-            </a:r>
-            <a:r>
-              <a:rPr lang="en-US" sz="2800" smtClean="0">
-                <a:latin typeface="Calibri Light" pitchFamily="34" charset="0"/>
-                <a:cs typeface="Calibri Light" pitchFamily="34" charset="0"/>
-              </a:rPr>
-              <a:t>Provider Directory :    Other Apps</a:t>
-            </a:r>
-            <a:br>
-              <a:rPr lang="en-US" sz="2800" smtClean="0">
-                <a:latin typeface="Calibri Light" pitchFamily="34" charset="0"/>
-                <a:cs typeface="Calibri Light" pitchFamily="34" charset="0"/>
-              </a:rPr>
-            </a:br>
-            <a:r>
-              <a:rPr lang="en-US" sz="2800" smtClean="0">
-                <a:latin typeface="Calibri Light" pitchFamily="34" charset="0"/>
-                <a:cs typeface="Calibri Light" pitchFamily="34" charset="0"/>
-              </a:rPr>
-              <a:t> </a:t>
-            </a:r>
-            <a:r>
-              <a:rPr lang="en-US" sz="2800" smtClean="0">
-                <a:latin typeface="Bauhaus 93"/>
-                <a:cs typeface="Calibri Light" pitchFamily="34" charset="0"/>
-              </a:rPr>
-              <a:t>  </a:t>
-            </a:r>
-            <a:r>
-              <a:rPr lang="en-US" sz="2800" smtClean="0">
-                <a:latin typeface="Calibri Light" pitchFamily="34" charset="0"/>
-                <a:cs typeface="Calibri Light" pitchFamily="34" charset="0"/>
-              </a:rPr>
-              <a:t>                                 Microservice APIs</a:t>
-            </a:r>
-          </a:p>
-        </p:txBody>
-      </p:sp>
-      <p:pic>
-        <p:nvPicPr>
-          <p:cNvPr id="26626" name="Content Placeholder 6"/>
-          <p:cNvPicPr>
-            <a:picLocks noGrp="1" noChangeAspect="1"/>
-          </p:cNvPicPr>
-          <p:nvPr>
-            <p:ph idx="1"/>
-          </p:nvPr>
-        </p:nvPicPr>
-        <p:blipFill>
-          <a:blip r:embed="rId2"/>
-          <a:srcRect/>
-          <a:stretch>
-            <a:fillRect/>
-          </a:stretch>
-        </p:blipFill>
-        <p:spPr>
-          <a:xfrm>
-            <a:off x="711200" y="1725613"/>
-            <a:ext cx="7975600" cy="3838575"/>
-          </a:xfrm>
-        </p:spPr>
-      </p:pic>
-      <p:sp>
-        <p:nvSpPr>
           <p:cNvPr id="4" name="Title 1">
-            <a:hlinkClick r:id="rId3" action="ppaction://hlinksldjump"/>
+            <a:hlinkClick r:id="rId2" action="ppaction://hlinksldjump"/>
           </p:cNvPr>
           <p:cNvSpPr txBox="1">
             <a:spLocks/>
@@ -5221,53 +5204,35 @@
           </a:p>
         </p:txBody>
       </p:sp>
-      <p:sp>
-        <p:nvSpPr>
-          <p:cNvPr id="26630" name="Text Box 6"/>
-          <p:cNvSpPr txBox="1">
-            <a:spLocks noChangeArrowheads="1"/>
-          </p:cNvSpPr>
-          <p:nvPr/>
-        </p:nvSpPr>
-        <p:spPr bwMode="auto">
+      <p:pic>
+        <p:nvPicPr>
+          <p:cNvPr id="6" name="Content Placeholder 5"/>
+          <p:cNvPicPr>
+            <a:picLocks noGrp="1" noChangeAspect="1"/>
+          </p:cNvPicPr>
+          <p:nvPr>
+            <p:ph idx="1"/>
+          </p:nvPr>
+        </p:nvPicPr>
+        <p:blipFill>
+          <a:blip r:embed="rId3">
+            <a:extLst>
+              <a:ext uri="{28A0092B-C50C-407E-A947-70E740481C1C}">
+                <a14:useLocalDpi xmlns:a14="http://schemas.microsoft.com/office/drawing/2010/main" val="0"/>
+              </a:ext>
+            </a:extLst>
+          </a:blip>
+          <a:stretch>
+            <a:fillRect/>
+          </a:stretch>
+        </p:blipFill>
+        <p:spPr>
           <a:xfrm>
-            <a:off x="1263650" y="5748338"/>
-            <a:ext cx="6265863" cy="404812"/>
+            <a:off x="368299" y="886904"/>
+            <a:ext cx="8485907" cy="5831948"/>
           </a:xfrm>
-          <a:prstGeom prst="rect">
-            <a:avLst/>
-          </a:prstGeom>
-          <a:solidFill>
-            <a:srgbClr val="C0C0C0"/>
-          </a:solidFill>
-          <a:ln w="38100">
-            <a:solidFill>
-              <a:srgbClr val="C0C0C0"/>
-            </a:solidFill>
-            <a:miter lim="800000"/>
-            <a:headEnd/>
-            <a:tailEnd/>
-          </a:ln>
-          <a:effectLst/>
         </p:spPr>
-        <p:txBody>
-          <a:bodyPr>
-            <a:spAutoFit/>
-          </a:bodyPr>
-          <a:lstStyle/>
-          <a:p>
-            <a:pPr algn="ctr" defTabSz="914400">
-              <a:spcBef>
-                <a:spcPct val="50000"/>
-              </a:spcBef>
-            </a:pPr>
-            <a:r>
-              <a:rPr lang="en-US"/>
-              <a:t>Micro Service REST APIs</a:t>
-            </a:r>
-          </a:p>
-        </p:txBody>
-      </p:sp>
+      </p:pic>
     </p:spTree>
   </p:cSld>
   <p:clrMapOvr>
@@ -7950,7 +7915,31 @@
               <a:rPr lang="en-US" sz="1800" b="1" dirty="0" smtClean="0">
                 <a:ea typeface="+mn-ea"/>
               </a:rPr>
-              <a:t>First access REST API and capture data.  Then access PD UI requesting same information.  Compare results</a:t>
+              <a:t>First access REST API and capture data.  Then access </a:t>
+            </a:r>
+            <a:r>
+              <a:rPr lang="en-US" sz="1800" b="1" dirty="0" smtClean="0">
+                <a:ea typeface="+mn-ea"/>
+              </a:rPr>
+              <a:t>Provider Directory </a:t>
+            </a:r>
+            <a:r>
+              <a:rPr lang="en-US" sz="1800" b="1" dirty="0" smtClean="0">
+                <a:ea typeface="+mn-ea"/>
+              </a:rPr>
+              <a:t>requesting same </a:t>
+            </a:r>
+            <a:r>
+              <a:rPr lang="en-US" sz="1800" b="1" dirty="0" smtClean="0">
+                <a:ea typeface="+mn-ea"/>
+              </a:rPr>
+              <a:t>information from the Web Interface,  </a:t>
+            </a:r>
+            <a:r>
+              <a:rPr lang="en-US" sz="1800" b="1" dirty="0" smtClean="0">
+                <a:ea typeface="+mn-ea"/>
+              </a:rPr>
+              <a:t>Compare results</a:t>
             </a:r>
           </a:p>
           <a:p>
@@ -8013,17 +8002,53 @@
               <a:rPr lang="en-US" sz="1900" b="1" dirty="0" smtClean="0">
                 <a:ea typeface="+mn-ea"/>
               </a:rPr>
-              <a:t>No need for another product or framework.  It can all be done in </a:t>
-            </a:r>
-            <a:r>
-              <a:rPr lang="en-US" sz="1800" b="1" dirty="0"/>
-              <a:t>NGTA </a:t>
+              <a:t>No need for another product or </a:t>
             </a:r>
             <a:r>
               <a:rPr lang="en-US" sz="1900" b="1" dirty="0" smtClean="0">
                 <a:ea typeface="+mn-ea"/>
               </a:rPr>
-              <a:t>Framework.</a:t>
+              <a:t>technology.  </a:t>
+            </a:r>
+          </a:p>
+          <a:p>
+            <a:pPr marL="862013" lvl="1" indent="-285750" eaLnBrk="1" fontAlgn="auto" hangingPunct="1">
+              <a:lnSpc>
+                <a:spcPct val="114000"/>
+              </a:lnSpc>
+              <a:spcBef>
+                <a:spcPts val="0"/>
+              </a:spcBef>
+              <a:spcAft>
+                <a:spcPts val="0"/>
+              </a:spcAft>
+              <a:buFont typeface="Arial" panose="020B0604020202020204" pitchFamily="34" charset="0"/>
+              <a:buChar char="•"/>
+              <a:defRPr/>
+            </a:pPr>
+            <a:r>
+              <a:rPr lang="en-US" sz="1900" b="1" dirty="0" smtClean="0">
+                <a:ea typeface="+mn-ea"/>
+              </a:rPr>
+              <a:t>We use the same Node.js , </a:t>
+            </a:r>
+            <a:r>
+              <a:rPr lang="en-US" sz="1900" b="1" dirty="0" err="1" smtClean="0">
+                <a:ea typeface="+mn-ea"/>
+              </a:rPr>
+              <a:t>Frisby</a:t>
+            </a:r>
+            <a:r>
+              <a:rPr lang="en-US" sz="1900" b="1" dirty="0" smtClean="0">
+                <a:ea typeface="+mn-ea"/>
+              </a:rPr>
+              <a:t> http Library , JavaScript to automate all API calls</a:t>
+            </a:r>
+            <a:r>
+              <a:rPr lang="en-US" sz="1900" b="1" dirty="0" smtClean="0">
+                <a:ea typeface="+mn-ea"/>
+              </a:rPr>
+              <a:t>.</a:t>
             </a:r>
             <a:endParaRPr lang="en-US" sz="1900" b="1" dirty="0">
               <a:ea typeface="+mn-ea"/>
@@ -8156,7 +8181,7 @@
           <a:p>
             <a:pPr algn="ctr" eaLnBrk="1" hangingPunct="1"/>
             <a:r>
-              <a:rPr lang="en-US" sz="4500" smtClean="0">
+              <a:rPr lang="en-US" sz="4500" dirty="0" smtClean="0">
                 <a:latin typeface="Calibri Light" pitchFamily="34" charset="0"/>
                 <a:cs typeface="Calibri Light" pitchFamily="34" charset="0"/>
               </a:rPr>
@@ -8165,40 +8190,6 @@
           </a:p>
         </p:txBody>
       </p:sp>
-      <p:pic>
-        <p:nvPicPr>
-          <p:cNvPr id="15362" name="Picture 9">
-            <a:hlinkClick r:id="rId2" action="ppaction://hlinksldjump"/>
-          </p:cNvPr>
-          <p:cNvPicPr>
-            <a:picLocks noChangeAspect="1"/>
-          </p:cNvPicPr>
-          <p:nvPr/>
-        </p:nvPicPr>
-        <p:blipFill>
-          <a:blip r:embed="rId3"/>
-          <a:srcRect/>
-          <a:stretch>
-            <a:fillRect/>
-          </a:stretch>
-        </p:blipFill>
-        <p:spPr bwMode="auto">
-          <a:xfrm>
-            <a:off x="4318000" y="1912938"/>
-            <a:ext cx="4810125" cy="3943350"/>
-          </a:xfrm>
-          <a:prstGeom prst="rect">
-            <a:avLst/>
-          </a:prstGeom>
-          <a:noFill/>
-          <a:ln w="9525">
-            <a:noFill/>
-            <a:miter lim="800000"/>
-            <a:headEnd/>
-            <a:tailEnd/>
-          </a:ln>
-        </p:spPr>
-      </p:pic>
       <p:sp>
         <p:nvSpPr>
           <p:cNvPr id="15363" name="Title 1"/>
@@ -8247,8 +8238,8 @@
         </p:nvSpPr>
         <p:spPr>
           <a:xfrm>
-            <a:off x="273050" y="1338263"/>
-            <a:ext cx="4162425" cy="5178425"/>
+            <a:off x="273051" y="1338263"/>
+            <a:ext cx="4014646" cy="5377169"/>
           </a:xfrm>
           <a:prstGeom prst="rect">
             <a:avLst/>
@@ -8288,7 +8279,7 @@
               <a:buSzPct val="100000"/>
               <a:buFontTx/>
               <a:buBlip>
-                <a:blip r:embed="rId4"/>
+                <a:blip r:embed="rId2"/>
               </a:buBlip>
               <a:defRPr sz="2200" b="0" i="0" kern="1200">
                 <a:solidFill>
@@ -8309,7 +8300,7 @@
               <a:buSzPct val="100000"/>
               <a:buFontTx/>
               <a:buBlip>
-                <a:blip r:embed="rId4"/>
+                <a:blip r:embed="rId2"/>
               </a:buBlip>
               <a:defRPr sz="2000" b="0" i="0" kern="1200">
                 <a:solidFill>
@@ -8330,7 +8321,7 @@
               <a:buSzPct val="100000"/>
               <a:buFontTx/>
               <a:buBlip>
-                <a:blip r:embed="rId4"/>
+                <a:blip r:embed="rId2"/>
               </a:buBlip>
               <a:defRPr sz="1800" b="0" i="0" kern="1200">
                 <a:solidFill>
@@ -8351,7 +8342,7 @@
               <a:buSzPct val="100000"/>
               <a:buFontTx/>
               <a:buBlip>
-                <a:blip r:embed="rId4"/>
+                <a:blip r:embed="rId2"/>
               </a:buBlip>
               <a:defRPr sz="1600" b="0" i="0" kern="1200">
                 <a:solidFill>
@@ -8472,6 +8463,25 @@
             </a:r>
           </a:p>
           <a:p>
+            <a:pPr indent="-234950" fontAlgn="auto">
+              <a:lnSpc>
+                <a:spcPct val="100000"/>
+              </a:lnSpc>
+              <a:spcBef>
+                <a:spcPts val="0"/>
+              </a:spcBef>
+              <a:spcAft>
+                <a:spcPts val="0"/>
+              </a:spcAft>
+              <a:defRPr/>
+            </a:pPr>
+            <a:r>
+              <a:rPr lang="en-US" sz="1800" dirty="0" smtClean="0"/>
+              <a:t>           </a:t>
+            </a:r>
+            <a:endParaRPr lang="en-US" sz="1800" dirty="0" smtClean="0"/>
+          </a:p>
+          <a:p>
             <a:pPr fontAlgn="auto">
               <a:lnSpc>
                 <a:spcPct val="100000"/>
@@ -8487,200 +8497,202 @@
               <a:defRPr/>
             </a:pPr>
             <a:r>
-              <a:rPr lang="en-US" sz="2000" b="1" dirty="0"/>
-              <a:t>Core base level </a:t>
-            </a:r>
-            <a:r>
-              <a:rPr lang="en-US" sz="2000" dirty="0"/>
-              <a:t>classes </a:t>
-            </a:r>
-            <a:r>
-              <a:rPr lang="en-US" sz="2000" dirty="0" smtClean="0"/>
-              <a:t>define    </a:t>
-            </a:r>
-            <a:r>
-              <a:rPr lang="en-US" sz="2000" dirty="0" smtClean="0">
+              <a:rPr lang="en-US" sz="1800" b="1" dirty="0" smtClean="0"/>
+              <a:t>Scripting :</a:t>
+            </a:r>
+            <a:r>
+              <a:rPr lang="en-US" sz="1800" dirty="0" smtClean="0"/>
+              <a:t> </a:t>
+            </a:r>
+            <a:r>
+              <a:rPr lang="en-US" sz="1800" dirty="0"/>
+              <a:t>Collection of actions specific to</a:t>
+            </a:r>
+            <a:r>
+              <a:rPr lang="en-US" sz="1800" dirty="0">
                 <a:solidFill>
                   <a:schemeClr val="bg1"/>
                 </a:solidFill>
               </a:rPr>
-              <a:t> …</a:t>
-            </a:r>
-            <a:r>
-              <a:rPr lang="en-US" sz="2000" dirty="0" smtClean="0"/>
-              <a:t>common components, Fields, </a:t>
-            </a:r>
-            <a:r>
-              <a:rPr lang="en-US" sz="2000" dirty="0" smtClean="0">
+              <a:t> </a:t>
+            </a:r>
+            <a:r>
+              <a:rPr lang="en-US" sz="1800" dirty="0" smtClean="0"/>
+              <a:t>the domain of T</a:t>
+            </a:r>
+            <a:r>
+              <a:rPr lang="en-US" sz="1800" u="sng" dirty="0" smtClean="0"/>
+              <a:t>est</a:t>
+            </a:r>
+            <a:r>
+              <a:rPr lang="en-US" sz="1800" dirty="0" smtClean="0"/>
+              <a:t>.  Built from </a:t>
+            </a:r>
+            <a:r>
+              <a:rPr lang="en-US" sz="1800" dirty="0"/>
+              <a:t>Core &amp; Mid Layer </a:t>
+            </a:r>
+            <a:r>
+              <a:rPr lang="en-US" sz="1800" dirty="0" smtClean="0"/>
+              <a:t>components</a:t>
+            </a:r>
+          </a:p>
+          <a:p>
+            <a:pPr fontAlgn="auto">
+              <a:lnSpc>
+                <a:spcPct val="100000"/>
+              </a:lnSpc>
+              <a:spcBef>
+                <a:spcPts val="0"/>
+              </a:spcBef>
+              <a:spcAft>
+                <a:spcPts val="0"/>
+              </a:spcAft>
+              <a:defRPr/>
+            </a:pPr>
+            <a:r>
+              <a:rPr lang="en-US" sz="900" dirty="0" smtClean="0"/>
+              <a:t>  </a:t>
+            </a:r>
+          </a:p>
+          <a:p>
+            <a:pPr fontAlgn="auto">
+              <a:lnSpc>
+                <a:spcPct val="100000"/>
+              </a:lnSpc>
+              <a:spcBef>
+                <a:spcPts val="0"/>
+              </a:spcBef>
+              <a:spcAft>
+                <a:spcPts val="0"/>
+              </a:spcAft>
+              <a:buFont typeface="Arial" panose="020B0604020202020204" pitchFamily="34" charset="0"/>
+              <a:buChar char="•"/>
+              <a:defRPr/>
+            </a:pPr>
+            <a:r>
+              <a:rPr lang="en-US" sz="1800" b="1" dirty="0" smtClean="0"/>
+              <a:t>Mid Layer </a:t>
+            </a:r>
+            <a:r>
+              <a:rPr lang="en-US" sz="1800" dirty="0" smtClean="0"/>
+              <a:t>: Actions limited to within the </a:t>
+            </a:r>
+            <a:r>
+              <a:rPr lang="en-US" sz="1800" u="sng" dirty="0" smtClean="0"/>
+              <a:t>Application</a:t>
+            </a:r>
+            <a:r>
+              <a:rPr lang="en-US" sz="1800" dirty="0" smtClean="0"/>
+              <a:t>, </a:t>
+            </a:r>
+            <a:r>
+              <a:rPr lang="en-US" sz="1800" dirty="0" smtClean="0">
                 <a:solidFill>
                   <a:schemeClr val="bg1"/>
                 </a:solidFill>
               </a:rPr>
-              <a:t>…</a:t>
-            </a:r>
-            <a:r>
-              <a:rPr lang="en-US" sz="2000" dirty="0" smtClean="0"/>
-              <a:t>Buttons, Links</a:t>
-            </a:r>
-          </a:p>
-          <a:p>
-            <a:pPr indent="-234950" fontAlgn="auto">
-              <a:lnSpc>
-                <a:spcPct val="100000"/>
-              </a:lnSpc>
-              <a:spcBef>
-                <a:spcPts val="0"/>
-              </a:spcBef>
-              <a:spcAft>
-                <a:spcPts val="0"/>
-              </a:spcAft>
-              <a:defRPr/>
-            </a:pPr>
-            <a:r>
-              <a:rPr lang="en-US" sz="2000" dirty="0" smtClean="0"/>
-              <a:t>           </a:t>
-            </a:r>
-          </a:p>
-          <a:p>
-            <a:pPr fontAlgn="auto">
-              <a:lnSpc>
-                <a:spcPct val="100000"/>
-              </a:lnSpc>
-              <a:spcBef>
-                <a:spcPts val="0"/>
-              </a:spcBef>
-              <a:spcAft>
-                <a:spcPts val="0"/>
-              </a:spcAft>
-              <a:buFont typeface="Arial" panose="020B0604020202020204" pitchFamily="34" charset="0"/>
-              <a:buChar char="•"/>
-              <a:defRPr/>
-            </a:pPr>
-            <a:r>
-              <a:rPr lang="en-US" sz="2000" b="1" dirty="0" smtClean="0"/>
-              <a:t>Mid Level</a:t>
-            </a:r>
-            <a:r>
-              <a:rPr lang="en-US" sz="2000" dirty="0" smtClean="0"/>
-              <a:t>: Specific to an Application, </a:t>
-            </a:r>
-            <a:r>
-              <a:rPr lang="en-US" sz="2000" dirty="0" smtClean="0">
+              <a:t> </a:t>
+            </a:r>
+            <a:r>
+              <a:rPr lang="en-US" sz="1800" dirty="0" smtClean="0"/>
+              <a:t>Collections built up from base class methods and Protractor to </a:t>
+            </a:r>
+            <a:r>
+              <a:rPr lang="en-US" sz="1800" dirty="0" smtClean="0">
                 <a:solidFill>
                   <a:schemeClr val="bg1"/>
                 </a:solidFill>
               </a:rPr>
-              <a:t>...</a:t>
-            </a:r>
-            <a:r>
-              <a:rPr lang="en-US" sz="2000" dirty="0" smtClean="0"/>
-              <a:t>Collections of bases classes to </a:t>
-            </a:r>
-            <a:r>
-              <a:rPr lang="en-US" sz="2000" dirty="0" smtClean="0">
+              <a:t> </a:t>
+            </a:r>
+            <a:r>
+              <a:rPr lang="en-US" sz="1800" dirty="0"/>
+              <a:t>perform specific </a:t>
+            </a:r>
+            <a:r>
+              <a:rPr lang="en-US" sz="1800" dirty="0">
                 <a:solidFill>
                   <a:schemeClr val="bg1"/>
                 </a:solidFill>
               </a:rPr>
-              <a:t>...</a:t>
-            </a:r>
-            <a:r>
-              <a:rPr lang="en-US" sz="2000" dirty="0" smtClean="0"/>
-              <a:t>perform Application page specific </a:t>
-            </a:r>
-            <a:r>
-              <a:rPr lang="en-US" sz="2000" dirty="0" smtClean="0">
+              <a:t> </a:t>
+            </a:r>
+            <a:r>
+              <a:rPr lang="en-US" sz="1800" dirty="0"/>
+              <a:t>action Application</a:t>
+            </a:r>
+            <a:endParaRPr lang="en-US" sz="1800" dirty="0" smtClean="0"/>
+          </a:p>
+          <a:p>
+            <a:pPr indent="-234950" fontAlgn="auto">
+              <a:lnSpc>
+                <a:spcPct val="100000"/>
+              </a:lnSpc>
+              <a:spcBef>
+                <a:spcPts val="0"/>
+              </a:spcBef>
+              <a:spcAft>
+                <a:spcPts val="0"/>
+              </a:spcAft>
+              <a:defRPr/>
+            </a:pPr>
+            <a:r>
+              <a:rPr lang="en-US" sz="800" dirty="0" smtClean="0"/>
+              <a:t>   </a:t>
+            </a:r>
+            <a:endParaRPr lang="en-US" sz="1800" dirty="0" smtClean="0"/>
+          </a:p>
+          <a:p>
+            <a:pPr fontAlgn="auto">
+              <a:lnSpc>
+                <a:spcPct val="100000"/>
+              </a:lnSpc>
+              <a:spcBef>
+                <a:spcPts val="0"/>
+              </a:spcBef>
+              <a:spcAft>
+                <a:spcPts val="0"/>
+              </a:spcAft>
+              <a:buFont typeface="Arial" panose="020B0604020202020204" pitchFamily="34" charset="0"/>
+              <a:buChar char="•"/>
+              <a:defRPr/>
+            </a:pPr>
+            <a:r>
+              <a:rPr lang="en-US" sz="1800" b="1" dirty="0"/>
+              <a:t>Core base level </a:t>
+            </a:r>
+            <a:r>
+              <a:rPr lang="en-US" sz="1800" dirty="0"/>
+              <a:t>classes define    </a:t>
+            </a:r>
+            <a:r>
+              <a:rPr lang="en-US" sz="1800" dirty="0">
                 <a:solidFill>
                   <a:schemeClr val="bg1"/>
                 </a:solidFill>
               </a:rPr>
-              <a:t>…</a:t>
-            </a:r>
-            <a:r>
-              <a:rPr lang="en-US" sz="2000" dirty="0" smtClean="0"/>
-              <a:t>action</a:t>
-            </a:r>
-          </a:p>
-          <a:p>
-            <a:pPr indent="-234950" fontAlgn="auto">
-              <a:lnSpc>
-                <a:spcPct val="100000"/>
-              </a:lnSpc>
-              <a:spcBef>
-                <a:spcPts val="0"/>
-              </a:spcBef>
-              <a:spcAft>
-                <a:spcPts val="0"/>
-              </a:spcAft>
-              <a:defRPr/>
-            </a:pPr>
-            <a:r>
-              <a:rPr lang="en-US" sz="900" dirty="0" smtClean="0"/>
-              <a:t>   </a:t>
-            </a:r>
-          </a:p>
-          <a:p>
-            <a:pPr fontAlgn="auto">
-              <a:lnSpc>
-                <a:spcPct val="100000"/>
-              </a:lnSpc>
-              <a:spcBef>
-                <a:spcPts val="0"/>
-              </a:spcBef>
-              <a:spcAft>
-                <a:spcPts val="0"/>
-              </a:spcAft>
-              <a:buFont typeface="Arial" panose="020B0604020202020204" pitchFamily="34" charset="0"/>
-              <a:buChar char="•"/>
-              <a:defRPr/>
-            </a:pPr>
-            <a:r>
-              <a:rPr lang="en-US" sz="2000" b="1" dirty="0"/>
-              <a:t>Script</a:t>
-            </a:r>
-            <a:r>
-              <a:rPr lang="en-US" sz="2000" dirty="0"/>
-              <a:t> </a:t>
-            </a:r>
-            <a:r>
-              <a:rPr lang="en-US" sz="2000" dirty="0" smtClean="0"/>
-              <a:t>Collection of actions specific to</a:t>
-            </a:r>
-            <a:r>
-              <a:rPr lang="en-US" sz="2000" dirty="0" smtClean="0">
+              <a:t>  </a:t>
+            </a:r>
+            <a:r>
+              <a:rPr lang="en-US" sz="1800" dirty="0"/>
+              <a:t>common components, Fields, </a:t>
+            </a:r>
+            <a:r>
+              <a:rPr lang="en-US" sz="1800" dirty="0">
                 <a:solidFill>
                   <a:schemeClr val="bg1"/>
                 </a:solidFill>
               </a:rPr>
-              <a:t> …</a:t>
-            </a:r>
-            <a:r>
-              <a:rPr lang="en-US" sz="2000" dirty="0" smtClean="0"/>
-              <a:t>test actions and </a:t>
-            </a:r>
-            <a:r>
-              <a:rPr lang="en-US" sz="2000" dirty="0"/>
-              <a:t>methods build up </a:t>
-            </a:r>
-            <a:r>
-              <a:rPr lang="en-US" sz="2000" dirty="0" smtClean="0">
-                <a:solidFill>
-                  <a:schemeClr val="bg1"/>
-                </a:solidFill>
-              </a:rPr>
-              <a:t>…</a:t>
-            </a:r>
-            <a:r>
-              <a:rPr lang="en-US" sz="2000" dirty="0" smtClean="0"/>
-              <a:t>from </a:t>
-            </a:r>
-            <a:r>
-              <a:rPr lang="en-US" sz="2000" dirty="0"/>
-              <a:t>Core &amp; Mid Layer components</a:t>
-            </a:r>
-          </a:p>
-          <a:p>
-            <a:pPr marL="341313" lvl="1" indent="0" fontAlgn="auto">
+              <a:t> </a:t>
+            </a:r>
+            <a:r>
+              <a:rPr lang="en-US" sz="1800" dirty="0"/>
+              <a:t>Buttons, Links</a:t>
+            </a:r>
+          </a:p>
+          <a:p>
+            <a:pPr fontAlgn="auto">
               <a:lnSpc>
                 <a:spcPct val="100000"/>
               </a:lnSpc>
@@ -8690,14 +8702,15 @@
               <a:spcAft>
                 <a:spcPts val="0"/>
               </a:spcAft>
-              <a:buFontTx/>
-              <a:buNone/>
-              <a:defRPr/>
-            </a:pPr>
-            <a:endParaRPr lang="en-US" sz="1800" dirty="0" smtClean="0"/>
-          </a:p>
-          <a:p>
-            <a:pPr lvl="1" fontAlgn="auto">
+              <a:defRPr/>
+            </a:pPr>
+            <a:r>
+              <a:rPr lang="en-US" sz="900" dirty="0" smtClean="0"/>
+              <a:t>   </a:t>
+            </a:r>
+          </a:p>
+          <a:p>
+            <a:pPr fontAlgn="auto">
               <a:lnSpc>
                 <a:spcPct val="100000"/>
               </a:lnSpc>
@@ -8711,55 +8724,48 @@
               <a:buChar char="•"/>
               <a:defRPr/>
             </a:pPr>
+            <a:r>
+              <a:rPr lang="en-US" sz="1800" b="1" dirty="0" smtClean="0"/>
+              <a:t>Micro Service REST APIs </a:t>
+            </a:r>
+            <a:r>
+              <a:rPr lang="en-US" sz="1800" dirty="0" smtClean="0"/>
+              <a:t>The underlying mechanism to acquiring persisted data yet decoupled from application</a:t>
+            </a:r>
             <a:endParaRPr lang="en-US" sz="1800" b="1" dirty="0"/>
           </a:p>
         </p:txBody>
       </p:sp>
-      <p:sp>
-        <p:nvSpPr>
-          <p:cNvPr id="15366" name="Text Box 6"/>
-          <p:cNvSpPr txBox="1">
-            <a:spLocks noChangeArrowheads="1"/>
-          </p:cNvSpPr>
+      <p:pic>
+        <p:nvPicPr>
+          <p:cNvPr id="2" name="Picture 1"/>
+          <p:cNvPicPr>
+            <a:picLocks noChangeAspect="1"/>
+          </p:cNvPicPr>
           <p:nvPr/>
-        </p:nvSpPr>
-        <p:spPr bwMode="auto">
+        </p:nvPicPr>
+        <p:blipFill>
+          <a:blip r:embed="rId3">
+            <a:extLst>
+              <a:ext uri="{28A0092B-C50C-407E-A947-70E740481C1C}">
+                <a14:useLocalDpi xmlns:a14="http://schemas.microsoft.com/office/drawing/2010/main" val="0"/>
+              </a:ext>
+            </a:extLst>
+          </a:blip>
+          <a:stretch>
+            <a:fillRect/>
+          </a:stretch>
+        </p:blipFill>
+        <p:spPr>
           <a:xfrm>
-            <a:off x="4318000" y="6038850"/>
-            <a:ext cx="4721225" cy="366713"/>
+            <a:off x="4287696" y="2762862"/>
+            <a:ext cx="4856303" cy="3883743"/>
           </a:xfrm>
           <a:prstGeom prst="rect">
             <a:avLst/>
           </a:prstGeom>
-          <a:solidFill>
-            <a:srgbClr val="C0C0C0"/>
-          </a:solidFill>
-          <a:ln w="9525">
-            <a:noFill/>
-            <a:miter lim="800000"/>
-            <a:headEnd/>
-            <a:tailEnd/>
-          </a:ln>
-          <a:effectLst/>
         </p:spPr>
-        <p:txBody>
-          <a:bodyPr>
-            <a:spAutoFit/>
-          </a:bodyPr>
-          <a:lstStyle/>
-          <a:p>
-            <a:pPr algn="ctr">
-              <a:spcBef>
-                <a:spcPct val="50000"/>
-              </a:spcBef>
-            </a:pPr>
-            <a:r>
-              <a:rPr lang="en-US"/>
-              <a:t>Micro Service APIs</a:t>
-            </a:r>
-          </a:p>
-        </p:txBody>
-      </p:sp>
+      </p:pic>
     </p:spTree>
   </p:cSld>
   <p:clrMapOvr>
@@ -9988,9 +9994,6 @@
               </a:rPr>
               <a:t>   </a:t>
             </a:r>
-            <a:endParaRPr lang="en-US" sz="1200" dirty="0">
-              <a:latin typeface="Calibri" pitchFamily="34" charset="0"/>
-            </a:endParaRPr>
           </a:p>
           <a:p>
             <a:pPr marL="342900" indent="-342900">
@@ -10043,9 +10046,6 @@
               </a:rPr>
               <a:t>     </a:t>
             </a:r>
-            <a:endParaRPr lang="en-US" sz="1200" dirty="0">
-              <a:latin typeface="Calibri" pitchFamily="34" charset="0"/>
-            </a:endParaRPr>
           </a:p>
           <a:p>
             <a:pPr marL="342900" indent="-342900">
@@ -10099,9 +10099,6 @@
               </a:rPr>
               <a:t>     </a:t>
             </a:r>
-            <a:endParaRPr lang="en-US" sz="1200" dirty="0">
-              <a:latin typeface="Calibri" pitchFamily="34" charset="0"/>
-            </a:endParaRPr>
           </a:p>
           <a:p>
             <a:pPr marL="342900" indent="-342900">
@@ -10470,7 +10467,7 @@
   <a:extraClrSchemeLst/>
   <a:extLst>
     <a:ext uri="{05A4C25C-085E-4340-85A3-A5531E510DB2}">
-      <thm15:themeFamily xmlns="" xmlns:thm15="http://schemas.microsoft.com/office/thememl/2012/main" name="Presentation2" id="{E033CE4F-DAC9-4DC1-B085-D07FC0345DDB}" vid="{0783260F-4856-4ED7-B8E5-5C83CC1572CF}"/>
+      <thm15:themeFamily xmlns:thm15="http://schemas.microsoft.com/office/thememl/2012/main" name="Presentation2" id="{E033CE4F-DAC9-4DC1-B085-D07FC0345DDB}" vid="{0783260F-4856-4ED7-B8E5-5C83CC1572CF}"/>
     </a:ext>
   </a:extLst>
 </a:theme>
@@ -10731,7 +10728,7 @@
   <a:extraClrSchemeLst/>
   <a:extLst>
     <a:ext uri="{05A4C25C-085E-4340-85A3-A5531E510DB2}">
-      <thm15:themeFamily xmlns="" xmlns:thm15="http://schemas.microsoft.com/office/thememl/2012/main" name="Office Theme" id="{62F939B6-93AF-4DB8-9C6B-D6C7DFDC589F}" vid="{4A3C46E8-61CC-4603-A589-7422A47A8E4A}"/>
+      <thm15:themeFamily xmlns:thm15="http://schemas.microsoft.com/office/thememl/2012/main" name="Office Theme" id="{62F939B6-93AF-4DB8-9C6B-D6C7DFDC589F}" vid="{4A3C46E8-61CC-4603-A589-7422A47A8E4A}"/>
     </a:ext>
   </a:extLst>
 </a:theme>

</xml_diff>

<commit_message>
4/20 new work and some capture
</commit_message>
<xml_diff>
--- a/CurrentWork_Delta/CX_StrategyPowerPoint.pptx
+++ b/CurrentWork_Delta/CX_StrategyPowerPoint.pptx
@@ -154,25 +154,6 @@
       </a:defRPr>
     </a:lvl9pPr>
   </p:defaultTextStyle>
-  <p:extLst>
-    <p:ext uri="{EFAFB233-063F-42B5-8137-9DF3F51BA10A}">
-      <p15:sldGuideLst xmlns:p15="http://schemas.microsoft.com/office/powerpoint/2012/main">
-        <p15:guide id="1" orient="horz" pos="2625">
-          <p15:clr>
-            <a:srgbClr val="A4A3A4"/>
-          </p15:clr>
-        </p15:guide>
-        <p15:guide id="2" pos="2880">
-          <p15:clr>
-            <a:srgbClr val="A4A3A4"/>
-          </p15:clr>
-        </p15:guide>
-      </p15:sldGuideLst>
-    </p:ext>
-    <p:ext uri="{2D200454-40CA-4A62-9FC3-DE9A4176ACB9}">
-      <p15:notesGuideLst xmlns:p15="http://schemas.microsoft.com/office/powerpoint/2012/main"/>
-    </p:ext>
-  </p:extLst>
 </p:presentation>
 </file>
 
@@ -280,7 +261,7 @@
             <a:pPr>
               <a:defRPr/>
             </a:pPr>
-            <a:fld id="{296A2737-3E21-4BC9-A306-7499E165A9A9}" type="datetimeFigureOut">
+            <a:fld id="{9891D345-2698-4EAC-B442-0FA7C3411E40}" type="datetimeFigureOut">
               <a:rPr lang="en-US"/>
               <a:pPr>
                 <a:defRPr/>
@@ -467,7 +448,7 @@
             <a:pPr>
               <a:defRPr/>
             </a:pPr>
-            <a:fld id="{87A28B5A-382F-4EA8-BD28-49D83C268167}" type="slidenum">
+            <a:fld id="{9BF79859-DFA4-41BF-912D-D1A2D9B8EE8D}" type="slidenum">
               <a:rPr lang="en-US"/>
               <a:pPr>
                 <a:defRPr/>
@@ -479,11 +460,6 @@
         </p:txBody>
       </p:sp>
     </p:spTree>
-    <p:extLst>
-      <p:ext uri="{BB962C8B-B14F-4D97-AF65-F5344CB8AC3E}">
-        <p14:creationId xmlns:p14="http://schemas.microsoft.com/office/powerpoint/2010/main" val="3086307207"/>
-      </p:ext>
-    </p:extLst>
   </p:cSld>
   <p:clrMap bg1="lt1" tx1="dk1" bg2="lt2" tx2="dk2" accent1="accent1" accent2="accent2" accent3="accent3" accent4="accent4" accent5="accent5" accent6="accent6" hlink="hlink" folHlink="folHlink"/>
   <p:notesStyle>
@@ -714,7 +690,7 @@
               </a:spcAft>
               <a:defRPr/>
             </a:pPr>
-            <a:fld id="{FBAB982A-551B-44A9-AA85-FA1C4026229F}" type="slidenum">
+            <a:fld id="{6095778B-777B-43E3-A8E0-BDADB53EF41D}" type="slidenum">
               <a:rPr lang="en-US">
                 <a:cs typeface="Arial" charset="0"/>
               </a:rPr>
@@ -736,11 +712,6 @@
         </p:txBody>
       </p:sp>
     </p:spTree>
-    <p:extLst>
-      <p:ext uri="{BB962C8B-B14F-4D97-AF65-F5344CB8AC3E}">
-        <p14:creationId xmlns:p14="http://schemas.microsoft.com/office/powerpoint/2010/main" val="208588175"/>
-      </p:ext>
-    </p:extLst>
   </p:cSld>
   <p:clrMapOvr>
     <a:masterClrMapping/>
@@ -851,7 +822,7 @@
               </a:spcAft>
               <a:defRPr/>
             </a:pPr>
-            <a:fld id="{E9CA4D86-9ECA-4493-8E2C-0E55AA3AB102}" type="slidenum">
+            <a:fld id="{804D6F54-6BF3-4C8A-A633-8A8472299B9D}" type="slidenum">
               <a:rPr lang="en-US">
                 <a:cs typeface="Arial" charset="0"/>
               </a:rPr>
@@ -873,11 +844,6 @@
         </p:txBody>
       </p:sp>
     </p:spTree>
-    <p:extLst>
-      <p:ext uri="{BB962C8B-B14F-4D97-AF65-F5344CB8AC3E}">
-        <p14:creationId xmlns:p14="http://schemas.microsoft.com/office/powerpoint/2010/main" val="1832979780"/>
-      </p:ext>
-    </p:extLst>
   </p:cSld>
   <p:clrMapOvr>
     <a:masterClrMapping/>
@@ -988,7 +954,7 @@
               </a:spcAft>
               <a:defRPr/>
             </a:pPr>
-            <a:fld id="{3741F209-2C17-4111-B063-30B949873B3A}" type="slidenum">
+            <a:fld id="{34F34C98-E8E8-4866-AE6C-1705C709B3C7}" type="slidenum">
               <a:rPr lang="en-US">
                 <a:cs typeface="Arial" charset="0"/>
               </a:rPr>
@@ -1010,11 +976,6 @@
         </p:txBody>
       </p:sp>
     </p:spTree>
-    <p:extLst>
-      <p:ext uri="{BB962C8B-B14F-4D97-AF65-F5344CB8AC3E}">
-        <p14:creationId xmlns:p14="http://schemas.microsoft.com/office/powerpoint/2010/main" val="1246303198"/>
-      </p:ext>
-    </p:extLst>
   </p:cSld>
   <p:clrMapOvr>
     <a:masterClrMapping/>
@@ -1313,7 +1274,7 @@
             <a:pPr>
               <a:defRPr/>
             </a:pPr>
-            <a:fld id="{D24B49B4-C45E-408E-86FB-1073DA093A12}" type="slidenum">
+            <a:fld id="{8FEEE48F-FE93-4D9D-971A-40BFAF63D6AF}" type="slidenum">
               <a:rPr lang="en-US"/>
               <a:pPr>
                 <a:defRPr/>
@@ -1456,7 +1417,7 @@
             <a:pPr>
               <a:defRPr/>
             </a:pPr>
-            <a:fld id="{7E3FE265-3AC8-4596-B00F-6776C79DF3B1}" type="slidenum">
+            <a:fld id="{E497472A-DF66-4BEA-8DBC-79C106B9631F}" type="slidenum">
               <a:rPr lang="en-US"/>
               <a:pPr>
                 <a:defRPr/>
@@ -1588,7 +1549,7 @@
             <a:pPr>
               <a:defRPr/>
             </a:pPr>
-            <a:fld id="{D4136995-DEAA-41BE-9D17-C2C7B4E065BC}" type="slidenum">
+            <a:fld id="{39FAC7D7-FDC3-4EDD-93F8-3FCEB58BD26C}" type="slidenum">
               <a:rPr lang="en-US"/>
               <a:pPr>
                 <a:defRPr/>
@@ -1646,7 +1607,7 @@
             <a:pPr>
               <a:defRPr/>
             </a:pPr>
-            <a:fld id="{8D240CA0-2B23-43AA-8CC6-B45C15ECF87B}" type="slidenum">
+            <a:fld id="{53F6E5F8-2FE6-49B3-BCAC-24419634ED56}" type="slidenum">
               <a:rPr lang="en-US"/>
               <a:pPr>
                 <a:defRPr/>
@@ -1843,7 +1804,7 @@
             <a:pPr>
               <a:defRPr/>
             </a:pPr>
-            <a:fld id="{F727976D-9333-434F-8A16-69F12111A806}" type="slidenum">
+            <a:fld id="{5F21EA03-5939-40C0-8031-C810CD5AC996}" type="slidenum">
               <a:rPr lang="en-US"/>
               <a:pPr>
                 <a:defRPr/>
@@ -1912,9 +1873,9 @@
   <p:clrMap bg1="lt1" tx1="dk1" bg2="lt2" tx2="dk2" accent1="accent1" accent2="accent2" accent3="accent3" accent4="accent4" accent5="accent5" accent6="accent6" hlink="hlink" folHlink="folHlink"/>
   <p:sldLayoutIdLst>
     <p:sldLayoutId id="2147483653" r:id="rId1"/>
-    <p:sldLayoutId id="2147483650" r:id="rId2"/>
+    <p:sldLayoutId id="2147483652" r:id="rId2"/>
     <p:sldLayoutId id="2147483651" r:id="rId3"/>
-    <p:sldLayoutId id="2147483652" r:id="rId4"/>
+    <p:sldLayoutId id="2147483650" r:id="rId4"/>
   </p:sldLayoutIdLst>
   <p:txStyles>
     <p:titleStyle>
@@ -2373,7 +2334,6 @@
             <a:r>
               <a:rPr lang="en-US" smtClean="0">
                 <a:latin typeface="Calibri Light" pitchFamily="34" charset="0"/>
-                <a:cs typeface="Calibri Light" pitchFamily="34" charset="0"/>
               </a:rPr>
               <a:t>Mark Atkinson</a:t>
             </a:r>
@@ -2451,7 +2411,7 @@
               </a:lnSpc>
             </a:pPr>
             <a:r>
-              <a:rPr lang="en-US" sz="5000" dirty="0">
+              <a:rPr lang="en-US" sz="5000">
                 <a:solidFill>
                   <a:srgbClr val="128BAD"/>
                 </a:solidFill>
@@ -2467,7 +2427,7 @@
               </a:lnSpc>
             </a:pPr>
             <a:r>
-              <a:rPr lang="en-US" sz="5000" dirty="0">
+              <a:rPr lang="en-US" sz="5000">
                 <a:solidFill>
                   <a:srgbClr val="128BAD"/>
                 </a:solidFill>
@@ -2534,7 +2494,6 @@
             <a:r>
               <a:rPr lang="en-US" smtClean="0">
                 <a:latin typeface="Calibri Light" pitchFamily="34" charset="0"/>
-                <a:cs typeface="Calibri Light" pitchFamily="34" charset="0"/>
               </a:rPr>
               <a:t>REPORTING</a:t>
             </a:r>
@@ -2680,9 +2639,9 @@
       </p:sp>
       <p:pic>
         <p:nvPicPr>
-          <p:cNvPr id="19459" name="Picture 3"/>
+          <p:cNvPr id="19463" name="Picture 7" descr="Rpt_SpecHeader"/>
           <p:cNvPicPr>
-            <a:picLocks noChangeAspect="1"/>
+            <a:picLocks noChangeAspect="1" noChangeArrowheads="1"/>
           </p:cNvPicPr>
           <p:nvPr/>
         </p:nvPicPr>
@@ -2695,26 +2654,20 @@
         </p:blipFill>
         <p:spPr bwMode="auto">
           <a:xfrm>
-            <a:off x="4484688" y="942975"/>
-            <a:ext cx="4621212" cy="5745163"/>
+            <a:off x="576263" y="3884613"/>
+            <a:ext cx="3886200" cy="2149475"/>
           </a:xfrm>
           <a:prstGeom prst="rect">
             <a:avLst/>
           </a:prstGeom>
           <a:noFill/>
-          <a:ln w="9525">
-            <a:noFill/>
-            <a:miter lim="800000"/>
-            <a:headEnd/>
-            <a:tailEnd/>
-          </a:ln>
         </p:spPr>
       </p:pic>
       <p:pic>
         <p:nvPicPr>
-          <p:cNvPr id="19460" name="Picture 4"/>
+          <p:cNvPr id="19464" name="Picture 8" descr="main"/>
           <p:cNvPicPr>
-            <a:picLocks noChangeAspect="1"/>
+            <a:picLocks noChangeAspect="1" noChangeArrowheads="1"/>
           </p:cNvPicPr>
           <p:nvPr/>
         </p:nvPicPr>
@@ -2727,19 +2680,13 @@
         </p:blipFill>
         <p:spPr bwMode="auto">
           <a:xfrm>
-            <a:off x="330200" y="4022725"/>
-            <a:ext cx="4284663" cy="2808288"/>
+            <a:off x="4779963" y="914400"/>
+            <a:ext cx="4364037" cy="5788025"/>
           </a:xfrm>
           <a:prstGeom prst="rect">
             <a:avLst/>
           </a:prstGeom>
           <a:noFill/>
-          <a:ln w="9525">
-            <a:noFill/>
-            <a:miter lim="800000"/>
-            <a:headEnd/>
-            <a:tailEnd/>
-          </a:ln>
         </p:spPr>
       </p:pic>
     </p:spTree>
@@ -2798,7 +2745,6 @@
             <a:r>
               <a:rPr lang="en-US" smtClean="0">
                 <a:latin typeface="Calibri Light" pitchFamily="34" charset="0"/>
-                <a:cs typeface="Calibri Light" pitchFamily="34" charset="0"/>
               </a:rPr>
               <a:t>REPORTING</a:t>
             </a:r>
@@ -2818,7 +2764,7 @@
         <p:spPr>
           <a:xfrm>
             <a:off x="433388" y="914400"/>
-            <a:ext cx="4859337" cy="2336800"/>
+            <a:ext cx="3205162" cy="3735388"/>
           </a:xfrm>
         </p:spPr>
         <p:txBody>
@@ -2920,9 +2866,9 @@
       </p:sp>
       <p:pic>
         <p:nvPicPr>
-          <p:cNvPr id="20483" name="Picture 4"/>
+          <p:cNvPr id="20486" name="Picture 6" descr="secondary"/>
           <p:cNvPicPr>
-            <a:picLocks noChangeAspect="1"/>
+            <a:picLocks noChangeAspect="1" noChangeArrowheads="1"/>
           </p:cNvPicPr>
           <p:nvPr/>
         </p:nvPicPr>
@@ -2935,51 +2881,13 @@
         </p:blipFill>
         <p:spPr bwMode="auto">
           <a:xfrm>
-            <a:off x="5429250" y="831850"/>
-            <a:ext cx="3598863" cy="6026150"/>
+            <a:off x="3638550" y="1073150"/>
+            <a:ext cx="5287963" cy="4313238"/>
           </a:xfrm>
           <a:prstGeom prst="rect">
             <a:avLst/>
           </a:prstGeom>
           <a:noFill/>
-          <a:ln w="9525">
-            <a:noFill/>
-            <a:miter lim="800000"/>
-            <a:headEnd/>
-            <a:tailEnd/>
-          </a:ln>
-        </p:spPr>
-      </p:pic>
-      <p:pic>
-        <p:nvPicPr>
-          <p:cNvPr id="20484" name="Picture 5"/>
-          <p:cNvPicPr>
-            <a:picLocks noChangeAspect="1"/>
-          </p:cNvPicPr>
-          <p:nvPr/>
-        </p:nvPicPr>
-        <p:blipFill>
-          <a:blip r:embed="rId3"/>
-          <a:srcRect/>
-          <a:stretch>
-            <a:fillRect/>
-          </a:stretch>
-        </p:blipFill>
-        <p:spPr bwMode="auto">
-          <a:xfrm>
-            <a:off x="322263" y="3429000"/>
-            <a:ext cx="5081587" cy="2811463"/>
-          </a:xfrm>
-          <a:prstGeom prst="rect">
-            <a:avLst/>
-          </a:prstGeom>
-          <a:noFill/>
-          <a:ln w="9525">
-            <a:noFill/>
-            <a:miter lim="800000"/>
-            <a:headEnd/>
-            <a:tailEnd/>
-          </a:ln>
         </p:spPr>
       </p:pic>
     </p:spTree>
@@ -3038,7 +2946,6 @@
             <a:r>
               <a:rPr lang="en-US" smtClean="0">
                 <a:latin typeface="Calibri Light" pitchFamily="34" charset="0"/>
-                <a:cs typeface="Calibri Light" pitchFamily="34" charset="0"/>
               </a:rPr>
               <a:t>REPORTING</a:t>
             </a:r>
@@ -3073,7 +2980,6 @@
             <a:r>
               <a:rPr lang="en-US" u="sng" smtClean="0">
                 <a:latin typeface="Calibri Light" pitchFamily="34" charset="0"/>
-                <a:cs typeface="Calibri Light" pitchFamily="34" charset="0"/>
               </a:rPr>
               <a:t>Three levels of reporting</a:t>
             </a:r>
@@ -3090,13 +2996,11 @@
             <a:r>
               <a:rPr lang="en-US" sz="700" smtClean="0">
                 <a:latin typeface="Calibri Light" pitchFamily="34" charset="0"/>
-                <a:cs typeface="Calibri Light" pitchFamily="34" charset="0"/>
               </a:rPr>
               <a:t> </a:t>
             </a:r>
             <a:endParaRPr lang="en-US" sz="700" u="sng" smtClean="0">
               <a:latin typeface="Calibri Light" pitchFamily="34" charset="0"/>
-              <a:cs typeface="Calibri Light" pitchFamily="34" charset="0"/>
             </a:endParaRPr>
           </a:p>
           <a:p>
@@ -3107,7 +3011,6 @@
             </a:pPr>
             <a:endParaRPr lang="en-US" b="1" smtClean="0">
               <a:latin typeface="Calibri Light" pitchFamily="34" charset="0"/>
-              <a:cs typeface="Calibri Light" pitchFamily="34" charset="0"/>
             </a:endParaRPr>
           </a:p>
           <a:p>
@@ -3119,7 +3022,6 @@
             <a:r>
               <a:rPr lang="en-US" sz="2500" b="1" u="sng" smtClean="0">
                 <a:latin typeface="Calibri Light" pitchFamily="34" charset="0"/>
-                <a:cs typeface="Calibri Light" pitchFamily="34" charset="0"/>
               </a:rPr>
               <a:t>ASPIRATIONAL PRESENTATION</a:t>
             </a:r>
@@ -3132,7 +3034,6 @@
             </a:pPr>
             <a:endParaRPr lang="en-US" sz="2500" b="1" smtClean="0">
               <a:latin typeface="Calibri Light" pitchFamily="34" charset="0"/>
-              <a:cs typeface="Calibri Light" pitchFamily="34" charset="0"/>
             </a:endParaRPr>
           </a:p>
           <a:p>
@@ -3144,7 +3045,6 @@
             <a:r>
               <a:rPr lang="en-US" b="1" smtClean="0">
                 <a:latin typeface="Calibri Light" pitchFamily="34" charset="0"/>
-                <a:cs typeface="Calibri Light" pitchFamily="34" charset="0"/>
               </a:rPr>
               <a:t>High Level Dashboard</a:t>
             </a:r>
@@ -3158,7 +3058,6 @@
             <a:r>
               <a:rPr lang="en-US" b="1" smtClean="0">
                 <a:latin typeface="Calibri Light" pitchFamily="34" charset="0"/>
-                <a:cs typeface="Calibri Light" pitchFamily="34" charset="0"/>
               </a:rPr>
               <a:t>Product Specific: </a:t>
             </a:r>
@@ -3172,7 +3071,6 @@
             <a:r>
               <a:rPr lang="en-US" sz="500" smtClean="0">
                 <a:latin typeface="Calibri Light" pitchFamily="34" charset="0"/>
-                <a:cs typeface="Calibri Light" pitchFamily="34" charset="0"/>
               </a:rPr>
               <a:t>       </a:t>
             </a:r>
@@ -3186,14 +3084,12 @@
             <a:r>
               <a:rPr lang="en-US" sz="1800" smtClean="0">
                 <a:latin typeface="Calibri Light" pitchFamily="34" charset="0"/>
-                <a:cs typeface="Calibri Light" pitchFamily="34" charset="0"/>
               </a:rPr>
               <a:t>       </a:t>
             </a:r>
             <a:r>
               <a:rPr lang="en-US" sz="1800" b="1" smtClean="0">
                 <a:latin typeface="Calibri Light" pitchFamily="34" charset="0"/>
-                <a:cs typeface="Calibri Light" pitchFamily="34" charset="0"/>
               </a:rPr>
               <a:t>Go / No-go Product  Dashboard</a:t>
             </a:r>
@@ -3206,7 +3102,6 @@
             </a:pPr>
             <a:endParaRPr lang="en-US" sz="1800" b="1" smtClean="0">
               <a:latin typeface="Calibri Light" pitchFamily="34" charset="0"/>
-              <a:cs typeface="Calibri Light" pitchFamily="34" charset="0"/>
             </a:endParaRPr>
           </a:p>
           <a:p>
@@ -3218,7 +3113,6 @@
             <a:r>
               <a:rPr lang="en-US" sz="800" smtClean="0">
                 <a:latin typeface="Calibri Light" pitchFamily="34" charset="0"/>
-                <a:cs typeface="Calibri Light" pitchFamily="34" charset="0"/>
               </a:rPr>
               <a:t>            </a:t>
             </a:r>
@@ -3232,7 +3126,6 @@
             <a:r>
               <a:rPr lang="en-US" b="1" smtClean="0">
                 <a:latin typeface="Calibri Light" pitchFamily="34" charset="0"/>
-                <a:cs typeface="Calibri Light" pitchFamily="34" charset="0"/>
               </a:rPr>
               <a:t>Provides:</a:t>
             </a:r>
@@ -3248,7 +3141,6 @@
             <a:r>
               <a:rPr lang="en-US" b="1" smtClean="0">
                 <a:latin typeface="Calibri Light" pitchFamily="34" charset="0"/>
-                <a:cs typeface="Calibri Light" pitchFamily="34" charset="0"/>
               </a:rPr>
               <a:t>Development Managers &amp;</a:t>
             </a:r>
@@ -3264,7 +3156,6 @@
             <a:r>
               <a:rPr lang="en-US" b="1" smtClean="0">
                 <a:latin typeface="Calibri Light" pitchFamily="34" charset="0"/>
-                <a:cs typeface="Calibri Light" pitchFamily="34" charset="0"/>
               </a:rPr>
               <a:t>Product Managers A quick look at the current health and capability to ship the product </a:t>
             </a:r>
@@ -3273,9 +3164,9 @@
       </p:sp>
       <p:pic>
         <p:nvPicPr>
-          <p:cNvPr id="21507" name="Picture 3"/>
+          <p:cNvPr id="21510" name="Picture 6" descr="TestRptProdProto"/>
           <p:cNvPicPr>
-            <a:picLocks noChangeAspect="1"/>
+            <a:picLocks noChangeAspect="1" noChangeArrowheads="1"/>
           </p:cNvPicPr>
           <p:nvPr/>
         </p:nvPicPr>
@@ -3288,19 +3179,13 @@
         </p:blipFill>
         <p:spPr bwMode="auto">
           <a:xfrm>
-            <a:off x="4468813" y="865188"/>
-            <a:ext cx="4675187" cy="5992812"/>
+            <a:off x="4857750" y="836613"/>
+            <a:ext cx="4090988" cy="5875337"/>
           </a:xfrm>
           <a:prstGeom prst="rect">
             <a:avLst/>
           </a:prstGeom>
           <a:noFill/>
-          <a:ln w="9525">
-            <a:noFill/>
-            <a:miter lim="800000"/>
-            <a:headEnd/>
-            <a:tailEnd/>
-          </a:ln>
         </p:spPr>
       </p:pic>
     </p:spTree>
@@ -3359,7 +3244,6 @@
             <a:r>
               <a:rPr lang="en-US" smtClean="0">
                 <a:latin typeface="Calibri Light" pitchFamily="34" charset="0"/>
-                <a:cs typeface="Calibri Light" pitchFamily="34" charset="0"/>
               </a:rPr>
               <a:t>FUTURE</a:t>
             </a:r>
@@ -3393,7 +3277,6 @@
             <a:r>
               <a:rPr lang="en-US" sz="2000" smtClean="0">
                 <a:latin typeface="Calibri Light" pitchFamily="34" charset="0"/>
-                <a:cs typeface="Calibri Light" pitchFamily="34" charset="0"/>
               </a:rPr>
               <a:t>Roll Out Framework to Development </a:t>
             </a:r>
@@ -3406,7 +3289,6 @@
             <a:r>
               <a:rPr lang="en-US" sz="2000" smtClean="0">
                 <a:latin typeface="Calibri Light" pitchFamily="34" charset="0"/>
-                <a:cs typeface="Calibri Light" pitchFamily="34" charset="0"/>
               </a:rPr>
               <a:t>Refactor Object layer commonality.  </a:t>
             </a:r>
@@ -3419,7 +3301,6 @@
             <a:r>
               <a:rPr lang="en-US" sz="2000" smtClean="0">
                 <a:latin typeface="Calibri Light" pitchFamily="34" charset="0"/>
-                <a:cs typeface="Calibri Light" pitchFamily="34" charset="0"/>
               </a:rPr>
               <a:t>Move commonality to the Base Layer. </a:t>
             </a:r>
@@ -3432,13 +3313,11 @@
             <a:r>
               <a:rPr lang="en-US" sz="1600" smtClean="0">
                 <a:latin typeface="Calibri Light" pitchFamily="34" charset="0"/>
-                <a:cs typeface="Calibri Light" pitchFamily="34" charset="0"/>
               </a:rPr>
               <a:t>The smaller the object layer, the easier to add new capability ( new applications )</a:t>
             </a:r>
             <a:endParaRPr lang="en-US" sz="1800" smtClean="0">
               <a:latin typeface="Calibri Light" pitchFamily="34" charset="0"/>
-              <a:cs typeface="Calibri Light" pitchFamily="34" charset="0"/>
             </a:endParaRPr>
           </a:p>
           <a:p>
@@ -3449,7 +3328,6 @@
             <a:r>
               <a:rPr lang="en-US" sz="2000" smtClean="0">
                 <a:latin typeface="Calibri Light" pitchFamily="34" charset="0"/>
-                <a:cs typeface="Calibri Light" pitchFamily="34" charset="0"/>
               </a:rPr>
               <a:t>Improve top of Object layer making more uniform</a:t>
             </a:r>
@@ -3462,7 +3340,6 @@
             <a:r>
               <a:rPr lang="en-US" sz="1600" smtClean="0">
                 <a:latin typeface="Calibri Light" pitchFamily="34" charset="0"/>
-                <a:cs typeface="Calibri Light" pitchFamily="34" charset="0"/>
               </a:rPr>
               <a:t>The smoother the top of the object layer, the easier to write test cases</a:t>
             </a:r>
@@ -3471,7 +3348,6 @@
             <a:pPr marL="919163" lvl="1" indent="-342900" eaLnBrk="1" hangingPunct="1"/>
             <a:endParaRPr lang="en-US" sz="1800" smtClean="0">
               <a:latin typeface="Calibri Light" pitchFamily="34" charset="0"/>
-              <a:cs typeface="Calibri Light" pitchFamily="34" charset="0"/>
             </a:endParaRPr>
           </a:p>
           <a:p>
@@ -3482,7 +3358,6 @@
             <a:r>
               <a:rPr lang="en-US" sz="1800" smtClean="0">
                 <a:latin typeface="Calibri Light" pitchFamily="34" charset="0"/>
-                <a:cs typeface="Calibri Light" pitchFamily="34" charset="0"/>
               </a:rPr>
               <a:t>Decouple function calls in the upper layer from in the bottom layer and below </a:t>
             </a:r>
@@ -3495,7 +3370,6 @@
             <a:r>
               <a:rPr lang="en-US" sz="1600" smtClean="0">
                 <a:latin typeface="Calibri Light" pitchFamily="34" charset="0"/>
-                <a:cs typeface="Calibri Light" pitchFamily="34" charset="0"/>
               </a:rPr>
               <a:t>Keep calls to Protractor in the mid Layer ( page Objects )</a:t>
             </a:r>
@@ -3508,7 +3382,6 @@
             <a:r>
               <a:rPr lang="en-US" sz="1600" smtClean="0">
                 <a:latin typeface="Calibri Light" pitchFamily="34" charset="0"/>
-                <a:cs typeface="Calibri Light" pitchFamily="34" charset="0"/>
               </a:rPr>
               <a:t>Work in localized well isolated areas.  Keep the churn away from the dev engineers</a:t>
             </a:r>
@@ -3518,7 +3391,6 @@
             <a:r>
               <a:rPr lang="en-US" sz="800" smtClean="0">
                 <a:latin typeface="Calibri Light" pitchFamily="34" charset="0"/>
-                <a:cs typeface="Calibri Light" pitchFamily="34" charset="0"/>
               </a:rPr>
               <a:t>  </a:t>
             </a:r>
@@ -3531,7 +3403,6 @@
             <a:r>
               <a:rPr lang="en-US" sz="2000" smtClean="0">
                 <a:latin typeface="Calibri Light" pitchFamily="34" charset="0"/>
-                <a:cs typeface="Calibri Light" pitchFamily="34" charset="0"/>
               </a:rPr>
               <a:t>Ability to spin up new application</a:t>
             </a:r>
@@ -3541,7 +3412,6 @@
             <a:r>
               <a:rPr lang="en-US" sz="1600" smtClean="0">
                 <a:latin typeface="Calibri Light" pitchFamily="34" charset="0"/>
-                <a:cs typeface="Calibri Light" pitchFamily="34" charset="0"/>
               </a:rPr>
               <a:t>Adding support for new applications can be accomplished in ~10 working Days</a:t>
             </a:r>
@@ -3551,7 +3421,6 @@
             <a:r>
               <a:rPr lang="en-US" sz="800" smtClean="0">
                 <a:latin typeface="Calibri Light" pitchFamily="34" charset="0"/>
-                <a:cs typeface="Calibri Light" pitchFamily="34" charset="0"/>
               </a:rPr>
               <a:t>          </a:t>
             </a:r>
@@ -3564,7 +3433,6 @@
             <a:r>
               <a:rPr lang="en-US" sz="2000" smtClean="0">
                 <a:latin typeface="Calibri Light" pitchFamily="34" charset="0"/>
-                <a:cs typeface="Calibri Light" pitchFamily="34" charset="0"/>
               </a:rPr>
               <a:t>Improved Reporting,  add a dashboard, provide stasistics</a:t>
             </a:r>
@@ -3574,7 +3442,6 @@
             <a:r>
               <a:rPr lang="en-US" sz="800" smtClean="0">
                 <a:latin typeface="Calibri Light" pitchFamily="34" charset="0"/>
-                <a:cs typeface="Calibri Light" pitchFamily="34" charset="0"/>
               </a:rPr>
               <a:t>          </a:t>
             </a:r>
@@ -3587,7 +3454,6 @@
             <a:r>
               <a:rPr lang="en-US" sz="2000" smtClean="0">
                 <a:latin typeface="Calibri Light" pitchFamily="34" charset="0"/>
-                <a:cs typeface="Calibri Light" pitchFamily="34" charset="0"/>
               </a:rPr>
               <a:t>Test Headless  : Trying to overcome CPU and Memory consumption</a:t>
             </a:r>
@@ -3597,7 +3463,6 @@
             <a:r>
               <a:rPr lang="en-US" sz="800" smtClean="0">
                 <a:latin typeface="Calibri Light" pitchFamily="34" charset="0"/>
-                <a:cs typeface="Calibri Light" pitchFamily="34" charset="0"/>
               </a:rPr>
               <a:t>    </a:t>
             </a:r>
@@ -3610,7 +3475,6 @@
             <a:r>
               <a:rPr lang="en-US" sz="2000" smtClean="0">
                 <a:latin typeface="Calibri Light" pitchFamily="34" charset="0"/>
-                <a:cs typeface="Calibri Light" pitchFamily="34" charset="0"/>
               </a:rPr>
               <a:t>Mobile devices</a:t>
             </a:r>
@@ -3619,7 +3483,6 @@
             <a:pPr marL="342900" indent="-342900" eaLnBrk="1" hangingPunct="1"/>
             <a:endParaRPr lang="en-US" sz="2000" smtClean="0">
               <a:latin typeface="Calibri Light" pitchFamily="34" charset="0"/>
-              <a:cs typeface="Calibri Light" pitchFamily="34" charset="0"/>
             </a:endParaRPr>
           </a:p>
         </p:txBody>
@@ -3680,7 +3543,6 @@
             <a:r>
               <a:rPr lang="en-US" smtClean="0">
                 <a:latin typeface="Calibri Light" pitchFamily="34" charset="0"/>
-                <a:cs typeface="Calibri Light" pitchFamily="34" charset="0"/>
               </a:rPr>
               <a:t>ROLL OUT</a:t>
             </a:r>
@@ -3961,8 +3823,8 @@
         </p:nvSpPr>
         <p:spPr bwMode="auto">
           <a:xfrm>
-            <a:off x="4699000" y="4316412"/>
-            <a:ext cx="184923" cy="671513"/>
+            <a:off x="4699000" y="4316413"/>
+            <a:ext cx="184150" cy="671512"/>
           </a:xfrm>
           <a:prstGeom prst="leftBrace">
             <a:avLst/>
@@ -4001,8 +3863,8 @@
         </p:nvSpPr>
         <p:spPr bwMode="auto">
           <a:xfrm>
-            <a:off x="4705350" y="5138739"/>
-            <a:ext cx="190500" cy="805952"/>
+            <a:off x="4705350" y="5138738"/>
+            <a:ext cx="190500" cy="806450"/>
           </a:xfrm>
           <a:prstGeom prst="leftBrace">
             <a:avLst/>
@@ -4035,7 +3897,7 @@
       </p:sp>
       <p:sp>
         <p:nvSpPr>
-          <p:cNvPr id="23559" name="TextBox 3"/>
+          <p:cNvPr id="23558" name="TextBox 3"/>
           <p:cNvSpPr txBox="1">
             <a:spLocks noChangeArrowheads="1"/>
           </p:cNvSpPr>
@@ -4043,7 +3905,7 @@
         </p:nvSpPr>
         <p:spPr bwMode="auto">
           <a:xfrm>
-            <a:off x="3268663" y="4222751"/>
+            <a:off x="3268663" y="4222750"/>
             <a:ext cx="1487487" cy="765175"/>
           </a:xfrm>
           <a:prstGeom prst="rect">
@@ -4058,13 +3920,13 @@
           </a:ln>
         </p:spPr>
         <p:txBody>
-          <a:bodyPr wrap="square">
+          <a:bodyPr>
             <a:spAutoFit/>
           </a:bodyPr>
           <a:lstStyle/>
           <a:p>
             <a:r>
-              <a:rPr lang="en-US" sz="1100" dirty="0"/>
+              <a:rPr lang="en-US" sz="1100"/>
               <a:t>Development Engineers Focus Attention on this layer for testing</a:t>
             </a:r>
           </a:p>
@@ -4072,7 +3934,7 @@
       </p:sp>
       <p:sp>
         <p:nvSpPr>
-          <p:cNvPr id="23560" name="TextBox 10"/>
+          <p:cNvPr id="23559" name="TextBox 10"/>
           <p:cNvSpPr txBox="1">
             <a:spLocks noChangeArrowheads="1"/>
           </p:cNvSpPr>
@@ -4081,7 +3943,7 @@
         <p:spPr bwMode="auto">
           <a:xfrm>
             <a:off x="3268663" y="5081588"/>
-            <a:ext cx="1487487" cy="769441"/>
+            <a:ext cx="1487487" cy="769937"/>
           </a:xfrm>
           <a:prstGeom prst="rect">
             <a:avLst/>
@@ -4095,57 +3957,54 @@
           </a:ln>
         </p:spPr>
         <p:txBody>
-          <a:bodyPr wrap="square">
+          <a:bodyPr>
             <a:spAutoFit/>
           </a:bodyPr>
           <a:lstStyle/>
           <a:p>
             <a:r>
-              <a:rPr lang="en-US" sz="1100" dirty="0"/>
+              <a:rPr lang="en-US" sz="1100"/>
               <a:t>NextGen </a:t>
             </a:r>
-            <a:endParaRPr lang="en-US" sz="1100" dirty="0" smtClean="0"/>
-          </a:p>
-          <a:p>
-            <a:r>
-              <a:rPr lang="en-US" sz="1100" dirty="0" smtClean="0"/>
-              <a:t>Test </a:t>
-            </a:r>
-            <a:r>
-              <a:rPr lang="en-US" sz="1100" dirty="0"/>
-              <a:t>Automation  staff enhance and improve these layers</a:t>
+          </a:p>
+          <a:p>
+            <a:r>
+              <a:rPr lang="en-US" sz="1100"/>
+              <a:t>Test Automation  staff enhance and improve these layers</a:t>
             </a:r>
           </a:p>
         </p:txBody>
       </p:sp>
       <p:pic>
         <p:nvPicPr>
-          <p:cNvPr id="4" name="Picture 3"/>
+          <p:cNvPr id="23560" name="Picture 3"/>
           <p:cNvPicPr>
             <a:picLocks noChangeAspect="1"/>
           </p:cNvPicPr>
           <p:nvPr/>
         </p:nvPicPr>
         <p:blipFill>
-          <a:blip r:embed="rId2">
-            <a:extLst>
-              <a:ext uri="{28A0092B-C50C-407E-A947-70E740481C1C}">
-                <a14:useLocalDpi xmlns:a14="http://schemas.microsoft.com/office/drawing/2010/main" val="0"/>
-              </a:ext>
-            </a:extLst>
-          </a:blip>
+          <a:blip r:embed="rId2"/>
+          <a:srcRect/>
           <a:stretch>
             <a:fillRect/>
           </a:stretch>
         </p:blipFill>
-        <p:spPr>
+        <p:spPr bwMode="auto">
           <a:xfrm>
-            <a:off x="5023623" y="3703229"/>
-            <a:ext cx="3784114" cy="2992539"/>
+            <a:off x="5022850" y="3703638"/>
+            <a:ext cx="3784600" cy="2992437"/>
           </a:xfrm>
           <a:prstGeom prst="rect">
             <a:avLst/>
           </a:prstGeom>
+          <a:noFill/>
+          <a:ln w="9525">
+            <a:noFill/>
+            <a:miter lim="800000"/>
+            <a:headEnd/>
+            <a:tailEnd/>
+          </a:ln>
         </p:spPr>
       </p:pic>
       <p:sp>
@@ -4156,8 +4015,8 @@
         </p:nvSpPr>
         <p:spPr bwMode="auto">
           <a:xfrm>
-            <a:off x="4705350" y="6143248"/>
-            <a:ext cx="190500" cy="552520"/>
+            <a:off x="4705350" y="6143625"/>
+            <a:ext cx="190500" cy="552450"/>
           </a:xfrm>
           <a:prstGeom prst="leftBrace">
             <a:avLst/>
@@ -4190,7 +4049,7 @@
       </p:sp>
       <p:sp>
         <p:nvSpPr>
-          <p:cNvPr id="15" name="TextBox 10"/>
+          <p:cNvPr id="23562" name="TextBox 10"/>
           <p:cNvSpPr txBox="1">
             <a:spLocks noChangeArrowheads="1"/>
           </p:cNvSpPr>
@@ -4198,8 +4057,8 @@
         </p:nvSpPr>
         <p:spPr bwMode="auto">
           <a:xfrm>
-            <a:off x="2630519" y="6095504"/>
-            <a:ext cx="2096528" cy="600164"/>
+            <a:off x="2630488" y="6096000"/>
+            <a:ext cx="2097087" cy="600075"/>
           </a:xfrm>
           <a:prstGeom prst="rect">
             <a:avLst/>
@@ -4213,24 +4072,15 @@
           </a:ln>
         </p:spPr>
         <p:txBody>
-          <a:bodyPr wrap="square">
+          <a:bodyPr>
             <a:spAutoFit/>
           </a:bodyPr>
           <a:lstStyle/>
           <a:p>
             <a:r>
-              <a:rPr lang="en-US" sz="1100" dirty="0"/>
-              <a:t>NextGen </a:t>
-            </a:r>
-            <a:r>
-              <a:rPr lang="en-US" sz="1100" dirty="0"/>
-              <a:t> </a:t>
-            </a:r>
-            <a:r>
-              <a:rPr lang="en-US" sz="1100" dirty="0" smtClean="0"/>
-              <a:t>Test Auto to develop and fill out all http layer REST API Automation Testing</a:t>
-            </a:r>
-            <a:endParaRPr lang="en-US" sz="1100" dirty="0"/>
+              <a:rPr lang="en-US" sz="1100"/>
+              <a:t>NextGen  Test Auto to develop and fill out all http layer REST API Automation Testing</a:t>
+            </a:r>
           </a:p>
         </p:txBody>
       </p:sp>
@@ -4290,7 +4140,6 @@
             <a:r>
               <a:rPr lang="en-US" smtClean="0">
                 <a:latin typeface="Calibri Light" pitchFamily="34" charset="0"/>
-                <a:cs typeface="Calibri Light" pitchFamily="34" charset="0"/>
               </a:rPr>
               <a:t>ROLES &amp; RESPONSIBILITIES</a:t>
             </a:r>
@@ -4327,7 +4176,6 @@
             <a:r>
               <a:rPr lang="en-US" sz="2000" b="1" smtClean="0">
                 <a:latin typeface="Calibri Light" pitchFamily="34" charset="0"/>
-                <a:cs typeface="Calibri Light" pitchFamily="34" charset="0"/>
               </a:rPr>
               <a:t>Shopping &amp; Buying Development Engineers</a:t>
             </a:r>
@@ -4340,15 +4188,10 @@
               <a:spcBef>
                 <a:spcPct val="0"/>
               </a:spcBef>
-              <a:buFont typeface="Arial" charset="0"/>
-              <a:buBlip>
-                <a:blip r:embed="rId2"/>
-              </a:buBlip>
             </a:pPr>
             <a:r>
               <a:rPr lang="en-US" sz="1400" smtClean="0">
                 <a:latin typeface="Calibri Light" pitchFamily="34" charset="0"/>
-                <a:cs typeface="Calibri Light" pitchFamily="34" charset="0"/>
               </a:rPr>
               <a:t>Responsible for all new  Page Level Functional Integration Tests</a:t>
             </a:r>
@@ -4361,21 +4204,15 @@
               <a:spcBef>
                 <a:spcPct val="0"/>
               </a:spcBef>
-              <a:buFont typeface="Arial" charset="0"/>
-              <a:buBlip>
-                <a:blip r:embed="rId2"/>
-              </a:buBlip>
             </a:pPr>
             <a:r>
               <a:rPr lang="en-US" sz="1400" smtClean="0">
                 <a:latin typeface="Calibri Light" pitchFamily="34" charset="0"/>
-                <a:cs typeface="Calibri Light" pitchFamily="34" charset="0"/>
               </a:rPr>
               <a:t>Responsible for correcting all test failures in  ../fitmp  directory, keeping it completely operational</a:t>
             </a:r>
             <a:endParaRPr lang="en-US" sz="1400" b="1" smtClean="0">
               <a:latin typeface="Calibri Light" pitchFamily="34" charset="0"/>
-              <a:cs typeface="Calibri Light" pitchFamily="34" charset="0"/>
             </a:endParaRPr>
           </a:p>
           <a:p>
@@ -4389,7 +4226,6 @@
             <a:r>
               <a:rPr lang="en-US" sz="2000" b="1" smtClean="0">
                 <a:latin typeface="Calibri Light" pitchFamily="34" charset="0"/>
-                <a:cs typeface="Calibri Light" pitchFamily="34" charset="0"/>
               </a:rPr>
               <a:t>Provider Directory Development Engineers </a:t>
             </a:r>
@@ -4402,15 +4238,10 @@
               <a:spcBef>
                 <a:spcPct val="0"/>
               </a:spcBef>
-              <a:buFont typeface="Arial" charset="0"/>
-              <a:buBlip>
-                <a:blip r:embed="rId2"/>
-              </a:buBlip>
             </a:pPr>
             <a:r>
               <a:rPr lang="en-US" sz="1400" smtClean="0">
                 <a:latin typeface="Calibri Light" pitchFamily="34" charset="0"/>
-                <a:cs typeface="Calibri Light" pitchFamily="34" charset="0"/>
               </a:rPr>
               <a:t>Responsible for all new Template level Functional Integration Tests</a:t>
             </a:r>
@@ -4423,15 +4254,10 @@
               <a:spcBef>
                 <a:spcPct val="0"/>
               </a:spcBef>
-              <a:buFont typeface="Arial" charset="0"/>
-              <a:buBlip>
-                <a:blip r:embed="rId2"/>
-              </a:buBlip>
             </a:pPr>
             <a:r>
               <a:rPr lang="en-US" sz="1400" smtClean="0">
                 <a:latin typeface="Calibri Light" pitchFamily="34" charset="0"/>
-                <a:cs typeface="Calibri Light" pitchFamily="34" charset="0"/>
               </a:rPr>
               <a:t>Responsible for correcting all test failures in the  ../fitpd  directory, keeping all test operational</a:t>
             </a:r>
@@ -4447,7 +4273,6 @@
             <a:r>
               <a:rPr lang="en-US" sz="2000" b="1" smtClean="0">
                 <a:latin typeface="Calibri Light" pitchFamily="34" charset="0"/>
-                <a:cs typeface="Calibri Light" pitchFamily="34" charset="0"/>
               </a:rPr>
               <a:t> Core Technology API Team engineers</a:t>
             </a:r>
@@ -4460,15 +4285,10 @@
               <a:spcBef>
                 <a:spcPct val="0"/>
               </a:spcBef>
-              <a:buFont typeface="Arial" charset="0"/>
-              <a:buBlip>
-                <a:blip r:embed="rId2"/>
-              </a:buBlip>
             </a:pPr>
             <a:r>
               <a:rPr lang="en-US" sz="1400" smtClean="0">
                 <a:latin typeface="Calibri Light" pitchFamily="34" charset="0"/>
-                <a:cs typeface="Calibri Light" pitchFamily="34" charset="0"/>
               </a:rPr>
               <a:t>Responsible for adding new tests to the REST API regression suite </a:t>
             </a:r>
@@ -4481,15 +4301,10 @@
               <a:spcBef>
                 <a:spcPct val="0"/>
               </a:spcBef>
-              <a:buFont typeface="Arial" charset="0"/>
-              <a:buBlip>
-                <a:blip r:embed="rId2"/>
-              </a:buBlip>
             </a:pPr>
             <a:r>
               <a:rPr lang="en-US" sz="1400" smtClean="0">
                 <a:latin typeface="Calibri Light" pitchFamily="34" charset="0"/>
-                <a:cs typeface="Calibri Light" pitchFamily="34" charset="0"/>
               </a:rPr>
               <a:t>Responsible for correcting all test failures in the ../fitapi directory, keeping all test operational</a:t>
             </a:r>
@@ -4505,7 +4320,6 @@
             <a:r>
               <a:rPr lang="en-US" sz="500" b="1" smtClean="0">
                 <a:latin typeface="Calibri Light" pitchFamily="34" charset="0"/>
-                <a:cs typeface="Calibri Light" pitchFamily="34" charset="0"/>
               </a:rPr>
               <a:t>             </a:t>
             </a:r>
@@ -4521,7 +4335,6 @@
             <a:r>
               <a:rPr lang="en-US" sz="2000" b="1" smtClean="0">
                 <a:latin typeface="Calibri Light" pitchFamily="34" charset="0"/>
-                <a:cs typeface="Calibri Light" pitchFamily="34" charset="0"/>
               </a:rPr>
               <a:t>NGTA Team engineers</a:t>
             </a:r>
@@ -4540,7 +4353,6 @@
             <a:r>
               <a:rPr lang="en-US" sz="1400" smtClean="0">
                 <a:latin typeface="Calibri Light" pitchFamily="34" charset="0"/>
-                <a:cs typeface="Calibri Light" pitchFamily="34" charset="0"/>
               </a:rPr>
               <a:t>Oversee and manage all Framework development. </a:t>
             </a:r>
@@ -4559,7 +4371,6 @@
             <a:r>
               <a:rPr lang="en-US" sz="1400" smtClean="0">
                 <a:latin typeface="Calibri Light" pitchFamily="34" charset="0"/>
-                <a:cs typeface="Calibri Light" pitchFamily="34" charset="0"/>
               </a:rPr>
               <a:t>Continual frame work improvement, evaluating all need for new coverage</a:t>
             </a:r>
@@ -4578,7 +4389,6 @@
             <a:r>
               <a:rPr lang="en-US" sz="1400" smtClean="0">
                 <a:latin typeface="Calibri Light" pitchFamily="34" charset="0"/>
-                <a:cs typeface="Calibri Light" pitchFamily="34" charset="0"/>
               </a:rPr>
               <a:t>Continually analyze mid layer code</a:t>
             </a:r>
@@ -4597,7 +4407,6 @@
             <a:r>
               <a:rPr lang="en-US" sz="1400" smtClean="0">
                 <a:latin typeface="Calibri Light" pitchFamily="34" charset="0"/>
-                <a:cs typeface="Calibri Light" pitchFamily="34" charset="0"/>
               </a:rPr>
               <a:t>Refactor content from mid layer to the lower common layer</a:t>
             </a:r>
@@ -4616,7 +4425,6 @@
             <a:r>
               <a:rPr lang="en-US" sz="1400" smtClean="0">
                 <a:latin typeface="Calibri Light" pitchFamily="34" charset="0"/>
-                <a:cs typeface="Calibri Light" pitchFamily="34" charset="0"/>
               </a:rPr>
               <a:t>Develop all End to End test automation scripts based on business use cases</a:t>
             </a:r>
@@ -5206,7 +5014,7 @@
       </p:sp>
       <p:pic>
         <p:nvPicPr>
-          <p:cNvPr id="6" name="Content Placeholder 5"/>
+          <p:cNvPr id="26627" name="Content Placeholder 5"/>
           <p:cNvPicPr>
             <a:picLocks noGrp="1" noChangeAspect="1"/>
           </p:cNvPicPr>
@@ -5215,21 +5023,16 @@
           </p:nvPr>
         </p:nvPicPr>
         <p:blipFill>
-          <a:blip r:embed="rId3">
-            <a:extLst>
-              <a:ext uri="{28A0092B-C50C-407E-A947-70E740481C1C}">
-                <a14:useLocalDpi xmlns:a14="http://schemas.microsoft.com/office/drawing/2010/main" val="0"/>
-              </a:ext>
-            </a:extLst>
-          </a:blip>
+          <a:blip r:embed="rId3"/>
+          <a:srcRect/>
           <a:stretch>
             <a:fillRect/>
           </a:stretch>
         </p:blipFill>
         <p:spPr>
           <a:xfrm>
-            <a:off x="368299" y="886904"/>
-            <a:ext cx="8485907" cy="5831948"/>
+            <a:off x="368300" y="887413"/>
+            <a:ext cx="8485188" cy="5830887"/>
           </a:xfrm>
         </p:spPr>
       </p:pic>
@@ -5289,14 +5092,12 @@
             <a:r>
               <a:rPr lang="en-US" smtClean="0">
                 <a:latin typeface="Calibri Light" pitchFamily="34" charset="0"/>
-                <a:cs typeface="Calibri Light" pitchFamily="34" charset="0"/>
               </a:rPr>
               <a:t>	    </a:t>
             </a:r>
             <a:r>
               <a:rPr lang="en-US" sz="1600" b="1" smtClean="0">
                 <a:latin typeface="Calibri Light" pitchFamily="34" charset="0"/>
-                <a:cs typeface="Calibri Light" pitchFamily="34" charset="0"/>
               </a:rPr>
               <a:t>Seconds</a:t>
             </a:r>
@@ -5306,7 +5107,6 @@
             <a:r>
               <a:rPr lang="en-US" smtClean="0">
                 <a:latin typeface="Calibri Light" pitchFamily="34" charset="0"/>
-                <a:cs typeface="Calibri Light" pitchFamily="34" charset="0"/>
               </a:rPr>
               <a:t>Small	5		%30</a:t>
             </a:r>
@@ -5315,7 +5115,6 @@
             <a:pPr eaLnBrk="1" hangingPunct="1"/>
             <a:endParaRPr lang="en-US" smtClean="0">
               <a:latin typeface="Calibri Light" pitchFamily="34" charset="0"/>
-              <a:cs typeface="Calibri Light" pitchFamily="34" charset="0"/>
             </a:endParaRPr>
           </a:p>
           <a:p>
@@ -5323,7 +5122,6 @@
             <a:r>
               <a:rPr lang="en-US" smtClean="0">
                 <a:latin typeface="Calibri Light" pitchFamily="34" charset="0"/>
-                <a:cs typeface="Calibri Light" pitchFamily="34" charset="0"/>
               </a:rPr>
               <a:t>Med	15		%50</a:t>
             </a:r>
@@ -5332,7 +5130,6 @@
             <a:pPr eaLnBrk="1" hangingPunct="1"/>
             <a:endParaRPr lang="en-US" smtClean="0">
               <a:latin typeface="Calibri Light" pitchFamily="34" charset="0"/>
-              <a:cs typeface="Calibri Light" pitchFamily="34" charset="0"/>
             </a:endParaRPr>
           </a:p>
           <a:p>
@@ -5340,7 +5137,6 @@
             <a:r>
               <a:rPr lang="en-US" smtClean="0">
                 <a:latin typeface="Calibri Light" pitchFamily="34" charset="0"/>
-                <a:cs typeface="Calibri Light" pitchFamily="34" charset="0"/>
               </a:rPr>
               <a:t>Large	30		%20</a:t>
             </a:r>
@@ -6962,7 +6758,6 @@
             <a:r>
               <a:rPr lang="en-US" sz="2000" b="1" smtClean="0">
                 <a:latin typeface="Calibri Light" pitchFamily="34" charset="0"/>
-                <a:cs typeface="Calibri Light" pitchFamily="34" charset="0"/>
               </a:rPr>
               <a:t>NGTA and the CX Market Place Development Team have matured since 2016. </a:t>
             </a:r>
@@ -6975,22 +6770,16 @@
               <a:spcBef>
                 <a:spcPct val="0"/>
               </a:spcBef>
-              <a:buFont typeface="Arial" charset="0"/>
-              <a:buBlip>
-                <a:blip r:embed="rId3"/>
-              </a:buBlip>
             </a:pPr>
             <a:r>
               <a:rPr lang="en-US" sz="1600" b="1" smtClean="0">
                 <a:latin typeface="Calibri Light" pitchFamily="34" charset="0"/>
-                <a:cs typeface="Calibri Light" pitchFamily="34" charset="0"/>
               </a:rPr>
               <a:t>We are able to do more and deliver to a greater audience. </a:t>
             </a:r>
             <a:r>
               <a:rPr lang="en-US" sz="1800" b="1" smtClean="0">
                 <a:latin typeface="Calibri Light" pitchFamily="34" charset="0"/>
-                <a:cs typeface="Calibri Light" pitchFamily="34" charset="0"/>
               </a:rPr>
               <a:t> </a:t>
             </a:r>
@@ -7009,7 +6798,6 @@
             <a:r>
               <a:rPr lang="en-US" sz="2000" b="1" smtClean="0">
                 <a:latin typeface="Calibri Light" pitchFamily="34" charset="0"/>
-                <a:cs typeface="Calibri Light" pitchFamily="34" charset="0"/>
               </a:rPr>
               <a:t>To scale as projected </a:t>
             </a:r>
@@ -7028,7 +6816,6 @@
             <a:r>
               <a:rPr lang="en-US" sz="1600" b="1" smtClean="0">
                 <a:latin typeface="Calibri Light" pitchFamily="34" charset="0"/>
-                <a:cs typeface="Calibri Light" pitchFamily="34" charset="0"/>
               </a:rPr>
               <a:t>we have to change how we develop tests   </a:t>
             </a:r>
@@ -7038,7 +6825,6 @@
                   <a:srgbClr val="A6A6A6"/>
                 </a:solidFill>
                 <a:latin typeface="Calibri Light" pitchFamily="34" charset="0"/>
-                <a:cs typeface="Calibri Light" pitchFamily="34" charset="0"/>
               </a:rPr>
               <a:t> </a:t>
             </a:r>
@@ -7057,7 +6843,6 @@
             <a:r>
               <a:rPr lang="en-US" sz="1600" b="1" smtClean="0">
                 <a:latin typeface="Calibri Light" pitchFamily="34" charset="0"/>
-                <a:cs typeface="Calibri Light" pitchFamily="34" charset="0"/>
               </a:rPr>
               <a:t>we have changed how we select &amp; control execution  </a:t>
             </a:r>
@@ -7066,7 +6851,6 @@
                 <a:srgbClr val="A6A6A6"/>
               </a:solidFill>
               <a:latin typeface="Calibri Light" pitchFamily="34" charset="0"/>
-              <a:cs typeface="Calibri Light" pitchFamily="34" charset="0"/>
             </a:endParaRPr>
           </a:p>
           <a:p>
@@ -7086,13 +6870,11 @@
                   <a:srgbClr val="A6A6A6"/>
                 </a:solidFill>
                 <a:latin typeface="Calibri Light" pitchFamily="34" charset="0"/>
-                <a:cs typeface="Calibri Light" pitchFamily="34" charset="0"/>
               </a:rPr>
               <a:t>   </a:t>
             </a:r>
             <a:endParaRPr lang="en-US" sz="700" b="1" smtClean="0">
               <a:latin typeface="Calibri Light" pitchFamily="34" charset="0"/>
-              <a:cs typeface="Calibri Light" pitchFamily="34" charset="0"/>
             </a:endParaRPr>
           </a:p>
           <a:p>
@@ -7109,7 +6891,6 @@
             <a:r>
               <a:rPr lang="en-US" sz="2000" b="1" smtClean="0">
                 <a:latin typeface="Calibri Light" pitchFamily="34" charset="0"/>
-                <a:cs typeface="Calibri Light" pitchFamily="34" charset="0"/>
               </a:rPr>
               <a:t>Massive reduction in the number of hours  Manual VS Automated</a:t>
             </a:r>
@@ -7127,7 +6908,6 @@
             </a:pPr>
             <a:endParaRPr lang="en-US" sz="1800" smtClean="0">
               <a:latin typeface="Calibri Light" pitchFamily="34" charset="0"/>
-              <a:cs typeface="Calibri Light" pitchFamily="34" charset="0"/>
             </a:endParaRPr>
           </a:p>
           <a:p>
@@ -7143,7 +6923,6 @@
             </a:pPr>
             <a:endParaRPr lang="en-US" sz="1800" smtClean="0">
               <a:latin typeface="Calibri Light" pitchFamily="34" charset="0"/>
-              <a:cs typeface="Calibri Light" pitchFamily="34" charset="0"/>
             </a:endParaRPr>
           </a:p>
           <a:p>
@@ -7154,7 +6933,6 @@
             </a:pPr>
             <a:endParaRPr lang="en-US" sz="2000" smtClean="0">
               <a:latin typeface="Calibri Light" pitchFamily="34" charset="0"/>
-              <a:cs typeface="Calibri Light" pitchFamily="34" charset="0"/>
             </a:endParaRPr>
           </a:p>
         </p:txBody>
@@ -7445,7 +7223,7 @@
           <p:nvPr/>
         </p:nvPicPr>
         <p:blipFill>
-          <a:blip r:embed="rId4"/>
+          <a:blip r:embed="rId3"/>
           <a:srcRect/>
           <a:stretch>
             <a:fillRect/>
@@ -7477,7 +7255,7 @@
           <p:nvPr/>
         </p:nvPicPr>
         <p:blipFill>
-          <a:blip r:embed="rId5"/>
+          <a:blip r:embed="rId4"/>
           <a:srcRect/>
           <a:stretch>
             <a:fillRect/>
@@ -7915,31 +7693,7 @@
               <a:rPr lang="en-US" sz="1800" b="1" dirty="0" smtClean="0">
                 <a:ea typeface="+mn-ea"/>
               </a:rPr>
-              <a:t>First access REST API and capture data.  Then access </a:t>
-            </a:r>
-            <a:r>
-              <a:rPr lang="en-US" sz="1800" b="1" dirty="0" smtClean="0">
-                <a:ea typeface="+mn-ea"/>
-              </a:rPr>
-              <a:t>Provider Directory </a:t>
-            </a:r>
-            <a:r>
-              <a:rPr lang="en-US" sz="1800" b="1" dirty="0" smtClean="0">
-                <a:ea typeface="+mn-ea"/>
-              </a:rPr>
-              <a:t>requesting same </a:t>
-            </a:r>
-            <a:r>
-              <a:rPr lang="en-US" sz="1800" b="1" dirty="0" smtClean="0">
-                <a:ea typeface="+mn-ea"/>
-              </a:rPr>
-              <a:t>information from the Web Interface,  </a:t>
-            </a:r>
-            <a:r>
-              <a:rPr lang="en-US" sz="1800" b="1" dirty="0" smtClean="0">
-                <a:ea typeface="+mn-ea"/>
-              </a:rPr>
-              <a:t>Compare results</a:t>
+              <a:t>First access REST API and capture data.  Then access Provider Directory requesting same information from the Web Interface,  Compare results</a:t>
             </a:r>
           </a:p>
           <a:p>
@@ -8002,13 +7756,7 @@
               <a:rPr lang="en-US" sz="1900" b="1" dirty="0" smtClean="0">
                 <a:ea typeface="+mn-ea"/>
               </a:rPr>
-              <a:t>No need for another product or </a:t>
-            </a:r>
-            <a:r>
-              <a:rPr lang="en-US" sz="1900" b="1" dirty="0" smtClean="0">
-                <a:ea typeface="+mn-ea"/>
-              </a:rPr>
-              <a:t>technology.  </a:t>
+              <a:t>No need for another product or technology.  </a:t>
             </a:r>
           </a:p>
           <a:p>
@@ -8042,13 +7790,7 @@
               <a:rPr lang="en-US" sz="1900" b="1" dirty="0" smtClean="0">
                 <a:ea typeface="+mn-ea"/>
               </a:rPr>
-              <a:t> http Library , JavaScript to automate all API calls</a:t>
-            </a:r>
-            <a:r>
-              <a:rPr lang="en-US" sz="1900" b="1" dirty="0" smtClean="0">
-                <a:ea typeface="+mn-ea"/>
-              </a:rPr>
-              <a:t>.</a:t>
+              <a:t> http Library , JavaScript to automate all API calls.</a:t>
             </a:r>
             <a:endParaRPr lang="en-US" sz="1900" b="1" dirty="0">
               <a:ea typeface="+mn-ea"/>
@@ -8181,9 +7923,8 @@
           <a:p>
             <a:pPr algn="ctr" eaLnBrk="1" hangingPunct="1"/>
             <a:r>
-              <a:rPr lang="en-US" sz="4500" dirty="0" smtClean="0">
+              <a:rPr lang="en-US" sz="4500" smtClean="0">
                 <a:latin typeface="Calibri Light" pitchFamily="34" charset="0"/>
-                <a:cs typeface="Calibri Light" pitchFamily="34" charset="0"/>
               </a:rPr>
               <a:t>ARCHITECTURAL TECH STACK</a:t>
             </a:r>
@@ -8192,7 +7933,7 @@
       </p:sp>
       <p:sp>
         <p:nvSpPr>
-          <p:cNvPr id="15363" name="Title 1"/>
+          <p:cNvPr id="15362" name="Title 1"/>
           <p:cNvSpPr txBox="1">
             <a:spLocks/>
           </p:cNvSpPr>
@@ -8238,8 +7979,8 @@
         </p:nvSpPr>
         <p:spPr>
           <a:xfrm>
-            <a:off x="273051" y="1338263"/>
-            <a:ext cx="4014646" cy="5377169"/>
+            <a:off x="273050" y="1338263"/>
+            <a:ext cx="4014788" cy="5376862"/>
           </a:xfrm>
           <a:prstGeom prst="rect">
             <a:avLst/>
@@ -8479,7 +8220,6 @@
               <a:rPr lang="en-US" sz="1800" dirty="0" smtClean="0"/>
               <a:t>           </a:t>
             </a:r>
-            <a:endParaRPr lang="en-US" sz="1800" dirty="0" smtClean="0"/>
           </a:p>
           <a:p>
             <a:pPr fontAlgn="auto">
@@ -8738,32 +8478,34 @@
       </p:sp>
       <p:pic>
         <p:nvPicPr>
-          <p:cNvPr id="2" name="Picture 1"/>
+          <p:cNvPr id="15364" name="Picture 1"/>
           <p:cNvPicPr>
             <a:picLocks noChangeAspect="1"/>
           </p:cNvPicPr>
           <p:nvPr/>
         </p:nvPicPr>
         <p:blipFill>
-          <a:blip r:embed="rId3">
-            <a:extLst>
-              <a:ext uri="{28A0092B-C50C-407E-A947-70E740481C1C}">
-                <a14:useLocalDpi xmlns:a14="http://schemas.microsoft.com/office/drawing/2010/main" val="0"/>
-              </a:ext>
-            </a:extLst>
-          </a:blip>
+          <a:blip r:embed="rId3"/>
+          <a:srcRect/>
           <a:stretch>
             <a:fillRect/>
           </a:stretch>
         </p:blipFill>
-        <p:spPr>
+        <p:spPr bwMode="auto">
           <a:xfrm>
-            <a:off x="4287696" y="2762862"/>
-            <a:ext cx="4856303" cy="3883743"/>
+            <a:off x="4287838" y="2762250"/>
+            <a:ext cx="4856162" cy="3884613"/>
           </a:xfrm>
           <a:prstGeom prst="rect">
             <a:avLst/>
           </a:prstGeom>
+          <a:noFill/>
+          <a:ln w="9525">
+            <a:noFill/>
+            <a:miter lim="800000"/>
+            <a:headEnd/>
+            <a:tailEnd/>
+          </a:ln>
         </p:spPr>
       </p:pic>
     </p:spTree>
@@ -9876,26 +9618,22 @@
             <a:r>
               <a:rPr lang="en-US" smtClean="0">
                 <a:latin typeface="Calibri Light" pitchFamily="34" charset="0"/>
-                <a:cs typeface="Calibri Light" pitchFamily="34" charset="0"/>
               </a:rPr>
               <a:t>TEST CASES NUMBERS</a:t>
             </a:r>
             <a:br>
               <a:rPr lang="en-US" smtClean="0">
                 <a:latin typeface="Calibri Light" pitchFamily="34" charset="0"/>
-                <a:cs typeface="Calibri Light" pitchFamily="34" charset="0"/>
               </a:rPr>
             </a:br>
             <a:r>
               <a:rPr lang="en-US" sz="4000" smtClean="0">
                 <a:latin typeface="Calibri Light" pitchFamily="34" charset="0"/>
-                <a:cs typeface="Calibri Light" pitchFamily="34" charset="0"/>
               </a:rPr>
               <a:t>Market Place</a:t>
             </a:r>
             <a:endParaRPr lang="en-US" smtClean="0">
               <a:latin typeface="Calibri Light" pitchFamily="34" charset="0"/>
-              <a:cs typeface="Calibri Light" pitchFamily="34" charset="0"/>
             </a:endParaRPr>
           </a:p>
         </p:txBody>
@@ -10467,7 +10205,7 @@
   <a:extraClrSchemeLst/>
   <a:extLst>
     <a:ext uri="{05A4C25C-085E-4340-85A3-A5531E510DB2}">
-      <thm15:themeFamily xmlns:thm15="http://schemas.microsoft.com/office/thememl/2012/main" name="Presentation2" id="{E033CE4F-DAC9-4DC1-B085-D07FC0345DDB}" vid="{0783260F-4856-4ED7-B8E5-5C83CC1572CF}"/>
+      <thm15:themeFamily xmlns="" xmlns:thm15="http://schemas.microsoft.com/office/thememl/2012/main" name="Presentation2" id="{E033CE4F-DAC9-4DC1-B085-D07FC0345DDB}" vid="{0783260F-4856-4ED7-B8E5-5C83CC1572CF}"/>
     </a:ext>
   </a:extLst>
 </a:theme>
@@ -10728,7 +10466,7 @@
   <a:extraClrSchemeLst/>
   <a:extLst>
     <a:ext uri="{05A4C25C-085E-4340-85A3-A5531E510DB2}">
-      <thm15:themeFamily xmlns:thm15="http://schemas.microsoft.com/office/thememl/2012/main" name="Office Theme" id="{62F939B6-93AF-4DB8-9C6B-D6C7DFDC589F}" vid="{4A3C46E8-61CC-4603-A589-7422A47A8E4A}"/>
+      <thm15:themeFamily xmlns="" xmlns:thm15="http://schemas.microsoft.com/office/thememl/2012/main" name="Office Theme" id="{62F939B6-93AF-4DB8-9C6B-D6C7DFDC589F}" vid="{4A3C46E8-61CC-4603-A589-7422A47A8E4A}"/>
     </a:ext>
   </a:extLst>
 </a:theme>

</xml_diff>

<commit_message>
4/20/18 new files and capture
</commit_message>
<xml_diff>
--- a/CurrentWork_Delta/CX_StrategyPowerPoint.pptx
+++ b/CurrentWork_Delta/CX_StrategyPowerPoint.pptx
@@ -5,7 +5,7 @@
     <p:sldMasterId id="2147483648" r:id="rId1"/>
   </p:sldMasterIdLst>
   <p:notesMasterIdLst>
-    <p:notesMasterId r:id="rId20"/>
+    <p:notesMasterId r:id="rId21"/>
   </p:notesMasterIdLst>
   <p:sldIdLst>
     <p:sldId id="256" r:id="rId2"/>
@@ -13,19 +13,20 @@
     <p:sldId id="262" r:id="rId4"/>
     <p:sldId id="263" r:id="rId5"/>
     <p:sldId id="283" r:id="rId6"/>
-    <p:sldId id="273" r:id="rId7"/>
-    <p:sldId id="287" r:id="rId8"/>
-    <p:sldId id="285" r:id="rId9"/>
-    <p:sldId id="280" r:id="rId10"/>
-    <p:sldId id="275" r:id="rId11"/>
-    <p:sldId id="281" r:id="rId12"/>
-    <p:sldId id="282" r:id="rId13"/>
-    <p:sldId id="279" r:id="rId14"/>
-    <p:sldId id="271" r:id="rId15"/>
-    <p:sldId id="286" r:id="rId16"/>
-    <p:sldId id="274" r:id="rId17"/>
-    <p:sldId id="288" r:id="rId18"/>
-    <p:sldId id="284" r:id="rId19"/>
+    <p:sldId id="289" r:id="rId7"/>
+    <p:sldId id="290" r:id="rId8"/>
+    <p:sldId id="287" r:id="rId9"/>
+    <p:sldId id="285" r:id="rId10"/>
+    <p:sldId id="280" r:id="rId11"/>
+    <p:sldId id="275" r:id="rId12"/>
+    <p:sldId id="281" r:id="rId13"/>
+    <p:sldId id="282" r:id="rId14"/>
+    <p:sldId id="279" r:id="rId15"/>
+    <p:sldId id="271" r:id="rId16"/>
+    <p:sldId id="286" r:id="rId17"/>
+    <p:sldId id="274" r:id="rId18"/>
+    <p:sldId id="288" r:id="rId19"/>
+    <p:sldId id="284" r:id="rId20"/>
   </p:sldIdLst>
   <p:sldSz cx="9144000" cy="6858000" type="screen4x3"/>
   <p:notesSz cx="7010400" cy="9296400"/>
@@ -154,6 +155,25 @@
       </a:defRPr>
     </a:lvl9pPr>
   </p:defaultTextStyle>
+  <p:extLst>
+    <p:ext uri="{EFAFB233-063F-42B5-8137-9DF3F51BA10A}">
+      <p15:sldGuideLst xmlns:p15="http://schemas.microsoft.com/office/powerpoint/2012/main">
+        <p15:guide id="1" orient="horz" pos="2625">
+          <p15:clr>
+            <a:srgbClr val="A4A3A4"/>
+          </p15:clr>
+        </p15:guide>
+        <p15:guide id="2" pos="2880">
+          <p15:clr>
+            <a:srgbClr val="A4A3A4"/>
+          </p15:clr>
+        </p15:guide>
+      </p15:sldGuideLst>
+    </p:ext>
+    <p:ext uri="{2D200454-40CA-4A62-9FC3-DE9A4176ACB9}">
+      <p15:notesGuideLst xmlns:p15="http://schemas.microsoft.com/office/powerpoint/2012/main"/>
+    </p:ext>
+  </p:extLst>
 </p:presentation>
 </file>
 
@@ -266,7 +286,7 @@
               <a:pPr>
                 <a:defRPr/>
               </a:pPr>
-              <a:t>4/19/2018</a:t>
+              <a:t>4/20/2018</a:t>
             </a:fld>
             <a:endParaRPr lang="en-US"/>
           </a:p>
@@ -460,6 +480,11 @@
         </p:txBody>
       </p:sp>
     </p:spTree>
+    <p:extLst>
+      <p:ext uri="{BB962C8B-B14F-4D97-AF65-F5344CB8AC3E}">
+        <p14:creationId xmlns:p14="http://schemas.microsoft.com/office/powerpoint/2010/main" val="678970598"/>
+      </p:ext>
+    </p:extLst>
   </p:cSld>
   <p:clrMap bg1="lt1" tx1="dk1" bg2="lt2" tx2="dk2" accent1="accent1" accent2="accent2" accent3="accent3" accent4="accent4" accent5="accent5" accent6="accent6" hlink="hlink" folHlink="folHlink"/>
   <p:notesStyle>
@@ -712,6 +737,11 @@
         </p:txBody>
       </p:sp>
     </p:spTree>
+    <p:extLst>
+      <p:ext uri="{BB962C8B-B14F-4D97-AF65-F5344CB8AC3E}">
+        <p14:creationId xmlns:p14="http://schemas.microsoft.com/office/powerpoint/2010/main" val="3120475581"/>
+      </p:ext>
+    </p:extLst>
   </p:cSld>
   <p:clrMapOvr>
     <a:masterClrMapping/>
@@ -844,6 +874,11 @@
         </p:txBody>
       </p:sp>
     </p:spTree>
+    <p:extLst>
+      <p:ext uri="{BB962C8B-B14F-4D97-AF65-F5344CB8AC3E}">
+        <p14:creationId xmlns:p14="http://schemas.microsoft.com/office/powerpoint/2010/main" val="1128729748"/>
+      </p:ext>
+    </p:extLst>
   </p:cSld>
   <p:clrMapOvr>
     <a:masterClrMapping/>
@@ -976,6 +1011,11 @@
         </p:txBody>
       </p:sp>
     </p:spTree>
+    <p:extLst>
+      <p:ext uri="{BB962C8B-B14F-4D97-AF65-F5344CB8AC3E}">
+        <p14:creationId xmlns:p14="http://schemas.microsoft.com/office/powerpoint/2010/main" val="3950300365"/>
+      </p:ext>
+    </p:extLst>
   </p:cSld>
   <p:clrMapOvr>
     <a:masterClrMapping/>
@@ -2472,6 +2512,375 @@
       </p:grpSpPr>
       <p:sp>
         <p:nvSpPr>
+          <p:cNvPr id="4" name="Title 1">
+            <a:hlinkClick r:id="rId2" action="ppaction://hlinksldjump"/>
+          </p:cNvPr>
+          <p:cNvSpPr txBox="1">
+            <a:spLocks/>
+          </p:cNvSpPr>
+          <p:nvPr/>
+        </p:nvSpPr>
+        <p:spPr>
+          <a:xfrm>
+            <a:off x="368300" y="47625"/>
+            <a:ext cx="312738" cy="287338"/>
+          </a:xfrm>
+          <a:prstGeom prst="rect">
+            <a:avLst/>
+          </a:prstGeom>
+        </p:spPr>
+        <p:txBody>
+          <a:bodyPr>
+            <a:normAutofit fontScale="55000" lnSpcReduction="20000"/>
+          </a:bodyPr>
+          <a:lstStyle>
+            <a:lvl1pPr algn="l" defTabSz="457200" rtl="0" eaLnBrk="1" latinLnBrk="0" hangingPunct="1">
+              <a:spcBef>
+                <a:spcPct val="0"/>
+              </a:spcBef>
+              <a:buNone/>
+              <a:defRPr sz="5000" b="0" i="0" kern="1200">
+                <a:solidFill>
+                  <a:srgbClr val="128BAD"/>
+                </a:solidFill>
+                <a:latin typeface="Calibri Light"/>
+                <a:ea typeface="+mj-ea"/>
+                <a:cs typeface="Calibri Light"/>
+              </a:defRPr>
+            </a:lvl1pPr>
+          </a:lstStyle>
+          <a:p>
+            <a:pPr fontAlgn="auto">
+              <a:spcAft>
+                <a:spcPts val="0"/>
+              </a:spcAft>
+              <a:defRPr/>
+            </a:pPr>
+            <a:endParaRPr lang="en-US" sz="2800" dirty="0">
+              <a:solidFill>
+                <a:schemeClr val="bg1">
+                  <a:lumMod val="95000"/>
+                </a:schemeClr>
+              </a:solidFill>
+            </a:endParaRPr>
+          </a:p>
+        </p:txBody>
+      </p:sp>
+      <p:sp>
+        <p:nvSpPr>
+          <p:cNvPr id="18434" name="Title 7"/>
+          <p:cNvSpPr>
+            <a:spLocks noGrp="1"/>
+          </p:cNvSpPr>
+          <p:nvPr>
+            <p:ph type="title"/>
+          </p:nvPr>
+        </p:nvSpPr>
+        <p:spPr>
+          <a:xfrm>
+            <a:off x="712788" y="109538"/>
+            <a:ext cx="6897687" cy="1528762"/>
+          </a:xfrm>
+        </p:spPr>
+        <p:txBody>
+          <a:bodyPr anchor="t"/>
+          <a:lstStyle/>
+          <a:p>
+            <a:pPr algn="ctr" eaLnBrk="1" hangingPunct="1"/>
+            <a:r>
+              <a:rPr lang="en-US" smtClean="0">
+                <a:latin typeface="Calibri Light" pitchFamily="34" charset="0"/>
+              </a:rPr>
+              <a:t>TEST CASES NUMBERS</a:t>
+            </a:r>
+            <a:br>
+              <a:rPr lang="en-US" smtClean="0">
+                <a:latin typeface="Calibri Light" pitchFamily="34" charset="0"/>
+              </a:rPr>
+            </a:br>
+            <a:r>
+              <a:rPr lang="en-US" sz="4000" smtClean="0">
+                <a:latin typeface="Calibri Light" pitchFamily="34" charset="0"/>
+              </a:rPr>
+              <a:t>Market Place</a:t>
+            </a:r>
+            <a:endParaRPr lang="en-US" smtClean="0">
+              <a:latin typeface="Calibri Light" pitchFamily="34" charset="0"/>
+            </a:endParaRPr>
+          </a:p>
+        </p:txBody>
+      </p:sp>
+      <p:sp>
+        <p:nvSpPr>
+          <p:cNvPr id="18435" name="TextBox 12"/>
+          <p:cNvSpPr txBox="1">
+            <a:spLocks noChangeArrowheads="1"/>
+          </p:cNvSpPr>
+          <p:nvPr/>
+        </p:nvSpPr>
+        <p:spPr bwMode="auto">
+          <a:xfrm>
+            <a:off x="274638" y="1582738"/>
+            <a:ext cx="8869362" cy="5140325"/>
+          </a:xfrm>
+          <a:prstGeom prst="rect">
+            <a:avLst/>
+          </a:prstGeom>
+          <a:noFill/>
+          <a:ln w="9525">
+            <a:noFill/>
+            <a:miter lim="800000"/>
+            <a:headEnd/>
+            <a:tailEnd/>
+          </a:ln>
+        </p:spPr>
+        <p:txBody>
+          <a:bodyPr>
+            <a:spAutoFit/>
+          </a:bodyPr>
+          <a:lstStyle/>
+          <a:p>
+            <a:pPr marL="342900" indent="-342900">
+              <a:buFont typeface="Arial" charset="0"/>
+              <a:buChar char="•"/>
+              <a:defRPr/>
+            </a:pPr>
+            <a:r>
+              <a:rPr lang="en-US" sz="2000" dirty="0">
+                <a:latin typeface="Calibri" pitchFamily="34" charset="0"/>
+              </a:rPr>
+              <a:t>Test case results are the result of functional test written                                                  for a product   X   data points tested against   X    States Tested in</a:t>
+            </a:r>
+          </a:p>
+          <a:p>
+            <a:pPr marL="342900" indent="-342900">
+              <a:defRPr/>
+            </a:pPr>
+            <a:endParaRPr lang="en-US" sz="2000" dirty="0">
+              <a:latin typeface="Calibri" pitchFamily="34" charset="0"/>
+            </a:endParaRPr>
+          </a:p>
+          <a:p>
+            <a:pPr marL="342900" indent="-342900">
+              <a:buFont typeface="Arial" charset="0"/>
+              <a:buChar char="•"/>
+              <a:defRPr/>
+            </a:pPr>
+            <a:r>
+              <a:rPr lang="en-US" sz="1400" b="1" dirty="0">
+                <a:latin typeface="Calibri" pitchFamily="34" charset="0"/>
+              </a:rPr>
+              <a:t>Phase 0</a:t>
+            </a:r>
+            <a:r>
+              <a:rPr lang="en-US" sz="1400" dirty="0">
+                <a:latin typeface="Calibri" pitchFamily="34" charset="0"/>
+              </a:rPr>
+              <a:t> contains 4 products w/ 393, 478, 387, 442 test cases per product, total 1700 functional tests written.                                                                              Factoring test data points and the states where the product is deployed the calculation                                                                                                                                  </a:t>
+            </a:r>
+            <a:r>
+              <a:rPr lang="en-US" sz="2000" dirty="0">
+                <a:latin typeface="Calibri" pitchFamily="34" charset="0"/>
+              </a:rPr>
+              <a:t>4 Products tested in 5 states totals </a:t>
+            </a:r>
+            <a:r>
+              <a:rPr lang="en-US" sz="2400" dirty="0">
+                <a:latin typeface="Calibri" pitchFamily="34" charset="0"/>
+              </a:rPr>
+              <a:t>10125 tests</a:t>
+            </a:r>
+            <a:endParaRPr lang="en-US" dirty="0">
+              <a:latin typeface="Calibri" pitchFamily="34" charset="0"/>
+            </a:endParaRPr>
+          </a:p>
+          <a:p>
+            <a:pPr>
+              <a:defRPr/>
+            </a:pPr>
+            <a:r>
+              <a:rPr lang="en-US" sz="1200" dirty="0">
+                <a:latin typeface="Calibri" pitchFamily="34" charset="0"/>
+              </a:rPr>
+              <a:t>   </a:t>
+            </a:r>
+          </a:p>
+          <a:p>
+            <a:pPr marL="342900" indent="-342900">
+              <a:buFont typeface="Arial" charset="0"/>
+              <a:buChar char="•"/>
+              <a:defRPr/>
+            </a:pPr>
+            <a:r>
+              <a:rPr lang="en-US" sz="1400" b="1" dirty="0">
+                <a:latin typeface="Calibri" pitchFamily="34" charset="0"/>
+              </a:rPr>
+              <a:t>Phase 1 </a:t>
+            </a:r>
+            <a:r>
+              <a:rPr lang="en-US" sz="1400" dirty="0">
+                <a:latin typeface="Calibri" pitchFamily="34" charset="0"/>
+              </a:rPr>
+              <a:t>contains 2 products with 387, 442 test cases per product, total 829 functional tests written.               Factoring test data points and the states where the product is deployed the calculation</a:t>
+            </a:r>
+            <a:r>
+              <a:rPr lang="en-US" dirty="0"/>
+              <a:t> </a:t>
+            </a:r>
+            <a:r>
+              <a:rPr lang="en-US" sz="1400" dirty="0">
+                <a:latin typeface="Calibri" pitchFamily="34" charset="0"/>
+              </a:rPr>
+              <a:t>                                                                                                                                       </a:t>
+            </a:r>
+            <a:r>
+              <a:rPr lang="en-US" sz="2000" dirty="0">
+                <a:latin typeface="Calibri" pitchFamily="34" charset="0"/>
+              </a:rPr>
+              <a:t>2 Products tested in 8 States totals </a:t>
+            </a:r>
+            <a:r>
+              <a:rPr lang="en-US" sz="2400" dirty="0">
+                <a:latin typeface="Calibri" pitchFamily="34" charset="0"/>
+              </a:rPr>
+              <a:t>4394 tests</a:t>
+            </a:r>
+          </a:p>
+          <a:p>
+            <a:pPr>
+              <a:defRPr/>
+            </a:pPr>
+            <a:r>
+              <a:rPr lang="en-US" sz="1200" dirty="0">
+                <a:latin typeface="Calibri" pitchFamily="34" charset="0"/>
+              </a:rPr>
+              <a:t>     </a:t>
+            </a:r>
+          </a:p>
+          <a:p>
+            <a:pPr marL="342900" indent="-342900">
+              <a:buFont typeface="Arial" charset="0"/>
+              <a:buChar char="•"/>
+              <a:defRPr/>
+            </a:pPr>
+            <a:r>
+              <a:rPr lang="en-US" sz="1400" b="1" dirty="0">
+                <a:latin typeface="Calibri" pitchFamily="34" charset="0"/>
+              </a:rPr>
+              <a:t>Phase 2 </a:t>
+            </a:r>
+            <a:r>
+              <a:rPr lang="en-US" sz="1400" dirty="0">
+                <a:latin typeface="Calibri" pitchFamily="34" charset="0"/>
+              </a:rPr>
+              <a:t>contains 1 products with 442 test cases per product, total 442 functional tests written.                      Factoring test data points and the states where the product is deployed the calculation</a:t>
+            </a:r>
+            <a:r>
+              <a:rPr lang="en-US" sz="1400" dirty="0"/>
+              <a:t>         </a:t>
+            </a:r>
+            <a:r>
+              <a:rPr lang="en-US" sz="1400" dirty="0" smtClean="0"/>
+              <a:t>                              </a:t>
+            </a:r>
+            <a:r>
+              <a:rPr lang="en-US" dirty="0" smtClean="0"/>
+              <a:t> </a:t>
+            </a:r>
+            <a:r>
+              <a:rPr lang="en-US" sz="2000" dirty="0">
+                <a:latin typeface="Calibri" pitchFamily="34" charset="0"/>
+              </a:rPr>
+              <a:t>1 Product tested in 7 States totals </a:t>
+            </a:r>
+            <a:r>
+              <a:rPr lang="en-US" sz="2400" dirty="0">
+                <a:latin typeface="Calibri" pitchFamily="34" charset="0"/>
+              </a:rPr>
+              <a:t>3234 tests</a:t>
+            </a:r>
+            <a:endParaRPr lang="en-US" sz="2000" dirty="0">
+              <a:latin typeface="Calibri" pitchFamily="34" charset="0"/>
+            </a:endParaRPr>
+          </a:p>
+          <a:p>
+            <a:pPr>
+              <a:defRPr/>
+            </a:pPr>
+            <a:r>
+              <a:rPr lang="en-US" sz="1200" dirty="0">
+                <a:latin typeface="Calibri" pitchFamily="34" charset="0"/>
+              </a:rPr>
+              <a:t>     </a:t>
+            </a:r>
+          </a:p>
+          <a:p>
+            <a:pPr marL="342900" indent="-342900">
+              <a:buFont typeface="Arial" charset="0"/>
+              <a:buChar char="•"/>
+              <a:defRPr/>
+            </a:pPr>
+            <a:r>
+              <a:rPr lang="en-US" sz="1400" b="1" dirty="0"/>
+              <a:t>Phase 3 </a:t>
+            </a:r>
+            <a:r>
+              <a:rPr lang="en-US" sz="1400" dirty="0"/>
+              <a:t>contains 1 products with 442 test cases per product, total 442 functional tests written.                      Factoring test data points and the states where the product is deployed the calculation</a:t>
+            </a:r>
+            <a:r>
+              <a:rPr lang="en-US" dirty="0"/>
+              <a:t>                        </a:t>
+            </a:r>
+            <a:r>
+              <a:rPr lang="en-US" sz="2000" dirty="0">
+                <a:latin typeface="Calibri" pitchFamily="34" charset="0"/>
+              </a:rPr>
+              <a:t>1 Product tested in 7 States totals </a:t>
+            </a:r>
+            <a:r>
+              <a:rPr lang="en-US" sz="2400" dirty="0">
+                <a:latin typeface="Calibri" pitchFamily="34" charset="0"/>
+              </a:rPr>
+              <a:t>3234 tests</a:t>
+            </a:r>
+          </a:p>
+        </p:txBody>
+      </p:sp>
+    </p:spTree>
+  </p:cSld>
+  <p:clrMapOvr>
+    <a:masterClrMapping/>
+  </p:clrMapOvr>
+  <p:timing>
+    <p:tnLst>
+      <p:par>
+        <p:cTn id="1" dur="indefinite" restart="never" nodeType="tmRoot"/>
+      </p:par>
+    </p:tnLst>
+  </p:timing>
+</p:sld>
+</file>
+
+<file path=ppt/slides/slide11.xml><?xml version="1.0" encoding="utf-8"?>
+<p:sld xmlns:a="http://schemas.openxmlformats.org/drawingml/2006/main" xmlns:r="http://schemas.openxmlformats.org/officeDocument/2006/relationships" xmlns:p="http://schemas.openxmlformats.org/presentationml/2006/main">
+  <p:cSld>
+    <p:spTree>
+      <p:nvGrpSpPr>
+        <p:cNvPr id="1" name=""/>
+        <p:cNvGrpSpPr/>
+        <p:nvPr/>
+      </p:nvGrpSpPr>
+      <p:grpSpPr>
+        <a:xfrm>
+          <a:off x="0" y="0"/>
+          <a:ext cx="0" cy="0"/>
+          <a:chOff x="0" y="0"/>
+          <a:chExt cx="0" cy="0"/>
+        </a:xfrm>
+      </p:grpSpPr>
+      <p:sp>
+        <p:nvSpPr>
           <p:cNvPr id="19457" name="Title 1"/>
           <p:cNvSpPr>
             <a:spLocks noGrp="1"/>
@@ -2704,7 +3113,7 @@
 </p:sld>
 </file>
 
-<file path=ppt/slides/slide11.xml><?xml version="1.0" encoding="utf-8"?>
+<file path=ppt/slides/slide12.xml><?xml version="1.0" encoding="utf-8"?>
 <p:sld xmlns:a="http://schemas.openxmlformats.org/drawingml/2006/main" xmlns:r="http://schemas.openxmlformats.org/officeDocument/2006/relationships" xmlns:p="http://schemas.openxmlformats.org/presentationml/2006/main">
   <p:cSld>
     <p:spTree>
@@ -2905,7 +3314,7 @@
 </p:sld>
 </file>
 
-<file path=ppt/slides/slide12.xml><?xml version="1.0" encoding="utf-8"?>
+<file path=ppt/slides/slide13.xml><?xml version="1.0" encoding="utf-8"?>
 <p:sld xmlns:a="http://schemas.openxmlformats.org/drawingml/2006/main" xmlns:r="http://schemas.openxmlformats.org/officeDocument/2006/relationships" xmlns:p="http://schemas.openxmlformats.org/presentationml/2006/main">
   <p:cSld>
     <p:spTree>
@@ -3203,7 +3612,7 @@
 </p:sld>
 </file>
 
-<file path=ppt/slides/slide13.xml><?xml version="1.0" encoding="utf-8"?>
+<file path=ppt/slides/slide14.xml><?xml version="1.0" encoding="utf-8"?>
 <p:sld xmlns:a="http://schemas.openxmlformats.org/drawingml/2006/main" xmlns:r="http://schemas.openxmlformats.org/officeDocument/2006/relationships" xmlns:p="http://schemas.openxmlformats.org/presentationml/2006/main">
   <p:cSld>
     <p:spTree>
@@ -3275,7 +3684,7 @@
               <a:buChar char="•"/>
             </a:pPr>
             <a:r>
-              <a:rPr lang="en-US" sz="2000" smtClean="0">
+              <a:rPr lang="en-US" sz="2000" dirty="0" smtClean="0">
                 <a:latin typeface="Calibri Light" pitchFamily="34" charset="0"/>
               </a:rPr>
               <a:t>Roll Out Framework to Development </a:t>
@@ -3287,7 +3696,7 @@
               <a:buNone/>
             </a:pPr>
             <a:r>
-              <a:rPr lang="en-US" sz="2000" smtClean="0">
+              <a:rPr lang="en-US" sz="2000" dirty="0" smtClean="0">
                 <a:latin typeface="Calibri Light" pitchFamily="34" charset="0"/>
               </a:rPr>
               <a:t>Refactor Object layer commonality.  </a:t>
@@ -3299,7 +3708,7 @@
               <a:buNone/>
             </a:pPr>
             <a:r>
-              <a:rPr lang="en-US" sz="2000" smtClean="0">
+              <a:rPr lang="en-US" sz="2000" dirty="0" smtClean="0">
                 <a:latin typeface="Calibri Light" pitchFamily="34" charset="0"/>
               </a:rPr>
               <a:t>Move commonality to the Base Layer. </a:t>
@@ -3311,12 +3720,12 @@
               <a:buChar char="•"/>
             </a:pPr>
             <a:r>
-              <a:rPr lang="en-US" sz="1600" smtClean="0">
+              <a:rPr lang="en-US" sz="1600" dirty="0" smtClean="0">
                 <a:latin typeface="Calibri Light" pitchFamily="34" charset="0"/>
               </a:rPr>
               <a:t>The smaller the object layer, the easier to add new capability ( new applications )</a:t>
             </a:r>
-            <a:endParaRPr lang="en-US" sz="1800" smtClean="0">
+            <a:endParaRPr lang="en-US" sz="1800" dirty="0" smtClean="0">
               <a:latin typeface="Calibri Light" pitchFamily="34" charset="0"/>
             </a:endParaRPr>
           </a:p>
@@ -3326,7 +3735,7 @@
               <a:buNone/>
             </a:pPr>
             <a:r>
-              <a:rPr lang="en-US" sz="2000" smtClean="0">
+              <a:rPr lang="en-US" sz="2000" dirty="0" smtClean="0">
                 <a:latin typeface="Calibri Light" pitchFamily="34" charset="0"/>
               </a:rPr>
               <a:t>Improve top of Object layer making more uniform</a:t>
@@ -3338,7 +3747,7 @@
               <a:buChar char="•"/>
             </a:pPr>
             <a:r>
-              <a:rPr lang="en-US" sz="1600" smtClean="0">
+              <a:rPr lang="en-US" sz="1600" dirty="0" smtClean="0">
                 <a:latin typeface="Calibri Light" pitchFamily="34" charset="0"/>
               </a:rPr>
               <a:t>The smoother the top of the object layer, the easier to write test cases</a:t>
@@ -3346,7 +3755,7 @@
           </a:p>
           <a:p>
             <a:pPr marL="919163" lvl="1" indent="-342900" eaLnBrk="1" hangingPunct="1"/>
-            <a:endParaRPr lang="en-US" sz="1800" smtClean="0">
+            <a:endParaRPr lang="en-US" sz="1800" dirty="0" smtClean="0">
               <a:latin typeface="Calibri Light" pitchFamily="34" charset="0"/>
             </a:endParaRPr>
           </a:p>
@@ -3356,7 +3765,7 @@
               <a:buNone/>
             </a:pPr>
             <a:r>
-              <a:rPr lang="en-US" sz="1800" smtClean="0">
+              <a:rPr lang="en-US" sz="1800" dirty="0" smtClean="0">
                 <a:latin typeface="Calibri Light" pitchFamily="34" charset="0"/>
               </a:rPr>
               <a:t>Decouple function calls in the upper layer from in the bottom layer and below </a:t>
@@ -3368,7 +3777,7 @@
               <a:buChar char="•"/>
             </a:pPr>
             <a:r>
-              <a:rPr lang="en-US" sz="1600" smtClean="0">
+              <a:rPr lang="en-US" sz="1600" dirty="0" smtClean="0">
                 <a:latin typeface="Calibri Light" pitchFamily="34" charset="0"/>
               </a:rPr>
               <a:t>Keep calls to Protractor in the mid Layer ( page Objects )</a:t>
@@ -3380,7 +3789,7 @@
               <a:buChar char="•"/>
             </a:pPr>
             <a:r>
-              <a:rPr lang="en-US" sz="1600" smtClean="0">
+              <a:rPr lang="en-US" sz="1600" dirty="0" smtClean="0">
                 <a:latin typeface="Calibri Light" pitchFamily="34" charset="0"/>
               </a:rPr>
               <a:t>Work in localized well isolated areas.  Keep the churn away from the dev engineers</a:t>
@@ -3389,7 +3798,7 @@
           <a:p>
             <a:pPr marL="342900" indent="-342900" eaLnBrk="1" hangingPunct="1"/>
             <a:r>
-              <a:rPr lang="en-US" sz="800" smtClean="0">
+              <a:rPr lang="en-US" sz="800" dirty="0" smtClean="0">
                 <a:latin typeface="Calibri Light" pitchFamily="34" charset="0"/>
               </a:rPr>
               <a:t>  </a:t>
@@ -3401,14 +3810,17 @@
               <a:buChar char="•"/>
             </a:pPr>
             <a:r>
-              <a:rPr lang="en-US" sz="2000" smtClean="0">
+              <a:rPr lang="en-US" sz="2000" dirty="0" smtClean="0">
                 <a:latin typeface="Calibri Light" pitchFamily="34" charset="0"/>
               </a:rPr>
               <a:t>Ability to spin up new application</a:t>
             </a:r>
           </a:p>
           <a:p>
-            <a:pPr marL="919163" lvl="1" indent="-342900" eaLnBrk="1" hangingPunct="1"/>
+            <a:pPr marL="919163" lvl="1" indent="-342900" eaLnBrk="1" hangingPunct="1">
+              <a:buFont typeface="Arial" panose="020B0604020202020204" pitchFamily="34" charset="0"/>
+              <a:buChar char="•"/>
+            </a:pPr>
             <a:r>
               <a:rPr lang="en-US" sz="1600" smtClean="0">
                 <a:latin typeface="Calibri Light" pitchFamily="34" charset="0"/>
@@ -3419,7 +3831,7 @@
           <a:p>
             <a:pPr marL="342900" indent="-342900" eaLnBrk="1" hangingPunct="1"/>
             <a:r>
-              <a:rPr lang="en-US" sz="800" smtClean="0">
+              <a:rPr lang="en-US" sz="800" dirty="0" smtClean="0">
                 <a:latin typeface="Calibri Light" pitchFamily="34" charset="0"/>
               </a:rPr>
               <a:t>          </a:t>
@@ -3431,16 +3843,25 @@
               <a:buChar char="•"/>
             </a:pPr>
             <a:r>
-              <a:rPr lang="en-US" sz="2000" smtClean="0">
-                <a:latin typeface="Calibri Light" pitchFamily="34" charset="0"/>
-              </a:rPr>
-              <a:t>Improved Reporting,  add a dashboard, provide stasistics</a:t>
-            </a:r>
+              <a:rPr lang="en-US" sz="2000" dirty="0" smtClean="0">
+                <a:latin typeface="Calibri Light" pitchFamily="34" charset="0"/>
+              </a:rPr>
+              <a:t>Improved Reporting,  add a dashboard, provide </a:t>
+            </a:r>
+            <a:r>
+              <a:rPr lang="en-US" sz="2000" dirty="0" err="1" smtClean="0">
+                <a:latin typeface="Calibri Light" pitchFamily="34" charset="0"/>
+              </a:rPr>
+              <a:t>stasistics</a:t>
+            </a:r>
+            <a:endParaRPr lang="en-US" sz="2000" dirty="0" smtClean="0">
+              <a:latin typeface="Calibri Light" pitchFamily="34" charset="0"/>
+            </a:endParaRPr>
           </a:p>
           <a:p>
             <a:pPr marL="342900" indent="-342900" eaLnBrk="1" hangingPunct="1"/>
             <a:r>
-              <a:rPr lang="en-US" sz="800" smtClean="0">
+              <a:rPr lang="en-US" sz="800" dirty="0" smtClean="0">
                 <a:latin typeface="Calibri Light" pitchFamily="34" charset="0"/>
               </a:rPr>
               <a:t>          </a:t>
@@ -3452,7 +3873,7 @@
               <a:buChar char="•"/>
             </a:pPr>
             <a:r>
-              <a:rPr lang="en-US" sz="2000" smtClean="0">
+              <a:rPr lang="en-US" sz="2000" dirty="0" smtClean="0">
                 <a:latin typeface="Calibri Light" pitchFamily="34" charset="0"/>
               </a:rPr>
               <a:t>Test Headless  : Trying to overcome CPU and Memory consumption</a:t>
@@ -3461,7 +3882,7 @@
           <a:p>
             <a:pPr marL="342900" indent="-342900" eaLnBrk="1" hangingPunct="1"/>
             <a:r>
-              <a:rPr lang="en-US" sz="800" smtClean="0">
+              <a:rPr lang="en-US" sz="800" dirty="0" smtClean="0">
                 <a:latin typeface="Calibri Light" pitchFamily="34" charset="0"/>
               </a:rPr>
               <a:t>    </a:t>
@@ -3473,7 +3894,7 @@
               <a:buChar char="•"/>
             </a:pPr>
             <a:r>
-              <a:rPr lang="en-US" sz="2000" smtClean="0">
+              <a:rPr lang="en-US" sz="2000" dirty="0" smtClean="0">
                 <a:latin typeface="Calibri Light" pitchFamily="34" charset="0"/>
               </a:rPr>
               <a:t>Mobile devices</a:t>
@@ -3481,7 +3902,7 @@
           </a:p>
           <a:p>
             <a:pPr marL="342900" indent="-342900" eaLnBrk="1" hangingPunct="1"/>
-            <a:endParaRPr lang="en-US" sz="2000" smtClean="0">
+            <a:endParaRPr lang="en-US" sz="2000" dirty="0" smtClean="0">
               <a:latin typeface="Calibri Light" pitchFamily="34" charset="0"/>
             </a:endParaRPr>
           </a:p>
@@ -3502,7 +3923,7 @@
 </p:sld>
 </file>
 
-<file path=ppt/slides/slide14.xml><?xml version="1.0" encoding="utf-8"?>
+<file path=ppt/slides/slide15.xml><?xml version="1.0" encoding="utf-8"?>
 <p:sld xmlns:a="http://schemas.openxmlformats.org/drawingml/2006/main" xmlns:r="http://schemas.openxmlformats.org/officeDocument/2006/relationships" xmlns:p="http://schemas.openxmlformats.org/presentationml/2006/main">
   <p:cSld>
     <p:spTree>
@@ -4099,7 +4520,7 @@
 </p:sld>
 </file>
 
-<file path=ppt/slides/slide15.xml><?xml version="1.0" encoding="utf-8"?>
+<file path=ppt/slides/slide16.xml><?xml version="1.0" encoding="utf-8"?>
 <p:sld xmlns:a="http://schemas.openxmlformats.org/drawingml/2006/main" xmlns:r="http://schemas.openxmlformats.org/officeDocument/2006/relationships" xmlns:p="http://schemas.openxmlformats.org/presentationml/2006/main">
   <p:cSld>
     <p:spTree>
@@ -4174,7 +4595,7 @@
               <a:buChar char="•"/>
             </a:pPr>
             <a:r>
-              <a:rPr lang="en-US" sz="2000" b="1" smtClean="0">
+              <a:rPr lang="en-US" sz="2000" b="1" dirty="0" smtClean="0">
                 <a:latin typeface="Calibri Light" pitchFamily="34" charset="0"/>
               </a:rPr>
               <a:t>Shopping &amp; Buying Development Engineers</a:t>
@@ -4188,9 +4609,11 @@
               <a:spcBef>
                 <a:spcPct val="0"/>
               </a:spcBef>
-            </a:pPr>
-            <a:r>
-              <a:rPr lang="en-US" sz="1400" smtClean="0">
+              <a:buFont typeface="Arial" panose="020B0604020202020204" pitchFamily="34" charset="0"/>
+              <a:buChar char="•"/>
+            </a:pPr>
+            <a:r>
+              <a:rPr lang="en-US" sz="1400" dirty="0" smtClean="0">
                 <a:latin typeface="Calibri Light" pitchFamily="34" charset="0"/>
               </a:rPr>
               <a:t>Responsible for all new  Page Level Functional Integration Tests</a:t>
@@ -4204,14 +4627,28 @@
               <a:spcBef>
                 <a:spcPct val="0"/>
               </a:spcBef>
-            </a:pPr>
-            <a:r>
-              <a:rPr lang="en-US" sz="1400" smtClean="0">
-                <a:latin typeface="Calibri Light" pitchFamily="34" charset="0"/>
-              </a:rPr>
-              <a:t>Responsible for correcting all test failures in  ../fitmp  directory, keeping it completely operational</a:t>
-            </a:r>
-            <a:endParaRPr lang="en-US" sz="1400" b="1" smtClean="0">
+              <a:buFont typeface="Arial" panose="020B0604020202020204" pitchFamily="34" charset="0"/>
+              <a:buChar char="•"/>
+            </a:pPr>
+            <a:r>
+              <a:rPr lang="en-US" sz="1400" dirty="0" smtClean="0">
+                <a:latin typeface="Calibri Light" pitchFamily="34" charset="0"/>
+              </a:rPr>
+              <a:t>Responsible for correcting all test failures in  ../</a:t>
+            </a:r>
+            <a:r>
+              <a:rPr lang="en-US" sz="1400" dirty="0" err="1" smtClean="0">
+                <a:latin typeface="Calibri Light" pitchFamily="34" charset="0"/>
+              </a:rPr>
+              <a:t>fitmp</a:t>
+            </a:r>
+            <a:r>
+              <a:rPr lang="en-US" sz="1400" dirty="0" smtClean="0">
+                <a:latin typeface="Calibri Light" pitchFamily="34" charset="0"/>
+              </a:rPr>
+              <a:t>  directory, keeping it completely operational</a:t>
+            </a:r>
+            <a:endParaRPr lang="en-US" sz="1400" b="1" dirty="0" smtClean="0">
               <a:latin typeface="Calibri Light" pitchFamily="34" charset="0"/>
             </a:endParaRPr>
           </a:p>
@@ -4224,7 +4661,7 @@
               <a:buChar char="•"/>
             </a:pPr>
             <a:r>
-              <a:rPr lang="en-US" sz="2000" b="1" smtClean="0">
+              <a:rPr lang="en-US" sz="2000" b="1" dirty="0" smtClean="0">
                 <a:latin typeface="Calibri Light" pitchFamily="34" charset="0"/>
               </a:rPr>
               <a:t>Provider Directory Development Engineers </a:t>
@@ -4238,9 +4675,11 @@
               <a:spcBef>
                 <a:spcPct val="0"/>
               </a:spcBef>
-            </a:pPr>
-            <a:r>
-              <a:rPr lang="en-US" sz="1400" smtClean="0">
+              <a:buFont typeface="Arial" panose="020B0604020202020204" pitchFamily="34" charset="0"/>
+              <a:buChar char="•"/>
+            </a:pPr>
+            <a:r>
+              <a:rPr lang="en-US" sz="1400" dirty="0" smtClean="0">
                 <a:latin typeface="Calibri Light" pitchFamily="34" charset="0"/>
               </a:rPr>
               <a:t>Responsible for all new Template level Functional Integration Tests</a:t>
@@ -4254,12 +4693,26 @@
               <a:spcBef>
                 <a:spcPct val="0"/>
               </a:spcBef>
-            </a:pPr>
-            <a:r>
-              <a:rPr lang="en-US" sz="1400" smtClean="0">
-                <a:latin typeface="Calibri Light" pitchFamily="34" charset="0"/>
-              </a:rPr>
-              <a:t>Responsible for correcting all test failures in the  ../fitpd  directory, keeping all test operational</a:t>
+              <a:buFont typeface="Arial" panose="020B0604020202020204" pitchFamily="34" charset="0"/>
+              <a:buChar char="•"/>
+            </a:pPr>
+            <a:r>
+              <a:rPr lang="en-US" sz="1400" dirty="0" smtClean="0">
+                <a:latin typeface="Calibri Light" pitchFamily="34" charset="0"/>
+              </a:rPr>
+              <a:t>Responsible for correcting all test failures in the  ../</a:t>
+            </a:r>
+            <a:r>
+              <a:rPr lang="en-US" sz="1400" dirty="0" err="1" smtClean="0">
+                <a:latin typeface="Calibri Light" pitchFamily="34" charset="0"/>
+              </a:rPr>
+              <a:t>fitpd</a:t>
+            </a:r>
+            <a:r>
+              <a:rPr lang="en-US" sz="1400" dirty="0" smtClean="0">
+                <a:latin typeface="Calibri Light" pitchFamily="34" charset="0"/>
+              </a:rPr>
+              <a:t>  directory, keeping all test operational</a:t>
             </a:r>
           </a:p>
           <a:p>
@@ -4271,7 +4724,7 @@
               <a:buChar char="•"/>
             </a:pPr>
             <a:r>
-              <a:rPr lang="en-US" sz="2000" b="1" smtClean="0">
+              <a:rPr lang="en-US" sz="2000" b="1" dirty="0" smtClean="0">
                 <a:latin typeface="Calibri Light" pitchFamily="34" charset="0"/>
               </a:rPr>
               <a:t> Core Technology API Team engineers</a:t>
@@ -4285,9 +4738,11 @@
               <a:spcBef>
                 <a:spcPct val="0"/>
               </a:spcBef>
-            </a:pPr>
-            <a:r>
-              <a:rPr lang="en-US" sz="1400" smtClean="0">
+              <a:buFont typeface="Arial" panose="020B0604020202020204" pitchFamily="34" charset="0"/>
+              <a:buChar char="•"/>
+            </a:pPr>
+            <a:r>
+              <a:rPr lang="en-US" sz="1400" dirty="0" smtClean="0">
                 <a:latin typeface="Calibri Light" pitchFamily="34" charset="0"/>
               </a:rPr>
               <a:t>Responsible for adding new tests to the REST API regression suite </a:t>
@@ -4301,12 +4756,26 @@
               <a:spcBef>
                 <a:spcPct val="0"/>
               </a:spcBef>
-            </a:pPr>
-            <a:r>
-              <a:rPr lang="en-US" sz="1400" smtClean="0">
-                <a:latin typeface="Calibri Light" pitchFamily="34" charset="0"/>
-              </a:rPr>
-              <a:t>Responsible for correcting all test failures in the ../fitapi directory, keeping all test operational</a:t>
+              <a:buFont typeface="Arial" panose="020B0604020202020204" pitchFamily="34" charset="0"/>
+              <a:buChar char="•"/>
+            </a:pPr>
+            <a:r>
+              <a:rPr lang="en-US" sz="1400" dirty="0" smtClean="0">
+                <a:latin typeface="Calibri Light" pitchFamily="34" charset="0"/>
+              </a:rPr>
+              <a:t>Responsible for correcting all test failures in the ../</a:t>
+            </a:r>
+            <a:r>
+              <a:rPr lang="en-US" sz="1400" dirty="0" err="1" smtClean="0">
+                <a:latin typeface="Calibri Light" pitchFamily="34" charset="0"/>
+              </a:rPr>
+              <a:t>fitapi</a:t>
+            </a:r>
+            <a:r>
+              <a:rPr lang="en-US" sz="1400" dirty="0" smtClean="0">
+                <a:latin typeface="Calibri Light" pitchFamily="34" charset="0"/>
+              </a:rPr>
+              <a:t> directory, keeping all test operational</a:t>
             </a:r>
           </a:p>
           <a:p>
@@ -4318,7 +4787,7 @@
               <a:buChar char="•"/>
             </a:pPr>
             <a:r>
-              <a:rPr lang="en-US" sz="500" b="1" smtClean="0">
+              <a:rPr lang="en-US" sz="500" b="1" dirty="0" smtClean="0">
                 <a:latin typeface="Calibri Light" pitchFamily="34" charset="0"/>
               </a:rPr>
               <a:t>             </a:t>
@@ -4333,7 +4802,7 @@
               <a:buChar char="•"/>
             </a:pPr>
             <a:r>
-              <a:rPr lang="en-US" sz="2000" b="1" smtClean="0">
+              <a:rPr lang="en-US" sz="2000" b="1" dirty="0" smtClean="0">
                 <a:latin typeface="Calibri Light" pitchFamily="34" charset="0"/>
               </a:rPr>
               <a:t>NGTA Team engineers</a:t>
@@ -4351,7 +4820,7 @@
               <a:buChar char="•"/>
             </a:pPr>
             <a:r>
-              <a:rPr lang="en-US" sz="1400" smtClean="0">
+              <a:rPr lang="en-US" sz="1400" dirty="0" smtClean="0">
                 <a:latin typeface="Calibri Light" pitchFamily="34" charset="0"/>
               </a:rPr>
               <a:t>Oversee and manage all Framework development. </a:t>
@@ -4369,7 +4838,7 @@
               <a:buChar char="•"/>
             </a:pPr>
             <a:r>
-              <a:rPr lang="en-US" sz="1400" smtClean="0">
+              <a:rPr lang="en-US" sz="1400" dirty="0" smtClean="0">
                 <a:latin typeface="Calibri Light" pitchFamily="34" charset="0"/>
               </a:rPr>
               <a:t>Continual frame work improvement, evaluating all need for new coverage</a:t>
@@ -4387,7 +4856,7 @@
               <a:buChar char="•"/>
             </a:pPr>
             <a:r>
-              <a:rPr lang="en-US" sz="1400" smtClean="0">
+              <a:rPr lang="en-US" sz="1400" dirty="0" smtClean="0">
                 <a:latin typeface="Calibri Light" pitchFamily="34" charset="0"/>
               </a:rPr>
               <a:t>Continually analyze mid layer code</a:t>
@@ -4405,7 +4874,7 @@
               <a:buChar char="•"/>
             </a:pPr>
             <a:r>
-              <a:rPr lang="en-US" sz="1400" smtClean="0">
+              <a:rPr lang="en-US" sz="1400" dirty="0" smtClean="0">
                 <a:latin typeface="Calibri Light" pitchFamily="34" charset="0"/>
               </a:rPr>
               <a:t>Refactor content from mid layer to the lower common layer</a:t>
@@ -4423,7 +4892,7 @@
               <a:buChar char="•"/>
             </a:pPr>
             <a:r>
-              <a:rPr lang="en-US" sz="1400" smtClean="0">
+              <a:rPr lang="en-US" sz="1400" dirty="0" smtClean="0">
                 <a:latin typeface="Calibri Light" pitchFamily="34" charset="0"/>
               </a:rPr>
               <a:t>Develop all End to End test automation scripts based on business use cases</a:t>
@@ -4487,7 +4956,7 @@
 </p:sld>
 </file>
 
-<file path=ppt/slides/slide16.xml><?xml version="1.0" encoding="utf-8"?>
+<file path=ppt/slides/slide17.xml><?xml version="1.0" encoding="utf-8"?>
 <p:sld xmlns:a="http://schemas.openxmlformats.org/drawingml/2006/main" xmlns:r="http://schemas.openxmlformats.org/officeDocument/2006/relationships" xmlns:p="http://schemas.openxmlformats.org/presentationml/2006/main">
   <p:cSld>
     <p:spTree>
@@ -4887,7 +5356,7 @@
 </p:sld>
 </file>
 
-<file path=ppt/slides/slide17.xml><?xml version="1.0" encoding="utf-8"?>
+<file path=ppt/slides/slide18.xml><?xml version="1.0" encoding="utf-8"?>
 <p:sld xmlns:a="http://schemas.openxmlformats.org/drawingml/2006/main" xmlns:r="http://schemas.openxmlformats.org/officeDocument/2006/relationships" xmlns:p="http://schemas.openxmlformats.org/presentationml/2006/main">
   <p:cSld>
     <p:spTree>
@@ -5051,7 +5520,7 @@
 </p:sld>
 </file>
 
-<file path=ppt/slides/slide18.xml><?xml version="1.0" encoding="utf-8"?>
+<file path=ppt/slides/slide19.xml><?xml version="1.0" encoding="utf-8"?>
 <p:sld xmlns:a="http://schemas.openxmlformats.org/drawingml/2006/main" xmlns:r="http://schemas.openxmlformats.org/officeDocument/2006/relationships" xmlns:p="http://schemas.openxmlformats.org/presentationml/2006/main">
   <p:cSld>
     <p:spTree>
@@ -7778,19 +8247,7 @@
               <a:rPr lang="en-US" sz="1900" b="1" dirty="0" smtClean="0">
                 <a:ea typeface="+mn-ea"/>
               </a:rPr>
-              <a:t>We use the same Node.js , </a:t>
-            </a:r>
-            <a:r>
-              <a:rPr lang="en-US" sz="1900" b="1" dirty="0" err="1" smtClean="0">
-                <a:ea typeface="+mn-ea"/>
-              </a:rPr>
-              <a:t>Frisby</a:t>
-            </a:r>
-            <a:r>
-              <a:rPr lang="en-US" sz="1900" b="1" dirty="0" smtClean="0">
-                <a:ea typeface="+mn-ea"/>
-              </a:rPr>
-              <a:t> http Library , JavaScript to automate all API calls.</a:t>
+              <a:t>We use the same Node.js , Frisby http Library , JavaScript to automate all API calls.</a:t>
             </a:r>
             <a:endParaRPr lang="en-US" sz="1900" b="1" dirty="0">
               <a:ea typeface="+mn-ea"/>
@@ -7913,21 +8370,40 @@
         </p:nvSpPr>
         <p:spPr>
           <a:xfrm>
-            <a:off x="498475" y="115888"/>
-            <a:ext cx="8540750" cy="957262"/>
+            <a:off x="498475" y="115887"/>
+            <a:ext cx="8540750" cy="1233795"/>
           </a:xfrm>
         </p:spPr>
         <p:txBody>
           <a:bodyPr anchor="t"/>
           <a:lstStyle/>
           <a:p>
-            <a:pPr algn="ctr" eaLnBrk="1" hangingPunct="1"/>
-            <a:r>
-              <a:rPr lang="en-US" sz="4500" smtClean="0">
-                <a:latin typeface="Calibri Light" pitchFamily="34" charset="0"/>
-              </a:rPr>
-              <a:t>ARCHITECTURAL TECH STACK</a:t>
-            </a:r>
+            <a:pPr algn="ctr" eaLnBrk="1" hangingPunct="1">
+              <a:lnSpc>
+                <a:spcPct val="95000"/>
+              </a:lnSpc>
+            </a:pPr>
+            <a:r>
+              <a:rPr lang="en-US" sz="4500" dirty="0" smtClean="0">
+                <a:latin typeface="Calibri Light" pitchFamily="34" charset="0"/>
+              </a:rPr>
+              <a:t>ARCHITECTURAL TECH </a:t>
+            </a:r>
+            <a:r>
+              <a:rPr lang="en-US" sz="4500" dirty="0" smtClean="0">
+                <a:latin typeface="Calibri Light" pitchFamily="34" charset="0"/>
+              </a:rPr>
+              <a:t>STACK        </a:t>
+            </a:r>
+            <a:r>
+              <a:rPr lang="en-US" sz="4000" dirty="0" smtClean="0">
+                <a:latin typeface="Calibri Light" pitchFamily="34" charset="0"/>
+              </a:rPr>
+              <a:t>REST API</a:t>
+            </a:r>
+            <a:endParaRPr lang="en-US" sz="4000" dirty="0" smtClean="0">
+              <a:latin typeface="Calibri Light" pitchFamily="34" charset="0"/>
+            </a:endParaRPr>
           </a:p>
         </p:txBody>
       </p:sp>
@@ -7941,7 +8417,7 @@
         </p:nvSpPr>
         <p:spPr bwMode="auto">
           <a:xfrm>
-            <a:off x="273050" y="944563"/>
+            <a:off x="273050" y="1349682"/>
             <a:ext cx="8855075" cy="608012"/>
           </a:xfrm>
           <a:prstGeom prst="rect">
@@ -7961,11 +8437,14 @@
           <a:p>
             <a:pPr algn="ctr"/>
             <a:r>
-              <a:rPr lang="en-US" sz="3100" b="1">
-                <a:latin typeface="Calibri Light" pitchFamily="34" charset="0"/>
-              </a:rPr>
-              <a:t>Git Repo     Node.js     Protractor     JavaScript   Jenkins</a:t>
-            </a:r>
+              <a:rPr lang="en-US" sz="3100" b="1" dirty="0" smtClean="0">
+                <a:latin typeface="Calibri Light" pitchFamily="34" charset="0"/>
+              </a:rPr>
+              <a:t>     Node.js         Frisby       JavaScript  </a:t>
+            </a:r>
+            <a:endParaRPr lang="en-US" sz="3100" b="1" dirty="0">
+              <a:latin typeface="Calibri Light" pitchFamily="34" charset="0"/>
+            </a:endParaRPr>
           </a:p>
         </p:txBody>
       </p:sp>
@@ -7979,8 +8458,8 @@
         </p:nvSpPr>
         <p:spPr>
           <a:xfrm>
-            <a:off x="273050" y="1338263"/>
-            <a:ext cx="4014788" cy="5376862"/>
+            <a:off x="273050" y="1720228"/>
+            <a:ext cx="4014788" cy="5137772"/>
           </a:xfrm>
           <a:prstGeom prst="rect">
             <a:avLst/>
@@ -8175,6 +8654,604 @@
               <a:defRPr/>
             </a:pPr>
             <a:r>
+              <a:rPr lang="en-US" sz="2000" dirty="0" smtClean="0"/>
+              <a:t>Persisted data is decoupled </a:t>
+            </a:r>
+          </a:p>
+          <a:p>
+            <a:pPr fontAlgn="auto">
+              <a:spcAft>
+                <a:spcPts val="0"/>
+              </a:spcAft>
+              <a:defRPr/>
+            </a:pPr>
+            <a:r>
+              <a:rPr lang="en-US" sz="600" dirty="0"/>
+              <a:t> </a:t>
+            </a:r>
+            <a:r>
+              <a:rPr lang="en-US" sz="600" dirty="0" smtClean="0"/>
+              <a:t>     </a:t>
+            </a:r>
+            <a:endParaRPr lang="en-US" sz="600" dirty="0" smtClean="0"/>
+          </a:p>
+          <a:p>
+            <a:pPr fontAlgn="auto">
+              <a:spcAft>
+                <a:spcPts val="0"/>
+              </a:spcAft>
+              <a:defRPr/>
+            </a:pPr>
+            <a:r>
+              <a:rPr lang="en-US" sz="500" dirty="0" smtClean="0"/>
+              <a:t>      </a:t>
+            </a:r>
+            <a:r>
+              <a:rPr lang="en-US" sz="600" dirty="0" smtClean="0"/>
+              <a:t>           </a:t>
+            </a:r>
+            <a:endParaRPr lang="en-US" sz="600" dirty="0" smtClean="0"/>
+          </a:p>
+          <a:p>
+            <a:pPr fontAlgn="auto">
+              <a:lnSpc>
+                <a:spcPct val="105000"/>
+              </a:lnSpc>
+              <a:spcBef>
+                <a:spcPts val="0"/>
+              </a:spcBef>
+              <a:spcAft>
+                <a:spcPts val="0"/>
+              </a:spcAft>
+              <a:buFont typeface="Arial" panose="020B0604020202020204" pitchFamily="34" charset="0"/>
+              <a:buChar char="•"/>
+              <a:defRPr/>
+            </a:pPr>
+            <a:r>
+              <a:rPr lang="en-US" sz="1800" b="1" dirty="0" smtClean="0"/>
+              <a:t>REST API:</a:t>
+            </a:r>
+            <a:r>
+              <a:rPr lang="en-US" sz="1800" dirty="0"/>
+              <a:t> The philosophical basis of </a:t>
+            </a:r>
+            <a:r>
+              <a:rPr lang="en-US" sz="1800" b="1" u="sng" dirty="0" smtClean="0"/>
+              <a:t>A</a:t>
+            </a:r>
+            <a:r>
+              <a:rPr lang="en-US" sz="1800" dirty="0" smtClean="0"/>
+              <a:t>pplication </a:t>
+            </a:r>
+            <a:r>
+              <a:rPr lang="en-US" sz="1800" b="1" u="sng" dirty="0"/>
+              <a:t>P</a:t>
+            </a:r>
+            <a:r>
+              <a:rPr lang="en-US" sz="1800" dirty="0" smtClean="0"/>
+              <a:t>rogramming </a:t>
+            </a:r>
+            <a:r>
+              <a:rPr lang="en-US" sz="1800" b="1" u="sng" dirty="0"/>
+              <a:t>I</a:t>
+            </a:r>
+            <a:r>
+              <a:rPr lang="en-US" sz="1800" dirty="0"/>
+              <a:t>nterfaces is to decouple the consumer from the internal workings of the publisher</a:t>
+            </a:r>
+            <a:r>
+              <a:rPr lang="en-US" sz="900" dirty="0" smtClean="0"/>
+              <a:t>  </a:t>
+            </a:r>
+            <a:endParaRPr lang="en-US" sz="900" dirty="0" smtClean="0"/>
+          </a:p>
+          <a:p>
+            <a:pPr indent="-234950" fontAlgn="auto">
+              <a:lnSpc>
+                <a:spcPct val="100000"/>
+              </a:lnSpc>
+              <a:spcBef>
+                <a:spcPts val="0"/>
+              </a:spcBef>
+              <a:spcAft>
+                <a:spcPts val="0"/>
+              </a:spcAft>
+              <a:defRPr/>
+            </a:pPr>
+            <a:r>
+              <a:rPr lang="en-US" sz="600" dirty="0" smtClean="0"/>
+              <a:t>   </a:t>
+            </a:r>
+            <a:endParaRPr lang="en-US" sz="600" dirty="0" smtClean="0"/>
+          </a:p>
+          <a:p>
+            <a:pPr fontAlgn="auto">
+              <a:lnSpc>
+                <a:spcPct val="105000"/>
+              </a:lnSpc>
+              <a:spcBef>
+                <a:spcPts val="0"/>
+              </a:spcBef>
+              <a:spcAft>
+                <a:spcPts val="0"/>
+              </a:spcAft>
+              <a:buFont typeface="Arial" panose="020B0604020202020204" pitchFamily="34" charset="0"/>
+              <a:buChar char="•"/>
+              <a:defRPr/>
+            </a:pPr>
+            <a:r>
+              <a:rPr lang="en-US" sz="1800" b="1" dirty="0" smtClean="0"/>
+              <a:t>ACCESS:  </a:t>
+            </a:r>
+            <a:r>
+              <a:rPr lang="en-US" sz="1800" dirty="0" smtClean="0"/>
+              <a:t>Engineering will only guarantee to honor an agreed upon Contract where actions will be performed upon receipt of valid data.</a:t>
+            </a:r>
+          </a:p>
+          <a:p>
+            <a:pPr fontAlgn="auto">
+              <a:lnSpc>
+                <a:spcPct val="100000"/>
+              </a:lnSpc>
+              <a:spcBef>
+                <a:spcPts val="0"/>
+              </a:spcBef>
+              <a:spcAft>
+                <a:spcPts val="0"/>
+              </a:spcAft>
+              <a:buFont typeface="Arial" panose="020B0604020202020204" pitchFamily="34" charset="0"/>
+              <a:buChar char="•"/>
+              <a:defRPr/>
+            </a:pPr>
+            <a:endParaRPr lang="en-US" sz="500" b="1" dirty="0" smtClean="0"/>
+          </a:p>
+          <a:p>
+            <a:pPr fontAlgn="auto">
+              <a:lnSpc>
+                <a:spcPct val="105000"/>
+              </a:lnSpc>
+              <a:spcBef>
+                <a:spcPts val="0"/>
+              </a:spcBef>
+              <a:spcAft>
+                <a:spcPts val="0"/>
+              </a:spcAft>
+              <a:buFont typeface="Arial" panose="020B0604020202020204" pitchFamily="34" charset="0"/>
+              <a:buChar char="•"/>
+              <a:defRPr/>
+            </a:pPr>
+            <a:r>
+              <a:rPr lang="en-US" sz="1800" b="1" dirty="0" smtClean="0"/>
+              <a:t>VALIDATION: </a:t>
+            </a:r>
+            <a:r>
+              <a:rPr lang="en-US" sz="1800" dirty="0" smtClean="0"/>
+              <a:t> APIs that effect a change to the persisted data will be published with an API call that can return the new state that was changed. </a:t>
+            </a:r>
+            <a:endParaRPr lang="en-US" sz="1800" b="1" dirty="0"/>
+          </a:p>
+          <a:p>
+            <a:pPr fontAlgn="auto">
+              <a:lnSpc>
+                <a:spcPct val="100000"/>
+              </a:lnSpc>
+              <a:spcBef>
+                <a:spcPts val="0"/>
+              </a:spcBef>
+              <a:spcAft>
+                <a:spcPts val="0"/>
+              </a:spcAft>
+              <a:defRPr/>
+            </a:pPr>
+            <a:r>
+              <a:rPr lang="en-US" sz="800" b="1" dirty="0" smtClean="0"/>
+              <a:t>       </a:t>
+            </a:r>
+          </a:p>
+          <a:p>
+            <a:pPr fontAlgn="auto">
+              <a:lnSpc>
+                <a:spcPct val="100000"/>
+              </a:lnSpc>
+              <a:spcBef>
+                <a:spcPts val="0"/>
+              </a:spcBef>
+              <a:spcAft>
+                <a:spcPts val="0"/>
+              </a:spcAft>
+              <a:defRPr/>
+            </a:pPr>
+            <a:r>
+              <a:rPr lang="en-US" sz="1400" dirty="0" smtClean="0"/>
+              <a:t>This is the only acceptable method to validate APIs that change internal state and return status.  Any more access would break the </a:t>
+            </a:r>
+            <a:r>
+              <a:rPr lang="en-US" sz="1400" dirty="0"/>
+              <a:t>P</a:t>
+            </a:r>
+            <a:r>
+              <a:rPr lang="en-US" sz="1400" dirty="0" smtClean="0"/>
+              <a:t>hilosophical Contract</a:t>
+            </a:r>
+            <a:endParaRPr lang="en-US" sz="1400" dirty="0"/>
+          </a:p>
+        </p:txBody>
+      </p:sp>
+      <p:pic>
+        <p:nvPicPr>
+          <p:cNvPr id="4" name="Picture 3"/>
+          <p:cNvPicPr>
+            <a:picLocks noChangeAspect="1"/>
+          </p:cNvPicPr>
+          <p:nvPr/>
+        </p:nvPicPr>
+        <p:blipFill>
+          <a:blip r:embed="rId3">
+            <a:extLst>
+              <a:ext uri="{28A0092B-C50C-407E-A947-70E740481C1C}">
+                <a14:useLocalDpi xmlns:a14="http://schemas.microsoft.com/office/drawing/2010/main" val="0"/>
+              </a:ext>
+            </a:extLst>
+          </a:blip>
+          <a:stretch>
+            <a:fillRect/>
+          </a:stretch>
+        </p:blipFill>
+        <p:spPr>
+          <a:xfrm>
+            <a:off x="4402705" y="2893673"/>
+            <a:ext cx="4636520" cy="3826614"/>
+          </a:xfrm>
+          <a:prstGeom prst="rect">
+            <a:avLst/>
+          </a:prstGeom>
+        </p:spPr>
+      </p:pic>
+    </p:spTree>
+    <p:extLst>
+      <p:ext uri="{BB962C8B-B14F-4D97-AF65-F5344CB8AC3E}">
+        <p14:creationId xmlns:p14="http://schemas.microsoft.com/office/powerpoint/2010/main" val="4266826973"/>
+      </p:ext>
+    </p:extLst>
+  </p:cSld>
+  <p:clrMapOvr>
+    <a:masterClrMapping/>
+  </p:clrMapOvr>
+  <p:timing>
+    <p:tnLst>
+      <p:par>
+        <p:cTn id="1" dur="indefinite" restart="never" nodeType="tmRoot"/>
+      </p:par>
+    </p:tnLst>
+  </p:timing>
+</p:sld>
+</file>
+
+<file path=ppt/slides/slide7.xml><?xml version="1.0" encoding="utf-8"?>
+<p:sld xmlns:a="http://schemas.openxmlformats.org/drawingml/2006/main" xmlns:r="http://schemas.openxmlformats.org/officeDocument/2006/relationships" xmlns:p="http://schemas.openxmlformats.org/presentationml/2006/main">
+  <p:cSld>
+    <p:spTree>
+      <p:nvGrpSpPr>
+        <p:cNvPr id="1" name=""/>
+        <p:cNvGrpSpPr/>
+        <p:nvPr/>
+      </p:nvGrpSpPr>
+      <p:grpSpPr>
+        <a:xfrm>
+          <a:off x="0" y="0"/>
+          <a:ext cx="0" cy="0"/>
+          <a:chOff x="0" y="0"/>
+          <a:chExt cx="0" cy="0"/>
+        </a:xfrm>
+      </p:grpSpPr>
+      <p:sp>
+        <p:nvSpPr>
+          <p:cNvPr id="15361" name="Title 1"/>
+          <p:cNvSpPr>
+            <a:spLocks noGrp="1"/>
+          </p:cNvSpPr>
+          <p:nvPr>
+            <p:ph type="title"/>
+          </p:nvPr>
+        </p:nvSpPr>
+        <p:spPr>
+          <a:xfrm>
+            <a:off x="498475" y="115887"/>
+            <a:ext cx="8540750" cy="1233795"/>
+          </a:xfrm>
+        </p:spPr>
+        <p:txBody>
+          <a:bodyPr anchor="t"/>
+          <a:lstStyle/>
+          <a:p>
+            <a:pPr algn="ctr" eaLnBrk="1" hangingPunct="1">
+              <a:lnSpc>
+                <a:spcPct val="90000"/>
+              </a:lnSpc>
+            </a:pPr>
+            <a:r>
+              <a:rPr lang="en-US" sz="4500" dirty="0" smtClean="0">
+                <a:latin typeface="Calibri Light" pitchFamily="34" charset="0"/>
+              </a:rPr>
+              <a:t>ARCHITECTURAL TECH </a:t>
+            </a:r>
+            <a:r>
+              <a:rPr lang="en-US" sz="4500" dirty="0" smtClean="0">
+                <a:latin typeface="Calibri Light" pitchFamily="34" charset="0"/>
+              </a:rPr>
+              <a:t>STACK       </a:t>
+            </a:r>
+            <a:r>
+              <a:rPr lang="en-US" sz="4000" dirty="0" smtClean="0">
+                <a:latin typeface="Calibri Light" pitchFamily="34" charset="0"/>
+              </a:rPr>
+              <a:t>Market Place</a:t>
+            </a:r>
+            <a:endParaRPr lang="en-US" sz="4000" dirty="0" smtClean="0">
+              <a:latin typeface="Calibri Light" pitchFamily="34" charset="0"/>
+            </a:endParaRPr>
+          </a:p>
+        </p:txBody>
+      </p:sp>
+      <p:sp>
+        <p:nvSpPr>
+          <p:cNvPr id="15362" name="Title 1"/>
+          <p:cNvSpPr txBox="1">
+            <a:spLocks/>
+          </p:cNvSpPr>
+          <p:nvPr/>
+        </p:nvSpPr>
+        <p:spPr bwMode="auto">
+          <a:xfrm>
+            <a:off x="273050" y="1349682"/>
+            <a:ext cx="8855075" cy="608012"/>
+          </a:xfrm>
+          <a:prstGeom prst="rect">
+            <a:avLst/>
+          </a:prstGeom>
+          <a:noFill/>
+          <a:ln w="9525">
+            <a:noFill/>
+            <a:miter lim="800000"/>
+            <a:headEnd/>
+            <a:tailEnd/>
+          </a:ln>
+        </p:spPr>
+        <p:txBody>
+          <a:bodyPr/>
+          <a:lstStyle/>
+          <a:p>
+            <a:pPr algn="ctr"/>
+            <a:r>
+              <a:rPr lang="en-US" sz="3100" b="1" dirty="0" smtClean="0">
+                <a:latin typeface="Calibri Light" pitchFamily="34" charset="0"/>
+              </a:rPr>
+              <a:t>   Node.js     </a:t>
+            </a:r>
+            <a:r>
+              <a:rPr lang="en-US" sz="3100" b="1" dirty="0">
+                <a:latin typeface="Calibri Light" pitchFamily="34" charset="0"/>
+              </a:rPr>
+              <a:t>Protractor     </a:t>
+            </a:r>
+            <a:r>
+              <a:rPr lang="en-US" sz="3100" b="1" dirty="0" smtClean="0">
+                <a:latin typeface="Calibri Light" pitchFamily="34" charset="0"/>
+              </a:rPr>
+              <a:t>JavaScript</a:t>
+            </a:r>
+            <a:endParaRPr lang="en-US" sz="3100" b="1" dirty="0">
+              <a:latin typeface="Calibri Light" pitchFamily="34" charset="0"/>
+            </a:endParaRPr>
+          </a:p>
+        </p:txBody>
+      </p:sp>
+      <p:sp>
+        <p:nvSpPr>
+          <p:cNvPr id="6" name="Content Placeholder 2"/>
+          <p:cNvSpPr txBox="1">
+            <a:spLocks/>
+          </p:cNvSpPr>
+          <p:nvPr/>
+        </p:nvSpPr>
+        <p:spPr>
+          <a:xfrm>
+            <a:off x="273050" y="1801253"/>
+            <a:ext cx="4014788" cy="5050961"/>
+          </a:xfrm>
+          <a:prstGeom prst="rect">
+            <a:avLst/>
+          </a:prstGeom>
+        </p:spPr>
+        <p:txBody>
+          <a:bodyPr>
+            <a:normAutofit/>
+          </a:bodyPr>
+          <a:lstStyle>
+            <a:lvl1pPr marL="0" indent="0" algn="l" defTabSz="457200" rtl="0" eaLnBrk="1" latinLnBrk="0" hangingPunct="1">
+              <a:lnSpc>
+                <a:spcPct val="80000"/>
+              </a:lnSpc>
+              <a:spcBef>
+                <a:spcPct val="20000"/>
+              </a:spcBef>
+              <a:buSzPct val="100000"/>
+              <a:buFontTx/>
+              <a:buNone/>
+              <a:defRPr sz="2400" b="0" i="0" kern="1200" baseline="0">
+                <a:solidFill>
+                  <a:schemeClr val="tx1"/>
+                </a:solidFill>
+                <a:latin typeface="Calibri Light"/>
+                <a:ea typeface="+mn-ea"/>
+                <a:cs typeface="Calibri Light"/>
+              </a:defRPr>
+            </a:lvl1pPr>
+            <a:lvl2pPr marL="576263" indent="-234950" algn="l" defTabSz="457200" rtl="0" eaLnBrk="1" latinLnBrk="0" hangingPunct="1">
+              <a:lnSpc>
+                <a:spcPct val="80000"/>
+              </a:lnSpc>
+              <a:spcBef>
+                <a:spcPct val="20000"/>
+              </a:spcBef>
+              <a:buSzPct val="100000"/>
+              <a:buFontTx/>
+              <a:buBlip>
+                <a:blip r:embed="rId2"/>
+              </a:buBlip>
+              <a:defRPr sz="2200" b="0" i="0" kern="1200">
+                <a:solidFill>
+                  <a:schemeClr val="tx1"/>
+                </a:solidFill>
+                <a:latin typeface="Calibri Light"/>
+                <a:ea typeface="+mn-ea"/>
+                <a:cs typeface="Calibri Light"/>
+              </a:defRPr>
+            </a:lvl2pPr>
+            <a:lvl3pPr marL="801688" indent="-225425" algn="l" defTabSz="457200" rtl="0" eaLnBrk="1" latinLnBrk="0" hangingPunct="1">
+              <a:lnSpc>
+                <a:spcPct val="80000"/>
+              </a:lnSpc>
+              <a:spcBef>
+                <a:spcPct val="20000"/>
+              </a:spcBef>
+              <a:buSzPct val="100000"/>
+              <a:buFontTx/>
+              <a:buBlip>
+                <a:blip r:embed="rId2"/>
+              </a:buBlip>
+              <a:defRPr sz="2000" b="0" i="0" kern="1200">
+                <a:solidFill>
+                  <a:schemeClr val="tx1"/>
+                </a:solidFill>
+                <a:latin typeface="Calibri Light"/>
+                <a:ea typeface="+mn-ea"/>
+                <a:cs typeface="Calibri Light"/>
+              </a:defRPr>
+            </a:lvl3pPr>
+            <a:lvl4pPr marL="966788" indent="-165100" algn="l" defTabSz="457200" rtl="0" eaLnBrk="1" latinLnBrk="0" hangingPunct="1">
+              <a:lnSpc>
+                <a:spcPct val="80000"/>
+              </a:lnSpc>
+              <a:spcBef>
+                <a:spcPct val="20000"/>
+              </a:spcBef>
+              <a:buSzPct val="100000"/>
+              <a:buFontTx/>
+              <a:buBlip>
+                <a:blip r:embed="rId2"/>
+              </a:buBlip>
+              <a:defRPr sz="1800" b="0" i="0" kern="1200">
+                <a:solidFill>
+                  <a:schemeClr val="tx1"/>
+                </a:solidFill>
+                <a:latin typeface="Calibri Light"/>
+                <a:ea typeface="+mn-ea"/>
+                <a:cs typeface="Calibri Light"/>
+              </a:defRPr>
+            </a:lvl4pPr>
+            <a:lvl5pPr marL="1201738" indent="-176213" algn="l" defTabSz="457200" rtl="0" eaLnBrk="1" latinLnBrk="0" hangingPunct="1">
+              <a:lnSpc>
+                <a:spcPct val="80000"/>
+              </a:lnSpc>
+              <a:spcBef>
+                <a:spcPct val="20000"/>
+              </a:spcBef>
+              <a:buSzPct val="100000"/>
+              <a:buFontTx/>
+              <a:buBlip>
+                <a:blip r:embed="rId2"/>
+              </a:buBlip>
+              <a:defRPr sz="1600" b="0" i="0" kern="1200">
+                <a:solidFill>
+                  <a:schemeClr val="tx1"/>
+                </a:solidFill>
+                <a:latin typeface="Calibri Light"/>
+                <a:ea typeface="+mn-ea"/>
+                <a:cs typeface="Calibri Light"/>
+              </a:defRPr>
+            </a:lvl5pPr>
+            <a:lvl6pPr marL="2514600" indent="-228600" algn="l" defTabSz="457200" rtl="0" eaLnBrk="1" latinLnBrk="0" hangingPunct="1">
+              <a:spcBef>
+                <a:spcPct val="20000"/>
+              </a:spcBef>
+              <a:buFont typeface="Arial"/>
+              <a:buChar char="•"/>
+              <a:defRPr sz="2000" kern="1200">
+                <a:solidFill>
+                  <a:schemeClr val="tx1"/>
+                </a:solidFill>
+                <a:latin typeface="+mn-lt"/>
+                <a:ea typeface="+mn-ea"/>
+                <a:cs typeface="+mn-cs"/>
+              </a:defRPr>
+            </a:lvl6pPr>
+            <a:lvl7pPr marL="2971800" indent="-228600" algn="l" defTabSz="457200" rtl="0" eaLnBrk="1" latinLnBrk="0" hangingPunct="1">
+              <a:spcBef>
+                <a:spcPct val="20000"/>
+              </a:spcBef>
+              <a:buFont typeface="Arial"/>
+              <a:buChar char="•"/>
+              <a:defRPr sz="2000" kern="1200">
+                <a:solidFill>
+                  <a:schemeClr val="tx1"/>
+                </a:solidFill>
+                <a:latin typeface="+mn-lt"/>
+                <a:ea typeface="+mn-ea"/>
+                <a:cs typeface="+mn-cs"/>
+              </a:defRPr>
+            </a:lvl7pPr>
+            <a:lvl8pPr marL="3429000" indent="-228600" algn="l" defTabSz="457200" rtl="0" eaLnBrk="1" latinLnBrk="0" hangingPunct="1">
+              <a:spcBef>
+                <a:spcPct val="20000"/>
+              </a:spcBef>
+              <a:buFont typeface="Arial"/>
+              <a:buChar char="•"/>
+              <a:defRPr sz="2000" kern="1200">
+                <a:solidFill>
+                  <a:schemeClr val="tx1"/>
+                </a:solidFill>
+                <a:latin typeface="+mn-lt"/>
+                <a:ea typeface="+mn-ea"/>
+                <a:cs typeface="+mn-cs"/>
+              </a:defRPr>
+            </a:lvl8pPr>
+            <a:lvl9pPr marL="3886200" indent="-228600" algn="l" defTabSz="457200" rtl="0" eaLnBrk="1" latinLnBrk="0" hangingPunct="1">
+              <a:spcBef>
+                <a:spcPct val="20000"/>
+              </a:spcBef>
+              <a:buFont typeface="Arial"/>
+              <a:buChar char="•"/>
+              <a:defRPr sz="2000" kern="1200">
+                <a:solidFill>
+                  <a:schemeClr val="tx1"/>
+                </a:solidFill>
+                <a:latin typeface="+mn-lt"/>
+                <a:ea typeface="+mn-ea"/>
+                <a:cs typeface="+mn-cs"/>
+              </a:defRPr>
+            </a:lvl9pPr>
+          </a:lstStyle>
+          <a:p>
+            <a:pPr fontAlgn="auto">
+              <a:spcAft>
+                <a:spcPts val="0"/>
+              </a:spcAft>
+              <a:defRPr/>
+            </a:pPr>
+            <a:r>
+              <a:rPr lang="en-US" sz="600" dirty="0" smtClean="0"/>
+              <a:t>       </a:t>
+            </a:r>
+          </a:p>
+          <a:p>
+            <a:pPr algn="ctr" fontAlgn="auto">
+              <a:spcAft>
+                <a:spcPts val="0"/>
+              </a:spcAft>
+              <a:defRPr/>
+            </a:pPr>
+            <a:r>
               <a:rPr lang="en-US" dirty="0" smtClean="0"/>
               <a:t>Framework is Class</a:t>
             </a:r>
@@ -8199,27 +9276,14 @@
               <a:defRPr/>
             </a:pPr>
             <a:r>
-              <a:rPr lang="en-US" sz="1600" dirty="0" smtClean="0"/>
+              <a:rPr lang="en-US" sz="500" dirty="0" smtClean="0"/>
               <a:t>      </a:t>
             </a:r>
-          </a:p>
-          <a:p>
-            <a:pPr indent="-234950" fontAlgn="auto">
-              <a:lnSpc>
-                <a:spcPct val="100000"/>
-              </a:lnSpc>
-              <a:spcBef>
-                <a:spcPts val="0"/>
-              </a:spcBef>
-              <a:spcAft>
-                <a:spcPts val="0"/>
-              </a:spcAft>
-              <a:defRPr/>
-            </a:pPr>
-            <a:r>
-              <a:rPr lang="en-US" sz="1800" dirty="0" smtClean="0"/>
+            <a:r>
+              <a:rPr lang="en-US" sz="600" dirty="0" smtClean="0"/>
               <a:t>           </a:t>
             </a:r>
+            <a:endParaRPr lang="en-US" sz="600" dirty="0" smtClean="0"/>
           </a:p>
           <a:p>
             <a:pPr fontAlgn="auto">
@@ -8509,539 +9573,11 @@
         </p:spPr>
       </p:pic>
     </p:spTree>
-  </p:cSld>
-  <p:clrMapOvr>
-    <a:masterClrMapping/>
-  </p:clrMapOvr>
-  <p:timing>
-    <p:tnLst>
-      <p:par>
-        <p:cTn id="1" dur="indefinite" restart="never" nodeType="tmRoot"/>
-      </p:par>
-    </p:tnLst>
-  </p:timing>
-</p:sld>
-</file>
-
-<file path=ppt/slides/slide7.xml><?xml version="1.0" encoding="utf-8"?>
-<p:sld xmlns:a="http://schemas.openxmlformats.org/drawingml/2006/main" xmlns:r="http://schemas.openxmlformats.org/officeDocument/2006/relationships" xmlns:p="http://schemas.openxmlformats.org/presentationml/2006/main">
-  <p:cSld>
-    <p:spTree>
-      <p:nvGrpSpPr>
-        <p:cNvPr id="1" name=""/>
-        <p:cNvGrpSpPr/>
-        <p:nvPr/>
-      </p:nvGrpSpPr>
-      <p:grpSpPr>
-        <a:xfrm>
-          <a:off x="0" y="0"/>
-          <a:ext cx="0" cy="0"/>
-          <a:chOff x="0" y="0"/>
-          <a:chExt cx="0" cy="0"/>
-        </a:xfrm>
-      </p:grpSpPr>
-      <p:sp>
-        <p:nvSpPr>
-          <p:cNvPr id="2" name="Title 1"/>
-          <p:cNvSpPr>
-            <a:spLocks noGrp="1"/>
-          </p:cNvSpPr>
-          <p:nvPr>
-            <p:ph type="title"/>
-          </p:nvPr>
-        </p:nvSpPr>
-        <p:spPr>
-          <a:xfrm>
-            <a:off x="1527175" y="125413"/>
-            <a:ext cx="5238750" cy="1325562"/>
-          </a:xfrm>
-        </p:spPr>
-        <p:txBody>
-          <a:bodyPr rtlCol="0" anchor="t">
-            <a:normAutofit/>
-          </a:bodyPr>
-          <a:lstStyle/>
-          <a:p>
-            <a:pPr algn="ctr" eaLnBrk="1" fontAlgn="auto" hangingPunct="1">
-              <a:spcAft>
-                <a:spcPts val="0"/>
-              </a:spcAft>
-              <a:defRPr/>
-            </a:pPr>
-            <a:r>
-              <a:rPr lang="en-US" dirty="0" smtClean="0">
-                <a:ea typeface="+mj-ea"/>
-              </a:rPr>
-              <a:t>TEST EXECUTION  </a:t>
-            </a:r>
-            <a:endParaRPr lang="en-US" dirty="0">
-              <a:solidFill>
-                <a:schemeClr val="bg1">
-                  <a:lumMod val="85000"/>
-                </a:schemeClr>
-              </a:solidFill>
-              <a:ea typeface="+mj-ea"/>
-            </a:endParaRPr>
-          </a:p>
-        </p:txBody>
-      </p:sp>
-      <p:sp>
-        <p:nvSpPr>
-          <p:cNvPr id="3" name="Content Placeholder 2"/>
-          <p:cNvSpPr>
-            <a:spLocks noGrp="1"/>
-          </p:cNvSpPr>
-          <p:nvPr>
-            <p:ph idx="1"/>
-          </p:nvPr>
-        </p:nvSpPr>
-        <p:spPr>
-          <a:xfrm>
-            <a:off x="274638" y="1827213"/>
-            <a:ext cx="8567737" cy="5002212"/>
-          </a:xfrm>
-        </p:spPr>
-        <p:txBody>
-          <a:bodyPr rtlCol="0">
-            <a:normAutofit fontScale="92500" lnSpcReduction="10000"/>
-          </a:bodyPr>
-          <a:lstStyle/>
-          <a:p>
-            <a:pPr marL="342900" indent="-342900" eaLnBrk="1" fontAlgn="auto" hangingPunct="1">
-              <a:lnSpc>
-                <a:spcPct val="110000"/>
-              </a:lnSpc>
-              <a:spcAft>
-                <a:spcPts val="0"/>
-              </a:spcAft>
-              <a:buFont typeface="Arial" panose="020B0604020202020204" pitchFamily="34" charset="0"/>
-              <a:buChar char="•"/>
-              <a:defRPr/>
-            </a:pPr>
-            <a:r>
-              <a:rPr lang="en-US" sz="2000" b="1" dirty="0" smtClean="0">
-                <a:ea typeface="+mn-ea"/>
-              </a:rPr>
-              <a:t>Two primary modes</a:t>
-            </a:r>
-          </a:p>
-          <a:p>
-            <a:pPr lvl="1" eaLnBrk="1" fontAlgn="auto" hangingPunct="1">
-              <a:lnSpc>
-                <a:spcPct val="110000"/>
-              </a:lnSpc>
-              <a:spcAft>
-                <a:spcPts val="0"/>
-              </a:spcAft>
-              <a:buFont typeface="Arial" panose="020B0604020202020204" pitchFamily="34" charset="0"/>
-              <a:buChar char="•"/>
-              <a:defRPr/>
-            </a:pPr>
-            <a:r>
-              <a:rPr lang="en-US" sz="1800" b="1" dirty="0">
-                <a:ea typeface="+mn-ea"/>
-              </a:rPr>
-              <a:t>Schedule Based : Covers Regression </a:t>
-            </a:r>
-            <a:r>
-              <a:rPr lang="en-US" sz="1800" b="1" dirty="0" smtClean="0">
-                <a:ea typeface="+mn-ea"/>
-              </a:rPr>
-              <a:t>Testing  </a:t>
-            </a:r>
-            <a:r>
-              <a:rPr lang="en-US" sz="1200" b="1" dirty="0" smtClean="0">
-                <a:ea typeface="+mn-ea"/>
-              </a:rPr>
-              <a:t>MOT - Cron</a:t>
-            </a:r>
-            <a:endParaRPr lang="en-US" sz="1200" b="1" dirty="0">
-              <a:ea typeface="+mn-ea"/>
-            </a:endParaRPr>
-          </a:p>
-          <a:p>
-            <a:pPr lvl="1" eaLnBrk="1" fontAlgn="auto" hangingPunct="1">
-              <a:lnSpc>
-                <a:spcPct val="110000"/>
-              </a:lnSpc>
-              <a:spcAft>
-                <a:spcPts val="0"/>
-              </a:spcAft>
-              <a:buFont typeface="Arial" panose="020B0604020202020204" pitchFamily="34" charset="0"/>
-              <a:buChar char="•"/>
-              <a:defRPr/>
-            </a:pPr>
-            <a:r>
-              <a:rPr lang="en-US" sz="1800" b="1" dirty="0">
-                <a:ea typeface="+mn-ea"/>
-              </a:rPr>
-              <a:t>On Demand : Covers all developer build initiated </a:t>
-            </a:r>
-            <a:r>
-              <a:rPr lang="en-US" sz="1800" b="1" dirty="0" smtClean="0">
-                <a:ea typeface="+mn-ea"/>
-              </a:rPr>
-              <a:t>testing  </a:t>
-            </a:r>
-            <a:r>
-              <a:rPr lang="en-US" sz="1200" b="1" dirty="0" smtClean="0">
-                <a:ea typeface="+mn-ea"/>
-              </a:rPr>
-              <a:t>DIT - Jenkins</a:t>
-            </a:r>
-            <a:endParaRPr lang="en-US" sz="1200" b="1" dirty="0">
-              <a:ea typeface="+mn-ea"/>
-            </a:endParaRPr>
-          </a:p>
-          <a:p>
-            <a:pPr marL="457206" lvl="1" indent="0" eaLnBrk="1" fontAlgn="auto" hangingPunct="1">
-              <a:lnSpc>
-                <a:spcPct val="110000"/>
-              </a:lnSpc>
-              <a:spcAft>
-                <a:spcPts val="0"/>
-              </a:spcAft>
-              <a:buFontTx/>
-              <a:buNone/>
-              <a:defRPr/>
-            </a:pPr>
-            <a:r>
-              <a:rPr lang="en-US" sz="1600" b="1" dirty="0" smtClean="0">
-                <a:ea typeface="+mn-ea"/>
-              </a:rPr>
-              <a:t>                  </a:t>
-            </a:r>
-            <a:endParaRPr lang="en-US" sz="1400" b="1" dirty="0">
-              <a:ea typeface="+mn-ea"/>
-            </a:endParaRPr>
-          </a:p>
-          <a:p>
-            <a:pPr marL="342900" indent="-342900" eaLnBrk="1" fontAlgn="auto" hangingPunct="1">
-              <a:spcAft>
-                <a:spcPts val="0"/>
-              </a:spcAft>
-              <a:buFont typeface="Arial" panose="020B0604020202020204" pitchFamily="34" charset="0"/>
-              <a:buChar char="•"/>
-              <a:defRPr/>
-            </a:pPr>
-            <a:r>
-              <a:rPr lang="en-US" sz="2000" b="1" dirty="0">
-                <a:ea typeface="+mn-ea"/>
-              </a:rPr>
-              <a:t>Configuration controlled </a:t>
-            </a:r>
-            <a:r>
-              <a:rPr lang="en-US" sz="2000" b="1" dirty="0" smtClean="0">
-                <a:ea typeface="+mn-ea"/>
-              </a:rPr>
-              <a:t>testing:  </a:t>
-            </a:r>
-            <a:r>
-              <a:rPr lang="en-US" sz="2000" b="1" u="sng" dirty="0" smtClean="0">
-                <a:ea typeface="+mn-ea"/>
-              </a:rPr>
-              <a:t>Biggest Evolutionary Advance</a:t>
-            </a:r>
-            <a:endParaRPr lang="en-US" sz="2000" b="1" u="sng" dirty="0">
-              <a:ea typeface="+mn-ea"/>
-            </a:endParaRPr>
-          </a:p>
-          <a:p>
-            <a:pPr lvl="1" eaLnBrk="1" fontAlgn="auto" hangingPunct="1">
-              <a:lnSpc>
-                <a:spcPct val="100000"/>
-              </a:lnSpc>
-              <a:spcAft>
-                <a:spcPts val="0"/>
-              </a:spcAft>
-              <a:buFont typeface="Arial" panose="020B0604020202020204" pitchFamily="34" charset="0"/>
-              <a:buChar char="•"/>
-              <a:defRPr/>
-            </a:pPr>
-            <a:r>
-              <a:rPr lang="en-US" sz="1800" b="1" dirty="0" smtClean="0"/>
-              <a:t>In </a:t>
-            </a:r>
-            <a:r>
-              <a:rPr lang="en-US" sz="1800" b="1" dirty="0"/>
-              <a:t>order to scale Market Place across states our research </a:t>
-            </a:r>
-            <a:r>
-              <a:rPr lang="en-US" sz="1800" b="1" dirty="0" smtClean="0"/>
-              <a:t>required we </a:t>
-            </a:r>
-            <a:r>
-              <a:rPr lang="en-US" sz="1800" b="1" dirty="0"/>
-              <a:t>pull test </a:t>
-            </a:r>
-            <a:r>
-              <a:rPr lang="en-US" sz="1800" b="1" dirty="0" smtClean="0"/>
-              <a:t>data out </a:t>
-            </a:r>
-            <a:r>
-              <a:rPr lang="en-US" sz="1800" b="1" dirty="0"/>
-              <a:t>of </a:t>
-            </a:r>
-            <a:r>
-              <a:rPr lang="en-US" sz="1800" b="1" dirty="0" smtClean="0"/>
-              <a:t>the test scripts</a:t>
-            </a:r>
-            <a:r>
-              <a:rPr lang="en-US" sz="1800" b="1" dirty="0"/>
-              <a:t>, decoupling execution from configuration</a:t>
-            </a:r>
-            <a:r>
-              <a:rPr lang="en-US" sz="1800" b="1" dirty="0" smtClean="0"/>
-              <a:t>.  Test data is now separate and usable all delivery phases</a:t>
-            </a:r>
-            <a:endParaRPr lang="en-US" sz="1800" b="1" dirty="0">
-              <a:ea typeface="+mn-ea"/>
-            </a:endParaRPr>
-          </a:p>
-          <a:p>
-            <a:pPr eaLnBrk="1" fontAlgn="auto" hangingPunct="1">
-              <a:spcAft>
-                <a:spcPts val="0"/>
-              </a:spcAft>
-              <a:defRPr/>
-            </a:pPr>
-            <a:endParaRPr lang="en-US" b="1" dirty="0">
-              <a:ea typeface="+mn-ea"/>
-            </a:endParaRPr>
-          </a:p>
-          <a:p>
-            <a:pPr marL="342900" indent="-342900" eaLnBrk="1" fontAlgn="auto" hangingPunct="1">
-              <a:spcAft>
-                <a:spcPts val="0"/>
-              </a:spcAft>
-              <a:buFont typeface="Arial" panose="020B0604020202020204" pitchFamily="34" charset="0"/>
-              <a:buChar char="•"/>
-              <a:defRPr/>
-            </a:pPr>
-            <a:r>
-              <a:rPr lang="en-US" sz="2000" b="1" dirty="0" smtClean="0">
-                <a:ea typeface="+mn-ea"/>
-              </a:rPr>
-              <a:t>All testing regardless of primary mode is </a:t>
-            </a:r>
-            <a:r>
-              <a:rPr lang="en-US" sz="2000" b="1" u="sng" dirty="0" smtClean="0">
-                <a:ea typeface="+mn-ea"/>
-              </a:rPr>
-              <a:t>configurable</a:t>
-            </a:r>
-            <a:r>
-              <a:rPr lang="en-US" sz="2000" b="1" dirty="0" smtClean="0">
-                <a:ea typeface="+mn-ea"/>
-              </a:rPr>
-              <a:t> prior to a test run</a:t>
-            </a:r>
-          </a:p>
-          <a:p>
-            <a:pPr lvl="1" eaLnBrk="1" fontAlgn="auto" hangingPunct="1">
-              <a:spcAft>
-                <a:spcPts val="0"/>
-              </a:spcAft>
-              <a:buFont typeface="Arial" panose="020B0604020202020204" pitchFamily="34" charset="0"/>
-              <a:buChar char="•"/>
-              <a:defRPr/>
-            </a:pPr>
-            <a:r>
-              <a:rPr lang="en-US" sz="1800" b="1" dirty="0" smtClean="0">
-                <a:ea typeface="+mn-ea"/>
-              </a:rPr>
-              <a:t>Development Integration testing uses the configuration model to focus testing on new code</a:t>
-            </a:r>
-          </a:p>
-          <a:p>
-            <a:pPr lvl="1" eaLnBrk="1" fontAlgn="auto" hangingPunct="1">
-              <a:spcAft>
-                <a:spcPts val="0"/>
-              </a:spcAft>
-              <a:buFont typeface="Arial" panose="020B0604020202020204" pitchFamily="34" charset="0"/>
-              <a:buChar char="•"/>
-              <a:defRPr/>
-            </a:pPr>
-            <a:r>
-              <a:rPr lang="en-US" sz="1800" b="1" dirty="0" smtClean="0"/>
-              <a:t>NGTA team can regression </a:t>
-            </a:r>
-            <a:r>
-              <a:rPr lang="en-US" sz="1800" b="1" dirty="0" smtClean="0">
-                <a:ea typeface="+mn-ea"/>
-              </a:rPr>
-              <a:t>test same deployed code w/out stepping on newly developed code</a:t>
-            </a:r>
-          </a:p>
-          <a:p>
-            <a:pPr indent="-234950" eaLnBrk="1" fontAlgn="auto" hangingPunct="1">
-              <a:spcAft>
-                <a:spcPts val="0"/>
-              </a:spcAft>
-              <a:defRPr/>
-            </a:pPr>
-            <a:r>
-              <a:rPr lang="en-US" sz="1200" b="1" dirty="0" smtClean="0">
-                <a:ea typeface="+mn-ea"/>
-              </a:rPr>
-              <a:t>                    </a:t>
-            </a:r>
-          </a:p>
-          <a:p>
-            <a:pPr marL="342900" indent="-342900" eaLnBrk="1" fontAlgn="auto" hangingPunct="1">
-              <a:lnSpc>
-                <a:spcPct val="114000"/>
-              </a:lnSpc>
-              <a:spcBef>
-                <a:spcPts val="0"/>
-              </a:spcBef>
-              <a:spcAft>
-                <a:spcPts val="0"/>
-              </a:spcAft>
-              <a:buFont typeface="Arial" panose="020B0604020202020204" pitchFamily="34" charset="0"/>
-              <a:buChar char="•"/>
-              <a:defRPr/>
-            </a:pPr>
-            <a:r>
-              <a:rPr lang="en-US" sz="1900" b="1" dirty="0"/>
-              <a:t>Market Place </a:t>
-            </a:r>
-            <a:r>
-              <a:rPr lang="en-US" sz="1900" b="1" dirty="0" smtClean="0"/>
-              <a:t>Regression test </a:t>
-            </a:r>
-            <a:r>
-              <a:rPr lang="en-US" sz="1900" b="1" dirty="0"/>
-              <a:t>&amp; Content </a:t>
-            </a:r>
-            <a:r>
-              <a:rPr lang="en-US" sz="1900" b="1" dirty="0" smtClean="0"/>
-              <a:t>test </a:t>
-            </a:r>
-            <a:r>
-              <a:rPr lang="en-US" sz="1900" b="1" dirty="0"/>
-              <a:t>is organized on </a:t>
-            </a:r>
-            <a:r>
-              <a:rPr lang="en-US" sz="1900" b="1" dirty="0" smtClean="0"/>
-              <a:t> phased </a:t>
-            </a:r>
-            <a:r>
-              <a:rPr lang="en-US" sz="1900" b="1" dirty="0"/>
-              <a:t>deliveries</a:t>
-            </a:r>
-          </a:p>
-          <a:p>
-            <a:pPr lvl="1">
-              <a:lnSpc>
-                <a:spcPct val="114000"/>
-              </a:lnSpc>
-              <a:spcBef>
-                <a:spcPts val="0"/>
-              </a:spcBef>
-              <a:buFont typeface="Arial" panose="020B0604020202020204" pitchFamily="34" charset="0"/>
-              <a:buChar char="•"/>
-              <a:defRPr/>
-            </a:pPr>
-            <a:r>
-              <a:rPr lang="en-US" sz="1500" b="1" dirty="0"/>
-              <a:t>Phase_0  CA, TX, PA, FL, NY    ,          Phase_1 DC, LA,  MD, PR, TN, VI, AK, </a:t>
-            </a:r>
-            <a:r>
-              <a:rPr lang="en-US" sz="1500" b="1" dirty="0" smtClean="0"/>
-              <a:t>AL</a:t>
-            </a:r>
-          </a:p>
-          <a:p>
-            <a:pPr marL="341313" lvl="1" indent="0">
-              <a:lnSpc>
-                <a:spcPct val="114000"/>
-              </a:lnSpc>
-              <a:spcBef>
-                <a:spcPts val="0"/>
-              </a:spcBef>
-              <a:buFontTx/>
-              <a:buNone/>
-              <a:defRPr/>
-            </a:pPr>
-            <a:r>
-              <a:rPr lang="en-US" sz="300" b="1" dirty="0"/>
-              <a:t> </a:t>
-            </a:r>
-            <a:r>
-              <a:rPr lang="en-US" sz="300" b="1" dirty="0" smtClean="0"/>
-              <a:t>              </a:t>
-            </a:r>
-            <a:endParaRPr lang="en-US" sz="300" b="1" dirty="0"/>
-          </a:p>
-          <a:p>
-            <a:pPr lvl="1">
-              <a:lnSpc>
-                <a:spcPct val="114000"/>
-              </a:lnSpc>
-              <a:spcBef>
-                <a:spcPts val="0"/>
-              </a:spcBef>
-              <a:buFont typeface="Arial" panose="020B0604020202020204" pitchFamily="34" charset="0"/>
-              <a:buChar char="•"/>
-              <a:defRPr/>
-            </a:pPr>
-            <a:r>
-              <a:rPr lang="en-US" sz="1500" b="1" dirty="0"/>
-              <a:t>Phase_2  DE, GA, MS, MT, NV, UT, </a:t>
-            </a:r>
-            <a:r>
-              <a:rPr lang="en-US" sz="1500" b="1" dirty="0" smtClean="0"/>
-              <a:t>WV  </a:t>
-            </a:r>
-            <a:r>
-              <a:rPr lang="en-US" sz="1500" b="1" dirty="0"/>
-              <a:t>,    </a:t>
-            </a:r>
-            <a:r>
-              <a:rPr lang="en-US" sz="1500" b="1" dirty="0" smtClean="0"/>
-              <a:t>       </a:t>
-            </a:r>
-            <a:r>
-              <a:rPr lang="en-US" sz="1500" b="1" dirty="0"/>
-              <a:t>Phase_3 CT, IL, OH, WA, KY, MN, NH</a:t>
-            </a:r>
-          </a:p>
-          <a:p>
-            <a:pPr marL="341313" lvl="1" indent="0" eaLnBrk="1" fontAlgn="auto" hangingPunct="1">
-              <a:spcAft>
-                <a:spcPts val="0"/>
-              </a:spcAft>
-              <a:buFontTx/>
-              <a:buNone/>
-              <a:defRPr/>
-            </a:pPr>
-            <a:endParaRPr lang="en-US" sz="1800" b="1" dirty="0" smtClean="0">
-              <a:ea typeface="+mn-ea"/>
-            </a:endParaRPr>
-          </a:p>
-          <a:p>
-            <a:pPr marL="457206" lvl="1" indent="0" eaLnBrk="1" fontAlgn="auto" hangingPunct="1">
-              <a:spcAft>
-                <a:spcPts val="0"/>
-              </a:spcAft>
-              <a:buFontTx/>
-              <a:buNone/>
-              <a:defRPr/>
-            </a:pPr>
-            <a:r>
-              <a:rPr lang="en-US" sz="1400" dirty="0" smtClean="0">
-                <a:ea typeface="+mn-ea"/>
-              </a:rPr>
-              <a:t>      </a:t>
-            </a:r>
-            <a:endParaRPr lang="en-US" sz="1400" dirty="0">
-              <a:ea typeface="+mn-ea"/>
-            </a:endParaRPr>
-          </a:p>
-        </p:txBody>
-      </p:sp>
-    </p:spTree>
+    <p:extLst>
+      <p:ext uri="{BB962C8B-B14F-4D97-AF65-F5344CB8AC3E}">
+        <p14:creationId xmlns:p14="http://schemas.microsoft.com/office/powerpoint/2010/main" val="906061002"/>
+      </p:ext>
+    </p:extLst>
   </p:cSld>
   <p:clrMapOvr>
     <a:masterClrMapping/>
@@ -9105,7 +9641,7 @@
               <a:rPr lang="en-US" dirty="0" smtClean="0">
                 <a:ea typeface="+mj-ea"/>
               </a:rPr>
-              <a:t>TESTING TYPES  </a:t>
+              <a:t>TEST EXECUTION  </a:t>
             </a:r>
             <a:endParaRPr lang="en-US" dirty="0">
               <a:solidFill>
@@ -9130,23 +9666,20 @@
         </p:nvSpPr>
         <p:spPr>
           <a:xfrm>
-            <a:off x="274638" y="1746250"/>
-            <a:ext cx="8567737" cy="5002213"/>
+            <a:off x="274638" y="1827213"/>
+            <a:ext cx="8567737" cy="5002212"/>
           </a:xfrm>
         </p:spPr>
         <p:txBody>
           <a:bodyPr rtlCol="0">
-            <a:normAutofit/>
+            <a:normAutofit fontScale="92500" lnSpcReduction="10000"/>
           </a:bodyPr>
           <a:lstStyle/>
           <a:p>
             <a:pPr marL="342900" indent="-342900" eaLnBrk="1" fontAlgn="auto" hangingPunct="1">
               <a:lnSpc>
-                <a:spcPct val="150000"/>
-              </a:lnSpc>
-              <a:spcBef>
-                <a:spcPts val="0"/>
-              </a:spcBef>
+                <a:spcPct val="110000"/>
+              </a:lnSpc>
               <a:spcAft>
                 <a:spcPts val="0"/>
               </a:spcAft>
@@ -9158,131 +9691,410 @@
               <a:rPr lang="en-US" sz="2000" b="1" dirty="0" smtClean="0">
                 <a:ea typeface="+mn-ea"/>
               </a:rPr>
-              <a:t>Three primary types of testing</a:t>
-            </a:r>
+              <a:t>Two primary modes</a:t>
+            </a:r>
+          </a:p>
+          <a:p>
+            <a:pPr marL="684213" lvl="1" indent="-342900" eaLnBrk="1" fontAlgn="auto" hangingPunct="1">
+              <a:lnSpc>
+                <a:spcPct val="110000"/>
+              </a:lnSpc>
+              <a:spcAft>
+                <a:spcPts val="0"/>
+              </a:spcAft>
+              <a:buFont typeface="+mj-lt"/>
+              <a:buAutoNum type="arabicPeriod"/>
+              <a:defRPr/>
+            </a:pPr>
+            <a:r>
+              <a:rPr lang="en-US" sz="1800" b="1" dirty="0">
+                <a:ea typeface="+mn-ea"/>
+              </a:rPr>
+              <a:t>Schedule Based : Covers Regression </a:t>
+            </a:r>
+            <a:r>
+              <a:rPr lang="en-US" sz="1800" b="1" dirty="0" smtClean="0">
+                <a:ea typeface="+mn-ea"/>
+              </a:rPr>
+              <a:t>Testing  </a:t>
+            </a:r>
+            <a:r>
+              <a:rPr lang="en-US" sz="1200" b="1" dirty="0" smtClean="0">
+                <a:ea typeface="+mn-ea"/>
+              </a:rPr>
+              <a:t>MOT - Cron</a:t>
+            </a:r>
+            <a:endParaRPr lang="en-US" sz="1200" b="1" dirty="0">
+              <a:ea typeface="+mn-ea"/>
+            </a:endParaRPr>
+          </a:p>
+          <a:p>
+            <a:pPr marL="684213" lvl="1" indent="-342900" eaLnBrk="1" fontAlgn="auto" hangingPunct="1">
+              <a:lnSpc>
+                <a:spcPct val="110000"/>
+              </a:lnSpc>
+              <a:spcAft>
+                <a:spcPts val="0"/>
+              </a:spcAft>
+              <a:buFont typeface="+mj-lt"/>
+              <a:buAutoNum type="arabicPeriod"/>
+              <a:defRPr/>
+            </a:pPr>
+            <a:r>
+              <a:rPr lang="en-US" sz="1800" b="1" dirty="0">
+                <a:ea typeface="+mn-ea"/>
+              </a:rPr>
+              <a:t>On Demand : Covers all developer build initiated </a:t>
+            </a:r>
+            <a:r>
+              <a:rPr lang="en-US" sz="1800" b="1" dirty="0" smtClean="0">
+                <a:ea typeface="+mn-ea"/>
+              </a:rPr>
+              <a:t>testing  </a:t>
+            </a:r>
+            <a:r>
+              <a:rPr lang="en-US" sz="1200" b="1" dirty="0" smtClean="0">
+                <a:ea typeface="+mn-ea"/>
+              </a:rPr>
+              <a:t>DIT - Jenkins</a:t>
+            </a:r>
+            <a:endParaRPr lang="en-US" sz="1200" b="1" dirty="0">
+              <a:ea typeface="+mn-ea"/>
+            </a:endParaRPr>
+          </a:p>
+          <a:p>
+            <a:pPr marL="457206" lvl="1" indent="0" eaLnBrk="1" fontAlgn="auto" hangingPunct="1">
+              <a:lnSpc>
+                <a:spcPct val="110000"/>
+              </a:lnSpc>
+              <a:spcAft>
+                <a:spcPts val="0"/>
+              </a:spcAft>
+              <a:buNone/>
+              <a:defRPr/>
+            </a:pPr>
+            <a:r>
+              <a:rPr lang="en-US" sz="1600" b="1" dirty="0" smtClean="0">
+                <a:ea typeface="+mn-ea"/>
+              </a:rPr>
+              <a:t>                  </a:t>
+            </a:r>
+            <a:endParaRPr lang="en-US" sz="1400" b="1" dirty="0">
+              <a:ea typeface="+mn-ea"/>
+            </a:endParaRPr>
+          </a:p>
+          <a:p>
+            <a:pPr marL="342900" indent="-342900" eaLnBrk="1" fontAlgn="auto" hangingPunct="1">
+              <a:spcAft>
+                <a:spcPts val="0"/>
+              </a:spcAft>
+              <a:buFont typeface="Arial" panose="020B0604020202020204" pitchFamily="34" charset="0"/>
+              <a:buChar char="•"/>
+              <a:defRPr/>
+            </a:pPr>
+            <a:r>
+              <a:rPr lang="en-US" sz="2000" b="1" dirty="0">
+                <a:ea typeface="+mn-ea"/>
+              </a:rPr>
+              <a:t>Configuration controlled </a:t>
+            </a:r>
+            <a:r>
+              <a:rPr lang="en-US" sz="2000" b="1" dirty="0" smtClean="0">
+                <a:ea typeface="+mn-ea"/>
+              </a:rPr>
+              <a:t>testing:  </a:t>
+            </a:r>
+            <a:r>
+              <a:rPr lang="en-US" sz="2000" b="1" u="sng" dirty="0" smtClean="0">
+                <a:ea typeface="+mn-ea"/>
+              </a:rPr>
+              <a:t>Biggest Evolutionary Advance</a:t>
+            </a:r>
+            <a:endParaRPr lang="en-US" sz="2000" b="1" u="sng" dirty="0">
+              <a:ea typeface="+mn-ea"/>
+            </a:endParaRPr>
+          </a:p>
+          <a:p>
+            <a:pPr lvl="1" eaLnBrk="1" fontAlgn="auto" hangingPunct="1">
+              <a:lnSpc>
+                <a:spcPct val="100000"/>
+              </a:lnSpc>
+              <a:spcAft>
+                <a:spcPts val="0"/>
+              </a:spcAft>
+              <a:buFont typeface="Arial" panose="020B0604020202020204" pitchFamily="34" charset="0"/>
+              <a:buChar char="•"/>
+              <a:defRPr/>
+            </a:pPr>
+            <a:r>
+              <a:rPr lang="en-US" sz="1800" b="1" dirty="0" smtClean="0"/>
+              <a:t>In </a:t>
+            </a:r>
+            <a:r>
+              <a:rPr lang="en-US" sz="1800" b="1" dirty="0"/>
+              <a:t>order to scale Market Place across states our research </a:t>
+            </a:r>
+            <a:r>
+              <a:rPr lang="en-US" sz="1800" b="1" dirty="0" smtClean="0"/>
+              <a:t>required we </a:t>
+            </a:r>
+            <a:r>
+              <a:rPr lang="en-US" sz="1800" b="1" dirty="0"/>
+              <a:t>pull test </a:t>
+            </a:r>
+            <a:r>
+              <a:rPr lang="en-US" sz="1800" b="1" dirty="0" smtClean="0"/>
+              <a:t>data out </a:t>
+            </a:r>
+            <a:r>
+              <a:rPr lang="en-US" sz="1800" b="1" dirty="0"/>
+              <a:t>of </a:t>
+            </a:r>
+            <a:r>
+              <a:rPr lang="en-US" sz="1800" b="1" dirty="0" smtClean="0"/>
+              <a:t>the test scripts</a:t>
+            </a:r>
+            <a:r>
+              <a:rPr lang="en-US" sz="1800" b="1" dirty="0"/>
+              <a:t>, decoupling execution from configuration</a:t>
+            </a:r>
+            <a:r>
+              <a:rPr lang="en-US" sz="1800" b="1" dirty="0" smtClean="0"/>
+              <a:t>.  Test data is now separate and usable all delivery phases</a:t>
+            </a:r>
+            <a:endParaRPr lang="en-US" sz="1800" b="1" dirty="0">
+              <a:ea typeface="+mn-ea"/>
+            </a:endParaRPr>
           </a:p>
           <a:p>
             <a:pPr eaLnBrk="1" fontAlgn="auto" hangingPunct="1">
-              <a:lnSpc>
-                <a:spcPct val="150000"/>
-              </a:lnSpc>
-              <a:spcBef>
-                <a:spcPts val="0"/>
-              </a:spcBef>
-              <a:spcAft>
-                <a:spcPts val="0"/>
-              </a:spcAft>
-              <a:defRPr/>
-            </a:pPr>
-            <a:r>
-              <a:rPr lang="en-US" sz="1200" b="1" dirty="0">
+              <a:spcAft>
+                <a:spcPts val="0"/>
+              </a:spcAft>
+              <a:defRPr/>
+            </a:pPr>
+            <a:endParaRPr lang="en-US" b="1" dirty="0">
+              <a:ea typeface="+mn-ea"/>
+            </a:endParaRPr>
+          </a:p>
+          <a:p>
+            <a:pPr marL="342900" indent="-342900" eaLnBrk="1" fontAlgn="auto" hangingPunct="1">
+              <a:spcAft>
+                <a:spcPts val="0"/>
+              </a:spcAft>
+              <a:buFont typeface="Arial" panose="020B0604020202020204" pitchFamily="34" charset="0"/>
+              <a:buChar char="•"/>
+              <a:defRPr/>
+            </a:pPr>
+            <a:r>
+              <a:rPr lang="en-US" sz="2000" b="1" dirty="0" smtClean="0">
+                <a:ea typeface="+mn-ea"/>
+              </a:rPr>
+              <a:t>All testing regardless of primary mode is </a:t>
+            </a:r>
+            <a:r>
+              <a:rPr lang="en-US" sz="2000" b="1" u="sng" dirty="0" smtClean="0">
+                <a:ea typeface="+mn-ea"/>
+              </a:rPr>
+              <a:t>configurable</a:t>
+            </a:r>
+            <a:r>
+              <a:rPr lang="en-US" sz="2000" b="1" dirty="0" smtClean="0">
+                <a:ea typeface="+mn-ea"/>
+              </a:rPr>
+              <a:t> prior to </a:t>
+            </a:r>
+            <a:r>
+              <a:rPr lang="en-US" sz="2000" b="1" dirty="0" smtClean="0">
                 <a:ea typeface="+mn-ea"/>
               </a:rPr>
               <a:t> </a:t>
             </a:r>
             <a:r>
+              <a:rPr lang="en-US" sz="2000" b="1" dirty="0" smtClean="0">
+                <a:ea typeface="+mn-ea"/>
+              </a:rPr>
+              <a:t>test run</a:t>
+            </a:r>
+          </a:p>
+          <a:p>
+            <a:pPr lvl="1" eaLnBrk="1" fontAlgn="auto" hangingPunct="1">
+              <a:spcAft>
+                <a:spcPts val="0"/>
+              </a:spcAft>
+              <a:buFont typeface="Arial" panose="020B0604020202020204" pitchFamily="34" charset="0"/>
+              <a:buChar char="•"/>
+              <a:defRPr/>
+            </a:pPr>
+            <a:r>
+              <a:rPr lang="en-US" sz="1800" b="1" dirty="0" smtClean="0">
+                <a:ea typeface="+mn-ea"/>
+              </a:rPr>
+              <a:t>Dev  Integration tests will </a:t>
+            </a:r>
+            <a:r>
+              <a:rPr lang="en-US" sz="1800" b="1" dirty="0" smtClean="0">
+                <a:ea typeface="+mn-ea"/>
+              </a:rPr>
+              <a:t>uses the configuration model to focus testing on new code</a:t>
+            </a:r>
+          </a:p>
+          <a:p>
+            <a:pPr lvl="1" eaLnBrk="1" fontAlgn="auto" hangingPunct="1">
+              <a:spcAft>
+                <a:spcPts val="0"/>
+              </a:spcAft>
+              <a:buFont typeface="Arial" panose="020B0604020202020204" pitchFamily="34" charset="0"/>
+              <a:buChar char="•"/>
+              <a:defRPr/>
+            </a:pPr>
+            <a:r>
+              <a:rPr lang="en-US" sz="1800" b="1" dirty="0" smtClean="0"/>
+              <a:t>NGTA team can regression </a:t>
+            </a:r>
+            <a:r>
+              <a:rPr lang="en-US" sz="1800" b="1" dirty="0" smtClean="0">
+                <a:ea typeface="+mn-ea"/>
+              </a:rPr>
+              <a:t>test same deployed code w/out stepping on newly developed code</a:t>
+            </a:r>
+          </a:p>
+          <a:p>
+            <a:pPr indent="-234950" eaLnBrk="1" fontAlgn="auto" hangingPunct="1">
+              <a:spcAft>
+                <a:spcPts val="0"/>
+              </a:spcAft>
+              <a:defRPr/>
+            </a:pPr>
+            <a:r>
               <a:rPr lang="en-US" sz="1200" b="1" dirty="0" smtClean="0">
                 <a:ea typeface="+mn-ea"/>
               </a:rPr>
-              <a:t>        </a:t>
-            </a:r>
-          </a:p>
-          <a:p>
-            <a:pPr marL="341313" lvl="1" indent="0" eaLnBrk="1" fontAlgn="auto" hangingPunct="1">
-              <a:lnSpc>
-                <a:spcPct val="150000"/>
-              </a:lnSpc>
-              <a:spcBef>
-                <a:spcPts val="0"/>
-              </a:spcBef>
-              <a:spcAft>
-                <a:spcPts val="0"/>
-              </a:spcAft>
+              <a:t>                    </a:t>
+            </a:r>
+          </a:p>
+          <a:p>
+            <a:pPr marL="342900" indent="-342900" eaLnBrk="1" fontAlgn="auto" hangingPunct="1">
+              <a:lnSpc>
+                <a:spcPct val="114000"/>
+              </a:lnSpc>
+              <a:spcBef>
+                <a:spcPts val="0"/>
+              </a:spcBef>
+              <a:spcAft>
+                <a:spcPts val="0"/>
+              </a:spcAft>
+              <a:buFont typeface="Arial" panose="020B0604020202020204" pitchFamily="34" charset="0"/>
+              <a:buChar char="•"/>
+              <a:defRPr/>
+            </a:pPr>
+            <a:r>
+              <a:rPr lang="en-US" sz="1900" b="1" dirty="0"/>
+              <a:t>Market Place </a:t>
+            </a:r>
+            <a:r>
+              <a:rPr lang="en-US" sz="1900" b="1" dirty="0" smtClean="0"/>
+              <a:t>Regression test </a:t>
+            </a:r>
+            <a:r>
+              <a:rPr lang="en-US" sz="1900" b="1" dirty="0"/>
+              <a:t>&amp; Content </a:t>
+            </a:r>
+            <a:r>
+              <a:rPr lang="en-US" sz="1900" b="1" dirty="0" smtClean="0"/>
+              <a:t>test </a:t>
+            </a:r>
+            <a:r>
+              <a:rPr lang="en-US" sz="1900" b="1" dirty="0"/>
+              <a:t>is organized on </a:t>
+            </a:r>
+            <a:r>
+              <a:rPr lang="en-US" sz="1900" b="1" dirty="0" smtClean="0"/>
+              <a:t> phased </a:t>
+            </a:r>
+            <a:r>
+              <a:rPr lang="en-US" sz="1900" b="1" dirty="0"/>
+              <a:t>deliveries</a:t>
+            </a:r>
+          </a:p>
+          <a:p>
+            <a:pPr lvl="1">
+              <a:lnSpc>
+                <a:spcPct val="114000"/>
+              </a:lnSpc>
+              <a:spcBef>
+                <a:spcPts val="0"/>
+              </a:spcBef>
+              <a:buFont typeface="Arial" panose="020B0604020202020204" pitchFamily="34" charset="0"/>
+              <a:buChar char="•"/>
+              <a:defRPr/>
+            </a:pPr>
+            <a:r>
+              <a:rPr lang="en-US" sz="1500" b="1" dirty="0"/>
+              <a:t>Phase_0  CA, TX, PA, FL, NY    ,          Phase_1 DC, LA,  MD, PR, TN, VI, AK, </a:t>
+            </a:r>
+            <a:r>
+              <a:rPr lang="en-US" sz="1500" b="1" dirty="0" smtClean="0"/>
+              <a:t>AL</a:t>
+            </a:r>
+          </a:p>
+          <a:p>
+            <a:pPr marL="341313" lvl="1" indent="0">
+              <a:lnSpc>
+                <a:spcPct val="114000"/>
+              </a:lnSpc>
+              <a:spcBef>
+                <a:spcPts val="0"/>
+              </a:spcBef>
               <a:buFontTx/>
               <a:buNone/>
               <a:defRPr/>
             </a:pPr>
             <a:r>
-              <a:rPr lang="en-US" sz="1800" b="1" dirty="0" smtClean="0">
-                <a:ea typeface="+mn-ea"/>
-              </a:rPr>
-              <a:t>Page level Functional Integration </a:t>
-            </a:r>
-          </a:p>
-          <a:p>
-            <a:pPr lvl="2" eaLnBrk="1" fontAlgn="auto" hangingPunct="1">
+              <a:rPr lang="en-US" sz="300" b="1" dirty="0"/>
+              <a:t> </a:t>
+            </a:r>
+            <a:r>
+              <a:rPr lang="en-US" sz="300" b="1" dirty="0" smtClean="0"/>
+              <a:t>              </a:t>
+            </a:r>
+            <a:endParaRPr lang="en-US" sz="300" b="1" dirty="0"/>
+          </a:p>
+          <a:p>
+            <a:pPr lvl="1">
               <a:lnSpc>
                 <a:spcPct val="114000"/>
               </a:lnSpc>
               <a:spcBef>
                 <a:spcPts val="0"/>
               </a:spcBef>
-              <a:spcAft>
-                <a:spcPts val="0"/>
-              </a:spcAft>
               <a:buFont typeface="Arial" panose="020B0604020202020204" pitchFamily="34" charset="0"/>
               <a:buChar char="•"/>
               <a:defRPr/>
             </a:pPr>
             <a:r>
-              <a:rPr lang="en-US" sz="1600" b="1" dirty="0" smtClean="0">
-                <a:ea typeface="+mn-ea"/>
-              </a:rPr>
-              <a:t>Static &amp; Functional html element analysis for all pages in all products</a:t>
-            </a:r>
-          </a:p>
-          <a:p>
-            <a:pPr lvl="3" eaLnBrk="1" fontAlgn="auto" hangingPunct="1">
-              <a:lnSpc>
-                <a:spcPct val="114000"/>
-              </a:lnSpc>
-              <a:spcBef>
-                <a:spcPts val="0"/>
-              </a:spcBef>
-              <a:spcAft>
-                <a:spcPts val="0"/>
-              </a:spcAft>
-              <a:buFont typeface="Arial" panose="020B0604020202020204" pitchFamily="34" charset="0"/>
-              <a:buChar char="•"/>
-              <a:defRPr/>
-            </a:pPr>
-            <a:r>
-              <a:rPr lang="en-US" sz="1400" b="1" dirty="0" smtClean="0">
-                <a:ea typeface="+mn-ea"/>
-              </a:rPr>
-              <a:t>Every Button, Field, Check Box, Link, page element is functionally evaluated and error checked</a:t>
-            </a:r>
-          </a:p>
-          <a:p>
-            <a:pPr lvl="3" eaLnBrk="1" fontAlgn="auto" hangingPunct="1">
-              <a:lnSpc>
-                <a:spcPct val="114000"/>
-              </a:lnSpc>
-              <a:spcBef>
-                <a:spcPts val="0"/>
-              </a:spcBef>
-              <a:spcAft>
-                <a:spcPts val="0"/>
-              </a:spcAft>
-              <a:buFont typeface="Arial" panose="020B0604020202020204" pitchFamily="34" charset="0"/>
-              <a:buChar char="•"/>
-              <a:defRPr/>
-            </a:pPr>
-            <a:r>
-              <a:rPr lang="en-US" sz="1400" b="1" dirty="0" smtClean="0">
-                <a:ea typeface="+mn-ea"/>
-              </a:rPr>
-              <a:t>All page level functionality local to a page is executed and evaluated</a:t>
+              <a:rPr lang="en-US" sz="1500" b="1" dirty="0"/>
+              <a:t>Phase_2  DE, GA, MS, MT, NV, UT, </a:t>
+            </a:r>
+            <a:r>
+              <a:rPr lang="en-US" sz="1500" b="1" dirty="0" smtClean="0"/>
+              <a:t>WV  </a:t>
+            </a:r>
+            <a:r>
+              <a:rPr lang="en-US" sz="1500" b="1" dirty="0"/>
+              <a:t>,    </a:t>
+            </a:r>
+            <a:r>
+              <a:rPr lang="en-US" sz="1500" b="1" dirty="0" smtClean="0"/>
+              <a:t>       </a:t>
+            </a:r>
+            <a:r>
+              <a:rPr lang="en-US" sz="1500" b="1" dirty="0"/>
+              <a:t>Phase_3 CT, IL, OH, WA, KY, MN, NH</a:t>
             </a:r>
           </a:p>
           <a:p>
             <a:pPr marL="341313" lvl="1" indent="0" eaLnBrk="1" fontAlgn="auto" hangingPunct="1">
-              <a:lnSpc>
-                <a:spcPct val="150000"/>
-              </a:lnSpc>
-              <a:spcBef>
-                <a:spcPts val="0"/>
-              </a:spcBef>
               <a:spcAft>
                 <a:spcPts val="0"/>
               </a:spcAft>
@@ -9290,21 +10102,12 @@
               <a:buNone/>
               <a:defRPr/>
             </a:pPr>
-            <a:r>
-              <a:rPr lang="en-US" sz="900" b="1" dirty="0" smtClean="0">
-                <a:ea typeface="+mn-ea"/>
-              </a:rPr>
-              <a:t>     </a:t>
-            </a:r>
-          </a:p>
-          <a:p>
-            <a:pPr marL="341313" lvl="1" indent="0" eaLnBrk="1" fontAlgn="auto" hangingPunct="1">
-              <a:lnSpc>
-                <a:spcPct val="150000"/>
-              </a:lnSpc>
-              <a:spcBef>
-                <a:spcPts val="0"/>
-              </a:spcBef>
+            <a:endParaRPr lang="en-US" sz="1800" b="1" dirty="0" smtClean="0">
+              <a:ea typeface="+mn-ea"/>
+            </a:endParaRPr>
+          </a:p>
+          <a:p>
+            <a:pPr marL="457206" lvl="1" indent="0" eaLnBrk="1" fontAlgn="auto" hangingPunct="1">
               <a:spcAft>
                 <a:spcPts val="0"/>
               </a:spcAft>
@@ -9313,194 +10116,12 @@
               <a:defRPr/>
             </a:pPr>
             <a:r>
-              <a:rPr lang="en-US" sz="1800" b="1" dirty="0" smtClean="0">
-                <a:ea typeface="+mn-ea"/>
-              </a:rPr>
-              <a:t>Application level user work flow  :    Complete  End to End  Scenarios</a:t>
-            </a:r>
-          </a:p>
-          <a:p>
-            <a:pPr lvl="2" eaLnBrk="1" fontAlgn="auto" hangingPunct="1">
-              <a:lnSpc>
-                <a:spcPct val="114000"/>
-              </a:lnSpc>
-              <a:spcBef>
-                <a:spcPts val="0"/>
-              </a:spcBef>
-              <a:spcAft>
-                <a:spcPts val="0"/>
-              </a:spcAft>
-              <a:buFont typeface="Arial" panose="020B0604020202020204" pitchFamily="34" charset="0"/>
-              <a:buChar char="•"/>
-              <a:defRPr/>
-            </a:pPr>
-            <a:r>
-              <a:rPr lang="en-US" sz="1600" b="1" dirty="0" smtClean="0">
-                <a:ea typeface="+mn-ea"/>
-              </a:rPr>
-              <a:t>Designated user work flow execution pathways</a:t>
-            </a:r>
-          </a:p>
-          <a:p>
-            <a:pPr lvl="2" eaLnBrk="1" fontAlgn="auto" hangingPunct="1">
-              <a:lnSpc>
-                <a:spcPct val="114000"/>
-              </a:lnSpc>
-              <a:spcBef>
-                <a:spcPts val="0"/>
-              </a:spcBef>
-              <a:spcAft>
-                <a:spcPts val="0"/>
-              </a:spcAft>
-              <a:buFont typeface="Arial" panose="020B0604020202020204" pitchFamily="34" charset="0"/>
-              <a:buChar char="•"/>
-              <a:defRPr/>
-            </a:pPr>
-            <a:r>
-              <a:rPr lang="en-US" sz="1600" b="1" dirty="0" smtClean="0">
-                <a:ea typeface="+mn-ea"/>
-              </a:rPr>
-              <a:t>Extensive repeat execution with large data set Data driven</a:t>
-            </a:r>
-          </a:p>
-          <a:p>
-            <a:pPr indent="-234950" eaLnBrk="1" fontAlgn="auto" hangingPunct="1">
-              <a:lnSpc>
-                <a:spcPct val="150000"/>
-              </a:lnSpc>
-              <a:spcBef>
-                <a:spcPts val="0"/>
-              </a:spcBef>
-              <a:spcAft>
-                <a:spcPts val="0"/>
-              </a:spcAft>
-              <a:defRPr/>
-            </a:pPr>
-            <a:r>
-              <a:rPr lang="en-US" sz="900" b="1" dirty="0" smtClean="0">
-                <a:ea typeface="+mn-ea"/>
-              </a:rPr>
-              <a:t>   </a:t>
-            </a:r>
-          </a:p>
-          <a:p>
-            <a:pPr indent="-234950" eaLnBrk="1" fontAlgn="auto" hangingPunct="1">
-              <a:lnSpc>
-                <a:spcPct val="150000"/>
-              </a:lnSpc>
-              <a:spcBef>
-                <a:spcPts val="0"/>
-              </a:spcBef>
-              <a:spcAft>
-                <a:spcPts val="0"/>
-              </a:spcAft>
-              <a:defRPr/>
-            </a:pPr>
-            <a:endParaRPr lang="en-US" sz="900" b="1" dirty="0">
-              <a:ea typeface="+mn-ea"/>
-            </a:endParaRPr>
-          </a:p>
-          <a:p>
-            <a:pPr marL="341313" lvl="1" indent="0" eaLnBrk="1" fontAlgn="auto" hangingPunct="1">
-              <a:lnSpc>
-                <a:spcPct val="150000"/>
-              </a:lnSpc>
-              <a:spcBef>
-                <a:spcPts val="0"/>
-              </a:spcBef>
-              <a:spcAft>
-                <a:spcPts val="0"/>
-              </a:spcAft>
-              <a:buFontTx/>
-              <a:buNone/>
-              <a:defRPr/>
-            </a:pPr>
-            <a:r>
-              <a:rPr lang="en-US" sz="1800" b="1" dirty="0" smtClean="0">
-                <a:ea typeface="+mn-ea"/>
-              </a:rPr>
-              <a:t>Micro Service REST APIs</a:t>
-            </a:r>
-          </a:p>
-          <a:p>
-            <a:pPr lvl="2" eaLnBrk="1" fontAlgn="auto" hangingPunct="1">
-              <a:lnSpc>
-                <a:spcPct val="114000"/>
-              </a:lnSpc>
-              <a:spcBef>
-                <a:spcPts val="0"/>
-              </a:spcBef>
-              <a:spcAft>
-                <a:spcPts val="0"/>
-              </a:spcAft>
-              <a:buFont typeface="Arial" panose="020B0604020202020204" pitchFamily="34" charset="0"/>
-              <a:buChar char="•"/>
-              <a:defRPr/>
-            </a:pPr>
-            <a:r>
-              <a:rPr lang="en-US" sz="1600" b="1" dirty="0" smtClean="0">
-                <a:ea typeface="+mn-ea"/>
-              </a:rPr>
-              <a:t>Regression coverage for Micro service REST API </a:t>
-            </a:r>
-          </a:p>
-          <a:p>
-            <a:pPr lvl="2" eaLnBrk="1" fontAlgn="auto" hangingPunct="1">
-              <a:lnSpc>
-                <a:spcPct val="114000"/>
-              </a:lnSpc>
-              <a:spcBef>
-                <a:spcPts val="0"/>
-              </a:spcBef>
-              <a:spcAft>
-                <a:spcPts val="0"/>
-              </a:spcAft>
-              <a:buFont typeface="Arial" panose="020B0604020202020204" pitchFamily="34" charset="0"/>
-              <a:buChar char="•"/>
-              <a:defRPr/>
-            </a:pPr>
-            <a:r>
-              <a:rPr lang="en-US" sz="1600" b="1" dirty="0" smtClean="0">
-                <a:ea typeface="+mn-ea"/>
-              </a:rPr>
-              <a:t>Additionally API testing is used to compare data for testing in CX UI Applications</a:t>
-            </a:r>
-            <a:endParaRPr lang="en-US" sz="1600" b="1" dirty="0">
-              <a:ea typeface="+mn-ea"/>
-            </a:endParaRPr>
-          </a:p>
-          <a:p>
-            <a:pPr marL="457206" lvl="1" indent="0" eaLnBrk="1" fontAlgn="auto" hangingPunct="1">
-              <a:lnSpc>
-                <a:spcPct val="110000"/>
-              </a:lnSpc>
-              <a:spcAft>
-                <a:spcPts val="0"/>
-              </a:spcAft>
-              <a:buFontTx/>
-              <a:buNone/>
-              <a:defRPr/>
-            </a:pPr>
-            <a:r>
-              <a:rPr lang="en-US" sz="1600" b="1" dirty="0" smtClean="0">
-                <a:ea typeface="+mn-ea"/>
-              </a:rPr>
-              <a:t>                  </a:t>
-            </a:r>
-          </a:p>
-          <a:p>
-            <a:pPr marL="457206" lvl="1" indent="0" eaLnBrk="1" fontAlgn="auto" hangingPunct="1">
-              <a:lnSpc>
-                <a:spcPct val="110000"/>
-              </a:lnSpc>
-              <a:spcAft>
-                <a:spcPts val="0"/>
-              </a:spcAft>
-              <a:buFontTx/>
-              <a:buNone/>
-              <a:defRPr/>
-            </a:pPr>
-            <a:endParaRPr lang="en-US" sz="1400" b="1" dirty="0">
+              <a:rPr lang="en-US" sz="1400" dirty="0" smtClean="0">
+                <a:ea typeface="+mn-ea"/>
+              </a:rPr>
+              <a:t>      </a:t>
+            </a:r>
+            <a:endParaRPr lang="en-US" sz="1400" dirty="0">
               <a:ea typeface="+mn-ea"/>
             </a:endParaRPr>
           </a:p>
@@ -9540,63 +10161,7 @@
       </p:grpSpPr>
       <p:sp>
         <p:nvSpPr>
-          <p:cNvPr id="4" name="Title 1">
-            <a:hlinkClick r:id="rId2" action="ppaction://hlinksldjump"/>
-          </p:cNvPr>
-          <p:cNvSpPr txBox="1">
-            <a:spLocks/>
-          </p:cNvSpPr>
-          <p:nvPr/>
-        </p:nvSpPr>
-        <p:spPr>
-          <a:xfrm>
-            <a:off x="368300" y="47625"/>
-            <a:ext cx="312738" cy="287338"/>
-          </a:xfrm>
-          <a:prstGeom prst="rect">
-            <a:avLst/>
-          </a:prstGeom>
-        </p:spPr>
-        <p:txBody>
-          <a:bodyPr>
-            <a:normAutofit fontScale="55000" lnSpcReduction="20000"/>
-          </a:bodyPr>
-          <a:lstStyle>
-            <a:lvl1pPr algn="l" defTabSz="457200" rtl="0" eaLnBrk="1" latinLnBrk="0" hangingPunct="1">
-              <a:spcBef>
-                <a:spcPct val="0"/>
-              </a:spcBef>
-              <a:buNone/>
-              <a:defRPr sz="5000" b="0" i="0" kern="1200">
-                <a:solidFill>
-                  <a:srgbClr val="128BAD"/>
-                </a:solidFill>
-                <a:latin typeface="Calibri Light"/>
-                <a:ea typeface="+mj-ea"/>
-                <a:cs typeface="Calibri Light"/>
-              </a:defRPr>
-            </a:lvl1pPr>
-          </a:lstStyle>
-          <a:p>
-            <a:pPr fontAlgn="auto">
-              <a:spcAft>
-                <a:spcPts val="0"/>
-              </a:spcAft>
-              <a:defRPr/>
-            </a:pPr>
-            <a:endParaRPr lang="en-US" sz="2800" dirty="0">
-              <a:solidFill>
-                <a:schemeClr val="bg1">
-                  <a:lumMod val="95000"/>
-                </a:schemeClr>
-              </a:solidFill>
-            </a:endParaRPr>
-          </a:p>
-        </p:txBody>
-      </p:sp>
-      <p:sp>
-        <p:nvSpPr>
-          <p:cNvPr id="18434" name="Title 7"/>
+          <p:cNvPr id="2" name="Title 1"/>
           <p:cNvSpPr>
             <a:spLocks noGrp="1"/>
           </p:cNvSpPr>
@@ -9606,268 +10171,424 @@
         </p:nvSpPr>
         <p:spPr>
           <a:xfrm>
-            <a:off x="712788" y="109538"/>
-            <a:ext cx="6897687" cy="1528762"/>
+            <a:off x="1527175" y="125413"/>
+            <a:ext cx="5238750" cy="1325562"/>
           </a:xfrm>
         </p:spPr>
         <p:txBody>
-          <a:bodyPr anchor="t"/>
+          <a:bodyPr rtlCol="0" anchor="t">
+            <a:normAutofit/>
+          </a:bodyPr>
           <a:lstStyle/>
           <a:p>
-            <a:pPr algn="ctr" eaLnBrk="1" hangingPunct="1"/>
-            <a:r>
-              <a:rPr lang="en-US" smtClean="0">
-                <a:latin typeface="Calibri Light" pitchFamily="34" charset="0"/>
-              </a:rPr>
-              <a:t>TEST CASES NUMBERS</a:t>
-            </a:r>
-            <a:br>
-              <a:rPr lang="en-US" smtClean="0">
-                <a:latin typeface="Calibri Light" pitchFamily="34" charset="0"/>
-              </a:rPr>
-            </a:br>
-            <a:r>
-              <a:rPr lang="en-US" sz="4000" smtClean="0">
-                <a:latin typeface="Calibri Light" pitchFamily="34" charset="0"/>
-              </a:rPr>
-              <a:t>Market Place</a:t>
-            </a:r>
-            <a:endParaRPr lang="en-US" smtClean="0">
-              <a:latin typeface="Calibri Light" pitchFamily="34" charset="0"/>
+            <a:pPr algn="ctr" eaLnBrk="1" fontAlgn="auto" hangingPunct="1">
+              <a:spcAft>
+                <a:spcPts val="0"/>
+              </a:spcAft>
+              <a:defRPr/>
+            </a:pPr>
+            <a:r>
+              <a:rPr lang="en-US" dirty="0" smtClean="0">
+                <a:ea typeface="+mj-ea"/>
+              </a:rPr>
+              <a:t>TESTING TYPES  </a:t>
+            </a:r>
+            <a:endParaRPr lang="en-US" dirty="0">
+              <a:solidFill>
+                <a:schemeClr val="bg1">
+                  <a:lumMod val="85000"/>
+                </a:schemeClr>
+              </a:solidFill>
+              <a:ea typeface="+mj-ea"/>
             </a:endParaRPr>
           </a:p>
         </p:txBody>
       </p:sp>
       <p:sp>
         <p:nvSpPr>
-          <p:cNvPr id="18435" name="TextBox 12"/>
-          <p:cNvSpPr txBox="1">
-            <a:spLocks noChangeArrowheads="1"/>
+          <p:cNvPr id="3" name="Content Placeholder 2"/>
+          <p:cNvSpPr>
+            <a:spLocks noGrp="1"/>
           </p:cNvSpPr>
-          <p:nvPr/>
+          <p:nvPr>
+            <p:ph idx="1"/>
+          </p:nvPr>
         </p:nvSpPr>
-        <p:spPr bwMode="auto">
+        <p:spPr>
           <a:xfrm>
-            <a:off x="274638" y="1582738"/>
-            <a:ext cx="8869362" cy="5140325"/>
+            <a:off x="274638" y="1746250"/>
+            <a:ext cx="8567737" cy="5002213"/>
           </a:xfrm>
-          <a:prstGeom prst="rect">
-            <a:avLst/>
-          </a:prstGeom>
-          <a:noFill/>
-          <a:ln w="9525">
-            <a:noFill/>
-            <a:miter lim="800000"/>
-            <a:headEnd/>
-            <a:tailEnd/>
-          </a:ln>
         </p:spPr>
         <p:txBody>
-          <a:bodyPr>
-            <a:spAutoFit/>
+          <a:bodyPr rtlCol="0">
+            <a:normAutofit/>
           </a:bodyPr>
           <a:lstStyle/>
           <a:p>
-            <a:pPr marL="342900" indent="-342900">
-              <a:buFont typeface="Arial" charset="0"/>
-              <a:buChar char="•"/>
-              <a:defRPr/>
-            </a:pPr>
-            <a:r>
-              <a:rPr lang="en-US" sz="2000" dirty="0">
-                <a:latin typeface="Calibri" pitchFamily="34" charset="0"/>
-              </a:rPr>
-              <a:t>Test case results are the result of functional test written                                                  for a product   X   data points tested against   X    States Tested in</a:t>
-            </a:r>
-          </a:p>
-          <a:p>
-            <a:pPr marL="342900" indent="-342900">
-              <a:defRPr/>
-            </a:pPr>
-            <a:endParaRPr lang="en-US" sz="2000" dirty="0">
-              <a:latin typeface="Calibri" pitchFamily="34" charset="0"/>
+            <a:pPr marL="342900" indent="-342900" eaLnBrk="1" fontAlgn="auto" hangingPunct="1">
+              <a:lnSpc>
+                <a:spcPct val="150000"/>
+              </a:lnSpc>
+              <a:spcBef>
+                <a:spcPts val="0"/>
+              </a:spcBef>
+              <a:spcAft>
+                <a:spcPts val="0"/>
+              </a:spcAft>
+              <a:buFont typeface="Arial" panose="020B0604020202020204" pitchFamily="34" charset="0"/>
+              <a:buChar char="•"/>
+              <a:defRPr/>
+            </a:pPr>
+            <a:r>
+              <a:rPr lang="en-US" sz="2000" b="1" dirty="0" smtClean="0">
+                <a:ea typeface="+mn-ea"/>
+              </a:rPr>
+              <a:t>Three primary types of testing</a:t>
+            </a:r>
+          </a:p>
+          <a:p>
+            <a:pPr eaLnBrk="1" fontAlgn="auto" hangingPunct="1">
+              <a:lnSpc>
+                <a:spcPct val="150000"/>
+              </a:lnSpc>
+              <a:spcBef>
+                <a:spcPts val="0"/>
+              </a:spcBef>
+              <a:spcAft>
+                <a:spcPts val="0"/>
+              </a:spcAft>
+              <a:defRPr/>
+            </a:pPr>
+            <a:r>
+              <a:rPr lang="en-US" sz="1200" b="1" dirty="0">
+                <a:ea typeface="+mn-ea"/>
+              </a:rPr>
+              <a:t> </a:t>
+            </a:r>
+            <a:r>
+              <a:rPr lang="en-US" sz="1200" b="1" dirty="0" smtClean="0">
+                <a:ea typeface="+mn-ea"/>
+              </a:rPr>
+              <a:t>        </a:t>
+            </a:r>
+          </a:p>
+          <a:p>
+            <a:pPr marL="341313" lvl="1" indent="0" eaLnBrk="1" fontAlgn="auto" hangingPunct="1">
+              <a:lnSpc>
+                <a:spcPct val="150000"/>
+              </a:lnSpc>
+              <a:spcBef>
+                <a:spcPts val="0"/>
+              </a:spcBef>
+              <a:spcAft>
+                <a:spcPts val="0"/>
+              </a:spcAft>
+              <a:buFontTx/>
+              <a:buNone/>
+              <a:defRPr/>
+            </a:pPr>
+            <a:r>
+              <a:rPr lang="en-US" sz="1800" b="1" dirty="0" smtClean="0">
+                <a:ea typeface="+mn-ea"/>
+              </a:rPr>
+              <a:t>Page level Functional Integration </a:t>
+            </a:r>
+          </a:p>
+          <a:p>
+            <a:pPr lvl="2" eaLnBrk="1" fontAlgn="auto" hangingPunct="1">
+              <a:lnSpc>
+                <a:spcPct val="114000"/>
+              </a:lnSpc>
+              <a:spcBef>
+                <a:spcPts val="0"/>
+              </a:spcBef>
+              <a:spcAft>
+                <a:spcPts val="0"/>
+              </a:spcAft>
+              <a:buFont typeface="Arial" panose="020B0604020202020204" pitchFamily="34" charset="0"/>
+              <a:buChar char="•"/>
+              <a:defRPr/>
+            </a:pPr>
+            <a:r>
+              <a:rPr lang="en-US" sz="1600" b="1" dirty="0" smtClean="0">
+                <a:ea typeface="+mn-ea"/>
+              </a:rPr>
+              <a:t>Static &amp; Functional html element analysis for all pages in all products</a:t>
+            </a:r>
+          </a:p>
+          <a:p>
+            <a:pPr lvl="3" eaLnBrk="1" fontAlgn="auto" hangingPunct="1">
+              <a:lnSpc>
+                <a:spcPct val="114000"/>
+              </a:lnSpc>
+              <a:spcBef>
+                <a:spcPts val="0"/>
+              </a:spcBef>
+              <a:spcAft>
+                <a:spcPts val="0"/>
+              </a:spcAft>
+              <a:buFont typeface="Arial" panose="020B0604020202020204" pitchFamily="34" charset="0"/>
+              <a:buChar char="•"/>
+              <a:defRPr/>
+            </a:pPr>
+            <a:r>
+              <a:rPr lang="en-US" sz="1400" b="1" dirty="0" smtClean="0">
+                <a:ea typeface="+mn-ea"/>
+              </a:rPr>
+              <a:t>Every Button, Field, Check Box, Link, page element is functionally evaluated and error checked</a:t>
+            </a:r>
+          </a:p>
+          <a:p>
+            <a:pPr lvl="3" eaLnBrk="1" fontAlgn="auto" hangingPunct="1">
+              <a:lnSpc>
+                <a:spcPct val="114000"/>
+              </a:lnSpc>
+              <a:spcBef>
+                <a:spcPts val="0"/>
+              </a:spcBef>
+              <a:spcAft>
+                <a:spcPts val="0"/>
+              </a:spcAft>
+              <a:buFont typeface="Arial" panose="020B0604020202020204" pitchFamily="34" charset="0"/>
+              <a:buChar char="•"/>
+              <a:defRPr/>
+            </a:pPr>
+            <a:r>
+              <a:rPr lang="en-US" sz="1400" b="1" dirty="0" smtClean="0">
+                <a:ea typeface="+mn-ea"/>
+              </a:rPr>
+              <a:t>All page level functionality local to a page is executed and evaluated</a:t>
+            </a:r>
+          </a:p>
+          <a:p>
+            <a:pPr marL="341313" lvl="1" indent="0" eaLnBrk="1" fontAlgn="auto" hangingPunct="1">
+              <a:lnSpc>
+                <a:spcPct val="150000"/>
+              </a:lnSpc>
+              <a:spcBef>
+                <a:spcPts val="0"/>
+              </a:spcBef>
+              <a:spcAft>
+                <a:spcPts val="0"/>
+              </a:spcAft>
+              <a:buFontTx/>
+              <a:buNone/>
+              <a:defRPr/>
+            </a:pPr>
+            <a:r>
+              <a:rPr lang="en-US" sz="900" b="1" dirty="0" smtClean="0">
+                <a:ea typeface="+mn-ea"/>
+              </a:rPr>
+              <a:t>     </a:t>
+            </a:r>
+          </a:p>
+          <a:p>
+            <a:pPr marL="341313" lvl="1" indent="0" eaLnBrk="1" fontAlgn="auto" hangingPunct="1">
+              <a:lnSpc>
+                <a:spcPct val="150000"/>
+              </a:lnSpc>
+              <a:spcBef>
+                <a:spcPts val="0"/>
+              </a:spcBef>
+              <a:spcAft>
+                <a:spcPts val="0"/>
+              </a:spcAft>
+              <a:buFontTx/>
+              <a:buNone/>
+              <a:defRPr/>
+            </a:pPr>
+            <a:r>
+              <a:rPr lang="en-US" sz="1800" b="1" dirty="0" smtClean="0">
+                <a:ea typeface="+mn-ea"/>
+              </a:rPr>
+              <a:t>Application level user work flow  :    Complete  End to End  Scenarios</a:t>
+            </a:r>
+          </a:p>
+          <a:p>
+            <a:pPr lvl="2" eaLnBrk="1" fontAlgn="auto" hangingPunct="1">
+              <a:lnSpc>
+                <a:spcPct val="114000"/>
+              </a:lnSpc>
+              <a:spcBef>
+                <a:spcPts val="0"/>
+              </a:spcBef>
+              <a:spcAft>
+                <a:spcPts val="0"/>
+              </a:spcAft>
+              <a:buFont typeface="Arial" panose="020B0604020202020204" pitchFamily="34" charset="0"/>
+              <a:buChar char="•"/>
+              <a:defRPr/>
+            </a:pPr>
+            <a:r>
+              <a:rPr lang="en-US" sz="1600" b="1" dirty="0" smtClean="0">
+                <a:ea typeface="+mn-ea"/>
+              </a:rPr>
+              <a:t>Designated user work flow execution pathways</a:t>
+            </a:r>
+          </a:p>
+          <a:p>
+            <a:pPr lvl="2" eaLnBrk="1" fontAlgn="auto" hangingPunct="1">
+              <a:lnSpc>
+                <a:spcPct val="114000"/>
+              </a:lnSpc>
+              <a:spcBef>
+                <a:spcPts val="0"/>
+              </a:spcBef>
+              <a:spcAft>
+                <a:spcPts val="0"/>
+              </a:spcAft>
+              <a:buFont typeface="Arial" panose="020B0604020202020204" pitchFamily="34" charset="0"/>
+              <a:buChar char="•"/>
+              <a:defRPr/>
+            </a:pPr>
+            <a:r>
+              <a:rPr lang="en-US" sz="1600" b="1" dirty="0" smtClean="0">
+                <a:ea typeface="+mn-ea"/>
+              </a:rPr>
+              <a:t>Extensive repeat execution with large data set Data driven</a:t>
+            </a:r>
+          </a:p>
+          <a:p>
+            <a:pPr indent="-234950" eaLnBrk="1" fontAlgn="auto" hangingPunct="1">
+              <a:lnSpc>
+                <a:spcPct val="150000"/>
+              </a:lnSpc>
+              <a:spcBef>
+                <a:spcPts val="0"/>
+              </a:spcBef>
+              <a:spcAft>
+                <a:spcPts val="0"/>
+              </a:spcAft>
+              <a:defRPr/>
+            </a:pPr>
+            <a:r>
+              <a:rPr lang="en-US" sz="900" b="1" dirty="0" smtClean="0">
+                <a:ea typeface="+mn-ea"/>
+              </a:rPr>
+              <a:t>   </a:t>
+            </a:r>
+          </a:p>
+          <a:p>
+            <a:pPr indent="-234950" eaLnBrk="1" fontAlgn="auto" hangingPunct="1">
+              <a:lnSpc>
+                <a:spcPct val="150000"/>
+              </a:lnSpc>
+              <a:spcBef>
+                <a:spcPts val="0"/>
+              </a:spcBef>
+              <a:spcAft>
+                <a:spcPts val="0"/>
+              </a:spcAft>
+              <a:defRPr/>
+            </a:pPr>
+            <a:endParaRPr lang="en-US" sz="900" b="1" dirty="0">
+              <a:ea typeface="+mn-ea"/>
             </a:endParaRPr>
           </a:p>
           <a:p>
-            <a:pPr marL="342900" indent="-342900">
-              <a:buFont typeface="Arial" charset="0"/>
-              <a:buChar char="•"/>
-              <a:defRPr/>
-            </a:pPr>
-            <a:r>
-              <a:rPr lang="en-US" sz="1400" b="1" dirty="0">
-                <a:latin typeface="Calibri" pitchFamily="34" charset="0"/>
-              </a:rPr>
-              <a:t>Phase 0</a:t>
-            </a:r>
-            <a:r>
-              <a:rPr lang="en-US" sz="1400" dirty="0">
-                <a:latin typeface="Calibri" pitchFamily="34" charset="0"/>
-              </a:rPr>
-              <a:t> contains 4 products w/ 393, 478, 387, 442 test cases per product, total 1700 functional tests written.                                                                              Factoring test data points and the states where the product is deployed the calculation                                                                                                                                  </a:t>
-            </a:r>
-            <a:r>
-              <a:rPr lang="en-US" sz="2000" dirty="0">
-                <a:latin typeface="Calibri" pitchFamily="34" charset="0"/>
-              </a:rPr>
-              <a:t>4 Products tested in 5 states totals </a:t>
-            </a:r>
-            <a:r>
-              <a:rPr lang="en-US" sz="2400" dirty="0">
-                <a:latin typeface="Calibri" pitchFamily="34" charset="0"/>
-              </a:rPr>
-              <a:t>10125 tests</a:t>
-            </a:r>
-            <a:endParaRPr lang="en-US" dirty="0">
-              <a:latin typeface="Calibri" pitchFamily="34" charset="0"/>
+            <a:pPr marL="341313" lvl="1" indent="0" eaLnBrk="1" fontAlgn="auto" hangingPunct="1">
+              <a:lnSpc>
+                <a:spcPct val="150000"/>
+              </a:lnSpc>
+              <a:spcBef>
+                <a:spcPts val="0"/>
+              </a:spcBef>
+              <a:spcAft>
+                <a:spcPts val="0"/>
+              </a:spcAft>
+              <a:buFontTx/>
+              <a:buNone/>
+              <a:defRPr/>
+            </a:pPr>
+            <a:r>
+              <a:rPr lang="en-US" sz="1800" b="1" dirty="0" smtClean="0">
+                <a:ea typeface="+mn-ea"/>
+              </a:rPr>
+              <a:t>Micro Service REST APIs</a:t>
+            </a:r>
+          </a:p>
+          <a:p>
+            <a:pPr lvl="2" eaLnBrk="1" fontAlgn="auto" hangingPunct="1">
+              <a:lnSpc>
+                <a:spcPct val="114000"/>
+              </a:lnSpc>
+              <a:spcBef>
+                <a:spcPts val="0"/>
+              </a:spcBef>
+              <a:spcAft>
+                <a:spcPts val="0"/>
+              </a:spcAft>
+              <a:buFont typeface="Arial" panose="020B0604020202020204" pitchFamily="34" charset="0"/>
+              <a:buChar char="•"/>
+              <a:defRPr/>
+            </a:pPr>
+            <a:r>
+              <a:rPr lang="en-US" sz="1600" b="1" dirty="0" smtClean="0">
+                <a:ea typeface="+mn-ea"/>
+              </a:rPr>
+              <a:t>Regression coverage for Micro service REST API </a:t>
+            </a:r>
+          </a:p>
+          <a:p>
+            <a:pPr lvl="2" eaLnBrk="1" fontAlgn="auto" hangingPunct="1">
+              <a:lnSpc>
+                <a:spcPct val="114000"/>
+              </a:lnSpc>
+              <a:spcBef>
+                <a:spcPts val="0"/>
+              </a:spcBef>
+              <a:spcAft>
+                <a:spcPts val="0"/>
+              </a:spcAft>
+              <a:buFont typeface="Arial" panose="020B0604020202020204" pitchFamily="34" charset="0"/>
+              <a:buChar char="•"/>
+              <a:defRPr/>
+            </a:pPr>
+            <a:r>
+              <a:rPr lang="en-US" sz="1600" b="1" dirty="0" smtClean="0">
+                <a:ea typeface="+mn-ea"/>
+              </a:rPr>
+              <a:t>Additionally API testing is used to compare data for testing in CX UI Applications</a:t>
+            </a:r>
+            <a:endParaRPr lang="en-US" sz="1600" b="1" dirty="0">
+              <a:ea typeface="+mn-ea"/>
             </a:endParaRPr>
           </a:p>
           <a:p>
-            <a:pPr>
-              <a:defRPr/>
-            </a:pPr>
-            <a:r>
-              <a:rPr lang="en-US" sz="1200" dirty="0">
-                <a:latin typeface="Calibri" pitchFamily="34" charset="0"/>
-              </a:rPr>
-              <a:t>   </a:t>
-            </a:r>
-          </a:p>
-          <a:p>
-            <a:pPr marL="342900" indent="-342900">
-              <a:buFont typeface="Arial" charset="0"/>
-              <a:buChar char="•"/>
-              <a:defRPr/>
-            </a:pPr>
-            <a:r>
-              <a:rPr lang="en-US" sz="1400" b="1" dirty="0">
-                <a:latin typeface="Calibri" pitchFamily="34" charset="0"/>
-              </a:rPr>
-              <a:t>Phase 1 </a:t>
-            </a:r>
-            <a:r>
-              <a:rPr lang="en-US" sz="1400" dirty="0">
-                <a:latin typeface="Calibri" pitchFamily="34" charset="0"/>
-              </a:rPr>
-              <a:t>contains 2 products with 387, 442 test cases per product, total 829 functional tests written.               Factoring test data points and the states where the product is deployed the calculation</a:t>
-            </a:r>
-            <a:r>
-              <a:rPr lang="en-US" dirty="0"/>
-              <a:t> </a:t>
-            </a:r>
-            <a:r>
-              <a:rPr lang="en-US" sz="1400" dirty="0">
-                <a:latin typeface="Calibri" pitchFamily="34" charset="0"/>
-              </a:rPr>
-              <a:t>                                                                                                                                       </a:t>
-            </a:r>
-            <a:r>
-              <a:rPr lang="en-US" sz="2000" dirty="0">
-                <a:latin typeface="Calibri" pitchFamily="34" charset="0"/>
-              </a:rPr>
-              <a:t>2 Products tested in 8 States totals </a:t>
-            </a:r>
-            <a:r>
-              <a:rPr lang="en-US" sz="2400" dirty="0">
-                <a:latin typeface="Calibri" pitchFamily="34" charset="0"/>
-              </a:rPr>
-              <a:t>4394 tests</a:t>
-            </a:r>
-          </a:p>
-          <a:p>
-            <a:pPr>
-              <a:defRPr/>
-            </a:pPr>
-            <a:r>
-              <a:rPr lang="en-US" sz="1200" dirty="0">
-                <a:latin typeface="Calibri" pitchFamily="34" charset="0"/>
-              </a:rPr>
-              <a:t>     </a:t>
-            </a:r>
-          </a:p>
-          <a:p>
-            <a:pPr marL="342900" indent="-342900">
-              <a:buFont typeface="Arial" charset="0"/>
-              <a:buChar char="•"/>
-              <a:defRPr/>
-            </a:pPr>
-            <a:r>
-              <a:rPr lang="en-US" sz="1400" b="1" dirty="0">
-                <a:latin typeface="Calibri" pitchFamily="34" charset="0"/>
-              </a:rPr>
-              <a:t>Phase 2 </a:t>
-            </a:r>
-            <a:r>
-              <a:rPr lang="en-US" sz="1400" dirty="0">
-                <a:latin typeface="Calibri" pitchFamily="34" charset="0"/>
-              </a:rPr>
-              <a:t>contains 1 products with 442 test cases per product, total 442 functional tests written.                      Factoring test data points and the states where the product is deployed the calculation</a:t>
-            </a:r>
-            <a:r>
-              <a:rPr lang="en-US" sz="1400" dirty="0"/>
-              <a:t>                                      </a:t>
-            </a:r>
-            <a:r>
-              <a:rPr lang="en-US" dirty="0"/>
-              <a:t> </a:t>
-            </a:r>
-            <a:r>
-              <a:rPr lang="en-US" sz="2000" dirty="0">
-                <a:latin typeface="Calibri" pitchFamily="34" charset="0"/>
-              </a:rPr>
-              <a:t>1 Product tested in 7 States totals </a:t>
-            </a:r>
-            <a:r>
-              <a:rPr lang="en-US" sz="2400" dirty="0">
-                <a:latin typeface="Calibri" pitchFamily="34" charset="0"/>
-              </a:rPr>
-              <a:t>3234 tests</a:t>
-            </a:r>
-            <a:endParaRPr lang="en-US" sz="2000" dirty="0">
-              <a:latin typeface="Calibri" pitchFamily="34" charset="0"/>
+            <a:pPr marL="457206" lvl="1" indent="0" eaLnBrk="1" fontAlgn="auto" hangingPunct="1">
+              <a:lnSpc>
+                <a:spcPct val="110000"/>
+              </a:lnSpc>
+              <a:spcAft>
+                <a:spcPts val="0"/>
+              </a:spcAft>
+              <a:buFontTx/>
+              <a:buNone/>
+              <a:defRPr/>
+            </a:pPr>
+            <a:r>
+              <a:rPr lang="en-US" sz="1600" b="1" dirty="0" smtClean="0">
+                <a:ea typeface="+mn-ea"/>
+              </a:rPr>
+              <a:t>                  </a:t>
+            </a:r>
+          </a:p>
+          <a:p>
+            <a:pPr marL="457206" lvl="1" indent="0" eaLnBrk="1" fontAlgn="auto" hangingPunct="1">
+              <a:lnSpc>
+                <a:spcPct val="110000"/>
+              </a:lnSpc>
+              <a:spcAft>
+                <a:spcPts val="0"/>
+              </a:spcAft>
+              <a:buFontTx/>
+              <a:buNone/>
+              <a:defRPr/>
+            </a:pPr>
+            <a:endParaRPr lang="en-US" sz="1400" b="1" dirty="0">
+              <a:ea typeface="+mn-ea"/>
             </a:endParaRPr>
-          </a:p>
-          <a:p>
-            <a:pPr>
-              <a:defRPr/>
-            </a:pPr>
-            <a:r>
-              <a:rPr lang="en-US" sz="1200" dirty="0">
-                <a:latin typeface="Calibri" pitchFamily="34" charset="0"/>
-              </a:rPr>
-              <a:t>     </a:t>
-            </a:r>
-          </a:p>
-          <a:p>
-            <a:pPr marL="342900" indent="-342900">
-              <a:buFont typeface="Arial" charset="0"/>
-              <a:buChar char="•"/>
-              <a:defRPr/>
-            </a:pPr>
-            <a:r>
-              <a:rPr lang="en-US" sz="1400" b="1" dirty="0"/>
-              <a:t>Phase 3 </a:t>
-            </a:r>
-            <a:r>
-              <a:rPr lang="en-US" sz="1400" dirty="0"/>
-              <a:t>contains 1 products with 442 test cases per product, total 442 functional tests written.                      Factoring test data points and the states where the product is deployed the calculation</a:t>
-            </a:r>
-            <a:r>
-              <a:rPr lang="en-US" dirty="0"/>
-              <a:t>                        </a:t>
-            </a:r>
-            <a:r>
-              <a:rPr lang="en-US" sz="2000" dirty="0">
-                <a:latin typeface="Calibri" pitchFamily="34" charset="0"/>
-              </a:rPr>
-              <a:t>1 Product tested in 7 States totals </a:t>
-            </a:r>
-            <a:r>
-              <a:rPr lang="en-US" sz="2400" dirty="0">
-                <a:latin typeface="Calibri" pitchFamily="34" charset="0"/>
-              </a:rPr>
-              <a:t>3234 tests</a:t>
-            </a:r>
           </a:p>
         </p:txBody>
       </p:sp>
@@ -10205,7 +10926,7 @@
   <a:extraClrSchemeLst/>
   <a:extLst>
     <a:ext uri="{05A4C25C-085E-4340-85A3-A5531E510DB2}">
-      <thm15:themeFamily xmlns="" xmlns:thm15="http://schemas.microsoft.com/office/thememl/2012/main" name="Presentation2" id="{E033CE4F-DAC9-4DC1-B085-D07FC0345DDB}" vid="{0783260F-4856-4ED7-B8E5-5C83CC1572CF}"/>
+      <thm15:themeFamily xmlns:thm15="http://schemas.microsoft.com/office/thememl/2012/main" name="Presentation2" id="{E033CE4F-DAC9-4DC1-B085-D07FC0345DDB}" vid="{0783260F-4856-4ED7-B8E5-5C83CC1572CF}"/>
     </a:ext>
   </a:extLst>
 </a:theme>
@@ -10466,7 +11187,7 @@
   <a:extraClrSchemeLst/>
   <a:extLst>
     <a:ext uri="{05A4C25C-085E-4340-85A3-A5531E510DB2}">
-      <thm15:themeFamily xmlns="" xmlns:thm15="http://schemas.microsoft.com/office/thememl/2012/main" name="Office Theme" id="{62F939B6-93AF-4DB8-9C6B-D6C7DFDC589F}" vid="{4A3C46E8-61CC-4603-A589-7422A47A8E4A}"/>
+      <thm15:themeFamily xmlns:thm15="http://schemas.microsoft.com/office/thememl/2012/main" name="Office Theme" id="{62F939B6-93AF-4DB8-9C6B-D6C7DFDC589F}" vid="{4A3C46E8-61CC-4603-A589-7422A47A8E4A}"/>
     </a:ext>
   </a:extLst>
 </a:theme>

</xml_diff>

<commit_message>
4/23/18 generally some mods to things
</commit_message>
<xml_diff>
--- a/CurrentWork_Delta/CX_StrategyPowerPoint.pptx
+++ b/CurrentWork_Delta/CX_StrategyPowerPoint.pptx
@@ -286,7 +286,7 @@
               <a:pPr>
                 <a:defRPr/>
               </a:pPr>
-              <a:t>4/20/2018</a:t>
+              <a:t>4/23/2018</a:t>
             </a:fld>
             <a:endParaRPr lang="en-US"/>
           </a:p>
@@ -2922,7 +2922,7 @@
         <p:spPr>
           <a:xfrm>
             <a:off x="433388" y="914400"/>
-            <a:ext cx="3849687" cy="2803525"/>
+            <a:ext cx="4254359" cy="5382228"/>
           </a:xfrm>
         </p:spPr>
         <p:txBody>
@@ -2941,7 +2941,13 @@
               <a:rPr lang="en-US" u="sng" dirty="0" smtClean="0">
                 <a:ea typeface="+mn-ea"/>
               </a:rPr>
-              <a:t>Three levels </a:t>
+              <a:t>Three </a:t>
+            </a:r>
+            <a:r>
+              <a:rPr lang="en-US" u="sng" dirty="0" smtClean="0">
+                <a:ea typeface="+mn-ea"/>
+              </a:rPr>
+              <a:t>Desired levels </a:t>
             </a:r>
             <a:r>
               <a:rPr lang="en-US" u="sng" dirty="0">
@@ -2987,7 +2993,7 @@
               <a:rPr lang="en-US" b="1" dirty="0" smtClean="0">
                 <a:ea typeface="+mn-ea"/>
               </a:rPr>
-              <a:t>Hyper granular</a:t>
+              <a:t>Test Run</a:t>
             </a:r>
             <a:r>
               <a:rPr lang="en-US" dirty="0" smtClean="0">
@@ -2995,6 +3001,9 @@
               </a:rPr>
               <a:t>:  </a:t>
             </a:r>
+            <a:endParaRPr lang="en-US" dirty="0" smtClean="0">
+              <a:ea typeface="+mn-ea"/>
+            </a:endParaRPr>
           </a:p>
           <a:p>
             <a:pPr marL="342900" indent="-342900" eaLnBrk="1" fontAlgn="auto" hangingPunct="1">
@@ -3009,8 +3018,36 @@
               <a:rPr lang="en-US" dirty="0" smtClean="0">
                 <a:ea typeface="+mn-ea"/>
               </a:rPr>
-              <a:t>Primary for debugging.</a:t>
-            </a:r>
+              <a:t>A collection of test cases by state, product, or function.</a:t>
+            </a:r>
+          </a:p>
+          <a:p>
+            <a:pPr eaLnBrk="1" fontAlgn="auto" hangingPunct="1">
+              <a:spcAft>
+                <a:spcPts val="0"/>
+              </a:spcAft>
+              <a:defRPr/>
+            </a:pPr>
+            <a:endParaRPr lang="en-US" dirty="0">
+              <a:ea typeface="+mn-ea"/>
+            </a:endParaRPr>
+          </a:p>
+          <a:p>
+            <a:pPr eaLnBrk="1" fontAlgn="auto" hangingPunct="1">
+              <a:spcAft>
+                <a:spcPts val="0"/>
+              </a:spcAft>
+              <a:defRPr/>
+            </a:pPr>
+            <a:r>
+              <a:rPr lang="en-US" b="1" dirty="0" smtClean="0">
+                <a:ea typeface="+mn-ea"/>
+              </a:rPr>
+              <a:t>Case Specific</a:t>
+            </a:r>
+            <a:endParaRPr lang="en-US" b="1" dirty="0" smtClean="0">
+              <a:ea typeface="+mn-ea"/>
+            </a:endParaRPr>
           </a:p>
           <a:p>
             <a:pPr marL="342900" indent="-342900" eaLnBrk="1" fontAlgn="auto" hangingPunct="1">
@@ -3025,11 +3062,86 @@
               <a:rPr lang="en-US" dirty="0" smtClean="0">
                 <a:ea typeface="+mn-ea"/>
               </a:rPr>
-              <a:t>Covers every Assert or comparison in Framework</a:t>
-            </a:r>
-          </a:p>
-          <a:p>
-            <a:pPr lvl="1" eaLnBrk="1" fontAlgn="auto" hangingPunct="1">
+              <a:t>Very </a:t>
+            </a:r>
+            <a:r>
+              <a:rPr lang="en-US" dirty="0" smtClean="0">
+                <a:ea typeface="+mn-ea"/>
+              </a:rPr>
+              <a:t>granular, c</a:t>
+            </a:r>
+            <a:r>
+              <a:rPr lang="en-US" dirty="0" smtClean="0">
+                <a:ea typeface="+mn-ea"/>
+              </a:rPr>
+              <a:t>overs </a:t>
+            </a:r>
+            <a:r>
+              <a:rPr lang="en-US" dirty="0" smtClean="0">
+                <a:ea typeface="+mn-ea"/>
+              </a:rPr>
+              <a:t>every Assert or </a:t>
+            </a:r>
+            <a:r>
+              <a:rPr lang="en-US" dirty="0" smtClean="0">
+                <a:ea typeface="+mn-ea"/>
+              </a:rPr>
+              <a:t>Compare in a </a:t>
+            </a:r>
+            <a:r>
+              <a:rPr lang="en-US" dirty="0" smtClean="0">
+                <a:ea typeface="+mn-ea"/>
+              </a:rPr>
+              <a:t>given test case</a:t>
+            </a:r>
+            <a:endParaRPr lang="en-US" dirty="0" smtClean="0">
+              <a:ea typeface="+mn-ea"/>
+            </a:endParaRPr>
+          </a:p>
+          <a:p>
+            <a:pPr eaLnBrk="1" fontAlgn="auto" hangingPunct="1">
+              <a:spcAft>
+                <a:spcPts val="0"/>
+              </a:spcAft>
+              <a:defRPr/>
+            </a:pPr>
+            <a:r>
+              <a:rPr lang="en-US" dirty="0" smtClean="0">
+                <a:ea typeface="+mn-ea"/>
+              </a:rPr>
+              <a:t>     Is a Key Development tool</a:t>
+            </a:r>
+          </a:p>
+          <a:p>
+            <a:pPr eaLnBrk="1" fontAlgn="auto" hangingPunct="1">
+              <a:spcAft>
+                <a:spcPts val="0"/>
+              </a:spcAft>
+              <a:defRPr/>
+            </a:pPr>
+            <a:endParaRPr lang="en-US" b="1" dirty="0">
+              <a:ea typeface="+mn-ea"/>
+            </a:endParaRPr>
+          </a:p>
+          <a:p>
+            <a:pPr eaLnBrk="1" fontAlgn="auto" hangingPunct="1">
+              <a:spcAft>
+                <a:spcPts val="0"/>
+              </a:spcAft>
+              <a:defRPr/>
+            </a:pPr>
+            <a:r>
+              <a:rPr lang="en-US" b="1" dirty="0" smtClean="0">
+                <a:ea typeface="+mn-ea"/>
+              </a:rPr>
+              <a:t>Dash Board</a:t>
+            </a:r>
+            <a:endParaRPr lang="en-US" b="1" dirty="0">
+              <a:ea typeface="+mn-ea"/>
+            </a:endParaRPr>
+          </a:p>
+          <a:p>
+            <a:pPr marL="342900" indent="-342900" eaLnBrk="1" fontAlgn="auto" hangingPunct="1">
               <a:spcAft>
                 <a:spcPts val="0"/>
               </a:spcAft>
@@ -3041,37 +3153,14 @@
               <a:rPr lang="en-US" dirty="0" smtClean="0">
                 <a:ea typeface="+mn-ea"/>
               </a:rPr>
-              <a:t>Debugging and Framework Development tool</a:t>
-            </a:r>
+              <a:t>Provides a view into the current state of a product w.r.t ship-ability </a:t>
+            </a:r>
+            <a:endParaRPr lang="en-US" dirty="0" smtClean="0">
+              <a:ea typeface="+mn-ea"/>
+            </a:endParaRPr>
           </a:p>
         </p:txBody>
       </p:sp>
-      <p:pic>
-        <p:nvPicPr>
-          <p:cNvPr id="19463" name="Picture 7" descr="Rpt_SpecHeader"/>
-          <p:cNvPicPr>
-            <a:picLocks noChangeAspect="1" noChangeArrowheads="1"/>
-          </p:cNvPicPr>
-          <p:nvPr/>
-        </p:nvPicPr>
-        <p:blipFill>
-          <a:blip r:embed="rId2"/>
-          <a:srcRect/>
-          <a:stretch>
-            <a:fillRect/>
-          </a:stretch>
-        </p:blipFill>
-        <p:spPr bwMode="auto">
-          <a:xfrm>
-            <a:off x="576263" y="3884613"/>
-            <a:ext cx="3886200" cy="2149475"/>
-          </a:xfrm>
-          <a:prstGeom prst="rect">
-            <a:avLst/>
-          </a:prstGeom>
-          <a:noFill/>
-        </p:spPr>
-      </p:pic>
       <p:pic>
         <p:nvPicPr>
           <p:cNvPr id="19464" name="Picture 8" descr="main"/>
@@ -3081,7 +3170,7 @@
           <p:nvPr/>
         </p:nvPicPr>
         <p:blipFill>
-          <a:blip r:embed="rId3"/>
+          <a:blip r:embed="rId2"/>
           <a:srcRect/>
           <a:stretch>
             <a:fillRect/>
@@ -3098,6 +3187,49 @@
           <a:noFill/>
         </p:spPr>
       </p:pic>
+      <p:sp>
+        <p:nvSpPr>
+          <p:cNvPr id="2" name="Right Arrow 1"/>
+          <p:cNvSpPr/>
+          <p:nvPr/>
+        </p:nvSpPr>
+        <p:spPr>
+          <a:xfrm>
+            <a:off x="8461099" y="5845216"/>
+            <a:ext cx="138896" cy="104172"/>
+          </a:xfrm>
+          <a:prstGeom prst="rightArrow">
+            <a:avLst/>
+          </a:prstGeom>
+          <a:solidFill>
+            <a:schemeClr val="bg1">
+              <a:lumMod val="95000"/>
+            </a:schemeClr>
+          </a:solidFill>
+        </p:spPr>
+        <p:style>
+          <a:lnRef idx="1">
+            <a:schemeClr val="accent1"/>
+          </a:lnRef>
+          <a:fillRef idx="3">
+            <a:schemeClr val="accent1"/>
+          </a:fillRef>
+          <a:effectRef idx="2">
+            <a:schemeClr val="accent1"/>
+          </a:effectRef>
+          <a:fontRef idx="minor">
+            <a:schemeClr val="lt1"/>
+          </a:fontRef>
+        </p:style>
+        <p:txBody>
+          <a:bodyPr rtlCol="0" anchor="ctr"/>
+          <a:lstStyle/>
+          <a:p>
+            <a:pPr algn="ctr"/>
+            <a:endParaRPr lang="en-US"/>
+          </a:p>
+        </p:txBody>
+      </p:sp>
     </p:spTree>
   </p:cSld>
   <p:clrMapOvr>
@@ -3290,8 +3422,8 @@
         </p:blipFill>
         <p:spPr bwMode="auto">
           <a:xfrm>
-            <a:off x="3638550" y="1073150"/>
-            <a:ext cx="5287963" cy="4313238"/>
+            <a:off x="3576583" y="1374093"/>
+            <a:ext cx="5523556" cy="4505404"/>
           </a:xfrm>
           <a:prstGeom prst="rect">
             <a:avLst/>
@@ -3373,8 +3505,8 @@
         </p:nvSpPr>
         <p:spPr>
           <a:xfrm>
-            <a:off x="433388" y="914400"/>
-            <a:ext cx="4035425" cy="5365750"/>
+            <a:off x="433388" y="914401"/>
+            <a:ext cx="4035425" cy="4537276"/>
           </a:xfrm>
         </p:spPr>
         <p:txBody>
@@ -3387,7 +3519,7 @@
               </a:lnSpc>
             </a:pPr>
             <a:r>
-              <a:rPr lang="en-US" u="sng" smtClean="0">
+              <a:rPr lang="en-US" u="sng" dirty="0" smtClean="0">
                 <a:latin typeface="Calibri Light" pitchFamily="34" charset="0"/>
               </a:rPr>
               <a:t>Three levels of reporting</a:t>
@@ -3403,12 +3535,12 @@
               </a:spcBef>
             </a:pPr>
             <a:r>
-              <a:rPr lang="en-US" sz="700" smtClean="0">
+              <a:rPr lang="en-US" sz="700" dirty="0" smtClean="0">
                 <a:latin typeface="Calibri Light" pitchFamily="34" charset="0"/>
               </a:rPr>
               <a:t> </a:t>
             </a:r>
-            <a:endParaRPr lang="en-US" sz="700" u="sng" smtClean="0">
+            <a:endParaRPr lang="en-US" sz="700" u="sng" dirty="0" smtClean="0">
               <a:latin typeface="Calibri Light" pitchFamily="34" charset="0"/>
             </a:endParaRPr>
           </a:p>
@@ -3418,7 +3550,7 @@
                 <a:spcPct val="70000"/>
               </a:lnSpc>
             </a:pPr>
-            <a:endParaRPr lang="en-US" b="1" smtClean="0">
+            <a:endParaRPr lang="en-US" b="1" dirty="0" smtClean="0">
               <a:latin typeface="Calibri Light" pitchFamily="34" charset="0"/>
             </a:endParaRPr>
           </a:p>
@@ -3429,7 +3561,7 @@
               </a:lnSpc>
             </a:pPr>
             <a:r>
-              <a:rPr lang="en-US" sz="2500" b="1" u="sng" smtClean="0">
+              <a:rPr lang="en-US" sz="2500" b="1" u="sng" dirty="0" smtClean="0">
                 <a:latin typeface="Calibri Light" pitchFamily="34" charset="0"/>
               </a:rPr>
               <a:t>ASPIRATIONAL PRESENTATION</a:t>
@@ -3441,7 +3573,13 @@
                 <a:spcPct val="70000"/>
               </a:lnSpc>
             </a:pPr>
-            <a:endParaRPr lang="en-US" sz="2500" b="1" smtClean="0">
+            <a:r>
+              <a:rPr lang="en-US" sz="900" b="1" dirty="0" smtClean="0">
+                <a:latin typeface="Calibri Light" pitchFamily="34" charset="0"/>
+              </a:rPr>
+              <a:t>     </a:t>
+            </a:r>
+            <a:endParaRPr lang="en-US" sz="900" b="1" dirty="0" smtClean="0">
               <a:latin typeface="Calibri Light" pitchFamily="34" charset="0"/>
             </a:endParaRPr>
           </a:p>
@@ -3452,7 +3590,7 @@
               </a:lnSpc>
             </a:pPr>
             <a:r>
-              <a:rPr lang="en-US" b="1" smtClean="0">
+              <a:rPr lang="en-US" b="1" dirty="0" smtClean="0">
                 <a:latin typeface="Calibri Light" pitchFamily="34" charset="0"/>
               </a:rPr>
               <a:t>High Level Dashboard</a:t>
@@ -3465,7 +3603,7 @@
               </a:lnSpc>
             </a:pPr>
             <a:r>
-              <a:rPr lang="en-US" b="1" smtClean="0">
+              <a:rPr lang="en-US" b="1" dirty="0" smtClean="0">
                 <a:latin typeface="Calibri Light" pitchFamily="34" charset="0"/>
               </a:rPr>
               <a:t>Product Specific: </a:t>
@@ -3478,7 +3616,7 @@
               </a:lnSpc>
             </a:pPr>
             <a:r>
-              <a:rPr lang="en-US" sz="500" smtClean="0">
+              <a:rPr lang="en-US" sz="500" dirty="0" smtClean="0">
                 <a:latin typeface="Calibri Light" pitchFamily="34" charset="0"/>
               </a:rPr>
               <a:t>       </a:t>
@@ -3491,13 +3629,13 @@
               </a:lnSpc>
             </a:pPr>
             <a:r>
-              <a:rPr lang="en-US" sz="1800" smtClean="0">
+              <a:rPr lang="en-US" sz="1800" dirty="0" smtClean="0">
                 <a:latin typeface="Calibri Light" pitchFamily="34" charset="0"/>
               </a:rPr>
               <a:t>       </a:t>
             </a:r>
             <a:r>
-              <a:rPr lang="en-US" sz="1800" b="1" smtClean="0">
+              <a:rPr lang="en-US" sz="1800" b="1" dirty="0" smtClean="0">
                 <a:latin typeface="Calibri Light" pitchFamily="34" charset="0"/>
               </a:rPr>
               <a:t>Go / No-go Product  Dashboard</a:t>
@@ -3509,7 +3647,13 @@
                 <a:spcPct val="70000"/>
               </a:lnSpc>
             </a:pPr>
-            <a:endParaRPr lang="en-US" sz="1800" b="1" smtClean="0">
+            <a:r>
+              <a:rPr lang="en-US" sz="800" dirty="0" smtClean="0">
+                <a:latin typeface="Calibri Light" pitchFamily="34" charset="0"/>
+              </a:rPr>
+              <a:t>            </a:t>
+            </a:r>
+            <a:endParaRPr lang="en-US" sz="800" dirty="0" smtClean="0">
               <a:latin typeface="Calibri Light" pitchFamily="34" charset="0"/>
             </a:endParaRPr>
           </a:p>
@@ -3520,23 +3664,25 @@
               </a:lnSpc>
             </a:pPr>
             <a:r>
-              <a:rPr lang="en-US" sz="800" smtClean="0">
+              <a:rPr lang="en-US" b="1" dirty="0" smtClean="0">
                 <a:latin typeface="Calibri Light" pitchFamily="34" charset="0"/>
               </a:rPr>
-              <a:t>            </a:t>
+              <a:t>Provides:</a:t>
             </a:r>
           </a:p>
           <a:p>
             <a:pPr eaLnBrk="1" hangingPunct="1">
               <a:lnSpc>
-                <a:spcPct val="70000"/>
-              </a:lnSpc>
-            </a:pPr>
-            <a:r>
-              <a:rPr lang="en-US" b="1" smtClean="0">
+                <a:spcPct val="105000"/>
+              </a:lnSpc>
+              <a:buFontTx/>
+              <a:buChar char="•"/>
+            </a:pPr>
+            <a:r>
+              <a:rPr lang="en-US" b="1" dirty="0" smtClean="0">
                 <a:latin typeface="Calibri Light" pitchFamily="34" charset="0"/>
               </a:rPr>
-              <a:t>Provides:</a:t>
+              <a:t>Development Managers &amp;</a:t>
             </a:r>
           </a:p>
           <a:p>
@@ -3548,22 +3694,7 @@
               <a:buChar char="•"/>
             </a:pPr>
             <a:r>
-              <a:rPr lang="en-US" b="1" smtClean="0">
-                <a:latin typeface="Calibri Light" pitchFamily="34" charset="0"/>
-              </a:rPr>
-              <a:t>Development Managers &amp;</a:t>
-            </a:r>
-          </a:p>
-          <a:p>
-            <a:pPr eaLnBrk="1" hangingPunct="1">
-              <a:lnSpc>
-                <a:spcPct val="105000"/>
-              </a:lnSpc>
-              <a:buFontTx/>
-              <a:buChar char="•"/>
-            </a:pPr>
-            <a:r>
-              <a:rPr lang="en-US" b="1" smtClean="0">
+              <a:rPr lang="en-US" b="1" dirty="0" smtClean="0">
                 <a:latin typeface="Calibri Light" pitchFamily="34" charset="0"/>
               </a:rPr>
               <a:t>Product Managers A quick look at the current health and capability to ship the product </a:t>
@@ -3588,13 +3719,43 @@
         </p:blipFill>
         <p:spPr bwMode="auto">
           <a:xfrm>
-            <a:off x="4857750" y="836613"/>
-            <a:ext cx="4090988" cy="5875337"/>
+            <a:off x="4953964" y="810229"/>
+            <a:ext cx="3994773" cy="4879778"/>
           </a:xfrm>
           <a:prstGeom prst="rect">
             <a:avLst/>
           </a:prstGeom>
           <a:noFill/>
+        </p:spPr>
+      </p:pic>
+      <p:pic>
+        <p:nvPicPr>
+          <p:cNvPr id="2" name="Picture 1"/>
+          <p:cNvPicPr>
+            <a:picLocks noChangeAspect="1"/>
+          </p:cNvPicPr>
+          <p:nvPr/>
+        </p:nvPicPr>
+        <p:blipFill>
+          <a:blip r:embed="rId3">
+            <a:extLst>
+              <a:ext uri="{28A0092B-C50C-407E-A947-70E740481C1C}">
+                <a14:useLocalDpi xmlns:a14="http://schemas.microsoft.com/office/drawing/2010/main" val="0"/>
+              </a:ext>
+            </a:extLst>
+          </a:blip>
+          <a:stretch>
+            <a:fillRect/>
+          </a:stretch>
+        </p:blipFill>
+        <p:spPr>
+          <a:xfrm>
+            <a:off x="766440" y="5690007"/>
+            <a:ext cx="7676808" cy="1167993"/>
+          </a:xfrm>
+          <a:prstGeom prst="rect">
+            <a:avLst/>
+          </a:prstGeom>
         </p:spPr>
       </p:pic>
     </p:spTree>
@@ -4478,8 +4639,8 @@
         </p:nvSpPr>
         <p:spPr bwMode="auto">
           <a:xfrm>
-            <a:off x="2630488" y="6096000"/>
-            <a:ext cx="2097087" cy="600075"/>
+            <a:off x="2361235" y="6003400"/>
+            <a:ext cx="2366340" cy="769441"/>
           </a:xfrm>
           <a:prstGeom prst="rect">
             <a:avLst/>
@@ -4493,15 +4654,48 @@
           </a:ln>
         </p:spPr>
         <p:txBody>
-          <a:bodyPr>
+          <a:bodyPr wrap="square">
             <a:spAutoFit/>
           </a:bodyPr>
           <a:lstStyle/>
           <a:p>
             <a:r>
-              <a:rPr lang="en-US" sz="1100"/>
-              <a:t>NextGen  Test Auto to develop and fill out all http layer REST API Automation Testing</a:t>
-            </a:r>
+              <a:rPr lang="en-US" sz="1100" dirty="0" smtClean="0"/>
+              <a:t>Dev </a:t>
+            </a:r>
+            <a:r>
+              <a:rPr lang="en-US" sz="1100" dirty="0" smtClean="0"/>
+              <a:t>engineers to develop API validation </a:t>
+            </a:r>
+            <a:r>
+              <a:rPr lang="en-US" sz="1100" dirty="0" smtClean="0"/>
+              <a:t>test scripting.  Next Gen Test </a:t>
+            </a:r>
+            <a:r>
+              <a:rPr lang="en-US" sz="1100" dirty="0"/>
+              <a:t>Auto </a:t>
+            </a:r>
+            <a:r>
+              <a:rPr lang="en-US" sz="1100" dirty="0" smtClean="0"/>
+              <a:t>team to fill </a:t>
+            </a:r>
+            <a:r>
+              <a:rPr lang="en-US" sz="1100" dirty="0"/>
+              <a:t>out </a:t>
+            </a:r>
+            <a:r>
+              <a:rPr lang="en-US" sz="1100" dirty="0" smtClean="0"/>
+              <a:t>remaining REST </a:t>
+            </a:r>
+            <a:r>
+              <a:rPr lang="en-US" sz="1100" dirty="0"/>
+              <a:t>API </a:t>
+            </a:r>
+            <a:r>
+              <a:rPr lang="en-US" sz="1100" dirty="0" smtClean="0"/>
+              <a:t>regression tests</a:t>
+            </a:r>
+            <a:endParaRPr lang="en-US" sz="1100" dirty="0"/>
           </a:p>
         </p:txBody>
       </p:sp>
@@ -6727,14 +6921,17 @@
               <a:rPr lang="en-US" sz="1600" b="1" dirty="0" smtClean="0">
                 <a:ea typeface="+mn-ea"/>
               </a:rPr>
-              <a:t>Frisby,    Solar  </a:t>
-            </a:r>
-            <a:r>
-              <a:rPr lang="en-US" sz="1400" b="1" dirty="0" smtClean="0">
-                <a:ea typeface="+mn-ea"/>
-              </a:rPr>
-              <a:t>( Node Modules )</a:t>
-            </a:r>
+              <a:t>Node.js, Frisby</a:t>
+            </a:r>
+            <a:r>
+              <a:rPr lang="en-US" sz="1600" b="1" dirty="0">
+                <a:ea typeface="+mn-ea"/>
+              </a:rPr>
+              <a:t> </a:t>
+            </a:r>
+            <a:endParaRPr lang="en-US" sz="1400" b="1" dirty="0" smtClean="0">
+              <a:ea typeface="+mn-ea"/>
+            </a:endParaRPr>
           </a:p>
           <a:p>
             <a:pPr marL="342900" indent="-342900" eaLnBrk="1" fontAlgn="auto" hangingPunct="1">
@@ -6912,7 +7109,13 @@
               <a:rPr lang="en-US" sz="2000" b="1" dirty="0" smtClean="0">
                 <a:ea typeface="+mn-ea"/>
               </a:rPr>
-              <a:t>My Team develops and delivered an automated </a:t>
+              <a:t>The Next Generation Test Automation team </a:t>
+            </a:r>
+            <a:r>
+              <a:rPr lang="en-US" sz="2000" b="1" dirty="0" smtClean="0">
+                <a:ea typeface="+mn-ea"/>
+              </a:rPr>
+              <a:t>develops and delivered an automated </a:t>
             </a:r>
             <a:r>
               <a:rPr lang="en-US" sz="2000" b="1" dirty="0">
@@ -7225,7 +7428,7 @@
               <a:buChar char="•"/>
             </a:pPr>
             <a:r>
-              <a:rPr lang="en-US" sz="2000" b="1" smtClean="0">
+              <a:rPr lang="en-US" sz="2000" b="1" dirty="0" smtClean="0">
                 <a:latin typeface="Calibri Light" pitchFamily="34" charset="0"/>
               </a:rPr>
               <a:t>NGTA and the CX Market Place Development Team have matured since 2016. </a:t>
@@ -7239,15 +7442,17 @@
               <a:spcBef>
                 <a:spcPct val="0"/>
               </a:spcBef>
-            </a:pPr>
-            <a:r>
-              <a:rPr lang="en-US" sz="1600" b="1" smtClean="0">
+              <a:buFont typeface="Arial" panose="020B0604020202020204" pitchFamily="34" charset="0"/>
+              <a:buChar char="•"/>
+            </a:pPr>
+            <a:r>
+              <a:rPr lang="en-US" sz="1600" b="1" dirty="0" smtClean="0">
                 <a:latin typeface="Calibri Light" pitchFamily="34" charset="0"/>
               </a:rPr>
               <a:t>We are able to do more and deliver to a greater audience. </a:t>
             </a:r>
             <a:r>
-              <a:rPr lang="en-US" sz="1800" b="1" smtClean="0">
+              <a:rPr lang="en-US" sz="1800" b="1" dirty="0" smtClean="0">
                 <a:latin typeface="Calibri Light" pitchFamily="34" charset="0"/>
               </a:rPr>
               <a:t> </a:t>
@@ -7265,7 +7470,7 @@
               <a:buChar char="•"/>
             </a:pPr>
             <a:r>
-              <a:rPr lang="en-US" sz="2000" b="1" smtClean="0">
+              <a:rPr lang="en-US" sz="2000" b="1" dirty="0" smtClean="0">
                 <a:latin typeface="Calibri Light" pitchFamily="34" charset="0"/>
               </a:rPr>
               <a:t>To scale as projected </a:t>
@@ -7283,13 +7488,13 @@
               <a:buChar char="•"/>
             </a:pPr>
             <a:r>
-              <a:rPr lang="en-US" sz="1600" b="1" smtClean="0">
+              <a:rPr lang="en-US" sz="1600" b="1" dirty="0" smtClean="0">
                 <a:latin typeface="Calibri Light" pitchFamily="34" charset="0"/>
               </a:rPr>
               <a:t>we have to change how we develop tests   </a:t>
             </a:r>
             <a:r>
-              <a:rPr lang="en-US" sz="1000" b="1" smtClean="0">
+              <a:rPr lang="en-US" sz="1000" b="1" dirty="0" smtClean="0">
                 <a:solidFill>
                   <a:srgbClr val="A6A6A6"/>
                 </a:solidFill>
@@ -7310,12 +7515,12 @@
               <a:buChar char="•"/>
             </a:pPr>
             <a:r>
-              <a:rPr lang="en-US" sz="1600" b="1" smtClean="0">
+              <a:rPr lang="en-US" sz="1600" b="1" dirty="0" smtClean="0">
                 <a:latin typeface="Calibri Light" pitchFamily="34" charset="0"/>
               </a:rPr>
               <a:t>we have changed how we select &amp; control execution  </a:t>
             </a:r>
-            <a:endParaRPr lang="en-US" sz="1000" b="1" smtClean="0">
+            <a:endParaRPr lang="en-US" sz="1000" b="1" dirty="0" smtClean="0">
               <a:solidFill>
                 <a:srgbClr val="A6A6A6"/>
               </a:solidFill>
@@ -7334,7 +7539,7 @@
               <a:buNone/>
             </a:pPr>
             <a:r>
-              <a:rPr lang="en-US" sz="200" b="1" smtClean="0">
+              <a:rPr lang="en-US" sz="200" b="1" dirty="0" smtClean="0">
                 <a:solidFill>
                   <a:srgbClr val="A6A6A6"/>
                 </a:solidFill>
@@ -7342,7 +7547,7 @@
               </a:rPr>
               <a:t>   </a:t>
             </a:r>
-            <a:endParaRPr lang="en-US" sz="700" b="1" smtClean="0">
+            <a:endParaRPr lang="en-US" sz="700" b="1" dirty="0" smtClean="0">
               <a:latin typeface="Calibri Light" pitchFamily="34" charset="0"/>
             </a:endParaRPr>
           </a:p>
@@ -7358,7 +7563,7 @@
               <a:buChar char="•"/>
             </a:pPr>
             <a:r>
-              <a:rPr lang="en-US" sz="2000" b="1" smtClean="0">
+              <a:rPr lang="en-US" sz="2000" b="1" dirty="0" smtClean="0">
                 <a:latin typeface="Calibri Light" pitchFamily="34" charset="0"/>
               </a:rPr>
               <a:t>Massive reduction in the number of hours  Manual VS Automated</a:t>
@@ -7375,7 +7580,7 @@
               <a:buFontTx/>
               <a:buNone/>
             </a:pPr>
-            <a:endParaRPr lang="en-US" sz="1800" smtClean="0">
+            <a:endParaRPr lang="en-US" sz="1800" dirty="0" smtClean="0">
               <a:latin typeface="Calibri Light" pitchFamily="34" charset="0"/>
             </a:endParaRPr>
           </a:p>
@@ -7390,7 +7595,7 @@
               <a:buFont typeface="Arial" charset="0"/>
               <a:buChar char="•"/>
             </a:pPr>
-            <a:endParaRPr lang="en-US" sz="1800" smtClean="0">
+            <a:endParaRPr lang="en-US" sz="1800" dirty="0" smtClean="0">
               <a:latin typeface="Calibri Light" pitchFamily="34" charset="0"/>
             </a:endParaRPr>
           </a:p>
@@ -7400,7 +7605,7 @@
                 <a:spcPct val="70000"/>
               </a:lnSpc>
             </a:pPr>
-            <a:endParaRPr lang="en-US" sz="2000" smtClean="0">
+            <a:endParaRPr lang="en-US" sz="2000" dirty="0" smtClean="0">
               <a:latin typeface="Calibri Light" pitchFamily="34" charset="0"/>
             </a:endParaRPr>
           </a:p>
@@ -8073,7 +8278,19 @@
               <a:rPr lang="en-US" sz="1700" b="1" dirty="0" smtClean="0">
                 <a:ea typeface="+mn-ea"/>
               </a:rPr>
-              <a:t>See Appendix: Test Case Numbers</a:t>
+              <a:t>See </a:t>
+            </a:r>
+            <a:r>
+              <a:rPr lang="en-US" sz="1700" b="1" dirty="0" smtClean="0">
+                <a:ea typeface="+mn-ea"/>
+              </a:rPr>
+              <a:t>Pg. Test </a:t>
+            </a:r>
+            <a:r>
+              <a:rPr lang="en-US" sz="1700" b="1" dirty="0" smtClean="0">
+                <a:ea typeface="+mn-ea"/>
+              </a:rPr>
+              <a:t>Case Numbers</a:t>
             </a:r>
           </a:p>
           <a:p>
@@ -8095,7 +8312,13 @@
               <a:rPr lang="en-US" sz="1900" b="1" dirty="0" smtClean="0">
                 <a:ea typeface="+mn-ea"/>
               </a:rPr>
-              <a:t>Implementation of the ‘dataProvider’ technology </a:t>
+              <a:t>Through implementation </a:t>
+            </a:r>
+            <a:r>
+              <a:rPr lang="en-US" sz="1900" b="1" dirty="0" smtClean="0">
+                <a:ea typeface="+mn-ea"/>
+              </a:rPr>
+              <a:t>of the ‘dataProvider’ technology </a:t>
             </a:r>
             <a:endParaRPr lang="en-US" sz="1800" b="1" dirty="0">
               <a:ea typeface="+mn-ea"/>
@@ -8203,7 +8426,19 @@
               <a:rPr lang="en-US" sz="2200" b="1" dirty="0" smtClean="0">
                 <a:ea typeface="+mn-ea"/>
               </a:rPr>
-              <a:t>Micro Service REST API Testing accomplished in same framework</a:t>
+              <a:t>Micro Service REST API Testing accomplished in </a:t>
+            </a:r>
+            <a:r>
+              <a:rPr lang="en-US" sz="2200" b="1" dirty="0" smtClean="0">
+                <a:ea typeface="+mn-ea"/>
+              </a:rPr>
+              <a:t>same Node.js </a:t>
+            </a:r>
+            <a:r>
+              <a:rPr lang="en-US" sz="2200" b="1" dirty="0" smtClean="0">
+                <a:ea typeface="+mn-ea"/>
+              </a:rPr>
+              <a:t>framework</a:t>
             </a:r>
           </a:p>
           <a:p>
@@ -8387,13 +8622,7 @@
               <a:rPr lang="en-US" sz="4500" dirty="0" smtClean="0">
                 <a:latin typeface="Calibri Light" pitchFamily="34" charset="0"/>
               </a:rPr>
-              <a:t>ARCHITECTURAL TECH </a:t>
-            </a:r>
-            <a:r>
-              <a:rPr lang="en-US" sz="4500" dirty="0" smtClean="0">
-                <a:latin typeface="Calibri Light" pitchFamily="34" charset="0"/>
-              </a:rPr>
-              <a:t>STACK        </a:t>
+              <a:t>ARCHITECTURAL TECH STACK        </a:t>
             </a:r>
             <a:r>
               <a:rPr lang="en-US" sz="4000" dirty="0" smtClean="0">
@@ -8401,9 +8630,6 @@
               </a:rPr>
               <a:t>REST API</a:t>
             </a:r>
-            <a:endParaRPr lang="en-US" sz="4000" dirty="0" smtClean="0">
-              <a:latin typeface="Calibri Light" pitchFamily="34" charset="0"/>
-            </a:endParaRPr>
           </a:p>
         </p:txBody>
       </p:sp>
@@ -8458,8 +8684,8 @@
         </p:nvSpPr>
         <p:spPr>
           <a:xfrm>
-            <a:off x="273050" y="1720228"/>
-            <a:ext cx="4014788" cy="5137772"/>
+            <a:off x="273049" y="1720228"/>
+            <a:ext cx="4129655" cy="5137772"/>
           </a:xfrm>
           <a:prstGeom prst="rect">
             <a:avLst/>
@@ -8673,7 +8899,6 @@
               <a:rPr lang="en-US" sz="600" dirty="0" smtClean="0"/>
               <a:t>     </a:t>
             </a:r>
-            <a:endParaRPr lang="en-US" sz="600" dirty="0" smtClean="0"/>
           </a:p>
           <a:p>
             <a:pPr fontAlgn="auto">
@@ -8690,7 +8915,6 @@
               <a:rPr lang="en-US" sz="600" dirty="0" smtClean="0"/>
               <a:t>           </a:t>
             </a:r>
-            <a:endParaRPr lang="en-US" sz="600" dirty="0" smtClean="0"/>
           </a:p>
           <a:p>
             <a:pPr fontAlgn="auto">
@@ -8743,7 +8967,6 @@
               <a:rPr lang="en-US" sz="900" dirty="0" smtClean="0"/>
               <a:t>  </a:t>
             </a:r>
-            <a:endParaRPr lang="en-US" sz="900" dirty="0" smtClean="0"/>
           </a:p>
           <a:p>
             <a:pPr indent="-234950" fontAlgn="auto">
@@ -8762,7 +8985,6 @@
               <a:rPr lang="en-US" sz="600" dirty="0" smtClean="0"/>
               <a:t>   </a:t>
             </a:r>
-            <a:endParaRPr lang="en-US" sz="600" dirty="0" smtClean="0"/>
           </a:p>
           <a:p>
             <a:pPr fontAlgn="auto">
@@ -8863,7 +9085,15 @@
             </a:pPr>
             <a:r>
               <a:rPr lang="en-US" sz="1400" dirty="0" smtClean="0"/>
-              <a:t>This is the only acceptable method to validate APIs that change internal state and return status.  Any more access would break the </a:t>
+              <a:t>This is the only acceptable method to validate APIs that change internal state and return status.  Any </a:t>
+            </a:r>
+            <a:r>
+              <a:rPr lang="en-US" sz="1400" dirty="0" smtClean="0"/>
+              <a:t>greater access </a:t>
+            </a:r>
+            <a:r>
+              <a:rPr lang="en-US" sz="1400" dirty="0" smtClean="0"/>
+              <a:t>would break the </a:t>
             </a:r>
             <a:r>
               <a:rPr lang="en-US" sz="1400" dirty="0"/>
@@ -8879,7 +9109,7 @@
       </p:sp>
       <p:pic>
         <p:nvPicPr>
-          <p:cNvPr id="4" name="Picture 3"/>
+          <p:cNvPr id="2" name="Picture 1"/>
           <p:cNvPicPr>
             <a:picLocks noChangeAspect="1"/>
           </p:cNvPicPr>
@@ -8899,8 +9129,8 @@
         </p:blipFill>
         <p:spPr>
           <a:xfrm>
-            <a:off x="4402705" y="2893673"/>
-            <a:ext cx="4636520" cy="3826614"/>
+            <a:off x="4189760" y="2285998"/>
+            <a:ext cx="4942984" cy="4072199"/>
           </a:xfrm>
           <a:prstGeom prst="rect">
             <a:avLst/>
@@ -8973,13 +9203,7 @@
               <a:rPr lang="en-US" sz="4500" dirty="0" smtClean="0">
                 <a:latin typeface="Calibri Light" pitchFamily="34" charset="0"/>
               </a:rPr>
-              <a:t>ARCHITECTURAL TECH </a:t>
-            </a:r>
-            <a:r>
-              <a:rPr lang="en-US" sz="4500" dirty="0" smtClean="0">
-                <a:latin typeface="Calibri Light" pitchFamily="34" charset="0"/>
-              </a:rPr>
-              <a:t>STACK       </a:t>
+              <a:t>ARCHITECTURAL TECH STACK       </a:t>
             </a:r>
             <a:r>
               <a:rPr lang="en-US" sz="4000" dirty="0" smtClean="0">
@@ -8987,9 +9211,6 @@
               </a:rPr>
               <a:t>Market Place</a:t>
             </a:r>
-            <a:endParaRPr lang="en-US" sz="4000" dirty="0" smtClean="0">
-              <a:latin typeface="Calibri Light" pitchFamily="34" charset="0"/>
-            </a:endParaRPr>
           </a:p>
         </p:txBody>
       </p:sp>
@@ -9283,7 +9504,6 @@
               <a:rPr lang="en-US" sz="600" dirty="0" smtClean="0"/>
               <a:t>           </a:t>
             </a:r>
-            <a:endParaRPr lang="en-US" sz="600" dirty="0" smtClean="0"/>
           </a:p>
           <a:p>
             <a:pPr fontAlgn="auto">
@@ -9542,34 +9762,32 @@
       </p:sp>
       <p:pic>
         <p:nvPicPr>
-          <p:cNvPr id="15364" name="Picture 1"/>
+          <p:cNvPr id="4" name="Picture 3"/>
           <p:cNvPicPr>
             <a:picLocks noChangeAspect="1"/>
           </p:cNvPicPr>
           <p:nvPr/>
         </p:nvPicPr>
         <p:blipFill>
-          <a:blip r:embed="rId3"/>
-          <a:srcRect/>
+          <a:blip r:embed="rId3">
+            <a:extLst>
+              <a:ext uri="{28A0092B-C50C-407E-A947-70E740481C1C}">
+                <a14:useLocalDpi xmlns:a14="http://schemas.microsoft.com/office/drawing/2010/main" val="0"/>
+              </a:ext>
+            </a:extLst>
+          </a:blip>
           <a:stretch>
             <a:fillRect/>
           </a:stretch>
         </p:blipFill>
-        <p:spPr bwMode="auto">
+        <p:spPr>
           <a:xfrm>
-            <a:off x="4287838" y="2762250"/>
-            <a:ext cx="4856162" cy="3884613"/>
+            <a:off x="4133661" y="2296388"/>
+            <a:ext cx="4989557" cy="4130386"/>
           </a:xfrm>
           <a:prstGeom prst="rect">
             <a:avLst/>
           </a:prstGeom>
-          <a:noFill/>
-          <a:ln w="9525">
-            <a:noFill/>
-            <a:miter lim="800000"/>
-            <a:headEnd/>
-            <a:tailEnd/>
-          </a:ln>
         </p:spPr>
       </p:pic>
     </p:spTree>
@@ -9666,7 +9884,7 @@
         </p:nvSpPr>
         <p:spPr>
           <a:xfrm>
-            <a:off x="274638" y="1827213"/>
+            <a:off x="274638" y="1572563"/>
             <a:ext cx="8567737" cy="5002212"/>
           </a:xfrm>
         </p:spPr>
@@ -9691,8 +9909,23 @@
               <a:rPr lang="en-US" sz="2000" b="1" dirty="0" smtClean="0">
                 <a:ea typeface="+mn-ea"/>
               </a:rPr>
-              <a:t>Two primary modes</a:t>
-            </a:r>
+              <a:t>Two basic </a:t>
+            </a:r>
+            <a:r>
+              <a:rPr lang="en-US" sz="2000" b="1" dirty="0" smtClean="0">
+                <a:ea typeface="+mn-ea"/>
+              </a:rPr>
+              <a:t>test execution </a:t>
+            </a:r>
+            <a:r>
+              <a:rPr lang="en-US" sz="2000" b="1" dirty="0" smtClean="0">
+                <a:ea typeface="+mn-ea"/>
+              </a:rPr>
+              <a:t>modes</a:t>
+            </a:r>
+            <a:endParaRPr lang="en-US" sz="2000" b="1" dirty="0" smtClean="0">
+              <a:ea typeface="+mn-ea"/>
+            </a:endParaRPr>
           </a:p>
           <a:p>
             <a:pPr marL="684213" lvl="1" indent="-342900" eaLnBrk="1" fontAlgn="auto" hangingPunct="1">
@@ -9744,7 +9977,31 @@
               <a:rPr lang="en-US" sz="1800" b="1" dirty="0">
                 <a:ea typeface="+mn-ea"/>
               </a:rPr>
-              <a:t>On Demand : Covers all developer build initiated </a:t>
+              <a:t>On Demand : </a:t>
+            </a:r>
+            <a:r>
+              <a:rPr lang="en-US" sz="1800" b="1" dirty="0" smtClean="0">
+                <a:ea typeface="+mn-ea"/>
+              </a:rPr>
+              <a:t>Initiated </a:t>
+            </a:r>
+            <a:r>
+              <a:rPr lang="en-US" sz="1800" b="1" dirty="0" smtClean="0">
+                <a:ea typeface="+mn-ea"/>
+              </a:rPr>
+              <a:t>via a </a:t>
+            </a:r>
+            <a:r>
+              <a:rPr lang="en-US" sz="1800" b="1" dirty="0" smtClean="0">
+                <a:ea typeface="+mn-ea"/>
+              </a:rPr>
+              <a:t>build </a:t>
+            </a:r>
+            <a:r>
+              <a:rPr lang="en-US" sz="1800" b="1" dirty="0">
+                <a:ea typeface="+mn-ea"/>
+              </a:rPr>
+              <a:t>initiated </a:t>
             </a:r>
             <a:r>
               <a:rPr lang="en-US" sz="1800" b="1" dirty="0" smtClean="0">
@@ -9902,19 +10159,7 @@
               <a:rPr lang="en-US" sz="2000" b="1" dirty="0" smtClean="0">
                 <a:ea typeface="+mn-ea"/>
               </a:rPr>
-              <a:t> prior to </a:t>
-            </a:r>
-            <a:r>
-              <a:rPr lang="en-US" sz="2000" b="1" dirty="0" smtClean="0">
-                <a:ea typeface="+mn-ea"/>
-              </a:rPr>
-              <a:t> </a:t>
-            </a:r>
-            <a:r>
-              <a:rPr lang="en-US" sz="2000" b="1" dirty="0" smtClean="0">
-                <a:ea typeface="+mn-ea"/>
-              </a:rPr>
-              <a:t>test run</a:t>
+              <a:t> prior to  test run</a:t>
             </a:r>
           </a:p>
           <a:p>
@@ -9930,13 +10175,7 @@
               <a:rPr lang="en-US" sz="1800" b="1" dirty="0" smtClean="0">
                 <a:ea typeface="+mn-ea"/>
               </a:rPr>
-              <a:t>Dev  Integration tests will </a:t>
-            </a:r>
-            <a:r>
-              <a:rPr lang="en-US" sz="1800" b="1" dirty="0" smtClean="0">
-                <a:ea typeface="+mn-ea"/>
-              </a:rPr>
-              <a:t>uses the configuration model to focus testing on new code</a:t>
+              <a:t>Dev  Integration tests will uses the configuration model to focus testing on new code</a:t>
             </a:r>
           </a:p>
           <a:p>
@@ -10216,7 +10455,7 @@
         </p:nvSpPr>
         <p:spPr>
           <a:xfrm>
-            <a:off x="274638" y="1746250"/>
+            <a:off x="274638" y="1473981"/>
             <a:ext cx="8567737" cy="5002213"/>
           </a:xfrm>
         </p:spPr>

</xml_diff>

<commit_message>
4/26/18 capture of what I don't know
</commit_message>
<xml_diff>
--- a/CurrentWork_Delta/CX_StrategyPowerPoint.pptx
+++ b/CurrentWork_Delta/CX_StrategyPowerPoint.pptx
@@ -286,7 +286,7 @@
               <a:pPr>
                 <a:defRPr/>
               </a:pPr>
-              <a:t>4/23/2018</a:t>
+              <a:t>4/26/2018</a:t>
             </a:fld>
             <a:endParaRPr lang="en-US"/>
           </a:p>
@@ -2941,13 +2941,7 @@
               <a:rPr lang="en-US" u="sng" dirty="0" smtClean="0">
                 <a:ea typeface="+mn-ea"/>
               </a:rPr>
-              <a:t>Three </a:t>
-            </a:r>
-            <a:r>
-              <a:rPr lang="en-US" u="sng" dirty="0" smtClean="0">
-                <a:ea typeface="+mn-ea"/>
-              </a:rPr>
-              <a:t>Desired levels </a:t>
+              <a:t>Three Desired levels </a:t>
             </a:r>
             <a:r>
               <a:rPr lang="en-US" u="sng" dirty="0">
@@ -3001,9 +2995,6 @@
               </a:rPr>
               <a:t>:  </a:t>
             </a:r>
-            <a:endParaRPr lang="en-US" dirty="0" smtClean="0">
-              <a:ea typeface="+mn-ea"/>
-            </a:endParaRPr>
           </a:p>
           <a:p>
             <a:pPr marL="342900" indent="-342900" eaLnBrk="1" fontAlgn="auto" hangingPunct="1">
@@ -3045,9 +3036,6 @@
               </a:rPr>
               <a:t>Case Specific</a:t>
             </a:r>
-            <a:endParaRPr lang="en-US" b="1" dirty="0" smtClean="0">
-              <a:ea typeface="+mn-ea"/>
-            </a:endParaRPr>
           </a:p>
           <a:p>
             <a:pPr marL="342900" indent="-342900" eaLnBrk="1" fontAlgn="auto" hangingPunct="1">
@@ -3062,41 +3050,8 @@
               <a:rPr lang="en-US" dirty="0" smtClean="0">
                 <a:ea typeface="+mn-ea"/>
               </a:rPr>
-              <a:t>Very </a:t>
-            </a:r>
-            <a:r>
-              <a:rPr lang="en-US" dirty="0" smtClean="0">
-                <a:ea typeface="+mn-ea"/>
-              </a:rPr>
-              <a:t>granular, c</a:t>
-            </a:r>
-            <a:r>
-              <a:rPr lang="en-US" dirty="0" smtClean="0">
-                <a:ea typeface="+mn-ea"/>
-              </a:rPr>
-              <a:t>overs </a:t>
-            </a:r>
-            <a:r>
-              <a:rPr lang="en-US" dirty="0" smtClean="0">
-                <a:ea typeface="+mn-ea"/>
-              </a:rPr>
-              <a:t>every Assert or </a:t>
-            </a:r>
-            <a:r>
-              <a:rPr lang="en-US" dirty="0" smtClean="0">
-                <a:ea typeface="+mn-ea"/>
-              </a:rPr>
-              <a:t>Compare in a </a:t>
-            </a:r>
-            <a:r>
-              <a:rPr lang="en-US" dirty="0" smtClean="0">
-                <a:ea typeface="+mn-ea"/>
-              </a:rPr>
-              <a:t>given test case</a:t>
-            </a:r>
-            <a:endParaRPr lang="en-US" dirty="0" smtClean="0">
-              <a:ea typeface="+mn-ea"/>
-            </a:endParaRPr>
+              <a:t>Very granular, covers every Assert or Compare in a given test case</a:t>
+            </a:r>
           </a:p>
           <a:p>
             <a:pPr eaLnBrk="1" fontAlgn="auto" hangingPunct="1">
@@ -3155,9 +3110,6 @@
               </a:rPr>
               <a:t>Provides a view into the current state of a product w.r.t ship-ability </a:t>
             </a:r>
-            <a:endParaRPr lang="en-US" dirty="0" smtClean="0">
-              <a:ea typeface="+mn-ea"/>
-            </a:endParaRPr>
           </a:p>
         </p:txBody>
       </p:sp>
@@ -3579,9 +3531,6 @@
               </a:rPr>
               <a:t>     </a:t>
             </a:r>
-            <a:endParaRPr lang="en-US" sz="900" b="1" dirty="0" smtClean="0">
-              <a:latin typeface="Calibri Light" pitchFamily="34" charset="0"/>
-            </a:endParaRPr>
           </a:p>
           <a:p>
             <a:pPr eaLnBrk="1" hangingPunct="1">
@@ -3653,9 +3602,6 @@
               </a:rPr>
               <a:t>            </a:t>
             </a:r>
-            <a:endParaRPr lang="en-US" sz="800" dirty="0" smtClean="0">
-              <a:latin typeface="Calibri Light" pitchFamily="34" charset="0"/>
-            </a:endParaRPr>
           </a:p>
           <a:p>
             <a:pPr eaLnBrk="1" hangingPunct="1">
@@ -4661,15 +4607,7 @@
           <a:p>
             <a:r>
               <a:rPr lang="en-US" sz="1100" dirty="0" smtClean="0"/>
-              <a:t>Dev </a:t>
-            </a:r>
-            <a:r>
-              <a:rPr lang="en-US" sz="1100" dirty="0" smtClean="0"/>
-              <a:t>engineers to develop API validation </a:t>
-            </a:r>
-            <a:r>
-              <a:rPr lang="en-US" sz="1100" dirty="0" smtClean="0"/>
-              <a:t>test scripting.  Next Gen Test </a:t>
+              <a:t>Dev engineers to develop API validation test scripting.  Next Gen Test </a:t>
             </a:r>
             <a:r>
               <a:rPr lang="en-US" sz="1100" dirty="0"/>
@@ -7109,13 +7047,7 @@
               <a:rPr lang="en-US" sz="2000" b="1" dirty="0" smtClean="0">
                 <a:ea typeface="+mn-ea"/>
               </a:rPr>
-              <a:t>The Next Generation Test Automation team </a:t>
-            </a:r>
-            <a:r>
-              <a:rPr lang="en-US" sz="2000" b="1" dirty="0" smtClean="0">
-                <a:ea typeface="+mn-ea"/>
-              </a:rPr>
-              <a:t>develops and delivered an automated </a:t>
+              <a:t>The Next Generation Test Automation team develops and delivered an automated </a:t>
             </a:r>
             <a:r>
               <a:rPr lang="en-US" sz="2000" b="1" dirty="0">
@@ -8278,19 +8210,7 @@
               <a:rPr lang="en-US" sz="1700" b="1" dirty="0" smtClean="0">
                 <a:ea typeface="+mn-ea"/>
               </a:rPr>
-              <a:t>See </a:t>
-            </a:r>
-            <a:r>
-              <a:rPr lang="en-US" sz="1700" b="1" dirty="0" smtClean="0">
-                <a:ea typeface="+mn-ea"/>
-              </a:rPr>
-              <a:t>Pg. Test </a:t>
-            </a:r>
-            <a:r>
-              <a:rPr lang="en-US" sz="1700" b="1" dirty="0" smtClean="0">
-                <a:ea typeface="+mn-ea"/>
-              </a:rPr>
-              <a:t>Case Numbers</a:t>
+              <a:t>See Pg. Test Case Numbers</a:t>
             </a:r>
           </a:p>
           <a:p>
@@ -8312,13 +8232,7 @@
               <a:rPr lang="en-US" sz="1900" b="1" dirty="0" smtClean="0">
                 <a:ea typeface="+mn-ea"/>
               </a:rPr>
-              <a:t>Through implementation </a:t>
-            </a:r>
-            <a:r>
-              <a:rPr lang="en-US" sz="1900" b="1" dirty="0" smtClean="0">
-                <a:ea typeface="+mn-ea"/>
-              </a:rPr>
-              <a:t>of the ‘dataProvider’ technology </a:t>
+              <a:t>Through implementation of the ‘dataProvider’ technology </a:t>
             </a:r>
             <a:endParaRPr lang="en-US" sz="1800" b="1" dirty="0">
               <a:ea typeface="+mn-ea"/>
@@ -8426,19 +8340,7 @@
               <a:rPr lang="en-US" sz="2200" b="1" dirty="0" smtClean="0">
                 <a:ea typeface="+mn-ea"/>
               </a:rPr>
-              <a:t>Micro Service REST API Testing accomplished in </a:t>
-            </a:r>
-            <a:r>
-              <a:rPr lang="en-US" sz="2200" b="1" dirty="0" smtClean="0">
-                <a:ea typeface="+mn-ea"/>
-              </a:rPr>
-              <a:t>same Node.js </a:t>
-            </a:r>
-            <a:r>
-              <a:rPr lang="en-US" sz="2200" b="1" dirty="0" smtClean="0">
-                <a:ea typeface="+mn-ea"/>
-              </a:rPr>
-              <a:t>framework</a:t>
+              <a:t>Micro Service REST API Testing accomplished in same Node.js framework</a:t>
             </a:r>
           </a:p>
           <a:p>
@@ -9085,15 +8987,7 @@
             </a:pPr>
             <a:r>
               <a:rPr lang="en-US" sz="1400" dirty="0" smtClean="0"/>
-              <a:t>This is the only acceptable method to validate APIs that change internal state and return status.  Any </a:t>
-            </a:r>
-            <a:r>
-              <a:rPr lang="en-US" sz="1400" dirty="0" smtClean="0"/>
-              <a:t>greater access </a:t>
-            </a:r>
-            <a:r>
-              <a:rPr lang="en-US" sz="1400" dirty="0" smtClean="0"/>
-              <a:t>would break the </a:t>
+              <a:t>This is the only acceptable method to validate APIs that change internal state and return status.  Any greater access would break the </a:t>
             </a:r>
             <a:r>
               <a:rPr lang="en-US" sz="1400" dirty="0"/>
@@ -9909,23 +9803,8 @@
               <a:rPr lang="en-US" sz="2000" b="1" dirty="0" smtClean="0">
                 <a:ea typeface="+mn-ea"/>
               </a:rPr>
-              <a:t>Two basic </a:t>
-            </a:r>
-            <a:r>
-              <a:rPr lang="en-US" sz="2000" b="1" dirty="0" smtClean="0">
-                <a:ea typeface="+mn-ea"/>
-              </a:rPr>
-              <a:t>test execution </a:t>
-            </a:r>
-            <a:r>
-              <a:rPr lang="en-US" sz="2000" b="1" dirty="0" smtClean="0">
-                <a:ea typeface="+mn-ea"/>
-              </a:rPr>
-              <a:t>modes</a:t>
-            </a:r>
-            <a:endParaRPr lang="en-US" sz="2000" b="1" dirty="0" smtClean="0">
-              <a:ea typeface="+mn-ea"/>
-            </a:endParaRPr>
+              <a:t>Two basic test execution modes</a:t>
+            </a:r>
           </a:p>
           <a:p>
             <a:pPr marL="684213" lvl="1" indent="-342900" eaLnBrk="1" fontAlgn="auto" hangingPunct="1">
@@ -9983,19 +9862,7 @@
               <a:rPr lang="en-US" sz="1800" b="1" dirty="0" smtClean="0">
                 <a:ea typeface="+mn-ea"/>
               </a:rPr>
-              <a:t>Initiated </a:t>
-            </a:r>
-            <a:r>
-              <a:rPr lang="en-US" sz="1800" b="1" dirty="0" smtClean="0">
-                <a:ea typeface="+mn-ea"/>
-              </a:rPr>
-              <a:t>via a </a:t>
-            </a:r>
-            <a:r>
-              <a:rPr lang="en-US" sz="1800" b="1" dirty="0" smtClean="0">
-                <a:ea typeface="+mn-ea"/>
-              </a:rPr>
-              <a:t>build </a:t>
+              <a:t>Initiated via a build </a:t>
             </a:r>
             <a:r>
               <a:rPr lang="en-US" sz="1800" b="1" dirty="0">

</xml_diff>

<commit_message>
5/15/18 added a page for API tests
</commit_message>
<xml_diff>
--- a/CurrentWork_Delta/CX_StrategyPowerPoint.pptx
+++ b/CurrentWork_Delta/CX_StrategyPowerPoint.pptx
@@ -5,7 +5,7 @@
     <p:sldMasterId id="2147483648" r:id="rId1"/>
   </p:sldMasterIdLst>
   <p:notesMasterIdLst>
-    <p:notesMasterId r:id="rId21"/>
+    <p:notesMasterId r:id="rId22"/>
   </p:notesMasterIdLst>
   <p:sldIdLst>
     <p:sldId id="256" r:id="rId2"/>
@@ -18,15 +18,16 @@
     <p:sldId id="287" r:id="rId9"/>
     <p:sldId id="285" r:id="rId10"/>
     <p:sldId id="280" r:id="rId11"/>
-    <p:sldId id="275" r:id="rId12"/>
-    <p:sldId id="281" r:id="rId13"/>
-    <p:sldId id="282" r:id="rId14"/>
-    <p:sldId id="279" r:id="rId15"/>
-    <p:sldId id="271" r:id="rId16"/>
-    <p:sldId id="286" r:id="rId17"/>
-    <p:sldId id="274" r:id="rId18"/>
-    <p:sldId id="288" r:id="rId19"/>
-    <p:sldId id="284" r:id="rId20"/>
+    <p:sldId id="291" r:id="rId12"/>
+    <p:sldId id="275" r:id="rId13"/>
+    <p:sldId id="281" r:id="rId14"/>
+    <p:sldId id="282" r:id="rId15"/>
+    <p:sldId id="279" r:id="rId16"/>
+    <p:sldId id="271" r:id="rId17"/>
+    <p:sldId id="286" r:id="rId18"/>
+    <p:sldId id="274" r:id="rId19"/>
+    <p:sldId id="288" r:id="rId20"/>
+    <p:sldId id="284" r:id="rId21"/>
   </p:sldIdLst>
   <p:sldSz cx="9144000" cy="6858000" type="screen4x3"/>
   <p:notesSz cx="7010400" cy="9296400"/>
@@ -155,25 +156,6 @@
       </a:defRPr>
     </a:lvl9pPr>
   </p:defaultTextStyle>
-  <p:extLst>
-    <p:ext uri="{EFAFB233-063F-42B5-8137-9DF3F51BA10A}">
-      <p15:sldGuideLst xmlns:p15="http://schemas.microsoft.com/office/powerpoint/2012/main">
-        <p15:guide id="1" orient="horz" pos="2625">
-          <p15:clr>
-            <a:srgbClr val="A4A3A4"/>
-          </p15:clr>
-        </p15:guide>
-        <p15:guide id="2" pos="2880">
-          <p15:clr>
-            <a:srgbClr val="A4A3A4"/>
-          </p15:clr>
-        </p15:guide>
-      </p15:sldGuideLst>
-    </p:ext>
-    <p:ext uri="{2D200454-40CA-4A62-9FC3-DE9A4176ACB9}">
-      <p15:notesGuideLst xmlns:p15="http://schemas.microsoft.com/office/powerpoint/2012/main"/>
-    </p:ext>
-  </p:extLst>
 </p:presentation>
 </file>
 
@@ -281,12 +263,12 @@
             <a:pPr>
               <a:defRPr/>
             </a:pPr>
-            <a:fld id="{9891D345-2698-4EAC-B442-0FA7C3411E40}" type="datetimeFigureOut">
+            <a:fld id="{3C2587A6-1E06-441F-A1B9-7D8BCBF0E2ED}" type="datetimeFigureOut">
               <a:rPr lang="en-US"/>
               <a:pPr>
                 <a:defRPr/>
               </a:pPr>
-              <a:t>4/26/2018</a:t>
+              <a:t>5/15/2018</a:t>
             </a:fld>
             <a:endParaRPr lang="en-US"/>
           </a:p>
@@ -468,7 +450,7 @@
             <a:pPr>
               <a:defRPr/>
             </a:pPr>
-            <a:fld id="{9BF79859-DFA4-41BF-912D-D1A2D9B8EE8D}" type="slidenum">
+            <a:fld id="{BD3786D6-0884-4D32-BBDA-002BC7F4D12C}" type="slidenum">
               <a:rPr lang="en-US"/>
               <a:pPr>
                 <a:defRPr/>
@@ -480,11 +462,6 @@
         </p:txBody>
       </p:sp>
     </p:spTree>
-    <p:extLst>
-      <p:ext uri="{BB962C8B-B14F-4D97-AF65-F5344CB8AC3E}">
-        <p14:creationId xmlns:p14="http://schemas.microsoft.com/office/powerpoint/2010/main" val="678970598"/>
-      </p:ext>
-    </p:extLst>
   </p:cSld>
   <p:clrMap bg1="lt1" tx1="dk1" bg2="lt2" tx2="dk2" accent1="accent1" accent2="accent2" accent3="accent3" accent4="accent4" accent5="accent5" accent6="accent6" hlink="hlink" folHlink="folHlink"/>
   <p:notesStyle>
@@ -715,7 +692,7 @@
               </a:spcAft>
               <a:defRPr/>
             </a:pPr>
-            <a:fld id="{6095778B-777B-43E3-A8E0-BDADB53EF41D}" type="slidenum">
+            <a:fld id="{DEC51F47-6088-4594-AB1D-BB2FB010E7F1}" type="slidenum">
               <a:rPr lang="en-US">
                 <a:cs typeface="Arial" charset="0"/>
               </a:rPr>
@@ -737,11 +714,6 @@
         </p:txBody>
       </p:sp>
     </p:spTree>
-    <p:extLst>
-      <p:ext uri="{BB962C8B-B14F-4D97-AF65-F5344CB8AC3E}">
-        <p14:creationId xmlns:p14="http://schemas.microsoft.com/office/powerpoint/2010/main" val="3120475581"/>
-      </p:ext>
-    </p:extLst>
   </p:cSld>
   <p:clrMapOvr>
     <a:masterClrMapping/>
@@ -852,7 +824,7 @@
               </a:spcAft>
               <a:defRPr/>
             </a:pPr>
-            <a:fld id="{804D6F54-6BF3-4C8A-A633-8A8472299B9D}" type="slidenum">
+            <a:fld id="{CD618E74-1480-4F39-8C8B-C88A70F4194F}" type="slidenum">
               <a:rPr lang="en-US">
                 <a:cs typeface="Arial" charset="0"/>
               </a:rPr>
@@ -874,11 +846,6 @@
         </p:txBody>
       </p:sp>
     </p:spTree>
-    <p:extLst>
-      <p:ext uri="{BB962C8B-B14F-4D97-AF65-F5344CB8AC3E}">
-        <p14:creationId xmlns:p14="http://schemas.microsoft.com/office/powerpoint/2010/main" val="1128729748"/>
-      </p:ext>
-    </p:extLst>
   </p:cSld>
   <p:clrMapOvr>
     <a:masterClrMapping/>
@@ -989,7 +956,7 @@
               </a:spcAft>
               <a:defRPr/>
             </a:pPr>
-            <a:fld id="{34F34C98-E8E8-4866-AE6C-1705C709B3C7}" type="slidenum">
+            <a:fld id="{0C61D29F-1FCE-4760-9639-D745565E7C7E}" type="slidenum">
               <a:rPr lang="en-US">
                 <a:cs typeface="Arial" charset="0"/>
               </a:rPr>
@@ -1011,11 +978,6 @@
         </p:txBody>
       </p:sp>
     </p:spTree>
-    <p:extLst>
-      <p:ext uri="{BB962C8B-B14F-4D97-AF65-F5344CB8AC3E}">
-        <p14:creationId xmlns:p14="http://schemas.microsoft.com/office/powerpoint/2010/main" val="3950300365"/>
-      </p:ext>
-    </p:extLst>
   </p:cSld>
   <p:clrMapOvr>
     <a:masterClrMapping/>
@@ -1314,7 +1276,7 @@
             <a:pPr>
               <a:defRPr/>
             </a:pPr>
-            <a:fld id="{8FEEE48F-FE93-4D9D-971A-40BFAF63D6AF}" type="slidenum">
+            <a:fld id="{75932459-CACE-4C8B-8FD8-204F19C997BA}" type="slidenum">
               <a:rPr lang="en-US"/>
               <a:pPr>
                 <a:defRPr/>
@@ -1457,7 +1419,7 @@
             <a:pPr>
               <a:defRPr/>
             </a:pPr>
-            <a:fld id="{E497472A-DF66-4BEA-8DBC-79C106B9631F}" type="slidenum">
+            <a:fld id="{312B2EEB-BAEF-45AD-8594-7783EE789D53}" type="slidenum">
               <a:rPr lang="en-US"/>
               <a:pPr>
                 <a:defRPr/>
@@ -1589,7 +1551,7 @@
             <a:pPr>
               <a:defRPr/>
             </a:pPr>
-            <a:fld id="{39FAC7D7-FDC3-4EDD-93F8-3FCEB58BD26C}" type="slidenum">
+            <a:fld id="{BE6BF8A2-352C-4640-A6BA-C56C1095EA86}" type="slidenum">
               <a:rPr lang="en-US"/>
               <a:pPr>
                 <a:defRPr/>
@@ -1647,7 +1609,7 @@
             <a:pPr>
               <a:defRPr/>
             </a:pPr>
-            <a:fld id="{53F6E5F8-2FE6-49B3-BCAC-24419634ED56}" type="slidenum">
+            <a:fld id="{B7B2F45D-7B2C-4DC0-A9FC-6EC2A5E79F31}" type="slidenum">
               <a:rPr lang="en-US"/>
               <a:pPr>
                 <a:defRPr/>
@@ -1844,7 +1806,7 @@
             <a:pPr>
               <a:defRPr/>
             </a:pPr>
-            <a:fld id="{5F21EA03-5939-40C0-8031-C810CD5AC996}" type="slidenum">
+            <a:fld id="{85B606A7-9CDA-4ACB-AF88-626C7C4B16CC}" type="slidenum">
               <a:rPr lang="en-US"/>
               <a:pPr>
                 <a:defRPr/>
@@ -2568,7 +2530,7 @@
       </p:sp>
       <p:sp>
         <p:nvSpPr>
-          <p:cNvPr id="18434" name="Title 7"/>
+          <p:cNvPr id="19458" name="Title 7"/>
           <p:cNvSpPr>
             <a:spLocks noGrp="1"/>
           </p:cNvSpPr>
@@ -2780,11 +2742,11 @@
               <a:t>         </a:t>
             </a:r>
             <a:r>
-              <a:rPr lang="en-US" sz="1400" dirty="0" smtClean="0"/>
+              <a:rPr lang="en-US" sz="1400" dirty="0"/>
               <a:t>                              </a:t>
             </a:r>
             <a:r>
-              <a:rPr lang="en-US" dirty="0" smtClean="0"/>
+              <a:rPr lang="en-US" dirty="0"/>
               <a:t> </a:t>
             </a:r>
             <a:r>
@@ -2881,18 +2843,74 @@
       </p:grpSpPr>
       <p:sp>
         <p:nvSpPr>
-          <p:cNvPr id="19457" name="Title 1"/>
+          <p:cNvPr id="4" name="Title 1">
+            <a:hlinkClick r:id="rId2" action="ppaction://hlinksldjump"/>
+          </p:cNvPr>
+          <p:cNvSpPr txBox="1">
+            <a:spLocks/>
+          </p:cNvSpPr>
+          <p:nvPr/>
+        </p:nvSpPr>
+        <p:spPr>
+          <a:xfrm>
+            <a:off x="368300" y="47625"/>
+            <a:ext cx="312738" cy="287338"/>
+          </a:xfrm>
+          <a:prstGeom prst="rect">
+            <a:avLst/>
+          </a:prstGeom>
+        </p:spPr>
+        <p:txBody>
+          <a:bodyPr>
+            <a:normAutofit fontScale="55000" lnSpcReduction="20000"/>
+          </a:bodyPr>
+          <a:lstStyle>
+            <a:lvl1pPr algn="l" defTabSz="457200" rtl="0" eaLnBrk="1" latinLnBrk="0" hangingPunct="1">
+              <a:spcBef>
+                <a:spcPct val="0"/>
+              </a:spcBef>
+              <a:buNone/>
+              <a:defRPr sz="5000" b="0" i="0" kern="1200">
+                <a:solidFill>
+                  <a:srgbClr val="128BAD"/>
+                </a:solidFill>
+                <a:latin typeface="Calibri Light"/>
+                <a:ea typeface="+mj-ea"/>
+                <a:cs typeface="Calibri Light"/>
+              </a:defRPr>
+            </a:lvl1pPr>
+          </a:lstStyle>
+          <a:p>
+            <a:pPr fontAlgn="auto">
+              <a:spcAft>
+                <a:spcPts val="0"/>
+              </a:spcAft>
+              <a:defRPr/>
+            </a:pPr>
+            <a:endParaRPr lang="en-US" sz="2800" dirty="0">
+              <a:solidFill>
+                <a:schemeClr val="bg1">
+                  <a:lumMod val="95000"/>
+                </a:schemeClr>
+              </a:solidFill>
+            </a:endParaRPr>
+          </a:p>
+        </p:txBody>
+      </p:sp>
+      <p:sp>
+        <p:nvSpPr>
+          <p:cNvPr id="30723" name="Title 7"/>
           <p:cNvSpPr>
             <a:spLocks noGrp="1"/>
           </p:cNvSpPr>
           <p:nvPr>
-            <p:ph type="title"/>
+            <p:ph type="title" idx="4294967295"/>
           </p:nvPr>
         </p:nvSpPr>
         <p:spPr>
           <a:xfrm>
-            <a:off x="1641475" y="130175"/>
-            <a:ext cx="5102225" cy="1325563"/>
+            <a:off x="712788" y="109538"/>
+            <a:ext cx="6897687" cy="1528762"/>
           </a:xfrm>
         </p:spPr>
         <p:txBody>
@@ -2904,281 +2922,179 @@
               <a:rPr lang="en-US" smtClean="0">
                 <a:latin typeface="Calibri Light" pitchFamily="34" charset="0"/>
               </a:rPr>
-              <a:t>REPORTING</a:t>
-            </a:r>
+              <a:t>TEST CASES NUMBERS</a:t>
+            </a:r>
+            <a:br>
+              <a:rPr lang="en-US" smtClean="0">
+                <a:latin typeface="Calibri Light" pitchFamily="34" charset="0"/>
+              </a:rPr>
+            </a:br>
+            <a:r>
+              <a:rPr lang="en-US" sz="4000" smtClean="0">
+                <a:latin typeface="Calibri Light" pitchFamily="34" charset="0"/>
+              </a:rPr>
+              <a:t>Market Place &amp; APIs</a:t>
+            </a:r>
+            <a:endParaRPr lang="en-US" smtClean="0">
+              <a:latin typeface="Calibri Light" pitchFamily="34" charset="0"/>
+            </a:endParaRPr>
           </a:p>
         </p:txBody>
       </p:sp>
       <p:sp>
         <p:nvSpPr>
-          <p:cNvPr id="3" name="Content Placeholder 2"/>
-          <p:cNvSpPr>
-            <a:spLocks noGrp="1"/>
+          <p:cNvPr id="18435" name="TextBox 12"/>
+          <p:cNvSpPr txBox="1">
+            <a:spLocks noChangeArrowheads="1"/>
           </p:cNvSpPr>
-          <p:nvPr>
-            <p:ph idx="1"/>
-          </p:nvPr>
+          <p:nvPr/>
         </p:nvSpPr>
-        <p:spPr>
-          <a:xfrm>
-            <a:off x="433388" y="914400"/>
-            <a:ext cx="4254359" cy="5382228"/>
-          </a:xfrm>
-        </p:spPr>
-        <p:txBody>
-          <a:bodyPr rtlCol="0">
-            <a:normAutofit/>
-          </a:bodyPr>
-          <a:lstStyle/>
-          <a:p>
-            <a:pPr eaLnBrk="1" fontAlgn="auto" hangingPunct="1">
-              <a:spcAft>
-                <a:spcPts val="0"/>
-              </a:spcAft>
-              <a:defRPr/>
-            </a:pPr>
-            <a:r>
-              <a:rPr lang="en-US" u="sng" dirty="0" smtClean="0">
-                <a:ea typeface="+mn-ea"/>
-              </a:rPr>
-              <a:t>Three Desired levels </a:t>
-            </a:r>
-            <a:r>
-              <a:rPr lang="en-US" u="sng" dirty="0">
-                <a:ea typeface="+mn-ea"/>
-              </a:rPr>
-              <a:t>of </a:t>
-            </a:r>
-            <a:r>
-              <a:rPr lang="en-US" u="sng" dirty="0" smtClean="0">
-                <a:ea typeface="+mn-ea"/>
-              </a:rPr>
-              <a:t>reporting</a:t>
-            </a:r>
-          </a:p>
-          <a:p>
-            <a:pPr eaLnBrk="1" fontAlgn="auto" hangingPunct="1">
-              <a:spcBef>
-                <a:spcPts val="0"/>
-              </a:spcBef>
-              <a:spcAft>
-                <a:spcPts val="0"/>
-              </a:spcAft>
-              <a:defRPr/>
-            </a:pPr>
-            <a:r>
-              <a:rPr lang="en-US" sz="400" dirty="0" smtClean="0">
-                <a:ea typeface="+mn-ea"/>
-              </a:rPr>
-              <a:t>    </a:t>
-            </a:r>
-            <a:endParaRPr lang="en-US" sz="400" dirty="0">
-              <a:ea typeface="+mn-ea"/>
-            </a:endParaRPr>
-          </a:p>
-          <a:p>
-            <a:pPr eaLnBrk="1" fontAlgn="auto" hangingPunct="1">
-              <a:spcAft>
-                <a:spcPts val="0"/>
-              </a:spcAft>
-              <a:defRPr/>
-            </a:pPr>
-            <a:r>
-              <a:rPr lang="en-US" b="1" dirty="0" smtClean="0">
-                <a:ea typeface="+mn-ea"/>
-              </a:rPr>
-              <a:t>Test Run</a:t>
-            </a:r>
-            <a:r>
-              <a:rPr lang="en-US" dirty="0" smtClean="0">
-                <a:ea typeface="+mn-ea"/>
-              </a:rPr>
-              <a:t>:  </a:t>
-            </a:r>
-          </a:p>
-          <a:p>
-            <a:pPr marL="342900" indent="-342900" eaLnBrk="1" fontAlgn="auto" hangingPunct="1">
-              <a:spcAft>
-                <a:spcPts val="0"/>
-              </a:spcAft>
-              <a:buFont typeface="Arial" panose="020B0604020202020204" pitchFamily="34" charset="0"/>
-              <a:buChar char="•"/>
-              <a:defRPr/>
-            </a:pPr>
-            <a:r>
-              <a:rPr lang="en-US" dirty="0" smtClean="0">
-                <a:ea typeface="+mn-ea"/>
-              </a:rPr>
-              <a:t>A collection of test cases by state, product, or function.</a:t>
-            </a:r>
-          </a:p>
-          <a:p>
-            <a:pPr eaLnBrk="1" fontAlgn="auto" hangingPunct="1">
-              <a:spcAft>
-                <a:spcPts val="0"/>
-              </a:spcAft>
-              <a:defRPr/>
-            </a:pPr>
-            <a:endParaRPr lang="en-US" dirty="0">
-              <a:ea typeface="+mn-ea"/>
-            </a:endParaRPr>
-          </a:p>
-          <a:p>
-            <a:pPr eaLnBrk="1" fontAlgn="auto" hangingPunct="1">
-              <a:spcAft>
-                <a:spcPts val="0"/>
-              </a:spcAft>
-              <a:defRPr/>
-            </a:pPr>
-            <a:r>
-              <a:rPr lang="en-US" b="1" dirty="0" smtClean="0">
-                <a:ea typeface="+mn-ea"/>
-              </a:rPr>
-              <a:t>Case Specific</a:t>
-            </a:r>
-          </a:p>
-          <a:p>
-            <a:pPr marL="342900" indent="-342900" eaLnBrk="1" fontAlgn="auto" hangingPunct="1">
-              <a:spcAft>
-                <a:spcPts val="0"/>
-              </a:spcAft>
-              <a:buFont typeface="Arial" panose="020B0604020202020204" pitchFamily="34" charset="0"/>
-              <a:buChar char="•"/>
-              <a:defRPr/>
-            </a:pPr>
-            <a:r>
-              <a:rPr lang="en-US" dirty="0" smtClean="0">
-                <a:ea typeface="+mn-ea"/>
-              </a:rPr>
-              <a:t>Very granular, covers every Assert or Compare in a given test case</a:t>
-            </a:r>
-          </a:p>
-          <a:p>
-            <a:pPr eaLnBrk="1" fontAlgn="auto" hangingPunct="1">
-              <a:spcAft>
-                <a:spcPts val="0"/>
-              </a:spcAft>
-              <a:defRPr/>
-            </a:pPr>
-            <a:r>
-              <a:rPr lang="en-US" dirty="0" smtClean="0">
-                <a:ea typeface="+mn-ea"/>
-              </a:rPr>
-              <a:t>     Is a Key Development tool</a:t>
-            </a:r>
-          </a:p>
-          <a:p>
-            <a:pPr eaLnBrk="1" fontAlgn="auto" hangingPunct="1">
-              <a:spcAft>
-                <a:spcPts val="0"/>
-              </a:spcAft>
-              <a:defRPr/>
-            </a:pPr>
-            <a:endParaRPr lang="en-US" b="1" dirty="0">
-              <a:ea typeface="+mn-ea"/>
-            </a:endParaRPr>
-          </a:p>
-          <a:p>
-            <a:pPr eaLnBrk="1" fontAlgn="auto" hangingPunct="1">
-              <a:spcAft>
-                <a:spcPts val="0"/>
-              </a:spcAft>
-              <a:defRPr/>
-            </a:pPr>
-            <a:r>
-              <a:rPr lang="en-US" b="1" dirty="0" smtClean="0">
-                <a:ea typeface="+mn-ea"/>
-              </a:rPr>
-              <a:t>Dash Board</a:t>
-            </a:r>
-            <a:endParaRPr lang="en-US" b="1" dirty="0">
-              <a:ea typeface="+mn-ea"/>
-            </a:endParaRPr>
-          </a:p>
-          <a:p>
-            <a:pPr marL="342900" indent="-342900" eaLnBrk="1" fontAlgn="auto" hangingPunct="1">
-              <a:spcAft>
-                <a:spcPts val="0"/>
-              </a:spcAft>
-              <a:buFont typeface="Arial" panose="020B0604020202020204" pitchFamily="34" charset="0"/>
-              <a:buChar char="•"/>
-              <a:defRPr/>
-            </a:pPr>
-            <a:r>
-              <a:rPr lang="en-US" dirty="0" smtClean="0">
-                <a:ea typeface="+mn-ea"/>
-              </a:rPr>
-              <a:t>Provides a view into the current state of a product w.r.t ship-ability </a:t>
-            </a:r>
-          </a:p>
-        </p:txBody>
-      </p:sp>
-      <p:pic>
-        <p:nvPicPr>
-          <p:cNvPr id="19464" name="Picture 8" descr="main"/>
-          <p:cNvPicPr>
-            <a:picLocks noChangeAspect="1" noChangeArrowheads="1"/>
-          </p:cNvPicPr>
-          <p:nvPr/>
-        </p:nvPicPr>
-        <p:blipFill>
-          <a:blip r:embed="rId2"/>
-          <a:srcRect/>
-          <a:stretch>
-            <a:fillRect/>
-          </a:stretch>
-        </p:blipFill>
         <p:spPr bwMode="auto">
           <a:xfrm>
-            <a:off x="4779963" y="914400"/>
-            <a:ext cx="4364037" cy="5788025"/>
+            <a:off x="274638" y="1582738"/>
+            <a:ext cx="8869362" cy="3470275"/>
           </a:xfrm>
           <a:prstGeom prst="rect">
             <a:avLst/>
           </a:prstGeom>
           <a:noFill/>
+          <a:ln w="9525">
+            <a:noFill/>
+            <a:miter lim="800000"/>
+            <a:headEnd/>
+            <a:tailEnd/>
+          </a:ln>
         </p:spPr>
-      </p:pic>
-      <p:sp>
-        <p:nvSpPr>
-          <p:cNvPr id="2" name="Right Arrow 1"/>
-          <p:cNvSpPr/>
-          <p:nvPr/>
-        </p:nvSpPr>
-        <p:spPr>
-          <a:xfrm>
-            <a:off x="8461099" y="5845216"/>
-            <a:ext cx="138896" cy="104172"/>
-          </a:xfrm>
-          <a:prstGeom prst="rightArrow">
-            <a:avLst/>
-          </a:prstGeom>
-          <a:solidFill>
-            <a:schemeClr val="bg1">
-              <a:lumMod val="95000"/>
-            </a:schemeClr>
-          </a:solidFill>
-        </p:spPr>
-        <p:style>
-          <a:lnRef idx="1">
-            <a:schemeClr val="accent1"/>
-          </a:lnRef>
-          <a:fillRef idx="3">
-            <a:schemeClr val="accent1"/>
-          </a:fillRef>
-          <a:effectRef idx="2">
-            <a:schemeClr val="accent1"/>
-          </a:effectRef>
-          <a:fontRef idx="minor">
-            <a:schemeClr val="lt1"/>
-          </a:fontRef>
-        </p:style>
         <p:txBody>
-          <a:bodyPr rtlCol="0" anchor="ctr"/>
+          <a:bodyPr>
+            <a:spAutoFit/>
+          </a:bodyPr>
           <a:lstStyle/>
           <a:p>
-            <a:pPr algn="ctr"/>
-            <a:endParaRPr lang="en-US"/>
+            <a:pPr marL="342900" indent="-342900">
+              <a:buFont typeface="Arial" charset="0"/>
+              <a:buChar char="•"/>
+            </a:pPr>
+            <a:r>
+              <a:rPr lang="en-US" sz="2000">
+                <a:latin typeface="Calibri" pitchFamily="34" charset="0"/>
+              </a:rPr>
+              <a:t>Test case results are the result of functional test written                                                  for a product   X   data points tested against   X    States Tested in</a:t>
+            </a:r>
+          </a:p>
+          <a:p>
+            <a:pPr marL="342900" indent="-342900"/>
+            <a:endParaRPr lang="en-US" sz="2000">
+              <a:latin typeface="Calibri" pitchFamily="34" charset="0"/>
+            </a:endParaRPr>
+          </a:p>
+          <a:p>
+            <a:pPr marL="342900" indent="-342900">
+              <a:buFont typeface="Arial" charset="0"/>
+              <a:buChar char="•"/>
+            </a:pPr>
+            <a:r>
+              <a:rPr lang="en-US" sz="1400" b="1">
+                <a:latin typeface="Calibri" pitchFamily="34" charset="0"/>
+              </a:rPr>
+              <a:t>Phase 0</a:t>
+            </a:r>
+            <a:r>
+              <a:rPr lang="en-US" sz="1400">
+                <a:latin typeface="Calibri" pitchFamily="34" charset="0"/>
+              </a:rPr>
+              <a:t> contains 4 products w/ 393, 478, 387, 442 test cases per product, total 1700 functional tests written.                                                                              Factoring test data points and the states where the product is deployed the calculation                                                                                                                                  </a:t>
+            </a:r>
+            <a:r>
+              <a:rPr lang="en-US" sz="2000">
+                <a:latin typeface="Calibri" pitchFamily="34" charset="0"/>
+              </a:rPr>
+              <a:t>4 Products tested in 5 states totals </a:t>
+            </a:r>
+            <a:r>
+              <a:rPr lang="en-US" sz="2400">
+                <a:latin typeface="Calibri" pitchFamily="34" charset="0"/>
+              </a:rPr>
+              <a:t>10125 tests</a:t>
+            </a:r>
+            <a:endParaRPr lang="en-US">
+              <a:latin typeface="Calibri" pitchFamily="34" charset="0"/>
+            </a:endParaRPr>
+          </a:p>
+          <a:p>
+            <a:pPr marL="342900" indent="-342900"/>
+            <a:r>
+              <a:rPr lang="en-US" sz="1200">
+                <a:latin typeface="Calibri" pitchFamily="34" charset="0"/>
+              </a:rPr>
+              <a:t>   </a:t>
+            </a:r>
+          </a:p>
+          <a:p>
+            <a:pPr marL="342900" indent="-342900">
+              <a:buFont typeface="Arial" charset="0"/>
+              <a:buChar char="•"/>
+            </a:pPr>
+            <a:r>
+              <a:rPr lang="en-US" sz="1400" b="1">
+                <a:latin typeface="Calibri" pitchFamily="34" charset="0"/>
+              </a:rPr>
+              <a:t>Remaining Phases up to 7  </a:t>
+            </a:r>
+            <a:r>
+              <a:rPr lang="en-US" sz="1400">
+                <a:latin typeface="Calibri" pitchFamily="34" charset="0"/>
+              </a:rPr>
+              <a:t>contains less products yet similar numbers of test cases per product</a:t>
+            </a:r>
+          </a:p>
+          <a:p>
+            <a:pPr marL="342900" indent="-342900">
+              <a:buFont typeface="Arial" charset="0"/>
+              <a:buChar char="•"/>
+            </a:pPr>
+            <a:r>
+              <a:rPr lang="en-US" sz="2000">
+                <a:latin typeface="Calibri" pitchFamily="34" charset="0"/>
+              </a:rPr>
+              <a:t>Products tested in a number of States totals of </a:t>
+            </a:r>
+            <a:r>
+              <a:rPr lang="en-US" sz="2400">
+                <a:latin typeface="Calibri" pitchFamily="34" charset="0"/>
+              </a:rPr>
+              <a:t>3200 to 4400 tests</a:t>
+            </a:r>
+          </a:p>
+          <a:p>
+            <a:pPr marL="342900" indent="-342900">
+              <a:buFont typeface="Arial" charset="0"/>
+              <a:buChar char="•"/>
+            </a:pPr>
+            <a:r>
+              <a:rPr lang="en-US" sz="2400">
+                <a:latin typeface="Calibri" pitchFamily="34" charset="0"/>
+              </a:rPr>
+              <a:t>API Tests</a:t>
+            </a:r>
+          </a:p>
+          <a:p>
+            <a:pPr marL="342900" indent="-342900">
+              <a:buFont typeface="Arial" charset="0"/>
+              <a:buChar char="•"/>
+            </a:pPr>
+            <a:endParaRPr lang="en-US" sz="2400">
+              <a:latin typeface="Calibri" pitchFamily="34" charset="0"/>
+            </a:endParaRPr>
+          </a:p>
+          <a:p>
+            <a:pPr marL="342900" indent="-342900">
+              <a:buFont typeface="Arial" charset="0"/>
+              <a:buChar char="•"/>
+            </a:pPr>
+            <a:endParaRPr lang="en-US" sz="1200">
+              <a:latin typeface="Calibri" pitchFamily="34" charset="0"/>
+            </a:endParaRPr>
           </a:p>
         </p:txBody>
       </p:sp>
@@ -3257,7 +3173,7 @@
         <p:spPr>
           <a:xfrm>
             <a:off x="433388" y="914400"/>
-            <a:ext cx="3205162" cy="3735388"/>
+            <a:ext cx="4254500" cy="5381625"/>
           </a:xfrm>
         </p:spPr>
         <p:txBody>
@@ -3273,10 +3189,16 @@
               <a:defRPr/>
             </a:pPr>
             <a:r>
+              <a:rPr lang="en-US" u="sng" dirty="0" smtClean="0">
+                <a:ea typeface="+mn-ea"/>
+              </a:rPr>
+              <a:t>Three Desired levels </a:t>
+            </a:r>
+            <a:r>
               <a:rPr lang="en-US" u="sng" dirty="0">
                 <a:ea typeface="+mn-ea"/>
               </a:rPr>
-              <a:t>Three levels of </a:t>
+              <a:t>of </a:t>
             </a:r>
             <a:r>
               <a:rPr lang="en-US" u="sng" dirty="0" smtClean="0">
@@ -3296,17 +3218,17 @@
               <a:defRPr/>
             </a:pPr>
             <a:r>
-              <a:rPr lang="en-US" sz="800" dirty="0">
-                <a:ea typeface="+mn-ea"/>
-              </a:rPr>
-              <a:t> </a:t>
-            </a:r>
-            <a:endParaRPr lang="en-US" u="sng" dirty="0">
+              <a:rPr lang="en-US" sz="400" dirty="0" smtClean="0">
+                <a:ea typeface="+mn-ea"/>
+              </a:rPr>
+              <a:t>    </a:t>
+            </a:r>
+            <a:endParaRPr lang="en-US" sz="400" dirty="0">
               <a:ea typeface="+mn-ea"/>
             </a:endParaRPr>
           </a:p>
           <a:p>
-            <a:pPr indent="-234950" eaLnBrk="1" fontAlgn="auto" hangingPunct="1">
+            <a:pPr eaLnBrk="1" fontAlgn="auto" hangingPunct="1">
               <a:spcAft>
                 <a:spcPts val="0"/>
               </a:spcAft>
@@ -3316,7 +3238,7 @@
               <a:rPr lang="en-US" b="1" dirty="0" smtClean="0">
                 <a:ea typeface="+mn-ea"/>
               </a:rPr>
-              <a:t>Test Run Specific</a:t>
+              <a:t>Test Run</a:t>
             </a:r>
             <a:r>
               <a:rPr lang="en-US" dirty="0" smtClean="0">
@@ -3326,21 +3248,7 @@
             </a:r>
           </a:p>
           <a:p>
-            <a:pPr indent="-234950" eaLnBrk="1" fontAlgn="auto" hangingPunct="1">
-              <a:spcAft>
-                <a:spcPts val="0"/>
-              </a:spcAft>
-              <a:defRPr/>
-            </a:pPr>
-            <a:r>
-              <a:rPr lang="en-US" dirty="0" smtClean="0">
-                <a:ea typeface="+mn-ea"/>
-              </a:rPr>
-              <a:t>Test Function Pass / Fail </a:t>
-            </a:r>
-          </a:p>
-          <a:p>
-            <a:pPr marL="684213" lvl="1" indent="-342900" eaLnBrk="1" fontAlgn="auto" hangingPunct="1">
+            <a:pPr marL="342900" indent="-342900" eaLnBrk="1" fontAlgn="auto" hangingPunct="1">
               <a:spcAft>
                 <a:spcPts val="0"/>
               </a:spcAft>
@@ -3352,14 +3260,113 @@
               <a:rPr lang="en-US" dirty="0" smtClean="0">
                 <a:ea typeface="+mn-ea"/>
               </a:rPr>
-              <a:t>Current Standard test run encompassing test specific data and testRun specifics</a:t>
+              <a:t>A collection of test cases by state, product, or function.</a:t>
+            </a:r>
+          </a:p>
+          <a:p>
+            <a:pPr eaLnBrk="1" fontAlgn="auto" hangingPunct="1">
+              <a:spcAft>
+                <a:spcPts val="0"/>
+              </a:spcAft>
+              <a:defRPr/>
+            </a:pPr>
+            <a:endParaRPr lang="en-US" dirty="0">
+              <a:ea typeface="+mn-ea"/>
+            </a:endParaRPr>
+          </a:p>
+          <a:p>
+            <a:pPr eaLnBrk="1" fontAlgn="auto" hangingPunct="1">
+              <a:spcAft>
+                <a:spcPts val="0"/>
+              </a:spcAft>
+              <a:defRPr/>
+            </a:pPr>
+            <a:r>
+              <a:rPr lang="en-US" b="1" dirty="0" smtClean="0">
+                <a:ea typeface="+mn-ea"/>
+              </a:rPr>
+              <a:t>Case Specific</a:t>
+            </a:r>
+          </a:p>
+          <a:p>
+            <a:pPr marL="342900" indent="-342900" eaLnBrk="1" fontAlgn="auto" hangingPunct="1">
+              <a:spcAft>
+                <a:spcPts val="0"/>
+              </a:spcAft>
+              <a:buFont typeface="Arial" panose="020B0604020202020204" pitchFamily="34" charset="0"/>
+              <a:buChar char="•"/>
+              <a:defRPr/>
+            </a:pPr>
+            <a:r>
+              <a:rPr lang="en-US" dirty="0" smtClean="0">
+                <a:ea typeface="+mn-ea"/>
+              </a:rPr>
+              <a:t>Very granular, covers every Assert or Compare in a given test case</a:t>
+            </a:r>
+          </a:p>
+          <a:p>
+            <a:pPr eaLnBrk="1" fontAlgn="auto" hangingPunct="1">
+              <a:spcAft>
+                <a:spcPts val="0"/>
+              </a:spcAft>
+              <a:defRPr/>
+            </a:pPr>
+            <a:r>
+              <a:rPr lang="en-US" dirty="0" smtClean="0">
+                <a:ea typeface="+mn-ea"/>
+              </a:rPr>
+              <a:t>     Is a Key Development tool</a:t>
+            </a:r>
+          </a:p>
+          <a:p>
+            <a:pPr eaLnBrk="1" fontAlgn="auto" hangingPunct="1">
+              <a:spcAft>
+                <a:spcPts val="0"/>
+              </a:spcAft>
+              <a:defRPr/>
+            </a:pPr>
+            <a:endParaRPr lang="en-US" b="1" dirty="0">
+              <a:ea typeface="+mn-ea"/>
+            </a:endParaRPr>
+          </a:p>
+          <a:p>
+            <a:pPr eaLnBrk="1" fontAlgn="auto" hangingPunct="1">
+              <a:spcAft>
+                <a:spcPts val="0"/>
+              </a:spcAft>
+              <a:defRPr/>
+            </a:pPr>
+            <a:r>
+              <a:rPr lang="en-US" b="1" dirty="0" smtClean="0">
+                <a:ea typeface="+mn-ea"/>
+              </a:rPr>
+              <a:t>Dash Board</a:t>
+            </a:r>
+            <a:endParaRPr lang="en-US" b="1" dirty="0">
+              <a:ea typeface="+mn-ea"/>
+            </a:endParaRPr>
+          </a:p>
+          <a:p>
+            <a:pPr marL="342900" indent="-342900" eaLnBrk="1" fontAlgn="auto" hangingPunct="1">
+              <a:spcAft>
+                <a:spcPts val="0"/>
+              </a:spcAft>
+              <a:buFont typeface="Arial" panose="020B0604020202020204" pitchFamily="34" charset="0"/>
+              <a:buChar char="•"/>
+              <a:defRPr/>
+            </a:pPr>
+            <a:r>
+              <a:rPr lang="en-US" dirty="0" smtClean="0">
+                <a:ea typeface="+mn-ea"/>
+              </a:rPr>
+              <a:t>Provides a view into the current state of a product w.r.t ship-ability </a:t>
             </a:r>
           </a:p>
         </p:txBody>
       </p:sp>
       <p:pic>
         <p:nvPicPr>
-          <p:cNvPr id="20486" name="Picture 6" descr="secondary"/>
+          <p:cNvPr id="20483" name="Picture 8" descr="main"/>
           <p:cNvPicPr>
             <a:picLocks noChangeAspect="1" noChangeArrowheads="1"/>
           </p:cNvPicPr>
@@ -3374,15 +3381,66 @@
         </p:blipFill>
         <p:spPr bwMode="auto">
           <a:xfrm>
-            <a:off x="3576583" y="1374093"/>
-            <a:ext cx="5523556" cy="4505404"/>
+            <a:off x="4779963" y="914400"/>
+            <a:ext cx="4364037" cy="5788025"/>
           </a:xfrm>
           <a:prstGeom prst="rect">
             <a:avLst/>
           </a:prstGeom>
           <a:noFill/>
+          <a:ln w="9525">
+            <a:noFill/>
+            <a:miter lim="800000"/>
+            <a:headEnd/>
+            <a:tailEnd/>
+          </a:ln>
         </p:spPr>
       </p:pic>
+      <p:sp>
+        <p:nvSpPr>
+          <p:cNvPr id="2" name="Right Arrow 1"/>
+          <p:cNvSpPr/>
+          <p:nvPr/>
+        </p:nvSpPr>
+        <p:spPr>
+          <a:xfrm>
+            <a:off x="8461375" y="5845175"/>
+            <a:ext cx="138113" cy="104775"/>
+          </a:xfrm>
+          <a:prstGeom prst="rightArrow">
+            <a:avLst/>
+          </a:prstGeom>
+          <a:solidFill>
+            <a:schemeClr val="bg1">
+              <a:lumMod val="95000"/>
+            </a:schemeClr>
+          </a:solidFill>
+        </p:spPr>
+        <p:style>
+          <a:lnRef idx="1">
+            <a:schemeClr val="accent1"/>
+          </a:lnRef>
+          <a:fillRef idx="3">
+            <a:schemeClr val="accent1"/>
+          </a:fillRef>
+          <a:effectRef idx="2">
+            <a:schemeClr val="accent1"/>
+          </a:effectRef>
+          <a:fontRef idx="minor">
+            <a:schemeClr val="lt1"/>
+          </a:fontRef>
+        </p:style>
+        <p:txBody>
+          <a:bodyPr anchor="ctr"/>
+          <a:lstStyle/>
+          <a:p>
+            <a:pPr algn="ctr">
+              <a:defRPr/>
+            </a:pPr>
+            <a:endParaRPr lang="en-US"/>
+          </a:p>
+        </p:txBody>
+      </p:sp>
     </p:spTree>
   </p:cSld>
   <p:clrMapOvr>
@@ -3447,7 +3505,7 @@
       </p:sp>
       <p:sp>
         <p:nvSpPr>
-          <p:cNvPr id="21506" name="Content Placeholder 2"/>
+          <p:cNvPr id="3" name="Content Placeholder 2"/>
           <p:cNvSpPr>
             <a:spLocks noGrp="1"/>
           </p:cNvSpPr>
@@ -3457,200 +3515,110 @@
         </p:nvSpPr>
         <p:spPr>
           <a:xfrm>
-            <a:off x="433388" y="914401"/>
-            <a:ext cx="4035425" cy="4537276"/>
+            <a:off x="433388" y="914400"/>
+            <a:ext cx="3205162" cy="3735388"/>
           </a:xfrm>
         </p:spPr>
         <p:txBody>
-          <a:bodyPr/>
+          <a:bodyPr rtlCol="0">
+            <a:normAutofit/>
+          </a:bodyPr>
           <a:lstStyle/>
           <a:p>
-            <a:pPr eaLnBrk="1" hangingPunct="1">
-              <a:lnSpc>
-                <a:spcPct val="70000"/>
-              </a:lnSpc>
-            </a:pPr>
+            <a:pPr eaLnBrk="1" fontAlgn="auto" hangingPunct="1">
+              <a:spcAft>
+                <a:spcPts val="0"/>
+              </a:spcAft>
+              <a:defRPr/>
+            </a:pPr>
+            <a:r>
+              <a:rPr lang="en-US" u="sng" dirty="0">
+                <a:ea typeface="+mn-ea"/>
+              </a:rPr>
+              <a:t>Three levels of </a:t>
+            </a:r>
             <a:r>
               <a:rPr lang="en-US" u="sng" dirty="0" smtClean="0">
-                <a:latin typeface="Calibri Light" pitchFamily="34" charset="0"/>
-              </a:rPr>
-              <a:t>Three levels of reporting</a:t>
-            </a:r>
-          </a:p>
-          <a:p>
-            <a:pPr eaLnBrk="1" hangingPunct="1">
-              <a:lnSpc>
-                <a:spcPct val="70000"/>
-              </a:lnSpc>
-              <a:spcBef>
-                <a:spcPct val="0"/>
-              </a:spcBef>
-            </a:pPr>
-            <a:r>
-              <a:rPr lang="en-US" sz="700" dirty="0" smtClean="0">
-                <a:latin typeface="Calibri Light" pitchFamily="34" charset="0"/>
+                <a:ea typeface="+mn-ea"/>
+              </a:rPr>
+              <a:t>reporting</a:t>
+            </a:r>
+          </a:p>
+          <a:p>
+            <a:pPr eaLnBrk="1" fontAlgn="auto" hangingPunct="1">
+              <a:spcBef>
+                <a:spcPts val="0"/>
+              </a:spcBef>
+              <a:spcAft>
+                <a:spcPts val="0"/>
+              </a:spcAft>
+              <a:defRPr/>
+            </a:pPr>
+            <a:r>
+              <a:rPr lang="en-US" sz="800" dirty="0">
+                <a:ea typeface="+mn-ea"/>
               </a:rPr>
               <a:t> </a:t>
             </a:r>
-            <a:endParaRPr lang="en-US" sz="700" u="sng" dirty="0" smtClean="0">
-              <a:latin typeface="Calibri Light" pitchFamily="34" charset="0"/>
+            <a:endParaRPr lang="en-US" u="sng" dirty="0">
+              <a:ea typeface="+mn-ea"/>
             </a:endParaRPr>
           </a:p>
           <a:p>
-            <a:pPr eaLnBrk="1" hangingPunct="1">
-              <a:lnSpc>
-                <a:spcPct val="70000"/>
-              </a:lnSpc>
-            </a:pPr>
-            <a:endParaRPr lang="en-US" b="1" dirty="0" smtClean="0">
-              <a:latin typeface="Calibri Light" pitchFamily="34" charset="0"/>
-            </a:endParaRPr>
-          </a:p>
-          <a:p>
-            <a:pPr eaLnBrk="1" hangingPunct="1">
-              <a:lnSpc>
-                <a:spcPct val="70000"/>
-              </a:lnSpc>
-            </a:pPr>
-            <a:r>
-              <a:rPr lang="en-US" sz="2500" b="1" u="sng" dirty="0" smtClean="0">
-                <a:latin typeface="Calibri Light" pitchFamily="34" charset="0"/>
-              </a:rPr>
-              <a:t>ASPIRATIONAL PRESENTATION</a:t>
-            </a:r>
-          </a:p>
-          <a:p>
-            <a:pPr eaLnBrk="1" hangingPunct="1">
-              <a:lnSpc>
-                <a:spcPct val="70000"/>
-              </a:lnSpc>
-            </a:pPr>
-            <a:r>
-              <a:rPr lang="en-US" sz="900" b="1" dirty="0" smtClean="0">
-                <a:latin typeface="Calibri Light" pitchFamily="34" charset="0"/>
-              </a:rPr>
-              <a:t>     </a:t>
-            </a:r>
-          </a:p>
-          <a:p>
-            <a:pPr eaLnBrk="1" hangingPunct="1">
-              <a:lnSpc>
-                <a:spcPct val="85000"/>
-              </a:lnSpc>
+            <a:pPr indent="-234950" eaLnBrk="1" fontAlgn="auto" hangingPunct="1">
+              <a:spcAft>
+                <a:spcPts val="0"/>
+              </a:spcAft>
+              <a:defRPr/>
             </a:pPr>
             <a:r>
               <a:rPr lang="en-US" b="1" dirty="0" smtClean="0">
-                <a:latin typeface="Calibri Light" pitchFamily="34" charset="0"/>
-              </a:rPr>
-              <a:t>High Level Dashboard</a:t>
-            </a:r>
-          </a:p>
-          <a:p>
-            <a:pPr eaLnBrk="1" hangingPunct="1">
-              <a:lnSpc>
-                <a:spcPct val="85000"/>
-              </a:lnSpc>
-            </a:pPr>
-            <a:r>
-              <a:rPr lang="en-US" b="1" dirty="0" smtClean="0">
-                <a:latin typeface="Calibri Light" pitchFamily="34" charset="0"/>
-              </a:rPr>
-              <a:t>Product Specific: </a:t>
-            </a:r>
-          </a:p>
-          <a:p>
-            <a:pPr eaLnBrk="1" hangingPunct="1">
-              <a:lnSpc>
-                <a:spcPct val="85000"/>
-              </a:lnSpc>
-            </a:pPr>
-            <a:r>
-              <a:rPr lang="en-US" sz="500" dirty="0" smtClean="0">
-                <a:latin typeface="Calibri Light" pitchFamily="34" charset="0"/>
-              </a:rPr>
-              <a:t>       </a:t>
-            </a:r>
-          </a:p>
-          <a:p>
-            <a:pPr eaLnBrk="1" hangingPunct="1">
-              <a:lnSpc>
-                <a:spcPct val="85000"/>
-              </a:lnSpc>
-            </a:pPr>
-            <a:r>
-              <a:rPr lang="en-US" sz="1800" dirty="0" smtClean="0">
-                <a:latin typeface="Calibri Light" pitchFamily="34" charset="0"/>
-              </a:rPr>
-              <a:t>       </a:t>
-            </a:r>
-            <a:r>
-              <a:rPr lang="en-US" sz="1800" b="1" dirty="0" smtClean="0">
-                <a:latin typeface="Calibri Light" pitchFamily="34" charset="0"/>
-              </a:rPr>
-              <a:t>Go / No-go Product  Dashboard</a:t>
-            </a:r>
-          </a:p>
-          <a:p>
-            <a:pPr eaLnBrk="1" hangingPunct="1">
-              <a:lnSpc>
-                <a:spcPct val="70000"/>
-              </a:lnSpc>
-            </a:pPr>
-            <a:r>
-              <a:rPr lang="en-US" sz="800" dirty="0" smtClean="0">
-                <a:latin typeface="Calibri Light" pitchFamily="34" charset="0"/>
-              </a:rPr>
-              <a:t>            </a:t>
-            </a:r>
-          </a:p>
-          <a:p>
-            <a:pPr eaLnBrk="1" hangingPunct="1">
-              <a:lnSpc>
-                <a:spcPct val="70000"/>
-              </a:lnSpc>
-            </a:pPr>
-            <a:r>
-              <a:rPr lang="en-US" b="1" dirty="0" smtClean="0">
-                <a:latin typeface="Calibri Light" pitchFamily="34" charset="0"/>
-              </a:rPr>
-              <a:t>Provides:</a:t>
-            </a:r>
-          </a:p>
-          <a:p>
-            <a:pPr eaLnBrk="1" hangingPunct="1">
-              <a:lnSpc>
-                <a:spcPct val="105000"/>
-              </a:lnSpc>
-              <a:buFontTx/>
+                <a:ea typeface="+mn-ea"/>
+              </a:rPr>
+              <a:t>Test Run Specific</a:t>
+            </a:r>
+            <a:r>
+              <a:rPr lang="en-US" dirty="0" smtClean="0">
+                <a:ea typeface="+mn-ea"/>
+              </a:rPr>
+              <a:t>:  </a:t>
+            </a:r>
+          </a:p>
+          <a:p>
+            <a:pPr indent="-234950" eaLnBrk="1" fontAlgn="auto" hangingPunct="1">
+              <a:spcAft>
+                <a:spcPts val="0"/>
+              </a:spcAft>
+              <a:defRPr/>
+            </a:pPr>
+            <a:r>
+              <a:rPr lang="en-US" dirty="0" smtClean="0">
+                <a:ea typeface="+mn-ea"/>
+              </a:rPr>
+              <a:t>Test Function Pass / Fail </a:t>
+            </a:r>
+          </a:p>
+          <a:p>
+            <a:pPr marL="684213" lvl="1" indent="-342900" eaLnBrk="1" fontAlgn="auto" hangingPunct="1">
+              <a:spcAft>
+                <a:spcPts val="0"/>
+              </a:spcAft>
+              <a:buFont typeface="Arial" panose="020B0604020202020204" pitchFamily="34" charset="0"/>
               <a:buChar char="•"/>
-            </a:pPr>
-            <a:r>
-              <a:rPr lang="en-US" b="1" dirty="0" smtClean="0">
-                <a:latin typeface="Calibri Light" pitchFamily="34" charset="0"/>
-              </a:rPr>
-              <a:t>Development Managers &amp;</a:t>
-            </a:r>
-          </a:p>
-          <a:p>
-            <a:pPr eaLnBrk="1" hangingPunct="1">
-              <a:lnSpc>
-                <a:spcPct val="105000"/>
-              </a:lnSpc>
-              <a:buFontTx/>
-              <a:buChar char="•"/>
-            </a:pPr>
-            <a:r>
-              <a:rPr lang="en-US" b="1" dirty="0" smtClean="0">
-                <a:latin typeface="Calibri Light" pitchFamily="34" charset="0"/>
-              </a:rPr>
-              <a:t>Product Managers A quick look at the current health and capability to ship the product </a:t>
+              <a:defRPr/>
+            </a:pPr>
+            <a:r>
+              <a:rPr lang="en-US" dirty="0" smtClean="0">
+                <a:ea typeface="+mn-ea"/>
+              </a:rPr>
+              <a:t>Current Standard test run encompassing test specific data and testRun specifics</a:t>
             </a:r>
           </a:p>
         </p:txBody>
       </p:sp>
       <p:pic>
         <p:nvPicPr>
-          <p:cNvPr id="21510" name="Picture 6" descr="TestRptProdProto"/>
+          <p:cNvPr id="21507" name="Picture 6" descr="secondary"/>
           <p:cNvPicPr>
             <a:picLocks noChangeAspect="1" noChangeArrowheads="1"/>
           </p:cNvPicPr>
@@ -3665,43 +3633,19 @@
         </p:blipFill>
         <p:spPr bwMode="auto">
           <a:xfrm>
-            <a:off x="4953964" y="810229"/>
-            <a:ext cx="3994773" cy="4879778"/>
+            <a:off x="3576638" y="1374775"/>
+            <a:ext cx="5522912" cy="4505325"/>
           </a:xfrm>
           <a:prstGeom prst="rect">
             <a:avLst/>
           </a:prstGeom>
           <a:noFill/>
-        </p:spPr>
-      </p:pic>
-      <p:pic>
-        <p:nvPicPr>
-          <p:cNvPr id="2" name="Picture 1"/>
-          <p:cNvPicPr>
-            <a:picLocks noChangeAspect="1"/>
-          </p:cNvPicPr>
-          <p:nvPr/>
-        </p:nvPicPr>
-        <p:blipFill>
-          <a:blip r:embed="rId3">
-            <a:extLst>
-              <a:ext uri="{28A0092B-C50C-407E-A947-70E740481C1C}">
-                <a14:useLocalDpi xmlns:a14="http://schemas.microsoft.com/office/drawing/2010/main" val="0"/>
-              </a:ext>
-            </a:extLst>
-          </a:blip>
-          <a:stretch>
-            <a:fillRect/>
-          </a:stretch>
-        </p:blipFill>
-        <p:spPr>
-          <a:xfrm>
-            <a:off x="766440" y="5690007"/>
-            <a:ext cx="7676808" cy="1167993"/>
-          </a:xfrm>
-          <a:prstGeom prst="rect">
-            <a:avLst/>
-          </a:prstGeom>
+          <a:ln w="9525">
+            <a:noFill/>
+            <a:miter lim="800000"/>
+            <a:headEnd/>
+            <a:tailEnd/>
+          </a:ln>
         </p:spPr>
       </p:pic>
     </p:spTree>
@@ -3748,8 +3692,8 @@
         </p:nvSpPr>
         <p:spPr>
           <a:xfrm>
-            <a:off x="3346450" y="142875"/>
-            <a:ext cx="3040063" cy="1325563"/>
+            <a:off x="1641475" y="130175"/>
+            <a:ext cx="5102225" cy="1325563"/>
           </a:xfrm>
         </p:spPr>
         <p:txBody>
@@ -3761,7 +3705,7 @@
               <a:rPr lang="en-US" smtClean="0">
                 <a:latin typeface="Calibri Light" pitchFamily="34" charset="0"/>
               </a:rPr>
-              <a:t>FUTURE</a:t>
+              <a:t>REPORTING</a:t>
             </a:r>
           </a:p>
         </p:txBody>
@@ -3778,243 +3722,261 @@
         </p:nvSpPr>
         <p:spPr>
           <a:xfrm>
-            <a:off x="274638" y="1825625"/>
-            <a:ext cx="8869362" cy="4351338"/>
+            <a:off x="433388" y="914400"/>
+            <a:ext cx="4035425" cy="4537075"/>
           </a:xfrm>
         </p:spPr>
         <p:txBody>
           <a:bodyPr/>
           <a:lstStyle/>
           <a:p>
-            <a:pPr marL="342900" indent="-342900" eaLnBrk="1" hangingPunct="1">
+            <a:pPr eaLnBrk="1" hangingPunct="1">
+              <a:lnSpc>
+                <a:spcPct val="70000"/>
+              </a:lnSpc>
+            </a:pPr>
+            <a:r>
+              <a:rPr lang="en-US" u="sng" smtClean="0">
+                <a:latin typeface="Calibri Light" pitchFamily="34" charset="0"/>
+              </a:rPr>
+              <a:t>Three levels of reporting</a:t>
+            </a:r>
+          </a:p>
+          <a:p>
+            <a:pPr eaLnBrk="1" hangingPunct="1">
+              <a:lnSpc>
+                <a:spcPct val="70000"/>
+              </a:lnSpc>
+              <a:spcBef>
+                <a:spcPct val="0"/>
+              </a:spcBef>
+            </a:pPr>
+            <a:r>
+              <a:rPr lang="en-US" sz="700" smtClean="0">
+                <a:latin typeface="Calibri Light" pitchFamily="34" charset="0"/>
+              </a:rPr>
+              <a:t> </a:t>
+            </a:r>
+            <a:endParaRPr lang="en-US" sz="700" u="sng" smtClean="0">
+              <a:latin typeface="Calibri Light" pitchFamily="34" charset="0"/>
+            </a:endParaRPr>
+          </a:p>
+          <a:p>
+            <a:pPr eaLnBrk="1" hangingPunct="1">
+              <a:lnSpc>
+                <a:spcPct val="70000"/>
+              </a:lnSpc>
+            </a:pPr>
+            <a:endParaRPr lang="en-US" b="1" smtClean="0">
+              <a:latin typeface="Calibri Light" pitchFamily="34" charset="0"/>
+            </a:endParaRPr>
+          </a:p>
+          <a:p>
+            <a:pPr eaLnBrk="1" hangingPunct="1">
+              <a:lnSpc>
+                <a:spcPct val="70000"/>
+              </a:lnSpc>
+            </a:pPr>
+            <a:r>
+              <a:rPr lang="en-US" sz="2500" b="1" u="sng" smtClean="0">
+                <a:latin typeface="Calibri Light" pitchFamily="34" charset="0"/>
+              </a:rPr>
+              <a:t>ASPIRATIONAL PRESENTATION</a:t>
+            </a:r>
+          </a:p>
+          <a:p>
+            <a:pPr eaLnBrk="1" hangingPunct="1">
+              <a:lnSpc>
+                <a:spcPct val="70000"/>
+              </a:lnSpc>
+            </a:pPr>
+            <a:r>
+              <a:rPr lang="en-US" sz="900" b="1" smtClean="0">
+                <a:latin typeface="Calibri Light" pitchFamily="34" charset="0"/>
+              </a:rPr>
+              <a:t>     </a:t>
+            </a:r>
+          </a:p>
+          <a:p>
+            <a:pPr eaLnBrk="1" hangingPunct="1">
+              <a:lnSpc>
+                <a:spcPct val="85000"/>
+              </a:lnSpc>
+            </a:pPr>
+            <a:r>
+              <a:rPr lang="en-US" b="1" smtClean="0">
+                <a:latin typeface="Calibri Light" pitchFamily="34" charset="0"/>
+              </a:rPr>
+              <a:t>High Level Dashboard</a:t>
+            </a:r>
+          </a:p>
+          <a:p>
+            <a:pPr eaLnBrk="1" hangingPunct="1">
+              <a:lnSpc>
+                <a:spcPct val="85000"/>
+              </a:lnSpc>
+            </a:pPr>
+            <a:r>
+              <a:rPr lang="en-US" b="1" smtClean="0">
+                <a:latin typeface="Calibri Light" pitchFamily="34" charset="0"/>
+              </a:rPr>
+              <a:t>Product Specific: </a:t>
+            </a:r>
+          </a:p>
+          <a:p>
+            <a:pPr eaLnBrk="1" hangingPunct="1">
+              <a:lnSpc>
+                <a:spcPct val="85000"/>
+              </a:lnSpc>
+            </a:pPr>
+            <a:r>
+              <a:rPr lang="en-US" sz="500" smtClean="0">
+                <a:latin typeface="Calibri Light" pitchFamily="34" charset="0"/>
+              </a:rPr>
+              <a:t>       </a:t>
+            </a:r>
+          </a:p>
+          <a:p>
+            <a:pPr eaLnBrk="1" hangingPunct="1">
+              <a:lnSpc>
+                <a:spcPct val="85000"/>
+              </a:lnSpc>
+            </a:pPr>
+            <a:r>
+              <a:rPr lang="en-US" sz="1800" smtClean="0">
+                <a:latin typeface="Calibri Light" pitchFamily="34" charset="0"/>
+              </a:rPr>
+              <a:t>       </a:t>
+            </a:r>
+            <a:r>
+              <a:rPr lang="en-US" sz="1800" b="1" smtClean="0">
+                <a:latin typeface="Calibri Light" pitchFamily="34" charset="0"/>
+              </a:rPr>
+              <a:t>Go / No-go Product  Dashboard</a:t>
+            </a:r>
+          </a:p>
+          <a:p>
+            <a:pPr eaLnBrk="1" hangingPunct="1">
+              <a:lnSpc>
+                <a:spcPct val="70000"/>
+              </a:lnSpc>
+            </a:pPr>
+            <a:r>
+              <a:rPr lang="en-US" sz="800" smtClean="0">
+                <a:latin typeface="Calibri Light" pitchFamily="34" charset="0"/>
+              </a:rPr>
+              <a:t>            </a:t>
+            </a:r>
+          </a:p>
+          <a:p>
+            <a:pPr eaLnBrk="1" hangingPunct="1">
+              <a:lnSpc>
+                <a:spcPct val="70000"/>
+              </a:lnSpc>
+            </a:pPr>
+            <a:r>
+              <a:rPr lang="en-US" b="1" smtClean="0">
+                <a:latin typeface="Calibri Light" pitchFamily="34" charset="0"/>
+              </a:rPr>
+              <a:t>Provides:</a:t>
+            </a:r>
+          </a:p>
+          <a:p>
+            <a:pPr eaLnBrk="1" hangingPunct="1">
+              <a:lnSpc>
+                <a:spcPct val="105000"/>
+              </a:lnSpc>
               <a:buFontTx/>
               <a:buChar char="•"/>
             </a:pPr>
             <a:r>
-              <a:rPr lang="en-US" sz="2000" dirty="0" smtClean="0">
-                <a:latin typeface="Calibri Light" pitchFamily="34" charset="0"/>
-              </a:rPr>
-              <a:t>Roll Out Framework to Development </a:t>
-            </a:r>
-          </a:p>
-          <a:p>
-            <a:pPr marL="919163" lvl="1" indent="-342900" eaLnBrk="1" hangingPunct="1">
-              <a:buFontTx/>
-              <a:buNone/>
-            </a:pPr>
-            <a:r>
-              <a:rPr lang="en-US" sz="2000" dirty="0" smtClean="0">
-                <a:latin typeface="Calibri Light" pitchFamily="34" charset="0"/>
-              </a:rPr>
-              <a:t>Refactor Object layer commonality.  </a:t>
-            </a:r>
-          </a:p>
-          <a:p>
-            <a:pPr marL="919163" lvl="1" indent="-342900" eaLnBrk="1" hangingPunct="1">
-              <a:buFontTx/>
-              <a:buNone/>
-            </a:pPr>
-            <a:r>
-              <a:rPr lang="en-US" sz="2000" dirty="0" smtClean="0">
-                <a:latin typeface="Calibri Light" pitchFamily="34" charset="0"/>
-              </a:rPr>
-              <a:t>Move commonality to the Base Layer. </a:t>
-            </a:r>
-          </a:p>
-          <a:p>
-            <a:pPr marL="1143000" lvl="2" indent="-228600" eaLnBrk="1" hangingPunct="1">
+              <a:rPr lang="en-US" b="1" smtClean="0">
+                <a:latin typeface="Calibri Light" pitchFamily="34" charset="0"/>
+              </a:rPr>
+              <a:t>Development Managers &amp;</a:t>
+            </a:r>
+          </a:p>
+          <a:p>
+            <a:pPr eaLnBrk="1" hangingPunct="1">
+              <a:lnSpc>
+                <a:spcPct val="105000"/>
+              </a:lnSpc>
               <a:buFontTx/>
               <a:buChar char="•"/>
             </a:pPr>
             <a:r>
-              <a:rPr lang="en-US" sz="1600" dirty="0" smtClean="0">
-                <a:latin typeface="Calibri Light" pitchFamily="34" charset="0"/>
-              </a:rPr>
-              <a:t>The smaller the object layer, the easier to add new capability ( new applications )</a:t>
-            </a:r>
-            <a:endParaRPr lang="en-US" sz="1800" dirty="0" smtClean="0">
-              <a:latin typeface="Calibri Light" pitchFamily="34" charset="0"/>
-            </a:endParaRPr>
-          </a:p>
-          <a:p>
-            <a:pPr marL="919163" lvl="1" indent="-342900" eaLnBrk="1" hangingPunct="1">
-              <a:buFontTx/>
-              <a:buNone/>
-            </a:pPr>
-            <a:r>
-              <a:rPr lang="en-US" sz="2000" dirty="0" smtClean="0">
-                <a:latin typeface="Calibri Light" pitchFamily="34" charset="0"/>
-              </a:rPr>
-              <a:t>Improve top of Object layer making more uniform</a:t>
-            </a:r>
-          </a:p>
-          <a:p>
-            <a:pPr marL="1143000" lvl="2" indent="-228600" eaLnBrk="1" hangingPunct="1">
-              <a:buFontTx/>
-              <a:buChar char="•"/>
-            </a:pPr>
-            <a:r>
-              <a:rPr lang="en-US" sz="1600" dirty="0" smtClean="0">
-                <a:latin typeface="Calibri Light" pitchFamily="34" charset="0"/>
-              </a:rPr>
-              <a:t>The smoother the top of the object layer, the easier to write test cases</a:t>
-            </a:r>
-          </a:p>
-          <a:p>
-            <a:pPr marL="919163" lvl="1" indent="-342900" eaLnBrk="1" hangingPunct="1"/>
-            <a:endParaRPr lang="en-US" sz="1800" dirty="0" smtClean="0">
-              <a:latin typeface="Calibri Light" pitchFamily="34" charset="0"/>
-            </a:endParaRPr>
-          </a:p>
-          <a:p>
-            <a:pPr marL="919163" lvl="1" indent="-342900" eaLnBrk="1" hangingPunct="1">
-              <a:buFontTx/>
-              <a:buNone/>
-            </a:pPr>
-            <a:r>
-              <a:rPr lang="en-US" sz="1800" dirty="0" smtClean="0">
-                <a:latin typeface="Calibri Light" pitchFamily="34" charset="0"/>
-              </a:rPr>
-              <a:t>Decouple function calls in the upper layer from in the bottom layer and below </a:t>
-            </a:r>
-          </a:p>
-          <a:p>
-            <a:pPr marL="1143000" lvl="2" indent="-228600" eaLnBrk="1" hangingPunct="1">
-              <a:buFontTx/>
-              <a:buChar char="•"/>
-            </a:pPr>
-            <a:r>
-              <a:rPr lang="en-US" sz="1600" dirty="0" smtClean="0">
-                <a:latin typeface="Calibri Light" pitchFamily="34" charset="0"/>
-              </a:rPr>
-              <a:t>Keep calls to Protractor in the mid Layer ( page Objects )</a:t>
-            </a:r>
-          </a:p>
-          <a:p>
-            <a:pPr marL="1143000" lvl="2" indent="-228600" eaLnBrk="1" hangingPunct="1">
-              <a:buFontTx/>
-              <a:buChar char="•"/>
-            </a:pPr>
-            <a:r>
-              <a:rPr lang="en-US" sz="1600" dirty="0" smtClean="0">
-                <a:latin typeface="Calibri Light" pitchFamily="34" charset="0"/>
-              </a:rPr>
-              <a:t>Work in localized well isolated areas.  Keep the churn away from the dev engineers</a:t>
-            </a:r>
-          </a:p>
-          <a:p>
-            <a:pPr marL="342900" indent="-342900" eaLnBrk="1" hangingPunct="1"/>
-            <a:r>
-              <a:rPr lang="en-US" sz="800" dirty="0" smtClean="0">
-                <a:latin typeface="Calibri Light" pitchFamily="34" charset="0"/>
-              </a:rPr>
-              <a:t>  </a:t>
-            </a:r>
-          </a:p>
-          <a:p>
-            <a:pPr marL="342900" indent="-342900" eaLnBrk="1" hangingPunct="1">
-              <a:buFontTx/>
-              <a:buChar char="•"/>
-            </a:pPr>
-            <a:r>
-              <a:rPr lang="en-US" sz="2000" dirty="0" smtClean="0">
-                <a:latin typeface="Calibri Light" pitchFamily="34" charset="0"/>
-              </a:rPr>
-              <a:t>Ability to spin up new application</a:t>
-            </a:r>
-          </a:p>
-          <a:p>
-            <a:pPr marL="919163" lvl="1" indent="-342900" eaLnBrk="1" hangingPunct="1">
-              <a:buFont typeface="Arial" panose="020B0604020202020204" pitchFamily="34" charset="0"/>
-              <a:buChar char="•"/>
-            </a:pPr>
-            <a:r>
-              <a:rPr lang="en-US" sz="1600" smtClean="0">
-                <a:latin typeface="Calibri Light" pitchFamily="34" charset="0"/>
-              </a:rPr>
-              <a:t>Adding support for new applications can be accomplished in ~10 working Days</a:t>
-            </a:r>
-          </a:p>
-          <a:p>
-            <a:pPr marL="342900" indent="-342900" eaLnBrk="1" hangingPunct="1"/>
-            <a:r>
-              <a:rPr lang="en-US" sz="800" dirty="0" smtClean="0">
-                <a:latin typeface="Calibri Light" pitchFamily="34" charset="0"/>
-              </a:rPr>
-              <a:t>          </a:t>
-            </a:r>
-          </a:p>
-          <a:p>
-            <a:pPr marL="342900" indent="-342900" eaLnBrk="1" hangingPunct="1">
-              <a:buFontTx/>
-              <a:buChar char="•"/>
-            </a:pPr>
-            <a:r>
-              <a:rPr lang="en-US" sz="2000" dirty="0" smtClean="0">
-                <a:latin typeface="Calibri Light" pitchFamily="34" charset="0"/>
-              </a:rPr>
-              <a:t>Improved Reporting,  add a dashboard, provide </a:t>
-            </a:r>
-            <a:r>
-              <a:rPr lang="en-US" sz="2000" dirty="0" err="1" smtClean="0">
-                <a:latin typeface="Calibri Light" pitchFamily="34" charset="0"/>
-              </a:rPr>
-              <a:t>stasistics</a:t>
-            </a:r>
-            <a:endParaRPr lang="en-US" sz="2000" dirty="0" smtClean="0">
-              <a:latin typeface="Calibri Light" pitchFamily="34" charset="0"/>
-            </a:endParaRPr>
-          </a:p>
-          <a:p>
-            <a:pPr marL="342900" indent="-342900" eaLnBrk="1" hangingPunct="1"/>
-            <a:r>
-              <a:rPr lang="en-US" sz="800" dirty="0" smtClean="0">
-                <a:latin typeface="Calibri Light" pitchFamily="34" charset="0"/>
-              </a:rPr>
-              <a:t>          </a:t>
-            </a:r>
-          </a:p>
-          <a:p>
-            <a:pPr marL="342900" indent="-342900" eaLnBrk="1" hangingPunct="1">
-              <a:buFontTx/>
-              <a:buChar char="•"/>
-            </a:pPr>
-            <a:r>
-              <a:rPr lang="en-US" sz="2000" dirty="0" smtClean="0">
-                <a:latin typeface="Calibri Light" pitchFamily="34" charset="0"/>
-              </a:rPr>
-              <a:t>Test Headless  : Trying to overcome CPU and Memory consumption</a:t>
-            </a:r>
-          </a:p>
-          <a:p>
-            <a:pPr marL="342900" indent="-342900" eaLnBrk="1" hangingPunct="1"/>
-            <a:r>
-              <a:rPr lang="en-US" sz="800" dirty="0" smtClean="0">
-                <a:latin typeface="Calibri Light" pitchFamily="34" charset="0"/>
-              </a:rPr>
-              <a:t>    </a:t>
-            </a:r>
-          </a:p>
-          <a:p>
-            <a:pPr marL="342900" indent="-342900" eaLnBrk="1" hangingPunct="1">
-              <a:buFontTx/>
-              <a:buChar char="•"/>
-            </a:pPr>
-            <a:r>
-              <a:rPr lang="en-US" sz="2000" dirty="0" smtClean="0">
-                <a:latin typeface="Calibri Light" pitchFamily="34" charset="0"/>
-              </a:rPr>
-              <a:t>Mobile devices</a:t>
-            </a:r>
-          </a:p>
-          <a:p>
-            <a:pPr marL="342900" indent="-342900" eaLnBrk="1" hangingPunct="1"/>
-            <a:endParaRPr lang="en-US" sz="2000" dirty="0" smtClean="0">
-              <a:latin typeface="Calibri Light" pitchFamily="34" charset="0"/>
-            </a:endParaRPr>
+              <a:rPr lang="en-US" b="1" smtClean="0">
+                <a:latin typeface="Calibri Light" pitchFamily="34" charset="0"/>
+              </a:rPr>
+              <a:t>Product Managers A quick look at the current health and capability to ship the product </a:t>
+            </a:r>
           </a:p>
         </p:txBody>
       </p:sp>
+      <p:pic>
+        <p:nvPicPr>
+          <p:cNvPr id="22531" name="Picture 6" descr="TestRptProdProto"/>
+          <p:cNvPicPr>
+            <a:picLocks noChangeAspect="1" noChangeArrowheads="1"/>
+          </p:cNvPicPr>
+          <p:nvPr/>
+        </p:nvPicPr>
+        <p:blipFill>
+          <a:blip r:embed="rId2"/>
+          <a:srcRect/>
+          <a:stretch>
+            <a:fillRect/>
+          </a:stretch>
+        </p:blipFill>
+        <p:spPr bwMode="auto">
+          <a:xfrm>
+            <a:off x="4954588" y="809625"/>
+            <a:ext cx="3994150" cy="4879975"/>
+          </a:xfrm>
+          <a:prstGeom prst="rect">
+            <a:avLst/>
+          </a:prstGeom>
+          <a:noFill/>
+          <a:ln w="9525">
+            <a:noFill/>
+            <a:miter lim="800000"/>
+            <a:headEnd/>
+            <a:tailEnd/>
+          </a:ln>
+        </p:spPr>
+      </p:pic>
+      <p:pic>
+        <p:nvPicPr>
+          <p:cNvPr id="22532" name="Picture 1"/>
+          <p:cNvPicPr>
+            <a:picLocks noChangeAspect="1"/>
+          </p:cNvPicPr>
+          <p:nvPr/>
+        </p:nvPicPr>
+        <p:blipFill>
+          <a:blip r:embed="rId3"/>
+          <a:srcRect/>
+          <a:stretch>
+            <a:fillRect/>
+          </a:stretch>
+        </p:blipFill>
+        <p:spPr bwMode="auto">
+          <a:xfrm>
+            <a:off x="766763" y="5689600"/>
+            <a:ext cx="7677150" cy="1168400"/>
+          </a:xfrm>
+          <a:prstGeom prst="rect">
+            <a:avLst/>
+          </a:prstGeom>
+          <a:noFill/>
+          <a:ln w="9525">
+            <a:noFill/>
+            <a:miter lim="800000"/>
+            <a:headEnd/>
+            <a:tailEnd/>
+          </a:ln>
+        </p:spPr>
+      </p:pic>
     </p:spTree>
   </p:cSld>
   <p:clrMapOvr>
@@ -4059,6 +4021,310 @@
         </p:nvSpPr>
         <p:spPr>
           <a:xfrm>
+            <a:off x="3346450" y="142875"/>
+            <a:ext cx="3040063" cy="1325563"/>
+          </a:xfrm>
+        </p:spPr>
+        <p:txBody>
+          <a:bodyPr anchor="t"/>
+          <a:lstStyle/>
+          <a:p>
+            <a:pPr algn="ctr" eaLnBrk="1" hangingPunct="1"/>
+            <a:r>
+              <a:rPr lang="en-US" smtClean="0">
+                <a:latin typeface="Calibri Light" pitchFamily="34" charset="0"/>
+              </a:rPr>
+              <a:t>FUTURE</a:t>
+            </a:r>
+          </a:p>
+        </p:txBody>
+      </p:sp>
+      <p:sp>
+        <p:nvSpPr>
+          <p:cNvPr id="23554" name="Content Placeholder 2"/>
+          <p:cNvSpPr>
+            <a:spLocks noGrp="1"/>
+          </p:cNvSpPr>
+          <p:nvPr>
+            <p:ph idx="1"/>
+          </p:nvPr>
+        </p:nvSpPr>
+        <p:spPr>
+          <a:xfrm>
+            <a:off x="274638" y="1825625"/>
+            <a:ext cx="8869362" cy="4351338"/>
+          </a:xfrm>
+        </p:spPr>
+        <p:txBody>
+          <a:bodyPr/>
+          <a:lstStyle/>
+          <a:p>
+            <a:pPr marL="342900" indent="-342900" eaLnBrk="1" hangingPunct="1">
+              <a:buFontTx/>
+              <a:buChar char="•"/>
+            </a:pPr>
+            <a:r>
+              <a:rPr lang="en-US" sz="2000" smtClean="0">
+                <a:latin typeface="Calibri Light" pitchFamily="34" charset="0"/>
+              </a:rPr>
+              <a:t>Roll Out Framework to Development </a:t>
+            </a:r>
+          </a:p>
+          <a:p>
+            <a:pPr marL="919163" lvl="1" indent="-342900" eaLnBrk="1" hangingPunct="1">
+              <a:buFontTx/>
+              <a:buNone/>
+            </a:pPr>
+            <a:r>
+              <a:rPr lang="en-US" sz="2000" smtClean="0">
+                <a:latin typeface="Calibri Light" pitchFamily="34" charset="0"/>
+              </a:rPr>
+              <a:t>Refactor Object layer commonality.  </a:t>
+            </a:r>
+          </a:p>
+          <a:p>
+            <a:pPr marL="919163" lvl="1" indent="-342900" eaLnBrk="1" hangingPunct="1">
+              <a:buFontTx/>
+              <a:buNone/>
+            </a:pPr>
+            <a:r>
+              <a:rPr lang="en-US" sz="2000" smtClean="0">
+                <a:latin typeface="Calibri Light" pitchFamily="34" charset="0"/>
+              </a:rPr>
+              <a:t>Move commonality to the Base Layer. </a:t>
+            </a:r>
+          </a:p>
+          <a:p>
+            <a:pPr marL="1143000" lvl="2" indent="-228600" eaLnBrk="1" hangingPunct="1">
+              <a:buFontTx/>
+              <a:buChar char="•"/>
+            </a:pPr>
+            <a:r>
+              <a:rPr lang="en-US" sz="1600" smtClean="0">
+                <a:latin typeface="Calibri Light" pitchFamily="34" charset="0"/>
+              </a:rPr>
+              <a:t>The smaller the object layer, the easier to add new capability ( new applications )</a:t>
+            </a:r>
+            <a:endParaRPr lang="en-US" sz="1800" smtClean="0">
+              <a:latin typeface="Calibri Light" pitchFamily="34" charset="0"/>
+            </a:endParaRPr>
+          </a:p>
+          <a:p>
+            <a:pPr marL="919163" lvl="1" indent="-342900" eaLnBrk="1" hangingPunct="1">
+              <a:buFontTx/>
+              <a:buNone/>
+            </a:pPr>
+            <a:r>
+              <a:rPr lang="en-US" sz="2000" smtClean="0">
+                <a:latin typeface="Calibri Light" pitchFamily="34" charset="0"/>
+              </a:rPr>
+              <a:t>Improve top of Object layer making more uniform</a:t>
+            </a:r>
+          </a:p>
+          <a:p>
+            <a:pPr marL="1143000" lvl="2" indent="-228600" eaLnBrk="1" hangingPunct="1">
+              <a:buFontTx/>
+              <a:buChar char="•"/>
+            </a:pPr>
+            <a:r>
+              <a:rPr lang="en-US" sz="1600" smtClean="0">
+                <a:latin typeface="Calibri Light" pitchFamily="34" charset="0"/>
+              </a:rPr>
+              <a:t>The smoother the top of the object layer, the easier to write test cases</a:t>
+            </a:r>
+          </a:p>
+          <a:p>
+            <a:pPr marL="919163" lvl="1" indent="-342900" eaLnBrk="1" hangingPunct="1"/>
+            <a:endParaRPr lang="en-US" sz="1800" smtClean="0">
+              <a:latin typeface="Calibri Light" pitchFamily="34" charset="0"/>
+            </a:endParaRPr>
+          </a:p>
+          <a:p>
+            <a:pPr marL="919163" lvl="1" indent="-342900" eaLnBrk="1" hangingPunct="1">
+              <a:buFontTx/>
+              <a:buNone/>
+            </a:pPr>
+            <a:r>
+              <a:rPr lang="en-US" sz="1800" smtClean="0">
+                <a:latin typeface="Calibri Light" pitchFamily="34" charset="0"/>
+              </a:rPr>
+              <a:t>Decouple function calls in the upper layer from in the bottom layer and below </a:t>
+            </a:r>
+          </a:p>
+          <a:p>
+            <a:pPr marL="1143000" lvl="2" indent="-228600" eaLnBrk="1" hangingPunct="1">
+              <a:buFontTx/>
+              <a:buChar char="•"/>
+            </a:pPr>
+            <a:r>
+              <a:rPr lang="en-US" sz="1600" smtClean="0">
+                <a:latin typeface="Calibri Light" pitchFamily="34" charset="0"/>
+              </a:rPr>
+              <a:t>Keep calls to Protractor in the mid Layer ( page Objects )</a:t>
+            </a:r>
+          </a:p>
+          <a:p>
+            <a:pPr marL="1143000" lvl="2" indent="-228600" eaLnBrk="1" hangingPunct="1">
+              <a:buFontTx/>
+              <a:buChar char="•"/>
+            </a:pPr>
+            <a:r>
+              <a:rPr lang="en-US" sz="1600" smtClean="0">
+                <a:latin typeface="Calibri Light" pitchFamily="34" charset="0"/>
+              </a:rPr>
+              <a:t>Work in localized well isolated areas.  Keep the churn away from the dev engineers</a:t>
+            </a:r>
+          </a:p>
+          <a:p>
+            <a:pPr marL="342900" indent="-342900" eaLnBrk="1" hangingPunct="1"/>
+            <a:r>
+              <a:rPr lang="en-US" sz="800" smtClean="0">
+                <a:latin typeface="Calibri Light" pitchFamily="34" charset="0"/>
+              </a:rPr>
+              <a:t>  </a:t>
+            </a:r>
+          </a:p>
+          <a:p>
+            <a:pPr marL="342900" indent="-342900" eaLnBrk="1" hangingPunct="1">
+              <a:buFontTx/>
+              <a:buChar char="•"/>
+            </a:pPr>
+            <a:r>
+              <a:rPr lang="en-US" sz="2000" smtClean="0">
+                <a:latin typeface="Calibri Light" pitchFamily="34" charset="0"/>
+              </a:rPr>
+              <a:t>Ability to spin up new application</a:t>
+            </a:r>
+          </a:p>
+          <a:p>
+            <a:pPr marL="919163" lvl="1" indent="-342900" eaLnBrk="1" hangingPunct="1">
+              <a:buFont typeface="Arial" charset="0"/>
+              <a:buBlip>
+                <a:blip r:embed="rId2"/>
+              </a:buBlip>
+            </a:pPr>
+            <a:r>
+              <a:rPr lang="en-US" sz="1600" smtClean="0">
+                <a:latin typeface="Calibri Light" pitchFamily="34" charset="0"/>
+              </a:rPr>
+              <a:t>Adding support for new applications can be accomplished in ~10 working Days</a:t>
+            </a:r>
+          </a:p>
+          <a:p>
+            <a:pPr marL="342900" indent="-342900" eaLnBrk="1" hangingPunct="1"/>
+            <a:r>
+              <a:rPr lang="en-US" sz="800" smtClean="0">
+                <a:latin typeface="Calibri Light" pitchFamily="34" charset="0"/>
+              </a:rPr>
+              <a:t>          </a:t>
+            </a:r>
+          </a:p>
+          <a:p>
+            <a:pPr marL="342900" indent="-342900" eaLnBrk="1" hangingPunct="1">
+              <a:buFontTx/>
+              <a:buChar char="•"/>
+            </a:pPr>
+            <a:r>
+              <a:rPr lang="en-US" sz="2000" smtClean="0">
+                <a:latin typeface="Calibri Light" pitchFamily="34" charset="0"/>
+              </a:rPr>
+              <a:t>Improved Reporting,  add a dashboard, provide stasistics</a:t>
+            </a:r>
+          </a:p>
+          <a:p>
+            <a:pPr marL="342900" indent="-342900" eaLnBrk="1" hangingPunct="1"/>
+            <a:r>
+              <a:rPr lang="en-US" sz="800" smtClean="0">
+                <a:latin typeface="Calibri Light" pitchFamily="34" charset="0"/>
+              </a:rPr>
+              <a:t>          </a:t>
+            </a:r>
+          </a:p>
+          <a:p>
+            <a:pPr marL="342900" indent="-342900" eaLnBrk="1" hangingPunct="1">
+              <a:buFontTx/>
+              <a:buChar char="•"/>
+            </a:pPr>
+            <a:r>
+              <a:rPr lang="en-US" sz="2000" smtClean="0">
+                <a:latin typeface="Calibri Light" pitchFamily="34" charset="0"/>
+              </a:rPr>
+              <a:t>Test Headless  : Trying to overcome CPU and Memory consumption</a:t>
+            </a:r>
+          </a:p>
+          <a:p>
+            <a:pPr marL="342900" indent="-342900" eaLnBrk="1" hangingPunct="1"/>
+            <a:r>
+              <a:rPr lang="en-US" sz="800" smtClean="0">
+                <a:latin typeface="Calibri Light" pitchFamily="34" charset="0"/>
+              </a:rPr>
+              <a:t>    </a:t>
+            </a:r>
+          </a:p>
+          <a:p>
+            <a:pPr marL="342900" indent="-342900" eaLnBrk="1" hangingPunct="1">
+              <a:buFontTx/>
+              <a:buChar char="•"/>
+            </a:pPr>
+            <a:r>
+              <a:rPr lang="en-US" sz="2000" smtClean="0">
+                <a:latin typeface="Calibri Light" pitchFamily="34" charset="0"/>
+              </a:rPr>
+              <a:t>Mobile devices</a:t>
+            </a:r>
+          </a:p>
+          <a:p>
+            <a:pPr marL="342900" indent="-342900" eaLnBrk="1" hangingPunct="1"/>
+            <a:endParaRPr lang="en-US" sz="2000" smtClean="0">
+              <a:latin typeface="Calibri Light" pitchFamily="34" charset="0"/>
+            </a:endParaRPr>
+          </a:p>
+        </p:txBody>
+      </p:sp>
+    </p:spTree>
+  </p:cSld>
+  <p:clrMapOvr>
+    <a:masterClrMapping/>
+  </p:clrMapOvr>
+  <p:timing>
+    <p:tnLst>
+      <p:par>
+        <p:cTn id="1" dur="indefinite" restart="never" nodeType="tmRoot"/>
+      </p:par>
+    </p:tnLst>
+  </p:timing>
+</p:sld>
+</file>
+
+<file path=ppt/slides/slide16.xml><?xml version="1.0" encoding="utf-8"?>
+<p:sld xmlns:a="http://schemas.openxmlformats.org/drawingml/2006/main" xmlns:r="http://schemas.openxmlformats.org/officeDocument/2006/relationships" xmlns:p="http://schemas.openxmlformats.org/presentationml/2006/main">
+  <p:cSld>
+    <p:spTree>
+      <p:nvGrpSpPr>
+        <p:cNvPr id="1" name=""/>
+        <p:cNvGrpSpPr/>
+        <p:nvPr/>
+      </p:nvGrpSpPr>
+      <p:grpSpPr>
+        <a:xfrm>
+          <a:off x="0" y="0"/>
+          <a:ext cx="0" cy="0"/>
+          <a:chOff x="0" y="0"/>
+          <a:chExt cx="0" cy="0"/>
+        </a:xfrm>
+      </p:grpSpPr>
+      <p:sp>
+        <p:nvSpPr>
+          <p:cNvPr id="24577" name="Title 1"/>
+          <p:cNvSpPr>
+            <a:spLocks noGrp="1"/>
+          </p:cNvSpPr>
+          <p:nvPr>
+            <p:ph type="title"/>
+          </p:nvPr>
+        </p:nvSpPr>
+        <p:spPr>
+          <a:xfrm>
             <a:off x="1009650" y="128588"/>
             <a:ext cx="5765800" cy="650875"/>
           </a:xfrm>
@@ -4425,7 +4691,7 @@
       </p:sp>
       <p:sp>
         <p:nvSpPr>
-          <p:cNvPr id="23558" name="TextBox 3"/>
+          <p:cNvPr id="24582" name="TextBox 3"/>
           <p:cNvSpPr txBox="1">
             <a:spLocks noChangeArrowheads="1"/>
           </p:cNvSpPr>
@@ -4462,7 +4728,7 @@
       </p:sp>
       <p:sp>
         <p:nvSpPr>
-          <p:cNvPr id="23559" name="TextBox 10"/>
+          <p:cNvPr id="24583" name="TextBox 10"/>
           <p:cNvSpPr txBox="1">
             <a:spLocks noChangeArrowheads="1"/>
           </p:cNvSpPr>
@@ -4505,7 +4771,7 @@
       </p:sp>
       <p:pic>
         <p:nvPicPr>
-          <p:cNvPr id="23560" name="Picture 3"/>
+          <p:cNvPr id="24584" name="Picture 3"/>
           <p:cNvPicPr>
             <a:picLocks noChangeAspect="1"/>
           </p:cNvPicPr>
@@ -4577,7 +4843,7 @@
       </p:sp>
       <p:sp>
         <p:nvSpPr>
-          <p:cNvPr id="23562" name="TextBox 10"/>
+          <p:cNvPr id="24586" name="TextBox 10"/>
           <p:cNvSpPr txBox="1">
             <a:spLocks noChangeArrowheads="1"/>
           </p:cNvSpPr>
@@ -4585,8 +4851,8 @@
         </p:nvSpPr>
         <p:spPr bwMode="auto">
           <a:xfrm>
-            <a:off x="2361235" y="6003400"/>
-            <a:ext cx="2366340" cy="769441"/>
+            <a:off x="2360613" y="6003925"/>
+            <a:ext cx="2366962" cy="768350"/>
           </a:xfrm>
           <a:prstGeom prst="rect">
             <a:avLst/>
@@ -4600,40 +4866,15 @@
           </a:ln>
         </p:spPr>
         <p:txBody>
-          <a:bodyPr wrap="square">
+          <a:bodyPr>
             <a:spAutoFit/>
           </a:bodyPr>
           <a:lstStyle/>
           <a:p>
             <a:r>
-              <a:rPr lang="en-US" sz="1100" dirty="0" smtClean="0"/>
-              <a:t>Dev engineers to develop API validation test scripting.  Next Gen Test </a:t>
-            </a:r>
-            <a:r>
-              <a:rPr lang="en-US" sz="1100" dirty="0"/>
-              <a:t>Auto </a:t>
-            </a:r>
-            <a:r>
-              <a:rPr lang="en-US" sz="1100" dirty="0" smtClean="0"/>
-              <a:t>team to fill </a:t>
-            </a:r>
-            <a:r>
-              <a:rPr lang="en-US" sz="1100" dirty="0"/>
-              <a:t>out </a:t>
-            </a:r>
-            <a:r>
-              <a:rPr lang="en-US" sz="1100" dirty="0" smtClean="0"/>
-              <a:t>remaining REST </a:t>
-            </a:r>
-            <a:r>
-              <a:rPr lang="en-US" sz="1100" dirty="0"/>
-              <a:t>API </a:t>
-            </a:r>
-            <a:r>
-              <a:rPr lang="en-US" sz="1100" dirty="0" smtClean="0"/>
-              <a:t>regression tests</a:t>
-            </a:r>
-            <a:endParaRPr lang="en-US" sz="1100" dirty="0"/>
+              <a:rPr lang="en-US" sz="1100"/>
+              <a:t>Dev engineers to develop API validation test scripting.  Next Gen Test Auto team to fill out remaining REST API regression tests</a:t>
+            </a:r>
           </a:p>
         </p:txBody>
       </p:sp>
@@ -4652,7 +4893,7 @@
 </p:sld>
 </file>
 
-<file path=ppt/slides/slide16.xml><?xml version="1.0" encoding="utf-8"?>
+<file path=ppt/slides/slide17.xml><?xml version="1.0" encoding="utf-8"?>
 <p:sld xmlns:a="http://schemas.openxmlformats.org/drawingml/2006/main" xmlns:r="http://schemas.openxmlformats.org/officeDocument/2006/relationships" xmlns:p="http://schemas.openxmlformats.org/presentationml/2006/main">
   <p:cSld>
     <p:spTree>
@@ -4671,7 +4912,7 @@
       </p:grpSpPr>
       <p:sp>
         <p:nvSpPr>
-          <p:cNvPr id="24577" name="Title 1"/>
+          <p:cNvPr id="25601" name="Title 1"/>
           <p:cNvSpPr>
             <a:spLocks noGrp="1"/>
           </p:cNvSpPr>
@@ -4701,7 +4942,7 @@
       </p:sp>
       <p:sp>
         <p:nvSpPr>
-          <p:cNvPr id="24578" name="Content Placeholder 2"/>
+          <p:cNvPr id="25602" name="Content Placeholder 2"/>
           <p:cNvSpPr>
             <a:spLocks noGrp="1"/>
           </p:cNvSpPr>
@@ -4727,7 +4968,7 @@
               <a:buChar char="•"/>
             </a:pPr>
             <a:r>
-              <a:rPr lang="en-US" sz="2000" b="1" dirty="0" smtClean="0">
+              <a:rPr lang="en-US" sz="2000" b="1" smtClean="0">
                 <a:latin typeface="Calibri Light" pitchFamily="34" charset="0"/>
               </a:rPr>
               <a:t>Shopping &amp; Buying Development Engineers</a:t>
@@ -4741,11 +4982,13 @@
               <a:spcBef>
                 <a:spcPct val="0"/>
               </a:spcBef>
-              <a:buFont typeface="Arial" panose="020B0604020202020204" pitchFamily="34" charset="0"/>
-              <a:buChar char="•"/>
-            </a:pPr>
-            <a:r>
-              <a:rPr lang="en-US" sz="1400" dirty="0" smtClean="0">
+              <a:buFont typeface="Arial" charset="0"/>
+              <a:buBlip>
+                <a:blip r:embed="rId2"/>
+              </a:buBlip>
+            </a:pPr>
+            <a:r>
+              <a:rPr lang="en-US" sz="1400" smtClean="0">
                 <a:latin typeface="Calibri Light" pitchFamily="34" charset="0"/>
               </a:rPr>
               <a:t>Responsible for all new  Page Level Functional Integration Tests</a:t>
@@ -4759,28 +5002,18 @@
               <a:spcBef>
                 <a:spcPct val="0"/>
               </a:spcBef>
-              <a:buFont typeface="Arial" panose="020B0604020202020204" pitchFamily="34" charset="0"/>
-              <a:buChar char="•"/>
-            </a:pPr>
-            <a:r>
-              <a:rPr lang="en-US" sz="1400" dirty="0" smtClean="0">
-                <a:latin typeface="Calibri Light" pitchFamily="34" charset="0"/>
-              </a:rPr>
-              <a:t>Responsible for correcting all test failures in  ../</a:t>
-            </a:r>
-            <a:r>
-              <a:rPr lang="en-US" sz="1400" dirty="0" err="1" smtClean="0">
-                <a:latin typeface="Calibri Light" pitchFamily="34" charset="0"/>
-              </a:rPr>
-              <a:t>fitmp</a:t>
-            </a:r>
-            <a:r>
-              <a:rPr lang="en-US" sz="1400" dirty="0" smtClean="0">
-                <a:latin typeface="Calibri Light" pitchFamily="34" charset="0"/>
-              </a:rPr>
-              <a:t>  directory, keeping it completely operational</a:t>
-            </a:r>
-            <a:endParaRPr lang="en-US" sz="1400" b="1" dirty="0" smtClean="0">
+              <a:buFont typeface="Arial" charset="0"/>
+              <a:buBlip>
+                <a:blip r:embed="rId2"/>
+              </a:buBlip>
+            </a:pPr>
+            <a:r>
+              <a:rPr lang="en-US" sz="1400" smtClean="0">
+                <a:latin typeface="Calibri Light" pitchFamily="34" charset="0"/>
+              </a:rPr>
+              <a:t>Responsible for correcting all test failures in  ../fitmp  directory, keeping it completely operational</a:t>
+            </a:r>
+            <a:endParaRPr lang="en-US" sz="1400" b="1" smtClean="0">
               <a:latin typeface="Calibri Light" pitchFamily="34" charset="0"/>
             </a:endParaRPr>
           </a:p>
@@ -4793,7 +5026,7 @@
               <a:buChar char="•"/>
             </a:pPr>
             <a:r>
-              <a:rPr lang="en-US" sz="2000" b="1" dirty="0" smtClean="0">
+              <a:rPr lang="en-US" sz="2000" b="1" smtClean="0">
                 <a:latin typeface="Calibri Light" pitchFamily="34" charset="0"/>
               </a:rPr>
               <a:t>Provider Directory Development Engineers </a:t>
@@ -4807,11 +5040,13 @@
               <a:spcBef>
                 <a:spcPct val="0"/>
               </a:spcBef>
-              <a:buFont typeface="Arial" panose="020B0604020202020204" pitchFamily="34" charset="0"/>
-              <a:buChar char="•"/>
-            </a:pPr>
-            <a:r>
-              <a:rPr lang="en-US" sz="1400" dirty="0" smtClean="0">
+              <a:buFont typeface="Arial" charset="0"/>
+              <a:buBlip>
+                <a:blip r:embed="rId2"/>
+              </a:buBlip>
+            </a:pPr>
+            <a:r>
+              <a:rPr lang="en-US" sz="1400" smtClean="0">
                 <a:latin typeface="Calibri Light" pitchFamily="34" charset="0"/>
               </a:rPr>
               <a:t>Responsible for all new Template level Functional Integration Tests</a:t>
@@ -4825,26 +5060,16 @@
               <a:spcBef>
                 <a:spcPct val="0"/>
               </a:spcBef>
-              <a:buFont typeface="Arial" panose="020B0604020202020204" pitchFamily="34" charset="0"/>
-              <a:buChar char="•"/>
-            </a:pPr>
-            <a:r>
-              <a:rPr lang="en-US" sz="1400" dirty="0" smtClean="0">
-                <a:latin typeface="Calibri Light" pitchFamily="34" charset="0"/>
-              </a:rPr>
-              <a:t>Responsible for correcting all test failures in the  ../</a:t>
-            </a:r>
-            <a:r>
-              <a:rPr lang="en-US" sz="1400" dirty="0" err="1" smtClean="0">
-                <a:latin typeface="Calibri Light" pitchFamily="34" charset="0"/>
-              </a:rPr>
-              <a:t>fitpd</a:t>
-            </a:r>
-            <a:r>
-              <a:rPr lang="en-US" sz="1400" dirty="0" smtClean="0">
-                <a:latin typeface="Calibri Light" pitchFamily="34" charset="0"/>
-              </a:rPr>
-              <a:t>  directory, keeping all test operational</a:t>
+              <a:buFont typeface="Arial" charset="0"/>
+              <a:buBlip>
+                <a:blip r:embed="rId2"/>
+              </a:buBlip>
+            </a:pPr>
+            <a:r>
+              <a:rPr lang="en-US" sz="1400" smtClean="0">
+                <a:latin typeface="Calibri Light" pitchFamily="34" charset="0"/>
+              </a:rPr>
+              <a:t>Responsible for correcting all test failures in the  ../fitpd  directory, keeping all test operational</a:t>
             </a:r>
           </a:p>
           <a:p>
@@ -4856,7 +5081,7 @@
               <a:buChar char="•"/>
             </a:pPr>
             <a:r>
-              <a:rPr lang="en-US" sz="2000" b="1" dirty="0" smtClean="0">
+              <a:rPr lang="en-US" sz="2000" b="1" smtClean="0">
                 <a:latin typeface="Calibri Light" pitchFamily="34" charset="0"/>
               </a:rPr>
               <a:t> Core Technology API Team engineers</a:t>
@@ -4870,11 +5095,13 @@
               <a:spcBef>
                 <a:spcPct val="0"/>
               </a:spcBef>
-              <a:buFont typeface="Arial" panose="020B0604020202020204" pitchFamily="34" charset="0"/>
-              <a:buChar char="•"/>
-            </a:pPr>
-            <a:r>
-              <a:rPr lang="en-US" sz="1400" dirty="0" smtClean="0">
+              <a:buFont typeface="Arial" charset="0"/>
+              <a:buBlip>
+                <a:blip r:embed="rId2"/>
+              </a:buBlip>
+            </a:pPr>
+            <a:r>
+              <a:rPr lang="en-US" sz="1400" smtClean="0">
                 <a:latin typeface="Calibri Light" pitchFamily="34" charset="0"/>
               </a:rPr>
               <a:t>Responsible for adding new tests to the REST API regression suite </a:t>
@@ -4888,26 +5115,16 @@
               <a:spcBef>
                 <a:spcPct val="0"/>
               </a:spcBef>
-              <a:buFont typeface="Arial" panose="020B0604020202020204" pitchFamily="34" charset="0"/>
-              <a:buChar char="•"/>
-            </a:pPr>
-            <a:r>
-              <a:rPr lang="en-US" sz="1400" dirty="0" smtClean="0">
-                <a:latin typeface="Calibri Light" pitchFamily="34" charset="0"/>
-              </a:rPr>
-              <a:t>Responsible for correcting all test failures in the ../</a:t>
-            </a:r>
-            <a:r>
-              <a:rPr lang="en-US" sz="1400" dirty="0" err="1" smtClean="0">
-                <a:latin typeface="Calibri Light" pitchFamily="34" charset="0"/>
-              </a:rPr>
-              <a:t>fitapi</a:t>
-            </a:r>
-            <a:r>
-              <a:rPr lang="en-US" sz="1400" dirty="0" smtClean="0">
-                <a:latin typeface="Calibri Light" pitchFamily="34" charset="0"/>
-              </a:rPr>
-              <a:t> directory, keeping all test operational</a:t>
+              <a:buFont typeface="Arial" charset="0"/>
+              <a:buBlip>
+                <a:blip r:embed="rId2"/>
+              </a:buBlip>
+            </a:pPr>
+            <a:r>
+              <a:rPr lang="en-US" sz="1400" smtClean="0">
+                <a:latin typeface="Calibri Light" pitchFamily="34" charset="0"/>
+              </a:rPr>
+              <a:t>Responsible for correcting all test failures in the ../fitapi directory, keeping all test operational</a:t>
             </a:r>
           </a:p>
           <a:p>
@@ -4919,7 +5136,7 @@
               <a:buChar char="•"/>
             </a:pPr>
             <a:r>
-              <a:rPr lang="en-US" sz="500" b="1" dirty="0" smtClean="0">
+              <a:rPr lang="en-US" sz="500" b="1" smtClean="0">
                 <a:latin typeface="Calibri Light" pitchFamily="34" charset="0"/>
               </a:rPr>
               <a:t>             </a:t>
@@ -4934,7 +5151,7 @@
               <a:buChar char="•"/>
             </a:pPr>
             <a:r>
-              <a:rPr lang="en-US" sz="2000" b="1" dirty="0" smtClean="0">
+              <a:rPr lang="en-US" sz="2000" b="1" smtClean="0">
                 <a:latin typeface="Calibri Light" pitchFamily="34" charset="0"/>
               </a:rPr>
               <a:t>NGTA Team engineers</a:t>
@@ -4952,7 +5169,7 @@
               <a:buChar char="•"/>
             </a:pPr>
             <a:r>
-              <a:rPr lang="en-US" sz="1400" dirty="0" smtClean="0">
+              <a:rPr lang="en-US" sz="1400" smtClean="0">
                 <a:latin typeface="Calibri Light" pitchFamily="34" charset="0"/>
               </a:rPr>
               <a:t>Oversee and manage all Framework development. </a:t>
@@ -4970,7 +5187,7 @@
               <a:buChar char="•"/>
             </a:pPr>
             <a:r>
-              <a:rPr lang="en-US" sz="1400" dirty="0" smtClean="0">
+              <a:rPr lang="en-US" sz="1400" smtClean="0">
                 <a:latin typeface="Calibri Light" pitchFamily="34" charset="0"/>
               </a:rPr>
               <a:t>Continual frame work improvement, evaluating all need for new coverage</a:t>
@@ -4988,7 +5205,7 @@
               <a:buChar char="•"/>
             </a:pPr>
             <a:r>
-              <a:rPr lang="en-US" sz="1400" dirty="0" smtClean="0">
+              <a:rPr lang="en-US" sz="1400" smtClean="0">
                 <a:latin typeface="Calibri Light" pitchFamily="34" charset="0"/>
               </a:rPr>
               <a:t>Continually analyze mid layer code</a:t>
@@ -5006,7 +5223,7 @@
               <a:buChar char="•"/>
             </a:pPr>
             <a:r>
-              <a:rPr lang="en-US" sz="1400" dirty="0" smtClean="0">
+              <a:rPr lang="en-US" sz="1400" smtClean="0">
                 <a:latin typeface="Calibri Light" pitchFamily="34" charset="0"/>
               </a:rPr>
               <a:t>Refactor content from mid layer to the lower common layer</a:t>
@@ -5024,7 +5241,7 @@
               <a:buChar char="•"/>
             </a:pPr>
             <a:r>
-              <a:rPr lang="en-US" sz="1400" dirty="0" smtClean="0">
+              <a:rPr lang="en-US" sz="1400" smtClean="0">
                 <a:latin typeface="Calibri Light" pitchFamily="34" charset="0"/>
               </a:rPr>
               <a:t>Develop all End to End test automation scripts based on business use cases</a:t>
@@ -5034,7 +5251,7 @@
       </p:sp>
       <p:sp>
         <p:nvSpPr>
-          <p:cNvPr id="24579" name="Title 1"/>
+          <p:cNvPr id="25603" name="Title 1"/>
           <p:cNvSpPr txBox="1">
             <a:spLocks/>
           </p:cNvSpPr>
@@ -5088,7 +5305,7 @@
 </p:sld>
 </file>
 
-<file path=ppt/slides/slide17.xml><?xml version="1.0" encoding="utf-8"?>
+<file path=ppt/slides/slide18.xml><?xml version="1.0" encoding="utf-8"?>
 <p:sld xmlns:a="http://schemas.openxmlformats.org/drawingml/2006/main" xmlns:r="http://schemas.openxmlformats.org/officeDocument/2006/relationships" xmlns:p="http://schemas.openxmlformats.org/presentationml/2006/main">
   <p:cSld>
     <p:spTree>
@@ -5402,7 +5619,7 @@
       </p:sp>
       <p:sp>
         <p:nvSpPr>
-          <p:cNvPr id="25603" name="Title 1"/>
+          <p:cNvPr id="26627" name="Title 1"/>
           <p:cNvSpPr txBox="1">
             <a:spLocks/>
           </p:cNvSpPr>
@@ -5443,7 +5660,7 @@
       </p:sp>
       <p:pic>
         <p:nvPicPr>
-          <p:cNvPr id="25604" name="Picture 2"/>
+          <p:cNvPr id="26628" name="Picture 2"/>
           <p:cNvPicPr>
             <a:picLocks noChangeAspect="1"/>
           </p:cNvPicPr>
@@ -5488,7 +5705,7 @@
 </p:sld>
 </file>
 
-<file path=ppt/slides/slide18.xml><?xml version="1.0" encoding="utf-8"?>
+<file path=ppt/slides/slide19.xml><?xml version="1.0" encoding="utf-8"?>
 <p:sld xmlns:a="http://schemas.openxmlformats.org/drawingml/2006/main" xmlns:r="http://schemas.openxmlformats.org/officeDocument/2006/relationships" xmlns:p="http://schemas.openxmlformats.org/presentationml/2006/main">
   <p:cSld>
     <p:spTree>
@@ -5615,7 +5832,7 @@
       </p:sp>
       <p:pic>
         <p:nvPicPr>
-          <p:cNvPr id="26627" name="Content Placeholder 5"/>
+          <p:cNvPr id="27651" name="Content Placeholder 5"/>
           <p:cNvPicPr>
             <a:picLocks noGrp="1" noChangeAspect="1"/>
           </p:cNvPicPr>
@@ -5652,7 +5869,7 @@
 </p:sld>
 </file>
 
-<file path=ppt/slides/slide19.xml><?xml version="1.0" encoding="utf-8"?>
+<file path=ppt/slides/slide2.xml><?xml version="1.0" encoding="utf-8"?>
 <p:sld xmlns:a="http://schemas.openxmlformats.org/drawingml/2006/main" xmlns:r="http://schemas.openxmlformats.org/officeDocument/2006/relationships" xmlns:p="http://schemas.openxmlformats.org/presentationml/2006/main">
   <p:cSld>
     <p:spTree>
@@ -5671,7 +5888,382 @@
       </p:grpSpPr>
       <p:sp>
         <p:nvSpPr>
-          <p:cNvPr id="27649" name="Content Placeholder 2"/>
+          <p:cNvPr id="6" name="Title 1"/>
+          <p:cNvSpPr>
+            <a:spLocks noGrp="1"/>
+          </p:cNvSpPr>
+          <p:nvPr>
+            <p:ph type="title"/>
+          </p:nvPr>
+        </p:nvSpPr>
+        <p:spPr>
+          <a:xfrm>
+            <a:off x="0" y="114300"/>
+            <a:ext cx="8769350" cy="1333500"/>
+          </a:xfrm>
+        </p:spPr>
+        <p:txBody>
+          <a:bodyPr rtlCol="0" anchor="t">
+            <a:normAutofit fontScale="90000"/>
+          </a:bodyPr>
+          <a:lstStyle/>
+          <a:p>
+            <a:pPr algn="ctr" eaLnBrk="1" fontAlgn="auto" hangingPunct="1">
+              <a:spcAft>
+                <a:spcPts val="0"/>
+              </a:spcAft>
+              <a:defRPr/>
+            </a:pPr>
+            <a:r>
+              <a:rPr lang="en-US" dirty="0" smtClean="0">
+                <a:ea typeface="+mj-ea"/>
+              </a:rPr>
+              <a:t>INTRODUCTION</a:t>
+            </a:r>
+            <a:br>
+              <a:rPr lang="en-US" dirty="0" smtClean="0">
+                <a:ea typeface="+mj-ea"/>
+              </a:rPr>
+            </a:br>
+            <a:r>
+              <a:rPr lang="en-US" dirty="0" smtClean="0">
+                <a:ea typeface="+mj-ea"/>
+              </a:rPr>
+              <a:t>     NGTA  - </a:t>
+            </a:r>
+            <a:r>
+              <a:rPr lang="en-US" sz="3000" b="1" dirty="0" smtClean="0">
+                <a:ea typeface="+mj-ea"/>
+              </a:rPr>
+              <a:t>Next Generation platform Test </a:t>
+            </a:r>
+            <a:r>
+              <a:rPr lang="en-US" sz="3000" b="1" dirty="0">
+                <a:ea typeface="+mj-ea"/>
+              </a:rPr>
+              <a:t>Automation</a:t>
+            </a:r>
+          </a:p>
+        </p:txBody>
+      </p:sp>
+      <p:sp>
+        <p:nvSpPr>
+          <p:cNvPr id="7" name="Content Placeholder 2"/>
+          <p:cNvSpPr>
+            <a:spLocks noGrp="1"/>
+          </p:cNvSpPr>
+          <p:nvPr>
+            <p:ph idx="1"/>
+          </p:nvPr>
+        </p:nvSpPr>
+        <p:spPr>
+          <a:xfrm>
+            <a:off x="277813" y="1512888"/>
+            <a:ext cx="8866187" cy="3997325"/>
+          </a:xfrm>
+        </p:spPr>
+        <p:txBody>
+          <a:bodyPr rtlCol="0">
+            <a:normAutofit/>
+          </a:bodyPr>
+          <a:lstStyle/>
+          <a:p>
+            <a:pPr marL="342900" indent="-342900" eaLnBrk="1" fontAlgn="auto" hangingPunct="1">
+              <a:lnSpc>
+                <a:spcPct val="90000"/>
+              </a:lnSpc>
+              <a:spcBef>
+                <a:spcPts val="0"/>
+              </a:spcBef>
+              <a:spcAft>
+                <a:spcPts val="0"/>
+              </a:spcAft>
+              <a:buFont typeface="Arial" panose="020B0604020202020204" pitchFamily="34" charset="0"/>
+              <a:buChar char="•"/>
+              <a:defRPr/>
+            </a:pPr>
+            <a:r>
+              <a:rPr lang="en-US" sz="2000" b="1" dirty="0" smtClean="0">
+                <a:ea typeface="+mn-ea"/>
+              </a:rPr>
+              <a:t>The Test Automation frame work leverages available open source technology</a:t>
+            </a:r>
+          </a:p>
+          <a:p>
+            <a:pPr marL="747713" lvl="1" indent="-171450" eaLnBrk="1" fontAlgn="auto" hangingPunct="1">
+              <a:lnSpc>
+                <a:spcPct val="90000"/>
+              </a:lnSpc>
+              <a:spcBef>
+                <a:spcPts val="0"/>
+              </a:spcBef>
+              <a:spcAft>
+                <a:spcPts val="0"/>
+              </a:spcAft>
+              <a:buFont typeface="Arial" panose="020B0604020202020204" pitchFamily="34" charset="0"/>
+              <a:buChar char="•"/>
+              <a:defRPr/>
+            </a:pPr>
+            <a:r>
+              <a:rPr lang="en-US" sz="1600" b="1" dirty="0" smtClean="0">
+                <a:ea typeface="+mn-ea"/>
+              </a:rPr>
+              <a:t>Node,   Protractor,   JavaScript</a:t>
+            </a:r>
+            <a:r>
+              <a:rPr lang="en-US" sz="1600" b="1" dirty="0">
+                <a:ea typeface="+mn-ea"/>
+              </a:rPr>
+              <a:t> </a:t>
+            </a:r>
+            <a:endParaRPr lang="en-US" sz="2000" b="1" dirty="0">
+              <a:ea typeface="+mn-ea"/>
+            </a:endParaRPr>
+          </a:p>
+          <a:p>
+            <a:pPr lvl="1" indent="0" eaLnBrk="1" fontAlgn="auto" hangingPunct="1">
+              <a:lnSpc>
+                <a:spcPct val="90000"/>
+              </a:lnSpc>
+              <a:spcBef>
+                <a:spcPts val="0"/>
+              </a:spcBef>
+              <a:spcAft>
+                <a:spcPts val="0"/>
+              </a:spcAft>
+              <a:buFontTx/>
+              <a:buNone/>
+              <a:defRPr/>
+            </a:pPr>
+            <a:endParaRPr lang="en-US" sz="1200" dirty="0">
+              <a:ea typeface="+mn-ea"/>
+            </a:endParaRPr>
+          </a:p>
+          <a:p>
+            <a:pPr marL="342900" indent="-342900" eaLnBrk="1" fontAlgn="auto" hangingPunct="1">
+              <a:lnSpc>
+                <a:spcPct val="90000"/>
+              </a:lnSpc>
+              <a:spcBef>
+                <a:spcPts val="0"/>
+              </a:spcBef>
+              <a:spcAft>
+                <a:spcPts val="0"/>
+              </a:spcAft>
+              <a:buFont typeface="Arial" panose="020B0604020202020204" pitchFamily="34" charset="0"/>
+              <a:buChar char="•"/>
+              <a:defRPr/>
+            </a:pPr>
+            <a:r>
+              <a:rPr lang="en-US" sz="2000" b="1" dirty="0" smtClean="0">
+                <a:ea typeface="+mn-ea"/>
+              </a:rPr>
+              <a:t>NGTA validates product quality, usability and performance of CX Web Applications</a:t>
+            </a:r>
+          </a:p>
+          <a:p>
+            <a:pPr lvl="1" indent="0" eaLnBrk="1" fontAlgn="auto" hangingPunct="1">
+              <a:lnSpc>
+                <a:spcPct val="90000"/>
+              </a:lnSpc>
+              <a:spcBef>
+                <a:spcPts val="0"/>
+              </a:spcBef>
+              <a:spcAft>
+                <a:spcPts val="0"/>
+              </a:spcAft>
+              <a:buFontTx/>
+              <a:buNone/>
+              <a:defRPr/>
+            </a:pPr>
+            <a:r>
+              <a:rPr lang="en-US" sz="800" dirty="0" smtClean="0">
+                <a:solidFill>
+                  <a:srgbClr val="FF0000"/>
+                </a:solidFill>
+                <a:ea typeface="+mn-ea"/>
+              </a:rPr>
+              <a:t>	</a:t>
+            </a:r>
+            <a:endParaRPr lang="en-US" sz="1000" dirty="0" smtClean="0">
+              <a:solidFill>
+                <a:srgbClr val="FF0000"/>
+              </a:solidFill>
+              <a:ea typeface="+mn-ea"/>
+            </a:endParaRPr>
+          </a:p>
+          <a:p>
+            <a:pPr lvl="1" indent="0" eaLnBrk="1" fontAlgn="auto" hangingPunct="1">
+              <a:lnSpc>
+                <a:spcPct val="90000"/>
+              </a:lnSpc>
+              <a:spcBef>
+                <a:spcPts val="0"/>
+              </a:spcBef>
+              <a:spcAft>
+                <a:spcPts val="0"/>
+              </a:spcAft>
+              <a:buFontTx/>
+              <a:buNone/>
+              <a:defRPr/>
+            </a:pPr>
+            <a:endParaRPr lang="en-US" sz="1000" dirty="0" smtClean="0">
+              <a:ea typeface="+mn-ea"/>
+            </a:endParaRPr>
+          </a:p>
+          <a:p>
+            <a:pPr lvl="1" indent="0" eaLnBrk="1" fontAlgn="auto" hangingPunct="1">
+              <a:lnSpc>
+                <a:spcPct val="90000"/>
+              </a:lnSpc>
+              <a:spcBef>
+                <a:spcPts val="0"/>
+              </a:spcBef>
+              <a:spcAft>
+                <a:spcPts val="0"/>
+              </a:spcAft>
+              <a:buFontTx/>
+              <a:buNone/>
+              <a:defRPr/>
+            </a:pPr>
+            <a:endParaRPr lang="en-US" sz="1000" dirty="0" smtClean="0">
+              <a:ea typeface="+mn-ea"/>
+            </a:endParaRPr>
+          </a:p>
+          <a:p>
+            <a:pPr marL="342900" indent="-342900" eaLnBrk="1" fontAlgn="auto" hangingPunct="1">
+              <a:lnSpc>
+                <a:spcPct val="90000"/>
+              </a:lnSpc>
+              <a:spcBef>
+                <a:spcPts val="0"/>
+              </a:spcBef>
+              <a:spcAft>
+                <a:spcPts val="0"/>
+              </a:spcAft>
+              <a:buFont typeface="Arial" panose="020B0604020202020204" pitchFamily="34" charset="0"/>
+              <a:buChar char="•"/>
+              <a:defRPr/>
+            </a:pPr>
+            <a:r>
+              <a:rPr lang="en-US" sz="2000" b="1" dirty="0"/>
+              <a:t>NGTA </a:t>
+            </a:r>
+            <a:r>
+              <a:rPr lang="en-US" sz="2000" b="1" dirty="0" smtClean="0">
+                <a:ea typeface="+mn-ea"/>
+              </a:rPr>
+              <a:t>validates core functional APIs( micro service API )</a:t>
+            </a:r>
+          </a:p>
+          <a:p>
+            <a:pPr marL="919163" lvl="1" indent="-342900" eaLnBrk="1" fontAlgn="auto" hangingPunct="1">
+              <a:lnSpc>
+                <a:spcPct val="90000"/>
+              </a:lnSpc>
+              <a:spcBef>
+                <a:spcPts val="0"/>
+              </a:spcBef>
+              <a:spcAft>
+                <a:spcPts val="0"/>
+              </a:spcAft>
+              <a:buFont typeface="Arial" panose="020B0604020202020204" pitchFamily="34" charset="0"/>
+              <a:buChar char="•"/>
+              <a:defRPr/>
+            </a:pPr>
+            <a:r>
+              <a:rPr lang="en-US" sz="1600" b="1" dirty="0" smtClean="0">
+                <a:ea typeface="+mn-ea"/>
+              </a:rPr>
+              <a:t>Node.js, Frisby</a:t>
+            </a:r>
+            <a:r>
+              <a:rPr lang="en-US" sz="1600" b="1" dirty="0">
+                <a:ea typeface="+mn-ea"/>
+              </a:rPr>
+              <a:t> </a:t>
+            </a:r>
+            <a:endParaRPr lang="en-US" sz="1400" b="1" dirty="0" smtClean="0">
+              <a:ea typeface="+mn-ea"/>
+            </a:endParaRPr>
+          </a:p>
+          <a:p>
+            <a:pPr marL="342900" indent="-342900" eaLnBrk="1" fontAlgn="auto" hangingPunct="1">
+              <a:lnSpc>
+                <a:spcPct val="150000"/>
+              </a:lnSpc>
+              <a:spcAft>
+                <a:spcPts val="1000"/>
+              </a:spcAft>
+              <a:buFont typeface="Arial" panose="020B0604020202020204" pitchFamily="34" charset="0"/>
+              <a:buChar char="•"/>
+              <a:defRPr/>
+            </a:pPr>
+            <a:r>
+              <a:rPr lang="en-US" sz="2000" b="1" dirty="0" smtClean="0">
+                <a:ea typeface="+mn-ea"/>
+              </a:rPr>
+              <a:t>The following provides an explanation of </a:t>
+            </a:r>
+            <a:r>
+              <a:rPr lang="en-US" sz="2000" b="1" dirty="0" smtClean="0"/>
+              <a:t>NGTA </a:t>
+            </a:r>
+            <a:r>
+              <a:rPr lang="en-US" sz="2000" b="1" dirty="0" smtClean="0">
+                <a:ea typeface="+mn-ea"/>
+              </a:rPr>
+              <a:t>, our purpose, technologies, philosophies, process, and our evolutionary plans for 2018 being developed by         2 local staff and 3 off shore staff.</a:t>
+            </a:r>
+          </a:p>
+          <a:p>
+            <a:pPr eaLnBrk="1" fontAlgn="auto" hangingPunct="1">
+              <a:spcAft>
+                <a:spcPts val="0"/>
+              </a:spcAft>
+              <a:defRPr/>
+            </a:pPr>
+            <a:endParaRPr lang="en-US" dirty="0">
+              <a:ea typeface="+mn-ea"/>
+            </a:endParaRPr>
+          </a:p>
+        </p:txBody>
+      </p:sp>
+    </p:spTree>
+  </p:cSld>
+  <p:clrMapOvr>
+    <a:masterClrMapping/>
+  </p:clrMapOvr>
+  <p:timing>
+    <p:tnLst>
+      <p:par>
+        <p:cTn id="1" dur="indefinite" restart="never" nodeType="tmRoot"/>
+      </p:par>
+    </p:tnLst>
+  </p:timing>
+</p:sld>
+</file>
+
+<file path=ppt/slides/slide20.xml><?xml version="1.0" encoding="utf-8"?>
+<p:sld xmlns:a="http://schemas.openxmlformats.org/drawingml/2006/main" xmlns:r="http://schemas.openxmlformats.org/officeDocument/2006/relationships" xmlns:p="http://schemas.openxmlformats.org/presentationml/2006/main">
+  <p:cSld>
+    <p:spTree>
+      <p:nvGrpSpPr>
+        <p:cNvPr id="1" name=""/>
+        <p:cNvGrpSpPr/>
+        <p:nvPr/>
+      </p:nvGrpSpPr>
+      <p:grpSpPr>
+        <a:xfrm>
+          <a:off x="0" y="0"/>
+          <a:ext cx="0" cy="0"/>
+          <a:chOff x="0" y="0"/>
+          <a:chExt cx="0" cy="0"/>
+        </a:xfrm>
+      </p:grpSpPr>
+      <p:sp>
+        <p:nvSpPr>
+          <p:cNvPr id="28673" name="Content Placeholder 2"/>
           <p:cNvSpPr>
             <a:spLocks noGrp="1"/>
           </p:cNvSpPr>
@@ -5746,7 +6338,7 @@
       </p:sp>
       <p:sp>
         <p:nvSpPr>
-          <p:cNvPr id="27650" name="Content Placeholder 2"/>
+          <p:cNvPr id="28674" name="Content Placeholder 2"/>
           <p:cNvSpPr txBox="1">
             <a:spLocks/>
           </p:cNvSpPr>
@@ -6251,7 +6843,7 @@
       </p:sp>
       <p:sp>
         <p:nvSpPr>
-          <p:cNvPr id="27655" name="Content Placeholder 2"/>
+          <p:cNvPr id="28679" name="Content Placeholder 2"/>
           <p:cNvSpPr txBox="1">
             <a:spLocks/>
           </p:cNvSpPr>
@@ -6335,7 +6927,7 @@
       </p:cxnSp>
       <p:sp>
         <p:nvSpPr>
-          <p:cNvPr id="27657" name="Content Placeholder 2"/>
+          <p:cNvPr id="28681" name="Content Placeholder 2"/>
           <p:cNvSpPr txBox="1">
             <a:spLocks/>
           </p:cNvSpPr>
@@ -6535,381 +7127,6 @@
               <a:t>Appendix:</a:t>
             </a:r>
             <a:endParaRPr lang="en-US" sz="2800" dirty="0"/>
-          </a:p>
-        </p:txBody>
-      </p:sp>
-    </p:spTree>
-  </p:cSld>
-  <p:clrMapOvr>
-    <a:masterClrMapping/>
-  </p:clrMapOvr>
-  <p:timing>
-    <p:tnLst>
-      <p:par>
-        <p:cTn id="1" dur="indefinite" restart="never" nodeType="tmRoot"/>
-      </p:par>
-    </p:tnLst>
-  </p:timing>
-</p:sld>
-</file>
-
-<file path=ppt/slides/slide2.xml><?xml version="1.0" encoding="utf-8"?>
-<p:sld xmlns:a="http://schemas.openxmlformats.org/drawingml/2006/main" xmlns:r="http://schemas.openxmlformats.org/officeDocument/2006/relationships" xmlns:p="http://schemas.openxmlformats.org/presentationml/2006/main">
-  <p:cSld>
-    <p:spTree>
-      <p:nvGrpSpPr>
-        <p:cNvPr id="1" name=""/>
-        <p:cNvGrpSpPr/>
-        <p:nvPr/>
-      </p:nvGrpSpPr>
-      <p:grpSpPr>
-        <a:xfrm>
-          <a:off x="0" y="0"/>
-          <a:ext cx="0" cy="0"/>
-          <a:chOff x="0" y="0"/>
-          <a:chExt cx="0" cy="0"/>
-        </a:xfrm>
-      </p:grpSpPr>
-      <p:sp>
-        <p:nvSpPr>
-          <p:cNvPr id="6" name="Title 1"/>
-          <p:cNvSpPr>
-            <a:spLocks noGrp="1"/>
-          </p:cNvSpPr>
-          <p:nvPr>
-            <p:ph type="title"/>
-          </p:nvPr>
-        </p:nvSpPr>
-        <p:spPr>
-          <a:xfrm>
-            <a:off x="0" y="114300"/>
-            <a:ext cx="8769350" cy="1333500"/>
-          </a:xfrm>
-        </p:spPr>
-        <p:txBody>
-          <a:bodyPr rtlCol="0" anchor="t">
-            <a:normAutofit fontScale="90000"/>
-          </a:bodyPr>
-          <a:lstStyle/>
-          <a:p>
-            <a:pPr algn="ctr" eaLnBrk="1" fontAlgn="auto" hangingPunct="1">
-              <a:spcAft>
-                <a:spcPts val="0"/>
-              </a:spcAft>
-              <a:defRPr/>
-            </a:pPr>
-            <a:r>
-              <a:rPr lang="en-US" dirty="0" smtClean="0">
-                <a:ea typeface="+mj-ea"/>
-              </a:rPr>
-              <a:t>INTRODUCTION</a:t>
-            </a:r>
-            <a:br>
-              <a:rPr lang="en-US" dirty="0" smtClean="0">
-                <a:ea typeface="+mj-ea"/>
-              </a:rPr>
-            </a:br>
-            <a:r>
-              <a:rPr lang="en-US" dirty="0" smtClean="0">
-                <a:ea typeface="+mj-ea"/>
-              </a:rPr>
-              <a:t>     NGTA  - </a:t>
-            </a:r>
-            <a:r>
-              <a:rPr lang="en-US" sz="3000" b="1" dirty="0" smtClean="0">
-                <a:ea typeface="+mj-ea"/>
-              </a:rPr>
-              <a:t>Next Generation platform Test </a:t>
-            </a:r>
-            <a:r>
-              <a:rPr lang="en-US" sz="3000" b="1" dirty="0">
-                <a:ea typeface="+mj-ea"/>
-              </a:rPr>
-              <a:t>Automation</a:t>
-            </a:r>
-          </a:p>
-        </p:txBody>
-      </p:sp>
-      <p:sp>
-        <p:nvSpPr>
-          <p:cNvPr id="7" name="Content Placeholder 2"/>
-          <p:cNvSpPr>
-            <a:spLocks noGrp="1"/>
-          </p:cNvSpPr>
-          <p:nvPr>
-            <p:ph idx="1"/>
-          </p:nvPr>
-        </p:nvSpPr>
-        <p:spPr>
-          <a:xfrm>
-            <a:off x="277813" y="1512888"/>
-            <a:ext cx="8866187" cy="3997325"/>
-          </a:xfrm>
-        </p:spPr>
-        <p:txBody>
-          <a:bodyPr rtlCol="0">
-            <a:normAutofit/>
-          </a:bodyPr>
-          <a:lstStyle/>
-          <a:p>
-            <a:pPr marL="342900" indent="-342900" eaLnBrk="1" fontAlgn="auto" hangingPunct="1">
-              <a:lnSpc>
-                <a:spcPct val="90000"/>
-              </a:lnSpc>
-              <a:spcBef>
-                <a:spcPts val="0"/>
-              </a:spcBef>
-              <a:spcAft>
-                <a:spcPts val="0"/>
-              </a:spcAft>
-              <a:buFont typeface="Arial" panose="020B0604020202020204" pitchFamily="34" charset="0"/>
-              <a:buChar char="•"/>
-              <a:defRPr/>
-            </a:pPr>
-            <a:r>
-              <a:rPr lang="en-US" sz="2000" b="1" dirty="0" smtClean="0">
-                <a:ea typeface="+mn-ea"/>
-              </a:rPr>
-              <a:t>The Test Automation frame work leverages available open source technology</a:t>
-            </a:r>
-          </a:p>
-          <a:p>
-            <a:pPr marL="747713" lvl="1" indent="-171450" eaLnBrk="1" fontAlgn="auto" hangingPunct="1">
-              <a:lnSpc>
-                <a:spcPct val="90000"/>
-              </a:lnSpc>
-              <a:spcBef>
-                <a:spcPts val="0"/>
-              </a:spcBef>
-              <a:spcAft>
-                <a:spcPts val="0"/>
-              </a:spcAft>
-              <a:buFont typeface="Arial" panose="020B0604020202020204" pitchFamily="34" charset="0"/>
-              <a:buChar char="•"/>
-              <a:defRPr/>
-            </a:pPr>
-            <a:r>
-              <a:rPr lang="en-US" sz="1600" b="1" dirty="0" smtClean="0">
-                <a:ea typeface="+mn-ea"/>
-              </a:rPr>
-              <a:t>Node,   Protractor,   JavaScript</a:t>
-            </a:r>
-            <a:r>
-              <a:rPr lang="en-US" sz="1600" b="1" dirty="0">
-                <a:ea typeface="+mn-ea"/>
-              </a:rPr>
-              <a:t> </a:t>
-            </a:r>
-            <a:endParaRPr lang="en-US" sz="2000" b="1" dirty="0">
-              <a:ea typeface="+mn-ea"/>
-            </a:endParaRPr>
-          </a:p>
-          <a:p>
-            <a:pPr lvl="1" indent="0" eaLnBrk="1" fontAlgn="auto" hangingPunct="1">
-              <a:lnSpc>
-                <a:spcPct val="90000"/>
-              </a:lnSpc>
-              <a:spcBef>
-                <a:spcPts val="0"/>
-              </a:spcBef>
-              <a:spcAft>
-                <a:spcPts val="0"/>
-              </a:spcAft>
-              <a:buFontTx/>
-              <a:buNone/>
-              <a:defRPr/>
-            </a:pPr>
-            <a:endParaRPr lang="en-US" sz="1200" dirty="0">
-              <a:ea typeface="+mn-ea"/>
-            </a:endParaRPr>
-          </a:p>
-          <a:p>
-            <a:pPr marL="342900" indent="-342900" eaLnBrk="1" fontAlgn="auto" hangingPunct="1">
-              <a:lnSpc>
-                <a:spcPct val="90000"/>
-              </a:lnSpc>
-              <a:spcBef>
-                <a:spcPts val="0"/>
-              </a:spcBef>
-              <a:spcAft>
-                <a:spcPts val="0"/>
-              </a:spcAft>
-              <a:buFont typeface="Arial" panose="020B0604020202020204" pitchFamily="34" charset="0"/>
-              <a:buChar char="•"/>
-              <a:defRPr/>
-            </a:pPr>
-            <a:r>
-              <a:rPr lang="en-US" sz="2000" b="1" dirty="0" smtClean="0">
-                <a:ea typeface="+mn-ea"/>
-              </a:rPr>
-              <a:t>NGTA validates product quality, usability and performance of CX Web Applications</a:t>
-            </a:r>
-          </a:p>
-          <a:p>
-            <a:pPr lvl="1" indent="0" eaLnBrk="1" fontAlgn="auto" hangingPunct="1">
-              <a:lnSpc>
-                <a:spcPct val="90000"/>
-              </a:lnSpc>
-              <a:spcBef>
-                <a:spcPts val="0"/>
-              </a:spcBef>
-              <a:spcAft>
-                <a:spcPts val="0"/>
-              </a:spcAft>
-              <a:buFontTx/>
-              <a:buNone/>
-              <a:defRPr/>
-            </a:pPr>
-            <a:r>
-              <a:rPr lang="en-US" sz="800" dirty="0" smtClean="0">
-                <a:solidFill>
-                  <a:srgbClr val="FF0000"/>
-                </a:solidFill>
-                <a:ea typeface="+mn-ea"/>
-              </a:rPr>
-              <a:t>	</a:t>
-            </a:r>
-            <a:endParaRPr lang="en-US" sz="1000" dirty="0" smtClean="0">
-              <a:solidFill>
-                <a:srgbClr val="FF0000"/>
-              </a:solidFill>
-              <a:ea typeface="+mn-ea"/>
-            </a:endParaRPr>
-          </a:p>
-          <a:p>
-            <a:pPr lvl="1" indent="0" eaLnBrk="1" fontAlgn="auto" hangingPunct="1">
-              <a:lnSpc>
-                <a:spcPct val="90000"/>
-              </a:lnSpc>
-              <a:spcBef>
-                <a:spcPts val="0"/>
-              </a:spcBef>
-              <a:spcAft>
-                <a:spcPts val="0"/>
-              </a:spcAft>
-              <a:buFontTx/>
-              <a:buNone/>
-              <a:defRPr/>
-            </a:pPr>
-            <a:endParaRPr lang="en-US" sz="1000" dirty="0" smtClean="0">
-              <a:ea typeface="+mn-ea"/>
-            </a:endParaRPr>
-          </a:p>
-          <a:p>
-            <a:pPr lvl="1" indent="0" eaLnBrk="1" fontAlgn="auto" hangingPunct="1">
-              <a:lnSpc>
-                <a:spcPct val="90000"/>
-              </a:lnSpc>
-              <a:spcBef>
-                <a:spcPts val="0"/>
-              </a:spcBef>
-              <a:spcAft>
-                <a:spcPts val="0"/>
-              </a:spcAft>
-              <a:buFontTx/>
-              <a:buNone/>
-              <a:defRPr/>
-            </a:pPr>
-            <a:endParaRPr lang="en-US" sz="1000" dirty="0" smtClean="0">
-              <a:ea typeface="+mn-ea"/>
-            </a:endParaRPr>
-          </a:p>
-          <a:p>
-            <a:pPr marL="342900" indent="-342900" eaLnBrk="1" fontAlgn="auto" hangingPunct="1">
-              <a:lnSpc>
-                <a:spcPct val="90000"/>
-              </a:lnSpc>
-              <a:spcBef>
-                <a:spcPts val="0"/>
-              </a:spcBef>
-              <a:spcAft>
-                <a:spcPts val="0"/>
-              </a:spcAft>
-              <a:buFont typeface="Arial" panose="020B0604020202020204" pitchFamily="34" charset="0"/>
-              <a:buChar char="•"/>
-              <a:defRPr/>
-            </a:pPr>
-            <a:r>
-              <a:rPr lang="en-US" sz="2000" b="1" dirty="0"/>
-              <a:t>NGTA </a:t>
-            </a:r>
-            <a:r>
-              <a:rPr lang="en-US" sz="2000" b="1" dirty="0" smtClean="0">
-                <a:ea typeface="+mn-ea"/>
-              </a:rPr>
-              <a:t>validates core functional APIs( micro service API )</a:t>
-            </a:r>
-          </a:p>
-          <a:p>
-            <a:pPr marL="919163" lvl="1" indent="-342900" eaLnBrk="1" fontAlgn="auto" hangingPunct="1">
-              <a:lnSpc>
-                <a:spcPct val="90000"/>
-              </a:lnSpc>
-              <a:spcBef>
-                <a:spcPts val="0"/>
-              </a:spcBef>
-              <a:spcAft>
-                <a:spcPts val="0"/>
-              </a:spcAft>
-              <a:buFont typeface="Arial" panose="020B0604020202020204" pitchFamily="34" charset="0"/>
-              <a:buChar char="•"/>
-              <a:defRPr/>
-            </a:pPr>
-            <a:r>
-              <a:rPr lang="en-US" sz="1600" b="1" dirty="0" smtClean="0">
-                <a:ea typeface="+mn-ea"/>
-              </a:rPr>
-              <a:t>Node.js, Frisby</a:t>
-            </a:r>
-            <a:r>
-              <a:rPr lang="en-US" sz="1600" b="1" dirty="0">
-                <a:ea typeface="+mn-ea"/>
-              </a:rPr>
-              <a:t> </a:t>
-            </a:r>
-            <a:endParaRPr lang="en-US" sz="1400" b="1" dirty="0" smtClean="0">
-              <a:ea typeface="+mn-ea"/>
-            </a:endParaRPr>
-          </a:p>
-          <a:p>
-            <a:pPr marL="342900" indent="-342900" eaLnBrk="1" fontAlgn="auto" hangingPunct="1">
-              <a:lnSpc>
-                <a:spcPct val="150000"/>
-              </a:lnSpc>
-              <a:spcAft>
-                <a:spcPts val="1000"/>
-              </a:spcAft>
-              <a:buFont typeface="Arial" panose="020B0604020202020204" pitchFamily="34" charset="0"/>
-              <a:buChar char="•"/>
-              <a:defRPr/>
-            </a:pPr>
-            <a:r>
-              <a:rPr lang="en-US" sz="2000" b="1" dirty="0" smtClean="0">
-                <a:ea typeface="+mn-ea"/>
-              </a:rPr>
-              <a:t>The following provides an explanation of </a:t>
-            </a:r>
-            <a:r>
-              <a:rPr lang="en-US" sz="2000" b="1" dirty="0" smtClean="0"/>
-              <a:t>NGTA </a:t>
-            </a:r>
-            <a:r>
-              <a:rPr lang="en-US" sz="2000" b="1" dirty="0" smtClean="0">
-                <a:ea typeface="+mn-ea"/>
-              </a:rPr>
-              <a:t>, our purpose, technologies, philosophies, process, and our evolutionary plans for 2018 being developed by         2 local staff and 3 off shore staff.</a:t>
-            </a:r>
-          </a:p>
-          <a:p>
-            <a:pPr eaLnBrk="1" fontAlgn="auto" hangingPunct="1">
-              <a:spcAft>
-                <a:spcPts val="0"/>
-              </a:spcAft>
-              <a:defRPr/>
-            </a:pPr>
-            <a:endParaRPr lang="en-US" dirty="0">
-              <a:ea typeface="+mn-ea"/>
-            </a:endParaRPr>
           </a:p>
         </p:txBody>
       </p:sp>
@@ -7360,7 +7577,7 @@
               <a:buChar char="•"/>
             </a:pPr>
             <a:r>
-              <a:rPr lang="en-US" sz="2000" b="1" dirty="0" smtClean="0">
+              <a:rPr lang="en-US" sz="2000" b="1" smtClean="0">
                 <a:latin typeface="Calibri Light" pitchFamily="34" charset="0"/>
               </a:rPr>
               <a:t>NGTA and the CX Market Place Development Team have matured since 2016. </a:t>
@@ -7374,17 +7591,19 @@
               <a:spcBef>
                 <a:spcPct val="0"/>
               </a:spcBef>
-              <a:buFont typeface="Arial" panose="020B0604020202020204" pitchFamily="34" charset="0"/>
-              <a:buChar char="•"/>
-            </a:pPr>
-            <a:r>
-              <a:rPr lang="en-US" sz="1600" b="1" dirty="0" smtClean="0">
+              <a:buFont typeface="Arial" charset="0"/>
+              <a:buBlip>
+                <a:blip r:embed="rId3"/>
+              </a:buBlip>
+            </a:pPr>
+            <a:r>
+              <a:rPr lang="en-US" sz="1600" b="1" smtClean="0">
                 <a:latin typeface="Calibri Light" pitchFamily="34" charset="0"/>
               </a:rPr>
               <a:t>We are able to do more and deliver to a greater audience. </a:t>
             </a:r>
             <a:r>
-              <a:rPr lang="en-US" sz="1800" b="1" dirty="0" smtClean="0">
+              <a:rPr lang="en-US" sz="1800" b="1" smtClean="0">
                 <a:latin typeface="Calibri Light" pitchFamily="34" charset="0"/>
               </a:rPr>
               <a:t> </a:t>
@@ -7402,7 +7621,7 @@
               <a:buChar char="•"/>
             </a:pPr>
             <a:r>
-              <a:rPr lang="en-US" sz="2000" b="1" dirty="0" smtClean="0">
+              <a:rPr lang="en-US" sz="2000" b="1" smtClean="0">
                 <a:latin typeface="Calibri Light" pitchFamily="34" charset="0"/>
               </a:rPr>
               <a:t>To scale as projected </a:t>
@@ -7420,13 +7639,13 @@
               <a:buChar char="•"/>
             </a:pPr>
             <a:r>
-              <a:rPr lang="en-US" sz="1600" b="1" dirty="0" smtClean="0">
+              <a:rPr lang="en-US" sz="1600" b="1" smtClean="0">
                 <a:latin typeface="Calibri Light" pitchFamily="34" charset="0"/>
               </a:rPr>
               <a:t>we have to change how we develop tests   </a:t>
             </a:r>
             <a:r>
-              <a:rPr lang="en-US" sz="1000" b="1" dirty="0" smtClean="0">
+              <a:rPr lang="en-US" sz="1000" b="1" smtClean="0">
                 <a:solidFill>
                   <a:srgbClr val="A6A6A6"/>
                 </a:solidFill>
@@ -7447,12 +7666,12 @@
               <a:buChar char="•"/>
             </a:pPr>
             <a:r>
-              <a:rPr lang="en-US" sz="1600" b="1" dirty="0" smtClean="0">
+              <a:rPr lang="en-US" sz="1600" b="1" smtClean="0">
                 <a:latin typeface="Calibri Light" pitchFamily="34" charset="0"/>
               </a:rPr>
               <a:t>we have changed how we select &amp; control execution  </a:t>
             </a:r>
-            <a:endParaRPr lang="en-US" sz="1000" b="1" dirty="0" smtClean="0">
+            <a:endParaRPr lang="en-US" sz="1000" b="1" smtClean="0">
               <a:solidFill>
                 <a:srgbClr val="A6A6A6"/>
               </a:solidFill>
@@ -7471,7 +7690,7 @@
               <a:buNone/>
             </a:pPr>
             <a:r>
-              <a:rPr lang="en-US" sz="200" b="1" dirty="0" smtClean="0">
+              <a:rPr lang="en-US" sz="200" b="1" smtClean="0">
                 <a:solidFill>
                   <a:srgbClr val="A6A6A6"/>
                 </a:solidFill>
@@ -7479,7 +7698,7 @@
               </a:rPr>
               <a:t>   </a:t>
             </a:r>
-            <a:endParaRPr lang="en-US" sz="700" b="1" dirty="0" smtClean="0">
+            <a:endParaRPr lang="en-US" sz="700" b="1" smtClean="0">
               <a:latin typeface="Calibri Light" pitchFamily="34" charset="0"/>
             </a:endParaRPr>
           </a:p>
@@ -7495,7 +7714,7 @@
               <a:buChar char="•"/>
             </a:pPr>
             <a:r>
-              <a:rPr lang="en-US" sz="2000" b="1" dirty="0" smtClean="0">
+              <a:rPr lang="en-US" sz="2000" b="1" smtClean="0">
                 <a:latin typeface="Calibri Light" pitchFamily="34" charset="0"/>
               </a:rPr>
               <a:t>Massive reduction in the number of hours  Manual VS Automated</a:t>
@@ -7512,7 +7731,7 @@
               <a:buFontTx/>
               <a:buNone/>
             </a:pPr>
-            <a:endParaRPr lang="en-US" sz="1800" dirty="0" smtClean="0">
+            <a:endParaRPr lang="en-US" sz="1800" smtClean="0">
               <a:latin typeface="Calibri Light" pitchFamily="34" charset="0"/>
             </a:endParaRPr>
           </a:p>
@@ -7527,7 +7746,7 @@
               <a:buFont typeface="Arial" charset="0"/>
               <a:buChar char="•"/>
             </a:pPr>
-            <a:endParaRPr lang="en-US" sz="1800" dirty="0" smtClean="0">
+            <a:endParaRPr lang="en-US" sz="1800" smtClean="0">
               <a:latin typeface="Calibri Light" pitchFamily="34" charset="0"/>
             </a:endParaRPr>
           </a:p>
@@ -7537,7 +7756,7 @@
                 <a:spcPct val="70000"/>
               </a:lnSpc>
             </a:pPr>
-            <a:endParaRPr lang="en-US" sz="2000" dirty="0" smtClean="0">
+            <a:endParaRPr lang="en-US" sz="2000" smtClean="0">
               <a:latin typeface="Calibri Light" pitchFamily="34" charset="0"/>
             </a:endParaRPr>
           </a:p>
@@ -7829,7 +8048,7 @@
           <p:nvPr/>
         </p:nvPicPr>
         <p:blipFill>
-          <a:blip r:embed="rId3"/>
+          <a:blip r:embed="rId4"/>
           <a:srcRect/>
           <a:stretch>
             <a:fillRect/>
@@ -7861,7 +8080,7 @@
           <p:nvPr/>
         </p:nvPicPr>
         <p:blipFill>
-          <a:blip r:embed="rId4"/>
+          <a:blip r:embed="rId5"/>
           <a:srcRect/>
           <a:stretch>
             <a:fillRect/>
@@ -8507,8 +8726,8 @@
         </p:nvSpPr>
         <p:spPr>
           <a:xfrm>
-            <a:off x="498475" y="115887"/>
-            <a:ext cx="8540750" cy="1233795"/>
+            <a:off x="498475" y="115888"/>
+            <a:ext cx="8540750" cy="1233487"/>
           </a:xfrm>
         </p:spPr>
         <p:txBody>
@@ -8521,13 +8740,13 @@
               </a:lnSpc>
             </a:pPr>
             <a:r>
-              <a:rPr lang="en-US" sz="4500" dirty="0" smtClean="0">
+              <a:rPr lang="en-US" sz="4500" smtClean="0">
                 <a:latin typeface="Calibri Light" pitchFamily="34" charset="0"/>
               </a:rPr>
               <a:t>ARCHITECTURAL TECH STACK        </a:t>
             </a:r>
             <a:r>
-              <a:rPr lang="en-US" sz="4000" dirty="0" smtClean="0">
+              <a:rPr lang="en-US" sz="4000" smtClean="0">
                 <a:latin typeface="Calibri Light" pitchFamily="34" charset="0"/>
               </a:rPr>
               <a:t>REST API</a:t>
@@ -8545,8 +8764,8 @@
         </p:nvSpPr>
         <p:spPr bwMode="auto">
           <a:xfrm>
-            <a:off x="273050" y="1349682"/>
-            <a:ext cx="8855075" cy="608012"/>
+            <a:off x="273050" y="1349375"/>
+            <a:ext cx="8855075" cy="608013"/>
           </a:xfrm>
           <a:prstGeom prst="rect">
             <a:avLst/>
@@ -8565,14 +8784,11 @@
           <a:p>
             <a:pPr algn="ctr"/>
             <a:r>
-              <a:rPr lang="en-US" sz="3100" b="1" dirty="0" smtClean="0">
+              <a:rPr lang="en-US" sz="3100" b="1">
                 <a:latin typeface="Calibri Light" pitchFamily="34" charset="0"/>
               </a:rPr>
               <a:t>     Node.js         Frisby       JavaScript  </a:t>
             </a:r>
-            <a:endParaRPr lang="en-US" sz="3100" b="1" dirty="0">
-              <a:latin typeface="Calibri Light" pitchFamily="34" charset="0"/>
-            </a:endParaRPr>
           </a:p>
         </p:txBody>
       </p:sp>
@@ -8586,8 +8802,8 @@
         </p:nvSpPr>
         <p:spPr>
           <a:xfrm>
-            <a:off x="273049" y="1720228"/>
-            <a:ext cx="4129655" cy="5137772"/>
+            <a:off x="273050" y="1720850"/>
+            <a:ext cx="4129088" cy="5137150"/>
           </a:xfrm>
           <a:prstGeom prst="rect">
             <a:avLst/>
@@ -9003,40 +9219,37 @@
       </p:sp>
       <p:pic>
         <p:nvPicPr>
-          <p:cNvPr id="2" name="Picture 1"/>
+          <p:cNvPr id="15364" name="Picture 1"/>
           <p:cNvPicPr>
             <a:picLocks noChangeAspect="1"/>
           </p:cNvPicPr>
           <p:nvPr/>
         </p:nvPicPr>
         <p:blipFill>
-          <a:blip r:embed="rId3">
-            <a:extLst>
-              <a:ext uri="{28A0092B-C50C-407E-A947-70E740481C1C}">
-                <a14:useLocalDpi xmlns:a14="http://schemas.microsoft.com/office/drawing/2010/main" val="0"/>
-              </a:ext>
-            </a:extLst>
-          </a:blip>
+          <a:blip r:embed="rId3"/>
+          <a:srcRect/>
           <a:stretch>
             <a:fillRect/>
           </a:stretch>
         </p:blipFill>
-        <p:spPr>
+        <p:spPr bwMode="auto">
           <a:xfrm>
-            <a:off x="4189760" y="2285998"/>
-            <a:ext cx="4942984" cy="4072199"/>
+            <a:off x="4189413" y="2286000"/>
+            <a:ext cx="4943475" cy="4071938"/>
           </a:xfrm>
           <a:prstGeom prst="rect">
             <a:avLst/>
           </a:prstGeom>
+          <a:noFill/>
+          <a:ln w="9525">
+            <a:noFill/>
+            <a:miter lim="800000"/>
+            <a:headEnd/>
+            <a:tailEnd/>
+          </a:ln>
         </p:spPr>
       </p:pic>
     </p:spTree>
-    <p:extLst>
-      <p:ext uri="{BB962C8B-B14F-4D97-AF65-F5344CB8AC3E}">
-        <p14:creationId xmlns:p14="http://schemas.microsoft.com/office/powerpoint/2010/main" val="4266826973"/>
-      </p:ext>
-    </p:extLst>
   </p:cSld>
   <p:clrMapOvr>
     <a:masterClrMapping/>
@@ -9070,7 +9283,7 @@
       </p:grpSpPr>
       <p:sp>
         <p:nvSpPr>
-          <p:cNvPr id="15361" name="Title 1"/>
+          <p:cNvPr id="16385" name="Title 1"/>
           <p:cNvSpPr>
             <a:spLocks noGrp="1"/>
           </p:cNvSpPr>
@@ -9080,8 +9293,8 @@
         </p:nvSpPr>
         <p:spPr>
           <a:xfrm>
-            <a:off x="498475" y="115887"/>
-            <a:ext cx="8540750" cy="1233795"/>
+            <a:off x="498475" y="115888"/>
+            <a:ext cx="8540750" cy="1233487"/>
           </a:xfrm>
         </p:spPr>
         <p:txBody>
@@ -9094,13 +9307,13 @@
               </a:lnSpc>
             </a:pPr>
             <a:r>
-              <a:rPr lang="en-US" sz="4500" dirty="0" smtClean="0">
+              <a:rPr lang="en-US" sz="4500" smtClean="0">
                 <a:latin typeface="Calibri Light" pitchFamily="34" charset="0"/>
               </a:rPr>
               <a:t>ARCHITECTURAL TECH STACK       </a:t>
             </a:r>
             <a:r>
-              <a:rPr lang="en-US" sz="4000" dirty="0" smtClean="0">
+              <a:rPr lang="en-US" sz="4000" smtClean="0">
                 <a:latin typeface="Calibri Light" pitchFamily="34" charset="0"/>
               </a:rPr>
               <a:t>Market Place</a:t>
@@ -9110,7 +9323,7 @@
       </p:sp>
       <p:sp>
         <p:nvSpPr>
-          <p:cNvPr id="15362" name="Title 1"/>
+          <p:cNvPr id="16386" name="Title 1"/>
           <p:cNvSpPr txBox="1">
             <a:spLocks/>
           </p:cNvSpPr>
@@ -9118,8 +9331,8 @@
         </p:nvSpPr>
         <p:spPr bwMode="auto">
           <a:xfrm>
-            <a:off x="273050" y="1349682"/>
-            <a:ext cx="8855075" cy="608012"/>
+            <a:off x="273050" y="1349375"/>
+            <a:ext cx="8855075" cy="608013"/>
           </a:xfrm>
           <a:prstGeom prst="rect">
             <a:avLst/>
@@ -9138,26 +9351,11 @@
           <a:p>
             <a:pPr algn="ctr"/>
             <a:r>
-              <a:rPr lang="en-US" sz="3100" b="1" dirty="0" smtClean="0">
-                <a:latin typeface="Calibri Light" pitchFamily="34" charset="0"/>
-              </a:rPr>
-              <a:t>   Node.js     </a:t>
-            </a:r>
-            <a:r>
-              <a:rPr lang="en-US" sz="3100" b="1" dirty="0">
-                <a:latin typeface="Calibri Light" pitchFamily="34" charset="0"/>
-              </a:rPr>
-              <a:t>Protractor     </a:t>
-            </a:r>
-            <a:r>
-              <a:rPr lang="en-US" sz="3100" b="1" dirty="0" smtClean="0">
-                <a:latin typeface="Calibri Light" pitchFamily="34" charset="0"/>
-              </a:rPr>
-              <a:t>JavaScript</a:t>
-            </a:r>
-            <a:endParaRPr lang="en-US" sz="3100" b="1" dirty="0">
-              <a:latin typeface="Calibri Light" pitchFamily="34" charset="0"/>
-            </a:endParaRPr>
+              <a:rPr lang="en-US" sz="3100" b="1">
+                <a:latin typeface="Calibri Light" pitchFamily="34" charset="0"/>
+              </a:rPr>
+              <a:t>   Node.js     Protractor     JavaScript</a:t>
+            </a:r>
           </a:p>
         </p:txBody>
       </p:sp>
@@ -9171,8 +9369,8 @@
         </p:nvSpPr>
         <p:spPr>
           <a:xfrm>
-            <a:off x="273050" y="1801253"/>
-            <a:ext cx="4014788" cy="5050961"/>
+            <a:off x="273050" y="1801813"/>
+            <a:ext cx="4014788" cy="5049837"/>
           </a:xfrm>
           <a:prstGeom prst="rect">
             <a:avLst/>
@@ -9182,8 +9380,9 @@
           <a:bodyPr>
             <a:normAutofit/>
           </a:bodyPr>
-          <a:lstStyle>
-            <a:lvl1pPr marL="0" indent="0" algn="l" defTabSz="457200" rtl="0" eaLnBrk="1" latinLnBrk="0" hangingPunct="1">
+          <a:lstStyle/>
+          <a:p>
+            <a:pPr>
               <a:lnSpc>
                 <a:spcPct val="80000"/>
               </a:lnSpc>
@@ -9191,18 +9390,16 @@
                 <a:spcPct val="20000"/>
               </a:spcBef>
               <a:buSzPct val="100000"/>
-              <a:buFontTx/>
-              <a:buNone/>
-              <a:defRPr sz="2400" b="0" i="0" kern="1200" baseline="0">
-                <a:solidFill>
-                  <a:schemeClr val="tx1"/>
-                </a:solidFill>
-                <a:latin typeface="Calibri Light"/>
-                <a:ea typeface="+mn-ea"/>
-                <a:cs typeface="Calibri Light"/>
-              </a:defRPr>
-            </a:lvl1pPr>
-            <a:lvl2pPr marL="576263" indent="-234950" algn="l" defTabSz="457200" rtl="0" eaLnBrk="1" latinLnBrk="0" hangingPunct="1">
+            </a:pPr>
+            <a:r>
+              <a:rPr lang="en-US" sz="600">
+                <a:latin typeface="Calibri Light" pitchFamily="34" charset="0"/>
+              </a:rPr>
+              <a:t>       </a:t>
+            </a:r>
+          </a:p>
+          <a:p>
+            <a:pPr algn="ctr">
               <a:lnSpc>
                 <a:spcPct val="80000"/>
               </a:lnSpc>
@@ -9210,20 +9407,16 @@
                 <a:spcPct val="20000"/>
               </a:spcBef>
               <a:buSzPct val="100000"/>
-              <a:buFontTx/>
-              <a:buBlip>
-                <a:blip r:embed="rId2"/>
-              </a:buBlip>
-              <a:defRPr sz="2200" b="0" i="0" kern="1200">
-                <a:solidFill>
-                  <a:schemeClr val="tx1"/>
-                </a:solidFill>
-                <a:latin typeface="Calibri Light"/>
-                <a:ea typeface="+mn-ea"/>
-                <a:cs typeface="Calibri Light"/>
-              </a:defRPr>
-            </a:lvl2pPr>
-            <a:lvl3pPr marL="801688" indent="-225425" algn="l" defTabSz="457200" rtl="0" eaLnBrk="1" latinLnBrk="0" hangingPunct="1">
+            </a:pPr>
+            <a:r>
+              <a:rPr lang="en-US" sz="2400">
+                <a:latin typeface="Calibri Light" pitchFamily="34" charset="0"/>
+              </a:rPr>
+              <a:t>Framework is Class</a:t>
+            </a:r>
+          </a:p>
+          <a:p>
+            <a:pPr algn="ctr">
               <a:lnSpc>
                 <a:spcPct val="80000"/>
               </a:lnSpc>
@@ -9231,20 +9424,16 @@
                 <a:spcPct val="20000"/>
               </a:spcBef>
               <a:buSzPct val="100000"/>
-              <a:buFontTx/>
-              <a:buBlip>
-                <a:blip r:embed="rId2"/>
-              </a:buBlip>
-              <a:defRPr sz="2000" b="0" i="0" kern="1200">
-                <a:solidFill>
-                  <a:schemeClr val="tx1"/>
-                </a:solidFill>
-                <a:latin typeface="Calibri Light"/>
-                <a:ea typeface="+mn-ea"/>
-                <a:cs typeface="Calibri Light"/>
-              </a:defRPr>
-            </a:lvl3pPr>
-            <a:lvl4pPr marL="966788" indent="-165100" algn="l" defTabSz="457200" rtl="0" eaLnBrk="1" latinLnBrk="0" hangingPunct="1">
+            </a:pPr>
+            <a:r>
+              <a:rPr lang="en-US" sz="2400">
+                <a:latin typeface="Calibri Light" pitchFamily="34" charset="0"/>
+              </a:rPr>
+              <a:t>Object based</a:t>
+            </a:r>
+          </a:p>
+          <a:p>
+            <a:pPr>
               <a:lnSpc>
                 <a:spcPct val="80000"/>
               </a:lnSpc>
@@ -9252,444 +9441,284 @@
                 <a:spcPct val="20000"/>
               </a:spcBef>
               <a:buSzPct val="100000"/>
-              <a:buFontTx/>
-              <a:buBlip>
-                <a:blip r:embed="rId2"/>
-              </a:buBlip>
-              <a:defRPr sz="1800" b="0" i="0" kern="1200">
-                <a:solidFill>
-                  <a:schemeClr val="tx1"/>
-                </a:solidFill>
-                <a:latin typeface="Calibri Light"/>
-                <a:ea typeface="+mn-ea"/>
-                <a:cs typeface="Calibri Light"/>
-              </a:defRPr>
-            </a:lvl4pPr>
-            <a:lvl5pPr marL="1201738" indent="-176213" algn="l" defTabSz="457200" rtl="0" eaLnBrk="1" latinLnBrk="0" hangingPunct="1">
-              <a:lnSpc>
-                <a:spcPct val="80000"/>
-              </a:lnSpc>
-              <a:spcBef>
-                <a:spcPct val="20000"/>
-              </a:spcBef>
+            </a:pPr>
+            <a:r>
+              <a:rPr lang="en-US" sz="500">
+                <a:latin typeface="Calibri Light" pitchFamily="34" charset="0"/>
+              </a:rPr>
+              <a:t>      </a:t>
+            </a:r>
+            <a:r>
+              <a:rPr lang="en-US" sz="600">
+                <a:latin typeface="Calibri Light" pitchFamily="34" charset="0"/>
+              </a:rPr>
+              <a:t>           </a:t>
+            </a:r>
+          </a:p>
+          <a:p>
+            <a:pPr>
               <a:buSzPct val="100000"/>
-              <a:buFontTx/>
-              <a:buBlip>
-                <a:blip r:embed="rId2"/>
-              </a:buBlip>
-              <a:defRPr sz="1600" b="0" i="0" kern="1200">
-                <a:solidFill>
-                  <a:schemeClr val="tx1"/>
-                </a:solidFill>
-                <a:latin typeface="Calibri Light"/>
-                <a:ea typeface="+mn-ea"/>
-                <a:cs typeface="Calibri Light"/>
-              </a:defRPr>
-            </a:lvl5pPr>
-            <a:lvl6pPr marL="2514600" indent="-228600" algn="l" defTabSz="457200" rtl="0" eaLnBrk="1" latinLnBrk="0" hangingPunct="1">
-              <a:spcBef>
-                <a:spcPct val="20000"/>
-              </a:spcBef>
-              <a:buFont typeface="Arial"/>
+              <a:buFont typeface="Arial" charset="0"/>
               <a:buChar char="•"/>
-              <a:defRPr sz="2000" kern="1200">
-                <a:solidFill>
-                  <a:schemeClr val="tx1"/>
-                </a:solidFill>
-                <a:latin typeface="+mn-lt"/>
-                <a:ea typeface="+mn-ea"/>
-                <a:cs typeface="+mn-cs"/>
-              </a:defRPr>
-            </a:lvl6pPr>
-            <a:lvl7pPr marL="2971800" indent="-228600" algn="l" defTabSz="457200" rtl="0" eaLnBrk="1" latinLnBrk="0" hangingPunct="1">
-              <a:spcBef>
-                <a:spcPct val="20000"/>
-              </a:spcBef>
-              <a:buFont typeface="Arial"/>
-              <a:buChar char="•"/>
-              <a:defRPr sz="2000" kern="1200">
-                <a:solidFill>
-                  <a:schemeClr val="tx1"/>
-                </a:solidFill>
-                <a:latin typeface="+mn-lt"/>
-                <a:ea typeface="+mn-ea"/>
-                <a:cs typeface="+mn-cs"/>
-              </a:defRPr>
-            </a:lvl7pPr>
-            <a:lvl8pPr marL="3429000" indent="-228600" algn="l" defTabSz="457200" rtl="0" eaLnBrk="1" latinLnBrk="0" hangingPunct="1">
-              <a:spcBef>
-                <a:spcPct val="20000"/>
-              </a:spcBef>
-              <a:buFont typeface="Arial"/>
-              <a:buChar char="•"/>
-              <a:defRPr sz="2000" kern="1200">
-                <a:solidFill>
-                  <a:schemeClr val="tx1"/>
-                </a:solidFill>
-                <a:latin typeface="+mn-lt"/>
-                <a:ea typeface="+mn-ea"/>
-                <a:cs typeface="+mn-cs"/>
-              </a:defRPr>
-            </a:lvl8pPr>
-            <a:lvl9pPr marL="3886200" indent="-228600" algn="l" defTabSz="457200" rtl="0" eaLnBrk="1" latinLnBrk="0" hangingPunct="1">
-              <a:spcBef>
-                <a:spcPct val="20000"/>
-              </a:spcBef>
-              <a:buFont typeface="Arial"/>
-              <a:buChar char="•"/>
-              <a:defRPr sz="2000" kern="1200">
-                <a:solidFill>
-                  <a:schemeClr val="tx1"/>
-                </a:solidFill>
-                <a:latin typeface="+mn-lt"/>
-                <a:ea typeface="+mn-ea"/>
-                <a:cs typeface="+mn-cs"/>
-              </a:defRPr>
-            </a:lvl9pPr>
-          </a:lstStyle>
-          <a:p>
-            <a:pPr fontAlgn="auto">
-              <a:spcAft>
-                <a:spcPts val="0"/>
-              </a:spcAft>
-              <a:defRPr/>
-            </a:pPr>
-            <a:r>
-              <a:rPr lang="en-US" sz="600" dirty="0" smtClean="0"/>
-              <a:t>       </a:t>
-            </a:r>
-          </a:p>
-          <a:p>
-            <a:pPr algn="ctr" fontAlgn="auto">
-              <a:spcAft>
-                <a:spcPts val="0"/>
-              </a:spcAft>
-              <a:defRPr/>
-            </a:pPr>
-            <a:r>
-              <a:rPr lang="en-US" dirty="0" smtClean="0"/>
-              <a:t>Framework is Class</a:t>
-            </a:r>
-          </a:p>
-          <a:p>
-            <a:pPr algn="ctr" fontAlgn="auto">
-              <a:spcAft>
-                <a:spcPts val="0"/>
-              </a:spcAft>
-              <a:defRPr/>
-            </a:pPr>
-            <a:r>
-              <a:rPr lang="en-US" dirty="0" smtClean="0"/>
-              <a:t>Object based</a:t>
-            </a:r>
-          </a:p>
-          <a:p>
-            <a:pPr fontAlgn="auto">
-              <a:spcAft>
-                <a:spcPts val="0"/>
-              </a:spcAft>
-              <a:defRPr/>
-            </a:pPr>
-            <a:r>
-              <a:rPr lang="en-US" sz="500" dirty="0" smtClean="0"/>
-              <a:t>      </a:t>
-            </a:r>
-            <a:r>
-              <a:rPr lang="en-US" sz="600" dirty="0" smtClean="0"/>
-              <a:t>           </a:t>
-            </a:r>
-          </a:p>
-          <a:p>
-            <a:pPr fontAlgn="auto">
-              <a:lnSpc>
-                <a:spcPct val="100000"/>
-              </a:lnSpc>
-              <a:spcBef>
-                <a:spcPts val="0"/>
-              </a:spcBef>
-              <a:spcAft>
-                <a:spcPts val="0"/>
-              </a:spcAft>
-              <a:buFont typeface="Arial" panose="020B0604020202020204" pitchFamily="34" charset="0"/>
-              <a:buChar char="•"/>
-              <a:defRPr/>
-            </a:pPr>
-            <a:r>
-              <a:rPr lang="en-US" sz="1800" b="1" dirty="0" smtClean="0"/>
+            </a:pPr>
+            <a:r>
+              <a:rPr lang="en-US" b="1">
+                <a:latin typeface="Calibri Light" pitchFamily="34" charset="0"/>
+              </a:rPr>
               <a:t>Scripting :</a:t>
             </a:r>
             <a:r>
-              <a:rPr lang="en-US" sz="1800" dirty="0" smtClean="0"/>
-              <a:t> </a:t>
-            </a:r>
-            <a:r>
-              <a:rPr lang="en-US" sz="1800" dirty="0"/>
-              <a:t>Collection of actions specific to</a:t>
-            </a:r>
-            <a:r>
-              <a:rPr lang="en-US" sz="1800" dirty="0">
+              <a:rPr lang="en-US">
+                <a:latin typeface="Calibri Light" pitchFamily="34" charset="0"/>
+              </a:rPr>
+              <a:t> Collection of actions specific to</a:t>
+            </a:r>
+            <a:r>
+              <a:rPr lang="en-US">
                 <a:solidFill>
                   <a:schemeClr val="bg1"/>
                 </a:solidFill>
+                <a:latin typeface="Calibri Light" pitchFamily="34" charset="0"/>
               </a:rPr>
               <a:t> </a:t>
             </a:r>
             <a:r>
-              <a:rPr lang="en-US" sz="1800" dirty="0" smtClean="0"/>
-              <a:t>the domain of T</a:t>
-            </a:r>
-            <a:r>
-              <a:rPr lang="en-US" sz="1800" u="sng" dirty="0" smtClean="0"/>
-              <a:t>est</a:t>
-            </a:r>
-            <a:r>
-              <a:rPr lang="en-US" sz="1800" dirty="0" smtClean="0"/>
-              <a:t>.  Built from </a:t>
-            </a:r>
-            <a:r>
-              <a:rPr lang="en-US" sz="1800" dirty="0"/>
-              <a:t>Core &amp; Mid Layer </a:t>
-            </a:r>
-            <a:r>
-              <a:rPr lang="en-US" sz="1800" dirty="0" smtClean="0"/>
-              <a:t>components</a:t>
-            </a:r>
-          </a:p>
-          <a:p>
-            <a:pPr fontAlgn="auto">
-              <a:lnSpc>
-                <a:spcPct val="100000"/>
-              </a:lnSpc>
-              <a:spcBef>
-                <a:spcPts val="0"/>
-              </a:spcBef>
-              <a:spcAft>
-                <a:spcPts val="0"/>
-              </a:spcAft>
-              <a:defRPr/>
-            </a:pPr>
-            <a:r>
-              <a:rPr lang="en-US" sz="900" dirty="0" smtClean="0"/>
+              <a:rPr lang="en-US">
+                <a:latin typeface="Calibri Light" pitchFamily="34" charset="0"/>
+              </a:rPr>
+              <a:t>the domain of </a:t>
+            </a:r>
+            <a:r>
+              <a:rPr lang="en-US" u="sng">
+                <a:latin typeface="Calibri Light" pitchFamily="34" charset="0"/>
+              </a:rPr>
+              <a:t>Test</a:t>
+            </a:r>
+            <a:r>
+              <a:rPr lang="en-US">
+                <a:latin typeface="Calibri Light" pitchFamily="34" charset="0"/>
+              </a:rPr>
+              <a:t>.  Built from Core &amp; Mid Layer components</a:t>
+            </a:r>
+          </a:p>
+          <a:p>
+            <a:pPr>
+              <a:buSzPct val="100000"/>
+            </a:pPr>
+            <a:r>
+              <a:rPr lang="en-US" sz="900">
+                <a:latin typeface="Calibri Light" pitchFamily="34" charset="0"/>
+              </a:rPr>
               <a:t>  </a:t>
             </a:r>
           </a:p>
           <a:p>
-            <a:pPr fontAlgn="auto">
-              <a:lnSpc>
-                <a:spcPct val="100000"/>
-              </a:lnSpc>
-              <a:spcBef>
-                <a:spcPts val="0"/>
-              </a:spcBef>
-              <a:spcAft>
-                <a:spcPts val="0"/>
-              </a:spcAft>
-              <a:buFont typeface="Arial" panose="020B0604020202020204" pitchFamily="34" charset="0"/>
+            <a:pPr>
+              <a:buSzPct val="100000"/>
+              <a:buFont typeface="Arial" charset="0"/>
               <a:buChar char="•"/>
-              <a:defRPr/>
-            </a:pPr>
-            <a:r>
-              <a:rPr lang="en-US" sz="1800" b="1" dirty="0" smtClean="0"/>
+            </a:pPr>
+            <a:r>
+              <a:rPr lang="en-US" b="1">
+                <a:latin typeface="Calibri Light" pitchFamily="34" charset="0"/>
+              </a:rPr>
               <a:t>Mid Layer </a:t>
             </a:r>
             <a:r>
-              <a:rPr lang="en-US" sz="1800" dirty="0" smtClean="0"/>
+              <a:rPr lang="en-US">
+                <a:latin typeface="Calibri Light" pitchFamily="34" charset="0"/>
+              </a:rPr>
               <a:t>: Actions limited to within the </a:t>
             </a:r>
             <a:r>
-              <a:rPr lang="en-US" sz="1800" u="sng" dirty="0" smtClean="0"/>
+              <a:rPr lang="en-US" u="sng">
+                <a:latin typeface="Calibri Light" pitchFamily="34" charset="0"/>
+              </a:rPr>
               <a:t>Application</a:t>
             </a:r>
             <a:r>
-              <a:rPr lang="en-US" sz="1800" dirty="0" smtClean="0"/>
+              <a:rPr lang="en-US">
+                <a:latin typeface="Calibri Light" pitchFamily="34" charset="0"/>
+              </a:rPr>
               <a:t>, </a:t>
             </a:r>
             <a:r>
-              <a:rPr lang="en-US" sz="1800" dirty="0" smtClean="0">
+              <a:rPr lang="en-US">
                 <a:solidFill>
                   <a:schemeClr val="bg1"/>
                 </a:solidFill>
+                <a:latin typeface="Calibri Light" pitchFamily="34" charset="0"/>
               </a:rPr>
               <a:t> </a:t>
             </a:r>
             <a:r>
-              <a:rPr lang="en-US" sz="1800" dirty="0" smtClean="0"/>
+              <a:rPr lang="en-US">
+                <a:latin typeface="Calibri Light" pitchFamily="34" charset="0"/>
+              </a:rPr>
               <a:t>Collections built up from base class methods and Protractor to </a:t>
             </a:r>
             <a:r>
-              <a:rPr lang="en-US" sz="1800" dirty="0" smtClean="0">
+              <a:rPr lang="en-US">
                 <a:solidFill>
                   <a:schemeClr val="bg1"/>
                 </a:solidFill>
+                <a:latin typeface="Calibri Light" pitchFamily="34" charset="0"/>
               </a:rPr>
               <a:t> </a:t>
             </a:r>
             <a:r>
-              <a:rPr lang="en-US" sz="1800" dirty="0"/>
+              <a:rPr lang="en-US">
+                <a:latin typeface="Calibri Light" pitchFamily="34" charset="0"/>
+              </a:rPr>
               <a:t>perform specific </a:t>
             </a:r>
             <a:r>
-              <a:rPr lang="en-US" sz="1800" dirty="0">
+              <a:rPr lang="en-US">
                 <a:solidFill>
                   <a:schemeClr val="bg1"/>
                 </a:solidFill>
+                <a:latin typeface="Calibri Light" pitchFamily="34" charset="0"/>
               </a:rPr>
               <a:t> </a:t>
             </a:r>
             <a:r>
-              <a:rPr lang="en-US" sz="1800" dirty="0"/>
+              <a:rPr lang="en-US">
+                <a:latin typeface="Calibri Light" pitchFamily="34" charset="0"/>
+              </a:rPr>
               <a:t>action Application</a:t>
             </a:r>
-            <a:endParaRPr lang="en-US" sz="1800" dirty="0" smtClean="0"/>
-          </a:p>
-          <a:p>
-            <a:pPr indent="-234950" fontAlgn="auto">
-              <a:lnSpc>
-                <a:spcPct val="100000"/>
-              </a:lnSpc>
-              <a:spcBef>
-                <a:spcPts val="0"/>
-              </a:spcBef>
-              <a:spcAft>
-                <a:spcPts val="0"/>
-              </a:spcAft>
-              <a:defRPr/>
-            </a:pPr>
-            <a:r>
-              <a:rPr lang="en-US" sz="800" dirty="0" smtClean="0"/>
+          </a:p>
+          <a:p>
+            <a:pPr>
+              <a:buSzPct val="100000"/>
+            </a:pPr>
+            <a:r>
+              <a:rPr lang="en-US" sz="800">
+                <a:latin typeface="Calibri Light" pitchFamily="34" charset="0"/>
+              </a:rPr>
               <a:t>   </a:t>
             </a:r>
-            <a:endParaRPr lang="en-US" sz="1800" dirty="0" smtClean="0"/>
-          </a:p>
-          <a:p>
-            <a:pPr fontAlgn="auto">
-              <a:lnSpc>
-                <a:spcPct val="100000"/>
-              </a:lnSpc>
-              <a:spcBef>
-                <a:spcPts val="0"/>
-              </a:spcBef>
-              <a:spcAft>
-                <a:spcPts val="0"/>
-              </a:spcAft>
-              <a:buFont typeface="Arial" panose="020B0604020202020204" pitchFamily="34" charset="0"/>
+            <a:endParaRPr lang="en-US">
+              <a:latin typeface="Calibri Light" pitchFamily="34" charset="0"/>
+            </a:endParaRPr>
+          </a:p>
+          <a:p>
+            <a:pPr>
+              <a:buSzPct val="100000"/>
+              <a:buFont typeface="Arial" charset="0"/>
               <a:buChar char="•"/>
-              <a:defRPr/>
-            </a:pPr>
-            <a:r>
-              <a:rPr lang="en-US" sz="1800" b="1" dirty="0"/>
+            </a:pPr>
+            <a:r>
+              <a:rPr lang="en-US" b="1">
+                <a:latin typeface="Calibri Light" pitchFamily="34" charset="0"/>
+              </a:rPr>
               <a:t>Core base level </a:t>
             </a:r>
             <a:r>
-              <a:rPr lang="en-US" sz="1800" dirty="0"/>
+              <a:rPr lang="en-US">
+                <a:latin typeface="Calibri Light" pitchFamily="34" charset="0"/>
+              </a:rPr>
               <a:t>classes define    </a:t>
             </a:r>
             <a:r>
-              <a:rPr lang="en-US" sz="1800" dirty="0">
+              <a:rPr lang="en-US">
                 <a:solidFill>
                   <a:schemeClr val="bg1"/>
                 </a:solidFill>
+                <a:latin typeface="Calibri Light" pitchFamily="34" charset="0"/>
               </a:rPr>
               <a:t>  </a:t>
             </a:r>
             <a:r>
-              <a:rPr lang="en-US" sz="1800" dirty="0"/>
+              <a:rPr lang="en-US">
+                <a:latin typeface="Calibri Light" pitchFamily="34" charset="0"/>
+              </a:rPr>
               <a:t>common components, Fields, </a:t>
             </a:r>
             <a:r>
-              <a:rPr lang="en-US" sz="1800" dirty="0">
+              <a:rPr lang="en-US">
                 <a:solidFill>
                   <a:schemeClr val="bg1"/>
                 </a:solidFill>
+                <a:latin typeface="Calibri Light" pitchFamily="34" charset="0"/>
               </a:rPr>
               <a:t> </a:t>
             </a:r>
             <a:r>
-              <a:rPr lang="en-US" sz="1800" dirty="0"/>
+              <a:rPr lang="en-US">
+                <a:latin typeface="Calibri Light" pitchFamily="34" charset="0"/>
+              </a:rPr>
               <a:t>Buttons, Links</a:t>
             </a:r>
           </a:p>
           <a:p>
-            <a:pPr fontAlgn="auto">
-              <a:lnSpc>
-                <a:spcPct val="100000"/>
-              </a:lnSpc>
-              <a:spcBef>
-                <a:spcPts val="0"/>
-              </a:spcBef>
-              <a:spcAft>
-                <a:spcPts val="0"/>
-              </a:spcAft>
-              <a:defRPr/>
-            </a:pPr>
-            <a:r>
-              <a:rPr lang="en-US" sz="900" dirty="0" smtClean="0"/>
+            <a:pPr>
+              <a:buSzPct val="100000"/>
+            </a:pPr>
+            <a:r>
+              <a:rPr lang="en-US" sz="900">
+                <a:latin typeface="Calibri Light" pitchFamily="34" charset="0"/>
+              </a:rPr>
               <a:t>   </a:t>
             </a:r>
           </a:p>
           <a:p>
-            <a:pPr fontAlgn="auto">
-              <a:lnSpc>
-                <a:spcPct val="100000"/>
-              </a:lnSpc>
-              <a:spcBef>
-                <a:spcPts val="0"/>
-              </a:spcBef>
-              <a:spcAft>
-                <a:spcPts val="0"/>
-              </a:spcAft>
-              <a:buFont typeface="Arial" panose="020B0604020202020204" pitchFamily="34" charset="0"/>
+            <a:pPr>
+              <a:buSzPct val="100000"/>
+              <a:buFont typeface="Arial" charset="0"/>
               <a:buChar char="•"/>
-              <a:defRPr/>
-            </a:pPr>
-            <a:r>
-              <a:rPr lang="en-US" sz="1800" b="1" dirty="0" smtClean="0"/>
+            </a:pPr>
+            <a:r>
+              <a:rPr lang="en-US" b="1">
+                <a:latin typeface="Calibri Light" pitchFamily="34" charset="0"/>
+              </a:rPr>
               <a:t>Micro Service REST APIs </a:t>
             </a:r>
             <a:r>
-              <a:rPr lang="en-US" sz="1800" dirty="0" smtClean="0"/>
+              <a:rPr lang="en-US">
+                <a:latin typeface="Calibri Light" pitchFamily="34" charset="0"/>
+              </a:rPr>
               <a:t>The underlying mechanism to acquiring persisted data yet decoupled from application</a:t>
             </a:r>
-            <a:endParaRPr lang="en-US" sz="1800" b="1" dirty="0"/>
+            <a:endParaRPr lang="en-US" b="1">
+              <a:latin typeface="Calibri Light" pitchFamily="34" charset="0"/>
+            </a:endParaRPr>
           </a:p>
         </p:txBody>
       </p:sp>
       <p:pic>
         <p:nvPicPr>
-          <p:cNvPr id="4" name="Picture 3"/>
+          <p:cNvPr id="16388" name="Picture 3"/>
           <p:cNvPicPr>
             <a:picLocks noChangeAspect="1"/>
           </p:cNvPicPr>
           <p:nvPr/>
         </p:nvPicPr>
         <p:blipFill>
-          <a:blip r:embed="rId3">
-            <a:extLst>
-              <a:ext uri="{28A0092B-C50C-407E-A947-70E740481C1C}">
-                <a14:useLocalDpi xmlns:a14="http://schemas.microsoft.com/office/drawing/2010/main" val="0"/>
-              </a:ext>
-            </a:extLst>
-          </a:blip>
+          <a:blip r:embed="rId2"/>
+          <a:srcRect/>
           <a:stretch>
             <a:fillRect/>
           </a:stretch>
         </p:blipFill>
-        <p:spPr>
+        <p:spPr bwMode="auto">
           <a:xfrm>
-            <a:off x="4133661" y="2296388"/>
-            <a:ext cx="4989557" cy="4130386"/>
+            <a:off x="4133850" y="2297113"/>
+            <a:ext cx="4989513" cy="4129087"/>
           </a:xfrm>
           <a:prstGeom prst="rect">
             <a:avLst/>
           </a:prstGeom>
+          <a:noFill/>
+          <a:ln w="9525">
+            <a:noFill/>
+            <a:miter lim="800000"/>
+            <a:headEnd/>
+            <a:tailEnd/>
+          </a:ln>
         </p:spPr>
       </p:pic>
     </p:spTree>
-    <p:extLst>
-      <p:ext uri="{BB962C8B-B14F-4D97-AF65-F5344CB8AC3E}">
-        <p14:creationId xmlns:p14="http://schemas.microsoft.com/office/powerpoint/2010/main" val="906061002"/>
-      </p:ext>
-    </p:extLst>
   </p:cSld>
   <p:clrMapOvr>
     <a:masterClrMapping/>
@@ -9778,7 +9807,7 @@
         </p:nvSpPr>
         <p:spPr>
           <a:xfrm>
-            <a:off x="274638" y="1572563"/>
+            <a:off x="274638" y="1573213"/>
             <a:ext cx="8567737" cy="5002212"/>
           </a:xfrm>
         </p:spPr>
@@ -9894,6 +9923,7 @@
               <a:spcAft>
                 <a:spcPts val="0"/>
               </a:spcAft>
+              <a:buFontTx/>
               <a:buNone/>
               <a:defRPr/>
             </a:pPr>
@@ -10322,7 +10352,7 @@
         </p:nvSpPr>
         <p:spPr>
           <a:xfrm>
-            <a:off x="274638" y="1473981"/>
+            <a:off x="274638" y="1473200"/>
             <a:ext cx="8567737" cy="5002213"/>
           </a:xfrm>
         </p:spPr>
@@ -11032,7 +11062,7 @@
   <a:extraClrSchemeLst/>
   <a:extLst>
     <a:ext uri="{05A4C25C-085E-4340-85A3-A5531E510DB2}">
-      <thm15:themeFamily xmlns:thm15="http://schemas.microsoft.com/office/thememl/2012/main" name="Presentation2" id="{E033CE4F-DAC9-4DC1-B085-D07FC0345DDB}" vid="{0783260F-4856-4ED7-B8E5-5C83CC1572CF}"/>
+      <thm15:themeFamily xmlns="" xmlns:thm15="http://schemas.microsoft.com/office/thememl/2012/main" name="Presentation2" id="{E033CE4F-DAC9-4DC1-B085-D07FC0345DDB}" vid="{0783260F-4856-4ED7-B8E5-5C83CC1572CF}"/>
     </a:ext>
   </a:extLst>
 </a:theme>
@@ -11293,7 +11323,7 @@
   <a:extraClrSchemeLst/>
   <a:extLst>
     <a:ext uri="{05A4C25C-085E-4340-85A3-A5531E510DB2}">
-      <thm15:themeFamily xmlns:thm15="http://schemas.microsoft.com/office/thememl/2012/main" name="Office Theme" id="{62F939B6-93AF-4DB8-9C6B-D6C7DFDC589F}" vid="{4A3C46E8-61CC-4603-A589-7422A47A8E4A}"/>
+      <thm15:themeFamily xmlns="" xmlns:thm15="http://schemas.microsoft.com/office/thememl/2012/main" name="Office Theme" id="{62F939B6-93AF-4DB8-9C6B-D6C7DFDC589F}" vid="{4A3C46E8-61CC-4603-A589-7422A47A8E4A}"/>
     </a:ext>
   </a:extLst>
 </a:theme>

</xml_diff>